<commit_message>
Creation of Home page design in pptx file
</commit_message>
<xml_diff>
--- a/Website Design Tools.pptx
+++ b/Website Design Tools.pptx
@@ -2,13 +2,16 @@
 <file path=ppt/presentation.xml><?xml version="1.0" encoding="utf-8"?>
 <p:presentation xmlns:a="http://schemas.openxmlformats.org/drawingml/2006/main" xmlns:r="http://schemas.openxmlformats.org/officeDocument/2006/relationships" xmlns:p="http://schemas.openxmlformats.org/presentationml/2006/main" saveSubsetFonts="1">
   <p:sldMasterIdLst>
-    <p:sldMasterId id="2147483660" r:id="rId1"/>
+    <p:sldMasterId id="2147483672" r:id="rId1"/>
   </p:sldMasterIdLst>
+  <p:notesMasterIdLst>
+    <p:notesMasterId r:id="rId4"/>
+  </p:notesMasterIdLst>
   <p:sldIdLst>
     <p:sldId id="257" r:id="rId2"/>
     <p:sldId id="258" r:id="rId3"/>
   </p:sldIdLst>
-  <p:sldSz cx="6858000" cy="12192000"/>
+  <p:sldSz cx="6858000" cy="10799763"/>
   <p:notesSz cx="6858000" cy="9144000"/>
   <p:defaultTextStyle>
     <a:defPPr>
@@ -106,9 +109,23 @@
     </a:lvl9pPr>
   </p:defaultTextStyle>
   <p:extLst>
+    <p:ext uri="{521415D9-36F7-43E2-AB2F-B90AF26B5E84}">
+      <p14:sectionLst xmlns:p14="http://schemas.microsoft.com/office/powerpoint/2010/main">
+        <p14:section name="Ideas and Elements" id="{F08C5A6D-516F-4A4D-840E-FEBB0C8624D6}">
+          <p14:sldIdLst>
+            <p14:sldId id="257"/>
+          </p14:sldIdLst>
+        </p14:section>
+        <p14:section name="Page Designs" id="{1543D77E-2646-47C1-932D-F940423AE1B4}">
+          <p14:sldIdLst>
+            <p14:sldId id="258"/>
+          </p14:sldIdLst>
+        </p14:section>
+      </p14:sectionLst>
+    </p:ext>
     <p:ext uri="{EFAFB233-063F-42B5-8137-9DF3F51BA10A}">
       <p15:sldGuideLst xmlns:p15="http://schemas.microsoft.com/office/powerpoint/2012/main">
-        <p15:guide id="1" orient="horz" pos="3840" userDrawn="1">
+        <p15:guide id="1" orient="horz" pos="3402" userDrawn="1">
           <p15:clr>
             <a:srgbClr val="A4A3A4"/>
           </p15:clr>
@@ -5362,6 +5379,457 @@
 </dgm:styleDef>
 </file>
 
+<file path=ppt/notesMasters/notesMaster1.xml><?xml version="1.0" encoding="utf-8"?>
+<p:notesMaster xmlns:a="http://schemas.openxmlformats.org/drawingml/2006/main" xmlns:r="http://schemas.openxmlformats.org/officeDocument/2006/relationships" xmlns:p="http://schemas.openxmlformats.org/presentationml/2006/main">
+  <p:cSld>
+    <p:bg>
+      <p:bgRef idx="1001">
+        <a:schemeClr val="bg1"/>
+      </p:bgRef>
+    </p:bg>
+    <p:spTree>
+      <p:nvGrpSpPr>
+        <p:cNvPr id="1" name=""/>
+        <p:cNvGrpSpPr/>
+        <p:nvPr/>
+      </p:nvGrpSpPr>
+      <p:grpSpPr>
+        <a:xfrm>
+          <a:off x="0" y="0"/>
+          <a:ext cx="0" cy="0"/>
+          <a:chOff x="0" y="0"/>
+          <a:chExt cx="0" cy="0"/>
+        </a:xfrm>
+      </p:grpSpPr>
+      <p:sp>
+        <p:nvSpPr>
+          <p:cNvPr id="2" name="Header Placeholder 1"/>
+          <p:cNvSpPr>
+            <a:spLocks noGrp="1"/>
+          </p:cNvSpPr>
+          <p:nvPr>
+            <p:ph type="hdr" sz="quarter"/>
+          </p:nvPr>
+        </p:nvSpPr>
+        <p:spPr>
+          <a:xfrm>
+            <a:off x="0" y="0"/>
+            <a:ext cx="2971800" cy="458788"/>
+          </a:xfrm>
+          <a:prstGeom prst="rect">
+            <a:avLst/>
+          </a:prstGeom>
+        </p:spPr>
+        <p:txBody>
+          <a:bodyPr vert="horz" lIns="91440" tIns="45720" rIns="91440" bIns="45720" rtlCol="0"/>
+          <a:lstStyle>
+            <a:lvl1pPr algn="l">
+              <a:defRPr sz="1200"/>
+            </a:lvl1pPr>
+          </a:lstStyle>
+          <a:p>
+            <a:endParaRPr lang="en-GB"/>
+          </a:p>
+        </p:txBody>
+      </p:sp>
+      <p:sp>
+        <p:nvSpPr>
+          <p:cNvPr id="3" name="Date Placeholder 2"/>
+          <p:cNvSpPr>
+            <a:spLocks noGrp="1"/>
+          </p:cNvSpPr>
+          <p:nvPr>
+            <p:ph type="dt" idx="1"/>
+          </p:nvPr>
+        </p:nvSpPr>
+        <p:spPr>
+          <a:xfrm>
+            <a:off x="3884613" y="0"/>
+            <a:ext cx="2971800" cy="458788"/>
+          </a:xfrm>
+          <a:prstGeom prst="rect">
+            <a:avLst/>
+          </a:prstGeom>
+        </p:spPr>
+        <p:txBody>
+          <a:bodyPr vert="horz" lIns="91440" tIns="45720" rIns="91440" bIns="45720" rtlCol="0"/>
+          <a:lstStyle>
+            <a:lvl1pPr algn="r">
+              <a:defRPr sz="1200"/>
+            </a:lvl1pPr>
+          </a:lstStyle>
+          <a:p>
+            <a:fld id="{12F15D9C-A007-4C82-A807-6D2013854DF5}" type="datetimeFigureOut">
+              <a:rPr lang="en-GB" smtClean="0"/>
+              <a:t>14/02/2022</a:t>
+            </a:fld>
+            <a:endParaRPr lang="en-GB"/>
+          </a:p>
+        </p:txBody>
+      </p:sp>
+      <p:sp>
+        <p:nvSpPr>
+          <p:cNvPr id="4" name="Slide Image Placeholder 3"/>
+          <p:cNvSpPr>
+            <a:spLocks noGrp="1" noRot="1" noChangeAspect="1"/>
+          </p:cNvSpPr>
+          <p:nvPr>
+            <p:ph type="sldImg" idx="2"/>
+          </p:nvPr>
+        </p:nvSpPr>
+        <p:spPr>
+          <a:xfrm>
+            <a:off x="2449513" y="1143000"/>
+            <a:ext cx="1958975" cy="3086100"/>
+          </a:xfrm>
+          <a:prstGeom prst="rect">
+            <a:avLst/>
+          </a:prstGeom>
+          <a:noFill/>
+          <a:ln w="12700">
+            <a:solidFill>
+              <a:prstClr val="black"/>
+            </a:solidFill>
+          </a:ln>
+        </p:spPr>
+        <p:txBody>
+          <a:bodyPr vert="horz" lIns="91440" tIns="45720" rIns="91440" bIns="45720" rtlCol="0" anchor="ctr"/>
+          <a:lstStyle/>
+          <a:p>
+            <a:endParaRPr lang="en-GB"/>
+          </a:p>
+        </p:txBody>
+      </p:sp>
+      <p:sp>
+        <p:nvSpPr>
+          <p:cNvPr id="5" name="Notes Placeholder 4"/>
+          <p:cNvSpPr>
+            <a:spLocks noGrp="1"/>
+          </p:cNvSpPr>
+          <p:nvPr>
+            <p:ph type="body" sz="quarter" idx="3"/>
+          </p:nvPr>
+        </p:nvSpPr>
+        <p:spPr>
+          <a:xfrm>
+            <a:off x="685800" y="4400550"/>
+            <a:ext cx="5486400" cy="3600450"/>
+          </a:xfrm>
+          <a:prstGeom prst="rect">
+            <a:avLst/>
+          </a:prstGeom>
+        </p:spPr>
+        <p:txBody>
+          <a:bodyPr vert="horz" lIns="91440" tIns="45720" rIns="91440" bIns="45720" rtlCol="0"/>
+          <a:lstStyle/>
+          <a:p>
+            <a:pPr lvl="0"/>
+            <a:r>
+              <a:rPr lang="en-US"/>
+              <a:t>Click to edit Master text styles</a:t>
+            </a:r>
+          </a:p>
+          <a:p>
+            <a:pPr lvl="1"/>
+            <a:r>
+              <a:rPr lang="en-US"/>
+              <a:t>Second level</a:t>
+            </a:r>
+          </a:p>
+          <a:p>
+            <a:pPr lvl="2"/>
+            <a:r>
+              <a:rPr lang="en-US"/>
+              <a:t>Third level</a:t>
+            </a:r>
+          </a:p>
+          <a:p>
+            <a:pPr lvl="3"/>
+            <a:r>
+              <a:rPr lang="en-US"/>
+              <a:t>Fourth level</a:t>
+            </a:r>
+          </a:p>
+          <a:p>
+            <a:pPr lvl="4"/>
+            <a:r>
+              <a:rPr lang="en-US"/>
+              <a:t>Fifth level</a:t>
+            </a:r>
+            <a:endParaRPr lang="en-GB"/>
+          </a:p>
+        </p:txBody>
+      </p:sp>
+      <p:sp>
+        <p:nvSpPr>
+          <p:cNvPr id="6" name="Footer Placeholder 5"/>
+          <p:cNvSpPr>
+            <a:spLocks noGrp="1"/>
+          </p:cNvSpPr>
+          <p:nvPr>
+            <p:ph type="ftr" sz="quarter" idx="4"/>
+          </p:nvPr>
+        </p:nvSpPr>
+        <p:spPr>
+          <a:xfrm>
+            <a:off x="0" y="8685213"/>
+            <a:ext cx="2971800" cy="458787"/>
+          </a:xfrm>
+          <a:prstGeom prst="rect">
+            <a:avLst/>
+          </a:prstGeom>
+        </p:spPr>
+        <p:txBody>
+          <a:bodyPr vert="horz" lIns="91440" tIns="45720" rIns="91440" bIns="45720" rtlCol="0" anchor="b"/>
+          <a:lstStyle>
+            <a:lvl1pPr algn="l">
+              <a:defRPr sz="1200"/>
+            </a:lvl1pPr>
+          </a:lstStyle>
+          <a:p>
+            <a:endParaRPr lang="en-GB"/>
+          </a:p>
+        </p:txBody>
+      </p:sp>
+      <p:sp>
+        <p:nvSpPr>
+          <p:cNvPr id="7" name="Slide Number Placeholder 6"/>
+          <p:cNvSpPr>
+            <a:spLocks noGrp="1"/>
+          </p:cNvSpPr>
+          <p:nvPr>
+            <p:ph type="sldNum" sz="quarter" idx="5"/>
+          </p:nvPr>
+        </p:nvSpPr>
+        <p:spPr>
+          <a:xfrm>
+            <a:off x="3884613" y="8685213"/>
+            <a:ext cx="2971800" cy="458787"/>
+          </a:xfrm>
+          <a:prstGeom prst="rect">
+            <a:avLst/>
+          </a:prstGeom>
+        </p:spPr>
+        <p:txBody>
+          <a:bodyPr vert="horz" lIns="91440" tIns="45720" rIns="91440" bIns="45720" rtlCol="0" anchor="b"/>
+          <a:lstStyle>
+            <a:lvl1pPr algn="r">
+              <a:defRPr sz="1200"/>
+            </a:lvl1pPr>
+          </a:lstStyle>
+          <a:p>
+            <a:fld id="{63B92925-6786-4756-8985-7A915050A8F8}" type="slidenum">
+              <a:rPr lang="en-GB" smtClean="0"/>
+              <a:t>‹#›</a:t>
+            </a:fld>
+            <a:endParaRPr lang="en-GB"/>
+          </a:p>
+        </p:txBody>
+      </p:sp>
+    </p:spTree>
+    <p:extLst>
+      <p:ext uri="{BB962C8B-B14F-4D97-AF65-F5344CB8AC3E}">
+        <p14:creationId xmlns:p14="http://schemas.microsoft.com/office/powerpoint/2010/main" val="2008657801"/>
+      </p:ext>
+    </p:extLst>
+  </p:cSld>
+  <p:clrMap bg1="lt1" tx1="dk1" bg2="lt2" tx2="dk2" accent1="accent1" accent2="accent2" accent3="accent3" accent4="accent4" accent5="accent5" accent6="accent6" hlink="hlink" folHlink="folHlink"/>
+  <p:notesStyle>
+    <a:lvl1pPr marL="0" algn="l" defTabSz="914400" rtl="0" eaLnBrk="1" latinLnBrk="0" hangingPunct="1">
+      <a:defRPr sz="1200" kern="1200">
+        <a:solidFill>
+          <a:schemeClr val="tx1"/>
+        </a:solidFill>
+        <a:latin typeface="+mn-lt"/>
+        <a:ea typeface="+mn-ea"/>
+        <a:cs typeface="+mn-cs"/>
+      </a:defRPr>
+    </a:lvl1pPr>
+    <a:lvl2pPr marL="457200" algn="l" defTabSz="914400" rtl="0" eaLnBrk="1" latinLnBrk="0" hangingPunct="1">
+      <a:defRPr sz="1200" kern="1200">
+        <a:solidFill>
+          <a:schemeClr val="tx1"/>
+        </a:solidFill>
+        <a:latin typeface="+mn-lt"/>
+        <a:ea typeface="+mn-ea"/>
+        <a:cs typeface="+mn-cs"/>
+      </a:defRPr>
+    </a:lvl2pPr>
+    <a:lvl3pPr marL="914400" algn="l" defTabSz="914400" rtl="0" eaLnBrk="1" latinLnBrk="0" hangingPunct="1">
+      <a:defRPr sz="1200" kern="1200">
+        <a:solidFill>
+          <a:schemeClr val="tx1"/>
+        </a:solidFill>
+        <a:latin typeface="+mn-lt"/>
+        <a:ea typeface="+mn-ea"/>
+        <a:cs typeface="+mn-cs"/>
+      </a:defRPr>
+    </a:lvl3pPr>
+    <a:lvl4pPr marL="1371600" algn="l" defTabSz="914400" rtl="0" eaLnBrk="1" latinLnBrk="0" hangingPunct="1">
+      <a:defRPr sz="1200" kern="1200">
+        <a:solidFill>
+          <a:schemeClr val="tx1"/>
+        </a:solidFill>
+        <a:latin typeface="+mn-lt"/>
+        <a:ea typeface="+mn-ea"/>
+        <a:cs typeface="+mn-cs"/>
+      </a:defRPr>
+    </a:lvl4pPr>
+    <a:lvl5pPr marL="1828800" algn="l" defTabSz="914400" rtl="0" eaLnBrk="1" latinLnBrk="0" hangingPunct="1">
+      <a:defRPr sz="1200" kern="1200">
+        <a:solidFill>
+          <a:schemeClr val="tx1"/>
+        </a:solidFill>
+        <a:latin typeface="+mn-lt"/>
+        <a:ea typeface="+mn-ea"/>
+        <a:cs typeface="+mn-cs"/>
+      </a:defRPr>
+    </a:lvl5pPr>
+    <a:lvl6pPr marL="2286000" algn="l" defTabSz="914400" rtl="0" eaLnBrk="1" latinLnBrk="0" hangingPunct="1">
+      <a:defRPr sz="1200" kern="1200">
+        <a:solidFill>
+          <a:schemeClr val="tx1"/>
+        </a:solidFill>
+        <a:latin typeface="+mn-lt"/>
+        <a:ea typeface="+mn-ea"/>
+        <a:cs typeface="+mn-cs"/>
+      </a:defRPr>
+    </a:lvl6pPr>
+    <a:lvl7pPr marL="2743200" algn="l" defTabSz="914400" rtl="0" eaLnBrk="1" latinLnBrk="0" hangingPunct="1">
+      <a:defRPr sz="1200" kern="1200">
+        <a:solidFill>
+          <a:schemeClr val="tx1"/>
+        </a:solidFill>
+        <a:latin typeface="+mn-lt"/>
+        <a:ea typeface="+mn-ea"/>
+        <a:cs typeface="+mn-cs"/>
+      </a:defRPr>
+    </a:lvl7pPr>
+    <a:lvl8pPr marL="3200400" algn="l" defTabSz="914400" rtl="0" eaLnBrk="1" latinLnBrk="0" hangingPunct="1">
+      <a:defRPr sz="1200" kern="1200">
+        <a:solidFill>
+          <a:schemeClr val="tx1"/>
+        </a:solidFill>
+        <a:latin typeface="+mn-lt"/>
+        <a:ea typeface="+mn-ea"/>
+        <a:cs typeface="+mn-cs"/>
+      </a:defRPr>
+    </a:lvl8pPr>
+    <a:lvl9pPr marL="3657600" algn="l" defTabSz="914400" rtl="0" eaLnBrk="1" latinLnBrk="0" hangingPunct="1">
+      <a:defRPr sz="1200" kern="1200">
+        <a:solidFill>
+          <a:schemeClr val="tx1"/>
+        </a:solidFill>
+        <a:latin typeface="+mn-lt"/>
+        <a:ea typeface="+mn-ea"/>
+        <a:cs typeface="+mn-cs"/>
+      </a:defRPr>
+    </a:lvl9pPr>
+  </p:notesStyle>
+</p:notesMaster>
+</file>
+
+<file path=ppt/notesSlides/notesSlide1.xml><?xml version="1.0" encoding="utf-8"?>
+<p:notes xmlns:a="http://schemas.openxmlformats.org/drawingml/2006/main" xmlns:r="http://schemas.openxmlformats.org/officeDocument/2006/relationships" xmlns:p="http://schemas.openxmlformats.org/presentationml/2006/main">
+  <p:cSld>
+    <p:spTree>
+      <p:nvGrpSpPr>
+        <p:cNvPr id="1" name=""/>
+        <p:cNvGrpSpPr/>
+        <p:nvPr/>
+      </p:nvGrpSpPr>
+      <p:grpSpPr>
+        <a:xfrm>
+          <a:off x="0" y="0"/>
+          <a:ext cx="0" cy="0"/>
+          <a:chOff x="0" y="0"/>
+          <a:chExt cx="0" cy="0"/>
+        </a:xfrm>
+      </p:grpSpPr>
+      <p:sp>
+        <p:nvSpPr>
+          <p:cNvPr id="2" name="Slide Image Placeholder 1"/>
+          <p:cNvSpPr>
+            <a:spLocks noGrp="1" noRot="1" noChangeAspect="1"/>
+          </p:cNvSpPr>
+          <p:nvPr>
+            <p:ph type="sldImg"/>
+          </p:nvPr>
+        </p:nvSpPr>
+        <p:spPr>
+          <a:xfrm>
+            <a:off x="2449513" y="1143000"/>
+            <a:ext cx="1958975" cy="3086100"/>
+          </a:xfrm>
+        </p:spPr>
+      </p:sp>
+      <p:sp>
+        <p:nvSpPr>
+          <p:cNvPr id="3" name="Notes Placeholder 2"/>
+          <p:cNvSpPr>
+            <a:spLocks noGrp="1"/>
+          </p:cNvSpPr>
+          <p:nvPr>
+            <p:ph type="body" idx="1"/>
+          </p:nvPr>
+        </p:nvSpPr>
+        <p:spPr/>
+        <p:txBody>
+          <a:bodyPr/>
+          <a:lstStyle/>
+          <a:p>
+            <a:r>
+              <a:rPr lang="en-GB" dirty="0"/>
+              <a:t>Blue container will be an image with a half opacity overlay, creating a faded out effect. Makes the text on top easier to read.</a:t>
+            </a:r>
+          </a:p>
+          <a:p>
+            <a:r>
+              <a:rPr lang="en-GB" dirty="0"/>
+              <a:t>The quote can be a patient review, a quote from the surgeon, etc.</a:t>
+            </a:r>
+          </a:p>
+          <a:p>
+            <a:endParaRPr lang="en-GB" dirty="0"/>
+          </a:p>
+        </p:txBody>
+      </p:sp>
+      <p:sp>
+        <p:nvSpPr>
+          <p:cNvPr id="4" name="Slide Number Placeholder 3"/>
+          <p:cNvSpPr>
+            <a:spLocks noGrp="1"/>
+          </p:cNvSpPr>
+          <p:nvPr>
+            <p:ph type="sldNum" sz="quarter" idx="5"/>
+          </p:nvPr>
+        </p:nvSpPr>
+        <p:spPr/>
+        <p:txBody>
+          <a:bodyPr/>
+          <a:lstStyle/>
+          <a:p>
+            <a:fld id="{63B92925-6786-4756-8985-7A915050A8F8}" type="slidenum">
+              <a:rPr lang="en-GB" smtClean="0"/>
+              <a:t>2</a:t>
+            </a:fld>
+            <a:endParaRPr lang="en-GB"/>
+          </a:p>
+        </p:txBody>
+      </p:sp>
+    </p:spTree>
+    <p:extLst>
+      <p:ext uri="{BB962C8B-B14F-4D97-AF65-F5344CB8AC3E}">
+        <p14:creationId xmlns:p14="http://schemas.microsoft.com/office/powerpoint/2010/main" val="941008046"/>
+      </p:ext>
+    </p:extLst>
+  </p:cSld>
+  <p:clrMapOvr>
+    <a:masterClrMapping/>
+  </p:clrMapOvr>
+</p:notes>
+</file>
+
 <file path=ppt/slideLayouts/slideLayout1.xml><?xml version="1.0" encoding="utf-8"?>
 <p:sldLayout xmlns:a="http://schemas.openxmlformats.org/drawingml/2006/main" xmlns:r="http://schemas.openxmlformats.org/officeDocument/2006/relationships" xmlns:p="http://schemas.openxmlformats.org/presentationml/2006/main" type="title" preserve="1">
   <p:cSld name="Title Slide">
@@ -5391,8 +5859,8 @@
         </p:nvSpPr>
         <p:spPr>
           <a:xfrm>
-            <a:off x="514350" y="1995312"/>
-            <a:ext cx="5829300" cy="4244622"/>
+            <a:off x="514350" y="1767462"/>
+            <a:ext cx="5829300" cy="3759917"/>
           </a:xfrm>
         </p:spPr>
         <p:txBody>
@@ -5423,8 +5891,8 @@
         </p:nvSpPr>
         <p:spPr>
           <a:xfrm>
-            <a:off x="857250" y="6403623"/>
-            <a:ext cx="5143500" cy="2943577"/>
+            <a:off x="857250" y="5672376"/>
+            <a:ext cx="5143500" cy="2607442"/>
           </a:xfrm>
         </p:spPr>
         <p:txBody>
@@ -5493,7 +5961,7 @@
           <a:p>
             <a:fld id="{1C4F9540-4BF6-456B-983F-E69BCBCF3DC2}" type="datetimeFigureOut">
               <a:rPr lang="en-GB" smtClean="0"/>
-              <a:t>12/02/2022</a:t>
+              <a:t>13/02/2022</a:t>
             </a:fld>
             <a:endParaRPr lang="en-GB"/>
           </a:p>
@@ -5544,7 +6012,7 @@
     </p:spTree>
     <p:extLst>
       <p:ext uri="{BB962C8B-B14F-4D97-AF65-F5344CB8AC3E}">
-        <p14:creationId xmlns:p14="http://schemas.microsoft.com/office/powerpoint/2010/main" val="4155518673"/>
+        <p14:creationId xmlns:p14="http://schemas.microsoft.com/office/powerpoint/2010/main" val="2576295039"/>
       </p:ext>
     </p:extLst>
   </p:cSld>
@@ -5663,7 +6131,7 @@
           <a:p>
             <a:fld id="{1C4F9540-4BF6-456B-983F-E69BCBCF3DC2}" type="datetimeFigureOut">
               <a:rPr lang="en-GB" smtClean="0"/>
-              <a:t>12/02/2022</a:t>
+              <a:t>13/02/2022</a:t>
             </a:fld>
             <a:endParaRPr lang="en-GB"/>
           </a:p>
@@ -5714,7 +6182,7 @@
     </p:spTree>
     <p:extLst>
       <p:ext uri="{BB962C8B-B14F-4D97-AF65-F5344CB8AC3E}">
-        <p14:creationId xmlns:p14="http://schemas.microsoft.com/office/powerpoint/2010/main" val="3877588525"/>
+        <p14:creationId xmlns:p14="http://schemas.microsoft.com/office/powerpoint/2010/main" val="3402040117"/>
       </p:ext>
     </p:extLst>
   </p:cSld>
@@ -5753,8 +6221,8 @@
         </p:nvSpPr>
         <p:spPr>
           <a:xfrm>
-            <a:off x="4907757" y="649111"/>
-            <a:ext cx="1478756" cy="10332156"/>
+            <a:off x="4907757" y="574987"/>
+            <a:ext cx="1478756" cy="9152300"/>
           </a:xfrm>
         </p:spPr>
         <p:txBody>
@@ -5781,8 +6249,8 @@
         </p:nvSpPr>
         <p:spPr>
           <a:xfrm>
-            <a:off x="471488" y="649111"/>
-            <a:ext cx="4350544" cy="10332156"/>
+            <a:off x="471488" y="574987"/>
+            <a:ext cx="4350544" cy="9152300"/>
           </a:xfrm>
         </p:spPr>
         <p:txBody>
@@ -5843,7 +6311,7 @@
           <a:p>
             <a:fld id="{1C4F9540-4BF6-456B-983F-E69BCBCF3DC2}" type="datetimeFigureOut">
               <a:rPr lang="en-GB" smtClean="0"/>
-              <a:t>12/02/2022</a:t>
+              <a:t>13/02/2022</a:t>
             </a:fld>
             <a:endParaRPr lang="en-GB"/>
           </a:p>
@@ -5894,7 +6362,7 @@
     </p:spTree>
     <p:extLst>
       <p:ext uri="{BB962C8B-B14F-4D97-AF65-F5344CB8AC3E}">
-        <p14:creationId xmlns:p14="http://schemas.microsoft.com/office/powerpoint/2010/main" val="3428076594"/>
+        <p14:creationId xmlns:p14="http://schemas.microsoft.com/office/powerpoint/2010/main" val="2663362345"/>
       </p:ext>
     </p:extLst>
   </p:cSld>
@@ -6013,7 +6481,7 @@
           <a:p>
             <a:fld id="{1C4F9540-4BF6-456B-983F-E69BCBCF3DC2}" type="datetimeFigureOut">
               <a:rPr lang="en-GB" smtClean="0"/>
-              <a:t>12/02/2022</a:t>
+              <a:t>13/02/2022</a:t>
             </a:fld>
             <a:endParaRPr lang="en-GB"/>
           </a:p>
@@ -6064,7 +6532,7 @@
     </p:spTree>
     <p:extLst>
       <p:ext uri="{BB962C8B-B14F-4D97-AF65-F5344CB8AC3E}">
-        <p14:creationId xmlns:p14="http://schemas.microsoft.com/office/powerpoint/2010/main" val="4256287988"/>
+        <p14:creationId xmlns:p14="http://schemas.microsoft.com/office/powerpoint/2010/main" val="481876773"/>
       </p:ext>
     </p:extLst>
   </p:cSld>
@@ -6103,8 +6571,8 @@
         </p:nvSpPr>
         <p:spPr>
           <a:xfrm>
-            <a:off x="467916" y="3039537"/>
-            <a:ext cx="5915025" cy="5071532"/>
+            <a:off x="467916" y="2692444"/>
+            <a:ext cx="5915025" cy="4492401"/>
           </a:xfrm>
         </p:spPr>
         <p:txBody>
@@ -6135,8 +6603,8 @@
         </p:nvSpPr>
         <p:spPr>
           <a:xfrm>
-            <a:off x="467916" y="8159048"/>
-            <a:ext cx="5915025" cy="2666999"/>
+            <a:off x="467916" y="7227345"/>
+            <a:ext cx="5915025" cy="2362447"/>
           </a:xfrm>
         </p:spPr>
         <p:txBody>
@@ -6257,7 +6725,7 @@
           <a:p>
             <a:fld id="{1C4F9540-4BF6-456B-983F-E69BCBCF3DC2}" type="datetimeFigureOut">
               <a:rPr lang="en-GB" smtClean="0"/>
-              <a:t>12/02/2022</a:t>
+              <a:t>13/02/2022</a:t>
             </a:fld>
             <a:endParaRPr lang="en-GB"/>
           </a:p>
@@ -6308,7 +6776,7 @@
     </p:spTree>
     <p:extLst>
       <p:ext uri="{BB962C8B-B14F-4D97-AF65-F5344CB8AC3E}">
-        <p14:creationId xmlns:p14="http://schemas.microsoft.com/office/powerpoint/2010/main" val="2289693488"/>
+        <p14:creationId xmlns:p14="http://schemas.microsoft.com/office/powerpoint/2010/main" val="2165681637"/>
       </p:ext>
     </p:extLst>
   </p:cSld>
@@ -6370,8 +6838,8 @@
         </p:nvSpPr>
         <p:spPr>
           <a:xfrm>
-            <a:off x="471488" y="3245556"/>
-            <a:ext cx="2914650" cy="7735712"/>
+            <a:off x="471488" y="2874937"/>
+            <a:ext cx="2914650" cy="6852350"/>
           </a:xfrm>
         </p:spPr>
         <p:txBody>
@@ -6427,8 +6895,8 @@
         </p:nvSpPr>
         <p:spPr>
           <a:xfrm>
-            <a:off x="3471863" y="3245556"/>
-            <a:ext cx="2914650" cy="7735712"/>
+            <a:off x="3471863" y="2874937"/>
+            <a:ext cx="2914650" cy="6852350"/>
           </a:xfrm>
         </p:spPr>
         <p:txBody>
@@ -6489,7 +6957,7 @@
           <a:p>
             <a:fld id="{1C4F9540-4BF6-456B-983F-E69BCBCF3DC2}" type="datetimeFigureOut">
               <a:rPr lang="en-GB" smtClean="0"/>
-              <a:t>12/02/2022</a:t>
+              <a:t>13/02/2022</a:t>
             </a:fld>
             <a:endParaRPr lang="en-GB"/>
           </a:p>
@@ -6540,7 +7008,7 @@
     </p:spTree>
     <p:extLst>
       <p:ext uri="{BB962C8B-B14F-4D97-AF65-F5344CB8AC3E}">
-        <p14:creationId xmlns:p14="http://schemas.microsoft.com/office/powerpoint/2010/main" val="3824238585"/>
+        <p14:creationId xmlns:p14="http://schemas.microsoft.com/office/powerpoint/2010/main" val="1854183289"/>
       </p:ext>
     </p:extLst>
   </p:cSld>
@@ -6579,8 +7047,8 @@
         </p:nvSpPr>
         <p:spPr>
           <a:xfrm>
-            <a:off x="472381" y="649114"/>
-            <a:ext cx="5915025" cy="2356556"/>
+            <a:off x="472381" y="574990"/>
+            <a:ext cx="5915025" cy="2087455"/>
           </a:xfrm>
         </p:spPr>
         <p:txBody>
@@ -6607,8 +7075,8 @@
         </p:nvSpPr>
         <p:spPr>
           <a:xfrm>
-            <a:off x="472381" y="2988734"/>
-            <a:ext cx="2901255" cy="1464732"/>
+            <a:off x="472381" y="2647443"/>
+            <a:ext cx="2901255" cy="1297471"/>
           </a:xfrm>
         </p:spPr>
         <p:txBody>
@@ -6672,8 +7140,8 @@
         </p:nvSpPr>
         <p:spPr>
           <a:xfrm>
-            <a:off x="472381" y="4453467"/>
-            <a:ext cx="2901255" cy="6550379"/>
+            <a:off x="472381" y="3944914"/>
+            <a:ext cx="2901255" cy="5802373"/>
           </a:xfrm>
         </p:spPr>
         <p:txBody>
@@ -6729,8 +7197,8 @@
         </p:nvSpPr>
         <p:spPr>
           <a:xfrm>
-            <a:off x="3471863" y="2988734"/>
-            <a:ext cx="2915543" cy="1464732"/>
+            <a:off x="3471863" y="2647443"/>
+            <a:ext cx="2915543" cy="1297471"/>
           </a:xfrm>
         </p:spPr>
         <p:txBody>
@@ -6794,8 +7262,8 @@
         </p:nvSpPr>
         <p:spPr>
           <a:xfrm>
-            <a:off x="3471863" y="4453467"/>
-            <a:ext cx="2915543" cy="6550379"/>
+            <a:off x="3471863" y="3944914"/>
+            <a:ext cx="2915543" cy="5802373"/>
           </a:xfrm>
         </p:spPr>
         <p:txBody>
@@ -6856,7 +7324,7 @@
           <a:p>
             <a:fld id="{1C4F9540-4BF6-456B-983F-E69BCBCF3DC2}" type="datetimeFigureOut">
               <a:rPr lang="en-GB" smtClean="0"/>
-              <a:t>12/02/2022</a:t>
+              <a:t>13/02/2022</a:t>
             </a:fld>
             <a:endParaRPr lang="en-GB"/>
           </a:p>
@@ -6907,7 +7375,7 @@
     </p:spTree>
     <p:extLst>
       <p:ext uri="{BB962C8B-B14F-4D97-AF65-F5344CB8AC3E}">
-        <p14:creationId xmlns:p14="http://schemas.microsoft.com/office/powerpoint/2010/main" val="797865870"/>
+        <p14:creationId xmlns:p14="http://schemas.microsoft.com/office/powerpoint/2010/main" val="2915981718"/>
       </p:ext>
     </p:extLst>
   </p:cSld>
@@ -6974,7 +7442,7 @@
           <a:p>
             <a:fld id="{1C4F9540-4BF6-456B-983F-E69BCBCF3DC2}" type="datetimeFigureOut">
               <a:rPr lang="en-GB" smtClean="0"/>
-              <a:t>12/02/2022</a:t>
+              <a:t>13/02/2022</a:t>
             </a:fld>
             <a:endParaRPr lang="en-GB"/>
           </a:p>
@@ -7025,7 +7493,7 @@
     </p:spTree>
     <p:extLst>
       <p:ext uri="{BB962C8B-B14F-4D97-AF65-F5344CB8AC3E}">
-        <p14:creationId xmlns:p14="http://schemas.microsoft.com/office/powerpoint/2010/main" val="3214678316"/>
+        <p14:creationId xmlns:p14="http://schemas.microsoft.com/office/powerpoint/2010/main" val="531261582"/>
       </p:ext>
     </p:extLst>
   </p:cSld>
@@ -7069,7 +7537,7 @@
           <a:p>
             <a:fld id="{1C4F9540-4BF6-456B-983F-E69BCBCF3DC2}" type="datetimeFigureOut">
               <a:rPr lang="en-GB" smtClean="0"/>
-              <a:t>12/02/2022</a:t>
+              <a:t>13/02/2022</a:t>
             </a:fld>
             <a:endParaRPr lang="en-GB"/>
           </a:p>
@@ -7120,7 +7588,7 @@
     </p:spTree>
     <p:extLst>
       <p:ext uri="{BB962C8B-B14F-4D97-AF65-F5344CB8AC3E}">
-        <p14:creationId xmlns:p14="http://schemas.microsoft.com/office/powerpoint/2010/main" val="2623921804"/>
+        <p14:creationId xmlns:p14="http://schemas.microsoft.com/office/powerpoint/2010/main" val="649801413"/>
       </p:ext>
     </p:extLst>
   </p:cSld>
@@ -7159,8 +7627,8 @@
         </p:nvSpPr>
         <p:spPr>
           <a:xfrm>
-            <a:off x="472381" y="812800"/>
-            <a:ext cx="2211884" cy="2844800"/>
+            <a:off x="472381" y="719984"/>
+            <a:ext cx="2211884" cy="2519945"/>
           </a:xfrm>
         </p:spPr>
         <p:txBody>
@@ -7191,8 +7659,8 @@
         </p:nvSpPr>
         <p:spPr>
           <a:xfrm>
-            <a:off x="2915543" y="1755425"/>
-            <a:ext cx="3471863" cy="8664222"/>
+            <a:off x="2915543" y="1554968"/>
+            <a:ext cx="3471863" cy="7674832"/>
           </a:xfrm>
         </p:spPr>
         <p:txBody>
@@ -7276,8 +7744,8 @@
         </p:nvSpPr>
         <p:spPr>
           <a:xfrm>
-            <a:off x="472381" y="3657600"/>
-            <a:ext cx="2211884" cy="6776156"/>
+            <a:off x="472381" y="3239929"/>
+            <a:ext cx="2211884" cy="6002369"/>
           </a:xfrm>
         </p:spPr>
         <p:txBody>
@@ -7346,7 +7814,7 @@
           <a:p>
             <a:fld id="{1C4F9540-4BF6-456B-983F-E69BCBCF3DC2}" type="datetimeFigureOut">
               <a:rPr lang="en-GB" smtClean="0"/>
-              <a:t>12/02/2022</a:t>
+              <a:t>13/02/2022</a:t>
             </a:fld>
             <a:endParaRPr lang="en-GB"/>
           </a:p>
@@ -7397,7 +7865,7 @@
     </p:spTree>
     <p:extLst>
       <p:ext uri="{BB962C8B-B14F-4D97-AF65-F5344CB8AC3E}">
-        <p14:creationId xmlns:p14="http://schemas.microsoft.com/office/powerpoint/2010/main" val="3191876626"/>
+        <p14:creationId xmlns:p14="http://schemas.microsoft.com/office/powerpoint/2010/main" val="503773779"/>
       </p:ext>
     </p:extLst>
   </p:cSld>
@@ -7436,8 +7904,8 @@
         </p:nvSpPr>
         <p:spPr>
           <a:xfrm>
-            <a:off x="472381" y="812800"/>
-            <a:ext cx="2211884" cy="2844800"/>
+            <a:off x="472381" y="719984"/>
+            <a:ext cx="2211884" cy="2519945"/>
           </a:xfrm>
         </p:spPr>
         <p:txBody>
@@ -7468,8 +7936,8 @@
         </p:nvSpPr>
         <p:spPr>
           <a:xfrm>
-            <a:off x="2915543" y="1755425"/>
-            <a:ext cx="3471863" cy="8664222"/>
+            <a:off x="2915543" y="1554968"/>
+            <a:ext cx="3471863" cy="7674832"/>
           </a:xfrm>
         </p:spPr>
         <p:txBody>
@@ -7533,8 +8001,8 @@
         </p:nvSpPr>
         <p:spPr>
           <a:xfrm>
-            <a:off x="472381" y="3657600"/>
-            <a:ext cx="2211884" cy="6776156"/>
+            <a:off x="472381" y="3239929"/>
+            <a:ext cx="2211884" cy="6002369"/>
           </a:xfrm>
         </p:spPr>
         <p:txBody>
@@ -7603,7 +8071,7 @@
           <a:p>
             <a:fld id="{1C4F9540-4BF6-456B-983F-E69BCBCF3DC2}" type="datetimeFigureOut">
               <a:rPr lang="en-GB" smtClean="0"/>
-              <a:t>12/02/2022</a:t>
+              <a:t>13/02/2022</a:t>
             </a:fld>
             <a:endParaRPr lang="en-GB"/>
           </a:p>
@@ -7654,7 +8122,7 @@
     </p:spTree>
     <p:extLst>
       <p:ext uri="{BB962C8B-B14F-4D97-AF65-F5344CB8AC3E}">
-        <p14:creationId xmlns:p14="http://schemas.microsoft.com/office/powerpoint/2010/main" val="4071138020"/>
+        <p14:creationId xmlns:p14="http://schemas.microsoft.com/office/powerpoint/2010/main" val="339612165"/>
       </p:ext>
     </p:extLst>
   </p:cSld>
@@ -7698,8 +8166,8 @@
         </p:nvSpPr>
         <p:spPr>
           <a:xfrm>
-            <a:off x="471488" y="649114"/>
-            <a:ext cx="5915025" cy="2356556"/>
+            <a:off x="471488" y="574990"/>
+            <a:ext cx="5915025" cy="2087455"/>
           </a:xfrm>
           <a:prstGeom prst="rect">
             <a:avLst/>
@@ -7731,8 +8199,8 @@
         </p:nvSpPr>
         <p:spPr>
           <a:xfrm>
-            <a:off x="471488" y="3245556"/>
-            <a:ext cx="5915025" cy="7735712"/>
+            <a:off x="471488" y="2874937"/>
+            <a:ext cx="5915025" cy="6852350"/>
           </a:xfrm>
           <a:prstGeom prst="rect">
             <a:avLst/>
@@ -7793,8 +8261,8 @@
         </p:nvSpPr>
         <p:spPr>
           <a:xfrm>
-            <a:off x="471488" y="11300181"/>
-            <a:ext cx="1543050" cy="649111"/>
+            <a:off x="471488" y="10009783"/>
+            <a:ext cx="1543050" cy="574987"/>
           </a:xfrm>
           <a:prstGeom prst="rect">
             <a:avLst/>
@@ -7816,7 +8284,7 @@
           <a:p>
             <a:fld id="{1C4F9540-4BF6-456B-983F-E69BCBCF3DC2}" type="datetimeFigureOut">
               <a:rPr lang="en-GB" smtClean="0"/>
-              <a:t>12/02/2022</a:t>
+              <a:t>13/02/2022</a:t>
             </a:fld>
             <a:endParaRPr lang="en-GB"/>
           </a:p>
@@ -7834,8 +8302,8 @@
         </p:nvSpPr>
         <p:spPr>
           <a:xfrm>
-            <a:off x="2271713" y="11300181"/>
-            <a:ext cx="2314575" cy="649111"/>
+            <a:off x="2271713" y="10009783"/>
+            <a:ext cx="2314575" cy="574987"/>
           </a:xfrm>
           <a:prstGeom prst="rect">
             <a:avLst/>
@@ -7871,8 +8339,8 @@
         </p:nvSpPr>
         <p:spPr>
           <a:xfrm>
-            <a:off x="4843463" y="11300181"/>
-            <a:ext cx="1543050" cy="649111"/>
+            <a:off x="4843463" y="10009783"/>
+            <a:ext cx="1543050" cy="574987"/>
           </a:xfrm>
           <a:prstGeom prst="rect">
             <a:avLst/>
@@ -7903,23 +8371,23 @@
     </p:spTree>
     <p:extLst>
       <p:ext uri="{BB962C8B-B14F-4D97-AF65-F5344CB8AC3E}">
-        <p14:creationId xmlns:p14="http://schemas.microsoft.com/office/powerpoint/2010/main" val="2949881242"/>
+        <p14:creationId xmlns:p14="http://schemas.microsoft.com/office/powerpoint/2010/main" val="2139545738"/>
       </p:ext>
     </p:extLst>
   </p:cSld>
   <p:clrMap bg1="lt1" tx1="dk1" bg2="lt2" tx2="dk2" accent1="accent1" accent2="accent2" accent3="accent3" accent4="accent4" accent5="accent5" accent6="accent6" hlink="hlink" folHlink="folHlink"/>
   <p:sldLayoutIdLst>
-    <p:sldLayoutId id="2147483661" r:id="rId1"/>
-    <p:sldLayoutId id="2147483662" r:id="rId2"/>
-    <p:sldLayoutId id="2147483663" r:id="rId3"/>
-    <p:sldLayoutId id="2147483664" r:id="rId4"/>
-    <p:sldLayoutId id="2147483665" r:id="rId5"/>
-    <p:sldLayoutId id="2147483666" r:id="rId6"/>
-    <p:sldLayoutId id="2147483667" r:id="rId7"/>
-    <p:sldLayoutId id="2147483668" r:id="rId8"/>
-    <p:sldLayoutId id="2147483669" r:id="rId9"/>
-    <p:sldLayoutId id="2147483670" r:id="rId10"/>
-    <p:sldLayoutId id="2147483671" r:id="rId11"/>
+    <p:sldLayoutId id="2147483673" r:id="rId1"/>
+    <p:sldLayoutId id="2147483674" r:id="rId2"/>
+    <p:sldLayoutId id="2147483675" r:id="rId3"/>
+    <p:sldLayoutId id="2147483676" r:id="rId4"/>
+    <p:sldLayoutId id="2147483677" r:id="rId5"/>
+    <p:sldLayoutId id="2147483678" r:id="rId6"/>
+    <p:sldLayoutId id="2147483679" r:id="rId7"/>
+    <p:sldLayoutId id="2147483680" r:id="rId8"/>
+    <p:sldLayoutId id="2147483681" r:id="rId9"/>
+    <p:sldLayoutId id="2147483682" r:id="rId10"/>
+    <p:sldLayoutId id="2147483683" r:id="rId11"/>
   </p:sldLayoutIdLst>
   <p:txStyles>
     <p:titleStyle>
@@ -8249,7 +8717,7 @@
         </p:blipFill>
         <p:spPr>
           <a:xfrm>
-            <a:off x="64472" y="466833"/>
+            <a:off x="64473" y="453756"/>
             <a:ext cx="6716805" cy="3086100"/>
           </a:xfrm>
           <a:prstGeom prst="rect">
@@ -8270,13 +8738,13 @@
           <p:nvPr>
             <p:extLst>
               <p:ext uri="{D42A27DB-BD31-4B8C-83A1-F6EECF244321}">
-                <p14:modId xmlns:p14="http://schemas.microsoft.com/office/powerpoint/2010/main" val="2997814424"/>
+                <p14:modId xmlns:p14="http://schemas.microsoft.com/office/powerpoint/2010/main" val="1037166155"/>
               </p:ext>
             </p:extLst>
           </p:nvPr>
         </p:nvGraphicFramePr>
         <p:xfrm>
-          <a:off x="141194" y="4373311"/>
+          <a:off x="141194" y="4150912"/>
           <a:ext cx="6563360" cy="1524005"/>
         </p:xfrm>
         <a:graphic>
@@ -8299,7 +8767,7 @@
         </p:nvSpPr>
         <p:spPr>
           <a:xfrm>
-            <a:off x="238760" y="6644638"/>
+            <a:off x="238760" y="6201899"/>
             <a:ext cx="6380480" cy="720000"/>
           </a:xfrm>
           <a:prstGeom prst="rect">
@@ -8425,7 +8893,7 @@
         </p:blipFill>
         <p:spPr bwMode="auto">
           <a:xfrm>
-            <a:off x="299109" y="6703186"/>
+            <a:off x="299109" y="6260448"/>
             <a:ext cx="1574936" cy="602905"/>
           </a:xfrm>
           <a:prstGeom prst="rect">
@@ -8462,7 +8930,7 @@
         </p:nvSpPr>
         <p:spPr>
           <a:xfrm>
-            <a:off x="4414437" y="6894008"/>
+            <a:off x="4414437" y="6451269"/>
             <a:ext cx="2139774" cy="231422"/>
           </a:xfrm>
           <a:prstGeom prst="rect">
@@ -8514,7 +8982,7 @@
         </p:nvSpPr>
         <p:spPr>
           <a:xfrm>
-            <a:off x="1934394" y="6894008"/>
+            <a:off x="1934394" y="6451269"/>
             <a:ext cx="2415014" cy="231422"/>
           </a:xfrm>
           <a:prstGeom prst="rect">
@@ -8584,7 +9052,7 @@
         </p:blipFill>
         <p:spPr>
           <a:xfrm flipH="1">
-            <a:off x="6342011" y="6916585"/>
+            <a:off x="6342012" y="6473847"/>
             <a:ext cx="183447" cy="183447"/>
           </a:xfrm>
           <a:prstGeom prst="rect">
@@ -8606,7 +9074,7 @@
         </p:nvSpPr>
         <p:spPr>
           <a:xfrm>
-            <a:off x="153446" y="6275306"/>
+            <a:off x="153446" y="5832567"/>
             <a:ext cx="2345514" cy="369332"/>
           </a:xfrm>
           <a:prstGeom prst="rect">
@@ -8641,7 +9109,7 @@
         </p:nvCxnSpPr>
         <p:spPr>
           <a:xfrm>
-            <a:off x="3422874" y="7484532"/>
+            <a:off x="3422874" y="7041794"/>
             <a:ext cx="0" cy="327377"/>
           </a:xfrm>
           <a:prstGeom prst="straightConnector1">
@@ -8683,7 +9151,7 @@
         </p:nvSpPr>
         <p:spPr>
           <a:xfrm>
-            <a:off x="238755" y="8133635"/>
+            <a:off x="238755" y="7690896"/>
             <a:ext cx="6380480" cy="287866"/>
           </a:xfrm>
           <a:prstGeom prst="rect">
@@ -8735,7 +9203,7 @@
         </p:nvSpPr>
         <p:spPr>
           <a:xfrm>
-            <a:off x="141194" y="7769331"/>
+            <a:off x="141194" y="7326592"/>
             <a:ext cx="3186578" cy="369332"/>
           </a:xfrm>
           <a:prstGeom prst="rect">
@@ -8783,7 +9251,7 @@
         </p:blipFill>
         <p:spPr bwMode="auto">
           <a:xfrm>
-            <a:off x="261331" y="8158392"/>
+            <a:off x="261332" y="7715653"/>
             <a:ext cx="246667" cy="238352"/>
           </a:xfrm>
           <a:prstGeom prst="rect">
@@ -8820,7 +9288,7 @@
         </p:nvSpPr>
         <p:spPr>
           <a:xfrm>
-            <a:off x="530574" y="8164371"/>
+            <a:off x="530574" y="7721632"/>
             <a:ext cx="2415014" cy="231422"/>
           </a:xfrm>
           <a:prstGeom prst="rect">
@@ -8873,7 +9341,7 @@
         </p:nvSpPr>
         <p:spPr>
           <a:xfrm>
-            <a:off x="238755" y="8635990"/>
+            <a:off x="238755" y="8193252"/>
             <a:ext cx="4003084" cy="830997"/>
           </a:xfrm>
           <a:prstGeom prst="rect">
@@ -8942,7 +9410,7 @@
         </p:nvSpPr>
         <p:spPr>
           <a:xfrm>
-            <a:off x="153446" y="4003979"/>
+            <a:off x="153446" y="3781579"/>
             <a:ext cx="1784784" cy="369332"/>
           </a:xfrm>
           <a:prstGeom prst="rect">
@@ -8994,7 +9462,7 @@
         </p:blipFill>
         <p:spPr>
           <a:xfrm flipH="1">
-            <a:off x="6350001" y="8151267"/>
+            <a:off x="6350001" y="7708528"/>
             <a:ext cx="246668" cy="246668"/>
           </a:xfrm>
           <a:prstGeom prst="rect">
@@ -9016,7 +9484,7 @@
         </p:nvSpPr>
         <p:spPr>
           <a:xfrm>
-            <a:off x="149610" y="97501"/>
+            <a:off x="149610" y="84424"/>
             <a:ext cx="1972720" cy="369332"/>
           </a:xfrm>
           <a:prstGeom prst="rect">
@@ -9037,6 +9505,727 @@
           </a:p>
         </p:txBody>
       </p:sp>
+      <p:sp>
+        <p:nvSpPr>
+          <p:cNvPr id="21" name="TextBox 20">
+            <a:extLst>
+              <a:ext uri="{FF2B5EF4-FFF2-40B4-BE49-F238E27FC236}">
+                <a16:creationId xmlns:a16="http://schemas.microsoft.com/office/drawing/2014/main" id="{2D6C252B-4BF6-4B5F-BD61-AC6229FF29E8}"/>
+              </a:ext>
+            </a:extLst>
+          </p:cNvPr>
+          <p:cNvSpPr txBox="1"/>
+          <p:nvPr/>
+        </p:nvSpPr>
+        <p:spPr>
+          <a:xfrm>
+            <a:off x="238756" y="10127102"/>
+            <a:ext cx="5394105" cy="461665"/>
+          </a:xfrm>
+          <a:prstGeom prst="rect">
+            <a:avLst/>
+          </a:prstGeom>
+          <a:noFill/>
+        </p:spPr>
+        <p:txBody>
+          <a:bodyPr wrap="none" rtlCol="0">
+            <a:spAutoFit/>
+          </a:bodyPr>
+          <a:lstStyle/>
+          <a:p>
+            <a:pPr marL="171450" indent="-171450">
+              <a:buFontTx/>
+              <a:buChar char="-"/>
+            </a:pPr>
+            <a:r>
+              <a:rPr lang="en-GB" sz="1200" dirty="0"/>
+              <a:t>Hover over button to change colour and make the arrow shift slightly to the right</a:t>
+            </a:r>
+          </a:p>
+          <a:p>
+            <a:pPr marL="171450" indent="-171450">
+              <a:buFontTx/>
+              <a:buChar char="-"/>
+            </a:pPr>
+            <a:r>
+              <a:rPr lang="en-GB" sz="1200" dirty="0"/>
+              <a:t>Nice design feature that makes the page feel more interactive than it is</a:t>
+            </a:r>
+          </a:p>
+        </p:txBody>
+      </p:sp>
+      <p:grpSp>
+        <p:nvGrpSpPr>
+          <p:cNvPr id="30" name="Group 29">
+            <a:extLst>
+              <a:ext uri="{FF2B5EF4-FFF2-40B4-BE49-F238E27FC236}">
+                <a16:creationId xmlns:a16="http://schemas.microsoft.com/office/drawing/2014/main" id="{330A8B7B-7991-45BB-B118-3A64CA76F10F}"/>
+              </a:ext>
+            </a:extLst>
+          </p:cNvPr>
+          <p:cNvGrpSpPr/>
+          <p:nvPr/>
+        </p:nvGrpSpPr>
+        <p:grpSpPr>
+          <a:xfrm>
+            <a:off x="2669764" y="9487577"/>
+            <a:ext cx="1848256" cy="484949"/>
+            <a:chOff x="2501152" y="9930314"/>
+            <a:chExt cx="1848256" cy="484949"/>
+          </a:xfrm>
+        </p:grpSpPr>
+        <p:sp>
+          <p:nvSpPr>
+            <p:cNvPr id="25" name="Rectangle: Diagonal Corners Rounded 24">
+              <a:extLst>
+                <a:ext uri="{FF2B5EF4-FFF2-40B4-BE49-F238E27FC236}">
+                  <a16:creationId xmlns:a16="http://schemas.microsoft.com/office/drawing/2014/main" id="{0C0B25CD-435D-4066-9DF0-4EAF375FC041}"/>
+                </a:ext>
+              </a:extLst>
+            </p:cNvPr>
+            <p:cNvSpPr/>
+            <p:nvPr/>
+          </p:nvSpPr>
+          <p:spPr>
+            <a:xfrm flipH="1">
+              <a:off x="2501152" y="9930314"/>
+              <a:ext cx="1848256" cy="484949"/>
+            </a:xfrm>
+            <a:prstGeom prst="round2DiagRect">
+              <a:avLst/>
+            </a:prstGeom>
+            <a:solidFill>
+              <a:schemeClr val="bg2">
+                <a:lumMod val="25000"/>
+              </a:schemeClr>
+            </a:solidFill>
+            <a:ln>
+              <a:noFill/>
+            </a:ln>
+          </p:spPr>
+          <p:style>
+            <a:lnRef idx="2">
+              <a:schemeClr val="accent1">
+                <a:shade val="50000"/>
+              </a:schemeClr>
+            </a:lnRef>
+            <a:fillRef idx="1">
+              <a:schemeClr val="accent1"/>
+            </a:fillRef>
+            <a:effectRef idx="0">
+              <a:schemeClr val="accent1"/>
+            </a:effectRef>
+            <a:fontRef idx="minor">
+              <a:schemeClr val="lt1"/>
+            </a:fontRef>
+          </p:style>
+          <p:txBody>
+            <a:bodyPr rtlCol="0" anchor="ctr"/>
+            <a:lstStyle/>
+            <a:p>
+              <a:r>
+                <a:rPr lang="en-GB" dirty="0"/>
+                <a:t>   Start here</a:t>
+              </a:r>
+            </a:p>
+          </p:txBody>
+        </p:sp>
+        <p:grpSp>
+          <p:nvGrpSpPr>
+            <p:cNvPr id="28" name="Group 27">
+              <a:extLst>
+                <a:ext uri="{FF2B5EF4-FFF2-40B4-BE49-F238E27FC236}">
+                  <a16:creationId xmlns:a16="http://schemas.microsoft.com/office/drawing/2014/main" id="{F56C1FF6-EB99-4EB5-983D-C463605281DE}"/>
+                </a:ext>
+              </a:extLst>
+            </p:cNvPr>
+            <p:cNvGrpSpPr/>
+            <p:nvPr/>
+          </p:nvGrpSpPr>
+          <p:grpSpPr>
+            <a:xfrm>
+              <a:off x="3963243" y="10052838"/>
+              <a:ext cx="155191" cy="239899"/>
+              <a:chOff x="3617970" y="5911752"/>
+              <a:chExt cx="547691" cy="533402"/>
+            </a:xfrm>
+            <a:solidFill>
+              <a:schemeClr val="bg1"/>
+            </a:solidFill>
+          </p:grpSpPr>
+          <p:sp>
+            <p:nvSpPr>
+              <p:cNvPr id="18" name="Freeform: Shape 17">
+                <a:extLst>
+                  <a:ext uri="{FF2B5EF4-FFF2-40B4-BE49-F238E27FC236}">
+                    <a16:creationId xmlns:a16="http://schemas.microsoft.com/office/drawing/2014/main" id="{76681476-D51C-4B24-8AEE-F92CF321C587}"/>
+                  </a:ext>
+                </a:extLst>
+              </p:cNvPr>
+              <p:cNvSpPr/>
+              <p:nvPr/>
+            </p:nvSpPr>
+            <p:spPr>
+              <a:xfrm>
+                <a:off x="3617970" y="5911754"/>
+                <a:ext cx="319087" cy="533400"/>
+              </a:xfrm>
+              <a:custGeom>
+                <a:avLst/>
+                <a:gdLst>
+                  <a:gd name="connsiteX0" fmla="*/ 119063 w 319087"/>
+                  <a:gd name="connsiteY0" fmla="*/ 0 h 533400"/>
+                  <a:gd name="connsiteX1" fmla="*/ 0 w 319087"/>
+                  <a:gd name="connsiteY1" fmla="*/ 0 h 533400"/>
+                  <a:gd name="connsiteX2" fmla="*/ 200025 w 319087"/>
+                  <a:gd name="connsiteY2" fmla="*/ 266700 h 533400"/>
+                  <a:gd name="connsiteX3" fmla="*/ 0 w 319087"/>
+                  <a:gd name="connsiteY3" fmla="*/ 533400 h 533400"/>
+                  <a:gd name="connsiteX4" fmla="*/ 119063 w 319087"/>
+                  <a:gd name="connsiteY4" fmla="*/ 533400 h 533400"/>
+                  <a:gd name="connsiteX5" fmla="*/ 319088 w 319087"/>
+                  <a:gd name="connsiteY5" fmla="*/ 266700 h 533400"/>
+                  <a:gd name="connsiteX6" fmla="*/ 119063 w 319087"/>
+                  <a:gd name="connsiteY6" fmla="*/ 0 h 533400"/>
+                </a:gdLst>
+                <a:ahLst/>
+                <a:cxnLst>
+                  <a:cxn ang="0">
+                    <a:pos x="connsiteX0" y="connsiteY0"/>
+                  </a:cxn>
+                  <a:cxn ang="0">
+                    <a:pos x="connsiteX1" y="connsiteY1"/>
+                  </a:cxn>
+                  <a:cxn ang="0">
+                    <a:pos x="connsiteX2" y="connsiteY2"/>
+                  </a:cxn>
+                  <a:cxn ang="0">
+                    <a:pos x="connsiteX3" y="connsiteY3"/>
+                  </a:cxn>
+                  <a:cxn ang="0">
+                    <a:pos x="connsiteX4" y="connsiteY4"/>
+                  </a:cxn>
+                  <a:cxn ang="0">
+                    <a:pos x="connsiteX5" y="connsiteY5"/>
+                  </a:cxn>
+                  <a:cxn ang="0">
+                    <a:pos x="connsiteX6" y="connsiteY6"/>
+                  </a:cxn>
+                </a:cxnLst>
+                <a:rect l="l" t="t" r="r" b="b"/>
+                <a:pathLst>
+                  <a:path w="319087" h="533400">
+                    <a:moveTo>
+                      <a:pt x="119063" y="0"/>
+                    </a:moveTo>
+                    <a:lnTo>
+                      <a:pt x="0" y="0"/>
+                    </a:lnTo>
+                    <a:lnTo>
+                      <a:pt x="200025" y="266700"/>
+                    </a:lnTo>
+                    <a:lnTo>
+                      <a:pt x="0" y="533400"/>
+                    </a:lnTo>
+                    <a:lnTo>
+                      <a:pt x="119063" y="533400"/>
+                    </a:lnTo>
+                    <a:lnTo>
+                      <a:pt x="319088" y="266700"/>
+                    </a:lnTo>
+                    <a:lnTo>
+                      <a:pt x="119063" y="0"/>
+                    </a:lnTo>
+                    <a:close/>
+                  </a:path>
+                </a:pathLst>
+              </a:custGeom>
+              <a:grpFill/>
+              <a:ln w="9525" cap="flat">
+                <a:noFill/>
+                <a:prstDash val="solid"/>
+                <a:miter/>
+              </a:ln>
+            </p:spPr>
+            <p:txBody>
+              <a:bodyPr rot="0" spcFirstLastPara="0" vertOverflow="overflow" horzOverflow="overflow" vert="horz" wrap="square" lIns="91440" tIns="45720" rIns="91440" bIns="45720" numCol="1" spcCol="0" rtlCol="0" fromWordArt="0" anchor="ctr" anchorCtr="0" forceAA="0" compatLnSpc="1">
+                <a:prstTxWarp prst="textNoShape">
+                  <a:avLst/>
+                </a:prstTxWarp>
+                <a:noAutofit/>
+              </a:bodyPr>
+              <a:lstStyle/>
+              <a:p>
+                <a:endParaRPr lang="en-GB" sz="1400" dirty="0"/>
+              </a:p>
+            </p:txBody>
+          </p:sp>
+          <p:sp>
+            <p:nvSpPr>
+              <p:cNvPr id="27" name="Freeform: Shape 26">
+                <a:extLst>
+                  <a:ext uri="{FF2B5EF4-FFF2-40B4-BE49-F238E27FC236}">
+                    <a16:creationId xmlns:a16="http://schemas.microsoft.com/office/drawing/2014/main" id="{DF5793BC-6BFE-4464-B7C7-63DE57343657}"/>
+                  </a:ext>
+                </a:extLst>
+              </p:cNvPr>
+              <p:cNvSpPr/>
+              <p:nvPr/>
+            </p:nvSpPr>
+            <p:spPr>
+              <a:xfrm>
+                <a:off x="3846574" y="5911752"/>
+                <a:ext cx="319087" cy="533400"/>
+              </a:xfrm>
+              <a:custGeom>
+                <a:avLst/>
+                <a:gdLst>
+                  <a:gd name="connsiteX0" fmla="*/ 119063 w 319087"/>
+                  <a:gd name="connsiteY0" fmla="*/ 0 h 533400"/>
+                  <a:gd name="connsiteX1" fmla="*/ 0 w 319087"/>
+                  <a:gd name="connsiteY1" fmla="*/ 0 h 533400"/>
+                  <a:gd name="connsiteX2" fmla="*/ 200025 w 319087"/>
+                  <a:gd name="connsiteY2" fmla="*/ 266700 h 533400"/>
+                  <a:gd name="connsiteX3" fmla="*/ 0 w 319087"/>
+                  <a:gd name="connsiteY3" fmla="*/ 533400 h 533400"/>
+                  <a:gd name="connsiteX4" fmla="*/ 119063 w 319087"/>
+                  <a:gd name="connsiteY4" fmla="*/ 533400 h 533400"/>
+                  <a:gd name="connsiteX5" fmla="*/ 319088 w 319087"/>
+                  <a:gd name="connsiteY5" fmla="*/ 266700 h 533400"/>
+                  <a:gd name="connsiteX6" fmla="*/ 119063 w 319087"/>
+                  <a:gd name="connsiteY6" fmla="*/ 0 h 533400"/>
+                </a:gdLst>
+                <a:ahLst/>
+                <a:cxnLst>
+                  <a:cxn ang="0">
+                    <a:pos x="connsiteX0" y="connsiteY0"/>
+                  </a:cxn>
+                  <a:cxn ang="0">
+                    <a:pos x="connsiteX1" y="connsiteY1"/>
+                  </a:cxn>
+                  <a:cxn ang="0">
+                    <a:pos x="connsiteX2" y="connsiteY2"/>
+                  </a:cxn>
+                  <a:cxn ang="0">
+                    <a:pos x="connsiteX3" y="connsiteY3"/>
+                  </a:cxn>
+                  <a:cxn ang="0">
+                    <a:pos x="connsiteX4" y="connsiteY4"/>
+                  </a:cxn>
+                  <a:cxn ang="0">
+                    <a:pos x="connsiteX5" y="connsiteY5"/>
+                  </a:cxn>
+                  <a:cxn ang="0">
+                    <a:pos x="connsiteX6" y="connsiteY6"/>
+                  </a:cxn>
+                </a:cxnLst>
+                <a:rect l="l" t="t" r="r" b="b"/>
+                <a:pathLst>
+                  <a:path w="319087" h="533400">
+                    <a:moveTo>
+                      <a:pt x="119063" y="0"/>
+                    </a:moveTo>
+                    <a:lnTo>
+                      <a:pt x="0" y="0"/>
+                    </a:lnTo>
+                    <a:lnTo>
+                      <a:pt x="200025" y="266700"/>
+                    </a:lnTo>
+                    <a:lnTo>
+                      <a:pt x="0" y="533400"/>
+                    </a:lnTo>
+                    <a:lnTo>
+                      <a:pt x="119063" y="533400"/>
+                    </a:lnTo>
+                    <a:lnTo>
+                      <a:pt x="319088" y="266700"/>
+                    </a:lnTo>
+                    <a:lnTo>
+                      <a:pt x="119063" y="0"/>
+                    </a:lnTo>
+                    <a:close/>
+                  </a:path>
+                </a:pathLst>
+              </a:custGeom>
+              <a:grpFill/>
+              <a:ln w="9525" cap="flat">
+                <a:noFill/>
+                <a:prstDash val="solid"/>
+                <a:miter/>
+              </a:ln>
+            </p:spPr>
+            <p:txBody>
+              <a:bodyPr rot="0" spcFirstLastPara="0" vertOverflow="overflow" horzOverflow="overflow" vert="horz" wrap="square" lIns="91440" tIns="45720" rIns="91440" bIns="45720" numCol="1" spcCol="0" rtlCol="0" fromWordArt="0" anchor="ctr" anchorCtr="0" forceAA="0" compatLnSpc="1">
+                <a:prstTxWarp prst="textNoShape">
+                  <a:avLst/>
+                </a:prstTxWarp>
+                <a:noAutofit/>
+              </a:bodyPr>
+              <a:lstStyle/>
+              <a:p>
+                <a:endParaRPr lang="en-GB" sz="1400"/>
+              </a:p>
+            </p:txBody>
+          </p:sp>
+        </p:grpSp>
+      </p:grpSp>
+      <p:grpSp>
+        <p:nvGrpSpPr>
+          <p:cNvPr id="29" name="Group 28">
+            <a:extLst>
+              <a:ext uri="{FF2B5EF4-FFF2-40B4-BE49-F238E27FC236}">
+                <a16:creationId xmlns:a16="http://schemas.microsoft.com/office/drawing/2014/main" id="{A68C401D-ECE3-449C-B7F9-8802ECACB37D}"/>
+              </a:ext>
+            </a:extLst>
+          </p:cNvPr>
+          <p:cNvGrpSpPr/>
+          <p:nvPr/>
+        </p:nvGrpSpPr>
+        <p:grpSpPr>
+          <a:xfrm>
+            <a:off x="238755" y="9487577"/>
+            <a:ext cx="1848256" cy="484949"/>
+            <a:chOff x="238755" y="9930315"/>
+            <a:chExt cx="1848256" cy="484949"/>
+          </a:xfrm>
+        </p:grpSpPr>
+        <p:sp>
+          <p:nvSpPr>
+            <p:cNvPr id="20" name="Rectangle: Diagonal Corners Rounded 19">
+              <a:extLst>
+                <a:ext uri="{FF2B5EF4-FFF2-40B4-BE49-F238E27FC236}">
+                  <a16:creationId xmlns:a16="http://schemas.microsoft.com/office/drawing/2014/main" id="{1CD94611-A110-4577-A944-E542FC5E1507}"/>
+                </a:ext>
+              </a:extLst>
+            </p:cNvPr>
+            <p:cNvSpPr/>
+            <p:nvPr/>
+          </p:nvSpPr>
+          <p:spPr>
+            <a:xfrm flipH="1">
+              <a:off x="238755" y="9930315"/>
+              <a:ext cx="1848256" cy="484949"/>
+            </a:xfrm>
+            <a:prstGeom prst="round2DiagRect">
+              <a:avLst/>
+            </a:prstGeom>
+            <a:solidFill>
+              <a:srgbClr val="92D050"/>
+            </a:solidFill>
+            <a:ln>
+              <a:noFill/>
+            </a:ln>
+          </p:spPr>
+          <p:style>
+            <a:lnRef idx="2">
+              <a:schemeClr val="accent1">
+                <a:shade val="50000"/>
+              </a:schemeClr>
+            </a:lnRef>
+            <a:fillRef idx="1">
+              <a:schemeClr val="accent1"/>
+            </a:fillRef>
+            <a:effectRef idx="0">
+              <a:schemeClr val="accent1"/>
+            </a:effectRef>
+            <a:fontRef idx="minor">
+              <a:schemeClr val="lt1"/>
+            </a:fontRef>
+          </p:style>
+          <p:txBody>
+            <a:bodyPr rtlCol="0" anchor="ctr"/>
+            <a:lstStyle/>
+            <a:p>
+              <a:r>
+                <a:rPr lang="en-GB" dirty="0"/>
+                <a:t>   Start here</a:t>
+              </a:r>
+            </a:p>
+          </p:txBody>
+        </p:sp>
+        <p:grpSp>
+          <p:nvGrpSpPr>
+            <p:cNvPr id="31" name="Group 30">
+              <a:extLst>
+                <a:ext uri="{FF2B5EF4-FFF2-40B4-BE49-F238E27FC236}">
+                  <a16:creationId xmlns:a16="http://schemas.microsoft.com/office/drawing/2014/main" id="{983DDE42-D62B-433E-B7C5-E19175CD39E3}"/>
+                </a:ext>
+              </a:extLst>
+            </p:cNvPr>
+            <p:cNvGrpSpPr/>
+            <p:nvPr/>
+          </p:nvGrpSpPr>
+          <p:grpSpPr>
+            <a:xfrm>
+              <a:off x="1579670" y="10052839"/>
+              <a:ext cx="155190" cy="239898"/>
+              <a:chOff x="3866750" y="5911756"/>
+              <a:chExt cx="547687" cy="533400"/>
+            </a:xfrm>
+            <a:solidFill>
+              <a:schemeClr val="bg1"/>
+            </a:solidFill>
+          </p:grpSpPr>
+          <p:sp>
+            <p:nvSpPr>
+              <p:cNvPr id="32" name="Freeform: Shape 31">
+                <a:extLst>
+                  <a:ext uri="{FF2B5EF4-FFF2-40B4-BE49-F238E27FC236}">
+                    <a16:creationId xmlns:a16="http://schemas.microsoft.com/office/drawing/2014/main" id="{F38B39B5-E2B9-4560-BEA2-6D29B6E024FE}"/>
+                  </a:ext>
+                </a:extLst>
+              </p:cNvPr>
+              <p:cNvSpPr/>
+              <p:nvPr/>
+            </p:nvSpPr>
+            <p:spPr>
+              <a:xfrm>
+                <a:off x="3866750" y="5911756"/>
+                <a:ext cx="319087" cy="533400"/>
+              </a:xfrm>
+              <a:custGeom>
+                <a:avLst/>
+                <a:gdLst>
+                  <a:gd name="connsiteX0" fmla="*/ 119063 w 319087"/>
+                  <a:gd name="connsiteY0" fmla="*/ 0 h 533400"/>
+                  <a:gd name="connsiteX1" fmla="*/ 0 w 319087"/>
+                  <a:gd name="connsiteY1" fmla="*/ 0 h 533400"/>
+                  <a:gd name="connsiteX2" fmla="*/ 200025 w 319087"/>
+                  <a:gd name="connsiteY2" fmla="*/ 266700 h 533400"/>
+                  <a:gd name="connsiteX3" fmla="*/ 0 w 319087"/>
+                  <a:gd name="connsiteY3" fmla="*/ 533400 h 533400"/>
+                  <a:gd name="connsiteX4" fmla="*/ 119063 w 319087"/>
+                  <a:gd name="connsiteY4" fmla="*/ 533400 h 533400"/>
+                  <a:gd name="connsiteX5" fmla="*/ 319088 w 319087"/>
+                  <a:gd name="connsiteY5" fmla="*/ 266700 h 533400"/>
+                  <a:gd name="connsiteX6" fmla="*/ 119063 w 319087"/>
+                  <a:gd name="connsiteY6" fmla="*/ 0 h 533400"/>
+                </a:gdLst>
+                <a:ahLst/>
+                <a:cxnLst>
+                  <a:cxn ang="0">
+                    <a:pos x="connsiteX0" y="connsiteY0"/>
+                  </a:cxn>
+                  <a:cxn ang="0">
+                    <a:pos x="connsiteX1" y="connsiteY1"/>
+                  </a:cxn>
+                  <a:cxn ang="0">
+                    <a:pos x="connsiteX2" y="connsiteY2"/>
+                  </a:cxn>
+                  <a:cxn ang="0">
+                    <a:pos x="connsiteX3" y="connsiteY3"/>
+                  </a:cxn>
+                  <a:cxn ang="0">
+                    <a:pos x="connsiteX4" y="connsiteY4"/>
+                  </a:cxn>
+                  <a:cxn ang="0">
+                    <a:pos x="connsiteX5" y="connsiteY5"/>
+                  </a:cxn>
+                  <a:cxn ang="0">
+                    <a:pos x="connsiteX6" y="connsiteY6"/>
+                  </a:cxn>
+                </a:cxnLst>
+                <a:rect l="l" t="t" r="r" b="b"/>
+                <a:pathLst>
+                  <a:path w="319087" h="533400">
+                    <a:moveTo>
+                      <a:pt x="119063" y="0"/>
+                    </a:moveTo>
+                    <a:lnTo>
+                      <a:pt x="0" y="0"/>
+                    </a:lnTo>
+                    <a:lnTo>
+                      <a:pt x="200025" y="266700"/>
+                    </a:lnTo>
+                    <a:lnTo>
+                      <a:pt x="0" y="533400"/>
+                    </a:lnTo>
+                    <a:lnTo>
+                      <a:pt x="119063" y="533400"/>
+                    </a:lnTo>
+                    <a:lnTo>
+                      <a:pt x="319088" y="266700"/>
+                    </a:lnTo>
+                    <a:lnTo>
+                      <a:pt x="119063" y="0"/>
+                    </a:lnTo>
+                    <a:close/>
+                  </a:path>
+                </a:pathLst>
+              </a:custGeom>
+              <a:grpFill/>
+              <a:ln w="9525" cap="flat">
+                <a:noFill/>
+                <a:prstDash val="solid"/>
+                <a:miter/>
+              </a:ln>
+            </p:spPr>
+            <p:txBody>
+              <a:bodyPr rot="0" spcFirstLastPara="0" vertOverflow="overflow" horzOverflow="overflow" vert="horz" wrap="square" lIns="91440" tIns="45720" rIns="91440" bIns="45720" numCol="1" spcCol="0" rtlCol="0" fromWordArt="0" anchor="ctr" anchorCtr="0" forceAA="0" compatLnSpc="1">
+                <a:prstTxWarp prst="textNoShape">
+                  <a:avLst/>
+                </a:prstTxWarp>
+                <a:noAutofit/>
+              </a:bodyPr>
+              <a:lstStyle/>
+              <a:p>
+                <a:endParaRPr lang="en-GB" sz="1400"/>
+              </a:p>
+            </p:txBody>
+          </p:sp>
+          <p:sp>
+            <p:nvSpPr>
+              <p:cNvPr id="33" name="Freeform: Shape 32">
+                <a:extLst>
+                  <a:ext uri="{FF2B5EF4-FFF2-40B4-BE49-F238E27FC236}">
+                    <a16:creationId xmlns:a16="http://schemas.microsoft.com/office/drawing/2014/main" id="{7D4AB826-43F1-4178-8447-9ACCE14E5935}"/>
+                  </a:ext>
+                </a:extLst>
+              </p:cNvPr>
+              <p:cNvSpPr/>
+              <p:nvPr/>
+            </p:nvSpPr>
+            <p:spPr>
+              <a:xfrm>
+                <a:off x="4095350" y="5911756"/>
+                <a:ext cx="319087" cy="533400"/>
+              </a:xfrm>
+              <a:custGeom>
+                <a:avLst/>
+                <a:gdLst>
+                  <a:gd name="connsiteX0" fmla="*/ 119063 w 319087"/>
+                  <a:gd name="connsiteY0" fmla="*/ 0 h 533400"/>
+                  <a:gd name="connsiteX1" fmla="*/ 0 w 319087"/>
+                  <a:gd name="connsiteY1" fmla="*/ 0 h 533400"/>
+                  <a:gd name="connsiteX2" fmla="*/ 200025 w 319087"/>
+                  <a:gd name="connsiteY2" fmla="*/ 266700 h 533400"/>
+                  <a:gd name="connsiteX3" fmla="*/ 0 w 319087"/>
+                  <a:gd name="connsiteY3" fmla="*/ 533400 h 533400"/>
+                  <a:gd name="connsiteX4" fmla="*/ 119063 w 319087"/>
+                  <a:gd name="connsiteY4" fmla="*/ 533400 h 533400"/>
+                  <a:gd name="connsiteX5" fmla="*/ 319088 w 319087"/>
+                  <a:gd name="connsiteY5" fmla="*/ 266700 h 533400"/>
+                  <a:gd name="connsiteX6" fmla="*/ 119063 w 319087"/>
+                  <a:gd name="connsiteY6" fmla="*/ 0 h 533400"/>
+                </a:gdLst>
+                <a:ahLst/>
+                <a:cxnLst>
+                  <a:cxn ang="0">
+                    <a:pos x="connsiteX0" y="connsiteY0"/>
+                  </a:cxn>
+                  <a:cxn ang="0">
+                    <a:pos x="connsiteX1" y="connsiteY1"/>
+                  </a:cxn>
+                  <a:cxn ang="0">
+                    <a:pos x="connsiteX2" y="connsiteY2"/>
+                  </a:cxn>
+                  <a:cxn ang="0">
+                    <a:pos x="connsiteX3" y="connsiteY3"/>
+                  </a:cxn>
+                  <a:cxn ang="0">
+                    <a:pos x="connsiteX4" y="connsiteY4"/>
+                  </a:cxn>
+                  <a:cxn ang="0">
+                    <a:pos x="connsiteX5" y="connsiteY5"/>
+                  </a:cxn>
+                  <a:cxn ang="0">
+                    <a:pos x="connsiteX6" y="connsiteY6"/>
+                  </a:cxn>
+                </a:cxnLst>
+                <a:rect l="l" t="t" r="r" b="b"/>
+                <a:pathLst>
+                  <a:path w="319087" h="533400">
+                    <a:moveTo>
+                      <a:pt x="119063" y="0"/>
+                    </a:moveTo>
+                    <a:lnTo>
+                      <a:pt x="0" y="0"/>
+                    </a:lnTo>
+                    <a:lnTo>
+                      <a:pt x="200025" y="266700"/>
+                    </a:lnTo>
+                    <a:lnTo>
+                      <a:pt x="0" y="533400"/>
+                    </a:lnTo>
+                    <a:lnTo>
+                      <a:pt x="119063" y="533400"/>
+                    </a:lnTo>
+                    <a:lnTo>
+                      <a:pt x="319088" y="266700"/>
+                    </a:lnTo>
+                    <a:lnTo>
+                      <a:pt x="119063" y="0"/>
+                    </a:lnTo>
+                    <a:close/>
+                  </a:path>
+                </a:pathLst>
+              </a:custGeom>
+              <a:grpFill/>
+              <a:ln w="9525" cap="flat">
+                <a:noFill/>
+                <a:prstDash val="solid"/>
+                <a:miter/>
+              </a:ln>
+            </p:spPr>
+            <p:txBody>
+              <a:bodyPr rot="0" spcFirstLastPara="0" vertOverflow="overflow" horzOverflow="overflow" vert="horz" wrap="square" lIns="91440" tIns="45720" rIns="91440" bIns="45720" numCol="1" spcCol="0" rtlCol="0" fromWordArt="0" anchor="ctr" anchorCtr="0" forceAA="0" compatLnSpc="1">
+                <a:prstTxWarp prst="textNoShape">
+                  <a:avLst/>
+                </a:prstTxWarp>
+                <a:noAutofit/>
+              </a:bodyPr>
+              <a:lstStyle/>
+              <a:p>
+                <a:endParaRPr lang="en-GB" sz="1400"/>
+              </a:p>
+            </p:txBody>
+          </p:sp>
+        </p:grpSp>
+      </p:grpSp>
+      <p:cxnSp>
+        <p:nvCxnSpPr>
+          <p:cNvPr id="36" name="Straight Arrow Connector 35">
+            <a:extLst>
+              <a:ext uri="{FF2B5EF4-FFF2-40B4-BE49-F238E27FC236}">
+                <a16:creationId xmlns:a16="http://schemas.microsoft.com/office/drawing/2014/main" id="{BE67D74A-2491-4DCD-BBA1-9E5E2C811592}"/>
+              </a:ext>
+            </a:extLst>
+          </p:cNvPr>
+          <p:cNvCxnSpPr>
+            <a:cxnSpLocks/>
+          </p:cNvCxnSpPr>
+          <p:nvPr/>
+        </p:nvCxnSpPr>
+        <p:spPr>
+          <a:xfrm rot="16200000">
+            <a:off x="2403986" y="9566361"/>
+            <a:ext cx="0" cy="327377"/>
+          </a:xfrm>
+          <a:prstGeom prst="straightConnector1">
+            <a:avLst/>
+          </a:prstGeom>
+          <a:ln w="57150">
+            <a:solidFill>
+              <a:schemeClr val="tx1"/>
+            </a:solidFill>
+            <a:tailEnd type="triangle"/>
+          </a:ln>
+        </p:spPr>
+        <p:style>
+          <a:lnRef idx="1">
+            <a:schemeClr val="accent1"/>
+          </a:lnRef>
+          <a:fillRef idx="0">
+            <a:schemeClr val="accent1"/>
+          </a:fillRef>
+          <a:effectRef idx="0">
+            <a:schemeClr val="accent1"/>
+          </a:effectRef>
+          <a:fontRef idx="minor">
+            <a:schemeClr val="tx1"/>
+          </a:fontRef>
+        </p:style>
+      </p:cxnSp>
     </p:spTree>
     <p:extLst>
       <p:ext uri="{BB962C8B-B14F-4D97-AF65-F5344CB8AC3E}">
@@ -9082,14 +10271,14 @@
           <p:nvPr/>
         </p:nvPicPr>
         <p:blipFill>
-          <a:blip r:embed="rId2"/>
+          <a:blip r:embed="rId3"/>
           <a:stretch>
             <a:fillRect/>
           </a:stretch>
         </p:blipFill>
         <p:spPr>
           <a:xfrm>
-            <a:off x="0" y="0"/>
+            <a:off x="0" y="-2063"/>
             <a:ext cx="6858000" cy="799794"/>
           </a:xfrm>
           <a:prstGeom prst="rect">
@@ -9111,21 +10300,1692 @@
         </p:nvSpPr>
         <p:spPr>
           <a:xfrm>
-            <a:off x="0" y="799794"/>
-            <a:ext cx="6858000" cy="2520000"/>
+            <a:off x="0" y="797731"/>
+            <a:ext cx="6858000" cy="3003596"/>
           </a:xfrm>
           <a:prstGeom prst="rect">
             <a:avLst/>
           </a:prstGeom>
           <a:solidFill>
-            <a:schemeClr val="accent1">
-              <a:lumMod val="40000"/>
-              <a:lumOff val="60000"/>
+            <a:schemeClr val="bg2">
+              <a:lumMod val="90000"/>
             </a:schemeClr>
           </a:solidFill>
           <a:ln>
+            <a:noFill/>
+          </a:ln>
+        </p:spPr>
+        <p:style>
+          <a:lnRef idx="2">
+            <a:schemeClr val="accent1">
+              <a:shade val="50000"/>
+            </a:schemeClr>
+          </a:lnRef>
+          <a:fillRef idx="1">
+            <a:schemeClr val="accent1"/>
+          </a:fillRef>
+          <a:effectRef idx="0">
+            <a:schemeClr val="accent1"/>
+          </a:effectRef>
+          <a:fontRef idx="minor">
+            <a:schemeClr val="lt1"/>
+          </a:fontRef>
+        </p:style>
+        <p:txBody>
+          <a:bodyPr rtlCol="0" anchor="ctr"/>
+          <a:lstStyle/>
+          <a:p>
+            <a:pPr algn="ctr"/>
+            <a:endParaRPr lang="en-GB" dirty="0"/>
+          </a:p>
+        </p:txBody>
+      </p:sp>
+      <p:sp>
+        <p:nvSpPr>
+          <p:cNvPr id="11" name="TextBox 10">
+            <a:extLst>
+              <a:ext uri="{FF2B5EF4-FFF2-40B4-BE49-F238E27FC236}">
+                <a16:creationId xmlns:a16="http://schemas.microsoft.com/office/drawing/2014/main" id="{B0DCE2E4-3535-4D74-AEEA-2DBE74C8BB13}"/>
+              </a:ext>
+            </a:extLst>
+          </p:cNvPr>
+          <p:cNvSpPr txBox="1"/>
+          <p:nvPr/>
+        </p:nvSpPr>
+        <p:spPr>
+          <a:xfrm>
+            <a:off x="3070220" y="1087875"/>
+            <a:ext cx="3420488" cy="830997"/>
+          </a:xfrm>
+          <a:prstGeom prst="rect">
+            <a:avLst/>
+          </a:prstGeom>
+          <a:noFill/>
+        </p:spPr>
+        <p:txBody>
+          <a:bodyPr wrap="none" rtlCol="0">
+            <a:spAutoFit/>
+          </a:bodyPr>
+          <a:lstStyle/>
+          <a:p>
+            <a:pPr algn="r"/>
+            <a:r>
+              <a:rPr lang="en-GB" sz="2400" dirty="0" err="1"/>
+              <a:t>AdventHealth</a:t>
+            </a:r>
+            <a:r>
+              <a:rPr lang="en-GB" sz="2400" dirty="0"/>
+              <a:t> Celebration</a:t>
+            </a:r>
+          </a:p>
+          <a:p>
+            <a:pPr algn="r"/>
+            <a:r>
+              <a:rPr lang="en-GB" sz="2400" dirty="0"/>
+              <a:t>Bariatric Surgery</a:t>
+            </a:r>
+          </a:p>
+        </p:txBody>
+      </p:sp>
+      <p:sp>
+        <p:nvSpPr>
+          <p:cNvPr id="2" name="TextBox 1">
+            <a:extLst>
+              <a:ext uri="{FF2B5EF4-FFF2-40B4-BE49-F238E27FC236}">
+                <a16:creationId xmlns:a16="http://schemas.microsoft.com/office/drawing/2014/main" id="{E061937A-987C-45CC-8D67-565C0EA2699B}"/>
+              </a:ext>
+            </a:extLst>
+          </p:cNvPr>
+          <p:cNvSpPr txBox="1"/>
+          <p:nvPr/>
+        </p:nvSpPr>
+        <p:spPr>
+          <a:xfrm>
+            <a:off x="367293" y="2052440"/>
+            <a:ext cx="2566985" cy="338554"/>
+          </a:xfrm>
+          <a:prstGeom prst="rect">
+            <a:avLst/>
+          </a:prstGeom>
+          <a:noFill/>
+        </p:spPr>
+        <p:txBody>
+          <a:bodyPr wrap="none" rtlCol="0">
+            <a:spAutoFit/>
+          </a:bodyPr>
+          <a:lstStyle/>
+          <a:p>
+            <a:r>
+              <a:rPr lang="en-GB" sz="1600" dirty="0"/>
+              <a:t>Based in Celebration, Florida</a:t>
+            </a:r>
+          </a:p>
+        </p:txBody>
+      </p:sp>
+      <p:sp>
+        <p:nvSpPr>
+          <p:cNvPr id="3" name="TextBox 2">
+            <a:extLst>
+              <a:ext uri="{FF2B5EF4-FFF2-40B4-BE49-F238E27FC236}">
+                <a16:creationId xmlns:a16="http://schemas.microsoft.com/office/drawing/2014/main" id="{58609DA5-0C79-46E9-9F2E-4777E8A87A44}"/>
+              </a:ext>
+            </a:extLst>
+          </p:cNvPr>
+          <p:cNvSpPr txBox="1"/>
+          <p:nvPr/>
+        </p:nvSpPr>
+        <p:spPr>
+          <a:xfrm>
+            <a:off x="367293" y="2354825"/>
+            <a:ext cx="3114763" cy="276999"/>
+          </a:xfrm>
+          <a:prstGeom prst="rect">
+            <a:avLst/>
+          </a:prstGeom>
+          <a:noFill/>
+        </p:spPr>
+        <p:txBody>
+          <a:bodyPr wrap="none" rtlCol="0">
+            <a:spAutoFit/>
+          </a:bodyPr>
+          <a:lstStyle/>
+          <a:p>
+            <a:r>
+              <a:rPr lang="en-GB" sz="1200" dirty="0"/>
+              <a:t>Marketing message and basic information here</a:t>
+            </a:r>
+          </a:p>
+        </p:txBody>
+      </p:sp>
+      <p:sp>
+        <p:nvSpPr>
+          <p:cNvPr id="10" name="TextBox 9">
+            <a:extLst>
+              <a:ext uri="{FF2B5EF4-FFF2-40B4-BE49-F238E27FC236}">
+                <a16:creationId xmlns:a16="http://schemas.microsoft.com/office/drawing/2014/main" id="{13C09E0D-2BD3-4A69-8183-D805BD299CC1}"/>
+              </a:ext>
+            </a:extLst>
+          </p:cNvPr>
+          <p:cNvSpPr txBox="1"/>
+          <p:nvPr/>
+        </p:nvSpPr>
+        <p:spPr>
+          <a:xfrm>
+            <a:off x="367293" y="4188851"/>
+            <a:ext cx="4023553" cy="1754326"/>
+          </a:xfrm>
+          <a:prstGeom prst="rect">
+            <a:avLst/>
+          </a:prstGeom>
+          <a:noFill/>
+        </p:spPr>
+        <p:txBody>
+          <a:bodyPr wrap="square" rtlCol="0">
+            <a:spAutoFit/>
+          </a:bodyPr>
+          <a:lstStyle/>
+          <a:p>
+            <a:pPr algn="l"/>
+            <a:r>
+              <a:rPr lang="en-GB" sz="1200" dirty="0">
+                <a:solidFill>
+                  <a:srgbClr val="000000"/>
+                </a:solidFill>
+              </a:rPr>
+              <a:t>A few sentences of quick information. Lorem ipsum </a:t>
+            </a:r>
+            <a:r>
+              <a:rPr lang="en-GB" sz="1200" dirty="0" err="1">
+                <a:solidFill>
+                  <a:srgbClr val="000000"/>
+                </a:solidFill>
+              </a:rPr>
+              <a:t>dolor</a:t>
+            </a:r>
+            <a:r>
+              <a:rPr lang="en-GB" sz="1200" dirty="0">
+                <a:solidFill>
+                  <a:srgbClr val="000000"/>
+                </a:solidFill>
+              </a:rPr>
+              <a:t> sit </a:t>
+            </a:r>
+            <a:r>
+              <a:rPr lang="en-GB" sz="1200" dirty="0" err="1">
+                <a:solidFill>
+                  <a:srgbClr val="000000"/>
+                </a:solidFill>
+              </a:rPr>
+              <a:t>amet</a:t>
+            </a:r>
+            <a:r>
+              <a:rPr lang="en-GB" sz="1200" dirty="0">
+                <a:solidFill>
+                  <a:srgbClr val="000000"/>
+                </a:solidFill>
+              </a:rPr>
+              <a:t>, </a:t>
+            </a:r>
+            <a:r>
+              <a:rPr lang="en-GB" sz="1200" dirty="0" err="1">
+                <a:solidFill>
+                  <a:srgbClr val="000000"/>
+                </a:solidFill>
+              </a:rPr>
+              <a:t>consectetur</a:t>
+            </a:r>
+            <a:r>
+              <a:rPr lang="en-GB" sz="1200" dirty="0">
+                <a:solidFill>
+                  <a:srgbClr val="000000"/>
+                </a:solidFill>
+              </a:rPr>
+              <a:t> </a:t>
+            </a:r>
+            <a:r>
+              <a:rPr lang="en-GB" sz="1200" dirty="0" err="1">
+                <a:solidFill>
+                  <a:srgbClr val="000000"/>
+                </a:solidFill>
+              </a:rPr>
+              <a:t>adipiscing</a:t>
+            </a:r>
+            <a:r>
+              <a:rPr lang="en-GB" sz="1200" dirty="0">
+                <a:solidFill>
+                  <a:srgbClr val="000000"/>
+                </a:solidFill>
+              </a:rPr>
+              <a:t> </a:t>
+            </a:r>
+            <a:r>
+              <a:rPr lang="en-GB" sz="1200" dirty="0" err="1">
+                <a:solidFill>
+                  <a:srgbClr val="000000"/>
+                </a:solidFill>
+              </a:rPr>
+              <a:t>elit</a:t>
+            </a:r>
+            <a:r>
+              <a:rPr lang="en-GB" sz="1200" dirty="0">
+                <a:solidFill>
+                  <a:srgbClr val="000000"/>
+                </a:solidFill>
+              </a:rPr>
+              <a:t>. </a:t>
+            </a:r>
+            <a:r>
+              <a:rPr lang="en-GB" sz="1200" dirty="0" err="1">
+                <a:solidFill>
+                  <a:srgbClr val="000000"/>
+                </a:solidFill>
+              </a:rPr>
+              <a:t>Aliquam</a:t>
+            </a:r>
+            <a:r>
+              <a:rPr lang="en-GB" sz="1200" dirty="0">
+                <a:solidFill>
+                  <a:srgbClr val="000000"/>
+                </a:solidFill>
+              </a:rPr>
+              <a:t> </a:t>
+            </a:r>
+            <a:r>
+              <a:rPr lang="en-GB" sz="1200" dirty="0" err="1">
+                <a:solidFill>
+                  <a:srgbClr val="000000"/>
+                </a:solidFill>
+              </a:rPr>
+              <a:t>lectus</a:t>
+            </a:r>
+            <a:r>
+              <a:rPr lang="en-GB" sz="1200" dirty="0">
+                <a:solidFill>
+                  <a:srgbClr val="000000"/>
+                </a:solidFill>
+              </a:rPr>
+              <a:t> dui, cursus vitae </a:t>
+            </a:r>
+            <a:r>
+              <a:rPr lang="en-GB" sz="1200" dirty="0" err="1">
+                <a:solidFill>
+                  <a:srgbClr val="000000"/>
+                </a:solidFill>
+              </a:rPr>
+              <a:t>elit</a:t>
+            </a:r>
+            <a:r>
+              <a:rPr lang="en-GB" sz="1200" dirty="0">
+                <a:solidFill>
+                  <a:srgbClr val="000000"/>
+                </a:solidFill>
+              </a:rPr>
+              <a:t> </a:t>
+            </a:r>
+            <a:r>
+              <a:rPr lang="en-GB" sz="1200" dirty="0" err="1">
+                <a:solidFill>
+                  <a:srgbClr val="000000"/>
+                </a:solidFill>
+              </a:rPr>
+              <a:t>quis</a:t>
+            </a:r>
+            <a:r>
+              <a:rPr lang="en-GB" sz="1200" dirty="0">
+                <a:solidFill>
+                  <a:srgbClr val="000000"/>
+                </a:solidFill>
+              </a:rPr>
+              <a:t>, </a:t>
+            </a:r>
+            <a:r>
+              <a:rPr lang="en-GB" sz="1200" dirty="0" err="1">
+                <a:solidFill>
+                  <a:srgbClr val="000000"/>
+                </a:solidFill>
+              </a:rPr>
+              <a:t>mattis</a:t>
+            </a:r>
+            <a:r>
+              <a:rPr lang="en-GB" sz="1200" dirty="0">
+                <a:solidFill>
+                  <a:srgbClr val="000000"/>
+                </a:solidFill>
+              </a:rPr>
+              <a:t> </a:t>
+            </a:r>
+            <a:r>
+              <a:rPr lang="en-GB" sz="1200" dirty="0" err="1">
+                <a:solidFill>
+                  <a:srgbClr val="000000"/>
+                </a:solidFill>
+              </a:rPr>
+              <a:t>suscipit</a:t>
+            </a:r>
+            <a:r>
+              <a:rPr lang="en-GB" sz="1200" dirty="0">
+                <a:solidFill>
+                  <a:srgbClr val="000000"/>
+                </a:solidFill>
+              </a:rPr>
+              <a:t> </a:t>
+            </a:r>
+            <a:r>
+              <a:rPr lang="en-GB" sz="1200" dirty="0" err="1">
+                <a:solidFill>
+                  <a:srgbClr val="000000"/>
+                </a:solidFill>
+              </a:rPr>
+              <a:t>massa</a:t>
+            </a:r>
+            <a:r>
+              <a:rPr lang="en-GB" sz="1200" dirty="0">
+                <a:solidFill>
+                  <a:srgbClr val="000000"/>
+                </a:solidFill>
+              </a:rPr>
+              <a:t>. </a:t>
+            </a:r>
+            <a:r>
+              <a:rPr lang="en-GB" sz="1200" dirty="0" err="1">
+                <a:solidFill>
+                  <a:srgbClr val="000000"/>
+                </a:solidFill>
+              </a:rPr>
+              <a:t>Fusce</a:t>
+            </a:r>
+            <a:r>
+              <a:rPr lang="en-GB" sz="1200" dirty="0">
+                <a:solidFill>
+                  <a:srgbClr val="000000"/>
+                </a:solidFill>
+              </a:rPr>
+              <a:t> </a:t>
+            </a:r>
+            <a:r>
+              <a:rPr lang="en-GB" sz="1200" dirty="0" err="1">
+                <a:solidFill>
+                  <a:srgbClr val="000000"/>
+                </a:solidFill>
+              </a:rPr>
+              <a:t>nec</a:t>
+            </a:r>
+            <a:r>
+              <a:rPr lang="en-GB" sz="1200" dirty="0">
+                <a:solidFill>
+                  <a:srgbClr val="000000"/>
+                </a:solidFill>
+              </a:rPr>
+              <a:t> </a:t>
+            </a:r>
+            <a:r>
+              <a:rPr lang="en-GB" sz="1200" dirty="0" err="1">
+                <a:solidFill>
+                  <a:srgbClr val="000000"/>
+                </a:solidFill>
+              </a:rPr>
+              <a:t>diam</a:t>
+            </a:r>
+            <a:r>
+              <a:rPr lang="en-GB" sz="1200" dirty="0">
+                <a:solidFill>
+                  <a:srgbClr val="000000"/>
+                </a:solidFill>
+              </a:rPr>
+              <a:t> </a:t>
+            </a:r>
+            <a:r>
+              <a:rPr lang="en-GB" sz="1200" dirty="0" err="1">
+                <a:solidFill>
+                  <a:srgbClr val="000000"/>
+                </a:solidFill>
+              </a:rPr>
+              <a:t>leo</a:t>
+            </a:r>
+            <a:r>
+              <a:rPr lang="en-GB" sz="1200" dirty="0">
+                <a:solidFill>
+                  <a:srgbClr val="000000"/>
+                </a:solidFill>
+              </a:rPr>
+              <a:t>.</a:t>
+            </a:r>
+          </a:p>
+          <a:p>
+            <a:pPr algn="l"/>
+            <a:endParaRPr lang="en-GB" sz="1200" dirty="0">
+              <a:solidFill>
+                <a:srgbClr val="000000"/>
+              </a:solidFill>
+            </a:endParaRPr>
+          </a:p>
+          <a:p>
+            <a:pPr algn="l"/>
+            <a:endParaRPr lang="en-GB" sz="1200" dirty="0">
+              <a:solidFill>
+                <a:srgbClr val="000000"/>
+              </a:solidFill>
+            </a:endParaRPr>
+          </a:p>
+          <a:p>
+            <a:pPr algn="l"/>
+            <a:r>
+              <a:rPr lang="en-GB" sz="1200" dirty="0">
+                <a:solidFill>
+                  <a:srgbClr val="000000"/>
+                </a:solidFill>
+              </a:rPr>
+              <a:t>A bit about Dr. Dennis Smith and his background. Nunc </a:t>
+            </a:r>
+            <a:r>
+              <a:rPr lang="en-GB" sz="1200" dirty="0" err="1">
+                <a:solidFill>
+                  <a:srgbClr val="000000"/>
+                </a:solidFill>
+              </a:rPr>
+              <a:t>eget</a:t>
+            </a:r>
+            <a:r>
+              <a:rPr lang="en-GB" sz="1200" dirty="0">
+                <a:solidFill>
+                  <a:srgbClr val="000000"/>
+                </a:solidFill>
+              </a:rPr>
+              <a:t> eros </a:t>
+            </a:r>
+            <a:r>
+              <a:rPr lang="en-GB" sz="1200" dirty="0" err="1">
+                <a:solidFill>
+                  <a:srgbClr val="000000"/>
+                </a:solidFill>
+              </a:rPr>
+              <a:t>aliquet</a:t>
+            </a:r>
+            <a:r>
+              <a:rPr lang="en-GB" sz="1200" dirty="0">
+                <a:solidFill>
+                  <a:srgbClr val="000000"/>
+                </a:solidFill>
+              </a:rPr>
+              <a:t>, </a:t>
+            </a:r>
+            <a:r>
+              <a:rPr lang="en-GB" sz="1200" dirty="0" err="1">
+                <a:solidFill>
+                  <a:srgbClr val="000000"/>
+                </a:solidFill>
+              </a:rPr>
+              <a:t>lobortis</a:t>
+            </a:r>
+            <a:r>
+              <a:rPr lang="en-GB" sz="1200" dirty="0">
+                <a:solidFill>
+                  <a:srgbClr val="000000"/>
+                </a:solidFill>
+              </a:rPr>
+              <a:t> ante sit </a:t>
+            </a:r>
+            <a:r>
+              <a:rPr lang="en-GB" sz="1200" dirty="0" err="1">
+                <a:solidFill>
+                  <a:srgbClr val="000000"/>
+                </a:solidFill>
+              </a:rPr>
+              <a:t>amet</a:t>
+            </a:r>
+            <a:r>
+              <a:rPr lang="en-GB" sz="1200" dirty="0">
+                <a:solidFill>
+                  <a:srgbClr val="000000"/>
+                </a:solidFill>
+              </a:rPr>
+              <a:t>, </a:t>
+            </a:r>
+            <a:r>
+              <a:rPr lang="en-GB" sz="1200" dirty="0" err="1">
+                <a:solidFill>
+                  <a:srgbClr val="000000"/>
+                </a:solidFill>
+              </a:rPr>
+              <a:t>porttitor</a:t>
+            </a:r>
+            <a:r>
+              <a:rPr lang="en-GB" sz="1200" dirty="0">
+                <a:solidFill>
+                  <a:srgbClr val="000000"/>
+                </a:solidFill>
+              </a:rPr>
+              <a:t> </a:t>
+            </a:r>
+            <a:r>
+              <a:rPr lang="en-GB" sz="1200" dirty="0" err="1">
+                <a:solidFill>
+                  <a:srgbClr val="000000"/>
+                </a:solidFill>
+              </a:rPr>
+              <a:t>turpis</a:t>
+            </a:r>
+            <a:r>
+              <a:rPr lang="en-GB" sz="1200" dirty="0">
+                <a:solidFill>
+                  <a:srgbClr val="000000"/>
+                </a:solidFill>
+              </a:rPr>
+              <a:t>. Proin </a:t>
+            </a:r>
+            <a:r>
+              <a:rPr lang="en-GB" sz="1200" dirty="0" err="1">
+                <a:solidFill>
+                  <a:srgbClr val="000000"/>
+                </a:solidFill>
+              </a:rPr>
+              <a:t>sodales</a:t>
+            </a:r>
+            <a:r>
+              <a:rPr lang="en-GB" sz="1200" dirty="0">
+                <a:solidFill>
+                  <a:srgbClr val="000000"/>
+                </a:solidFill>
+              </a:rPr>
+              <a:t> </a:t>
+            </a:r>
+            <a:r>
+              <a:rPr lang="en-GB" sz="1200" dirty="0" err="1">
+                <a:solidFill>
+                  <a:srgbClr val="000000"/>
+                </a:solidFill>
+              </a:rPr>
+              <a:t>fringilla</a:t>
+            </a:r>
+            <a:r>
+              <a:rPr lang="en-GB" sz="1200" dirty="0">
+                <a:solidFill>
+                  <a:srgbClr val="000000"/>
+                </a:solidFill>
+              </a:rPr>
+              <a:t> </a:t>
+            </a:r>
+            <a:r>
+              <a:rPr lang="en-GB" sz="1200" dirty="0" err="1">
+                <a:solidFill>
+                  <a:srgbClr val="000000"/>
+                </a:solidFill>
+              </a:rPr>
+              <a:t>condimentum</a:t>
+            </a:r>
+            <a:r>
+              <a:rPr lang="en-GB" sz="1200" dirty="0">
+                <a:solidFill>
+                  <a:srgbClr val="000000"/>
+                </a:solidFill>
+              </a:rPr>
+              <a:t>. </a:t>
+            </a:r>
+            <a:r>
+              <a:rPr lang="en-GB" sz="1200" dirty="0" err="1">
+                <a:solidFill>
+                  <a:srgbClr val="000000"/>
+                </a:solidFill>
+              </a:rPr>
+              <a:t>Phasellus</a:t>
+            </a:r>
+            <a:r>
+              <a:rPr lang="en-GB" sz="1200" dirty="0">
+                <a:solidFill>
+                  <a:srgbClr val="000000"/>
+                </a:solidFill>
+              </a:rPr>
+              <a:t> </a:t>
+            </a:r>
+            <a:r>
+              <a:rPr lang="en-GB" sz="1200" dirty="0" err="1">
+                <a:solidFill>
+                  <a:srgbClr val="000000"/>
+                </a:solidFill>
+              </a:rPr>
+              <a:t>tristique</a:t>
+            </a:r>
+            <a:r>
+              <a:rPr lang="en-GB" sz="1200" dirty="0">
+                <a:solidFill>
+                  <a:srgbClr val="000000"/>
+                </a:solidFill>
+              </a:rPr>
+              <a:t> </a:t>
+            </a:r>
+            <a:r>
+              <a:rPr lang="en-GB" sz="1200" dirty="0" err="1">
+                <a:solidFill>
+                  <a:srgbClr val="000000"/>
+                </a:solidFill>
+              </a:rPr>
+              <a:t>sem</a:t>
+            </a:r>
+            <a:r>
+              <a:rPr lang="en-GB" sz="1200" dirty="0">
+                <a:solidFill>
+                  <a:srgbClr val="000000"/>
+                </a:solidFill>
+              </a:rPr>
+              <a:t> et </a:t>
+            </a:r>
+            <a:r>
+              <a:rPr lang="en-GB" sz="1200" dirty="0" err="1">
+                <a:solidFill>
+                  <a:srgbClr val="000000"/>
+                </a:solidFill>
+              </a:rPr>
+              <a:t>orci</a:t>
+            </a:r>
+            <a:r>
+              <a:rPr lang="en-GB" sz="1200" dirty="0">
+                <a:solidFill>
+                  <a:srgbClr val="000000"/>
+                </a:solidFill>
+              </a:rPr>
+              <a:t> </a:t>
+            </a:r>
+            <a:r>
+              <a:rPr lang="en-GB" sz="1200" dirty="0" err="1">
+                <a:solidFill>
+                  <a:srgbClr val="000000"/>
+                </a:solidFill>
+              </a:rPr>
+              <a:t>feugiat</a:t>
+            </a:r>
+            <a:r>
+              <a:rPr lang="en-GB" sz="1200" dirty="0">
+                <a:solidFill>
+                  <a:srgbClr val="000000"/>
+                </a:solidFill>
+              </a:rPr>
+              <a:t>, ac </a:t>
+            </a:r>
+            <a:r>
+              <a:rPr lang="en-GB" sz="1200" dirty="0" err="1">
+                <a:solidFill>
+                  <a:srgbClr val="000000"/>
+                </a:solidFill>
+              </a:rPr>
+              <a:t>euismod</a:t>
+            </a:r>
+            <a:r>
+              <a:rPr lang="en-GB" sz="1200" dirty="0">
+                <a:solidFill>
+                  <a:srgbClr val="000000"/>
+                </a:solidFill>
+              </a:rPr>
+              <a:t> </a:t>
+            </a:r>
+            <a:r>
+              <a:rPr lang="en-GB" sz="1200" dirty="0" err="1">
+                <a:solidFill>
+                  <a:srgbClr val="000000"/>
+                </a:solidFill>
+              </a:rPr>
+              <a:t>purus</a:t>
+            </a:r>
+            <a:r>
+              <a:rPr lang="en-GB" sz="1200" dirty="0">
+                <a:solidFill>
+                  <a:srgbClr val="000000"/>
+                </a:solidFill>
+              </a:rPr>
+              <a:t> </a:t>
+            </a:r>
+            <a:r>
+              <a:rPr lang="en-GB" sz="1200" dirty="0" err="1">
+                <a:solidFill>
+                  <a:srgbClr val="000000"/>
+                </a:solidFill>
+              </a:rPr>
+              <a:t>faucibus</a:t>
+            </a:r>
+            <a:r>
+              <a:rPr lang="en-GB" sz="1200" dirty="0">
+                <a:solidFill>
+                  <a:srgbClr val="000000"/>
+                </a:solidFill>
+              </a:rPr>
+              <a:t>. </a:t>
+            </a:r>
+          </a:p>
+        </p:txBody>
+      </p:sp>
+      <p:grpSp>
+        <p:nvGrpSpPr>
+          <p:cNvPr id="17" name="Group 16">
+            <a:extLst>
+              <a:ext uri="{FF2B5EF4-FFF2-40B4-BE49-F238E27FC236}">
+                <a16:creationId xmlns:a16="http://schemas.microsoft.com/office/drawing/2014/main" id="{A6FD8F5D-D5AE-4E1E-BED7-8786574F51CA}"/>
+              </a:ext>
+            </a:extLst>
+          </p:cNvPr>
+          <p:cNvGrpSpPr/>
+          <p:nvPr/>
+        </p:nvGrpSpPr>
+        <p:grpSpPr>
+          <a:xfrm>
+            <a:off x="472218" y="2821978"/>
+            <a:ext cx="1848256" cy="484949"/>
+            <a:chOff x="238755" y="9930315"/>
+            <a:chExt cx="1848256" cy="484949"/>
+          </a:xfrm>
+        </p:grpSpPr>
+        <p:sp>
+          <p:nvSpPr>
+            <p:cNvPr id="18" name="Rectangle: Diagonal Corners Rounded 17">
+              <a:extLst>
+                <a:ext uri="{FF2B5EF4-FFF2-40B4-BE49-F238E27FC236}">
+                  <a16:creationId xmlns:a16="http://schemas.microsoft.com/office/drawing/2014/main" id="{0C5D2E01-99E8-4D6E-9C20-F7597CB4A879}"/>
+                </a:ext>
+              </a:extLst>
+            </p:cNvPr>
+            <p:cNvSpPr/>
+            <p:nvPr/>
+          </p:nvSpPr>
+          <p:spPr>
+            <a:xfrm flipH="1">
+              <a:off x="238755" y="9930315"/>
+              <a:ext cx="1848256" cy="484949"/>
+            </a:xfrm>
+            <a:prstGeom prst="round2DiagRect">
+              <a:avLst/>
+            </a:prstGeom>
             <a:solidFill>
+              <a:srgbClr val="92D050"/>
+            </a:solidFill>
+            <a:ln>
+              <a:noFill/>
+            </a:ln>
+          </p:spPr>
+          <p:style>
+            <a:lnRef idx="2">
+              <a:schemeClr val="accent1">
+                <a:shade val="50000"/>
+              </a:schemeClr>
+            </a:lnRef>
+            <a:fillRef idx="1">
               <a:schemeClr val="accent1"/>
+            </a:fillRef>
+            <a:effectRef idx="0">
+              <a:schemeClr val="accent1"/>
+            </a:effectRef>
+            <a:fontRef idx="minor">
+              <a:schemeClr val="lt1"/>
+            </a:fontRef>
+          </p:style>
+          <p:txBody>
+            <a:bodyPr rtlCol="0" anchor="ctr"/>
+            <a:lstStyle/>
+            <a:p>
+              <a:r>
+                <a:rPr lang="en-GB" dirty="0"/>
+                <a:t>   Start here</a:t>
+              </a:r>
+            </a:p>
+          </p:txBody>
+        </p:sp>
+        <p:grpSp>
+          <p:nvGrpSpPr>
+            <p:cNvPr id="19" name="Group 18">
+              <a:extLst>
+                <a:ext uri="{FF2B5EF4-FFF2-40B4-BE49-F238E27FC236}">
+                  <a16:creationId xmlns:a16="http://schemas.microsoft.com/office/drawing/2014/main" id="{A4D4E1C9-E0CB-4126-9C7B-7DEFE1C8DA56}"/>
+                </a:ext>
+              </a:extLst>
+            </p:cNvPr>
+            <p:cNvGrpSpPr/>
+            <p:nvPr/>
+          </p:nvGrpSpPr>
+          <p:grpSpPr>
+            <a:xfrm>
+              <a:off x="1579670" y="10052839"/>
+              <a:ext cx="155190" cy="239898"/>
+              <a:chOff x="3866750" y="5911756"/>
+              <a:chExt cx="547687" cy="533400"/>
+            </a:xfrm>
+            <a:solidFill>
+              <a:schemeClr val="bg1"/>
+            </a:solidFill>
+          </p:grpSpPr>
+          <p:sp>
+            <p:nvSpPr>
+              <p:cNvPr id="20" name="Freeform: Shape 19">
+                <a:extLst>
+                  <a:ext uri="{FF2B5EF4-FFF2-40B4-BE49-F238E27FC236}">
+                    <a16:creationId xmlns:a16="http://schemas.microsoft.com/office/drawing/2014/main" id="{89E25ABF-8EA8-4B5F-8805-5CD52528161F}"/>
+                  </a:ext>
+                </a:extLst>
+              </p:cNvPr>
+              <p:cNvSpPr/>
+              <p:nvPr/>
+            </p:nvSpPr>
+            <p:spPr>
+              <a:xfrm>
+                <a:off x="3866750" y="5911756"/>
+                <a:ext cx="319087" cy="533400"/>
+              </a:xfrm>
+              <a:custGeom>
+                <a:avLst/>
+                <a:gdLst>
+                  <a:gd name="connsiteX0" fmla="*/ 119063 w 319087"/>
+                  <a:gd name="connsiteY0" fmla="*/ 0 h 533400"/>
+                  <a:gd name="connsiteX1" fmla="*/ 0 w 319087"/>
+                  <a:gd name="connsiteY1" fmla="*/ 0 h 533400"/>
+                  <a:gd name="connsiteX2" fmla="*/ 200025 w 319087"/>
+                  <a:gd name="connsiteY2" fmla="*/ 266700 h 533400"/>
+                  <a:gd name="connsiteX3" fmla="*/ 0 w 319087"/>
+                  <a:gd name="connsiteY3" fmla="*/ 533400 h 533400"/>
+                  <a:gd name="connsiteX4" fmla="*/ 119063 w 319087"/>
+                  <a:gd name="connsiteY4" fmla="*/ 533400 h 533400"/>
+                  <a:gd name="connsiteX5" fmla="*/ 319088 w 319087"/>
+                  <a:gd name="connsiteY5" fmla="*/ 266700 h 533400"/>
+                  <a:gd name="connsiteX6" fmla="*/ 119063 w 319087"/>
+                  <a:gd name="connsiteY6" fmla="*/ 0 h 533400"/>
+                </a:gdLst>
+                <a:ahLst/>
+                <a:cxnLst>
+                  <a:cxn ang="0">
+                    <a:pos x="connsiteX0" y="connsiteY0"/>
+                  </a:cxn>
+                  <a:cxn ang="0">
+                    <a:pos x="connsiteX1" y="connsiteY1"/>
+                  </a:cxn>
+                  <a:cxn ang="0">
+                    <a:pos x="connsiteX2" y="connsiteY2"/>
+                  </a:cxn>
+                  <a:cxn ang="0">
+                    <a:pos x="connsiteX3" y="connsiteY3"/>
+                  </a:cxn>
+                  <a:cxn ang="0">
+                    <a:pos x="connsiteX4" y="connsiteY4"/>
+                  </a:cxn>
+                  <a:cxn ang="0">
+                    <a:pos x="connsiteX5" y="connsiteY5"/>
+                  </a:cxn>
+                  <a:cxn ang="0">
+                    <a:pos x="connsiteX6" y="connsiteY6"/>
+                  </a:cxn>
+                </a:cxnLst>
+                <a:rect l="l" t="t" r="r" b="b"/>
+                <a:pathLst>
+                  <a:path w="319087" h="533400">
+                    <a:moveTo>
+                      <a:pt x="119063" y="0"/>
+                    </a:moveTo>
+                    <a:lnTo>
+                      <a:pt x="0" y="0"/>
+                    </a:lnTo>
+                    <a:lnTo>
+                      <a:pt x="200025" y="266700"/>
+                    </a:lnTo>
+                    <a:lnTo>
+                      <a:pt x="0" y="533400"/>
+                    </a:lnTo>
+                    <a:lnTo>
+                      <a:pt x="119063" y="533400"/>
+                    </a:lnTo>
+                    <a:lnTo>
+                      <a:pt x="319088" y="266700"/>
+                    </a:lnTo>
+                    <a:lnTo>
+                      <a:pt x="119063" y="0"/>
+                    </a:lnTo>
+                    <a:close/>
+                  </a:path>
+                </a:pathLst>
+              </a:custGeom>
+              <a:grpFill/>
+              <a:ln w="9525" cap="flat">
+                <a:noFill/>
+                <a:prstDash val="solid"/>
+                <a:miter/>
+              </a:ln>
+            </p:spPr>
+            <p:txBody>
+              <a:bodyPr rot="0" spcFirstLastPara="0" vertOverflow="overflow" horzOverflow="overflow" vert="horz" wrap="square" lIns="91440" tIns="45720" rIns="91440" bIns="45720" numCol="1" spcCol="0" rtlCol="0" fromWordArt="0" anchor="ctr" anchorCtr="0" forceAA="0" compatLnSpc="1">
+                <a:prstTxWarp prst="textNoShape">
+                  <a:avLst/>
+                </a:prstTxWarp>
+                <a:noAutofit/>
+              </a:bodyPr>
+              <a:lstStyle/>
+              <a:p>
+                <a:endParaRPr lang="en-GB" sz="1400"/>
+              </a:p>
+            </p:txBody>
+          </p:sp>
+          <p:sp>
+            <p:nvSpPr>
+              <p:cNvPr id="21" name="Freeform: Shape 20">
+                <a:extLst>
+                  <a:ext uri="{FF2B5EF4-FFF2-40B4-BE49-F238E27FC236}">
+                    <a16:creationId xmlns:a16="http://schemas.microsoft.com/office/drawing/2014/main" id="{BCB489A4-2381-4667-B3BB-BBD9247C2884}"/>
+                  </a:ext>
+                </a:extLst>
+              </p:cNvPr>
+              <p:cNvSpPr/>
+              <p:nvPr/>
+            </p:nvSpPr>
+            <p:spPr>
+              <a:xfrm>
+                <a:off x="4095350" y="5911756"/>
+                <a:ext cx="319087" cy="533400"/>
+              </a:xfrm>
+              <a:custGeom>
+                <a:avLst/>
+                <a:gdLst>
+                  <a:gd name="connsiteX0" fmla="*/ 119063 w 319087"/>
+                  <a:gd name="connsiteY0" fmla="*/ 0 h 533400"/>
+                  <a:gd name="connsiteX1" fmla="*/ 0 w 319087"/>
+                  <a:gd name="connsiteY1" fmla="*/ 0 h 533400"/>
+                  <a:gd name="connsiteX2" fmla="*/ 200025 w 319087"/>
+                  <a:gd name="connsiteY2" fmla="*/ 266700 h 533400"/>
+                  <a:gd name="connsiteX3" fmla="*/ 0 w 319087"/>
+                  <a:gd name="connsiteY3" fmla="*/ 533400 h 533400"/>
+                  <a:gd name="connsiteX4" fmla="*/ 119063 w 319087"/>
+                  <a:gd name="connsiteY4" fmla="*/ 533400 h 533400"/>
+                  <a:gd name="connsiteX5" fmla="*/ 319088 w 319087"/>
+                  <a:gd name="connsiteY5" fmla="*/ 266700 h 533400"/>
+                  <a:gd name="connsiteX6" fmla="*/ 119063 w 319087"/>
+                  <a:gd name="connsiteY6" fmla="*/ 0 h 533400"/>
+                </a:gdLst>
+                <a:ahLst/>
+                <a:cxnLst>
+                  <a:cxn ang="0">
+                    <a:pos x="connsiteX0" y="connsiteY0"/>
+                  </a:cxn>
+                  <a:cxn ang="0">
+                    <a:pos x="connsiteX1" y="connsiteY1"/>
+                  </a:cxn>
+                  <a:cxn ang="0">
+                    <a:pos x="connsiteX2" y="connsiteY2"/>
+                  </a:cxn>
+                  <a:cxn ang="0">
+                    <a:pos x="connsiteX3" y="connsiteY3"/>
+                  </a:cxn>
+                  <a:cxn ang="0">
+                    <a:pos x="connsiteX4" y="connsiteY4"/>
+                  </a:cxn>
+                  <a:cxn ang="0">
+                    <a:pos x="connsiteX5" y="connsiteY5"/>
+                  </a:cxn>
+                  <a:cxn ang="0">
+                    <a:pos x="connsiteX6" y="connsiteY6"/>
+                  </a:cxn>
+                </a:cxnLst>
+                <a:rect l="l" t="t" r="r" b="b"/>
+                <a:pathLst>
+                  <a:path w="319087" h="533400">
+                    <a:moveTo>
+                      <a:pt x="119063" y="0"/>
+                    </a:moveTo>
+                    <a:lnTo>
+                      <a:pt x="0" y="0"/>
+                    </a:lnTo>
+                    <a:lnTo>
+                      <a:pt x="200025" y="266700"/>
+                    </a:lnTo>
+                    <a:lnTo>
+                      <a:pt x="0" y="533400"/>
+                    </a:lnTo>
+                    <a:lnTo>
+                      <a:pt x="119063" y="533400"/>
+                    </a:lnTo>
+                    <a:lnTo>
+                      <a:pt x="319088" y="266700"/>
+                    </a:lnTo>
+                    <a:lnTo>
+                      <a:pt x="119063" y="0"/>
+                    </a:lnTo>
+                    <a:close/>
+                  </a:path>
+                </a:pathLst>
+              </a:custGeom>
+              <a:grpFill/>
+              <a:ln w="9525" cap="flat">
+                <a:noFill/>
+                <a:prstDash val="solid"/>
+                <a:miter/>
+              </a:ln>
+            </p:spPr>
+            <p:txBody>
+              <a:bodyPr rot="0" spcFirstLastPara="0" vertOverflow="overflow" horzOverflow="overflow" vert="horz" wrap="square" lIns="91440" tIns="45720" rIns="91440" bIns="45720" numCol="1" spcCol="0" rtlCol="0" fromWordArt="0" anchor="ctr" anchorCtr="0" forceAA="0" compatLnSpc="1">
+                <a:prstTxWarp prst="textNoShape">
+                  <a:avLst/>
+                </a:prstTxWarp>
+                <a:noAutofit/>
+              </a:bodyPr>
+              <a:lstStyle/>
+              <a:p>
+                <a:endParaRPr lang="en-GB" sz="1400"/>
+              </a:p>
+            </p:txBody>
+          </p:sp>
+        </p:grpSp>
+      </p:grpSp>
+      <p:grpSp>
+        <p:nvGrpSpPr>
+          <p:cNvPr id="26" name="Group 25">
+            <a:extLst>
+              <a:ext uri="{FF2B5EF4-FFF2-40B4-BE49-F238E27FC236}">
+                <a16:creationId xmlns:a16="http://schemas.microsoft.com/office/drawing/2014/main" id="{BF278D84-F6D2-4258-8682-3F6EE3A84076}"/>
+              </a:ext>
+            </a:extLst>
+          </p:cNvPr>
+          <p:cNvGrpSpPr/>
+          <p:nvPr/>
+        </p:nvGrpSpPr>
+        <p:grpSpPr>
+          <a:xfrm>
+            <a:off x="0" y="6370836"/>
+            <a:ext cx="6858000" cy="830997"/>
+            <a:chOff x="0" y="5385427"/>
+            <a:chExt cx="6858000" cy="830997"/>
+          </a:xfrm>
+        </p:grpSpPr>
+        <p:grpSp>
+          <p:nvGrpSpPr>
+            <p:cNvPr id="23" name="Group 22">
+              <a:extLst>
+                <a:ext uri="{FF2B5EF4-FFF2-40B4-BE49-F238E27FC236}">
+                  <a16:creationId xmlns:a16="http://schemas.microsoft.com/office/drawing/2014/main" id="{0625391A-3B6E-409D-BE9E-005A54CF1E94}"/>
+                </a:ext>
+              </a:extLst>
+            </p:cNvPr>
+            <p:cNvGrpSpPr/>
+            <p:nvPr/>
+          </p:nvGrpSpPr>
+          <p:grpSpPr>
+            <a:xfrm>
+              <a:off x="2009032" y="5385427"/>
+              <a:ext cx="2839936" cy="830997"/>
+              <a:chOff x="1981293" y="5376791"/>
+              <a:chExt cx="2839936" cy="830997"/>
+            </a:xfrm>
+          </p:grpSpPr>
+          <p:sp>
+            <p:nvSpPr>
+              <p:cNvPr id="22" name="TextBox 21">
+                <a:extLst>
+                  <a:ext uri="{FF2B5EF4-FFF2-40B4-BE49-F238E27FC236}">
+                    <a16:creationId xmlns:a16="http://schemas.microsoft.com/office/drawing/2014/main" id="{E13557C1-BCAC-4652-90E5-3D10889A26F2}"/>
+                  </a:ext>
+                </a:extLst>
+              </p:cNvPr>
+              <p:cNvSpPr txBox="1"/>
+              <p:nvPr/>
+            </p:nvSpPr>
+            <p:spPr>
+              <a:xfrm>
+                <a:off x="2142880" y="5376791"/>
+                <a:ext cx="2678349" cy="830997"/>
+              </a:xfrm>
+              <a:prstGeom prst="rect">
+                <a:avLst/>
+              </a:prstGeom>
+              <a:noFill/>
+            </p:spPr>
+            <p:txBody>
+              <a:bodyPr wrap="square">
+                <a:spAutoFit/>
+              </a:bodyPr>
+              <a:lstStyle/>
+              <a:p>
+                <a:r>
+                  <a:rPr lang="en-GB" sz="1200" i="1" dirty="0">
+                    <a:solidFill>
+                      <a:srgbClr val="000000"/>
+                    </a:solidFill>
+                  </a:rPr>
+                  <a:t>Lorem ipsum </a:t>
+                </a:r>
+                <a:r>
+                  <a:rPr lang="en-GB" sz="1200" i="1" dirty="0" err="1">
+                    <a:solidFill>
+                      <a:srgbClr val="000000"/>
+                    </a:solidFill>
+                  </a:rPr>
+                  <a:t>dolor</a:t>
+                </a:r>
+                <a:r>
+                  <a:rPr lang="en-GB" sz="1200" i="1" dirty="0">
+                    <a:solidFill>
+                      <a:srgbClr val="000000"/>
+                    </a:solidFill>
+                  </a:rPr>
+                  <a:t> sit </a:t>
+                </a:r>
+                <a:r>
+                  <a:rPr lang="en-GB" sz="1200" i="1" dirty="0" err="1">
+                    <a:solidFill>
+                      <a:srgbClr val="000000"/>
+                    </a:solidFill>
+                  </a:rPr>
+                  <a:t>amet</a:t>
+                </a:r>
+                <a:r>
+                  <a:rPr lang="en-GB" sz="1200" i="1" dirty="0">
+                    <a:solidFill>
+                      <a:srgbClr val="000000"/>
+                    </a:solidFill>
+                  </a:rPr>
+                  <a:t>, </a:t>
+                </a:r>
+                <a:r>
+                  <a:rPr lang="en-GB" sz="1200" i="1" dirty="0" err="1">
+                    <a:solidFill>
+                      <a:srgbClr val="000000"/>
+                    </a:solidFill>
+                  </a:rPr>
+                  <a:t>consectetur</a:t>
+                </a:r>
+                <a:r>
+                  <a:rPr lang="en-GB" sz="1200" i="1" dirty="0">
+                    <a:solidFill>
+                      <a:srgbClr val="000000"/>
+                    </a:solidFill>
+                  </a:rPr>
+                  <a:t> </a:t>
+                </a:r>
+                <a:r>
+                  <a:rPr lang="en-GB" sz="1200" i="1" dirty="0" err="1">
+                    <a:solidFill>
+                      <a:srgbClr val="000000"/>
+                    </a:solidFill>
+                  </a:rPr>
+                  <a:t>adipiscing</a:t>
+                </a:r>
+                <a:r>
+                  <a:rPr lang="en-GB" sz="1200" i="1" dirty="0">
+                    <a:solidFill>
+                      <a:srgbClr val="000000"/>
+                    </a:solidFill>
+                  </a:rPr>
+                  <a:t> </a:t>
+                </a:r>
+                <a:r>
+                  <a:rPr lang="en-GB" sz="1200" i="1" dirty="0" err="1">
+                    <a:solidFill>
+                      <a:srgbClr val="000000"/>
+                    </a:solidFill>
+                  </a:rPr>
+                  <a:t>elit</a:t>
+                </a:r>
+                <a:r>
+                  <a:rPr lang="en-GB" sz="1200" i="1" dirty="0">
+                    <a:solidFill>
+                      <a:srgbClr val="000000"/>
+                    </a:solidFill>
+                  </a:rPr>
+                  <a:t>. </a:t>
+                </a:r>
+                <a:r>
+                  <a:rPr lang="en-GB" sz="1200" i="1" dirty="0" err="1">
+                    <a:solidFill>
+                      <a:srgbClr val="000000"/>
+                    </a:solidFill>
+                  </a:rPr>
+                  <a:t>Aliquam</a:t>
+                </a:r>
+                <a:r>
+                  <a:rPr lang="en-GB" sz="1200" i="1" dirty="0">
+                    <a:solidFill>
+                      <a:srgbClr val="000000"/>
+                    </a:solidFill>
+                  </a:rPr>
+                  <a:t> </a:t>
+                </a:r>
+                <a:r>
+                  <a:rPr lang="en-GB" sz="1200" i="1" dirty="0" err="1">
+                    <a:solidFill>
+                      <a:srgbClr val="000000"/>
+                    </a:solidFill>
+                  </a:rPr>
+                  <a:t>lectus</a:t>
+                </a:r>
+                <a:r>
+                  <a:rPr lang="en-GB" sz="1200" i="1" dirty="0">
+                    <a:solidFill>
+                      <a:srgbClr val="000000"/>
+                    </a:solidFill>
+                  </a:rPr>
+                  <a:t> dui, cursus vitae </a:t>
+                </a:r>
+                <a:r>
+                  <a:rPr lang="en-GB" sz="1200" i="1" dirty="0" err="1">
+                    <a:solidFill>
+                      <a:srgbClr val="000000"/>
+                    </a:solidFill>
+                  </a:rPr>
+                  <a:t>elit</a:t>
+                </a:r>
+                <a:r>
+                  <a:rPr lang="en-GB" sz="1200" i="1" dirty="0">
+                    <a:solidFill>
+                      <a:srgbClr val="000000"/>
+                    </a:solidFill>
+                  </a:rPr>
+                  <a:t> </a:t>
+                </a:r>
+                <a:r>
+                  <a:rPr lang="en-GB" sz="1200" i="1" dirty="0" err="1">
+                    <a:solidFill>
+                      <a:srgbClr val="000000"/>
+                    </a:solidFill>
+                  </a:rPr>
+                  <a:t>quis</a:t>
+                </a:r>
+                <a:r>
+                  <a:rPr lang="en-GB" sz="1200" i="1" dirty="0">
+                    <a:solidFill>
+                      <a:srgbClr val="000000"/>
+                    </a:solidFill>
+                  </a:rPr>
+                  <a:t>, </a:t>
+                </a:r>
+                <a:r>
+                  <a:rPr lang="en-GB" sz="1200" i="1" dirty="0" err="1">
+                    <a:solidFill>
+                      <a:srgbClr val="000000"/>
+                    </a:solidFill>
+                  </a:rPr>
+                  <a:t>mattis</a:t>
+                </a:r>
+                <a:r>
+                  <a:rPr lang="en-GB" sz="1200" i="1" dirty="0">
+                    <a:solidFill>
+                      <a:srgbClr val="000000"/>
+                    </a:solidFill>
+                  </a:rPr>
+                  <a:t> </a:t>
+                </a:r>
+                <a:r>
+                  <a:rPr lang="en-GB" sz="1200" i="1" dirty="0" err="1">
+                    <a:solidFill>
+                      <a:srgbClr val="000000"/>
+                    </a:solidFill>
+                  </a:rPr>
+                  <a:t>suscipit</a:t>
+                </a:r>
+                <a:r>
+                  <a:rPr lang="en-GB" sz="1200" i="1" dirty="0">
+                    <a:solidFill>
+                      <a:srgbClr val="000000"/>
+                    </a:solidFill>
+                  </a:rPr>
+                  <a:t> </a:t>
+                </a:r>
+                <a:r>
+                  <a:rPr lang="en-GB" sz="1200" i="1" dirty="0" err="1">
+                    <a:solidFill>
+                      <a:srgbClr val="000000"/>
+                    </a:solidFill>
+                  </a:rPr>
+                  <a:t>massa</a:t>
+                </a:r>
+                <a:r>
+                  <a:rPr lang="en-GB" sz="1200" i="1" dirty="0">
+                    <a:solidFill>
+                      <a:srgbClr val="000000"/>
+                    </a:solidFill>
+                  </a:rPr>
+                  <a:t>. </a:t>
+                </a:r>
+                <a:r>
+                  <a:rPr lang="en-GB" sz="1200" i="1" dirty="0" err="1">
+                    <a:solidFill>
+                      <a:srgbClr val="000000"/>
+                    </a:solidFill>
+                  </a:rPr>
+                  <a:t>Fusce</a:t>
+                </a:r>
+                <a:r>
+                  <a:rPr lang="en-GB" sz="1200" i="1" dirty="0">
+                    <a:solidFill>
+                      <a:srgbClr val="000000"/>
+                    </a:solidFill>
+                  </a:rPr>
+                  <a:t> </a:t>
+                </a:r>
+                <a:r>
+                  <a:rPr lang="en-GB" sz="1200" i="1" dirty="0" err="1">
+                    <a:solidFill>
+                      <a:srgbClr val="000000"/>
+                    </a:solidFill>
+                  </a:rPr>
+                  <a:t>nec</a:t>
+                </a:r>
+                <a:r>
+                  <a:rPr lang="en-GB" sz="1200" i="1" dirty="0">
+                    <a:solidFill>
+                      <a:srgbClr val="000000"/>
+                    </a:solidFill>
+                  </a:rPr>
+                  <a:t> </a:t>
+                </a:r>
+                <a:r>
+                  <a:rPr lang="en-GB" sz="1200" i="1" dirty="0" err="1">
+                    <a:solidFill>
+                      <a:srgbClr val="000000"/>
+                    </a:solidFill>
+                  </a:rPr>
+                  <a:t>diam</a:t>
+                </a:r>
+                <a:r>
+                  <a:rPr lang="en-GB" sz="1200" i="1" dirty="0">
+                    <a:solidFill>
+                      <a:srgbClr val="000000"/>
+                    </a:solidFill>
+                  </a:rPr>
+                  <a:t> </a:t>
+                </a:r>
+                <a:r>
+                  <a:rPr lang="en-GB" sz="1200" i="1" dirty="0" err="1">
+                    <a:solidFill>
+                      <a:srgbClr val="000000"/>
+                    </a:solidFill>
+                  </a:rPr>
+                  <a:t>leo</a:t>
+                </a:r>
+                <a:r>
+                  <a:rPr lang="en-GB" sz="1200" i="1" dirty="0">
+                    <a:solidFill>
+                      <a:srgbClr val="000000"/>
+                    </a:solidFill>
+                  </a:rPr>
+                  <a:t>."</a:t>
+                </a:r>
+                <a:endParaRPr lang="en-GB" sz="1200" dirty="0"/>
+              </a:p>
+            </p:txBody>
+          </p:sp>
+          <p:pic>
+            <p:nvPicPr>
+              <p:cNvPr id="7" name="Graphic 6" descr="Open quotation mark with solid fill">
+                <a:extLst>
+                  <a:ext uri="{FF2B5EF4-FFF2-40B4-BE49-F238E27FC236}">
+                    <a16:creationId xmlns:a16="http://schemas.microsoft.com/office/drawing/2014/main" id="{240F670E-F593-4CD8-B560-34ECA2A6E98D}"/>
+                  </a:ext>
+                </a:extLst>
+              </p:cNvPr>
+              <p:cNvPicPr>
+                <a:picLocks noChangeAspect="1"/>
+              </p:cNvPicPr>
+              <p:nvPr/>
+            </p:nvPicPr>
+            <p:blipFill>
+              <a:blip r:embed="rId4">
+                <a:extLst>
+                  <a:ext uri="{28A0092B-C50C-407E-A947-70E740481C1C}">
+                    <a14:useLocalDpi xmlns:a14="http://schemas.microsoft.com/office/drawing/2010/main" val="0"/>
+                  </a:ext>
+                  <a:ext uri="{96DAC541-7B7A-43D3-8B79-37D633B846F1}">
+                    <asvg:svgBlip xmlns:asvg="http://schemas.microsoft.com/office/drawing/2016/SVG/main" r:embed="rId5"/>
+                  </a:ext>
+                </a:extLst>
+              </a:blip>
+              <a:stretch>
+                <a:fillRect/>
+              </a:stretch>
+            </p:blipFill>
+            <p:spPr>
+              <a:xfrm>
+                <a:off x="1981293" y="5396246"/>
+                <a:ext cx="232826" cy="232826"/>
+              </a:xfrm>
+              <a:prstGeom prst="rect">
+                <a:avLst/>
+              </a:prstGeom>
+            </p:spPr>
+          </p:pic>
+        </p:grpSp>
+        <p:sp>
+          <p:nvSpPr>
+            <p:cNvPr id="24" name="Arrow: Pentagon 23">
+              <a:extLst>
+                <a:ext uri="{FF2B5EF4-FFF2-40B4-BE49-F238E27FC236}">
+                  <a16:creationId xmlns:a16="http://schemas.microsoft.com/office/drawing/2014/main" id="{22537797-B5FE-4B30-AC25-31CD0EE3E665}"/>
+                </a:ext>
+              </a:extLst>
+            </p:cNvPr>
+            <p:cNvSpPr/>
+            <p:nvPr/>
+          </p:nvSpPr>
+          <p:spPr>
+            <a:xfrm>
+              <a:off x="0" y="5557736"/>
+              <a:ext cx="1877908" cy="486383"/>
+            </a:xfrm>
+            <a:prstGeom prst="homePlate">
+              <a:avLst/>
+            </a:prstGeom>
+            <a:solidFill>
+              <a:srgbClr val="92D050"/>
+            </a:solidFill>
+            <a:ln>
+              <a:noFill/>
+            </a:ln>
+          </p:spPr>
+          <p:style>
+            <a:lnRef idx="2">
+              <a:schemeClr val="accent1">
+                <a:shade val="50000"/>
+              </a:schemeClr>
+            </a:lnRef>
+            <a:fillRef idx="1">
+              <a:schemeClr val="accent1"/>
+            </a:fillRef>
+            <a:effectRef idx="0">
+              <a:schemeClr val="accent1"/>
+            </a:effectRef>
+            <a:fontRef idx="minor">
+              <a:schemeClr val="lt1"/>
+            </a:fontRef>
+          </p:style>
+          <p:txBody>
+            <a:bodyPr rtlCol="0" anchor="ctr"/>
+            <a:lstStyle/>
+            <a:p>
+              <a:pPr algn="ctr"/>
+              <a:endParaRPr lang="en-GB" dirty="0"/>
+            </a:p>
+          </p:txBody>
+        </p:sp>
+        <p:sp>
+          <p:nvSpPr>
+            <p:cNvPr id="25" name="Arrow: Pentagon 24">
+              <a:extLst>
+                <a:ext uri="{FF2B5EF4-FFF2-40B4-BE49-F238E27FC236}">
+                  <a16:creationId xmlns:a16="http://schemas.microsoft.com/office/drawing/2014/main" id="{696150C4-D52E-4612-8827-902C0E7BBA9B}"/>
+                </a:ext>
+              </a:extLst>
+            </p:cNvPr>
+            <p:cNvSpPr/>
+            <p:nvPr/>
+          </p:nvSpPr>
+          <p:spPr>
+            <a:xfrm flipH="1">
+              <a:off x="4980092" y="5557735"/>
+              <a:ext cx="1877908" cy="486383"/>
+            </a:xfrm>
+            <a:prstGeom prst="homePlate">
+              <a:avLst/>
+            </a:prstGeom>
+            <a:solidFill>
+              <a:srgbClr val="92D050"/>
+            </a:solidFill>
+            <a:ln>
+              <a:noFill/>
+            </a:ln>
+          </p:spPr>
+          <p:style>
+            <a:lnRef idx="2">
+              <a:schemeClr val="accent1">
+                <a:shade val="50000"/>
+              </a:schemeClr>
+            </a:lnRef>
+            <a:fillRef idx="1">
+              <a:schemeClr val="accent1"/>
+            </a:fillRef>
+            <a:effectRef idx="0">
+              <a:schemeClr val="accent1"/>
+            </a:effectRef>
+            <a:fontRef idx="minor">
+              <a:schemeClr val="lt1"/>
+            </a:fontRef>
+          </p:style>
+          <p:txBody>
+            <a:bodyPr rtlCol="0" anchor="ctr"/>
+            <a:lstStyle/>
+            <a:p>
+              <a:pPr algn="ctr"/>
+              <a:endParaRPr lang="en-GB" dirty="0"/>
+            </a:p>
+          </p:txBody>
+        </p:sp>
+      </p:grpSp>
+      <p:sp>
+        <p:nvSpPr>
+          <p:cNvPr id="28" name="Rectangle: Diagonal Corners Rounded 27">
+            <a:extLst>
+              <a:ext uri="{FF2B5EF4-FFF2-40B4-BE49-F238E27FC236}">
+                <a16:creationId xmlns:a16="http://schemas.microsoft.com/office/drawing/2014/main" id="{8E50376E-CDA4-4FCF-B1AF-81CD92418E62}"/>
+              </a:ext>
+            </a:extLst>
+          </p:cNvPr>
+          <p:cNvSpPr/>
+          <p:nvPr/>
+        </p:nvSpPr>
+        <p:spPr>
+          <a:xfrm flipH="1">
+            <a:off x="4980093" y="4362258"/>
+            <a:ext cx="1261691" cy="331045"/>
+          </a:xfrm>
+          <a:prstGeom prst="round2DiagRect">
+            <a:avLst/>
+          </a:prstGeom>
+          <a:solidFill>
+            <a:schemeClr val="accent1">
+              <a:lumMod val="60000"/>
+              <a:lumOff val="40000"/>
+            </a:schemeClr>
+          </a:solidFill>
+          <a:ln>
+            <a:noFill/>
+          </a:ln>
+        </p:spPr>
+        <p:style>
+          <a:lnRef idx="2">
+            <a:schemeClr val="accent1">
+              <a:shade val="50000"/>
+            </a:schemeClr>
+          </a:lnRef>
+          <a:fillRef idx="1">
+            <a:schemeClr val="accent1"/>
+          </a:fillRef>
+          <a:effectRef idx="0">
+            <a:schemeClr val="accent1"/>
+          </a:effectRef>
+          <a:fontRef idx="minor">
+            <a:schemeClr val="lt1"/>
+          </a:fontRef>
+        </p:style>
+        <p:txBody>
+          <a:bodyPr rtlCol="0" anchor="ctr"/>
+          <a:lstStyle/>
+          <a:p>
+            <a:pPr algn="ctr"/>
+            <a:r>
+              <a:rPr lang="en-GB" sz="1200" dirty="0"/>
+              <a:t>Read more</a:t>
+            </a:r>
+          </a:p>
+        </p:txBody>
+      </p:sp>
+      <p:sp>
+        <p:nvSpPr>
+          <p:cNvPr id="33" name="Rectangle: Diagonal Corners Rounded 32">
+            <a:extLst>
+              <a:ext uri="{FF2B5EF4-FFF2-40B4-BE49-F238E27FC236}">
+                <a16:creationId xmlns:a16="http://schemas.microsoft.com/office/drawing/2014/main" id="{BB76BFBA-FB7E-449B-B993-B1C67CE9F2FC}"/>
+              </a:ext>
+            </a:extLst>
+          </p:cNvPr>
+          <p:cNvSpPr/>
+          <p:nvPr/>
+        </p:nvSpPr>
+        <p:spPr>
+          <a:xfrm flipH="1">
+            <a:off x="4980093" y="5352747"/>
+            <a:ext cx="1261691" cy="331045"/>
+          </a:xfrm>
+          <a:prstGeom prst="round2DiagRect">
+            <a:avLst/>
+          </a:prstGeom>
+          <a:solidFill>
+            <a:schemeClr val="accent1">
+              <a:lumMod val="60000"/>
+              <a:lumOff val="40000"/>
+            </a:schemeClr>
+          </a:solidFill>
+          <a:ln>
+            <a:noFill/>
+          </a:ln>
+        </p:spPr>
+        <p:style>
+          <a:lnRef idx="2">
+            <a:schemeClr val="accent1">
+              <a:shade val="50000"/>
+            </a:schemeClr>
+          </a:lnRef>
+          <a:fillRef idx="1">
+            <a:schemeClr val="accent1"/>
+          </a:fillRef>
+          <a:effectRef idx="0">
+            <a:schemeClr val="accent1"/>
+          </a:effectRef>
+          <a:fontRef idx="minor">
+            <a:schemeClr val="lt1"/>
+          </a:fontRef>
+        </p:style>
+        <p:txBody>
+          <a:bodyPr rtlCol="0" anchor="ctr"/>
+          <a:lstStyle/>
+          <a:p>
+            <a:pPr algn="ctr"/>
+            <a:r>
+              <a:rPr lang="en-GB" sz="1200" dirty="0"/>
+              <a:t>Our Staff</a:t>
+            </a:r>
+          </a:p>
+        </p:txBody>
+      </p:sp>
+      <p:sp>
+        <p:nvSpPr>
+          <p:cNvPr id="37" name="Rectangle 36">
+            <a:extLst>
+              <a:ext uri="{FF2B5EF4-FFF2-40B4-BE49-F238E27FC236}">
+                <a16:creationId xmlns:a16="http://schemas.microsoft.com/office/drawing/2014/main" id="{75058A5E-EA42-4611-B2FE-15834733E505}"/>
+              </a:ext>
+            </a:extLst>
+          </p:cNvPr>
+          <p:cNvSpPr/>
+          <p:nvPr/>
+        </p:nvSpPr>
+        <p:spPr>
+          <a:xfrm>
+            <a:off x="0" y="9323816"/>
+            <a:ext cx="6858000" cy="1194865"/>
+          </a:xfrm>
+          <a:prstGeom prst="rect">
+            <a:avLst/>
+          </a:prstGeom>
+          <a:noFill/>
+          <a:ln w="12700">
+            <a:solidFill>
+              <a:schemeClr val="tx1"/>
             </a:solidFill>
           </a:ln>
         </p:spPr>
@@ -9150,16 +12010,16 @@
           <a:lstStyle/>
           <a:p>
             <a:pPr algn="ctr"/>
-            <a:endParaRPr lang="en-GB" dirty="0"/>
+            <a:endParaRPr lang="en-GB"/>
           </a:p>
         </p:txBody>
       </p:sp>
       <p:sp>
         <p:nvSpPr>
-          <p:cNvPr id="11" name="TextBox 10">
+          <p:cNvPr id="38" name="TextBox 37">
             <a:extLst>
               <a:ext uri="{FF2B5EF4-FFF2-40B4-BE49-F238E27FC236}">
-                <a16:creationId xmlns:a16="http://schemas.microsoft.com/office/drawing/2014/main" id="{B0DCE2E4-3535-4D74-AEEA-2DBE74C8BB13}"/>
+                <a16:creationId xmlns:a16="http://schemas.microsoft.com/office/drawing/2014/main" id="{1ACCF872-CCF8-46FA-8F76-38694C26EC08}"/>
               </a:ext>
             </a:extLst>
           </p:cNvPr>
@@ -9168,8 +12028,440 @@
         </p:nvSpPr>
         <p:spPr>
           <a:xfrm>
-            <a:off x="164892" y="929390"/>
-            <a:ext cx="3420488" cy="830997"/>
+            <a:off x="367292" y="7501327"/>
+            <a:ext cx="6123416" cy="461665"/>
+          </a:xfrm>
+          <a:prstGeom prst="rect">
+            <a:avLst/>
+          </a:prstGeom>
+          <a:noFill/>
+        </p:spPr>
+        <p:txBody>
+          <a:bodyPr wrap="square" rtlCol="0">
+            <a:spAutoFit/>
+          </a:bodyPr>
+          <a:lstStyle/>
+          <a:p>
+            <a:r>
+              <a:rPr lang="en-GB" sz="1200" dirty="0">
+                <a:solidFill>
+                  <a:srgbClr val="000000"/>
+                </a:solidFill>
+              </a:rPr>
+              <a:t>Marketing message with something like “click below to take the first step” Lorem ipsum </a:t>
+            </a:r>
+            <a:r>
+              <a:rPr lang="en-GB" sz="1200" dirty="0" err="1">
+                <a:solidFill>
+                  <a:srgbClr val="000000"/>
+                </a:solidFill>
+              </a:rPr>
+              <a:t>dolor</a:t>
+            </a:r>
+            <a:r>
+              <a:rPr lang="en-GB" sz="1200" dirty="0">
+                <a:solidFill>
+                  <a:srgbClr val="000000"/>
+                </a:solidFill>
+              </a:rPr>
+              <a:t> sit </a:t>
+            </a:r>
+            <a:r>
+              <a:rPr lang="en-GB" sz="1200" dirty="0" err="1">
+                <a:solidFill>
+                  <a:srgbClr val="000000"/>
+                </a:solidFill>
+              </a:rPr>
+              <a:t>amet</a:t>
+            </a:r>
+            <a:r>
+              <a:rPr lang="en-GB" sz="1200" dirty="0">
+                <a:solidFill>
+                  <a:srgbClr val="000000"/>
+                </a:solidFill>
+              </a:rPr>
+              <a:t>, </a:t>
+            </a:r>
+            <a:r>
+              <a:rPr lang="en-GB" sz="1200" dirty="0" err="1">
+                <a:solidFill>
+                  <a:srgbClr val="000000"/>
+                </a:solidFill>
+              </a:rPr>
+              <a:t>consectetur</a:t>
+            </a:r>
+            <a:r>
+              <a:rPr lang="en-GB" sz="1200" dirty="0">
+                <a:solidFill>
+                  <a:srgbClr val="000000"/>
+                </a:solidFill>
+              </a:rPr>
+              <a:t> </a:t>
+            </a:r>
+            <a:r>
+              <a:rPr lang="en-GB" sz="1200" dirty="0" err="1">
+                <a:solidFill>
+                  <a:srgbClr val="000000"/>
+                </a:solidFill>
+              </a:rPr>
+              <a:t>adipiscing</a:t>
+            </a:r>
+            <a:r>
+              <a:rPr lang="en-GB" sz="1200" dirty="0">
+                <a:solidFill>
+                  <a:srgbClr val="000000"/>
+                </a:solidFill>
+              </a:rPr>
+              <a:t> </a:t>
+            </a:r>
+            <a:r>
+              <a:rPr lang="en-GB" sz="1200" dirty="0" err="1">
+                <a:solidFill>
+                  <a:srgbClr val="000000"/>
+                </a:solidFill>
+              </a:rPr>
+              <a:t>elit</a:t>
+            </a:r>
+            <a:r>
+              <a:rPr lang="en-GB" sz="1200" dirty="0">
+                <a:solidFill>
+                  <a:srgbClr val="000000"/>
+                </a:solidFill>
+              </a:rPr>
+              <a:t>.</a:t>
+            </a:r>
+          </a:p>
+        </p:txBody>
+      </p:sp>
+      <p:grpSp>
+        <p:nvGrpSpPr>
+          <p:cNvPr id="39" name="Group 38">
+            <a:extLst>
+              <a:ext uri="{FF2B5EF4-FFF2-40B4-BE49-F238E27FC236}">
+                <a16:creationId xmlns:a16="http://schemas.microsoft.com/office/drawing/2014/main" id="{CD264F69-3531-4BE7-BE06-8311666DBE28}"/>
+              </a:ext>
+            </a:extLst>
+          </p:cNvPr>
+          <p:cNvGrpSpPr/>
+          <p:nvPr/>
+        </p:nvGrpSpPr>
+        <p:grpSpPr>
+          <a:xfrm>
+            <a:off x="2585665" y="8350516"/>
+            <a:ext cx="1848256" cy="484949"/>
+            <a:chOff x="238755" y="9930315"/>
+            <a:chExt cx="1848256" cy="484949"/>
+          </a:xfrm>
+        </p:grpSpPr>
+        <p:sp>
+          <p:nvSpPr>
+            <p:cNvPr id="40" name="Rectangle: Diagonal Corners Rounded 39">
+              <a:extLst>
+                <a:ext uri="{FF2B5EF4-FFF2-40B4-BE49-F238E27FC236}">
+                  <a16:creationId xmlns:a16="http://schemas.microsoft.com/office/drawing/2014/main" id="{7D9DD9EE-34A2-4614-AB1E-03829C4260E6}"/>
+                </a:ext>
+              </a:extLst>
+            </p:cNvPr>
+            <p:cNvSpPr/>
+            <p:nvPr/>
+          </p:nvSpPr>
+          <p:spPr>
+            <a:xfrm flipH="1">
+              <a:off x="238755" y="9930315"/>
+              <a:ext cx="1848256" cy="484949"/>
+            </a:xfrm>
+            <a:prstGeom prst="round2DiagRect">
+              <a:avLst/>
+            </a:prstGeom>
+            <a:solidFill>
+              <a:srgbClr val="92D050"/>
+            </a:solidFill>
+            <a:ln>
+              <a:noFill/>
+            </a:ln>
+          </p:spPr>
+          <p:style>
+            <a:lnRef idx="2">
+              <a:schemeClr val="accent1">
+                <a:shade val="50000"/>
+              </a:schemeClr>
+            </a:lnRef>
+            <a:fillRef idx="1">
+              <a:schemeClr val="accent1"/>
+            </a:fillRef>
+            <a:effectRef idx="0">
+              <a:schemeClr val="accent1"/>
+            </a:effectRef>
+            <a:fontRef idx="minor">
+              <a:schemeClr val="lt1"/>
+            </a:fontRef>
+          </p:style>
+          <p:txBody>
+            <a:bodyPr rtlCol="0" anchor="ctr"/>
+            <a:lstStyle/>
+            <a:p>
+              <a:r>
+                <a:rPr lang="en-GB" dirty="0"/>
+                <a:t>   Start here</a:t>
+              </a:r>
+            </a:p>
+          </p:txBody>
+        </p:sp>
+        <p:grpSp>
+          <p:nvGrpSpPr>
+            <p:cNvPr id="41" name="Group 40">
+              <a:extLst>
+                <a:ext uri="{FF2B5EF4-FFF2-40B4-BE49-F238E27FC236}">
+                  <a16:creationId xmlns:a16="http://schemas.microsoft.com/office/drawing/2014/main" id="{0E3BAB67-3582-4105-B9CE-3EFA50743001}"/>
+                </a:ext>
+              </a:extLst>
+            </p:cNvPr>
+            <p:cNvGrpSpPr/>
+            <p:nvPr/>
+          </p:nvGrpSpPr>
+          <p:grpSpPr>
+            <a:xfrm>
+              <a:off x="1579670" y="10052839"/>
+              <a:ext cx="155190" cy="239898"/>
+              <a:chOff x="3866750" y="5911756"/>
+              <a:chExt cx="547687" cy="533400"/>
+            </a:xfrm>
+            <a:solidFill>
+              <a:schemeClr val="bg1"/>
+            </a:solidFill>
+          </p:grpSpPr>
+          <p:sp>
+            <p:nvSpPr>
+              <p:cNvPr id="42" name="Freeform: Shape 41">
+                <a:extLst>
+                  <a:ext uri="{FF2B5EF4-FFF2-40B4-BE49-F238E27FC236}">
+                    <a16:creationId xmlns:a16="http://schemas.microsoft.com/office/drawing/2014/main" id="{A2F00392-B169-454F-8C6A-C4063D64ED05}"/>
+                  </a:ext>
+                </a:extLst>
+              </p:cNvPr>
+              <p:cNvSpPr/>
+              <p:nvPr/>
+            </p:nvSpPr>
+            <p:spPr>
+              <a:xfrm>
+                <a:off x="3866750" y="5911756"/>
+                <a:ext cx="319087" cy="533400"/>
+              </a:xfrm>
+              <a:custGeom>
+                <a:avLst/>
+                <a:gdLst>
+                  <a:gd name="connsiteX0" fmla="*/ 119063 w 319087"/>
+                  <a:gd name="connsiteY0" fmla="*/ 0 h 533400"/>
+                  <a:gd name="connsiteX1" fmla="*/ 0 w 319087"/>
+                  <a:gd name="connsiteY1" fmla="*/ 0 h 533400"/>
+                  <a:gd name="connsiteX2" fmla="*/ 200025 w 319087"/>
+                  <a:gd name="connsiteY2" fmla="*/ 266700 h 533400"/>
+                  <a:gd name="connsiteX3" fmla="*/ 0 w 319087"/>
+                  <a:gd name="connsiteY3" fmla="*/ 533400 h 533400"/>
+                  <a:gd name="connsiteX4" fmla="*/ 119063 w 319087"/>
+                  <a:gd name="connsiteY4" fmla="*/ 533400 h 533400"/>
+                  <a:gd name="connsiteX5" fmla="*/ 319088 w 319087"/>
+                  <a:gd name="connsiteY5" fmla="*/ 266700 h 533400"/>
+                  <a:gd name="connsiteX6" fmla="*/ 119063 w 319087"/>
+                  <a:gd name="connsiteY6" fmla="*/ 0 h 533400"/>
+                </a:gdLst>
+                <a:ahLst/>
+                <a:cxnLst>
+                  <a:cxn ang="0">
+                    <a:pos x="connsiteX0" y="connsiteY0"/>
+                  </a:cxn>
+                  <a:cxn ang="0">
+                    <a:pos x="connsiteX1" y="connsiteY1"/>
+                  </a:cxn>
+                  <a:cxn ang="0">
+                    <a:pos x="connsiteX2" y="connsiteY2"/>
+                  </a:cxn>
+                  <a:cxn ang="0">
+                    <a:pos x="connsiteX3" y="connsiteY3"/>
+                  </a:cxn>
+                  <a:cxn ang="0">
+                    <a:pos x="connsiteX4" y="connsiteY4"/>
+                  </a:cxn>
+                  <a:cxn ang="0">
+                    <a:pos x="connsiteX5" y="connsiteY5"/>
+                  </a:cxn>
+                  <a:cxn ang="0">
+                    <a:pos x="connsiteX6" y="connsiteY6"/>
+                  </a:cxn>
+                </a:cxnLst>
+                <a:rect l="l" t="t" r="r" b="b"/>
+                <a:pathLst>
+                  <a:path w="319087" h="533400">
+                    <a:moveTo>
+                      <a:pt x="119063" y="0"/>
+                    </a:moveTo>
+                    <a:lnTo>
+                      <a:pt x="0" y="0"/>
+                    </a:lnTo>
+                    <a:lnTo>
+                      <a:pt x="200025" y="266700"/>
+                    </a:lnTo>
+                    <a:lnTo>
+                      <a:pt x="0" y="533400"/>
+                    </a:lnTo>
+                    <a:lnTo>
+                      <a:pt x="119063" y="533400"/>
+                    </a:lnTo>
+                    <a:lnTo>
+                      <a:pt x="319088" y="266700"/>
+                    </a:lnTo>
+                    <a:lnTo>
+                      <a:pt x="119063" y="0"/>
+                    </a:lnTo>
+                    <a:close/>
+                  </a:path>
+                </a:pathLst>
+              </a:custGeom>
+              <a:grpFill/>
+              <a:ln w="9525" cap="flat">
+                <a:noFill/>
+                <a:prstDash val="solid"/>
+                <a:miter/>
+              </a:ln>
+            </p:spPr>
+            <p:txBody>
+              <a:bodyPr rot="0" spcFirstLastPara="0" vertOverflow="overflow" horzOverflow="overflow" vert="horz" wrap="square" lIns="91440" tIns="45720" rIns="91440" bIns="45720" numCol="1" spcCol="0" rtlCol="0" fromWordArt="0" anchor="ctr" anchorCtr="0" forceAA="0" compatLnSpc="1">
+                <a:prstTxWarp prst="textNoShape">
+                  <a:avLst/>
+                </a:prstTxWarp>
+                <a:noAutofit/>
+              </a:bodyPr>
+              <a:lstStyle/>
+              <a:p>
+                <a:endParaRPr lang="en-GB" sz="1400"/>
+              </a:p>
+            </p:txBody>
+          </p:sp>
+          <p:sp>
+            <p:nvSpPr>
+              <p:cNvPr id="43" name="Freeform: Shape 42">
+                <a:extLst>
+                  <a:ext uri="{FF2B5EF4-FFF2-40B4-BE49-F238E27FC236}">
+                    <a16:creationId xmlns:a16="http://schemas.microsoft.com/office/drawing/2014/main" id="{02828467-1BF7-411B-9B59-1CC7D7308E43}"/>
+                  </a:ext>
+                </a:extLst>
+              </p:cNvPr>
+              <p:cNvSpPr/>
+              <p:nvPr/>
+            </p:nvSpPr>
+            <p:spPr>
+              <a:xfrm>
+                <a:off x="4095350" y="5911756"/>
+                <a:ext cx="319087" cy="533400"/>
+              </a:xfrm>
+              <a:custGeom>
+                <a:avLst/>
+                <a:gdLst>
+                  <a:gd name="connsiteX0" fmla="*/ 119063 w 319087"/>
+                  <a:gd name="connsiteY0" fmla="*/ 0 h 533400"/>
+                  <a:gd name="connsiteX1" fmla="*/ 0 w 319087"/>
+                  <a:gd name="connsiteY1" fmla="*/ 0 h 533400"/>
+                  <a:gd name="connsiteX2" fmla="*/ 200025 w 319087"/>
+                  <a:gd name="connsiteY2" fmla="*/ 266700 h 533400"/>
+                  <a:gd name="connsiteX3" fmla="*/ 0 w 319087"/>
+                  <a:gd name="connsiteY3" fmla="*/ 533400 h 533400"/>
+                  <a:gd name="connsiteX4" fmla="*/ 119063 w 319087"/>
+                  <a:gd name="connsiteY4" fmla="*/ 533400 h 533400"/>
+                  <a:gd name="connsiteX5" fmla="*/ 319088 w 319087"/>
+                  <a:gd name="connsiteY5" fmla="*/ 266700 h 533400"/>
+                  <a:gd name="connsiteX6" fmla="*/ 119063 w 319087"/>
+                  <a:gd name="connsiteY6" fmla="*/ 0 h 533400"/>
+                </a:gdLst>
+                <a:ahLst/>
+                <a:cxnLst>
+                  <a:cxn ang="0">
+                    <a:pos x="connsiteX0" y="connsiteY0"/>
+                  </a:cxn>
+                  <a:cxn ang="0">
+                    <a:pos x="connsiteX1" y="connsiteY1"/>
+                  </a:cxn>
+                  <a:cxn ang="0">
+                    <a:pos x="connsiteX2" y="connsiteY2"/>
+                  </a:cxn>
+                  <a:cxn ang="0">
+                    <a:pos x="connsiteX3" y="connsiteY3"/>
+                  </a:cxn>
+                  <a:cxn ang="0">
+                    <a:pos x="connsiteX4" y="connsiteY4"/>
+                  </a:cxn>
+                  <a:cxn ang="0">
+                    <a:pos x="connsiteX5" y="connsiteY5"/>
+                  </a:cxn>
+                  <a:cxn ang="0">
+                    <a:pos x="connsiteX6" y="connsiteY6"/>
+                  </a:cxn>
+                </a:cxnLst>
+                <a:rect l="l" t="t" r="r" b="b"/>
+                <a:pathLst>
+                  <a:path w="319087" h="533400">
+                    <a:moveTo>
+                      <a:pt x="119063" y="0"/>
+                    </a:moveTo>
+                    <a:lnTo>
+                      <a:pt x="0" y="0"/>
+                    </a:lnTo>
+                    <a:lnTo>
+                      <a:pt x="200025" y="266700"/>
+                    </a:lnTo>
+                    <a:lnTo>
+                      <a:pt x="0" y="533400"/>
+                    </a:lnTo>
+                    <a:lnTo>
+                      <a:pt x="119063" y="533400"/>
+                    </a:lnTo>
+                    <a:lnTo>
+                      <a:pt x="319088" y="266700"/>
+                    </a:lnTo>
+                    <a:lnTo>
+                      <a:pt x="119063" y="0"/>
+                    </a:lnTo>
+                    <a:close/>
+                  </a:path>
+                </a:pathLst>
+              </a:custGeom>
+              <a:grpFill/>
+              <a:ln w="9525" cap="flat">
+                <a:noFill/>
+                <a:prstDash val="solid"/>
+                <a:miter/>
+              </a:ln>
+            </p:spPr>
+            <p:txBody>
+              <a:bodyPr rot="0" spcFirstLastPara="0" vertOverflow="overflow" horzOverflow="overflow" vert="horz" wrap="square" lIns="91440" tIns="45720" rIns="91440" bIns="45720" numCol="1" spcCol="0" rtlCol="0" fromWordArt="0" anchor="ctr" anchorCtr="0" forceAA="0" compatLnSpc="1">
+                <a:prstTxWarp prst="textNoShape">
+                  <a:avLst/>
+                </a:prstTxWarp>
+                <a:noAutofit/>
+              </a:bodyPr>
+              <a:lstStyle/>
+              <a:p>
+                <a:endParaRPr lang="en-GB" sz="1400"/>
+              </a:p>
+            </p:txBody>
+          </p:sp>
+        </p:grpSp>
+      </p:grpSp>
+      <p:sp>
+        <p:nvSpPr>
+          <p:cNvPr id="45" name="TextBox 44">
+            <a:extLst>
+              <a:ext uri="{FF2B5EF4-FFF2-40B4-BE49-F238E27FC236}">
+                <a16:creationId xmlns:a16="http://schemas.microsoft.com/office/drawing/2014/main" id="{55934532-5AF5-497A-845F-97179322D489}"/>
+              </a:ext>
+            </a:extLst>
+          </p:cNvPr>
+          <p:cNvSpPr txBox="1"/>
+          <p:nvPr/>
+        </p:nvSpPr>
+        <p:spPr>
+          <a:xfrm>
+            <a:off x="4809987" y="9981676"/>
+            <a:ext cx="1771639" cy="384721"/>
           </a:xfrm>
           <a:prstGeom prst="rect">
             <a:avLst/>
@@ -9183,18 +12475,208 @@
           <a:lstStyle/>
           <a:p>
             <a:r>
-              <a:rPr lang="en-GB" sz="2400" dirty="0" err="1"/>
-              <a:t>AdventHealth</a:t>
-            </a:r>
-            <a:r>
-              <a:rPr lang="en-GB" sz="2400" dirty="0"/>
-              <a:t> Celebration</a:t>
-            </a:r>
-          </a:p>
-          <a:p>
-            <a:r>
-              <a:rPr lang="en-GB" sz="2400" dirty="0"/>
-              <a:t>Bariatric Surgery</a:t>
+              <a:rPr lang="en-GB" sz="1100" dirty="0"/>
+              <a:t>Advanced Obesity Surgery</a:t>
+            </a:r>
+          </a:p>
+          <a:p>
+            <a:pPr algn="r"/>
+            <a:r>
+              <a:rPr lang="en-GB" sz="800" dirty="0"/>
+              <a:t>©Copyright 2022. All Rights Reserved.</a:t>
+            </a:r>
+          </a:p>
+        </p:txBody>
+      </p:sp>
+      <p:sp>
+        <p:nvSpPr>
+          <p:cNvPr id="46" name="TextBox 45">
+            <a:extLst>
+              <a:ext uri="{FF2B5EF4-FFF2-40B4-BE49-F238E27FC236}">
+                <a16:creationId xmlns:a16="http://schemas.microsoft.com/office/drawing/2014/main" id="{FB279216-47C7-4223-90D5-34866323339A}"/>
+              </a:ext>
+            </a:extLst>
+          </p:cNvPr>
+          <p:cNvSpPr txBox="1"/>
+          <p:nvPr/>
+        </p:nvSpPr>
+        <p:spPr>
+          <a:xfrm>
+            <a:off x="3761623" y="9468381"/>
+            <a:ext cx="2820003" cy="261610"/>
+          </a:xfrm>
+          <a:prstGeom prst="rect">
+            <a:avLst/>
+          </a:prstGeom>
+          <a:noFill/>
+        </p:spPr>
+        <p:txBody>
+          <a:bodyPr wrap="none" rtlCol="0">
+            <a:spAutoFit/>
+          </a:bodyPr>
+          <a:lstStyle/>
+          <a:p>
+            <a:r>
+              <a:rPr lang="en-GB" sz="1100" dirty="0"/>
+              <a:t>Blog        FAQ        Contact us        Privacy Policy</a:t>
+            </a:r>
+          </a:p>
+        </p:txBody>
+      </p:sp>
+      <p:pic>
+        <p:nvPicPr>
+          <p:cNvPr id="47" name="Picture 2" descr="Center for Metabolic and Obesity Surgery">
+            <a:extLst>
+              <a:ext uri="{FF2B5EF4-FFF2-40B4-BE49-F238E27FC236}">
+                <a16:creationId xmlns:a16="http://schemas.microsoft.com/office/drawing/2014/main" id="{8B0FE0B5-1240-444C-BDB1-32C7D6264DE7}"/>
+              </a:ext>
+            </a:extLst>
+          </p:cNvPr>
+          <p:cNvPicPr>
+            <a:picLocks noChangeAspect="1" noChangeArrowheads="1"/>
+          </p:cNvPicPr>
+          <p:nvPr/>
+        </p:nvPicPr>
+        <p:blipFill>
+          <a:blip r:embed="rId6">
+            <a:extLst>
+              <a:ext uri="{BEBA8EAE-BF5A-486C-A8C5-ECC9F3942E4B}">
+                <a14:imgProps xmlns:a14="http://schemas.microsoft.com/office/drawing/2010/main">
+                  <a14:imgLayer r:embed="rId7">
+                    <a14:imgEffect>
+                      <a14:backgroundRemoval t="8163" b="89796" l="4219" r="95000">
+                        <a14:foregroundMark x1="7969" y1="48163" x2="7969" y2="48163"/>
+                        <a14:foregroundMark x1="4219" y1="62857" x2="4219" y2="62857"/>
+                        <a14:foregroundMark x1="14844" y1="48571" x2="14844" y2="48571"/>
+                        <a14:foregroundMark x1="23594" y1="54286" x2="23594" y2="54286"/>
+                        <a14:foregroundMark x1="30938" y1="54694" x2="30938" y2="54694"/>
+                        <a14:foregroundMark x1="38594" y1="53061" x2="38594" y2="53061"/>
+                        <a14:foregroundMark x1="47031" y1="50612" x2="47031" y2="50612"/>
+                        <a14:foregroundMark x1="64531" y1="50612" x2="64531" y2="50612"/>
+                        <a14:foregroundMark x1="72656" y1="53469" x2="72656" y2="53469"/>
+                        <a14:foregroundMark x1="81094" y1="53061" x2="81094" y2="53061"/>
+                        <a14:foregroundMark x1="85156" y1="54286" x2="85156" y2="54286"/>
+                        <a14:foregroundMark x1="90469" y1="51429" x2="90469" y2="51429"/>
+                        <a14:foregroundMark x1="95000" y1="59184" x2="95000" y2="59184"/>
+                        <a14:foregroundMark x1="68281" y1="30204" x2="68281" y2="30204"/>
+                        <a14:foregroundMark x1="73125" y1="28980" x2="73125" y2="28980"/>
+                        <a14:foregroundMark x1="73125" y1="8163" x2="73125" y2="8163"/>
+                        <a14:foregroundMark x1="67500" y1="13061" x2="67500" y2="13061"/>
+                        <a14:foregroundMark x1="72031" y1="17143" x2="72031" y2="17143"/>
+                        <a14:foregroundMark x1="68438" y1="22041" x2="68438" y2="22041"/>
+                        <a14:foregroundMark x1="69688" y1="17143" x2="69688" y2="17143"/>
+                        <a14:foregroundMark x1="57031" y1="83265" x2="57031" y2="83265"/>
+                        <a14:foregroundMark x1="62187" y1="83673" x2="62187" y2="83673"/>
+                        <a14:foregroundMark x1="66250" y1="79184" x2="66250" y2="79184"/>
+                        <a14:foregroundMark x1="68281" y1="82857" x2="68281" y2="82857"/>
+                        <a14:foregroundMark x1="72969" y1="82041" x2="72969" y2="82041"/>
+                        <a14:foregroundMark x1="77188" y1="84898" x2="77188" y2="84898"/>
+                        <a14:foregroundMark x1="76719" y1="82857" x2="76719" y2="82857"/>
+                        <a14:foregroundMark x1="79219" y1="82857" x2="79219" y2="82857"/>
+                        <a14:foregroundMark x1="84375" y1="81224" x2="84375" y2="81224"/>
+                        <a14:foregroundMark x1="86094" y1="82041" x2="86094" y2="82041"/>
+                        <a14:foregroundMark x1="86094" y1="77143" x2="86094" y2="77143"/>
+                        <a14:foregroundMark x1="87969" y1="83673" x2="87969" y2="83673"/>
+                        <a14:foregroundMark x1="92656" y1="82041" x2="92656" y2="82041"/>
+                        <a14:foregroundMark x1="72813" y1="23673" x2="72813" y2="23673"/>
+                        <a14:foregroundMark x1="71563" y1="20816" x2="71563" y2="20816"/>
+                        <a14:foregroundMark x1="5938" y1="55510" x2="5938" y2="55510"/>
+                        <a14:backgroundMark x1="7969" y1="46531" x2="7969" y2="46531"/>
+                        <a14:backgroundMark x1="32656" y1="51837" x2="32656" y2="51837"/>
+                        <a14:backgroundMark x1="63281" y1="83265" x2="63281" y2="83265"/>
+                        <a14:backgroundMark x1="69375" y1="82857" x2="69375" y2="82857"/>
+                        <a14:backgroundMark x1="73281" y1="84898" x2="73281" y2="84898"/>
+                        <a14:backgroundMark x1="80938" y1="83673" x2="80938" y2="83673"/>
+                        <a14:backgroundMark x1="89375" y1="84898" x2="89375" y2="84898"/>
+                        <a14:backgroundMark x1="69688" y1="22041" x2="69688" y2="22041"/>
+                        <a14:backgroundMark x1="72500" y1="20816" x2="72500" y2="20816"/>
+                        <a14:backgroundMark x1="8125" y1="48163" x2="8125" y2="48163"/>
+                        <a14:backgroundMark x1="7969" y1="48163" x2="7969" y2="48163"/>
+                        <a14:backgroundMark x1="6406" y1="55510" x2="6406" y2="55510"/>
+                        <a14:backgroundMark x1="77344" y1="85714" x2="77344" y2="85714"/>
+                        <a14:backgroundMark x1="73125" y1="82857" x2="73125" y2="82857"/>
+                        <a14:backgroundMark x1="77500" y1="84898" x2="77500" y2="84898"/>
+                      </a14:backgroundRemoval>
+                    </a14:imgEffect>
+                  </a14:imgLayer>
+                </a14:imgProps>
+              </a:ext>
+              <a:ext uri="{28A0092B-C50C-407E-A947-70E740481C1C}">
+                <a14:useLocalDpi xmlns:a14="http://schemas.microsoft.com/office/drawing/2010/main" val="0"/>
+              </a:ext>
+            </a:extLst>
+          </a:blip>
+          <a:srcRect/>
+          <a:stretch>
+            <a:fillRect/>
+          </a:stretch>
+        </p:blipFill>
+        <p:spPr bwMode="auto">
+          <a:xfrm>
+            <a:off x="276376" y="9471521"/>
+            <a:ext cx="1158153" cy="443355"/>
+          </a:xfrm>
+          <a:prstGeom prst="rect">
+            <a:avLst/>
+          </a:prstGeom>
+          <a:noFill/>
+          <a:ln>
+            <a:noFill/>
+          </a:ln>
+          <a:extLst>
+            <a:ext uri="{909E8E84-426E-40DD-AFC4-6F175D3DCCD1}">
+              <a14:hiddenFill xmlns:a14="http://schemas.microsoft.com/office/drawing/2010/main">
+                <a:solidFill>
+                  <a:srgbClr val="FFFFFF"/>
+                </a:solidFill>
+              </a14:hiddenFill>
+            </a:ext>
+          </a:extLst>
+        </p:spPr>
+      </p:pic>
+      <p:sp>
+        <p:nvSpPr>
+          <p:cNvPr id="51" name="TextBox 50">
+            <a:extLst>
+              <a:ext uri="{FF2B5EF4-FFF2-40B4-BE49-F238E27FC236}">
+                <a16:creationId xmlns:a16="http://schemas.microsoft.com/office/drawing/2014/main" id="{0F4C1FDF-DE28-4AC0-8FC3-CAF327665F1A}"/>
+              </a:ext>
+            </a:extLst>
+          </p:cNvPr>
+          <p:cNvSpPr txBox="1"/>
+          <p:nvPr/>
+        </p:nvSpPr>
+        <p:spPr>
+          <a:xfrm>
+            <a:off x="208205" y="9904732"/>
+            <a:ext cx="2219850" cy="461665"/>
+          </a:xfrm>
+          <a:prstGeom prst="rect">
+            <a:avLst/>
+          </a:prstGeom>
+          <a:noFill/>
+        </p:spPr>
+        <p:txBody>
+          <a:bodyPr wrap="square">
+            <a:spAutoFit/>
+          </a:bodyPr>
+          <a:lstStyle/>
+          <a:p>
+            <a:r>
+              <a:rPr lang="en-GB" sz="800" dirty="0"/>
+              <a:t>407-303-3820</a:t>
+            </a:r>
+          </a:p>
+          <a:p>
+            <a:r>
+              <a:rPr lang="en-GB" sz="800" dirty="0"/>
+              <a:t>410 Celebration Place, Suite 401</a:t>
+            </a:r>
+          </a:p>
+          <a:p>
+            <a:r>
+              <a:rPr lang="en-GB" sz="800" dirty="0"/>
+              <a:t>Celebration, FL 34747</a:t>
             </a:r>
           </a:p>
         </p:txBody>
@@ -9471,4 +12953,299 @@
     </a:ext>
   </a:extLst>
 </a:theme>
+</file>
+
+<file path=ppt/theme/theme2.xml><?xml version="1.0" encoding="utf-8"?>
+<a:theme xmlns:a="http://schemas.openxmlformats.org/drawingml/2006/main" name="Office Theme">
+  <a:themeElements>
+    <a:clrScheme name="Office">
+      <a:dk1>
+        <a:sysClr val="windowText" lastClr="000000"/>
+      </a:dk1>
+      <a:lt1>
+        <a:sysClr val="window" lastClr="FFFFFF"/>
+      </a:lt1>
+      <a:dk2>
+        <a:srgbClr val="44546A"/>
+      </a:dk2>
+      <a:lt2>
+        <a:srgbClr val="E7E6E6"/>
+      </a:lt2>
+      <a:accent1>
+        <a:srgbClr val="4472C4"/>
+      </a:accent1>
+      <a:accent2>
+        <a:srgbClr val="ED7D31"/>
+      </a:accent2>
+      <a:accent3>
+        <a:srgbClr val="A5A5A5"/>
+      </a:accent3>
+      <a:accent4>
+        <a:srgbClr val="FFC000"/>
+      </a:accent4>
+      <a:accent5>
+        <a:srgbClr val="5B9BD5"/>
+      </a:accent5>
+      <a:accent6>
+        <a:srgbClr val="70AD47"/>
+      </a:accent6>
+      <a:hlink>
+        <a:srgbClr val="0563C1"/>
+      </a:hlink>
+      <a:folHlink>
+        <a:srgbClr val="954F72"/>
+      </a:folHlink>
+    </a:clrScheme>
+    <a:fontScheme name="Office">
+      <a:majorFont>
+        <a:latin typeface="Calibri Light" panose="020F0302020204030204"/>
+        <a:ea typeface=""/>
+        <a:cs typeface=""/>
+        <a:font script="Jpan" typeface="游ゴシック Light"/>
+        <a:font script="Hang" typeface="맑은 고딕"/>
+        <a:font script="Hans" typeface="等线 Light"/>
+        <a:font script="Hant" typeface="新細明體"/>
+        <a:font script="Arab" typeface="Times New Roman"/>
+        <a:font script="Hebr" typeface="Times New Roman"/>
+        <a:font script="Thai" typeface="Angsana New"/>
+        <a:font script="Ethi" typeface="Nyala"/>
+        <a:font script="Beng" typeface="Vrinda"/>
+        <a:font script="Gujr" typeface="Shruti"/>
+        <a:font script="Khmr" typeface="MoolBoran"/>
+        <a:font script="Knda" typeface="Tunga"/>
+        <a:font script="Guru" typeface="Raavi"/>
+        <a:font script="Cans" typeface="Euphemia"/>
+        <a:font script="Cher" typeface="Plantagenet Cherokee"/>
+        <a:font script="Yiii" typeface="Microsoft Yi Baiti"/>
+        <a:font script="Tibt" typeface="Microsoft Himalaya"/>
+        <a:font script="Thaa" typeface="MV Boli"/>
+        <a:font script="Deva" typeface="Mangal"/>
+        <a:font script="Telu" typeface="Gautami"/>
+        <a:font script="Taml" typeface="Latha"/>
+        <a:font script="Syrc" typeface="Estrangelo Edessa"/>
+        <a:font script="Orya" typeface="Kalinga"/>
+        <a:font script="Mlym" typeface="Kartika"/>
+        <a:font script="Laoo" typeface="DokChampa"/>
+        <a:font script="Sinh" typeface="Iskoola Pota"/>
+        <a:font script="Mong" typeface="Mongolian Baiti"/>
+        <a:font script="Viet" typeface="Times New Roman"/>
+        <a:font script="Uigh" typeface="Microsoft Uighur"/>
+        <a:font script="Geor" typeface="Sylfaen"/>
+        <a:font script="Armn" typeface="Arial"/>
+        <a:font script="Bugi" typeface="Leelawadee UI"/>
+        <a:font script="Bopo" typeface="Microsoft JhengHei"/>
+        <a:font script="Java" typeface="Javanese Text"/>
+        <a:font script="Lisu" typeface="Segoe UI"/>
+        <a:font script="Mymr" typeface="Myanmar Text"/>
+        <a:font script="Nkoo" typeface="Ebrima"/>
+        <a:font script="Olck" typeface="Nirmala UI"/>
+        <a:font script="Osma" typeface="Ebrima"/>
+        <a:font script="Phag" typeface="Phagspa"/>
+        <a:font script="Syrn" typeface="Estrangelo Edessa"/>
+        <a:font script="Syrj" typeface="Estrangelo Edessa"/>
+        <a:font script="Syre" typeface="Estrangelo Edessa"/>
+        <a:font script="Sora" typeface="Nirmala UI"/>
+        <a:font script="Tale" typeface="Microsoft Tai Le"/>
+        <a:font script="Talu" typeface="Microsoft New Tai Lue"/>
+        <a:font script="Tfng" typeface="Ebrima"/>
+      </a:majorFont>
+      <a:minorFont>
+        <a:latin typeface="Calibri" panose="020F0502020204030204"/>
+        <a:ea typeface=""/>
+        <a:cs typeface=""/>
+        <a:font script="Jpan" typeface="游ゴシック"/>
+        <a:font script="Hang" typeface="맑은 고딕"/>
+        <a:font script="Hans" typeface="等线"/>
+        <a:font script="Hant" typeface="新細明體"/>
+        <a:font script="Arab" typeface="Arial"/>
+        <a:font script="Hebr" typeface="Arial"/>
+        <a:font script="Thai" typeface="Cordia New"/>
+        <a:font script="Ethi" typeface="Nyala"/>
+        <a:font script="Beng" typeface="Vrinda"/>
+        <a:font script="Gujr" typeface="Shruti"/>
+        <a:font script="Khmr" typeface="DaunPenh"/>
+        <a:font script="Knda" typeface="Tunga"/>
+        <a:font script="Guru" typeface="Raavi"/>
+        <a:font script="Cans" typeface="Euphemia"/>
+        <a:font script="Cher" typeface="Plantagenet Cherokee"/>
+        <a:font script="Yiii" typeface="Microsoft Yi Baiti"/>
+        <a:font script="Tibt" typeface="Microsoft Himalaya"/>
+        <a:font script="Thaa" typeface="MV Boli"/>
+        <a:font script="Deva" typeface="Mangal"/>
+        <a:font script="Telu" typeface="Gautami"/>
+        <a:font script="Taml" typeface="Latha"/>
+        <a:font script="Syrc" typeface="Estrangelo Edessa"/>
+        <a:font script="Orya" typeface="Kalinga"/>
+        <a:font script="Mlym" typeface="Kartika"/>
+        <a:font script="Laoo" typeface="DokChampa"/>
+        <a:font script="Sinh" typeface="Iskoola Pota"/>
+        <a:font script="Mong" typeface="Mongolian Baiti"/>
+        <a:font script="Viet" typeface="Arial"/>
+        <a:font script="Uigh" typeface="Microsoft Uighur"/>
+        <a:font script="Geor" typeface="Sylfaen"/>
+        <a:font script="Armn" typeface="Arial"/>
+        <a:font script="Bugi" typeface="Leelawadee UI"/>
+        <a:font script="Bopo" typeface="Microsoft JhengHei"/>
+        <a:font script="Java" typeface="Javanese Text"/>
+        <a:font script="Lisu" typeface="Segoe UI"/>
+        <a:font script="Mymr" typeface="Myanmar Text"/>
+        <a:font script="Nkoo" typeface="Ebrima"/>
+        <a:font script="Olck" typeface="Nirmala UI"/>
+        <a:font script="Osma" typeface="Ebrima"/>
+        <a:font script="Phag" typeface="Phagspa"/>
+        <a:font script="Syrn" typeface="Estrangelo Edessa"/>
+        <a:font script="Syrj" typeface="Estrangelo Edessa"/>
+        <a:font script="Syre" typeface="Estrangelo Edessa"/>
+        <a:font script="Sora" typeface="Nirmala UI"/>
+        <a:font script="Tale" typeface="Microsoft Tai Le"/>
+        <a:font script="Talu" typeface="Microsoft New Tai Lue"/>
+        <a:font script="Tfng" typeface="Ebrima"/>
+      </a:minorFont>
+    </a:fontScheme>
+    <a:fmtScheme name="Office">
+      <a:fillStyleLst>
+        <a:solidFill>
+          <a:schemeClr val="phClr"/>
+        </a:solidFill>
+        <a:gradFill rotWithShape="1">
+          <a:gsLst>
+            <a:gs pos="0">
+              <a:schemeClr val="phClr">
+                <a:lumMod val="110000"/>
+                <a:satMod val="105000"/>
+                <a:tint val="67000"/>
+              </a:schemeClr>
+            </a:gs>
+            <a:gs pos="50000">
+              <a:schemeClr val="phClr">
+                <a:lumMod val="105000"/>
+                <a:satMod val="103000"/>
+                <a:tint val="73000"/>
+              </a:schemeClr>
+            </a:gs>
+            <a:gs pos="100000">
+              <a:schemeClr val="phClr">
+                <a:lumMod val="105000"/>
+                <a:satMod val="109000"/>
+                <a:tint val="81000"/>
+              </a:schemeClr>
+            </a:gs>
+          </a:gsLst>
+          <a:lin ang="5400000" scaled="0"/>
+        </a:gradFill>
+        <a:gradFill rotWithShape="1">
+          <a:gsLst>
+            <a:gs pos="0">
+              <a:schemeClr val="phClr">
+                <a:satMod val="103000"/>
+                <a:lumMod val="102000"/>
+                <a:tint val="94000"/>
+              </a:schemeClr>
+            </a:gs>
+            <a:gs pos="50000">
+              <a:schemeClr val="phClr">
+                <a:satMod val="110000"/>
+                <a:lumMod val="100000"/>
+                <a:shade val="100000"/>
+              </a:schemeClr>
+            </a:gs>
+            <a:gs pos="100000">
+              <a:schemeClr val="phClr">
+                <a:lumMod val="99000"/>
+                <a:satMod val="120000"/>
+                <a:shade val="78000"/>
+              </a:schemeClr>
+            </a:gs>
+          </a:gsLst>
+          <a:lin ang="5400000" scaled="0"/>
+        </a:gradFill>
+      </a:fillStyleLst>
+      <a:lnStyleLst>
+        <a:ln w="6350" cap="flat" cmpd="sng" algn="ctr">
+          <a:solidFill>
+            <a:schemeClr val="phClr"/>
+          </a:solidFill>
+          <a:prstDash val="solid"/>
+          <a:miter lim="800000"/>
+        </a:ln>
+        <a:ln w="12700" cap="flat" cmpd="sng" algn="ctr">
+          <a:solidFill>
+            <a:schemeClr val="phClr"/>
+          </a:solidFill>
+          <a:prstDash val="solid"/>
+          <a:miter lim="800000"/>
+        </a:ln>
+        <a:ln w="19050" cap="flat" cmpd="sng" algn="ctr">
+          <a:solidFill>
+            <a:schemeClr val="phClr"/>
+          </a:solidFill>
+          <a:prstDash val="solid"/>
+          <a:miter lim="800000"/>
+        </a:ln>
+      </a:lnStyleLst>
+      <a:effectStyleLst>
+        <a:effectStyle>
+          <a:effectLst/>
+        </a:effectStyle>
+        <a:effectStyle>
+          <a:effectLst/>
+        </a:effectStyle>
+        <a:effectStyle>
+          <a:effectLst>
+            <a:outerShdw blurRad="57150" dist="19050" dir="5400000" algn="ctr" rotWithShape="0">
+              <a:srgbClr val="000000">
+                <a:alpha val="63000"/>
+              </a:srgbClr>
+            </a:outerShdw>
+          </a:effectLst>
+        </a:effectStyle>
+      </a:effectStyleLst>
+      <a:bgFillStyleLst>
+        <a:solidFill>
+          <a:schemeClr val="phClr"/>
+        </a:solidFill>
+        <a:solidFill>
+          <a:schemeClr val="phClr">
+            <a:tint val="95000"/>
+            <a:satMod val="170000"/>
+          </a:schemeClr>
+        </a:solidFill>
+        <a:gradFill rotWithShape="1">
+          <a:gsLst>
+            <a:gs pos="0">
+              <a:schemeClr val="phClr">
+                <a:tint val="93000"/>
+                <a:satMod val="150000"/>
+                <a:shade val="98000"/>
+                <a:lumMod val="102000"/>
+              </a:schemeClr>
+            </a:gs>
+            <a:gs pos="50000">
+              <a:schemeClr val="phClr">
+                <a:tint val="98000"/>
+                <a:satMod val="130000"/>
+                <a:shade val="90000"/>
+                <a:lumMod val="103000"/>
+              </a:schemeClr>
+            </a:gs>
+            <a:gs pos="100000">
+              <a:schemeClr val="phClr">
+                <a:shade val="63000"/>
+                <a:satMod val="120000"/>
+              </a:schemeClr>
+            </a:gs>
+          </a:gsLst>
+          <a:lin ang="5400000" scaled="0"/>
+        </a:gradFill>
+      </a:bgFillStyleLst>
+    </a:fmtScheme>
+  </a:themeElements>
+  <a:objectDefaults/>
+  <a:extraClrSchemeLst/>
+  <a:extLst>
+    <a:ext uri="{05A4C25C-085E-4340-85A3-A5531E510DB2}">
+      <thm15:themeFamily xmlns:thm15="http://schemas.microsoft.com/office/thememl/2012/main" name="Office Theme" id="{62F939B6-93AF-4DB8-9C6B-D6C7DFDC589F}" vid="{4A3C46E8-61CC-4603-A589-7422A47A8E4A}"/>
+    </a:ext>
+  </a:extLst>
+</a:theme>
 </file>
</xml_diff>

<commit_message>
Built more designs and finished out home page HTML
</commit_message>
<xml_diff>
--- a/Website Design Tools.pptx
+++ b/Website Design Tools.pptx
@@ -5,11 +5,13 @@
     <p:sldMasterId id="2147483672" r:id="rId1"/>
   </p:sldMasterIdLst>
   <p:notesMasterIdLst>
-    <p:notesMasterId r:id="rId4"/>
+    <p:notesMasterId r:id="rId6"/>
   </p:notesMasterIdLst>
   <p:sldIdLst>
     <p:sldId id="257" r:id="rId2"/>
     <p:sldId id="258" r:id="rId3"/>
+    <p:sldId id="259" r:id="rId4"/>
+    <p:sldId id="260" r:id="rId5"/>
   </p:sldIdLst>
   <p:sldSz cx="6858000" cy="10799763"/>
   <p:notesSz cx="6858000" cy="9144000"/>
@@ -119,6 +121,8 @@
         <p14:section name="Page Designs" id="{1543D77E-2646-47C1-932D-F940423AE1B4}">
           <p14:sldIdLst>
             <p14:sldId id="258"/>
+            <p14:sldId id="259"/>
+            <p14:sldId id="260"/>
           </p14:sldIdLst>
         </p14:section>
       </p14:sectionLst>
@@ -5461,7 +5465,7 @@
           <a:p>
             <a:fld id="{12F15D9C-A007-4C82-A807-6D2013854DF5}" type="datetimeFigureOut">
               <a:rPr lang="en-GB" smtClean="0"/>
-              <a:t>14/02/2022</a:t>
+              <a:t>24/02/2022</a:t>
             </a:fld>
             <a:endParaRPr lang="en-GB"/>
           </a:p>
@@ -5961,7 +5965,7 @@
           <a:p>
             <a:fld id="{1C4F9540-4BF6-456B-983F-E69BCBCF3DC2}" type="datetimeFigureOut">
               <a:rPr lang="en-GB" smtClean="0"/>
-              <a:t>13/02/2022</a:t>
+              <a:t>24/02/2022</a:t>
             </a:fld>
             <a:endParaRPr lang="en-GB"/>
           </a:p>
@@ -6131,7 +6135,7 @@
           <a:p>
             <a:fld id="{1C4F9540-4BF6-456B-983F-E69BCBCF3DC2}" type="datetimeFigureOut">
               <a:rPr lang="en-GB" smtClean="0"/>
-              <a:t>13/02/2022</a:t>
+              <a:t>24/02/2022</a:t>
             </a:fld>
             <a:endParaRPr lang="en-GB"/>
           </a:p>
@@ -6311,7 +6315,7 @@
           <a:p>
             <a:fld id="{1C4F9540-4BF6-456B-983F-E69BCBCF3DC2}" type="datetimeFigureOut">
               <a:rPr lang="en-GB" smtClean="0"/>
-              <a:t>13/02/2022</a:t>
+              <a:t>24/02/2022</a:t>
             </a:fld>
             <a:endParaRPr lang="en-GB"/>
           </a:p>
@@ -6481,7 +6485,7 @@
           <a:p>
             <a:fld id="{1C4F9540-4BF6-456B-983F-E69BCBCF3DC2}" type="datetimeFigureOut">
               <a:rPr lang="en-GB" smtClean="0"/>
-              <a:t>13/02/2022</a:t>
+              <a:t>24/02/2022</a:t>
             </a:fld>
             <a:endParaRPr lang="en-GB"/>
           </a:p>
@@ -6725,7 +6729,7 @@
           <a:p>
             <a:fld id="{1C4F9540-4BF6-456B-983F-E69BCBCF3DC2}" type="datetimeFigureOut">
               <a:rPr lang="en-GB" smtClean="0"/>
-              <a:t>13/02/2022</a:t>
+              <a:t>24/02/2022</a:t>
             </a:fld>
             <a:endParaRPr lang="en-GB"/>
           </a:p>
@@ -6957,7 +6961,7 @@
           <a:p>
             <a:fld id="{1C4F9540-4BF6-456B-983F-E69BCBCF3DC2}" type="datetimeFigureOut">
               <a:rPr lang="en-GB" smtClean="0"/>
-              <a:t>13/02/2022</a:t>
+              <a:t>24/02/2022</a:t>
             </a:fld>
             <a:endParaRPr lang="en-GB"/>
           </a:p>
@@ -7324,7 +7328,7 @@
           <a:p>
             <a:fld id="{1C4F9540-4BF6-456B-983F-E69BCBCF3DC2}" type="datetimeFigureOut">
               <a:rPr lang="en-GB" smtClean="0"/>
-              <a:t>13/02/2022</a:t>
+              <a:t>24/02/2022</a:t>
             </a:fld>
             <a:endParaRPr lang="en-GB"/>
           </a:p>
@@ -7442,7 +7446,7 @@
           <a:p>
             <a:fld id="{1C4F9540-4BF6-456B-983F-E69BCBCF3DC2}" type="datetimeFigureOut">
               <a:rPr lang="en-GB" smtClean="0"/>
-              <a:t>13/02/2022</a:t>
+              <a:t>24/02/2022</a:t>
             </a:fld>
             <a:endParaRPr lang="en-GB"/>
           </a:p>
@@ -7537,7 +7541,7 @@
           <a:p>
             <a:fld id="{1C4F9540-4BF6-456B-983F-E69BCBCF3DC2}" type="datetimeFigureOut">
               <a:rPr lang="en-GB" smtClean="0"/>
-              <a:t>13/02/2022</a:t>
+              <a:t>24/02/2022</a:t>
             </a:fld>
             <a:endParaRPr lang="en-GB"/>
           </a:p>
@@ -7814,7 +7818,7 @@
           <a:p>
             <a:fld id="{1C4F9540-4BF6-456B-983F-E69BCBCF3DC2}" type="datetimeFigureOut">
               <a:rPr lang="en-GB" smtClean="0"/>
-              <a:t>13/02/2022</a:t>
+              <a:t>24/02/2022</a:t>
             </a:fld>
             <a:endParaRPr lang="en-GB"/>
           </a:p>
@@ -8071,7 +8075,7 @@
           <a:p>
             <a:fld id="{1C4F9540-4BF6-456B-983F-E69BCBCF3DC2}" type="datetimeFigureOut">
               <a:rPr lang="en-GB" smtClean="0"/>
-              <a:t>13/02/2022</a:t>
+              <a:t>24/02/2022</a:t>
             </a:fld>
             <a:endParaRPr lang="en-GB"/>
           </a:p>
@@ -8284,7 +8288,7 @@
           <a:p>
             <a:fld id="{1C4F9540-4BF6-456B-983F-E69BCBCF3DC2}" type="datetimeFigureOut">
               <a:rPr lang="en-GB" smtClean="0"/>
-              <a:t>13/02/2022</a:t>
+              <a:t>24/02/2022</a:t>
             </a:fld>
             <a:endParaRPr lang="en-GB"/>
           </a:p>
@@ -11957,7 +11961,7 @@
             <a:pPr algn="ctr"/>
             <a:r>
               <a:rPr lang="en-GB" sz="1200" dirty="0"/>
-              <a:t>Our Staff</a:t>
+              <a:t>Meet Dr. Smith</a:t>
             </a:r>
           </a:p>
         </p:txBody>
@@ -12042,6 +12046,7 @@
           </a:bodyPr>
           <a:lstStyle/>
           <a:p>
+            <a:pPr algn="ctr"/>
             <a:r>
               <a:rPr lang="en-GB" sz="1200" dirty="0">
                 <a:solidFill>
@@ -12685,6 +12690,1108 @@
     <p:extLst>
       <p:ext uri="{BB962C8B-B14F-4D97-AF65-F5344CB8AC3E}">
         <p14:creationId xmlns:p14="http://schemas.microsoft.com/office/powerpoint/2010/main" val="797161422"/>
+      </p:ext>
+    </p:extLst>
+  </p:cSld>
+  <p:clrMapOvr>
+    <a:masterClrMapping/>
+  </p:clrMapOvr>
+</p:sld>
+</file>
+
+<file path=ppt/slides/slide3.xml><?xml version="1.0" encoding="utf-8"?>
+<p:sld xmlns:a="http://schemas.openxmlformats.org/drawingml/2006/main" xmlns:r="http://schemas.openxmlformats.org/officeDocument/2006/relationships" xmlns:p="http://schemas.openxmlformats.org/presentationml/2006/main">
+  <p:cSld>
+    <p:spTree>
+      <p:nvGrpSpPr>
+        <p:cNvPr id="1" name=""/>
+        <p:cNvGrpSpPr/>
+        <p:nvPr/>
+      </p:nvGrpSpPr>
+      <p:grpSpPr>
+        <a:xfrm>
+          <a:off x="0" y="0"/>
+          <a:ext cx="0" cy="0"/>
+          <a:chOff x="0" y="0"/>
+          <a:chExt cx="0" cy="0"/>
+        </a:xfrm>
+      </p:grpSpPr>
+      <p:pic>
+        <p:nvPicPr>
+          <p:cNvPr id="2" name="Picture 1">
+            <a:extLst>
+              <a:ext uri="{FF2B5EF4-FFF2-40B4-BE49-F238E27FC236}">
+                <a16:creationId xmlns:a16="http://schemas.microsoft.com/office/drawing/2014/main" id="{EF557F53-1F6E-4921-BAD9-6E9A891279F9}"/>
+              </a:ext>
+            </a:extLst>
+          </p:cNvPr>
+          <p:cNvPicPr>
+            <a:picLocks noChangeAspect="1"/>
+          </p:cNvPicPr>
+          <p:nvPr/>
+        </p:nvPicPr>
+        <p:blipFill>
+          <a:blip r:embed="rId2"/>
+          <a:stretch>
+            <a:fillRect/>
+          </a:stretch>
+        </p:blipFill>
+        <p:spPr>
+          <a:xfrm>
+            <a:off x="0" y="-2063"/>
+            <a:ext cx="6858000" cy="799794"/>
+          </a:xfrm>
+          <a:prstGeom prst="rect">
+            <a:avLst/>
+          </a:prstGeom>
+        </p:spPr>
+      </p:pic>
+      <p:sp>
+        <p:nvSpPr>
+          <p:cNvPr id="3" name="Rectangle 2">
+            <a:extLst>
+              <a:ext uri="{FF2B5EF4-FFF2-40B4-BE49-F238E27FC236}">
+                <a16:creationId xmlns:a16="http://schemas.microsoft.com/office/drawing/2014/main" id="{48A3FB12-27FD-4813-AA7C-EF40B3782734}"/>
+              </a:ext>
+            </a:extLst>
+          </p:cNvPr>
+          <p:cNvSpPr/>
+          <p:nvPr/>
+        </p:nvSpPr>
+        <p:spPr>
+          <a:xfrm>
+            <a:off x="0" y="9323816"/>
+            <a:ext cx="6858000" cy="1194865"/>
+          </a:xfrm>
+          <a:prstGeom prst="rect">
+            <a:avLst/>
+          </a:prstGeom>
+          <a:noFill/>
+          <a:ln w="12700">
+            <a:solidFill>
+              <a:schemeClr val="tx1"/>
+            </a:solidFill>
+          </a:ln>
+        </p:spPr>
+        <p:style>
+          <a:lnRef idx="2">
+            <a:schemeClr val="accent1">
+              <a:shade val="50000"/>
+            </a:schemeClr>
+          </a:lnRef>
+          <a:fillRef idx="1">
+            <a:schemeClr val="accent1"/>
+          </a:fillRef>
+          <a:effectRef idx="0">
+            <a:schemeClr val="accent1"/>
+          </a:effectRef>
+          <a:fontRef idx="minor">
+            <a:schemeClr val="lt1"/>
+          </a:fontRef>
+        </p:style>
+        <p:txBody>
+          <a:bodyPr rtlCol="0" anchor="ctr"/>
+          <a:lstStyle/>
+          <a:p>
+            <a:pPr algn="ctr"/>
+            <a:endParaRPr lang="en-GB"/>
+          </a:p>
+        </p:txBody>
+      </p:sp>
+      <p:sp>
+        <p:nvSpPr>
+          <p:cNvPr id="4" name="TextBox 3">
+            <a:extLst>
+              <a:ext uri="{FF2B5EF4-FFF2-40B4-BE49-F238E27FC236}">
+                <a16:creationId xmlns:a16="http://schemas.microsoft.com/office/drawing/2014/main" id="{2D0A103B-9055-4BEF-BF31-B905AD28490A}"/>
+              </a:ext>
+            </a:extLst>
+          </p:cNvPr>
+          <p:cNvSpPr txBox="1"/>
+          <p:nvPr/>
+        </p:nvSpPr>
+        <p:spPr>
+          <a:xfrm>
+            <a:off x="4809987" y="9981676"/>
+            <a:ext cx="1771639" cy="384721"/>
+          </a:xfrm>
+          <a:prstGeom prst="rect">
+            <a:avLst/>
+          </a:prstGeom>
+          <a:noFill/>
+        </p:spPr>
+        <p:txBody>
+          <a:bodyPr wrap="none" rtlCol="0">
+            <a:spAutoFit/>
+          </a:bodyPr>
+          <a:lstStyle/>
+          <a:p>
+            <a:r>
+              <a:rPr lang="en-GB" sz="1100" dirty="0"/>
+              <a:t>Advanced Obesity Surgery</a:t>
+            </a:r>
+          </a:p>
+          <a:p>
+            <a:pPr algn="r"/>
+            <a:r>
+              <a:rPr lang="en-GB" sz="800" dirty="0"/>
+              <a:t>©Copyright 2022. All Rights Reserved.</a:t>
+            </a:r>
+          </a:p>
+        </p:txBody>
+      </p:sp>
+      <p:sp>
+        <p:nvSpPr>
+          <p:cNvPr id="5" name="TextBox 4">
+            <a:extLst>
+              <a:ext uri="{FF2B5EF4-FFF2-40B4-BE49-F238E27FC236}">
+                <a16:creationId xmlns:a16="http://schemas.microsoft.com/office/drawing/2014/main" id="{D1104D6F-5C43-4A97-9D07-AA45C9EB5809}"/>
+              </a:ext>
+            </a:extLst>
+          </p:cNvPr>
+          <p:cNvSpPr txBox="1"/>
+          <p:nvPr/>
+        </p:nvSpPr>
+        <p:spPr>
+          <a:xfrm>
+            <a:off x="3761623" y="9468381"/>
+            <a:ext cx="2820003" cy="261610"/>
+          </a:xfrm>
+          <a:prstGeom prst="rect">
+            <a:avLst/>
+          </a:prstGeom>
+          <a:noFill/>
+        </p:spPr>
+        <p:txBody>
+          <a:bodyPr wrap="none" rtlCol="0">
+            <a:spAutoFit/>
+          </a:bodyPr>
+          <a:lstStyle/>
+          <a:p>
+            <a:r>
+              <a:rPr lang="en-GB" sz="1100" dirty="0"/>
+              <a:t>Blog        FAQ        Contact us        Privacy Policy</a:t>
+            </a:r>
+          </a:p>
+        </p:txBody>
+      </p:sp>
+      <p:pic>
+        <p:nvPicPr>
+          <p:cNvPr id="6" name="Picture 2" descr="Center for Metabolic and Obesity Surgery">
+            <a:extLst>
+              <a:ext uri="{FF2B5EF4-FFF2-40B4-BE49-F238E27FC236}">
+                <a16:creationId xmlns:a16="http://schemas.microsoft.com/office/drawing/2014/main" id="{BC9DC308-DFF9-43F3-98CC-B5D83700AA36}"/>
+              </a:ext>
+            </a:extLst>
+          </p:cNvPr>
+          <p:cNvPicPr>
+            <a:picLocks noChangeAspect="1" noChangeArrowheads="1"/>
+          </p:cNvPicPr>
+          <p:nvPr/>
+        </p:nvPicPr>
+        <p:blipFill>
+          <a:blip r:embed="rId3">
+            <a:extLst>
+              <a:ext uri="{BEBA8EAE-BF5A-486C-A8C5-ECC9F3942E4B}">
+                <a14:imgProps xmlns:a14="http://schemas.microsoft.com/office/drawing/2010/main">
+                  <a14:imgLayer r:embed="rId4">
+                    <a14:imgEffect>
+                      <a14:backgroundRemoval t="8163" b="89796" l="4219" r="95000">
+                        <a14:foregroundMark x1="7969" y1="48163" x2="7969" y2="48163"/>
+                        <a14:foregroundMark x1="4219" y1="62857" x2="4219" y2="62857"/>
+                        <a14:foregroundMark x1="14844" y1="48571" x2="14844" y2="48571"/>
+                        <a14:foregroundMark x1="23594" y1="54286" x2="23594" y2="54286"/>
+                        <a14:foregroundMark x1="30938" y1="54694" x2="30938" y2="54694"/>
+                        <a14:foregroundMark x1="38594" y1="53061" x2="38594" y2="53061"/>
+                        <a14:foregroundMark x1="47031" y1="50612" x2="47031" y2="50612"/>
+                        <a14:foregroundMark x1="64531" y1="50612" x2="64531" y2="50612"/>
+                        <a14:foregroundMark x1="72656" y1="53469" x2="72656" y2="53469"/>
+                        <a14:foregroundMark x1="81094" y1="53061" x2="81094" y2="53061"/>
+                        <a14:foregroundMark x1="85156" y1="54286" x2="85156" y2="54286"/>
+                        <a14:foregroundMark x1="90469" y1="51429" x2="90469" y2="51429"/>
+                        <a14:foregroundMark x1="95000" y1="59184" x2="95000" y2="59184"/>
+                        <a14:foregroundMark x1="68281" y1="30204" x2="68281" y2="30204"/>
+                        <a14:foregroundMark x1="73125" y1="28980" x2="73125" y2="28980"/>
+                        <a14:foregroundMark x1="73125" y1="8163" x2="73125" y2="8163"/>
+                        <a14:foregroundMark x1="67500" y1="13061" x2="67500" y2="13061"/>
+                        <a14:foregroundMark x1="72031" y1="17143" x2="72031" y2="17143"/>
+                        <a14:foregroundMark x1="68438" y1="22041" x2="68438" y2="22041"/>
+                        <a14:foregroundMark x1="69688" y1="17143" x2="69688" y2="17143"/>
+                        <a14:foregroundMark x1="57031" y1="83265" x2="57031" y2="83265"/>
+                        <a14:foregroundMark x1="62187" y1="83673" x2="62187" y2="83673"/>
+                        <a14:foregroundMark x1="66250" y1="79184" x2="66250" y2="79184"/>
+                        <a14:foregroundMark x1="68281" y1="82857" x2="68281" y2="82857"/>
+                        <a14:foregroundMark x1="72969" y1="82041" x2="72969" y2="82041"/>
+                        <a14:foregroundMark x1="77188" y1="84898" x2="77188" y2="84898"/>
+                        <a14:foregroundMark x1="76719" y1="82857" x2="76719" y2="82857"/>
+                        <a14:foregroundMark x1="79219" y1="82857" x2="79219" y2="82857"/>
+                        <a14:foregroundMark x1="84375" y1="81224" x2="84375" y2="81224"/>
+                        <a14:foregroundMark x1="86094" y1="82041" x2="86094" y2="82041"/>
+                        <a14:foregroundMark x1="86094" y1="77143" x2="86094" y2="77143"/>
+                        <a14:foregroundMark x1="87969" y1="83673" x2="87969" y2="83673"/>
+                        <a14:foregroundMark x1="92656" y1="82041" x2="92656" y2="82041"/>
+                        <a14:foregroundMark x1="72813" y1="23673" x2="72813" y2="23673"/>
+                        <a14:foregroundMark x1="71563" y1="20816" x2="71563" y2="20816"/>
+                        <a14:foregroundMark x1="5938" y1="55510" x2="5938" y2="55510"/>
+                        <a14:backgroundMark x1="7969" y1="46531" x2="7969" y2="46531"/>
+                        <a14:backgroundMark x1="32656" y1="51837" x2="32656" y2="51837"/>
+                        <a14:backgroundMark x1="63281" y1="83265" x2="63281" y2="83265"/>
+                        <a14:backgroundMark x1="69375" y1="82857" x2="69375" y2="82857"/>
+                        <a14:backgroundMark x1="73281" y1="84898" x2="73281" y2="84898"/>
+                        <a14:backgroundMark x1="80938" y1="83673" x2="80938" y2="83673"/>
+                        <a14:backgroundMark x1="89375" y1="84898" x2="89375" y2="84898"/>
+                        <a14:backgroundMark x1="69688" y1="22041" x2="69688" y2="22041"/>
+                        <a14:backgroundMark x1="72500" y1="20816" x2="72500" y2="20816"/>
+                        <a14:backgroundMark x1="8125" y1="48163" x2="8125" y2="48163"/>
+                        <a14:backgroundMark x1="7969" y1="48163" x2="7969" y2="48163"/>
+                        <a14:backgroundMark x1="6406" y1="55510" x2="6406" y2="55510"/>
+                        <a14:backgroundMark x1="77344" y1="85714" x2="77344" y2="85714"/>
+                        <a14:backgroundMark x1="73125" y1="82857" x2="73125" y2="82857"/>
+                        <a14:backgroundMark x1="77500" y1="84898" x2="77500" y2="84898"/>
+                      </a14:backgroundRemoval>
+                    </a14:imgEffect>
+                  </a14:imgLayer>
+                </a14:imgProps>
+              </a:ext>
+              <a:ext uri="{28A0092B-C50C-407E-A947-70E740481C1C}">
+                <a14:useLocalDpi xmlns:a14="http://schemas.microsoft.com/office/drawing/2010/main" val="0"/>
+              </a:ext>
+            </a:extLst>
+          </a:blip>
+          <a:srcRect/>
+          <a:stretch>
+            <a:fillRect/>
+          </a:stretch>
+        </p:blipFill>
+        <p:spPr bwMode="auto">
+          <a:xfrm>
+            <a:off x="276376" y="9471521"/>
+            <a:ext cx="1158153" cy="443355"/>
+          </a:xfrm>
+          <a:prstGeom prst="rect">
+            <a:avLst/>
+          </a:prstGeom>
+          <a:noFill/>
+          <a:ln>
+            <a:noFill/>
+          </a:ln>
+          <a:extLst>
+            <a:ext uri="{909E8E84-426E-40DD-AFC4-6F175D3DCCD1}">
+              <a14:hiddenFill xmlns:a14="http://schemas.microsoft.com/office/drawing/2010/main">
+                <a:solidFill>
+                  <a:srgbClr val="FFFFFF"/>
+                </a:solidFill>
+              </a14:hiddenFill>
+            </a:ext>
+          </a:extLst>
+        </p:spPr>
+      </p:pic>
+      <p:sp>
+        <p:nvSpPr>
+          <p:cNvPr id="7" name="TextBox 6">
+            <a:extLst>
+              <a:ext uri="{FF2B5EF4-FFF2-40B4-BE49-F238E27FC236}">
+                <a16:creationId xmlns:a16="http://schemas.microsoft.com/office/drawing/2014/main" id="{7301EA2A-7BEA-4632-8ED7-BDA10E28D245}"/>
+              </a:ext>
+            </a:extLst>
+          </p:cNvPr>
+          <p:cNvSpPr txBox="1"/>
+          <p:nvPr/>
+        </p:nvSpPr>
+        <p:spPr>
+          <a:xfrm>
+            <a:off x="208205" y="9904732"/>
+            <a:ext cx="2219850" cy="461665"/>
+          </a:xfrm>
+          <a:prstGeom prst="rect">
+            <a:avLst/>
+          </a:prstGeom>
+          <a:noFill/>
+        </p:spPr>
+        <p:txBody>
+          <a:bodyPr wrap="square">
+            <a:spAutoFit/>
+          </a:bodyPr>
+          <a:lstStyle/>
+          <a:p>
+            <a:r>
+              <a:rPr lang="en-GB" sz="800" dirty="0"/>
+              <a:t>407-303-3820</a:t>
+            </a:r>
+          </a:p>
+          <a:p>
+            <a:r>
+              <a:rPr lang="en-GB" sz="800" dirty="0"/>
+              <a:t>410 Celebration Place, Suite 401</a:t>
+            </a:r>
+          </a:p>
+          <a:p>
+            <a:r>
+              <a:rPr lang="en-GB" sz="800" dirty="0"/>
+              <a:t>Celebration, FL 34747</a:t>
+            </a:r>
+          </a:p>
+        </p:txBody>
+      </p:sp>
+      <p:sp>
+        <p:nvSpPr>
+          <p:cNvPr id="8" name="Rectangle 7">
+            <a:extLst>
+              <a:ext uri="{FF2B5EF4-FFF2-40B4-BE49-F238E27FC236}">
+                <a16:creationId xmlns:a16="http://schemas.microsoft.com/office/drawing/2014/main" id="{289490A7-055A-4A87-8B1B-495B8ACBBA9C}"/>
+              </a:ext>
+            </a:extLst>
+          </p:cNvPr>
+          <p:cNvSpPr/>
+          <p:nvPr/>
+        </p:nvSpPr>
+        <p:spPr>
+          <a:xfrm>
+            <a:off x="0" y="797731"/>
+            <a:ext cx="6858000" cy="1488269"/>
+          </a:xfrm>
+          <a:prstGeom prst="rect">
+            <a:avLst/>
+          </a:prstGeom>
+          <a:solidFill>
+            <a:schemeClr val="bg2">
+              <a:lumMod val="90000"/>
+            </a:schemeClr>
+          </a:solidFill>
+          <a:ln>
+            <a:noFill/>
+          </a:ln>
+        </p:spPr>
+        <p:style>
+          <a:lnRef idx="2">
+            <a:schemeClr val="accent1">
+              <a:shade val="50000"/>
+            </a:schemeClr>
+          </a:lnRef>
+          <a:fillRef idx="1">
+            <a:schemeClr val="accent1"/>
+          </a:fillRef>
+          <a:effectRef idx="0">
+            <a:schemeClr val="accent1"/>
+          </a:effectRef>
+          <a:fontRef idx="minor">
+            <a:schemeClr val="lt1"/>
+          </a:fontRef>
+        </p:style>
+        <p:txBody>
+          <a:bodyPr rtlCol="0" anchor="ctr"/>
+          <a:lstStyle/>
+          <a:p>
+            <a:pPr algn="ctr"/>
+            <a:endParaRPr lang="en-GB" dirty="0"/>
+          </a:p>
+        </p:txBody>
+      </p:sp>
+      <p:sp>
+        <p:nvSpPr>
+          <p:cNvPr id="9" name="TextBox 8">
+            <a:extLst>
+              <a:ext uri="{FF2B5EF4-FFF2-40B4-BE49-F238E27FC236}">
+                <a16:creationId xmlns:a16="http://schemas.microsoft.com/office/drawing/2014/main" id="{C7D3372C-5532-4B65-9D93-821178721EC3}"/>
+              </a:ext>
+            </a:extLst>
+          </p:cNvPr>
+          <p:cNvSpPr txBox="1"/>
+          <p:nvPr/>
+        </p:nvSpPr>
+        <p:spPr>
+          <a:xfrm>
+            <a:off x="3170375" y="1087875"/>
+            <a:ext cx="3320333" cy="830997"/>
+          </a:xfrm>
+          <a:prstGeom prst="rect">
+            <a:avLst/>
+          </a:prstGeom>
+          <a:noFill/>
+        </p:spPr>
+        <p:txBody>
+          <a:bodyPr wrap="none" rtlCol="0">
+            <a:spAutoFit/>
+          </a:bodyPr>
+          <a:lstStyle/>
+          <a:p>
+            <a:pPr algn="r"/>
+            <a:r>
+              <a:rPr lang="en-GB" sz="2400" dirty="0"/>
+              <a:t>Meet Dr. Dennis Smith</a:t>
+            </a:r>
+          </a:p>
+          <a:p>
+            <a:pPr algn="r"/>
+            <a:r>
+              <a:rPr lang="en-GB" sz="2400" dirty="0"/>
+              <a:t>&lt;role, qualifications, etc&gt;</a:t>
+            </a:r>
+          </a:p>
+        </p:txBody>
+      </p:sp>
+      <p:sp>
+        <p:nvSpPr>
+          <p:cNvPr id="17" name="TextBox 16">
+            <a:extLst>
+              <a:ext uri="{FF2B5EF4-FFF2-40B4-BE49-F238E27FC236}">
+                <a16:creationId xmlns:a16="http://schemas.microsoft.com/office/drawing/2014/main" id="{AB6BA657-4CD3-4563-8787-8C01B6DBB89D}"/>
+              </a:ext>
+            </a:extLst>
+          </p:cNvPr>
+          <p:cNvSpPr txBox="1"/>
+          <p:nvPr/>
+        </p:nvSpPr>
+        <p:spPr>
+          <a:xfrm>
+            <a:off x="276376" y="2664551"/>
+            <a:ext cx="4183197" cy="6124754"/>
+          </a:xfrm>
+          <a:prstGeom prst="rect">
+            <a:avLst/>
+          </a:prstGeom>
+          <a:noFill/>
+        </p:spPr>
+        <p:txBody>
+          <a:bodyPr wrap="square" rtlCol="0">
+            <a:spAutoFit/>
+          </a:bodyPr>
+          <a:lstStyle/>
+          <a:p>
+            <a:pPr algn="l"/>
+            <a:r>
+              <a:rPr lang="en-GB" sz="1600" b="1" dirty="0">
+                <a:solidFill>
+                  <a:srgbClr val="000000"/>
+                </a:solidFill>
+                <a:latin typeface="Georgia" panose="02040502050405020303" pitchFamily="18" charset="0"/>
+              </a:rPr>
+              <a:t>Background</a:t>
+            </a:r>
+            <a:endParaRPr lang="en-GB" sz="1200" b="1" dirty="0">
+              <a:solidFill>
+                <a:srgbClr val="000000"/>
+              </a:solidFill>
+              <a:latin typeface="Georgia" panose="02040502050405020303" pitchFamily="18" charset="0"/>
+            </a:endParaRPr>
+          </a:p>
+          <a:p>
+            <a:pPr algn="l"/>
+            <a:endParaRPr lang="en-GB" sz="1200" dirty="0">
+              <a:solidFill>
+                <a:srgbClr val="000000"/>
+              </a:solidFill>
+              <a:latin typeface="Georgia" panose="02040502050405020303" pitchFamily="18" charset="0"/>
+            </a:endParaRPr>
+          </a:p>
+          <a:p>
+            <a:pPr algn="l"/>
+            <a:r>
+              <a:rPr lang="en-GB" sz="1200" b="0" i="0" dirty="0">
+                <a:solidFill>
+                  <a:srgbClr val="000000"/>
+                </a:solidFill>
+                <a:effectLst/>
+                <a:latin typeface="Georgia" panose="02040502050405020303" pitchFamily="18" charset="0"/>
+              </a:rPr>
+              <a:t>Dr. Dennis C. Smith has been doing bariatric surgery since 1997, when he practiced in Biloxi, MS. In 1999 he began developing a technique for the biliopancreatic diversion with Duodenal Switch to be done completely laparoscopically, which he first performed in November, 1999. He moved from Biloxi to Marietta, Georgia in late 1999. </a:t>
+            </a:r>
+          </a:p>
+          <a:p>
+            <a:pPr algn="l"/>
+            <a:endParaRPr lang="en-GB" sz="1200" dirty="0">
+              <a:solidFill>
+                <a:srgbClr val="000000"/>
+              </a:solidFill>
+              <a:latin typeface="Georgia" panose="02040502050405020303" pitchFamily="18" charset="0"/>
+            </a:endParaRPr>
+          </a:p>
+          <a:p>
+            <a:pPr algn="l"/>
+            <a:r>
+              <a:rPr lang="en-GB" sz="1200" b="0" i="0" dirty="0">
+                <a:solidFill>
+                  <a:srgbClr val="000000"/>
+                </a:solidFill>
+                <a:effectLst/>
+                <a:latin typeface="Georgia" panose="02040502050405020303" pitchFamily="18" charset="0"/>
+              </a:rPr>
+              <a:t>Having put together the elements of a bariatric surgery program with the highest possible standards, Dr. Smith in June, 2002 formed his own practice devoted exclusively to bariatric surgery, in order to better serve the morbidly obese population.</a:t>
+            </a:r>
+          </a:p>
+          <a:p>
+            <a:pPr algn="l"/>
+            <a:endParaRPr lang="en-GB" sz="1200" b="0" i="0" dirty="0">
+              <a:solidFill>
+                <a:srgbClr val="000000"/>
+              </a:solidFill>
+              <a:effectLst/>
+              <a:latin typeface="Georgia" panose="02040502050405020303" pitchFamily="18" charset="0"/>
+            </a:endParaRPr>
+          </a:p>
+          <a:p>
+            <a:pPr algn="l"/>
+            <a:endParaRPr lang="en-GB" sz="1200" dirty="0">
+              <a:solidFill>
+                <a:srgbClr val="000000"/>
+              </a:solidFill>
+              <a:latin typeface="Georgia" panose="02040502050405020303" pitchFamily="18" charset="0"/>
+            </a:endParaRPr>
+          </a:p>
+          <a:p>
+            <a:pPr algn="l"/>
+            <a:r>
+              <a:rPr lang="en-GB" sz="1600" b="1" i="0" dirty="0">
+                <a:solidFill>
+                  <a:srgbClr val="000000"/>
+                </a:solidFill>
+                <a:effectLst/>
+                <a:latin typeface="Georgia" panose="02040502050405020303" pitchFamily="18" charset="0"/>
+              </a:rPr>
+              <a:t>Current Work</a:t>
+            </a:r>
+          </a:p>
+          <a:p>
+            <a:pPr algn="l"/>
+            <a:endParaRPr lang="en-GB" sz="1200" dirty="0">
+              <a:solidFill>
+                <a:srgbClr val="000000"/>
+              </a:solidFill>
+              <a:latin typeface="Georgia" panose="02040502050405020303" pitchFamily="18" charset="0"/>
+            </a:endParaRPr>
+          </a:p>
+          <a:p>
+            <a:pPr algn="l"/>
+            <a:r>
+              <a:rPr lang="en-GB" sz="1200" i="0" dirty="0">
+                <a:solidFill>
+                  <a:srgbClr val="000000"/>
+                </a:solidFill>
+                <a:effectLst/>
+                <a:latin typeface="Georgia" panose="02040502050405020303" pitchFamily="18" charset="0"/>
+              </a:rPr>
+              <a:t>In early 2015 Dr. Smith moved to the Celebration Bariatric Surgery Program in Celebration, FL and he is now the Medical Director of the Program.</a:t>
+            </a:r>
+          </a:p>
+          <a:p>
+            <a:pPr algn="l"/>
+            <a:endParaRPr lang="en-GB" sz="1200" i="0" dirty="0">
+              <a:solidFill>
+                <a:srgbClr val="000000"/>
+              </a:solidFill>
+              <a:effectLst/>
+              <a:latin typeface="Georgia" panose="02040502050405020303" pitchFamily="18" charset="0"/>
+            </a:endParaRPr>
+          </a:p>
+          <a:p>
+            <a:pPr algn="l"/>
+            <a:r>
+              <a:rPr lang="en-GB" sz="1200" i="0" dirty="0">
+                <a:solidFill>
+                  <a:srgbClr val="000000"/>
+                </a:solidFill>
+                <a:effectLst/>
+                <a:latin typeface="Georgia" panose="02040502050405020303" pitchFamily="18" charset="0"/>
+              </a:rPr>
+              <a:t>Dr. Smith is one of only a handful of bariatric surgeons that regularly performs all four of these operations completely laparoscopically. He has done well over two thousand bariatric operations, with excellent short and long-term results.</a:t>
+            </a:r>
+          </a:p>
+          <a:p>
+            <a:pPr algn="l"/>
+            <a:endParaRPr lang="en-GB" sz="1200" dirty="0">
+              <a:solidFill>
+                <a:srgbClr val="000000"/>
+              </a:solidFill>
+              <a:latin typeface="Georgia" panose="02040502050405020303" pitchFamily="18" charset="0"/>
+            </a:endParaRPr>
+          </a:p>
+          <a:p>
+            <a:pPr algn="l"/>
+            <a:r>
+              <a:rPr lang="en-GB" sz="1200" i="0" dirty="0">
+                <a:solidFill>
+                  <a:srgbClr val="000000"/>
+                </a:solidFill>
+                <a:effectLst/>
+                <a:latin typeface="Georgia" panose="02040502050405020303" pitchFamily="18" charset="0"/>
+              </a:rPr>
+              <a:t>Continue about the development into using the robot, any extra studies or projects being worked on that are related, etc.</a:t>
+            </a:r>
+            <a:endParaRPr lang="en-GB" sz="1100" i="0" dirty="0">
+              <a:solidFill>
+                <a:srgbClr val="000000"/>
+              </a:solidFill>
+              <a:effectLst/>
+              <a:latin typeface="Georgia" panose="02040502050405020303" pitchFamily="18" charset="0"/>
+            </a:endParaRPr>
+          </a:p>
+        </p:txBody>
+      </p:sp>
+      <p:sp>
+        <p:nvSpPr>
+          <p:cNvPr id="19" name="Rectangle 18">
+            <a:extLst>
+              <a:ext uri="{FF2B5EF4-FFF2-40B4-BE49-F238E27FC236}">
+                <a16:creationId xmlns:a16="http://schemas.microsoft.com/office/drawing/2014/main" id="{0EB652DB-2148-4752-8B0A-97307B364E7F}"/>
+              </a:ext>
+            </a:extLst>
+          </p:cNvPr>
+          <p:cNvSpPr/>
+          <p:nvPr/>
+        </p:nvSpPr>
+        <p:spPr>
+          <a:xfrm>
+            <a:off x="4745328" y="2664551"/>
+            <a:ext cx="1836295" cy="2117311"/>
+          </a:xfrm>
+          <a:prstGeom prst="rect">
+            <a:avLst/>
+          </a:prstGeom>
+          <a:solidFill>
+            <a:schemeClr val="accent2">
+              <a:lumMod val="75000"/>
+            </a:schemeClr>
+          </a:solidFill>
+          <a:ln>
+            <a:noFill/>
+          </a:ln>
+        </p:spPr>
+        <p:style>
+          <a:lnRef idx="2">
+            <a:schemeClr val="accent1">
+              <a:shade val="50000"/>
+            </a:schemeClr>
+          </a:lnRef>
+          <a:fillRef idx="1">
+            <a:schemeClr val="accent1"/>
+          </a:fillRef>
+          <a:effectRef idx="0">
+            <a:schemeClr val="accent1"/>
+          </a:effectRef>
+          <a:fontRef idx="minor">
+            <a:schemeClr val="lt1"/>
+          </a:fontRef>
+        </p:style>
+        <p:txBody>
+          <a:bodyPr rtlCol="0" anchor="ctr"/>
+          <a:lstStyle/>
+          <a:p>
+            <a:pPr algn="ctr"/>
+            <a:r>
+              <a:rPr lang="en-GB" dirty="0"/>
+              <a:t>Image</a:t>
+            </a:r>
+          </a:p>
+        </p:txBody>
+      </p:sp>
+      <p:sp>
+        <p:nvSpPr>
+          <p:cNvPr id="20" name="Rectangle 19">
+            <a:extLst>
+              <a:ext uri="{FF2B5EF4-FFF2-40B4-BE49-F238E27FC236}">
+                <a16:creationId xmlns:a16="http://schemas.microsoft.com/office/drawing/2014/main" id="{0E6033F6-332D-472E-828B-2343EE8CFE6F}"/>
+              </a:ext>
+            </a:extLst>
+          </p:cNvPr>
+          <p:cNvSpPr/>
+          <p:nvPr/>
+        </p:nvSpPr>
+        <p:spPr>
+          <a:xfrm>
+            <a:off x="4745327" y="5865669"/>
+            <a:ext cx="1836295" cy="2117311"/>
+          </a:xfrm>
+          <a:prstGeom prst="rect">
+            <a:avLst/>
+          </a:prstGeom>
+          <a:solidFill>
+            <a:schemeClr val="accent2">
+              <a:lumMod val="75000"/>
+            </a:schemeClr>
+          </a:solidFill>
+          <a:ln>
+            <a:noFill/>
+          </a:ln>
+        </p:spPr>
+        <p:style>
+          <a:lnRef idx="2">
+            <a:schemeClr val="accent1">
+              <a:shade val="50000"/>
+            </a:schemeClr>
+          </a:lnRef>
+          <a:fillRef idx="1">
+            <a:schemeClr val="accent1"/>
+          </a:fillRef>
+          <a:effectRef idx="0">
+            <a:schemeClr val="accent1"/>
+          </a:effectRef>
+          <a:fontRef idx="minor">
+            <a:schemeClr val="lt1"/>
+          </a:fontRef>
+        </p:style>
+        <p:txBody>
+          <a:bodyPr rtlCol="0" anchor="ctr"/>
+          <a:lstStyle/>
+          <a:p>
+            <a:pPr algn="ctr"/>
+            <a:r>
+              <a:rPr lang="en-GB" dirty="0"/>
+              <a:t>Image</a:t>
+            </a:r>
+          </a:p>
+        </p:txBody>
+      </p:sp>
+    </p:spTree>
+    <p:extLst>
+      <p:ext uri="{BB962C8B-B14F-4D97-AF65-F5344CB8AC3E}">
+        <p14:creationId xmlns:p14="http://schemas.microsoft.com/office/powerpoint/2010/main" val="2065759704"/>
+      </p:ext>
+    </p:extLst>
+  </p:cSld>
+  <p:clrMapOvr>
+    <a:masterClrMapping/>
+  </p:clrMapOvr>
+</p:sld>
+</file>
+
+<file path=ppt/slides/slide4.xml><?xml version="1.0" encoding="utf-8"?>
+<p:sld xmlns:a="http://schemas.openxmlformats.org/drawingml/2006/main" xmlns:r="http://schemas.openxmlformats.org/officeDocument/2006/relationships" xmlns:p="http://schemas.openxmlformats.org/presentationml/2006/main">
+  <p:cSld>
+    <p:spTree>
+      <p:nvGrpSpPr>
+        <p:cNvPr id="1" name=""/>
+        <p:cNvGrpSpPr/>
+        <p:nvPr/>
+      </p:nvGrpSpPr>
+      <p:grpSpPr>
+        <a:xfrm>
+          <a:off x="0" y="0"/>
+          <a:ext cx="0" cy="0"/>
+          <a:chOff x="0" y="0"/>
+          <a:chExt cx="0" cy="0"/>
+        </a:xfrm>
+      </p:grpSpPr>
+      <p:pic>
+        <p:nvPicPr>
+          <p:cNvPr id="2" name="Picture 1">
+            <a:extLst>
+              <a:ext uri="{FF2B5EF4-FFF2-40B4-BE49-F238E27FC236}">
+                <a16:creationId xmlns:a16="http://schemas.microsoft.com/office/drawing/2014/main" id="{4E6B584F-EC48-435A-B393-06F73552FC57}"/>
+              </a:ext>
+            </a:extLst>
+          </p:cNvPr>
+          <p:cNvPicPr>
+            <a:picLocks noChangeAspect="1"/>
+          </p:cNvPicPr>
+          <p:nvPr/>
+        </p:nvPicPr>
+        <p:blipFill>
+          <a:blip r:embed="rId2"/>
+          <a:stretch>
+            <a:fillRect/>
+          </a:stretch>
+        </p:blipFill>
+        <p:spPr>
+          <a:xfrm>
+            <a:off x="0" y="-2063"/>
+            <a:ext cx="6858000" cy="799794"/>
+          </a:xfrm>
+          <a:prstGeom prst="rect">
+            <a:avLst/>
+          </a:prstGeom>
+        </p:spPr>
+      </p:pic>
+      <p:sp>
+        <p:nvSpPr>
+          <p:cNvPr id="3" name="Rectangle 2">
+            <a:extLst>
+              <a:ext uri="{FF2B5EF4-FFF2-40B4-BE49-F238E27FC236}">
+                <a16:creationId xmlns:a16="http://schemas.microsoft.com/office/drawing/2014/main" id="{F0AFD289-EBDE-4D5D-9529-6A1C9F0B019C}"/>
+              </a:ext>
+            </a:extLst>
+          </p:cNvPr>
+          <p:cNvSpPr/>
+          <p:nvPr/>
+        </p:nvSpPr>
+        <p:spPr>
+          <a:xfrm>
+            <a:off x="0" y="9323816"/>
+            <a:ext cx="6858000" cy="1194865"/>
+          </a:xfrm>
+          <a:prstGeom prst="rect">
+            <a:avLst/>
+          </a:prstGeom>
+          <a:noFill/>
+          <a:ln w="12700">
+            <a:solidFill>
+              <a:schemeClr val="tx1"/>
+            </a:solidFill>
+          </a:ln>
+        </p:spPr>
+        <p:style>
+          <a:lnRef idx="2">
+            <a:schemeClr val="accent1">
+              <a:shade val="50000"/>
+            </a:schemeClr>
+          </a:lnRef>
+          <a:fillRef idx="1">
+            <a:schemeClr val="accent1"/>
+          </a:fillRef>
+          <a:effectRef idx="0">
+            <a:schemeClr val="accent1"/>
+          </a:effectRef>
+          <a:fontRef idx="minor">
+            <a:schemeClr val="lt1"/>
+          </a:fontRef>
+        </p:style>
+        <p:txBody>
+          <a:bodyPr rtlCol="0" anchor="ctr"/>
+          <a:lstStyle/>
+          <a:p>
+            <a:pPr algn="ctr"/>
+            <a:endParaRPr lang="en-GB"/>
+          </a:p>
+        </p:txBody>
+      </p:sp>
+      <p:sp>
+        <p:nvSpPr>
+          <p:cNvPr id="4" name="TextBox 3">
+            <a:extLst>
+              <a:ext uri="{FF2B5EF4-FFF2-40B4-BE49-F238E27FC236}">
+                <a16:creationId xmlns:a16="http://schemas.microsoft.com/office/drawing/2014/main" id="{5BE45FEC-ADD0-4B2A-979B-2A328F1A933F}"/>
+              </a:ext>
+            </a:extLst>
+          </p:cNvPr>
+          <p:cNvSpPr txBox="1"/>
+          <p:nvPr/>
+        </p:nvSpPr>
+        <p:spPr>
+          <a:xfrm>
+            <a:off x="4809987" y="9981676"/>
+            <a:ext cx="1771639" cy="384721"/>
+          </a:xfrm>
+          <a:prstGeom prst="rect">
+            <a:avLst/>
+          </a:prstGeom>
+          <a:noFill/>
+        </p:spPr>
+        <p:txBody>
+          <a:bodyPr wrap="none" rtlCol="0">
+            <a:spAutoFit/>
+          </a:bodyPr>
+          <a:lstStyle/>
+          <a:p>
+            <a:r>
+              <a:rPr lang="en-GB" sz="1100" dirty="0"/>
+              <a:t>Advanced Obesity Surgery</a:t>
+            </a:r>
+          </a:p>
+          <a:p>
+            <a:pPr algn="r"/>
+            <a:r>
+              <a:rPr lang="en-GB" sz="800" dirty="0"/>
+              <a:t>©Copyright 2022. All Rights Reserved.</a:t>
+            </a:r>
+          </a:p>
+        </p:txBody>
+      </p:sp>
+      <p:sp>
+        <p:nvSpPr>
+          <p:cNvPr id="5" name="TextBox 4">
+            <a:extLst>
+              <a:ext uri="{FF2B5EF4-FFF2-40B4-BE49-F238E27FC236}">
+                <a16:creationId xmlns:a16="http://schemas.microsoft.com/office/drawing/2014/main" id="{04FFC2A0-59D7-4A2D-BA4F-A644F4E715CD}"/>
+              </a:ext>
+            </a:extLst>
+          </p:cNvPr>
+          <p:cNvSpPr txBox="1"/>
+          <p:nvPr/>
+        </p:nvSpPr>
+        <p:spPr>
+          <a:xfrm>
+            <a:off x="3761623" y="9468381"/>
+            <a:ext cx="2820003" cy="261610"/>
+          </a:xfrm>
+          <a:prstGeom prst="rect">
+            <a:avLst/>
+          </a:prstGeom>
+          <a:noFill/>
+        </p:spPr>
+        <p:txBody>
+          <a:bodyPr wrap="none" rtlCol="0">
+            <a:spAutoFit/>
+          </a:bodyPr>
+          <a:lstStyle/>
+          <a:p>
+            <a:r>
+              <a:rPr lang="en-GB" sz="1100" dirty="0"/>
+              <a:t>Blog        FAQ        Contact us        Privacy Policy</a:t>
+            </a:r>
+          </a:p>
+        </p:txBody>
+      </p:sp>
+      <p:pic>
+        <p:nvPicPr>
+          <p:cNvPr id="6" name="Picture 2" descr="Center for Metabolic and Obesity Surgery">
+            <a:extLst>
+              <a:ext uri="{FF2B5EF4-FFF2-40B4-BE49-F238E27FC236}">
+                <a16:creationId xmlns:a16="http://schemas.microsoft.com/office/drawing/2014/main" id="{5349BEB1-CD49-49D1-9DA8-147B946718F5}"/>
+              </a:ext>
+            </a:extLst>
+          </p:cNvPr>
+          <p:cNvPicPr>
+            <a:picLocks noChangeAspect="1" noChangeArrowheads="1"/>
+          </p:cNvPicPr>
+          <p:nvPr/>
+        </p:nvPicPr>
+        <p:blipFill>
+          <a:blip r:embed="rId3">
+            <a:extLst>
+              <a:ext uri="{BEBA8EAE-BF5A-486C-A8C5-ECC9F3942E4B}">
+                <a14:imgProps xmlns:a14="http://schemas.microsoft.com/office/drawing/2010/main">
+                  <a14:imgLayer r:embed="rId4">
+                    <a14:imgEffect>
+                      <a14:backgroundRemoval t="8163" b="89796" l="4219" r="95000">
+                        <a14:foregroundMark x1="7969" y1="48163" x2="7969" y2="48163"/>
+                        <a14:foregroundMark x1="4219" y1="62857" x2="4219" y2="62857"/>
+                        <a14:foregroundMark x1="14844" y1="48571" x2="14844" y2="48571"/>
+                        <a14:foregroundMark x1="23594" y1="54286" x2="23594" y2="54286"/>
+                        <a14:foregroundMark x1="30938" y1="54694" x2="30938" y2="54694"/>
+                        <a14:foregroundMark x1="38594" y1="53061" x2="38594" y2="53061"/>
+                        <a14:foregroundMark x1="47031" y1="50612" x2="47031" y2="50612"/>
+                        <a14:foregroundMark x1="64531" y1="50612" x2="64531" y2="50612"/>
+                        <a14:foregroundMark x1="72656" y1="53469" x2="72656" y2="53469"/>
+                        <a14:foregroundMark x1="81094" y1="53061" x2="81094" y2="53061"/>
+                        <a14:foregroundMark x1="85156" y1="54286" x2="85156" y2="54286"/>
+                        <a14:foregroundMark x1="90469" y1="51429" x2="90469" y2="51429"/>
+                        <a14:foregroundMark x1="95000" y1="59184" x2="95000" y2="59184"/>
+                        <a14:foregroundMark x1="68281" y1="30204" x2="68281" y2="30204"/>
+                        <a14:foregroundMark x1="73125" y1="28980" x2="73125" y2="28980"/>
+                        <a14:foregroundMark x1="73125" y1="8163" x2="73125" y2="8163"/>
+                        <a14:foregroundMark x1="67500" y1="13061" x2="67500" y2="13061"/>
+                        <a14:foregroundMark x1="72031" y1="17143" x2="72031" y2="17143"/>
+                        <a14:foregroundMark x1="68438" y1="22041" x2="68438" y2="22041"/>
+                        <a14:foregroundMark x1="69688" y1="17143" x2="69688" y2="17143"/>
+                        <a14:foregroundMark x1="57031" y1="83265" x2="57031" y2="83265"/>
+                        <a14:foregroundMark x1="62187" y1="83673" x2="62187" y2="83673"/>
+                        <a14:foregroundMark x1="66250" y1="79184" x2="66250" y2="79184"/>
+                        <a14:foregroundMark x1="68281" y1="82857" x2="68281" y2="82857"/>
+                        <a14:foregroundMark x1="72969" y1="82041" x2="72969" y2="82041"/>
+                        <a14:foregroundMark x1="77188" y1="84898" x2="77188" y2="84898"/>
+                        <a14:foregroundMark x1="76719" y1="82857" x2="76719" y2="82857"/>
+                        <a14:foregroundMark x1="79219" y1="82857" x2="79219" y2="82857"/>
+                        <a14:foregroundMark x1="84375" y1="81224" x2="84375" y2="81224"/>
+                        <a14:foregroundMark x1="86094" y1="82041" x2="86094" y2="82041"/>
+                        <a14:foregroundMark x1="86094" y1="77143" x2="86094" y2="77143"/>
+                        <a14:foregroundMark x1="87969" y1="83673" x2="87969" y2="83673"/>
+                        <a14:foregroundMark x1="92656" y1="82041" x2="92656" y2="82041"/>
+                        <a14:foregroundMark x1="72813" y1="23673" x2="72813" y2="23673"/>
+                        <a14:foregroundMark x1="71563" y1="20816" x2="71563" y2="20816"/>
+                        <a14:foregroundMark x1="5938" y1="55510" x2="5938" y2="55510"/>
+                        <a14:backgroundMark x1="7969" y1="46531" x2="7969" y2="46531"/>
+                        <a14:backgroundMark x1="32656" y1="51837" x2="32656" y2="51837"/>
+                        <a14:backgroundMark x1="63281" y1="83265" x2="63281" y2="83265"/>
+                        <a14:backgroundMark x1="69375" y1="82857" x2="69375" y2="82857"/>
+                        <a14:backgroundMark x1="73281" y1="84898" x2="73281" y2="84898"/>
+                        <a14:backgroundMark x1="80938" y1="83673" x2="80938" y2="83673"/>
+                        <a14:backgroundMark x1="89375" y1="84898" x2="89375" y2="84898"/>
+                        <a14:backgroundMark x1="69688" y1="22041" x2="69688" y2="22041"/>
+                        <a14:backgroundMark x1="72500" y1="20816" x2="72500" y2="20816"/>
+                        <a14:backgroundMark x1="8125" y1="48163" x2="8125" y2="48163"/>
+                        <a14:backgroundMark x1="7969" y1="48163" x2="7969" y2="48163"/>
+                        <a14:backgroundMark x1="6406" y1="55510" x2="6406" y2="55510"/>
+                        <a14:backgroundMark x1="77344" y1="85714" x2="77344" y2="85714"/>
+                        <a14:backgroundMark x1="73125" y1="82857" x2="73125" y2="82857"/>
+                        <a14:backgroundMark x1="77500" y1="84898" x2="77500" y2="84898"/>
+                      </a14:backgroundRemoval>
+                    </a14:imgEffect>
+                  </a14:imgLayer>
+                </a14:imgProps>
+              </a:ext>
+              <a:ext uri="{28A0092B-C50C-407E-A947-70E740481C1C}">
+                <a14:useLocalDpi xmlns:a14="http://schemas.microsoft.com/office/drawing/2010/main" val="0"/>
+              </a:ext>
+            </a:extLst>
+          </a:blip>
+          <a:srcRect/>
+          <a:stretch>
+            <a:fillRect/>
+          </a:stretch>
+        </p:blipFill>
+        <p:spPr bwMode="auto">
+          <a:xfrm>
+            <a:off x="276376" y="9471521"/>
+            <a:ext cx="1158153" cy="443355"/>
+          </a:xfrm>
+          <a:prstGeom prst="rect">
+            <a:avLst/>
+          </a:prstGeom>
+          <a:noFill/>
+          <a:ln>
+            <a:noFill/>
+          </a:ln>
+          <a:extLst>
+            <a:ext uri="{909E8E84-426E-40DD-AFC4-6F175D3DCCD1}">
+              <a14:hiddenFill xmlns:a14="http://schemas.microsoft.com/office/drawing/2010/main">
+                <a:solidFill>
+                  <a:srgbClr val="FFFFFF"/>
+                </a:solidFill>
+              </a14:hiddenFill>
+            </a:ext>
+          </a:extLst>
+        </p:spPr>
+      </p:pic>
+      <p:sp>
+        <p:nvSpPr>
+          <p:cNvPr id="7" name="TextBox 6">
+            <a:extLst>
+              <a:ext uri="{FF2B5EF4-FFF2-40B4-BE49-F238E27FC236}">
+                <a16:creationId xmlns:a16="http://schemas.microsoft.com/office/drawing/2014/main" id="{3800E88B-5171-485B-B88C-7672BE51DD5C}"/>
+              </a:ext>
+            </a:extLst>
+          </p:cNvPr>
+          <p:cNvSpPr txBox="1"/>
+          <p:nvPr/>
+        </p:nvSpPr>
+        <p:spPr>
+          <a:xfrm>
+            <a:off x="208205" y="9904732"/>
+            <a:ext cx="2219850" cy="461665"/>
+          </a:xfrm>
+          <a:prstGeom prst="rect">
+            <a:avLst/>
+          </a:prstGeom>
+          <a:noFill/>
+        </p:spPr>
+        <p:txBody>
+          <a:bodyPr wrap="square">
+            <a:spAutoFit/>
+          </a:bodyPr>
+          <a:lstStyle/>
+          <a:p>
+            <a:r>
+              <a:rPr lang="en-GB" sz="800" dirty="0"/>
+              <a:t>407-303-3820</a:t>
+            </a:r>
+          </a:p>
+          <a:p>
+            <a:r>
+              <a:rPr lang="en-GB" sz="800" dirty="0"/>
+              <a:t>410 Celebration Place, Suite 401</a:t>
+            </a:r>
+          </a:p>
+          <a:p>
+            <a:r>
+              <a:rPr lang="en-GB" sz="800" dirty="0"/>
+              <a:t>Celebration, FL 34747</a:t>
+            </a:r>
+          </a:p>
+        </p:txBody>
+      </p:sp>
+    </p:spTree>
+    <p:extLst>
+      <p:ext uri="{BB962C8B-B14F-4D97-AF65-F5344CB8AC3E}">
+        <p14:creationId xmlns:p14="http://schemas.microsoft.com/office/powerpoint/2010/main" val="305581621"/>
       </p:ext>
     </p:extLst>
   </p:cSld>

</xml_diff>

<commit_message>
Designed and created "Meet Dr. Smith" page
</commit_message>
<xml_diff>
--- a/Website Design Tools.pptx
+++ b/Website Design Tools.pptx
@@ -1346,7 +1346,7 @@
         <a:p>
           <a:r>
             <a:rPr lang="en-GB" sz="700" dirty="0"/>
-            <a:t>Our Hospital</a:t>
+            <a:t>The Hospital</a:t>
           </a:r>
         </a:p>
       </dgm:t>
@@ -1490,7 +1490,7 @@
         <a:p>
           <a:r>
             <a:rPr lang="en-GB" sz="700" dirty="0"/>
-            <a:t>Our Staff</a:t>
+            <a:t>Meet Dr. Smith</a:t>
           </a:r>
         </a:p>
       </dgm:t>
@@ -2831,7 +2831,7 @@
           </a:pPr>
           <a:r>
             <a:rPr lang="en-GB" sz="700" kern="1200" dirty="0"/>
-            <a:t>Our Hospital</a:t>
+            <a:t>The Hospital</a:t>
           </a:r>
         </a:p>
       </dsp:txBody>
@@ -2973,7 +2973,7 @@
           </a:pPr>
           <a:r>
             <a:rPr lang="en-GB" sz="700" kern="1200" dirty="0"/>
-            <a:t>Our Staff</a:t>
+            <a:t>Meet Dr. Smith</a:t>
           </a:r>
         </a:p>
       </dsp:txBody>
@@ -8742,7 +8742,7 @@
           <p:nvPr>
             <p:extLst>
               <p:ext uri="{D42A27DB-BD31-4B8C-83A1-F6EECF244321}">
-                <p14:modId xmlns:p14="http://schemas.microsoft.com/office/powerpoint/2010/main" val="1037166155"/>
+                <p14:modId xmlns:p14="http://schemas.microsoft.com/office/powerpoint/2010/main" val="3686610625"/>
               </p:ext>
             </p:extLst>
           </p:nvPr>
@@ -13145,7 +13145,7 @@
         <p:spPr>
           <a:xfrm>
             <a:off x="276376" y="2664551"/>
-            <a:ext cx="4183197" cy="6124754"/>
+            <a:ext cx="4183197" cy="5386090"/>
           </a:xfrm>
           <a:prstGeom prst="rect">
             <a:avLst/>
@@ -13164,7 +13164,6 @@
                 <a:solidFill>
                   <a:srgbClr val="000000"/>
                 </a:solidFill>
-                <a:latin typeface="Georgia" panose="02040502050405020303" pitchFamily="18" charset="0"/>
               </a:rPr>
               <a:t>Background</a:t>
             </a:r>
@@ -13172,7 +13171,6 @@
               <a:solidFill>
                 <a:srgbClr val="000000"/>
               </a:solidFill>
-              <a:latin typeface="Georgia" panose="02040502050405020303" pitchFamily="18" charset="0"/>
             </a:endParaRPr>
           </a:p>
           <a:p>
@@ -13181,7 +13179,6 @@
               <a:solidFill>
                 <a:srgbClr val="000000"/>
               </a:solidFill>
-              <a:latin typeface="Georgia" panose="02040502050405020303" pitchFamily="18" charset="0"/>
             </a:endParaRPr>
           </a:p>
           <a:p>
@@ -13192,7 +13189,6 @@
                   <a:srgbClr val="000000"/>
                 </a:solidFill>
                 <a:effectLst/>
-                <a:latin typeface="Georgia" panose="02040502050405020303" pitchFamily="18" charset="0"/>
               </a:rPr>
               <a:t>Dr. Dennis C. Smith has been doing bariatric surgery since 1997, when he practiced in Biloxi, MS. In 1999 he began developing a technique for the biliopancreatic diversion with Duodenal Switch to be done completely laparoscopically, which he first performed in November, 1999. He moved from Biloxi to Marietta, Georgia in late 1999. </a:t>
             </a:r>
@@ -13203,7 +13199,6 @@
               <a:solidFill>
                 <a:srgbClr val="000000"/>
               </a:solidFill>
-              <a:latin typeface="Georgia" panose="02040502050405020303" pitchFamily="18" charset="0"/>
             </a:endParaRPr>
           </a:p>
           <a:p>
@@ -13214,7 +13209,6 @@
                   <a:srgbClr val="000000"/>
                 </a:solidFill>
                 <a:effectLst/>
-                <a:latin typeface="Georgia" panose="02040502050405020303" pitchFamily="18" charset="0"/>
               </a:rPr>
               <a:t>Having put together the elements of a bariatric surgery program with the highest possible standards, Dr. Smith in June, 2002 formed his own practice devoted exclusively to bariatric surgery, in order to better serve the morbidly obese population.</a:t>
             </a:r>
@@ -13226,7 +13220,6 @@
                 <a:srgbClr val="000000"/>
               </a:solidFill>
               <a:effectLst/>
-              <a:latin typeface="Georgia" panose="02040502050405020303" pitchFamily="18" charset="0"/>
             </a:endParaRPr>
           </a:p>
           <a:p>
@@ -13235,7 +13228,6 @@
               <a:solidFill>
                 <a:srgbClr val="000000"/>
               </a:solidFill>
-              <a:latin typeface="Georgia" panose="02040502050405020303" pitchFamily="18" charset="0"/>
             </a:endParaRPr>
           </a:p>
           <a:p>
@@ -13246,7 +13238,6 @@
                   <a:srgbClr val="000000"/>
                 </a:solidFill>
                 <a:effectLst/>
-                <a:latin typeface="Georgia" panose="02040502050405020303" pitchFamily="18" charset="0"/>
               </a:rPr>
               <a:t>Current Work</a:t>
             </a:r>
@@ -13257,7 +13248,6 @@
               <a:solidFill>
                 <a:srgbClr val="000000"/>
               </a:solidFill>
-              <a:latin typeface="Georgia" panose="02040502050405020303" pitchFamily="18" charset="0"/>
             </a:endParaRPr>
           </a:p>
           <a:p>
@@ -13268,7 +13258,6 @@
                   <a:srgbClr val="000000"/>
                 </a:solidFill>
                 <a:effectLst/>
-                <a:latin typeface="Georgia" panose="02040502050405020303" pitchFamily="18" charset="0"/>
               </a:rPr>
               <a:t>In early 2015 Dr. Smith moved to the Celebration Bariatric Surgery Program in Celebration, FL and he is now the Medical Director of the Program.</a:t>
             </a:r>
@@ -13280,7 +13269,6 @@
                 <a:srgbClr val="000000"/>
               </a:solidFill>
               <a:effectLst/>
-              <a:latin typeface="Georgia" panose="02040502050405020303" pitchFamily="18" charset="0"/>
             </a:endParaRPr>
           </a:p>
           <a:p>
@@ -13291,7 +13279,6 @@
                   <a:srgbClr val="000000"/>
                 </a:solidFill>
                 <a:effectLst/>
-                <a:latin typeface="Georgia" panose="02040502050405020303" pitchFamily="18" charset="0"/>
               </a:rPr>
               <a:t>Dr. Smith is one of only a handful of bariatric surgeons that regularly performs all four of these operations completely laparoscopically. He has done well over two thousand bariatric operations, with excellent short and long-term results.</a:t>
             </a:r>
@@ -13302,7 +13289,6 @@
               <a:solidFill>
                 <a:srgbClr val="000000"/>
               </a:solidFill>
-              <a:latin typeface="Georgia" panose="02040502050405020303" pitchFamily="18" charset="0"/>
             </a:endParaRPr>
           </a:p>
           <a:p>
@@ -13313,7 +13299,6 @@
                   <a:srgbClr val="000000"/>
                 </a:solidFill>
                 <a:effectLst/>
-                <a:latin typeface="Georgia" panose="02040502050405020303" pitchFamily="18" charset="0"/>
               </a:rPr>
               <a:t>Continue about the development into using the robot, any extra studies or projects being worked on that are related, etc.</a:t>
             </a:r>
@@ -13322,7 +13307,6 @@
                 <a:srgbClr val="000000"/>
               </a:solidFill>
               <a:effectLst/>
-              <a:latin typeface="Georgia" panose="02040502050405020303" pitchFamily="18" charset="0"/>
             </a:endParaRPr>
           </a:p>
         </p:txBody>

</xml_diff>

<commit_message>
Designed and created "About hospital" HTML, imported Owl Carousel framework
</commit_message>
<xml_diff>
--- a/Website Design Tools.pptx
+++ b/Website Design Tools.pptx
@@ -5,13 +5,14 @@
     <p:sldMasterId id="2147483672" r:id="rId1"/>
   </p:sldMasterIdLst>
   <p:notesMasterIdLst>
-    <p:notesMasterId r:id="rId6"/>
+    <p:notesMasterId r:id="rId7"/>
   </p:notesMasterIdLst>
   <p:sldIdLst>
     <p:sldId id="257" r:id="rId2"/>
-    <p:sldId id="258" r:id="rId3"/>
-    <p:sldId id="259" r:id="rId4"/>
-    <p:sldId id="260" r:id="rId5"/>
+    <p:sldId id="261" r:id="rId3"/>
+    <p:sldId id="258" r:id="rId4"/>
+    <p:sldId id="259" r:id="rId5"/>
+    <p:sldId id="260" r:id="rId6"/>
   </p:sldIdLst>
   <p:sldSz cx="6858000" cy="10799763"/>
   <p:notesSz cx="6858000" cy="9144000"/>
@@ -116,6 +117,7 @@
         <p14:section name="Ideas and Elements" id="{F08C5A6D-516F-4A4D-840E-FEBB0C8624D6}">
           <p14:sldIdLst>
             <p14:sldId id="257"/>
+            <p14:sldId id="261"/>
           </p14:sldIdLst>
         </p14:section>
         <p14:section name="Page Designs" id="{1543D77E-2646-47C1-932D-F940423AE1B4}">
@@ -5815,7 +5817,7 @@
           <a:p>
             <a:fld id="{63B92925-6786-4756-8985-7A915050A8F8}" type="slidenum">
               <a:rPr lang="en-GB" smtClean="0"/>
-              <a:t>2</a:t>
+              <a:t>3</a:t>
             </a:fld>
             <a:endParaRPr lang="en-GB"/>
           </a:p>
@@ -9207,7 +9209,7 @@
         </p:nvSpPr>
         <p:spPr>
           <a:xfrm>
-            <a:off x="141194" y="7326592"/>
+            <a:off x="141194" y="7021792"/>
             <a:ext cx="3186578" cy="369332"/>
           </a:xfrm>
           <a:prstGeom prst="rect">
@@ -10244,6 +10246,136 @@
 </file>
 
 <file path=ppt/slides/slide2.xml><?xml version="1.0" encoding="utf-8"?>
+<p:sld xmlns:a="http://schemas.openxmlformats.org/drawingml/2006/main" xmlns:r="http://schemas.openxmlformats.org/officeDocument/2006/relationships" xmlns:p="http://schemas.openxmlformats.org/presentationml/2006/main">
+  <p:cSld>
+    <p:spTree>
+      <p:nvGrpSpPr>
+        <p:cNvPr id="1" name=""/>
+        <p:cNvGrpSpPr/>
+        <p:nvPr/>
+      </p:nvGrpSpPr>
+      <p:grpSpPr>
+        <a:xfrm>
+          <a:off x="0" y="0"/>
+          <a:ext cx="0" cy="0"/>
+          <a:chOff x="0" y="0"/>
+          <a:chExt cx="0" cy="0"/>
+        </a:xfrm>
+      </p:grpSpPr>
+      <p:sp>
+        <p:nvSpPr>
+          <p:cNvPr id="3" name="TextBox 2">
+            <a:extLst>
+              <a:ext uri="{FF2B5EF4-FFF2-40B4-BE49-F238E27FC236}">
+                <a16:creationId xmlns:a16="http://schemas.microsoft.com/office/drawing/2014/main" id="{5B6CDEDB-B3DB-4818-9BC5-55CD39A94C2C}"/>
+              </a:ext>
+            </a:extLst>
+          </p:cNvPr>
+          <p:cNvSpPr txBox="1"/>
+          <p:nvPr/>
+        </p:nvSpPr>
+        <p:spPr>
+          <a:xfrm>
+            <a:off x="768626" y="689113"/>
+            <a:ext cx="5218032" cy="6186309"/>
+          </a:xfrm>
+          <a:prstGeom prst="rect">
+            <a:avLst/>
+          </a:prstGeom>
+          <a:noFill/>
+        </p:spPr>
+        <p:txBody>
+          <a:bodyPr wrap="none" rtlCol="0">
+            <a:spAutoFit/>
+          </a:bodyPr>
+          <a:lstStyle/>
+          <a:p>
+            <a:r>
+              <a:rPr lang="en-GB" sz="3600" dirty="0"/>
+              <a:t>HTML pages needed</a:t>
+            </a:r>
+          </a:p>
+          <a:p>
+            <a:endParaRPr lang="en-GB" sz="3600" dirty="0"/>
+          </a:p>
+          <a:p>
+            <a:r>
+              <a:rPr lang="en-GB" sz="3600" dirty="0">
+                <a:highlight>
+                  <a:srgbClr val="FFFF00"/>
+                </a:highlight>
+              </a:rPr>
+              <a:t>Home</a:t>
+            </a:r>
+          </a:p>
+          <a:p>
+            <a:r>
+              <a:rPr lang="en-GB" sz="3600" dirty="0">
+                <a:highlight>
+                  <a:srgbClr val="FFFF00"/>
+                </a:highlight>
+              </a:rPr>
+              <a:t>Meet Dr. Smith</a:t>
+            </a:r>
+          </a:p>
+          <a:p>
+            <a:r>
+              <a:rPr lang="en-GB" sz="3600" dirty="0"/>
+              <a:t>About the hospital</a:t>
+            </a:r>
+          </a:p>
+          <a:p>
+            <a:r>
+              <a:rPr lang="en-GB" sz="3600" dirty="0"/>
+              <a:t>About procedures</a:t>
+            </a:r>
+          </a:p>
+          <a:p>
+            <a:r>
+              <a:rPr lang="en-GB" sz="3600" dirty="0"/>
+              <a:t>Patient stories</a:t>
+            </a:r>
+          </a:p>
+          <a:p>
+            <a:r>
+              <a:rPr lang="en-GB" sz="3600" dirty="0"/>
+              <a:t>Pre- and post-op resources</a:t>
+            </a:r>
+          </a:p>
+          <a:p>
+            <a:r>
+              <a:rPr lang="en-GB" sz="3600" dirty="0"/>
+              <a:t>Video gallery</a:t>
+            </a:r>
+          </a:p>
+          <a:p>
+            <a:r>
+              <a:rPr lang="en-GB" sz="3600" dirty="0"/>
+              <a:t>Blog</a:t>
+            </a:r>
+          </a:p>
+          <a:p>
+            <a:r>
+              <a:rPr lang="en-GB" sz="3600" dirty="0"/>
+              <a:t>Start here questionnaire</a:t>
+            </a:r>
+          </a:p>
+        </p:txBody>
+      </p:sp>
+    </p:spTree>
+    <p:extLst>
+      <p:ext uri="{BB962C8B-B14F-4D97-AF65-F5344CB8AC3E}">
+        <p14:creationId xmlns:p14="http://schemas.microsoft.com/office/powerpoint/2010/main" val="665911"/>
+      </p:ext>
+    </p:extLst>
+  </p:cSld>
+  <p:clrMapOvr>
+    <a:masterClrMapping/>
+  </p:clrMapOvr>
+</p:sld>
+</file>
+
+<file path=ppt/slides/slide3.xml><?xml version="1.0" encoding="utf-8"?>
 <p:sld xmlns:a="http://schemas.openxmlformats.org/drawingml/2006/main" xmlns:r="http://schemas.openxmlformats.org/officeDocument/2006/relationships" xmlns:p="http://schemas.openxmlformats.org/presentationml/2006/main">
   <p:cSld>
     <p:spTree>
@@ -11968,58 +12100,6 @@
       </p:sp>
       <p:sp>
         <p:nvSpPr>
-          <p:cNvPr id="37" name="Rectangle 36">
-            <a:extLst>
-              <a:ext uri="{FF2B5EF4-FFF2-40B4-BE49-F238E27FC236}">
-                <a16:creationId xmlns:a16="http://schemas.microsoft.com/office/drawing/2014/main" id="{75058A5E-EA42-4611-B2FE-15834733E505}"/>
-              </a:ext>
-            </a:extLst>
-          </p:cNvPr>
-          <p:cNvSpPr/>
-          <p:nvPr/>
-        </p:nvSpPr>
-        <p:spPr>
-          <a:xfrm>
-            <a:off x="0" y="9323816"/>
-            <a:ext cx="6858000" cy="1194865"/>
-          </a:xfrm>
-          <a:prstGeom prst="rect">
-            <a:avLst/>
-          </a:prstGeom>
-          <a:noFill/>
-          <a:ln w="12700">
-            <a:solidFill>
-              <a:schemeClr val="tx1"/>
-            </a:solidFill>
-          </a:ln>
-        </p:spPr>
-        <p:style>
-          <a:lnRef idx="2">
-            <a:schemeClr val="accent1">
-              <a:shade val="50000"/>
-            </a:schemeClr>
-          </a:lnRef>
-          <a:fillRef idx="1">
-            <a:schemeClr val="accent1"/>
-          </a:fillRef>
-          <a:effectRef idx="0">
-            <a:schemeClr val="accent1"/>
-          </a:effectRef>
-          <a:fontRef idx="minor">
-            <a:schemeClr val="lt1"/>
-          </a:fontRef>
-        </p:style>
-        <p:txBody>
-          <a:bodyPr rtlCol="0" anchor="ctr"/>
-          <a:lstStyle/>
-          <a:p>
-            <a:pPr algn="ctr"/>
-            <a:endParaRPr lang="en-GB"/>
-          </a:p>
-        </p:txBody>
-      </p:sp>
-      <p:sp>
-        <p:nvSpPr>
           <p:cNvPr id="38" name="TextBox 37">
             <a:extLst>
               <a:ext uri="{FF2B5EF4-FFF2-40B4-BE49-F238E27FC236}">
@@ -12453,10 +12533,62 @@
       </p:grpSp>
       <p:sp>
         <p:nvSpPr>
-          <p:cNvPr id="45" name="TextBox 44">
+          <p:cNvPr id="32" name="Rectangle 31">
             <a:extLst>
               <a:ext uri="{FF2B5EF4-FFF2-40B4-BE49-F238E27FC236}">
-                <a16:creationId xmlns:a16="http://schemas.microsoft.com/office/drawing/2014/main" id="{55934532-5AF5-497A-845F-97179322D489}"/>
+                <a16:creationId xmlns:a16="http://schemas.microsoft.com/office/drawing/2014/main" id="{255FC5DF-9A98-4860-9B44-027095BB23E0}"/>
+              </a:ext>
+            </a:extLst>
+          </p:cNvPr>
+          <p:cNvSpPr/>
+          <p:nvPr/>
+        </p:nvSpPr>
+        <p:spPr>
+          <a:xfrm>
+            <a:off x="0" y="9588856"/>
+            <a:ext cx="6858000" cy="1194865"/>
+          </a:xfrm>
+          <a:prstGeom prst="rect">
+            <a:avLst/>
+          </a:prstGeom>
+          <a:noFill/>
+          <a:ln w="12700">
+            <a:solidFill>
+              <a:schemeClr val="tx1"/>
+            </a:solidFill>
+          </a:ln>
+        </p:spPr>
+        <p:style>
+          <a:lnRef idx="2">
+            <a:schemeClr val="accent1">
+              <a:shade val="50000"/>
+            </a:schemeClr>
+          </a:lnRef>
+          <a:fillRef idx="1">
+            <a:schemeClr val="accent1"/>
+          </a:fillRef>
+          <a:effectRef idx="0">
+            <a:schemeClr val="accent1"/>
+          </a:effectRef>
+          <a:fontRef idx="minor">
+            <a:schemeClr val="lt1"/>
+          </a:fontRef>
+        </p:style>
+        <p:txBody>
+          <a:bodyPr rtlCol="0" anchor="ctr"/>
+          <a:lstStyle/>
+          <a:p>
+            <a:pPr algn="ctr"/>
+            <a:endParaRPr lang="en-GB"/>
+          </a:p>
+        </p:txBody>
+      </p:sp>
+      <p:sp>
+        <p:nvSpPr>
+          <p:cNvPr id="34" name="TextBox 33">
+            <a:extLst>
+              <a:ext uri="{FF2B5EF4-FFF2-40B4-BE49-F238E27FC236}">
+                <a16:creationId xmlns:a16="http://schemas.microsoft.com/office/drawing/2014/main" id="{846D6EC3-A2D9-40CE-BFE0-5AF596833121}"/>
               </a:ext>
             </a:extLst>
           </p:cNvPr>
@@ -12465,7 +12597,7 @@
         </p:nvSpPr>
         <p:spPr>
           <a:xfrm>
-            <a:off x="4809987" y="9981676"/>
+            <a:off x="4809987" y="10246716"/>
             <a:ext cx="1771639" cy="384721"/>
           </a:xfrm>
           <a:prstGeom prst="rect">
@@ -12495,10 +12627,10 @@
       </p:sp>
       <p:sp>
         <p:nvSpPr>
-          <p:cNvPr id="46" name="TextBox 45">
+          <p:cNvPr id="35" name="TextBox 34">
             <a:extLst>
               <a:ext uri="{FF2B5EF4-FFF2-40B4-BE49-F238E27FC236}">
-                <a16:creationId xmlns:a16="http://schemas.microsoft.com/office/drawing/2014/main" id="{FB279216-47C7-4223-90D5-34866323339A}"/>
+                <a16:creationId xmlns:a16="http://schemas.microsoft.com/office/drawing/2014/main" id="{A7F20842-3377-4AEA-8096-29048D8B5ACB}"/>
               </a:ext>
             </a:extLst>
           </p:cNvPr>
@@ -12507,7 +12639,7 @@
         </p:nvSpPr>
         <p:spPr>
           <a:xfrm>
-            <a:off x="3761623" y="9468381"/>
+            <a:off x="3761623" y="9733421"/>
             <a:ext cx="2820003" cy="261610"/>
           </a:xfrm>
           <a:prstGeom prst="rect">
@@ -12530,10 +12662,10 @@
       </p:sp>
       <p:pic>
         <p:nvPicPr>
-          <p:cNvPr id="47" name="Picture 2" descr="Center for Metabolic and Obesity Surgery">
+          <p:cNvPr id="36" name="Picture 2" descr="Center for Metabolic and Obesity Surgery">
             <a:extLst>
               <a:ext uri="{FF2B5EF4-FFF2-40B4-BE49-F238E27FC236}">
-                <a16:creationId xmlns:a16="http://schemas.microsoft.com/office/drawing/2014/main" id="{8B0FE0B5-1240-444C-BDB1-32C7D6264DE7}"/>
+                <a16:creationId xmlns:a16="http://schemas.microsoft.com/office/drawing/2014/main" id="{48CF8262-D334-43E3-A20D-0C9A09D6D5A7}"/>
               </a:ext>
             </a:extLst>
           </p:cNvPr>
@@ -12618,7 +12750,7 @@
         </p:blipFill>
         <p:spPr bwMode="auto">
           <a:xfrm>
-            <a:off x="276376" y="9471521"/>
+            <a:off x="276376" y="9736561"/>
             <a:ext cx="1158153" cy="443355"/>
           </a:xfrm>
           <a:prstGeom prst="rect">
@@ -12641,10 +12773,10 @@
       </p:pic>
       <p:sp>
         <p:nvSpPr>
-          <p:cNvPr id="51" name="TextBox 50">
+          <p:cNvPr id="44" name="TextBox 43">
             <a:extLst>
               <a:ext uri="{FF2B5EF4-FFF2-40B4-BE49-F238E27FC236}">
-                <a16:creationId xmlns:a16="http://schemas.microsoft.com/office/drawing/2014/main" id="{0F4C1FDF-DE28-4AC0-8FC3-CAF327665F1A}"/>
+                <a16:creationId xmlns:a16="http://schemas.microsoft.com/office/drawing/2014/main" id="{DB45E960-D627-4D73-97B5-72ADFD6FBBD6}"/>
               </a:ext>
             </a:extLst>
           </p:cNvPr>
@@ -12653,7 +12785,7 @@
         </p:nvSpPr>
         <p:spPr>
           <a:xfrm>
-            <a:off x="208205" y="9904732"/>
+            <a:off x="208205" y="10169772"/>
             <a:ext cx="2219850" cy="461665"/>
           </a:xfrm>
           <a:prstGeom prst="rect">
@@ -12699,7 +12831,7 @@
 </p:sld>
 </file>
 
-<file path=ppt/slides/slide3.xml><?xml version="1.0" encoding="utf-8"?>
+<file path=ppt/slides/slide4.xml><?xml version="1.0" encoding="utf-8"?>
 <p:sld xmlns:a="http://schemas.openxmlformats.org/drawingml/2006/main" xmlns:r="http://schemas.openxmlformats.org/officeDocument/2006/relationships" xmlns:p="http://schemas.openxmlformats.org/presentationml/2006/main">
   <p:cSld>
     <p:spTree>
@@ -12748,10 +12880,10 @@
       </p:pic>
       <p:sp>
         <p:nvSpPr>
-          <p:cNvPr id="3" name="Rectangle 2">
+          <p:cNvPr id="8" name="Rectangle 7">
             <a:extLst>
               <a:ext uri="{FF2B5EF4-FFF2-40B4-BE49-F238E27FC236}">
-                <a16:creationId xmlns:a16="http://schemas.microsoft.com/office/drawing/2014/main" id="{48A3FB12-27FD-4813-AA7C-EF40B3782734}"/>
+                <a16:creationId xmlns:a16="http://schemas.microsoft.com/office/drawing/2014/main" id="{289490A7-055A-4A87-8B1B-495B8ACBBA9C}"/>
               </a:ext>
             </a:extLst>
           </p:cNvPr>
@@ -12760,7 +12892,399 @@
         </p:nvSpPr>
         <p:spPr>
           <a:xfrm>
-            <a:off x="0" y="9323816"/>
+            <a:off x="0" y="797731"/>
+            <a:ext cx="6858000" cy="1488269"/>
+          </a:xfrm>
+          <a:prstGeom prst="rect">
+            <a:avLst/>
+          </a:prstGeom>
+          <a:solidFill>
+            <a:schemeClr val="bg2">
+              <a:lumMod val="90000"/>
+            </a:schemeClr>
+          </a:solidFill>
+          <a:ln>
+            <a:noFill/>
+          </a:ln>
+        </p:spPr>
+        <p:style>
+          <a:lnRef idx="2">
+            <a:schemeClr val="accent1">
+              <a:shade val="50000"/>
+            </a:schemeClr>
+          </a:lnRef>
+          <a:fillRef idx="1">
+            <a:schemeClr val="accent1"/>
+          </a:fillRef>
+          <a:effectRef idx="0">
+            <a:schemeClr val="accent1"/>
+          </a:effectRef>
+          <a:fontRef idx="minor">
+            <a:schemeClr val="lt1"/>
+          </a:fontRef>
+        </p:style>
+        <p:txBody>
+          <a:bodyPr rtlCol="0" anchor="ctr"/>
+          <a:lstStyle/>
+          <a:p>
+            <a:pPr algn="ctr"/>
+            <a:endParaRPr lang="en-GB" dirty="0"/>
+          </a:p>
+        </p:txBody>
+      </p:sp>
+      <p:sp>
+        <p:nvSpPr>
+          <p:cNvPr id="9" name="TextBox 8">
+            <a:extLst>
+              <a:ext uri="{FF2B5EF4-FFF2-40B4-BE49-F238E27FC236}">
+                <a16:creationId xmlns:a16="http://schemas.microsoft.com/office/drawing/2014/main" id="{C7D3372C-5532-4B65-9D93-821178721EC3}"/>
+              </a:ext>
+            </a:extLst>
+          </p:cNvPr>
+          <p:cNvSpPr txBox="1"/>
+          <p:nvPr/>
+        </p:nvSpPr>
+        <p:spPr>
+          <a:xfrm>
+            <a:off x="3170375" y="1087875"/>
+            <a:ext cx="3320333" cy="830997"/>
+          </a:xfrm>
+          <a:prstGeom prst="rect">
+            <a:avLst/>
+          </a:prstGeom>
+          <a:noFill/>
+        </p:spPr>
+        <p:txBody>
+          <a:bodyPr wrap="none" rtlCol="0">
+            <a:spAutoFit/>
+          </a:bodyPr>
+          <a:lstStyle/>
+          <a:p>
+            <a:pPr algn="r"/>
+            <a:r>
+              <a:rPr lang="en-GB" sz="2400" dirty="0"/>
+              <a:t>Meet Dr. Dennis Smith</a:t>
+            </a:r>
+          </a:p>
+          <a:p>
+            <a:pPr algn="r"/>
+            <a:r>
+              <a:rPr lang="en-GB" sz="2400" dirty="0"/>
+              <a:t>&lt;role, qualifications, etc&gt;</a:t>
+            </a:r>
+          </a:p>
+        </p:txBody>
+      </p:sp>
+      <p:sp>
+        <p:nvSpPr>
+          <p:cNvPr id="17" name="TextBox 16">
+            <a:extLst>
+              <a:ext uri="{FF2B5EF4-FFF2-40B4-BE49-F238E27FC236}">
+                <a16:creationId xmlns:a16="http://schemas.microsoft.com/office/drawing/2014/main" id="{AB6BA657-4CD3-4563-8787-8C01B6DBB89D}"/>
+              </a:ext>
+            </a:extLst>
+          </p:cNvPr>
+          <p:cNvSpPr txBox="1"/>
+          <p:nvPr/>
+        </p:nvSpPr>
+        <p:spPr>
+          <a:xfrm>
+            <a:off x="276376" y="2664551"/>
+            <a:ext cx="4183197" cy="5386090"/>
+          </a:xfrm>
+          <a:prstGeom prst="rect">
+            <a:avLst/>
+          </a:prstGeom>
+          <a:noFill/>
+        </p:spPr>
+        <p:txBody>
+          <a:bodyPr wrap="square" rtlCol="0">
+            <a:spAutoFit/>
+          </a:bodyPr>
+          <a:lstStyle/>
+          <a:p>
+            <a:pPr algn="l"/>
+            <a:r>
+              <a:rPr lang="en-GB" sz="1600" b="1" dirty="0">
+                <a:solidFill>
+                  <a:srgbClr val="000000"/>
+                </a:solidFill>
+              </a:rPr>
+              <a:t>Background</a:t>
+            </a:r>
+            <a:endParaRPr lang="en-GB" sz="1200" b="1" dirty="0">
+              <a:solidFill>
+                <a:srgbClr val="000000"/>
+              </a:solidFill>
+            </a:endParaRPr>
+          </a:p>
+          <a:p>
+            <a:pPr algn="l"/>
+            <a:endParaRPr lang="en-GB" sz="1200" dirty="0">
+              <a:solidFill>
+                <a:srgbClr val="000000"/>
+              </a:solidFill>
+            </a:endParaRPr>
+          </a:p>
+          <a:p>
+            <a:pPr algn="l"/>
+            <a:r>
+              <a:rPr lang="en-GB" sz="1200" b="0" i="0" dirty="0">
+                <a:solidFill>
+                  <a:srgbClr val="000000"/>
+                </a:solidFill>
+                <a:effectLst/>
+              </a:rPr>
+              <a:t>Dr. Dennis C. Smith has been doing bariatric surgery since 1997, when he practiced in Biloxi, MS. In 1999 he began developing a technique for the biliopancreatic diversion with Duodenal Switch to be done completely laparoscopically, which he first performed in November, 1999. He moved from Biloxi to Marietta, Georgia in late 1999. </a:t>
+            </a:r>
+          </a:p>
+          <a:p>
+            <a:pPr algn="l"/>
+            <a:endParaRPr lang="en-GB" sz="1200" dirty="0">
+              <a:solidFill>
+                <a:srgbClr val="000000"/>
+              </a:solidFill>
+            </a:endParaRPr>
+          </a:p>
+          <a:p>
+            <a:pPr algn="l"/>
+            <a:r>
+              <a:rPr lang="en-GB" sz="1200" b="0" i="0" dirty="0">
+                <a:solidFill>
+                  <a:srgbClr val="000000"/>
+                </a:solidFill>
+                <a:effectLst/>
+              </a:rPr>
+              <a:t>Having put together the elements of a bariatric surgery program with the highest possible standards, Dr. Smith in June, 2002 formed his own practice devoted exclusively to bariatric surgery, in order to better serve the morbidly obese population.</a:t>
+            </a:r>
+          </a:p>
+          <a:p>
+            <a:pPr algn="l"/>
+            <a:endParaRPr lang="en-GB" sz="1200" b="0" i="0" dirty="0">
+              <a:solidFill>
+                <a:srgbClr val="000000"/>
+              </a:solidFill>
+              <a:effectLst/>
+            </a:endParaRPr>
+          </a:p>
+          <a:p>
+            <a:pPr algn="l"/>
+            <a:endParaRPr lang="en-GB" sz="1200" dirty="0">
+              <a:solidFill>
+                <a:srgbClr val="000000"/>
+              </a:solidFill>
+            </a:endParaRPr>
+          </a:p>
+          <a:p>
+            <a:pPr algn="l"/>
+            <a:r>
+              <a:rPr lang="en-GB" sz="1600" b="1" i="0" dirty="0">
+                <a:solidFill>
+                  <a:srgbClr val="000000"/>
+                </a:solidFill>
+                <a:effectLst/>
+              </a:rPr>
+              <a:t>Current Work</a:t>
+            </a:r>
+          </a:p>
+          <a:p>
+            <a:pPr algn="l"/>
+            <a:endParaRPr lang="en-GB" sz="1200" dirty="0">
+              <a:solidFill>
+                <a:srgbClr val="000000"/>
+              </a:solidFill>
+            </a:endParaRPr>
+          </a:p>
+          <a:p>
+            <a:pPr algn="l"/>
+            <a:r>
+              <a:rPr lang="en-GB" sz="1200" i="0" dirty="0">
+                <a:solidFill>
+                  <a:srgbClr val="000000"/>
+                </a:solidFill>
+                <a:effectLst/>
+              </a:rPr>
+              <a:t>In early 2015 Dr. Smith moved to the Celebration Bariatric Surgery Program in Celebration, FL and he is now the Medical Director of the Program.</a:t>
+            </a:r>
+          </a:p>
+          <a:p>
+            <a:pPr algn="l"/>
+            <a:endParaRPr lang="en-GB" sz="1200" i="0" dirty="0">
+              <a:solidFill>
+                <a:srgbClr val="000000"/>
+              </a:solidFill>
+              <a:effectLst/>
+            </a:endParaRPr>
+          </a:p>
+          <a:p>
+            <a:pPr algn="l"/>
+            <a:r>
+              <a:rPr lang="en-GB" sz="1200" i="0" dirty="0">
+                <a:solidFill>
+                  <a:srgbClr val="000000"/>
+                </a:solidFill>
+                <a:effectLst/>
+              </a:rPr>
+              <a:t>Dr. Smith is one of only a handful of bariatric surgeons that regularly performs all four of these operations completely laparoscopically. He has done well over two thousand bariatric operations, with excellent short and long-term results.</a:t>
+            </a:r>
+          </a:p>
+          <a:p>
+            <a:pPr algn="l"/>
+            <a:endParaRPr lang="en-GB" sz="1200" dirty="0">
+              <a:solidFill>
+                <a:srgbClr val="000000"/>
+              </a:solidFill>
+            </a:endParaRPr>
+          </a:p>
+          <a:p>
+            <a:pPr algn="l"/>
+            <a:r>
+              <a:rPr lang="en-GB" sz="1200" i="0" dirty="0">
+                <a:solidFill>
+                  <a:srgbClr val="000000"/>
+                </a:solidFill>
+                <a:effectLst/>
+              </a:rPr>
+              <a:t>Continue about the development into using the robot, any extra studies or projects being worked on that are related, etc.</a:t>
+            </a:r>
+            <a:endParaRPr lang="en-GB" sz="1100" i="0" dirty="0">
+              <a:solidFill>
+                <a:srgbClr val="000000"/>
+              </a:solidFill>
+              <a:effectLst/>
+            </a:endParaRPr>
+          </a:p>
+        </p:txBody>
+      </p:sp>
+      <p:sp>
+        <p:nvSpPr>
+          <p:cNvPr id="19" name="Rectangle 18">
+            <a:extLst>
+              <a:ext uri="{FF2B5EF4-FFF2-40B4-BE49-F238E27FC236}">
+                <a16:creationId xmlns:a16="http://schemas.microsoft.com/office/drawing/2014/main" id="{0EB652DB-2148-4752-8B0A-97307B364E7F}"/>
+              </a:ext>
+            </a:extLst>
+          </p:cNvPr>
+          <p:cNvSpPr/>
+          <p:nvPr/>
+        </p:nvSpPr>
+        <p:spPr>
+          <a:xfrm>
+            <a:off x="4745328" y="2664551"/>
+            <a:ext cx="1836295" cy="2117311"/>
+          </a:xfrm>
+          <a:prstGeom prst="rect">
+            <a:avLst/>
+          </a:prstGeom>
+          <a:solidFill>
+            <a:schemeClr val="accent2">
+              <a:lumMod val="75000"/>
+            </a:schemeClr>
+          </a:solidFill>
+          <a:ln>
+            <a:noFill/>
+          </a:ln>
+        </p:spPr>
+        <p:style>
+          <a:lnRef idx="2">
+            <a:schemeClr val="accent1">
+              <a:shade val="50000"/>
+            </a:schemeClr>
+          </a:lnRef>
+          <a:fillRef idx="1">
+            <a:schemeClr val="accent1"/>
+          </a:fillRef>
+          <a:effectRef idx="0">
+            <a:schemeClr val="accent1"/>
+          </a:effectRef>
+          <a:fontRef idx="minor">
+            <a:schemeClr val="lt1"/>
+          </a:fontRef>
+        </p:style>
+        <p:txBody>
+          <a:bodyPr rtlCol="0" anchor="ctr"/>
+          <a:lstStyle/>
+          <a:p>
+            <a:pPr algn="ctr"/>
+            <a:r>
+              <a:rPr lang="en-GB" dirty="0"/>
+              <a:t>Image</a:t>
+            </a:r>
+          </a:p>
+        </p:txBody>
+      </p:sp>
+      <p:sp>
+        <p:nvSpPr>
+          <p:cNvPr id="20" name="Rectangle 19">
+            <a:extLst>
+              <a:ext uri="{FF2B5EF4-FFF2-40B4-BE49-F238E27FC236}">
+                <a16:creationId xmlns:a16="http://schemas.microsoft.com/office/drawing/2014/main" id="{0E6033F6-332D-472E-828B-2343EE8CFE6F}"/>
+              </a:ext>
+            </a:extLst>
+          </p:cNvPr>
+          <p:cNvSpPr/>
+          <p:nvPr/>
+        </p:nvSpPr>
+        <p:spPr>
+          <a:xfrm>
+            <a:off x="4745327" y="5865669"/>
+            <a:ext cx="1836295" cy="2117311"/>
+          </a:xfrm>
+          <a:prstGeom prst="rect">
+            <a:avLst/>
+          </a:prstGeom>
+          <a:solidFill>
+            <a:schemeClr val="accent2">
+              <a:lumMod val="75000"/>
+            </a:schemeClr>
+          </a:solidFill>
+          <a:ln>
+            <a:noFill/>
+          </a:ln>
+        </p:spPr>
+        <p:style>
+          <a:lnRef idx="2">
+            <a:schemeClr val="accent1">
+              <a:shade val="50000"/>
+            </a:schemeClr>
+          </a:lnRef>
+          <a:fillRef idx="1">
+            <a:schemeClr val="accent1"/>
+          </a:fillRef>
+          <a:effectRef idx="0">
+            <a:schemeClr val="accent1"/>
+          </a:effectRef>
+          <a:fontRef idx="minor">
+            <a:schemeClr val="lt1"/>
+          </a:fontRef>
+        </p:style>
+        <p:txBody>
+          <a:bodyPr rtlCol="0" anchor="ctr"/>
+          <a:lstStyle/>
+          <a:p>
+            <a:pPr algn="ctr"/>
+            <a:r>
+              <a:rPr lang="en-GB" dirty="0"/>
+              <a:t>Image</a:t>
+            </a:r>
+          </a:p>
+        </p:txBody>
+      </p:sp>
+      <p:sp>
+        <p:nvSpPr>
+          <p:cNvPr id="13" name="Rectangle 12">
+            <a:extLst>
+              <a:ext uri="{FF2B5EF4-FFF2-40B4-BE49-F238E27FC236}">
+                <a16:creationId xmlns:a16="http://schemas.microsoft.com/office/drawing/2014/main" id="{358025D3-BDA8-4233-883C-5958C9756C3F}"/>
+              </a:ext>
+            </a:extLst>
+          </p:cNvPr>
+          <p:cNvSpPr/>
+          <p:nvPr/>
+        </p:nvSpPr>
+        <p:spPr>
+          <a:xfrm>
+            <a:off x="0" y="9588856"/>
             <a:ext cx="6858000" cy="1194865"/>
           </a:xfrm>
           <a:prstGeom prst="rect">
@@ -12800,10 +13324,10 @@
       </p:sp>
       <p:sp>
         <p:nvSpPr>
-          <p:cNvPr id="4" name="TextBox 3">
+          <p:cNvPr id="14" name="TextBox 13">
             <a:extLst>
               <a:ext uri="{FF2B5EF4-FFF2-40B4-BE49-F238E27FC236}">
-                <a16:creationId xmlns:a16="http://schemas.microsoft.com/office/drawing/2014/main" id="{2D0A103B-9055-4BEF-BF31-B905AD28490A}"/>
+                <a16:creationId xmlns:a16="http://schemas.microsoft.com/office/drawing/2014/main" id="{EF2FF2B5-4A53-47E2-B50E-B9AA9FC40E39}"/>
               </a:ext>
             </a:extLst>
           </p:cNvPr>
@@ -12812,7 +13336,7 @@
         </p:nvSpPr>
         <p:spPr>
           <a:xfrm>
-            <a:off x="4809987" y="9981676"/>
+            <a:off x="4809987" y="10246716"/>
             <a:ext cx="1771639" cy="384721"/>
           </a:xfrm>
           <a:prstGeom prst="rect">
@@ -12842,10 +13366,10 @@
       </p:sp>
       <p:sp>
         <p:nvSpPr>
-          <p:cNvPr id="5" name="TextBox 4">
+          <p:cNvPr id="15" name="TextBox 14">
             <a:extLst>
               <a:ext uri="{FF2B5EF4-FFF2-40B4-BE49-F238E27FC236}">
-                <a16:creationId xmlns:a16="http://schemas.microsoft.com/office/drawing/2014/main" id="{D1104D6F-5C43-4A97-9D07-AA45C9EB5809}"/>
+                <a16:creationId xmlns:a16="http://schemas.microsoft.com/office/drawing/2014/main" id="{A76A86AF-49B6-4705-9FF2-BE90B1B2C5BB}"/>
               </a:ext>
             </a:extLst>
           </p:cNvPr>
@@ -12854,7 +13378,7 @@
         </p:nvSpPr>
         <p:spPr>
           <a:xfrm>
-            <a:off x="3761623" y="9468381"/>
+            <a:off x="3761623" y="9733421"/>
             <a:ext cx="2820003" cy="261610"/>
           </a:xfrm>
           <a:prstGeom prst="rect">
@@ -12877,10 +13401,10 @@
       </p:sp>
       <p:pic>
         <p:nvPicPr>
-          <p:cNvPr id="6" name="Picture 2" descr="Center for Metabolic and Obesity Surgery">
+          <p:cNvPr id="16" name="Picture 2" descr="Center for Metabolic and Obesity Surgery">
             <a:extLst>
               <a:ext uri="{FF2B5EF4-FFF2-40B4-BE49-F238E27FC236}">
-                <a16:creationId xmlns:a16="http://schemas.microsoft.com/office/drawing/2014/main" id="{BC9DC308-DFF9-43F3-98CC-B5D83700AA36}"/>
+                <a16:creationId xmlns:a16="http://schemas.microsoft.com/office/drawing/2014/main" id="{C3E6599B-83B1-45DD-8C11-BD911F5818C6}"/>
               </a:ext>
             </a:extLst>
           </p:cNvPr>
@@ -12965,7 +13489,7 @@
         </p:blipFill>
         <p:spPr bwMode="auto">
           <a:xfrm>
-            <a:off x="276376" y="9471521"/>
+            <a:off x="276376" y="9736561"/>
             <a:ext cx="1158153" cy="443355"/>
           </a:xfrm>
           <a:prstGeom prst="rect">
@@ -12988,10 +13512,10 @@
       </p:pic>
       <p:sp>
         <p:nvSpPr>
-          <p:cNvPr id="7" name="TextBox 6">
+          <p:cNvPr id="18" name="TextBox 17">
             <a:extLst>
               <a:ext uri="{FF2B5EF4-FFF2-40B4-BE49-F238E27FC236}">
-                <a16:creationId xmlns:a16="http://schemas.microsoft.com/office/drawing/2014/main" id="{7301EA2A-7BEA-4632-8ED7-BDA10E28D245}"/>
+                <a16:creationId xmlns:a16="http://schemas.microsoft.com/office/drawing/2014/main" id="{0C35CCBA-0573-4647-8009-32C853094C23}"/>
               </a:ext>
             </a:extLst>
           </p:cNvPr>
@@ -13000,7 +13524,7 @@
         </p:nvSpPr>
         <p:spPr>
           <a:xfrm>
-            <a:off x="208205" y="9904732"/>
+            <a:off x="208205" y="10169772"/>
             <a:ext cx="2219850" cy="461665"/>
           </a:xfrm>
           <a:prstGeom prst="rect">
@@ -13029,398 +13553,6 @@
             <a:r>
               <a:rPr lang="en-GB" sz="800" dirty="0"/>
               <a:t>Celebration, FL 34747</a:t>
-            </a:r>
-          </a:p>
-        </p:txBody>
-      </p:sp>
-      <p:sp>
-        <p:nvSpPr>
-          <p:cNvPr id="8" name="Rectangle 7">
-            <a:extLst>
-              <a:ext uri="{FF2B5EF4-FFF2-40B4-BE49-F238E27FC236}">
-                <a16:creationId xmlns:a16="http://schemas.microsoft.com/office/drawing/2014/main" id="{289490A7-055A-4A87-8B1B-495B8ACBBA9C}"/>
-              </a:ext>
-            </a:extLst>
-          </p:cNvPr>
-          <p:cNvSpPr/>
-          <p:nvPr/>
-        </p:nvSpPr>
-        <p:spPr>
-          <a:xfrm>
-            <a:off x="0" y="797731"/>
-            <a:ext cx="6858000" cy="1488269"/>
-          </a:xfrm>
-          <a:prstGeom prst="rect">
-            <a:avLst/>
-          </a:prstGeom>
-          <a:solidFill>
-            <a:schemeClr val="bg2">
-              <a:lumMod val="90000"/>
-            </a:schemeClr>
-          </a:solidFill>
-          <a:ln>
-            <a:noFill/>
-          </a:ln>
-        </p:spPr>
-        <p:style>
-          <a:lnRef idx="2">
-            <a:schemeClr val="accent1">
-              <a:shade val="50000"/>
-            </a:schemeClr>
-          </a:lnRef>
-          <a:fillRef idx="1">
-            <a:schemeClr val="accent1"/>
-          </a:fillRef>
-          <a:effectRef idx="0">
-            <a:schemeClr val="accent1"/>
-          </a:effectRef>
-          <a:fontRef idx="minor">
-            <a:schemeClr val="lt1"/>
-          </a:fontRef>
-        </p:style>
-        <p:txBody>
-          <a:bodyPr rtlCol="0" anchor="ctr"/>
-          <a:lstStyle/>
-          <a:p>
-            <a:pPr algn="ctr"/>
-            <a:endParaRPr lang="en-GB" dirty="0"/>
-          </a:p>
-        </p:txBody>
-      </p:sp>
-      <p:sp>
-        <p:nvSpPr>
-          <p:cNvPr id="9" name="TextBox 8">
-            <a:extLst>
-              <a:ext uri="{FF2B5EF4-FFF2-40B4-BE49-F238E27FC236}">
-                <a16:creationId xmlns:a16="http://schemas.microsoft.com/office/drawing/2014/main" id="{C7D3372C-5532-4B65-9D93-821178721EC3}"/>
-              </a:ext>
-            </a:extLst>
-          </p:cNvPr>
-          <p:cNvSpPr txBox="1"/>
-          <p:nvPr/>
-        </p:nvSpPr>
-        <p:spPr>
-          <a:xfrm>
-            <a:off x="3170375" y="1087875"/>
-            <a:ext cx="3320333" cy="830997"/>
-          </a:xfrm>
-          <a:prstGeom prst="rect">
-            <a:avLst/>
-          </a:prstGeom>
-          <a:noFill/>
-        </p:spPr>
-        <p:txBody>
-          <a:bodyPr wrap="none" rtlCol="0">
-            <a:spAutoFit/>
-          </a:bodyPr>
-          <a:lstStyle/>
-          <a:p>
-            <a:pPr algn="r"/>
-            <a:r>
-              <a:rPr lang="en-GB" sz="2400" dirty="0"/>
-              <a:t>Meet Dr. Dennis Smith</a:t>
-            </a:r>
-          </a:p>
-          <a:p>
-            <a:pPr algn="r"/>
-            <a:r>
-              <a:rPr lang="en-GB" sz="2400" dirty="0"/>
-              <a:t>&lt;role, qualifications, etc&gt;</a:t>
-            </a:r>
-          </a:p>
-        </p:txBody>
-      </p:sp>
-      <p:sp>
-        <p:nvSpPr>
-          <p:cNvPr id="17" name="TextBox 16">
-            <a:extLst>
-              <a:ext uri="{FF2B5EF4-FFF2-40B4-BE49-F238E27FC236}">
-                <a16:creationId xmlns:a16="http://schemas.microsoft.com/office/drawing/2014/main" id="{AB6BA657-4CD3-4563-8787-8C01B6DBB89D}"/>
-              </a:ext>
-            </a:extLst>
-          </p:cNvPr>
-          <p:cNvSpPr txBox="1"/>
-          <p:nvPr/>
-        </p:nvSpPr>
-        <p:spPr>
-          <a:xfrm>
-            <a:off x="276376" y="2664551"/>
-            <a:ext cx="4183197" cy="5386090"/>
-          </a:xfrm>
-          <a:prstGeom prst="rect">
-            <a:avLst/>
-          </a:prstGeom>
-          <a:noFill/>
-        </p:spPr>
-        <p:txBody>
-          <a:bodyPr wrap="square" rtlCol="0">
-            <a:spAutoFit/>
-          </a:bodyPr>
-          <a:lstStyle/>
-          <a:p>
-            <a:pPr algn="l"/>
-            <a:r>
-              <a:rPr lang="en-GB" sz="1600" b="1" dirty="0">
-                <a:solidFill>
-                  <a:srgbClr val="000000"/>
-                </a:solidFill>
-              </a:rPr>
-              <a:t>Background</a:t>
-            </a:r>
-            <a:endParaRPr lang="en-GB" sz="1200" b="1" dirty="0">
-              <a:solidFill>
-                <a:srgbClr val="000000"/>
-              </a:solidFill>
-            </a:endParaRPr>
-          </a:p>
-          <a:p>
-            <a:pPr algn="l"/>
-            <a:endParaRPr lang="en-GB" sz="1200" dirty="0">
-              <a:solidFill>
-                <a:srgbClr val="000000"/>
-              </a:solidFill>
-            </a:endParaRPr>
-          </a:p>
-          <a:p>
-            <a:pPr algn="l"/>
-            <a:r>
-              <a:rPr lang="en-GB" sz="1200" b="0" i="0" dirty="0">
-                <a:solidFill>
-                  <a:srgbClr val="000000"/>
-                </a:solidFill>
-                <a:effectLst/>
-              </a:rPr>
-              <a:t>Dr. Dennis C. Smith has been doing bariatric surgery since 1997, when he practiced in Biloxi, MS. In 1999 he began developing a technique for the biliopancreatic diversion with Duodenal Switch to be done completely laparoscopically, which he first performed in November, 1999. He moved from Biloxi to Marietta, Georgia in late 1999. </a:t>
-            </a:r>
-          </a:p>
-          <a:p>
-            <a:pPr algn="l"/>
-            <a:endParaRPr lang="en-GB" sz="1200" dirty="0">
-              <a:solidFill>
-                <a:srgbClr val="000000"/>
-              </a:solidFill>
-            </a:endParaRPr>
-          </a:p>
-          <a:p>
-            <a:pPr algn="l"/>
-            <a:r>
-              <a:rPr lang="en-GB" sz="1200" b="0" i="0" dirty="0">
-                <a:solidFill>
-                  <a:srgbClr val="000000"/>
-                </a:solidFill>
-                <a:effectLst/>
-              </a:rPr>
-              <a:t>Having put together the elements of a bariatric surgery program with the highest possible standards, Dr. Smith in June, 2002 formed his own practice devoted exclusively to bariatric surgery, in order to better serve the morbidly obese population.</a:t>
-            </a:r>
-          </a:p>
-          <a:p>
-            <a:pPr algn="l"/>
-            <a:endParaRPr lang="en-GB" sz="1200" b="0" i="0" dirty="0">
-              <a:solidFill>
-                <a:srgbClr val="000000"/>
-              </a:solidFill>
-              <a:effectLst/>
-            </a:endParaRPr>
-          </a:p>
-          <a:p>
-            <a:pPr algn="l"/>
-            <a:endParaRPr lang="en-GB" sz="1200" dirty="0">
-              <a:solidFill>
-                <a:srgbClr val="000000"/>
-              </a:solidFill>
-            </a:endParaRPr>
-          </a:p>
-          <a:p>
-            <a:pPr algn="l"/>
-            <a:r>
-              <a:rPr lang="en-GB" sz="1600" b="1" i="0" dirty="0">
-                <a:solidFill>
-                  <a:srgbClr val="000000"/>
-                </a:solidFill>
-                <a:effectLst/>
-              </a:rPr>
-              <a:t>Current Work</a:t>
-            </a:r>
-          </a:p>
-          <a:p>
-            <a:pPr algn="l"/>
-            <a:endParaRPr lang="en-GB" sz="1200" dirty="0">
-              <a:solidFill>
-                <a:srgbClr val="000000"/>
-              </a:solidFill>
-            </a:endParaRPr>
-          </a:p>
-          <a:p>
-            <a:pPr algn="l"/>
-            <a:r>
-              <a:rPr lang="en-GB" sz="1200" i="0" dirty="0">
-                <a:solidFill>
-                  <a:srgbClr val="000000"/>
-                </a:solidFill>
-                <a:effectLst/>
-              </a:rPr>
-              <a:t>In early 2015 Dr. Smith moved to the Celebration Bariatric Surgery Program in Celebration, FL and he is now the Medical Director of the Program.</a:t>
-            </a:r>
-          </a:p>
-          <a:p>
-            <a:pPr algn="l"/>
-            <a:endParaRPr lang="en-GB" sz="1200" i="0" dirty="0">
-              <a:solidFill>
-                <a:srgbClr val="000000"/>
-              </a:solidFill>
-              <a:effectLst/>
-            </a:endParaRPr>
-          </a:p>
-          <a:p>
-            <a:pPr algn="l"/>
-            <a:r>
-              <a:rPr lang="en-GB" sz="1200" i="0" dirty="0">
-                <a:solidFill>
-                  <a:srgbClr val="000000"/>
-                </a:solidFill>
-                <a:effectLst/>
-              </a:rPr>
-              <a:t>Dr. Smith is one of only a handful of bariatric surgeons that regularly performs all four of these operations completely laparoscopically. He has done well over two thousand bariatric operations, with excellent short and long-term results.</a:t>
-            </a:r>
-          </a:p>
-          <a:p>
-            <a:pPr algn="l"/>
-            <a:endParaRPr lang="en-GB" sz="1200" dirty="0">
-              <a:solidFill>
-                <a:srgbClr val="000000"/>
-              </a:solidFill>
-            </a:endParaRPr>
-          </a:p>
-          <a:p>
-            <a:pPr algn="l"/>
-            <a:r>
-              <a:rPr lang="en-GB" sz="1200" i="0" dirty="0">
-                <a:solidFill>
-                  <a:srgbClr val="000000"/>
-                </a:solidFill>
-                <a:effectLst/>
-              </a:rPr>
-              <a:t>Continue about the development into using the robot, any extra studies or projects being worked on that are related, etc.</a:t>
-            </a:r>
-            <a:endParaRPr lang="en-GB" sz="1100" i="0" dirty="0">
-              <a:solidFill>
-                <a:srgbClr val="000000"/>
-              </a:solidFill>
-              <a:effectLst/>
-            </a:endParaRPr>
-          </a:p>
-        </p:txBody>
-      </p:sp>
-      <p:sp>
-        <p:nvSpPr>
-          <p:cNvPr id="19" name="Rectangle 18">
-            <a:extLst>
-              <a:ext uri="{FF2B5EF4-FFF2-40B4-BE49-F238E27FC236}">
-                <a16:creationId xmlns:a16="http://schemas.microsoft.com/office/drawing/2014/main" id="{0EB652DB-2148-4752-8B0A-97307B364E7F}"/>
-              </a:ext>
-            </a:extLst>
-          </p:cNvPr>
-          <p:cNvSpPr/>
-          <p:nvPr/>
-        </p:nvSpPr>
-        <p:spPr>
-          <a:xfrm>
-            <a:off x="4745328" y="2664551"/>
-            <a:ext cx="1836295" cy="2117311"/>
-          </a:xfrm>
-          <a:prstGeom prst="rect">
-            <a:avLst/>
-          </a:prstGeom>
-          <a:solidFill>
-            <a:schemeClr val="accent2">
-              <a:lumMod val="75000"/>
-            </a:schemeClr>
-          </a:solidFill>
-          <a:ln>
-            <a:noFill/>
-          </a:ln>
-        </p:spPr>
-        <p:style>
-          <a:lnRef idx="2">
-            <a:schemeClr val="accent1">
-              <a:shade val="50000"/>
-            </a:schemeClr>
-          </a:lnRef>
-          <a:fillRef idx="1">
-            <a:schemeClr val="accent1"/>
-          </a:fillRef>
-          <a:effectRef idx="0">
-            <a:schemeClr val="accent1"/>
-          </a:effectRef>
-          <a:fontRef idx="minor">
-            <a:schemeClr val="lt1"/>
-          </a:fontRef>
-        </p:style>
-        <p:txBody>
-          <a:bodyPr rtlCol="0" anchor="ctr"/>
-          <a:lstStyle/>
-          <a:p>
-            <a:pPr algn="ctr"/>
-            <a:r>
-              <a:rPr lang="en-GB" dirty="0"/>
-              <a:t>Image</a:t>
-            </a:r>
-          </a:p>
-        </p:txBody>
-      </p:sp>
-      <p:sp>
-        <p:nvSpPr>
-          <p:cNvPr id="20" name="Rectangle 19">
-            <a:extLst>
-              <a:ext uri="{FF2B5EF4-FFF2-40B4-BE49-F238E27FC236}">
-                <a16:creationId xmlns:a16="http://schemas.microsoft.com/office/drawing/2014/main" id="{0E6033F6-332D-472E-828B-2343EE8CFE6F}"/>
-              </a:ext>
-            </a:extLst>
-          </p:cNvPr>
-          <p:cNvSpPr/>
-          <p:nvPr/>
-        </p:nvSpPr>
-        <p:spPr>
-          <a:xfrm>
-            <a:off x="4745327" y="5865669"/>
-            <a:ext cx="1836295" cy="2117311"/>
-          </a:xfrm>
-          <a:prstGeom prst="rect">
-            <a:avLst/>
-          </a:prstGeom>
-          <a:solidFill>
-            <a:schemeClr val="accent2">
-              <a:lumMod val="75000"/>
-            </a:schemeClr>
-          </a:solidFill>
-          <a:ln>
-            <a:noFill/>
-          </a:ln>
-        </p:spPr>
-        <p:style>
-          <a:lnRef idx="2">
-            <a:schemeClr val="accent1">
-              <a:shade val="50000"/>
-            </a:schemeClr>
-          </a:lnRef>
-          <a:fillRef idx="1">
-            <a:schemeClr val="accent1"/>
-          </a:fillRef>
-          <a:effectRef idx="0">
-            <a:schemeClr val="accent1"/>
-          </a:effectRef>
-          <a:fontRef idx="minor">
-            <a:schemeClr val="lt1"/>
-          </a:fontRef>
-        </p:style>
-        <p:txBody>
-          <a:bodyPr rtlCol="0" anchor="ctr"/>
-          <a:lstStyle/>
-          <a:p>
-            <a:pPr algn="ctr"/>
-            <a:r>
-              <a:rPr lang="en-GB" dirty="0"/>
-              <a:t>Image</a:t>
             </a:r>
           </a:p>
         </p:txBody>
@@ -13438,7 +13570,7 @@
 </p:sld>
 </file>
 
-<file path=ppt/slides/slide4.xml><?xml version="1.0" encoding="utf-8"?>
+<file path=ppt/slides/slide5.xml><?xml version="1.0" encoding="utf-8"?>
 <p:sld xmlns:a="http://schemas.openxmlformats.org/drawingml/2006/main" xmlns:r="http://schemas.openxmlformats.org/officeDocument/2006/relationships" xmlns:p="http://schemas.openxmlformats.org/presentationml/2006/main">
   <p:cSld>
     <p:spTree>
@@ -13499,7 +13631,7 @@
         </p:nvSpPr>
         <p:spPr>
           <a:xfrm>
-            <a:off x="0" y="9323816"/>
+            <a:off x="0" y="9588856"/>
             <a:ext cx="6858000" cy="1194865"/>
           </a:xfrm>
           <a:prstGeom prst="rect">
@@ -13551,7 +13683,7 @@
         </p:nvSpPr>
         <p:spPr>
           <a:xfrm>
-            <a:off x="4809987" y="9981676"/>
+            <a:off x="4809987" y="10246716"/>
             <a:ext cx="1771639" cy="384721"/>
           </a:xfrm>
           <a:prstGeom prst="rect">
@@ -13593,7 +13725,7 @@
         </p:nvSpPr>
         <p:spPr>
           <a:xfrm>
-            <a:off x="3761623" y="9468381"/>
+            <a:off x="3761623" y="9733421"/>
             <a:ext cx="2820003" cy="261610"/>
           </a:xfrm>
           <a:prstGeom prst="rect">
@@ -13704,7 +13836,7 @@
         </p:blipFill>
         <p:spPr bwMode="auto">
           <a:xfrm>
-            <a:off x="276376" y="9471521"/>
+            <a:off x="276376" y="9736561"/>
             <a:ext cx="1158153" cy="443355"/>
           </a:xfrm>
           <a:prstGeom prst="rect">
@@ -13739,7 +13871,7 @@
         </p:nvSpPr>
         <p:spPr>
           <a:xfrm>
-            <a:off x="208205" y="9904732"/>
+            <a:off x="208205" y="10169772"/>
             <a:ext cx="2219850" cy="461665"/>
           </a:xfrm>
           <a:prstGeom prst="rect">
@@ -13769,6 +13901,475 @@
               <a:rPr lang="en-GB" sz="800" dirty="0"/>
               <a:t>Celebration, FL 34747</a:t>
             </a:r>
+          </a:p>
+        </p:txBody>
+      </p:sp>
+      <p:sp>
+        <p:nvSpPr>
+          <p:cNvPr id="8" name="Rectangle 7">
+            <a:extLst>
+              <a:ext uri="{FF2B5EF4-FFF2-40B4-BE49-F238E27FC236}">
+                <a16:creationId xmlns:a16="http://schemas.microsoft.com/office/drawing/2014/main" id="{25C1D8DD-03AB-4B04-BFCA-9EC7CB2C4E27}"/>
+              </a:ext>
+            </a:extLst>
+          </p:cNvPr>
+          <p:cNvSpPr/>
+          <p:nvPr/>
+        </p:nvSpPr>
+        <p:spPr>
+          <a:xfrm>
+            <a:off x="0" y="797731"/>
+            <a:ext cx="6858000" cy="1488269"/>
+          </a:xfrm>
+          <a:prstGeom prst="rect">
+            <a:avLst/>
+          </a:prstGeom>
+          <a:solidFill>
+            <a:schemeClr val="bg2">
+              <a:lumMod val="90000"/>
+            </a:schemeClr>
+          </a:solidFill>
+          <a:ln>
+            <a:noFill/>
+          </a:ln>
+        </p:spPr>
+        <p:style>
+          <a:lnRef idx="2">
+            <a:schemeClr val="accent1">
+              <a:shade val="50000"/>
+            </a:schemeClr>
+          </a:lnRef>
+          <a:fillRef idx="1">
+            <a:schemeClr val="accent1"/>
+          </a:fillRef>
+          <a:effectRef idx="0">
+            <a:schemeClr val="accent1"/>
+          </a:effectRef>
+          <a:fontRef idx="minor">
+            <a:schemeClr val="lt1"/>
+          </a:fontRef>
+        </p:style>
+        <p:txBody>
+          <a:bodyPr rtlCol="0" anchor="ctr"/>
+          <a:lstStyle/>
+          <a:p>
+            <a:pPr algn="ctr"/>
+            <a:endParaRPr lang="en-GB" dirty="0"/>
+          </a:p>
+        </p:txBody>
+      </p:sp>
+      <p:sp>
+        <p:nvSpPr>
+          <p:cNvPr id="9" name="TextBox 8">
+            <a:extLst>
+              <a:ext uri="{FF2B5EF4-FFF2-40B4-BE49-F238E27FC236}">
+                <a16:creationId xmlns:a16="http://schemas.microsoft.com/office/drawing/2014/main" id="{6E158618-8AA7-4AC7-9191-CE80BC949280}"/>
+              </a:ext>
+            </a:extLst>
+          </p:cNvPr>
+          <p:cNvSpPr txBox="1"/>
+          <p:nvPr/>
+        </p:nvSpPr>
+        <p:spPr>
+          <a:xfrm>
+            <a:off x="1977548" y="1087875"/>
+            <a:ext cx="4513160" cy="830997"/>
+          </a:xfrm>
+          <a:prstGeom prst="rect">
+            <a:avLst/>
+          </a:prstGeom>
+          <a:noFill/>
+        </p:spPr>
+        <p:txBody>
+          <a:bodyPr wrap="none" rtlCol="0">
+            <a:spAutoFit/>
+          </a:bodyPr>
+          <a:lstStyle/>
+          <a:p>
+            <a:pPr algn="r"/>
+            <a:r>
+              <a:rPr lang="en-GB" sz="2400" dirty="0" err="1"/>
+              <a:t>AdventHealth</a:t>
+            </a:r>
+            <a:r>
+              <a:rPr lang="en-GB" sz="2400" dirty="0"/>
+              <a:t> Celebration Hospital</a:t>
+            </a:r>
+          </a:p>
+          <a:p>
+            <a:pPr algn="r"/>
+            <a:r>
+              <a:rPr lang="en-GB" sz="2400" dirty="0"/>
+              <a:t>410 Celebration Place, 34747</a:t>
+            </a:r>
+          </a:p>
+        </p:txBody>
+      </p:sp>
+      <p:sp>
+        <p:nvSpPr>
+          <p:cNvPr id="10" name="TextBox 9">
+            <a:extLst>
+              <a:ext uri="{FF2B5EF4-FFF2-40B4-BE49-F238E27FC236}">
+                <a16:creationId xmlns:a16="http://schemas.microsoft.com/office/drawing/2014/main" id="{211EEC47-4E84-45F9-AA6A-A1A235645818}"/>
+              </a:ext>
+            </a:extLst>
+          </p:cNvPr>
+          <p:cNvSpPr txBox="1"/>
+          <p:nvPr/>
+        </p:nvSpPr>
+        <p:spPr>
+          <a:xfrm>
+            <a:off x="276376" y="2664551"/>
+            <a:ext cx="4183197" cy="2554545"/>
+          </a:xfrm>
+          <a:prstGeom prst="rect">
+            <a:avLst/>
+          </a:prstGeom>
+          <a:noFill/>
+        </p:spPr>
+        <p:txBody>
+          <a:bodyPr wrap="square" rtlCol="0">
+            <a:spAutoFit/>
+          </a:bodyPr>
+          <a:lstStyle/>
+          <a:p>
+            <a:pPr algn="l"/>
+            <a:r>
+              <a:rPr lang="en-GB" sz="1600" b="1" dirty="0">
+                <a:solidFill>
+                  <a:srgbClr val="000000"/>
+                </a:solidFill>
+              </a:rPr>
+              <a:t>About </a:t>
+            </a:r>
+            <a:r>
+              <a:rPr lang="en-GB" sz="1600" b="1" dirty="0" err="1">
+                <a:solidFill>
+                  <a:srgbClr val="000000"/>
+                </a:solidFill>
+              </a:rPr>
+              <a:t>AdventHealth</a:t>
+            </a:r>
+            <a:endParaRPr lang="en-GB" sz="1200" b="1" dirty="0">
+              <a:solidFill>
+                <a:srgbClr val="000000"/>
+              </a:solidFill>
+            </a:endParaRPr>
+          </a:p>
+          <a:p>
+            <a:pPr algn="l"/>
+            <a:endParaRPr lang="en-GB" sz="1200" dirty="0">
+              <a:solidFill>
+                <a:srgbClr val="000000"/>
+              </a:solidFill>
+            </a:endParaRPr>
+          </a:p>
+          <a:p>
+            <a:pPr algn="l"/>
+            <a:r>
+              <a:rPr lang="en-GB" sz="1200" b="0" i="0" dirty="0">
+                <a:solidFill>
+                  <a:srgbClr val="000000"/>
+                </a:solidFill>
+                <a:effectLst/>
+              </a:rPr>
+              <a:t>Dr. Dennis C. Smith has been doing bariatric surgery since 1997, when he practiced in Biloxi, MS. In 1999 he began developing a technique for the biliopancreatic diversion with Duodenal Switch to be done completely laparoscopically, which he first performed in November, 1999. He moved from Biloxi to Marietta, Georgia in late 1999. </a:t>
+            </a:r>
+          </a:p>
+          <a:p>
+            <a:pPr algn="l"/>
+            <a:endParaRPr lang="en-GB" sz="1200" dirty="0">
+              <a:solidFill>
+                <a:srgbClr val="000000"/>
+              </a:solidFill>
+            </a:endParaRPr>
+          </a:p>
+          <a:p>
+            <a:pPr algn="l"/>
+            <a:r>
+              <a:rPr lang="en-GB" sz="1200" b="0" i="0" dirty="0">
+                <a:solidFill>
+                  <a:srgbClr val="000000"/>
+                </a:solidFill>
+                <a:effectLst/>
+              </a:rPr>
+              <a:t>Having put together the elements of a bariatric surgery program with the highest possible standards, Dr. Smith in June, 2002 formed his own practice devoted exclusively to bariatric surgery, in order to better serve the morbidly obese population.</a:t>
+            </a:r>
+          </a:p>
+        </p:txBody>
+      </p:sp>
+      <p:sp>
+        <p:nvSpPr>
+          <p:cNvPr id="11" name="Rectangle 10">
+            <a:extLst>
+              <a:ext uri="{FF2B5EF4-FFF2-40B4-BE49-F238E27FC236}">
+                <a16:creationId xmlns:a16="http://schemas.microsoft.com/office/drawing/2014/main" id="{2B7F510A-E1FB-45FF-9DD0-E0AC83B9831B}"/>
+              </a:ext>
+            </a:extLst>
+          </p:cNvPr>
+          <p:cNvSpPr/>
+          <p:nvPr/>
+        </p:nvSpPr>
+        <p:spPr>
+          <a:xfrm>
+            <a:off x="4654413" y="2664551"/>
+            <a:ext cx="1836295" cy="2117311"/>
+          </a:xfrm>
+          <a:prstGeom prst="rect">
+            <a:avLst/>
+          </a:prstGeom>
+          <a:solidFill>
+            <a:schemeClr val="accent2">
+              <a:lumMod val="75000"/>
+            </a:schemeClr>
+          </a:solidFill>
+          <a:ln>
+            <a:noFill/>
+          </a:ln>
+        </p:spPr>
+        <p:style>
+          <a:lnRef idx="2">
+            <a:schemeClr val="accent1">
+              <a:shade val="50000"/>
+            </a:schemeClr>
+          </a:lnRef>
+          <a:fillRef idx="1">
+            <a:schemeClr val="accent1"/>
+          </a:fillRef>
+          <a:effectRef idx="0">
+            <a:schemeClr val="accent1"/>
+          </a:effectRef>
+          <a:fontRef idx="minor">
+            <a:schemeClr val="lt1"/>
+          </a:fontRef>
+        </p:style>
+        <p:txBody>
+          <a:bodyPr rtlCol="0" anchor="ctr"/>
+          <a:lstStyle/>
+          <a:p>
+            <a:pPr algn="ctr"/>
+            <a:r>
+              <a:rPr lang="en-GB" dirty="0"/>
+              <a:t>Image</a:t>
+            </a:r>
+          </a:p>
+        </p:txBody>
+      </p:sp>
+      <p:sp>
+        <p:nvSpPr>
+          <p:cNvPr id="13" name="Freeform: Shape 12">
+            <a:extLst>
+              <a:ext uri="{FF2B5EF4-FFF2-40B4-BE49-F238E27FC236}">
+                <a16:creationId xmlns:a16="http://schemas.microsoft.com/office/drawing/2014/main" id="{E5A96175-5DBD-4607-82BD-F79CA9F7CA32}"/>
+              </a:ext>
+            </a:extLst>
+          </p:cNvPr>
+          <p:cNvSpPr/>
+          <p:nvPr/>
+        </p:nvSpPr>
+        <p:spPr>
+          <a:xfrm>
+            <a:off x="6640340" y="3603257"/>
+            <a:ext cx="90415" cy="239898"/>
+          </a:xfrm>
+          <a:custGeom>
+            <a:avLst/>
+            <a:gdLst>
+              <a:gd name="connsiteX0" fmla="*/ 119063 w 319087"/>
+              <a:gd name="connsiteY0" fmla="*/ 0 h 533400"/>
+              <a:gd name="connsiteX1" fmla="*/ 0 w 319087"/>
+              <a:gd name="connsiteY1" fmla="*/ 0 h 533400"/>
+              <a:gd name="connsiteX2" fmla="*/ 200025 w 319087"/>
+              <a:gd name="connsiteY2" fmla="*/ 266700 h 533400"/>
+              <a:gd name="connsiteX3" fmla="*/ 0 w 319087"/>
+              <a:gd name="connsiteY3" fmla="*/ 533400 h 533400"/>
+              <a:gd name="connsiteX4" fmla="*/ 119063 w 319087"/>
+              <a:gd name="connsiteY4" fmla="*/ 533400 h 533400"/>
+              <a:gd name="connsiteX5" fmla="*/ 319088 w 319087"/>
+              <a:gd name="connsiteY5" fmla="*/ 266700 h 533400"/>
+              <a:gd name="connsiteX6" fmla="*/ 119063 w 319087"/>
+              <a:gd name="connsiteY6" fmla="*/ 0 h 533400"/>
+            </a:gdLst>
+            <a:ahLst/>
+            <a:cxnLst>
+              <a:cxn ang="0">
+                <a:pos x="connsiteX0" y="connsiteY0"/>
+              </a:cxn>
+              <a:cxn ang="0">
+                <a:pos x="connsiteX1" y="connsiteY1"/>
+              </a:cxn>
+              <a:cxn ang="0">
+                <a:pos x="connsiteX2" y="connsiteY2"/>
+              </a:cxn>
+              <a:cxn ang="0">
+                <a:pos x="connsiteX3" y="connsiteY3"/>
+              </a:cxn>
+              <a:cxn ang="0">
+                <a:pos x="connsiteX4" y="connsiteY4"/>
+              </a:cxn>
+              <a:cxn ang="0">
+                <a:pos x="connsiteX5" y="connsiteY5"/>
+              </a:cxn>
+              <a:cxn ang="0">
+                <a:pos x="connsiteX6" y="connsiteY6"/>
+              </a:cxn>
+            </a:cxnLst>
+            <a:rect l="l" t="t" r="r" b="b"/>
+            <a:pathLst>
+              <a:path w="319087" h="533400">
+                <a:moveTo>
+                  <a:pt x="119063" y="0"/>
+                </a:moveTo>
+                <a:lnTo>
+                  <a:pt x="0" y="0"/>
+                </a:lnTo>
+                <a:lnTo>
+                  <a:pt x="200025" y="266700"/>
+                </a:lnTo>
+                <a:lnTo>
+                  <a:pt x="0" y="533400"/>
+                </a:lnTo>
+                <a:lnTo>
+                  <a:pt x="119063" y="533400"/>
+                </a:lnTo>
+                <a:lnTo>
+                  <a:pt x="319088" y="266700"/>
+                </a:lnTo>
+                <a:lnTo>
+                  <a:pt x="119063" y="0"/>
+                </a:lnTo>
+                <a:close/>
+              </a:path>
+            </a:pathLst>
+          </a:custGeom>
+          <a:solidFill>
+            <a:schemeClr val="tx1"/>
+          </a:solidFill>
+          <a:ln w="9525" cap="flat">
+            <a:noFill/>
+            <a:prstDash val="solid"/>
+            <a:miter/>
+          </a:ln>
+        </p:spPr>
+        <p:txBody>
+          <a:bodyPr rot="0" spcFirstLastPara="0" vertOverflow="overflow" horzOverflow="overflow" vert="horz" wrap="square" lIns="91440" tIns="45720" rIns="91440" bIns="45720" numCol="1" spcCol="0" rtlCol="0" fromWordArt="0" anchor="ctr" anchorCtr="0" forceAA="0" compatLnSpc="1">
+            <a:prstTxWarp prst="textNoShape">
+              <a:avLst/>
+            </a:prstTxWarp>
+            <a:noAutofit/>
+          </a:bodyPr>
+          <a:lstStyle/>
+          <a:p>
+            <a:endParaRPr lang="en-GB" sz="1400"/>
+          </a:p>
+        </p:txBody>
+      </p:sp>
+      <p:sp>
+        <p:nvSpPr>
+          <p:cNvPr id="14" name="Freeform: Shape 13">
+            <a:extLst>
+              <a:ext uri="{FF2B5EF4-FFF2-40B4-BE49-F238E27FC236}">
+                <a16:creationId xmlns:a16="http://schemas.microsoft.com/office/drawing/2014/main" id="{86ED094B-8221-4B95-B3C4-C091883A5458}"/>
+              </a:ext>
+            </a:extLst>
+          </p:cNvPr>
+          <p:cNvSpPr/>
+          <p:nvPr/>
+        </p:nvSpPr>
+        <p:spPr>
+          <a:xfrm flipH="1">
+            <a:off x="114666" y="3603257"/>
+            <a:ext cx="90415" cy="239898"/>
+          </a:xfrm>
+          <a:custGeom>
+            <a:avLst/>
+            <a:gdLst>
+              <a:gd name="connsiteX0" fmla="*/ 119063 w 319087"/>
+              <a:gd name="connsiteY0" fmla="*/ 0 h 533400"/>
+              <a:gd name="connsiteX1" fmla="*/ 0 w 319087"/>
+              <a:gd name="connsiteY1" fmla="*/ 0 h 533400"/>
+              <a:gd name="connsiteX2" fmla="*/ 200025 w 319087"/>
+              <a:gd name="connsiteY2" fmla="*/ 266700 h 533400"/>
+              <a:gd name="connsiteX3" fmla="*/ 0 w 319087"/>
+              <a:gd name="connsiteY3" fmla="*/ 533400 h 533400"/>
+              <a:gd name="connsiteX4" fmla="*/ 119063 w 319087"/>
+              <a:gd name="connsiteY4" fmla="*/ 533400 h 533400"/>
+              <a:gd name="connsiteX5" fmla="*/ 319088 w 319087"/>
+              <a:gd name="connsiteY5" fmla="*/ 266700 h 533400"/>
+              <a:gd name="connsiteX6" fmla="*/ 119063 w 319087"/>
+              <a:gd name="connsiteY6" fmla="*/ 0 h 533400"/>
+            </a:gdLst>
+            <a:ahLst/>
+            <a:cxnLst>
+              <a:cxn ang="0">
+                <a:pos x="connsiteX0" y="connsiteY0"/>
+              </a:cxn>
+              <a:cxn ang="0">
+                <a:pos x="connsiteX1" y="connsiteY1"/>
+              </a:cxn>
+              <a:cxn ang="0">
+                <a:pos x="connsiteX2" y="connsiteY2"/>
+              </a:cxn>
+              <a:cxn ang="0">
+                <a:pos x="connsiteX3" y="connsiteY3"/>
+              </a:cxn>
+              <a:cxn ang="0">
+                <a:pos x="connsiteX4" y="connsiteY4"/>
+              </a:cxn>
+              <a:cxn ang="0">
+                <a:pos x="connsiteX5" y="connsiteY5"/>
+              </a:cxn>
+              <a:cxn ang="0">
+                <a:pos x="connsiteX6" y="connsiteY6"/>
+              </a:cxn>
+            </a:cxnLst>
+            <a:rect l="l" t="t" r="r" b="b"/>
+            <a:pathLst>
+              <a:path w="319087" h="533400">
+                <a:moveTo>
+                  <a:pt x="119063" y="0"/>
+                </a:moveTo>
+                <a:lnTo>
+                  <a:pt x="0" y="0"/>
+                </a:lnTo>
+                <a:lnTo>
+                  <a:pt x="200025" y="266700"/>
+                </a:lnTo>
+                <a:lnTo>
+                  <a:pt x="0" y="533400"/>
+                </a:lnTo>
+                <a:lnTo>
+                  <a:pt x="119063" y="533400"/>
+                </a:lnTo>
+                <a:lnTo>
+                  <a:pt x="319088" y="266700"/>
+                </a:lnTo>
+                <a:lnTo>
+                  <a:pt x="119063" y="0"/>
+                </a:lnTo>
+                <a:close/>
+              </a:path>
+            </a:pathLst>
+          </a:custGeom>
+          <a:solidFill>
+            <a:schemeClr val="tx1"/>
+          </a:solidFill>
+          <a:ln w="9525" cap="flat">
+            <a:noFill/>
+            <a:prstDash val="solid"/>
+            <a:miter/>
+          </a:ln>
+        </p:spPr>
+        <p:txBody>
+          <a:bodyPr rot="0" spcFirstLastPara="0" vertOverflow="overflow" horzOverflow="overflow" vert="horz" wrap="square" lIns="91440" tIns="45720" rIns="91440" bIns="45720" numCol="1" spcCol="0" rtlCol="0" fromWordArt="0" anchor="ctr" anchorCtr="0" forceAA="0" compatLnSpc="1">
+            <a:prstTxWarp prst="textNoShape">
+              <a:avLst/>
+            </a:prstTxWarp>
+            <a:noAutofit/>
+          </a:bodyPr>
+          <a:lstStyle/>
+          <a:p>
+            <a:endParaRPr lang="en-GB" sz="1400"/>
           </a:p>
         </p:txBody>
       </p:sp>

</xml_diff>

<commit_message>
Modified hospital.html and completed for now
</commit_message>
<xml_diff>
--- a/Website Design Tools.pptx
+++ b/Website Design Tools.pptx
@@ -14020,7 +14020,7 @@
         <p:spPr>
           <a:xfrm>
             <a:off x="276376" y="2664551"/>
-            <a:ext cx="4183197" cy="2554545"/>
+            <a:ext cx="6214332" cy="6063198"/>
           </a:xfrm>
           <a:prstGeom prst="rect">
             <a:avLst/>
@@ -14035,37 +14035,50 @@
           <a:p>
             <a:pPr algn="l"/>
             <a:r>
-              <a:rPr lang="en-GB" sz="1600" b="1" dirty="0">
+              <a:rPr lang="en-GB" sz="1600" b="1" i="0" dirty="0">
                 <a:solidFill>
                   <a:srgbClr val="000000"/>
                 </a:solidFill>
+                <a:effectLst/>
               </a:rPr>
               <a:t>About </a:t>
             </a:r>
             <a:r>
-              <a:rPr lang="en-GB" sz="1600" b="1" dirty="0" err="1">
+              <a:rPr lang="en-GB" sz="1600" b="1" i="0" dirty="0" err="1">
                 <a:solidFill>
                   <a:srgbClr val="000000"/>
                 </a:solidFill>
+                <a:effectLst/>
               </a:rPr>
               <a:t>AdventHealth</a:t>
             </a:r>
-            <a:endParaRPr lang="en-GB" sz="1200" b="1" dirty="0">
+            <a:endParaRPr lang="en-GB" sz="1600" b="1" i="0" dirty="0">
               <a:solidFill>
                 <a:srgbClr val="000000"/>
               </a:solidFill>
+              <a:effectLst/>
             </a:endParaRPr>
           </a:p>
           <a:p>
             <a:pPr algn="l"/>
-            <a:endParaRPr lang="en-GB" sz="1200" dirty="0">
+            <a:endParaRPr lang="en-GB" sz="1200" b="0" i="0" dirty="0">
               <a:solidFill>
                 <a:srgbClr val="000000"/>
               </a:solidFill>
+              <a:effectLst/>
             </a:endParaRPr>
           </a:p>
           <a:p>
             <a:pPr algn="l"/>
+            <a:r>
+              <a:rPr lang="en-GB" sz="1200" b="0" i="0" dirty="0" err="1">
+                <a:solidFill>
+                  <a:srgbClr val="000000"/>
+                </a:solidFill>
+                <a:effectLst/>
+              </a:rPr>
+              <a:t>AdventHealth</a:t>
+            </a:r>
             <a:r>
               <a:rPr lang="en-GB" sz="1200" b="0" i="0" dirty="0">
                 <a:solidFill>
@@ -14073,19 +14086,29 @@
                 </a:solidFill>
                 <a:effectLst/>
               </a:rPr>
-              <a:t>Dr. Dennis C. Smith has been doing bariatric surgery since 1997, when he practiced in Biloxi, MS. In 1999 he began developing a technique for the biliopancreatic diversion with Duodenal Switch to be done completely laparoscopically, which he first performed in November, 1999. He moved from Biloxi to Marietta, Georgia in late 1999. </a:t>
+              <a:t> Celebration Hospital is a 172-bed, state-of-the-art hospital that serves as a showcase of innovation and excellence in healthcare. Our reputation for delivering highly efficient, patient-focused and cost effective care allows us to achieve optimum health and wellness for patients with an emphasis on healing the whole person - mind, body and spirit.</a:t>
             </a:r>
           </a:p>
           <a:p>
             <a:pPr algn="l"/>
-            <a:endParaRPr lang="en-GB" sz="1200" dirty="0">
+            <a:endParaRPr lang="en-GB" sz="1200" b="0" i="0" dirty="0">
               <a:solidFill>
                 <a:srgbClr val="000000"/>
               </a:solidFill>
+              <a:effectLst/>
             </a:endParaRPr>
           </a:p>
           <a:p>
             <a:pPr algn="l"/>
+            <a:r>
+              <a:rPr lang="en-GB" sz="1200" b="0" i="0" dirty="0" err="1">
+                <a:solidFill>
+                  <a:srgbClr val="000000"/>
+                </a:solidFill>
+                <a:effectLst/>
+              </a:rPr>
+              <a:t>AdventHealth</a:t>
+            </a:r>
             <a:r>
               <a:rPr lang="en-GB" sz="1200" b="0" i="0" dirty="0">
                 <a:solidFill>
@@ -14093,283 +14116,155 @@
                 </a:solidFill>
                 <a:effectLst/>
               </a:rPr>
-              <a:t>Having put together the elements of a bariatric surgery program with the highest possible standards, Dr. Smith in June, 2002 formed his own practice devoted exclusively to bariatric surgery, in order to better serve the morbidly obese population.</a:t>
-            </a:r>
-          </a:p>
-        </p:txBody>
-      </p:sp>
-      <p:sp>
-        <p:nvSpPr>
-          <p:cNvPr id="11" name="Rectangle 10">
-            <a:extLst>
-              <a:ext uri="{FF2B5EF4-FFF2-40B4-BE49-F238E27FC236}">
-                <a16:creationId xmlns:a16="http://schemas.microsoft.com/office/drawing/2014/main" id="{2B7F510A-E1FB-45FF-9DD0-E0AC83B9831B}"/>
-              </a:ext>
-            </a:extLst>
-          </p:cNvPr>
-          <p:cNvSpPr/>
-          <p:nvPr/>
-        </p:nvSpPr>
-        <p:spPr>
-          <a:xfrm>
-            <a:off x="4654413" y="2664551"/>
-            <a:ext cx="1836295" cy="2117311"/>
-          </a:xfrm>
-          <a:prstGeom prst="rect">
-            <a:avLst/>
-          </a:prstGeom>
-          <a:solidFill>
-            <a:schemeClr val="accent2">
-              <a:lumMod val="75000"/>
-            </a:schemeClr>
-          </a:solidFill>
-          <a:ln>
-            <a:noFill/>
-          </a:ln>
-        </p:spPr>
-        <p:style>
-          <a:lnRef idx="2">
-            <a:schemeClr val="accent1">
-              <a:shade val="50000"/>
-            </a:schemeClr>
-          </a:lnRef>
-          <a:fillRef idx="1">
-            <a:schemeClr val="accent1"/>
-          </a:fillRef>
-          <a:effectRef idx="0">
-            <a:schemeClr val="accent1"/>
-          </a:effectRef>
-          <a:fontRef idx="minor">
-            <a:schemeClr val="lt1"/>
-          </a:fontRef>
-        </p:style>
-        <p:txBody>
-          <a:bodyPr rtlCol="0" anchor="ctr"/>
-          <a:lstStyle/>
-          <a:p>
-            <a:pPr algn="ctr"/>
-            <a:r>
-              <a:rPr lang="en-GB" dirty="0"/>
-              <a:t>Image</a:t>
-            </a:r>
-          </a:p>
-        </p:txBody>
-      </p:sp>
-      <p:sp>
-        <p:nvSpPr>
-          <p:cNvPr id="13" name="Freeform: Shape 12">
-            <a:extLst>
-              <a:ext uri="{FF2B5EF4-FFF2-40B4-BE49-F238E27FC236}">
-                <a16:creationId xmlns:a16="http://schemas.microsoft.com/office/drawing/2014/main" id="{E5A96175-5DBD-4607-82BD-F79CA9F7CA32}"/>
-              </a:ext>
-            </a:extLst>
-          </p:cNvPr>
-          <p:cNvSpPr/>
-          <p:nvPr/>
-        </p:nvSpPr>
-        <p:spPr>
-          <a:xfrm>
-            <a:off x="6640340" y="3603257"/>
-            <a:ext cx="90415" cy="239898"/>
-          </a:xfrm>
-          <a:custGeom>
-            <a:avLst/>
-            <a:gdLst>
-              <a:gd name="connsiteX0" fmla="*/ 119063 w 319087"/>
-              <a:gd name="connsiteY0" fmla="*/ 0 h 533400"/>
-              <a:gd name="connsiteX1" fmla="*/ 0 w 319087"/>
-              <a:gd name="connsiteY1" fmla="*/ 0 h 533400"/>
-              <a:gd name="connsiteX2" fmla="*/ 200025 w 319087"/>
-              <a:gd name="connsiteY2" fmla="*/ 266700 h 533400"/>
-              <a:gd name="connsiteX3" fmla="*/ 0 w 319087"/>
-              <a:gd name="connsiteY3" fmla="*/ 533400 h 533400"/>
-              <a:gd name="connsiteX4" fmla="*/ 119063 w 319087"/>
-              <a:gd name="connsiteY4" fmla="*/ 533400 h 533400"/>
-              <a:gd name="connsiteX5" fmla="*/ 319088 w 319087"/>
-              <a:gd name="connsiteY5" fmla="*/ 266700 h 533400"/>
-              <a:gd name="connsiteX6" fmla="*/ 119063 w 319087"/>
-              <a:gd name="connsiteY6" fmla="*/ 0 h 533400"/>
-            </a:gdLst>
-            <a:ahLst/>
-            <a:cxnLst>
-              <a:cxn ang="0">
-                <a:pos x="connsiteX0" y="connsiteY0"/>
-              </a:cxn>
-              <a:cxn ang="0">
-                <a:pos x="connsiteX1" y="connsiteY1"/>
-              </a:cxn>
-              <a:cxn ang="0">
-                <a:pos x="connsiteX2" y="connsiteY2"/>
-              </a:cxn>
-              <a:cxn ang="0">
-                <a:pos x="connsiteX3" y="connsiteY3"/>
-              </a:cxn>
-              <a:cxn ang="0">
-                <a:pos x="connsiteX4" y="connsiteY4"/>
-              </a:cxn>
-              <a:cxn ang="0">
-                <a:pos x="connsiteX5" y="connsiteY5"/>
-              </a:cxn>
-              <a:cxn ang="0">
-                <a:pos x="connsiteX6" y="connsiteY6"/>
-              </a:cxn>
-            </a:cxnLst>
-            <a:rect l="l" t="t" r="r" b="b"/>
-            <a:pathLst>
-              <a:path w="319087" h="533400">
-                <a:moveTo>
-                  <a:pt x="119063" y="0"/>
-                </a:moveTo>
-                <a:lnTo>
-                  <a:pt x="0" y="0"/>
-                </a:lnTo>
-                <a:lnTo>
-                  <a:pt x="200025" y="266700"/>
-                </a:lnTo>
-                <a:lnTo>
-                  <a:pt x="0" y="533400"/>
-                </a:lnTo>
-                <a:lnTo>
-                  <a:pt x="119063" y="533400"/>
-                </a:lnTo>
-                <a:lnTo>
-                  <a:pt x="319088" y="266700"/>
-                </a:lnTo>
-                <a:lnTo>
-                  <a:pt x="119063" y="0"/>
-                </a:lnTo>
-                <a:close/>
-              </a:path>
-            </a:pathLst>
-          </a:custGeom>
-          <a:solidFill>
-            <a:schemeClr val="tx1"/>
-          </a:solidFill>
-          <a:ln w="9525" cap="flat">
-            <a:noFill/>
-            <a:prstDash val="solid"/>
-            <a:miter/>
-          </a:ln>
-        </p:spPr>
-        <p:txBody>
-          <a:bodyPr rot="0" spcFirstLastPara="0" vertOverflow="overflow" horzOverflow="overflow" vert="horz" wrap="square" lIns="91440" tIns="45720" rIns="91440" bIns="45720" numCol="1" spcCol="0" rtlCol="0" fromWordArt="0" anchor="ctr" anchorCtr="0" forceAA="0" compatLnSpc="1">
-            <a:prstTxWarp prst="textNoShape">
-              <a:avLst/>
-            </a:prstTxWarp>
-            <a:noAutofit/>
-          </a:bodyPr>
-          <a:lstStyle/>
-          <a:p>
-            <a:endParaRPr lang="en-GB" sz="1400"/>
-          </a:p>
-        </p:txBody>
-      </p:sp>
-      <p:sp>
-        <p:nvSpPr>
-          <p:cNvPr id="14" name="Freeform: Shape 13">
-            <a:extLst>
-              <a:ext uri="{FF2B5EF4-FFF2-40B4-BE49-F238E27FC236}">
-                <a16:creationId xmlns:a16="http://schemas.microsoft.com/office/drawing/2014/main" id="{86ED094B-8221-4B95-B3C4-C091883A5458}"/>
-              </a:ext>
-            </a:extLst>
-          </p:cNvPr>
-          <p:cNvSpPr/>
-          <p:nvPr/>
-        </p:nvSpPr>
-        <p:spPr>
-          <a:xfrm flipH="1">
-            <a:off x="114666" y="3603257"/>
-            <a:ext cx="90415" cy="239898"/>
-          </a:xfrm>
-          <a:custGeom>
-            <a:avLst/>
-            <a:gdLst>
-              <a:gd name="connsiteX0" fmla="*/ 119063 w 319087"/>
-              <a:gd name="connsiteY0" fmla="*/ 0 h 533400"/>
-              <a:gd name="connsiteX1" fmla="*/ 0 w 319087"/>
-              <a:gd name="connsiteY1" fmla="*/ 0 h 533400"/>
-              <a:gd name="connsiteX2" fmla="*/ 200025 w 319087"/>
-              <a:gd name="connsiteY2" fmla="*/ 266700 h 533400"/>
-              <a:gd name="connsiteX3" fmla="*/ 0 w 319087"/>
-              <a:gd name="connsiteY3" fmla="*/ 533400 h 533400"/>
-              <a:gd name="connsiteX4" fmla="*/ 119063 w 319087"/>
-              <a:gd name="connsiteY4" fmla="*/ 533400 h 533400"/>
-              <a:gd name="connsiteX5" fmla="*/ 319088 w 319087"/>
-              <a:gd name="connsiteY5" fmla="*/ 266700 h 533400"/>
-              <a:gd name="connsiteX6" fmla="*/ 119063 w 319087"/>
-              <a:gd name="connsiteY6" fmla="*/ 0 h 533400"/>
-            </a:gdLst>
-            <a:ahLst/>
-            <a:cxnLst>
-              <a:cxn ang="0">
-                <a:pos x="connsiteX0" y="connsiteY0"/>
-              </a:cxn>
-              <a:cxn ang="0">
-                <a:pos x="connsiteX1" y="connsiteY1"/>
-              </a:cxn>
-              <a:cxn ang="0">
-                <a:pos x="connsiteX2" y="connsiteY2"/>
-              </a:cxn>
-              <a:cxn ang="0">
-                <a:pos x="connsiteX3" y="connsiteY3"/>
-              </a:cxn>
-              <a:cxn ang="0">
-                <a:pos x="connsiteX4" y="connsiteY4"/>
-              </a:cxn>
-              <a:cxn ang="0">
-                <a:pos x="connsiteX5" y="connsiteY5"/>
-              </a:cxn>
-              <a:cxn ang="0">
-                <a:pos x="connsiteX6" y="connsiteY6"/>
-              </a:cxn>
-            </a:cxnLst>
-            <a:rect l="l" t="t" r="r" b="b"/>
-            <a:pathLst>
-              <a:path w="319087" h="533400">
-                <a:moveTo>
-                  <a:pt x="119063" y="0"/>
-                </a:moveTo>
-                <a:lnTo>
-                  <a:pt x="0" y="0"/>
-                </a:lnTo>
-                <a:lnTo>
-                  <a:pt x="200025" y="266700"/>
-                </a:lnTo>
-                <a:lnTo>
-                  <a:pt x="0" y="533400"/>
-                </a:lnTo>
-                <a:lnTo>
-                  <a:pt x="119063" y="533400"/>
-                </a:lnTo>
-                <a:lnTo>
-                  <a:pt x="319088" y="266700"/>
-                </a:lnTo>
-                <a:lnTo>
-                  <a:pt x="119063" y="0"/>
-                </a:lnTo>
-                <a:close/>
-              </a:path>
-            </a:pathLst>
-          </a:custGeom>
-          <a:solidFill>
-            <a:schemeClr val="tx1"/>
-          </a:solidFill>
-          <a:ln w="9525" cap="flat">
-            <a:noFill/>
-            <a:prstDash val="solid"/>
-            <a:miter/>
-          </a:ln>
-        </p:spPr>
-        <p:txBody>
-          <a:bodyPr rot="0" spcFirstLastPara="0" vertOverflow="overflow" horzOverflow="overflow" vert="horz" wrap="square" lIns="91440" tIns="45720" rIns="91440" bIns="45720" numCol="1" spcCol="0" rtlCol="0" fromWordArt="0" anchor="ctr" anchorCtr="0" forceAA="0" compatLnSpc="1">
-            <a:prstTxWarp prst="textNoShape">
-              <a:avLst/>
-            </a:prstTxWarp>
-            <a:noAutofit/>
-          </a:bodyPr>
-          <a:lstStyle/>
-          <a:p>
-            <a:endParaRPr lang="en-GB" sz="1400"/>
+              <a:t> Celebration Hospital is part of the </a:t>
+            </a:r>
+            <a:r>
+              <a:rPr lang="en-GB" sz="1200" b="0" i="0" dirty="0" err="1">
+                <a:solidFill>
+                  <a:srgbClr val="000000"/>
+                </a:solidFill>
+                <a:effectLst/>
+              </a:rPr>
+              <a:t>AdventHealth</a:t>
+            </a:r>
+            <a:r>
+              <a:rPr lang="en-GB" sz="1200" b="0" i="0" dirty="0">
+                <a:solidFill>
+                  <a:srgbClr val="000000"/>
+                </a:solidFill>
+                <a:effectLst/>
+              </a:rPr>
+              <a:t> network, which is operated by the Seventh-day Adventist Church. Serving much of the </a:t>
+            </a:r>
+            <a:r>
+              <a:rPr lang="en-GB" sz="1200" b="0" i="0" dirty="0" err="1">
+                <a:solidFill>
+                  <a:srgbClr val="000000"/>
+                </a:solidFill>
+                <a:effectLst/>
+              </a:rPr>
+              <a:t>Southeastern</a:t>
+            </a:r>
+            <a:r>
+              <a:rPr lang="en-GB" sz="1200" b="0" i="0" dirty="0">
+                <a:solidFill>
+                  <a:srgbClr val="000000"/>
+                </a:solidFill>
+                <a:effectLst/>
+              </a:rPr>
+              <a:t> United States, the Caribbean and South America, the Adventist Health System operates 44 hospitals in 10 states, making it the largest protestant, not-for-profit healthcare systems in the country.</a:t>
+            </a:r>
+          </a:p>
+          <a:p>
+            <a:pPr algn="l"/>
+            <a:br>
+              <a:rPr lang="en-GB" sz="1600" dirty="0"/>
+            </a:br>
+            <a:r>
+              <a:rPr lang="en-GB" sz="1600" b="1" i="0" dirty="0">
+                <a:solidFill>
+                  <a:srgbClr val="000000"/>
+                </a:solidFill>
+                <a:effectLst/>
+              </a:rPr>
+              <a:t>The Hospital</a:t>
+            </a:r>
+          </a:p>
+          <a:p>
+            <a:pPr algn="l"/>
+            <a:endParaRPr lang="en-GB" sz="1200" b="0" i="0" dirty="0">
+              <a:solidFill>
+                <a:srgbClr val="000000"/>
+              </a:solidFill>
+              <a:effectLst/>
+            </a:endParaRPr>
+          </a:p>
+          <a:p>
+            <a:pPr algn="l"/>
+            <a:r>
+              <a:rPr lang="en-GB" sz="1200" b="0" i="0" dirty="0">
+                <a:solidFill>
+                  <a:srgbClr val="000000"/>
+                </a:solidFill>
+                <a:effectLst/>
+              </a:rPr>
+              <a:t>Established in 1997, Celebration Hospital was designed as a resort-style facility to serve as a cornerstone of health in the Disney-planned community of Celebration, Florida. Our Mediterranean inspired facility that features leading edge technologies and superior patient care that has earned it an international reputation for excellence.</a:t>
+            </a:r>
+          </a:p>
+          <a:p>
+            <a:pPr algn="l"/>
+            <a:endParaRPr lang="en-GB" sz="1200" b="0" i="0" dirty="0">
+              <a:solidFill>
+                <a:srgbClr val="000000"/>
+              </a:solidFill>
+              <a:effectLst/>
+            </a:endParaRPr>
+          </a:p>
+          <a:p>
+            <a:pPr algn="l"/>
+            <a:r>
+              <a:rPr lang="en-GB" sz="1200" b="0" i="0" dirty="0">
+                <a:solidFill>
+                  <a:srgbClr val="000000"/>
+                </a:solidFill>
+                <a:effectLst/>
+              </a:rPr>
+              <a:t>With its expansive open spaces, natural lighting and stunning architecture, </a:t>
+            </a:r>
+            <a:r>
+              <a:rPr lang="en-GB" sz="1200" b="0" i="0" dirty="0" err="1">
+                <a:solidFill>
+                  <a:srgbClr val="000000"/>
+                </a:solidFill>
+                <a:effectLst/>
+              </a:rPr>
+              <a:t>AdventHealth</a:t>
+            </a:r>
+            <a:r>
+              <a:rPr lang="en-GB" sz="1200" b="0" i="0" dirty="0">
+                <a:solidFill>
+                  <a:srgbClr val="000000"/>
+                </a:solidFill>
+                <a:effectLst/>
+              </a:rPr>
+              <a:t> Celebration Hospital looks like a sophisticated resort. But look deeper and you will find a state-of-the-art facility that is dedicated entirely to health and wellness.</a:t>
+            </a:r>
+          </a:p>
+          <a:p>
+            <a:pPr algn="l"/>
+            <a:br>
+              <a:rPr lang="en-GB" sz="1200" dirty="0"/>
+            </a:br>
+            <a:r>
+              <a:rPr lang="en-GB" sz="1600" b="1" i="0" dirty="0">
+                <a:solidFill>
+                  <a:srgbClr val="000000"/>
+                </a:solidFill>
+                <a:effectLst/>
+              </a:rPr>
+              <a:t>The Bariatric Ward</a:t>
+            </a:r>
+          </a:p>
+          <a:p>
+            <a:pPr algn="l"/>
+            <a:endParaRPr lang="en-GB" sz="1200" b="0" i="0" dirty="0">
+              <a:solidFill>
+                <a:srgbClr val="000000"/>
+              </a:solidFill>
+              <a:effectLst/>
+            </a:endParaRPr>
+          </a:p>
+          <a:p>
+            <a:pPr algn="l"/>
+            <a:r>
+              <a:rPr lang="en-GB" sz="1200" b="0" i="0" dirty="0">
+                <a:solidFill>
+                  <a:srgbClr val="000000"/>
+                </a:solidFill>
+                <a:effectLst/>
+              </a:rPr>
+              <a:t>We have a hospital ward that is designated for our bariatric patients. Our nurses have training in the care of bariatric patients. We are proud to have achieved and maintained accreditation from the Metabolic and Bariatric Surgery Accreditation and Quality Improvement Program. We make every effort to maintain the highest standards possible in the care of our bariatric surgery patients. We also try to make the experience of having surgery here as smooth and comfortable as possible for you and for your loved ones.</a:t>
+            </a:r>
           </a:p>
         </p:txBody>
       </p:sp>

</xml_diff>

<commit_message>
Designed and created procedures.html, completed for now
</commit_message>
<xml_diff>
--- a/Website Design Tools.pptx
+++ b/Website Design Tools.pptx
@@ -5,7 +5,7 @@
     <p:sldMasterId id="2147483672" r:id="rId1"/>
   </p:sldMasterIdLst>
   <p:notesMasterIdLst>
-    <p:notesMasterId r:id="rId7"/>
+    <p:notesMasterId r:id="rId8"/>
   </p:notesMasterIdLst>
   <p:sldIdLst>
     <p:sldId id="257" r:id="rId2"/>
@@ -13,6 +13,7 @@
     <p:sldId id="258" r:id="rId4"/>
     <p:sldId id="259" r:id="rId5"/>
     <p:sldId id="260" r:id="rId6"/>
+    <p:sldId id="262" r:id="rId7"/>
   </p:sldIdLst>
   <p:sldSz cx="6858000" cy="10799763"/>
   <p:notesSz cx="6858000" cy="9144000"/>
@@ -125,6 +126,7 @@
             <p14:sldId id="258"/>
             <p14:sldId id="259"/>
             <p14:sldId id="260"/>
+            <p14:sldId id="262"/>
           </p14:sldIdLst>
         </p14:section>
       </p14:sectionLst>
@@ -9869,7 +9871,7 @@
               </a:bodyPr>
               <a:lstStyle/>
               <a:p>
-                <a:endParaRPr lang="en-GB" sz="1400"/>
+                <a:endParaRPr lang="en-GB" sz="1400" dirty="0"/>
               </a:p>
             </p:txBody>
           </p:sp>
@@ -10320,7 +10322,11 @@
           </a:p>
           <a:p>
             <a:r>
-              <a:rPr lang="en-GB" sz="3600" dirty="0"/>
+              <a:rPr lang="en-GB" sz="3600" dirty="0">
+                <a:highlight>
+                  <a:srgbClr val="FFFF00"/>
+                </a:highlight>
+              </a:rPr>
               <a:t>About the hospital</a:t>
             </a:r>
           </a:p>
@@ -14281,6 +14287,1317 @@
 </p:sld>
 </file>
 
+<file path=ppt/slides/slide6.xml><?xml version="1.0" encoding="utf-8"?>
+<p:sld xmlns:a="http://schemas.openxmlformats.org/drawingml/2006/main" xmlns:r="http://schemas.openxmlformats.org/officeDocument/2006/relationships" xmlns:p="http://schemas.openxmlformats.org/presentationml/2006/main">
+  <p:cSld>
+    <p:spTree>
+      <p:nvGrpSpPr>
+        <p:cNvPr id="1" name=""/>
+        <p:cNvGrpSpPr/>
+        <p:nvPr/>
+      </p:nvGrpSpPr>
+      <p:grpSpPr>
+        <a:xfrm>
+          <a:off x="0" y="0"/>
+          <a:ext cx="0" cy="0"/>
+          <a:chOff x="0" y="0"/>
+          <a:chExt cx="0" cy="0"/>
+        </a:xfrm>
+      </p:grpSpPr>
+      <p:pic>
+        <p:nvPicPr>
+          <p:cNvPr id="2" name="Picture 1">
+            <a:extLst>
+              <a:ext uri="{FF2B5EF4-FFF2-40B4-BE49-F238E27FC236}">
+                <a16:creationId xmlns:a16="http://schemas.microsoft.com/office/drawing/2014/main" id="{1F17E804-3DF0-4466-B2D6-AA33509EE98A}"/>
+              </a:ext>
+            </a:extLst>
+          </p:cNvPr>
+          <p:cNvPicPr>
+            <a:picLocks noChangeAspect="1"/>
+          </p:cNvPicPr>
+          <p:nvPr/>
+        </p:nvPicPr>
+        <p:blipFill>
+          <a:blip r:embed="rId2"/>
+          <a:stretch>
+            <a:fillRect/>
+          </a:stretch>
+        </p:blipFill>
+        <p:spPr>
+          <a:xfrm>
+            <a:off x="0" y="-2063"/>
+            <a:ext cx="6858000" cy="799794"/>
+          </a:xfrm>
+          <a:prstGeom prst="rect">
+            <a:avLst/>
+          </a:prstGeom>
+        </p:spPr>
+      </p:pic>
+      <p:sp>
+        <p:nvSpPr>
+          <p:cNvPr id="3" name="Rectangle 2">
+            <a:extLst>
+              <a:ext uri="{FF2B5EF4-FFF2-40B4-BE49-F238E27FC236}">
+                <a16:creationId xmlns:a16="http://schemas.microsoft.com/office/drawing/2014/main" id="{4CD37396-DE6A-4F0F-9B28-9A352FB0DA2B}"/>
+              </a:ext>
+            </a:extLst>
+          </p:cNvPr>
+          <p:cNvSpPr/>
+          <p:nvPr/>
+        </p:nvSpPr>
+        <p:spPr>
+          <a:xfrm>
+            <a:off x="0" y="797731"/>
+            <a:ext cx="6858000" cy="1488269"/>
+          </a:xfrm>
+          <a:prstGeom prst="rect">
+            <a:avLst/>
+          </a:prstGeom>
+          <a:solidFill>
+            <a:schemeClr val="bg2">
+              <a:lumMod val="90000"/>
+            </a:schemeClr>
+          </a:solidFill>
+          <a:ln>
+            <a:noFill/>
+          </a:ln>
+        </p:spPr>
+        <p:style>
+          <a:lnRef idx="2">
+            <a:schemeClr val="accent1">
+              <a:shade val="50000"/>
+            </a:schemeClr>
+          </a:lnRef>
+          <a:fillRef idx="1">
+            <a:schemeClr val="accent1"/>
+          </a:fillRef>
+          <a:effectRef idx="0">
+            <a:schemeClr val="accent1"/>
+          </a:effectRef>
+          <a:fontRef idx="minor">
+            <a:schemeClr val="lt1"/>
+          </a:fontRef>
+        </p:style>
+        <p:txBody>
+          <a:bodyPr rtlCol="0" anchor="ctr"/>
+          <a:lstStyle/>
+          <a:p>
+            <a:pPr algn="ctr"/>
+            <a:endParaRPr lang="en-GB" dirty="0"/>
+          </a:p>
+        </p:txBody>
+      </p:sp>
+      <p:sp>
+        <p:nvSpPr>
+          <p:cNvPr id="4" name="TextBox 3">
+            <a:extLst>
+              <a:ext uri="{FF2B5EF4-FFF2-40B4-BE49-F238E27FC236}">
+                <a16:creationId xmlns:a16="http://schemas.microsoft.com/office/drawing/2014/main" id="{C403D35F-0EE2-49B2-9942-3EB228DD3935}"/>
+              </a:ext>
+            </a:extLst>
+          </p:cNvPr>
+          <p:cNvSpPr txBox="1"/>
+          <p:nvPr/>
+        </p:nvSpPr>
+        <p:spPr>
+          <a:xfrm>
+            <a:off x="4897964" y="1087875"/>
+            <a:ext cx="1592744" cy="461665"/>
+          </a:xfrm>
+          <a:prstGeom prst="rect">
+            <a:avLst/>
+          </a:prstGeom>
+          <a:noFill/>
+        </p:spPr>
+        <p:txBody>
+          <a:bodyPr wrap="none" rtlCol="0">
+            <a:spAutoFit/>
+          </a:bodyPr>
+          <a:lstStyle/>
+          <a:p>
+            <a:pPr algn="r"/>
+            <a:r>
+              <a:rPr lang="en-GB" sz="2400" dirty="0"/>
+              <a:t>Procedures</a:t>
+            </a:r>
+          </a:p>
+        </p:txBody>
+      </p:sp>
+      <p:sp>
+        <p:nvSpPr>
+          <p:cNvPr id="5" name="Rectangle 4">
+            <a:extLst>
+              <a:ext uri="{FF2B5EF4-FFF2-40B4-BE49-F238E27FC236}">
+                <a16:creationId xmlns:a16="http://schemas.microsoft.com/office/drawing/2014/main" id="{8A2BF8C9-38AF-455E-B567-1B2EF3BC2E9C}"/>
+              </a:ext>
+            </a:extLst>
+          </p:cNvPr>
+          <p:cNvSpPr/>
+          <p:nvPr/>
+        </p:nvSpPr>
+        <p:spPr>
+          <a:xfrm>
+            <a:off x="0" y="9588856"/>
+            <a:ext cx="6858000" cy="1194865"/>
+          </a:xfrm>
+          <a:prstGeom prst="rect">
+            <a:avLst/>
+          </a:prstGeom>
+          <a:noFill/>
+          <a:ln w="12700">
+            <a:solidFill>
+              <a:schemeClr val="tx1"/>
+            </a:solidFill>
+          </a:ln>
+        </p:spPr>
+        <p:style>
+          <a:lnRef idx="2">
+            <a:schemeClr val="accent1">
+              <a:shade val="50000"/>
+            </a:schemeClr>
+          </a:lnRef>
+          <a:fillRef idx="1">
+            <a:schemeClr val="accent1"/>
+          </a:fillRef>
+          <a:effectRef idx="0">
+            <a:schemeClr val="accent1"/>
+          </a:effectRef>
+          <a:fontRef idx="minor">
+            <a:schemeClr val="lt1"/>
+          </a:fontRef>
+        </p:style>
+        <p:txBody>
+          <a:bodyPr rtlCol="0" anchor="ctr"/>
+          <a:lstStyle/>
+          <a:p>
+            <a:pPr algn="ctr"/>
+            <a:endParaRPr lang="en-GB"/>
+          </a:p>
+        </p:txBody>
+      </p:sp>
+      <p:sp>
+        <p:nvSpPr>
+          <p:cNvPr id="6" name="TextBox 5">
+            <a:extLst>
+              <a:ext uri="{FF2B5EF4-FFF2-40B4-BE49-F238E27FC236}">
+                <a16:creationId xmlns:a16="http://schemas.microsoft.com/office/drawing/2014/main" id="{19801E43-CAD5-4242-9AC4-1E0DFFD6A287}"/>
+              </a:ext>
+            </a:extLst>
+          </p:cNvPr>
+          <p:cNvSpPr txBox="1"/>
+          <p:nvPr/>
+        </p:nvSpPr>
+        <p:spPr>
+          <a:xfrm>
+            <a:off x="4809987" y="10246716"/>
+            <a:ext cx="1771639" cy="384721"/>
+          </a:xfrm>
+          <a:prstGeom prst="rect">
+            <a:avLst/>
+          </a:prstGeom>
+          <a:noFill/>
+        </p:spPr>
+        <p:txBody>
+          <a:bodyPr wrap="none" rtlCol="0">
+            <a:spAutoFit/>
+          </a:bodyPr>
+          <a:lstStyle/>
+          <a:p>
+            <a:r>
+              <a:rPr lang="en-GB" sz="1100" dirty="0"/>
+              <a:t>Advanced Obesity Surgery</a:t>
+            </a:r>
+          </a:p>
+          <a:p>
+            <a:pPr algn="r"/>
+            <a:r>
+              <a:rPr lang="en-GB" sz="800" dirty="0"/>
+              <a:t>©Copyright 2022. All Rights Reserved.</a:t>
+            </a:r>
+          </a:p>
+        </p:txBody>
+      </p:sp>
+      <p:sp>
+        <p:nvSpPr>
+          <p:cNvPr id="7" name="TextBox 6">
+            <a:extLst>
+              <a:ext uri="{FF2B5EF4-FFF2-40B4-BE49-F238E27FC236}">
+                <a16:creationId xmlns:a16="http://schemas.microsoft.com/office/drawing/2014/main" id="{BB63523D-5788-4D23-9347-AB9870E7FA31}"/>
+              </a:ext>
+            </a:extLst>
+          </p:cNvPr>
+          <p:cNvSpPr txBox="1"/>
+          <p:nvPr/>
+        </p:nvSpPr>
+        <p:spPr>
+          <a:xfrm>
+            <a:off x="3761623" y="9733421"/>
+            <a:ext cx="2820003" cy="261610"/>
+          </a:xfrm>
+          <a:prstGeom prst="rect">
+            <a:avLst/>
+          </a:prstGeom>
+          <a:noFill/>
+        </p:spPr>
+        <p:txBody>
+          <a:bodyPr wrap="none" rtlCol="0">
+            <a:spAutoFit/>
+          </a:bodyPr>
+          <a:lstStyle/>
+          <a:p>
+            <a:r>
+              <a:rPr lang="en-GB" sz="1100" dirty="0"/>
+              <a:t>Blog        FAQ        Contact us        Privacy Policy</a:t>
+            </a:r>
+          </a:p>
+        </p:txBody>
+      </p:sp>
+      <p:pic>
+        <p:nvPicPr>
+          <p:cNvPr id="8" name="Picture 2" descr="Center for Metabolic and Obesity Surgery">
+            <a:extLst>
+              <a:ext uri="{FF2B5EF4-FFF2-40B4-BE49-F238E27FC236}">
+                <a16:creationId xmlns:a16="http://schemas.microsoft.com/office/drawing/2014/main" id="{F7A6B6B8-0A58-4A82-B29B-32BA1AFE5342}"/>
+              </a:ext>
+            </a:extLst>
+          </p:cNvPr>
+          <p:cNvPicPr>
+            <a:picLocks noChangeAspect="1" noChangeArrowheads="1"/>
+          </p:cNvPicPr>
+          <p:nvPr/>
+        </p:nvPicPr>
+        <p:blipFill>
+          <a:blip r:embed="rId3">
+            <a:extLst>
+              <a:ext uri="{BEBA8EAE-BF5A-486C-A8C5-ECC9F3942E4B}">
+                <a14:imgProps xmlns:a14="http://schemas.microsoft.com/office/drawing/2010/main">
+                  <a14:imgLayer r:embed="rId4">
+                    <a14:imgEffect>
+                      <a14:backgroundRemoval t="8163" b="89796" l="4219" r="95000">
+                        <a14:foregroundMark x1="7969" y1="48163" x2="7969" y2="48163"/>
+                        <a14:foregroundMark x1="4219" y1="62857" x2="4219" y2="62857"/>
+                        <a14:foregroundMark x1="14844" y1="48571" x2="14844" y2="48571"/>
+                        <a14:foregroundMark x1="23594" y1="54286" x2="23594" y2="54286"/>
+                        <a14:foregroundMark x1="30938" y1="54694" x2="30938" y2="54694"/>
+                        <a14:foregroundMark x1="38594" y1="53061" x2="38594" y2="53061"/>
+                        <a14:foregroundMark x1="47031" y1="50612" x2="47031" y2="50612"/>
+                        <a14:foregroundMark x1="64531" y1="50612" x2="64531" y2="50612"/>
+                        <a14:foregroundMark x1="72656" y1="53469" x2="72656" y2="53469"/>
+                        <a14:foregroundMark x1="81094" y1="53061" x2="81094" y2="53061"/>
+                        <a14:foregroundMark x1="85156" y1="54286" x2="85156" y2="54286"/>
+                        <a14:foregroundMark x1="90469" y1="51429" x2="90469" y2="51429"/>
+                        <a14:foregroundMark x1="95000" y1="59184" x2="95000" y2="59184"/>
+                        <a14:foregroundMark x1="68281" y1="30204" x2="68281" y2="30204"/>
+                        <a14:foregroundMark x1="73125" y1="28980" x2="73125" y2="28980"/>
+                        <a14:foregroundMark x1="73125" y1="8163" x2="73125" y2="8163"/>
+                        <a14:foregroundMark x1="67500" y1="13061" x2="67500" y2="13061"/>
+                        <a14:foregroundMark x1="72031" y1="17143" x2="72031" y2="17143"/>
+                        <a14:foregroundMark x1="68438" y1="22041" x2="68438" y2="22041"/>
+                        <a14:foregroundMark x1="69688" y1="17143" x2="69688" y2="17143"/>
+                        <a14:foregroundMark x1="57031" y1="83265" x2="57031" y2="83265"/>
+                        <a14:foregroundMark x1="62187" y1="83673" x2="62187" y2="83673"/>
+                        <a14:foregroundMark x1="66250" y1="79184" x2="66250" y2="79184"/>
+                        <a14:foregroundMark x1="68281" y1="82857" x2="68281" y2="82857"/>
+                        <a14:foregroundMark x1="72969" y1="82041" x2="72969" y2="82041"/>
+                        <a14:foregroundMark x1="77188" y1="84898" x2="77188" y2="84898"/>
+                        <a14:foregroundMark x1="76719" y1="82857" x2="76719" y2="82857"/>
+                        <a14:foregroundMark x1="79219" y1="82857" x2="79219" y2="82857"/>
+                        <a14:foregroundMark x1="84375" y1="81224" x2="84375" y2="81224"/>
+                        <a14:foregroundMark x1="86094" y1="82041" x2="86094" y2="82041"/>
+                        <a14:foregroundMark x1="86094" y1="77143" x2="86094" y2="77143"/>
+                        <a14:foregroundMark x1="87969" y1="83673" x2="87969" y2="83673"/>
+                        <a14:foregroundMark x1="92656" y1="82041" x2="92656" y2="82041"/>
+                        <a14:foregroundMark x1="72813" y1="23673" x2="72813" y2="23673"/>
+                        <a14:foregroundMark x1="71563" y1="20816" x2="71563" y2="20816"/>
+                        <a14:foregroundMark x1="5938" y1="55510" x2="5938" y2="55510"/>
+                        <a14:backgroundMark x1="7969" y1="46531" x2="7969" y2="46531"/>
+                        <a14:backgroundMark x1="32656" y1="51837" x2="32656" y2="51837"/>
+                        <a14:backgroundMark x1="63281" y1="83265" x2="63281" y2="83265"/>
+                        <a14:backgroundMark x1="69375" y1="82857" x2="69375" y2="82857"/>
+                        <a14:backgroundMark x1="73281" y1="84898" x2="73281" y2="84898"/>
+                        <a14:backgroundMark x1="80938" y1="83673" x2="80938" y2="83673"/>
+                        <a14:backgroundMark x1="89375" y1="84898" x2="89375" y2="84898"/>
+                        <a14:backgroundMark x1="69688" y1="22041" x2="69688" y2="22041"/>
+                        <a14:backgroundMark x1="72500" y1="20816" x2="72500" y2="20816"/>
+                        <a14:backgroundMark x1="8125" y1="48163" x2="8125" y2="48163"/>
+                        <a14:backgroundMark x1="7969" y1="48163" x2="7969" y2="48163"/>
+                        <a14:backgroundMark x1="6406" y1="55510" x2="6406" y2="55510"/>
+                        <a14:backgroundMark x1="77344" y1="85714" x2="77344" y2="85714"/>
+                        <a14:backgroundMark x1="73125" y1="82857" x2="73125" y2="82857"/>
+                        <a14:backgroundMark x1="77500" y1="84898" x2="77500" y2="84898"/>
+                      </a14:backgroundRemoval>
+                    </a14:imgEffect>
+                  </a14:imgLayer>
+                </a14:imgProps>
+              </a:ext>
+              <a:ext uri="{28A0092B-C50C-407E-A947-70E740481C1C}">
+                <a14:useLocalDpi xmlns:a14="http://schemas.microsoft.com/office/drawing/2010/main" val="0"/>
+              </a:ext>
+            </a:extLst>
+          </a:blip>
+          <a:srcRect/>
+          <a:stretch>
+            <a:fillRect/>
+          </a:stretch>
+        </p:blipFill>
+        <p:spPr bwMode="auto">
+          <a:xfrm>
+            <a:off x="276376" y="9736561"/>
+            <a:ext cx="1158153" cy="443355"/>
+          </a:xfrm>
+          <a:prstGeom prst="rect">
+            <a:avLst/>
+          </a:prstGeom>
+          <a:noFill/>
+          <a:ln>
+            <a:noFill/>
+          </a:ln>
+          <a:extLst>
+            <a:ext uri="{909E8E84-426E-40DD-AFC4-6F175D3DCCD1}">
+              <a14:hiddenFill xmlns:a14="http://schemas.microsoft.com/office/drawing/2010/main">
+                <a:solidFill>
+                  <a:srgbClr val="FFFFFF"/>
+                </a:solidFill>
+              </a14:hiddenFill>
+            </a:ext>
+          </a:extLst>
+        </p:spPr>
+      </p:pic>
+      <p:sp>
+        <p:nvSpPr>
+          <p:cNvPr id="9" name="TextBox 8">
+            <a:extLst>
+              <a:ext uri="{FF2B5EF4-FFF2-40B4-BE49-F238E27FC236}">
+                <a16:creationId xmlns:a16="http://schemas.microsoft.com/office/drawing/2014/main" id="{6276612B-D9F9-4B13-8A61-8AFEAE6A461F}"/>
+              </a:ext>
+            </a:extLst>
+          </p:cNvPr>
+          <p:cNvSpPr txBox="1"/>
+          <p:nvPr/>
+        </p:nvSpPr>
+        <p:spPr>
+          <a:xfrm>
+            <a:off x="208205" y="10169772"/>
+            <a:ext cx="2219850" cy="461665"/>
+          </a:xfrm>
+          <a:prstGeom prst="rect">
+            <a:avLst/>
+          </a:prstGeom>
+          <a:noFill/>
+        </p:spPr>
+        <p:txBody>
+          <a:bodyPr wrap="square">
+            <a:spAutoFit/>
+          </a:bodyPr>
+          <a:lstStyle/>
+          <a:p>
+            <a:r>
+              <a:rPr lang="en-GB" sz="800" dirty="0"/>
+              <a:t>407-303-3820</a:t>
+            </a:r>
+          </a:p>
+          <a:p>
+            <a:r>
+              <a:rPr lang="en-GB" sz="800" dirty="0"/>
+              <a:t>410 Celebration Place, Suite 401</a:t>
+            </a:r>
+          </a:p>
+          <a:p>
+            <a:r>
+              <a:rPr lang="en-GB" sz="800" dirty="0"/>
+              <a:t>Celebration, FL 34747</a:t>
+            </a:r>
+          </a:p>
+        </p:txBody>
+      </p:sp>
+      <p:sp>
+        <p:nvSpPr>
+          <p:cNvPr id="10" name="TextBox 9">
+            <a:extLst>
+              <a:ext uri="{FF2B5EF4-FFF2-40B4-BE49-F238E27FC236}">
+                <a16:creationId xmlns:a16="http://schemas.microsoft.com/office/drawing/2014/main" id="{6056098E-290E-497A-A1C4-F9553BA9B7E2}"/>
+              </a:ext>
+            </a:extLst>
+          </p:cNvPr>
+          <p:cNvSpPr txBox="1"/>
+          <p:nvPr/>
+        </p:nvSpPr>
+        <p:spPr>
+          <a:xfrm>
+            <a:off x="276376" y="2664551"/>
+            <a:ext cx="6305250" cy="461665"/>
+          </a:xfrm>
+          <a:prstGeom prst="rect">
+            <a:avLst/>
+          </a:prstGeom>
+          <a:noFill/>
+        </p:spPr>
+        <p:txBody>
+          <a:bodyPr wrap="square" rtlCol="0">
+            <a:spAutoFit/>
+          </a:bodyPr>
+          <a:lstStyle/>
+          <a:p>
+            <a:pPr algn="l"/>
+            <a:r>
+              <a:rPr lang="en-GB" sz="1200" dirty="0">
+                <a:solidFill>
+                  <a:srgbClr val="000000"/>
+                </a:solidFill>
+              </a:rPr>
+              <a:t>Introductory information about the procedures available, e.g. how many and which is most common. “Click below to read more about each procedure.”</a:t>
+            </a:r>
+          </a:p>
+        </p:txBody>
+      </p:sp>
+      <p:sp>
+        <p:nvSpPr>
+          <p:cNvPr id="16" name="TextBox 15">
+            <a:extLst>
+              <a:ext uri="{FF2B5EF4-FFF2-40B4-BE49-F238E27FC236}">
+                <a16:creationId xmlns:a16="http://schemas.microsoft.com/office/drawing/2014/main" id="{2CD190DD-E027-4429-AB58-2864F5797D7A}"/>
+              </a:ext>
+            </a:extLst>
+          </p:cNvPr>
+          <p:cNvSpPr txBox="1"/>
+          <p:nvPr/>
+        </p:nvSpPr>
+        <p:spPr>
+          <a:xfrm>
+            <a:off x="276376" y="3421304"/>
+            <a:ext cx="6305250" cy="1754326"/>
+          </a:xfrm>
+          <a:prstGeom prst="rect">
+            <a:avLst/>
+          </a:prstGeom>
+          <a:noFill/>
+        </p:spPr>
+        <p:txBody>
+          <a:bodyPr wrap="square" numCol="3" spcCol="180000" rtlCol="0">
+            <a:spAutoFit/>
+          </a:bodyPr>
+          <a:lstStyle/>
+          <a:p>
+            <a:pPr marL="0" marR="0" lvl="0" indent="0" algn="l" defTabSz="457200" rtl="0" eaLnBrk="1" fontAlgn="auto" latinLnBrk="0" hangingPunct="1">
+              <a:lnSpc>
+                <a:spcPct val="100000"/>
+              </a:lnSpc>
+              <a:spcBef>
+                <a:spcPts val="0"/>
+              </a:spcBef>
+              <a:spcAft>
+                <a:spcPts val="0"/>
+              </a:spcAft>
+              <a:buClrTx/>
+              <a:buSzTx/>
+              <a:buFontTx/>
+              <a:buNone/>
+              <a:tabLst/>
+              <a:defRPr/>
+            </a:pPr>
+            <a:r>
+              <a:rPr kumimoji="0" lang="en-GB" sz="1600" b="1" i="0" u="none" strike="noStrike" kern="1200" cap="none" spc="0" normalizeH="0" baseline="0" noProof="0" dirty="0">
+                <a:ln>
+                  <a:noFill/>
+                </a:ln>
+                <a:solidFill>
+                  <a:srgbClr val="000000"/>
+                </a:solidFill>
+                <a:effectLst/>
+                <a:uLnTx/>
+                <a:uFillTx/>
+                <a:latin typeface="Calibri" panose="020F0502020204030204"/>
+                <a:ea typeface="+mn-ea"/>
+                <a:cs typeface="+mn-cs"/>
+              </a:rPr>
+              <a:t>Laparoscopic Duodenal Switch</a:t>
+            </a:r>
+            <a:endParaRPr kumimoji="0" lang="en-GB" sz="1200" b="1" i="0" u="none" strike="noStrike" kern="1200" cap="none" spc="0" normalizeH="0" baseline="0" noProof="0" dirty="0">
+              <a:ln>
+                <a:noFill/>
+              </a:ln>
+              <a:solidFill>
+                <a:srgbClr val="000000"/>
+              </a:solidFill>
+              <a:effectLst/>
+              <a:uLnTx/>
+              <a:uFillTx/>
+              <a:latin typeface="Calibri" panose="020F0502020204030204"/>
+              <a:ea typeface="+mn-ea"/>
+              <a:cs typeface="+mn-cs"/>
+            </a:endParaRPr>
+          </a:p>
+          <a:p>
+            <a:pPr marL="0" marR="0" lvl="0" indent="0" algn="l" defTabSz="457200" rtl="0" eaLnBrk="1" fontAlgn="auto" latinLnBrk="0" hangingPunct="1">
+              <a:lnSpc>
+                <a:spcPct val="100000"/>
+              </a:lnSpc>
+              <a:spcBef>
+                <a:spcPts val="0"/>
+              </a:spcBef>
+              <a:spcAft>
+                <a:spcPts val="0"/>
+              </a:spcAft>
+              <a:buClrTx/>
+              <a:buSzTx/>
+              <a:buFontTx/>
+              <a:buNone/>
+              <a:tabLst/>
+              <a:defRPr/>
+            </a:pPr>
+            <a:endParaRPr kumimoji="0" lang="en-GB" sz="1200" b="0" i="0" u="none" strike="noStrike" kern="1200" cap="none" spc="0" normalizeH="0" baseline="0" noProof="0" dirty="0">
+              <a:ln>
+                <a:noFill/>
+              </a:ln>
+              <a:solidFill>
+                <a:srgbClr val="000000"/>
+              </a:solidFill>
+              <a:effectLst/>
+              <a:uLnTx/>
+              <a:uFillTx/>
+              <a:latin typeface="Calibri" panose="020F0502020204030204"/>
+              <a:ea typeface="+mn-ea"/>
+              <a:cs typeface="+mn-cs"/>
+            </a:endParaRPr>
+          </a:p>
+          <a:p>
+            <a:pPr marL="0" marR="0" lvl="0" indent="0" algn="l" defTabSz="457200" rtl="0" eaLnBrk="1" fontAlgn="auto" latinLnBrk="0" hangingPunct="1">
+              <a:lnSpc>
+                <a:spcPct val="100000"/>
+              </a:lnSpc>
+              <a:spcBef>
+                <a:spcPts val="0"/>
+              </a:spcBef>
+              <a:spcAft>
+                <a:spcPts val="0"/>
+              </a:spcAft>
+              <a:buClrTx/>
+              <a:buSzTx/>
+              <a:buFontTx/>
+              <a:buNone/>
+              <a:tabLst/>
+              <a:defRPr/>
+            </a:pPr>
+            <a:r>
+              <a:rPr kumimoji="0" lang="en-GB" sz="1200" b="0" i="0" u="none" strike="noStrike" kern="1200" cap="none" spc="0" normalizeH="0" baseline="0" noProof="0" dirty="0">
+                <a:ln>
+                  <a:noFill/>
+                </a:ln>
+                <a:solidFill>
+                  <a:srgbClr val="000000"/>
+                </a:solidFill>
+                <a:effectLst/>
+                <a:uLnTx/>
+                <a:uFillTx/>
+                <a:latin typeface="Calibri" panose="020F0502020204030204"/>
+                <a:ea typeface="+mn-ea"/>
+                <a:cs typeface="+mn-cs"/>
+              </a:rPr>
+              <a:t>Short starting sentence</a:t>
+            </a:r>
+          </a:p>
+          <a:p>
+            <a:pPr marL="0" marR="0" lvl="0" indent="0" algn="l" defTabSz="457200" rtl="0" eaLnBrk="1" fontAlgn="auto" latinLnBrk="0" hangingPunct="1">
+              <a:lnSpc>
+                <a:spcPct val="100000"/>
+              </a:lnSpc>
+              <a:spcBef>
+                <a:spcPts val="0"/>
+              </a:spcBef>
+              <a:spcAft>
+                <a:spcPts val="0"/>
+              </a:spcAft>
+              <a:buClrTx/>
+              <a:buSzTx/>
+              <a:buFontTx/>
+              <a:buNone/>
+              <a:tabLst/>
+              <a:defRPr/>
+            </a:pPr>
+            <a:endParaRPr kumimoji="0" lang="en-GB" sz="1200" b="0" i="0" u="none" strike="noStrike" kern="1200" cap="none" spc="0" normalizeH="0" baseline="0" noProof="0" dirty="0">
+              <a:ln>
+                <a:noFill/>
+              </a:ln>
+              <a:solidFill>
+                <a:srgbClr val="000000"/>
+              </a:solidFill>
+              <a:effectLst/>
+              <a:uLnTx/>
+              <a:uFillTx/>
+              <a:latin typeface="Calibri" panose="020F0502020204030204"/>
+              <a:ea typeface="+mn-ea"/>
+              <a:cs typeface="+mn-cs"/>
+            </a:endParaRPr>
+          </a:p>
+          <a:p>
+            <a:pPr marL="0" marR="0" lvl="0" indent="0" algn="l" defTabSz="457200" rtl="0" eaLnBrk="1" fontAlgn="auto" latinLnBrk="0" hangingPunct="1">
+              <a:lnSpc>
+                <a:spcPct val="100000"/>
+              </a:lnSpc>
+              <a:spcBef>
+                <a:spcPts val="0"/>
+              </a:spcBef>
+              <a:spcAft>
+                <a:spcPts val="0"/>
+              </a:spcAft>
+              <a:buClrTx/>
+              <a:buSzTx/>
+              <a:buFontTx/>
+              <a:buNone/>
+              <a:tabLst/>
+              <a:defRPr/>
+            </a:pPr>
+            <a:endParaRPr kumimoji="0" lang="en-GB" sz="1200" b="0" i="0" u="none" strike="noStrike" kern="1200" cap="none" spc="0" normalizeH="0" baseline="0" noProof="0" dirty="0">
+              <a:ln>
+                <a:noFill/>
+              </a:ln>
+              <a:solidFill>
+                <a:srgbClr val="000000"/>
+              </a:solidFill>
+              <a:effectLst/>
+              <a:uLnTx/>
+              <a:uFillTx/>
+              <a:latin typeface="Calibri" panose="020F0502020204030204"/>
+              <a:ea typeface="+mn-ea"/>
+              <a:cs typeface="+mn-cs"/>
+            </a:endParaRPr>
+          </a:p>
+          <a:p>
+            <a:pPr marL="0" marR="0" lvl="0" indent="0" algn="l" defTabSz="457200" rtl="0" eaLnBrk="1" fontAlgn="auto" latinLnBrk="0" hangingPunct="1">
+              <a:lnSpc>
+                <a:spcPct val="100000"/>
+              </a:lnSpc>
+              <a:spcBef>
+                <a:spcPts val="0"/>
+              </a:spcBef>
+              <a:spcAft>
+                <a:spcPts val="0"/>
+              </a:spcAft>
+              <a:buClrTx/>
+              <a:buSzTx/>
+              <a:buFontTx/>
+              <a:buNone/>
+              <a:tabLst/>
+              <a:defRPr/>
+            </a:pPr>
+            <a:endParaRPr lang="en-GB" sz="1200" dirty="0">
+              <a:solidFill>
+                <a:srgbClr val="000000"/>
+              </a:solidFill>
+              <a:latin typeface="Calibri" panose="020F0502020204030204"/>
+            </a:endParaRPr>
+          </a:p>
+          <a:p>
+            <a:pPr marL="0" marR="0" lvl="0" indent="0" algn="l" defTabSz="457200" rtl="0" eaLnBrk="1" fontAlgn="auto" latinLnBrk="0" hangingPunct="1">
+              <a:lnSpc>
+                <a:spcPct val="100000"/>
+              </a:lnSpc>
+              <a:spcBef>
+                <a:spcPts val="0"/>
+              </a:spcBef>
+              <a:spcAft>
+                <a:spcPts val="0"/>
+              </a:spcAft>
+              <a:buClrTx/>
+              <a:buSzTx/>
+              <a:buFontTx/>
+              <a:buNone/>
+              <a:tabLst/>
+              <a:defRPr/>
+            </a:pPr>
+            <a:endParaRPr lang="en-GB" sz="1200" dirty="0">
+              <a:solidFill>
+                <a:srgbClr val="000000"/>
+              </a:solidFill>
+              <a:latin typeface="Calibri" panose="020F0502020204030204"/>
+            </a:endParaRPr>
+          </a:p>
+          <a:p>
+            <a:pPr marL="0" marR="0" lvl="0" indent="0" algn="l" defTabSz="457200" rtl="0" eaLnBrk="1" fontAlgn="auto" latinLnBrk="0" hangingPunct="1">
+              <a:lnSpc>
+                <a:spcPct val="100000"/>
+              </a:lnSpc>
+              <a:spcBef>
+                <a:spcPts val="0"/>
+              </a:spcBef>
+              <a:spcAft>
+                <a:spcPts val="0"/>
+              </a:spcAft>
+              <a:buClrTx/>
+              <a:buSzTx/>
+              <a:buFontTx/>
+              <a:buNone/>
+              <a:tabLst/>
+              <a:defRPr/>
+            </a:pPr>
+            <a:r>
+              <a:rPr lang="en-GB" sz="1600" b="1" dirty="0">
+                <a:solidFill>
+                  <a:srgbClr val="000000"/>
+                </a:solidFill>
+                <a:latin typeface="Calibri" panose="020F0502020204030204"/>
+              </a:rPr>
+              <a:t>Laparoscopic RNY Gastric Bypass</a:t>
+            </a:r>
+          </a:p>
+          <a:p>
+            <a:pPr marL="0" marR="0" lvl="0" indent="0" algn="l" defTabSz="457200" rtl="0" eaLnBrk="1" fontAlgn="auto" latinLnBrk="0" hangingPunct="1">
+              <a:lnSpc>
+                <a:spcPct val="100000"/>
+              </a:lnSpc>
+              <a:spcBef>
+                <a:spcPts val="0"/>
+              </a:spcBef>
+              <a:spcAft>
+                <a:spcPts val="0"/>
+              </a:spcAft>
+              <a:buClrTx/>
+              <a:buSzTx/>
+              <a:buFontTx/>
+              <a:buNone/>
+              <a:tabLst/>
+              <a:defRPr/>
+            </a:pPr>
+            <a:endParaRPr lang="en-GB" sz="1200" b="1" noProof="0" dirty="0">
+              <a:solidFill>
+                <a:srgbClr val="000000"/>
+              </a:solidFill>
+              <a:latin typeface="Calibri" panose="020F0502020204030204"/>
+            </a:endParaRPr>
+          </a:p>
+          <a:p>
+            <a:pPr marL="0" marR="0" lvl="0" indent="0" algn="l" defTabSz="457200" rtl="0" eaLnBrk="1" fontAlgn="auto" latinLnBrk="0" hangingPunct="1">
+              <a:lnSpc>
+                <a:spcPct val="100000"/>
+              </a:lnSpc>
+              <a:spcBef>
+                <a:spcPts val="0"/>
+              </a:spcBef>
+              <a:spcAft>
+                <a:spcPts val="0"/>
+              </a:spcAft>
+              <a:buClrTx/>
+              <a:buSzTx/>
+              <a:buFontTx/>
+              <a:buNone/>
+              <a:tabLst/>
+              <a:defRPr/>
+            </a:pPr>
+            <a:r>
+              <a:rPr kumimoji="0" lang="en-GB" sz="1200" b="0" i="0" u="none" strike="noStrike" kern="1200" cap="none" spc="0" normalizeH="0" baseline="0" noProof="0" dirty="0">
+                <a:ln>
+                  <a:noFill/>
+                </a:ln>
+                <a:solidFill>
+                  <a:srgbClr val="000000"/>
+                </a:solidFill>
+                <a:effectLst/>
+                <a:uLnTx/>
+                <a:uFillTx/>
+                <a:latin typeface="Calibri" panose="020F0502020204030204"/>
+                <a:ea typeface="+mn-ea"/>
+                <a:cs typeface="+mn-cs"/>
+              </a:rPr>
+              <a:t>Short starting sentence</a:t>
+            </a:r>
+          </a:p>
+          <a:p>
+            <a:pPr marL="0" marR="0" lvl="0" indent="0" algn="l" defTabSz="457200" rtl="0" eaLnBrk="1" fontAlgn="auto" latinLnBrk="0" hangingPunct="1">
+              <a:lnSpc>
+                <a:spcPct val="100000"/>
+              </a:lnSpc>
+              <a:spcBef>
+                <a:spcPts val="0"/>
+              </a:spcBef>
+              <a:spcAft>
+                <a:spcPts val="0"/>
+              </a:spcAft>
+              <a:buClrTx/>
+              <a:buSzTx/>
+              <a:buFontTx/>
+              <a:buNone/>
+              <a:tabLst/>
+              <a:defRPr/>
+            </a:pPr>
+            <a:endParaRPr kumimoji="0" lang="en-GB" sz="1200" b="0" i="0" u="none" strike="noStrike" kern="1200" cap="none" spc="0" normalizeH="0" baseline="0" noProof="0" dirty="0">
+              <a:ln>
+                <a:noFill/>
+              </a:ln>
+              <a:solidFill>
+                <a:srgbClr val="000000"/>
+              </a:solidFill>
+              <a:effectLst/>
+              <a:uLnTx/>
+              <a:uFillTx/>
+              <a:latin typeface="Calibri" panose="020F0502020204030204"/>
+              <a:ea typeface="+mn-ea"/>
+              <a:cs typeface="+mn-cs"/>
+            </a:endParaRPr>
+          </a:p>
+          <a:p>
+            <a:pPr marL="0" marR="0" lvl="0" indent="0" algn="l" defTabSz="457200" rtl="0" eaLnBrk="1" fontAlgn="auto" latinLnBrk="0" hangingPunct="1">
+              <a:lnSpc>
+                <a:spcPct val="100000"/>
+              </a:lnSpc>
+              <a:spcBef>
+                <a:spcPts val="0"/>
+              </a:spcBef>
+              <a:spcAft>
+                <a:spcPts val="0"/>
+              </a:spcAft>
+              <a:buClrTx/>
+              <a:buSzTx/>
+              <a:buFontTx/>
+              <a:buNone/>
+              <a:tabLst/>
+              <a:defRPr/>
+            </a:pPr>
+            <a:endParaRPr kumimoji="0" lang="en-GB" sz="1200" b="0" i="0" u="none" strike="noStrike" kern="1200" cap="none" spc="0" normalizeH="0" baseline="0" noProof="0" dirty="0">
+              <a:ln>
+                <a:noFill/>
+              </a:ln>
+              <a:solidFill>
+                <a:srgbClr val="000000"/>
+              </a:solidFill>
+              <a:effectLst/>
+              <a:uLnTx/>
+              <a:uFillTx/>
+              <a:latin typeface="Calibri" panose="020F0502020204030204"/>
+              <a:ea typeface="+mn-ea"/>
+              <a:cs typeface="+mn-cs"/>
+            </a:endParaRPr>
+          </a:p>
+          <a:p>
+            <a:pPr marL="0" marR="0" lvl="0" indent="0" algn="l" defTabSz="457200" rtl="0" eaLnBrk="1" fontAlgn="auto" latinLnBrk="0" hangingPunct="1">
+              <a:lnSpc>
+                <a:spcPct val="100000"/>
+              </a:lnSpc>
+              <a:spcBef>
+                <a:spcPts val="0"/>
+              </a:spcBef>
+              <a:spcAft>
+                <a:spcPts val="0"/>
+              </a:spcAft>
+              <a:buClrTx/>
+              <a:buSzTx/>
+              <a:buFontTx/>
+              <a:buNone/>
+              <a:tabLst/>
+              <a:defRPr/>
+            </a:pPr>
+            <a:endParaRPr lang="en-GB" sz="1200" dirty="0">
+              <a:solidFill>
+                <a:srgbClr val="000000"/>
+              </a:solidFill>
+              <a:latin typeface="Calibri" panose="020F0502020204030204"/>
+            </a:endParaRPr>
+          </a:p>
+          <a:p>
+            <a:pPr marL="0" marR="0" lvl="0" indent="0" algn="l" defTabSz="457200" rtl="0" eaLnBrk="1" fontAlgn="auto" latinLnBrk="0" hangingPunct="1">
+              <a:lnSpc>
+                <a:spcPct val="100000"/>
+              </a:lnSpc>
+              <a:spcBef>
+                <a:spcPts val="0"/>
+              </a:spcBef>
+              <a:spcAft>
+                <a:spcPts val="0"/>
+              </a:spcAft>
+              <a:buClrTx/>
+              <a:buSzTx/>
+              <a:buFontTx/>
+              <a:buNone/>
+              <a:tabLst/>
+              <a:defRPr/>
+            </a:pPr>
+            <a:endParaRPr kumimoji="0" lang="en-GB" sz="1200" b="0" i="0" u="none" strike="noStrike" kern="1200" cap="none" spc="0" normalizeH="0" baseline="0" noProof="0" dirty="0">
+              <a:ln>
+                <a:noFill/>
+              </a:ln>
+              <a:solidFill>
+                <a:srgbClr val="000000"/>
+              </a:solidFill>
+              <a:effectLst/>
+              <a:uLnTx/>
+              <a:uFillTx/>
+              <a:latin typeface="Calibri" panose="020F0502020204030204"/>
+              <a:ea typeface="+mn-ea"/>
+              <a:cs typeface="+mn-cs"/>
+            </a:endParaRPr>
+          </a:p>
+          <a:p>
+            <a:pPr marL="0" marR="0" lvl="0" indent="0" algn="l" defTabSz="457200" rtl="0" eaLnBrk="1" fontAlgn="auto" latinLnBrk="0" hangingPunct="1">
+              <a:lnSpc>
+                <a:spcPct val="100000"/>
+              </a:lnSpc>
+              <a:spcBef>
+                <a:spcPts val="0"/>
+              </a:spcBef>
+              <a:spcAft>
+                <a:spcPts val="0"/>
+              </a:spcAft>
+              <a:buClrTx/>
+              <a:buSzTx/>
+              <a:buFontTx/>
+              <a:buNone/>
+              <a:tabLst/>
+              <a:defRPr/>
+            </a:pPr>
+            <a:r>
+              <a:rPr lang="en-GB" sz="1600" b="1" dirty="0">
+                <a:solidFill>
+                  <a:srgbClr val="000000"/>
+                </a:solidFill>
+                <a:latin typeface="Calibri" panose="020F0502020204030204"/>
+              </a:rPr>
+              <a:t>Laparoscopic Sleeve Gastrectomy</a:t>
+            </a:r>
+            <a:endParaRPr lang="en-GB" sz="1200" b="1" dirty="0">
+              <a:solidFill>
+                <a:srgbClr val="000000"/>
+              </a:solidFill>
+              <a:latin typeface="Calibri" panose="020F0502020204030204"/>
+            </a:endParaRPr>
+          </a:p>
+          <a:p>
+            <a:pPr marL="0" marR="0" lvl="0" indent="0" algn="l" defTabSz="457200" rtl="0" eaLnBrk="1" fontAlgn="auto" latinLnBrk="0" hangingPunct="1">
+              <a:lnSpc>
+                <a:spcPct val="100000"/>
+              </a:lnSpc>
+              <a:spcBef>
+                <a:spcPts val="0"/>
+              </a:spcBef>
+              <a:spcAft>
+                <a:spcPts val="0"/>
+              </a:spcAft>
+              <a:buClrTx/>
+              <a:buSzTx/>
+              <a:buFontTx/>
+              <a:buNone/>
+              <a:tabLst/>
+              <a:defRPr/>
+            </a:pPr>
+            <a:endParaRPr kumimoji="0" lang="en-GB" sz="1200" b="0" i="0" u="none" strike="noStrike" kern="1200" cap="none" spc="0" normalizeH="0" baseline="0" noProof="0" dirty="0">
+              <a:ln>
+                <a:noFill/>
+              </a:ln>
+              <a:solidFill>
+                <a:srgbClr val="000000"/>
+              </a:solidFill>
+              <a:effectLst/>
+              <a:uLnTx/>
+              <a:uFillTx/>
+              <a:latin typeface="Calibri" panose="020F0502020204030204"/>
+              <a:ea typeface="+mn-ea"/>
+              <a:cs typeface="+mn-cs"/>
+            </a:endParaRPr>
+          </a:p>
+          <a:p>
+            <a:pPr marL="0" marR="0" lvl="0" indent="0" algn="l" defTabSz="457200" rtl="0" eaLnBrk="1" fontAlgn="auto" latinLnBrk="0" hangingPunct="1">
+              <a:lnSpc>
+                <a:spcPct val="100000"/>
+              </a:lnSpc>
+              <a:spcBef>
+                <a:spcPts val="0"/>
+              </a:spcBef>
+              <a:spcAft>
+                <a:spcPts val="0"/>
+              </a:spcAft>
+              <a:buClrTx/>
+              <a:buSzTx/>
+              <a:buFontTx/>
+              <a:buNone/>
+              <a:tabLst/>
+              <a:defRPr/>
+            </a:pPr>
+            <a:r>
+              <a:rPr kumimoji="0" lang="en-GB" sz="1200" b="0" i="0" u="none" strike="noStrike" kern="1200" cap="none" spc="0" normalizeH="0" baseline="0" noProof="0" dirty="0">
+                <a:ln>
+                  <a:noFill/>
+                </a:ln>
+                <a:solidFill>
+                  <a:srgbClr val="000000"/>
+                </a:solidFill>
+                <a:effectLst/>
+                <a:uLnTx/>
+                <a:uFillTx/>
+                <a:latin typeface="Calibri" panose="020F0502020204030204"/>
+                <a:ea typeface="+mn-ea"/>
+                <a:cs typeface="+mn-cs"/>
+              </a:rPr>
+              <a:t>Short starting sentence </a:t>
+            </a:r>
+          </a:p>
+        </p:txBody>
+      </p:sp>
+      <p:sp>
+        <p:nvSpPr>
+          <p:cNvPr id="13" name="Rectangle: Diagonal Corners Rounded 12">
+            <a:extLst>
+              <a:ext uri="{FF2B5EF4-FFF2-40B4-BE49-F238E27FC236}">
+                <a16:creationId xmlns:a16="http://schemas.microsoft.com/office/drawing/2014/main" id="{D9889027-8320-4893-A5A9-6A9FAFA20941}"/>
+              </a:ext>
+            </a:extLst>
+          </p:cNvPr>
+          <p:cNvSpPr/>
+          <p:nvPr/>
+        </p:nvSpPr>
+        <p:spPr>
+          <a:xfrm flipH="1">
+            <a:off x="4909025" y="4727753"/>
+            <a:ext cx="1261691" cy="331045"/>
+          </a:xfrm>
+          <a:prstGeom prst="round2DiagRect">
+            <a:avLst/>
+          </a:prstGeom>
+          <a:solidFill>
+            <a:schemeClr val="accent1">
+              <a:lumMod val="60000"/>
+              <a:lumOff val="40000"/>
+            </a:schemeClr>
+          </a:solidFill>
+          <a:ln>
+            <a:noFill/>
+          </a:ln>
+        </p:spPr>
+        <p:style>
+          <a:lnRef idx="2">
+            <a:schemeClr val="accent1">
+              <a:shade val="50000"/>
+            </a:schemeClr>
+          </a:lnRef>
+          <a:fillRef idx="1">
+            <a:schemeClr val="accent1"/>
+          </a:fillRef>
+          <a:effectRef idx="0">
+            <a:schemeClr val="accent1"/>
+          </a:effectRef>
+          <a:fontRef idx="minor">
+            <a:schemeClr val="lt1"/>
+          </a:fontRef>
+        </p:style>
+        <p:txBody>
+          <a:bodyPr rtlCol="0" anchor="ctr"/>
+          <a:lstStyle/>
+          <a:p>
+            <a:pPr algn="ctr"/>
+            <a:r>
+              <a:rPr lang="en-GB" sz="1200" dirty="0"/>
+              <a:t>Read more</a:t>
+            </a:r>
+          </a:p>
+        </p:txBody>
+      </p:sp>
+      <p:sp>
+        <p:nvSpPr>
+          <p:cNvPr id="14" name="Rectangle: Diagonal Corners Rounded 13">
+            <a:extLst>
+              <a:ext uri="{FF2B5EF4-FFF2-40B4-BE49-F238E27FC236}">
+                <a16:creationId xmlns:a16="http://schemas.microsoft.com/office/drawing/2014/main" id="{0219653C-43BC-4618-960D-856A50569D69}"/>
+              </a:ext>
+            </a:extLst>
+          </p:cNvPr>
+          <p:cNvSpPr/>
+          <p:nvPr/>
+        </p:nvSpPr>
+        <p:spPr>
+          <a:xfrm flipH="1">
+            <a:off x="2798154" y="4727754"/>
+            <a:ext cx="1261691" cy="331045"/>
+          </a:xfrm>
+          <a:prstGeom prst="round2DiagRect">
+            <a:avLst/>
+          </a:prstGeom>
+          <a:solidFill>
+            <a:schemeClr val="accent1">
+              <a:lumMod val="60000"/>
+              <a:lumOff val="40000"/>
+            </a:schemeClr>
+          </a:solidFill>
+          <a:ln>
+            <a:noFill/>
+          </a:ln>
+        </p:spPr>
+        <p:style>
+          <a:lnRef idx="2">
+            <a:schemeClr val="accent1">
+              <a:shade val="50000"/>
+            </a:schemeClr>
+          </a:lnRef>
+          <a:fillRef idx="1">
+            <a:schemeClr val="accent1"/>
+          </a:fillRef>
+          <a:effectRef idx="0">
+            <a:schemeClr val="accent1"/>
+          </a:effectRef>
+          <a:fontRef idx="minor">
+            <a:schemeClr val="lt1"/>
+          </a:fontRef>
+        </p:style>
+        <p:txBody>
+          <a:bodyPr rtlCol="0" anchor="ctr"/>
+          <a:lstStyle/>
+          <a:p>
+            <a:pPr algn="ctr"/>
+            <a:r>
+              <a:rPr lang="en-GB" sz="1200" dirty="0"/>
+              <a:t>Read more</a:t>
+            </a:r>
+          </a:p>
+        </p:txBody>
+      </p:sp>
+      <p:sp>
+        <p:nvSpPr>
+          <p:cNvPr id="15" name="Rectangle: Diagonal Corners Rounded 14">
+            <a:extLst>
+              <a:ext uri="{FF2B5EF4-FFF2-40B4-BE49-F238E27FC236}">
+                <a16:creationId xmlns:a16="http://schemas.microsoft.com/office/drawing/2014/main" id="{6B83900B-7C40-4818-B452-373B4A20F6A7}"/>
+              </a:ext>
+            </a:extLst>
+          </p:cNvPr>
+          <p:cNvSpPr/>
+          <p:nvPr/>
+        </p:nvSpPr>
+        <p:spPr>
+          <a:xfrm flipH="1">
+            <a:off x="687284" y="4727755"/>
+            <a:ext cx="1261691" cy="331045"/>
+          </a:xfrm>
+          <a:prstGeom prst="round2DiagRect">
+            <a:avLst/>
+          </a:prstGeom>
+          <a:solidFill>
+            <a:schemeClr val="accent1">
+              <a:lumMod val="60000"/>
+              <a:lumOff val="40000"/>
+            </a:schemeClr>
+          </a:solidFill>
+          <a:ln>
+            <a:noFill/>
+          </a:ln>
+        </p:spPr>
+        <p:style>
+          <a:lnRef idx="2">
+            <a:schemeClr val="accent1">
+              <a:shade val="50000"/>
+            </a:schemeClr>
+          </a:lnRef>
+          <a:fillRef idx="1">
+            <a:schemeClr val="accent1"/>
+          </a:fillRef>
+          <a:effectRef idx="0">
+            <a:schemeClr val="accent1"/>
+          </a:effectRef>
+          <a:fontRef idx="minor">
+            <a:schemeClr val="lt1"/>
+          </a:fontRef>
+        </p:style>
+        <p:txBody>
+          <a:bodyPr rtlCol="0" anchor="ctr"/>
+          <a:lstStyle/>
+          <a:p>
+            <a:pPr algn="ctr"/>
+            <a:r>
+              <a:rPr lang="en-GB" sz="1200" dirty="0"/>
+              <a:t>Read more</a:t>
+            </a:r>
+          </a:p>
+        </p:txBody>
+      </p:sp>
+      <p:sp>
+        <p:nvSpPr>
+          <p:cNvPr id="17" name="TextBox 16">
+            <a:extLst>
+              <a:ext uri="{FF2B5EF4-FFF2-40B4-BE49-F238E27FC236}">
+                <a16:creationId xmlns:a16="http://schemas.microsoft.com/office/drawing/2014/main" id="{F4B4AAD7-91F3-48A7-A3AE-911D446BE170}"/>
+              </a:ext>
+            </a:extLst>
+          </p:cNvPr>
+          <p:cNvSpPr txBox="1"/>
+          <p:nvPr/>
+        </p:nvSpPr>
+        <p:spPr>
+          <a:xfrm>
+            <a:off x="276374" y="5507188"/>
+            <a:ext cx="6305250" cy="338554"/>
+          </a:xfrm>
+          <a:prstGeom prst="rect">
+            <a:avLst/>
+          </a:prstGeom>
+          <a:noFill/>
+        </p:spPr>
+        <p:txBody>
+          <a:bodyPr wrap="square" rtlCol="0">
+            <a:spAutoFit/>
+          </a:bodyPr>
+          <a:lstStyle/>
+          <a:p>
+            <a:pPr algn="l"/>
+            <a:r>
+              <a:rPr lang="en-GB" sz="1600" b="1" dirty="0">
+                <a:solidFill>
+                  <a:srgbClr val="000000"/>
+                </a:solidFill>
+              </a:rPr>
+              <a:t>Revisions of Bariatric Operations</a:t>
+            </a:r>
+          </a:p>
+        </p:txBody>
+      </p:sp>
+      <p:sp>
+        <p:nvSpPr>
+          <p:cNvPr id="18" name="TextBox 17">
+            <a:extLst>
+              <a:ext uri="{FF2B5EF4-FFF2-40B4-BE49-F238E27FC236}">
+                <a16:creationId xmlns:a16="http://schemas.microsoft.com/office/drawing/2014/main" id="{7D47B27F-42D1-4002-9976-403B0CD9AB18}"/>
+              </a:ext>
+            </a:extLst>
+          </p:cNvPr>
+          <p:cNvSpPr txBox="1"/>
+          <p:nvPr/>
+        </p:nvSpPr>
+        <p:spPr>
+          <a:xfrm>
+            <a:off x="276374" y="5845742"/>
+            <a:ext cx="6305250" cy="276999"/>
+          </a:xfrm>
+          <a:prstGeom prst="rect">
+            <a:avLst/>
+          </a:prstGeom>
+          <a:noFill/>
+        </p:spPr>
+        <p:txBody>
+          <a:bodyPr wrap="square" rtlCol="0">
+            <a:spAutoFit/>
+          </a:bodyPr>
+          <a:lstStyle/>
+          <a:p>
+            <a:pPr algn="l"/>
+            <a:r>
+              <a:rPr lang="en-GB" sz="1200" dirty="0">
+                <a:solidFill>
+                  <a:srgbClr val="000000"/>
+                </a:solidFill>
+              </a:rPr>
+              <a:t>Paragraph about revisions.</a:t>
+            </a:r>
+          </a:p>
+        </p:txBody>
+      </p:sp>
+    </p:spTree>
+    <p:extLst>
+      <p:ext uri="{BB962C8B-B14F-4D97-AF65-F5344CB8AC3E}">
+        <p14:creationId xmlns:p14="http://schemas.microsoft.com/office/powerpoint/2010/main" val="2027665480"/>
+      </p:ext>
+    </p:extLst>
+  </p:cSld>
+  <p:clrMapOvr>
+    <a:masterClrMapping/>
+  </p:clrMapOvr>
+</p:sld>
+</file>
+
 <file path=ppt/theme/theme1.xml><?xml version="1.0" encoding="utf-8"?>
 <a:theme xmlns:a="http://schemas.openxmlformats.org/drawingml/2006/main" name="Office Theme">
   <a:themeElements>

</xml_diff>

<commit_message>
Small changes to procedures.html and design pptx
</commit_message>
<xml_diff>
--- a/Website Design Tools.pptx
+++ b/Website Design Tools.pptx
@@ -10332,7 +10332,11 @@
           </a:p>
           <a:p>
             <a:r>
-              <a:rPr lang="en-GB" sz="3600" dirty="0"/>
+              <a:rPr lang="en-GB" sz="3600" dirty="0">
+                <a:highlight>
+                  <a:srgbClr val="FFFF00"/>
+                </a:highlight>
+              </a:rPr>
               <a:t>About procedures</a:t>
             </a:r>
           </a:p>

</xml_diff>

<commit_message>
Designed and created patientStories.html and added resources to README
</commit_message>
<xml_diff>
--- a/Website Design Tools.pptx
+++ b/Website Design Tools.pptx
@@ -5,7 +5,7 @@
     <p:sldMasterId id="2147483672" r:id="rId1"/>
   </p:sldMasterIdLst>
   <p:notesMasterIdLst>
-    <p:notesMasterId r:id="rId8"/>
+    <p:notesMasterId r:id="rId9"/>
   </p:notesMasterIdLst>
   <p:sldIdLst>
     <p:sldId id="257" r:id="rId2"/>
@@ -14,6 +14,7 @@
     <p:sldId id="259" r:id="rId5"/>
     <p:sldId id="260" r:id="rId6"/>
     <p:sldId id="262" r:id="rId7"/>
+    <p:sldId id="263" r:id="rId8"/>
   </p:sldIdLst>
   <p:sldSz cx="6858000" cy="10799763"/>
   <p:notesSz cx="6858000" cy="9144000"/>
@@ -127,6 +128,7 @@
             <p14:sldId id="259"/>
             <p14:sldId id="260"/>
             <p14:sldId id="262"/>
+            <p14:sldId id="263"/>
           </p14:sldIdLst>
         </p14:section>
       </p14:sectionLst>
@@ -10342,7 +10344,11 @@
           </a:p>
           <a:p>
             <a:r>
-              <a:rPr lang="en-GB" sz="3600" dirty="0"/>
+              <a:rPr lang="en-GB" sz="3600" dirty="0">
+                <a:highlight>
+                  <a:srgbClr val="FFFF00"/>
+                </a:highlight>
+              </a:rPr>
               <a:t>Patient stories</a:t>
             </a:r>
           </a:p>
@@ -15564,7 +15570,7 @@
         <p:spPr>
           <a:xfrm>
             <a:off x="276374" y="5845742"/>
-            <a:ext cx="6305250" cy="276999"/>
+            <a:ext cx="6305250" cy="1384995"/>
           </a:xfrm>
           <a:prstGeom prst="rect">
             <a:avLst/>
@@ -15577,14 +15583,799 @@
           </a:bodyPr>
           <a:lstStyle/>
           <a:p>
+            <a:r>
+              <a:rPr lang="en-GB" sz="1200" dirty="0">
+                <a:solidFill>
+                  <a:srgbClr val="000000"/>
+                </a:solidFill>
+              </a:rPr>
+              <a:t>Paragraph about revisions. Lorem ipsum </a:t>
+            </a:r>
+            <a:r>
+              <a:rPr lang="en-GB" sz="1200" dirty="0" err="1">
+                <a:solidFill>
+                  <a:srgbClr val="000000"/>
+                </a:solidFill>
+              </a:rPr>
+              <a:t>dolor</a:t>
+            </a:r>
+            <a:r>
+              <a:rPr lang="en-GB" sz="1200" dirty="0">
+                <a:solidFill>
+                  <a:srgbClr val="000000"/>
+                </a:solidFill>
+              </a:rPr>
+              <a:t> sit </a:t>
+            </a:r>
+            <a:r>
+              <a:rPr lang="en-GB" sz="1200" dirty="0" err="1">
+                <a:solidFill>
+                  <a:srgbClr val="000000"/>
+                </a:solidFill>
+              </a:rPr>
+              <a:t>amet</a:t>
+            </a:r>
+            <a:r>
+              <a:rPr lang="en-GB" sz="1200" dirty="0">
+                <a:solidFill>
+                  <a:srgbClr val="000000"/>
+                </a:solidFill>
+              </a:rPr>
+              <a:t>, </a:t>
+            </a:r>
+            <a:r>
+              <a:rPr lang="en-GB" sz="1200" dirty="0" err="1">
+                <a:solidFill>
+                  <a:srgbClr val="000000"/>
+                </a:solidFill>
+              </a:rPr>
+              <a:t>consectetur</a:t>
+            </a:r>
+            <a:r>
+              <a:rPr lang="en-GB" sz="1200" dirty="0">
+                <a:solidFill>
+                  <a:srgbClr val="000000"/>
+                </a:solidFill>
+              </a:rPr>
+              <a:t> </a:t>
+            </a:r>
+            <a:r>
+              <a:rPr lang="en-GB" sz="1200" dirty="0" err="1">
+                <a:solidFill>
+                  <a:srgbClr val="000000"/>
+                </a:solidFill>
+              </a:rPr>
+              <a:t>adipiscing</a:t>
+            </a:r>
+            <a:r>
+              <a:rPr lang="en-GB" sz="1200" dirty="0">
+                <a:solidFill>
+                  <a:srgbClr val="000000"/>
+                </a:solidFill>
+              </a:rPr>
+              <a:t> </a:t>
+            </a:r>
+            <a:r>
+              <a:rPr lang="en-GB" sz="1200" dirty="0" err="1">
+                <a:solidFill>
+                  <a:srgbClr val="000000"/>
+                </a:solidFill>
+              </a:rPr>
+              <a:t>elit</a:t>
+            </a:r>
+            <a:r>
+              <a:rPr lang="en-GB" sz="1200" dirty="0">
+                <a:solidFill>
+                  <a:srgbClr val="000000"/>
+                </a:solidFill>
+              </a:rPr>
+              <a:t>. </a:t>
+            </a:r>
+            <a:r>
+              <a:rPr lang="en-GB" sz="1200" dirty="0" err="1">
+                <a:solidFill>
+                  <a:srgbClr val="000000"/>
+                </a:solidFill>
+              </a:rPr>
+              <a:t>Aliquam</a:t>
+            </a:r>
+            <a:r>
+              <a:rPr lang="en-GB" sz="1200" dirty="0">
+                <a:solidFill>
+                  <a:srgbClr val="000000"/>
+                </a:solidFill>
+              </a:rPr>
+              <a:t> </a:t>
+            </a:r>
+            <a:r>
+              <a:rPr lang="en-GB" sz="1200" dirty="0" err="1">
+                <a:solidFill>
+                  <a:srgbClr val="000000"/>
+                </a:solidFill>
+              </a:rPr>
+              <a:t>lectus</a:t>
+            </a:r>
+            <a:r>
+              <a:rPr lang="en-GB" sz="1200" dirty="0">
+                <a:solidFill>
+                  <a:srgbClr val="000000"/>
+                </a:solidFill>
+              </a:rPr>
+              <a:t> dui, cursus vitae </a:t>
+            </a:r>
+            <a:r>
+              <a:rPr lang="en-GB" sz="1200" dirty="0" err="1">
+                <a:solidFill>
+                  <a:srgbClr val="000000"/>
+                </a:solidFill>
+              </a:rPr>
+              <a:t>elit</a:t>
+            </a:r>
+            <a:r>
+              <a:rPr lang="en-GB" sz="1200" dirty="0">
+                <a:solidFill>
+                  <a:srgbClr val="000000"/>
+                </a:solidFill>
+              </a:rPr>
+              <a:t> </a:t>
+            </a:r>
+            <a:r>
+              <a:rPr lang="en-GB" sz="1200" dirty="0" err="1">
+                <a:solidFill>
+                  <a:srgbClr val="000000"/>
+                </a:solidFill>
+              </a:rPr>
+              <a:t>quis</a:t>
+            </a:r>
+            <a:r>
+              <a:rPr lang="en-GB" sz="1200" dirty="0">
+                <a:solidFill>
+                  <a:srgbClr val="000000"/>
+                </a:solidFill>
+              </a:rPr>
+              <a:t>, </a:t>
+            </a:r>
+            <a:r>
+              <a:rPr lang="en-GB" sz="1200" dirty="0" err="1">
+                <a:solidFill>
+                  <a:srgbClr val="000000"/>
+                </a:solidFill>
+              </a:rPr>
+              <a:t>mattis</a:t>
+            </a:r>
+            <a:r>
+              <a:rPr lang="en-GB" sz="1200" dirty="0">
+                <a:solidFill>
+                  <a:srgbClr val="000000"/>
+                </a:solidFill>
+              </a:rPr>
+              <a:t> </a:t>
+            </a:r>
+            <a:r>
+              <a:rPr lang="en-GB" sz="1200" dirty="0" err="1">
+                <a:solidFill>
+                  <a:srgbClr val="000000"/>
+                </a:solidFill>
+              </a:rPr>
+              <a:t>suscipit</a:t>
+            </a:r>
+            <a:r>
+              <a:rPr lang="en-GB" sz="1200" dirty="0">
+                <a:solidFill>
+                  <a:srgbClr val="000000"/>
+                </a:solidFill>
+              </a:rPr>
+              <a:t> </a:t>
+            </a:r>
+            <a:r>
+              <a:rPr lang="en-GB" sz="1200" dirty="0" err="1">
+                <a:solidFill>
+                  <a:srgbClr val="000000"/>
+                </a:solidFill>
+              </a:rPr>
+              <a:t>massa</a:t>
+            </a:r>
+            <a:r>
+              <a:rPr lang="en-GB" sz="1200" dirty="0">
+                <a:solidFill>
+                  <a:srgbClr val="000000"/>
+                </a:solidFill>
+              </a:rPr>
+              <a:t>. </a:t>
+            </a:r>
+            <a:r>
+              <a:rPr lang="en-GB" sz="1200" dirty="0" err="1">
+                <a:solidFill>
+                  <a:srgbClr val="000000"/>
+                </a:solidFill>
+              </a:rPr>
+              <a:t>Fusce</a:t>
+            </a:r>
+            <a:r>
+              <a:rPr lang="en-GB" sz="1200" dirty="0">
+                <a:solidFill>
+                  <a:srgbClr val="000000"/>
+                </a:solidFill>
+              </a:rPr>
+              <a:t> </a:t>
+            </a:r>
+            <a:r>
+              <a:rPr lang="en-GB" sz="1200" dirty="0" err="1">
+                <a:solidFill>
+                  <a:srgbClr val="000000"/>
+                </a:solidFill>
+              </a:rPr>
+              <a:t>nec</a:t>
+            </a:r>
+            <a:r>
+              <a:rPr lang="en-GB" sz="1200" dirty="0">
+                <a:solidFill>
+                  <a:srgbClr val="000000"/>
+                </a:solidFill>
+              </a:rPr>
+              <a:t> </a:t>
+            </a:r>
+            <a:r>
+              <a:rPr lang="en-GB" sz="1200" dirty="0" err="1">
+                <a:solidFill>
+                  <a:srgbClr val="000000"/>
+                </a:solidFill>
+              </a:rPr>
+              <a:t>diam</a:t>
+            </a:r>
+            <a:r>
+              <a:rPr lang="en-GB" sz="1200" dirty="0">
+                <a:solidFill>
+                  <a:srgbClr val="000000"/>
+                </a:solidFill>
+              </a:rPr>
+              <a:t> </a:t>
+            </a:r>
+            <a:r>
+              <a:rPr lang="en-GB" sz="1200" dirty="0" err="1">
+                <a:solidFill>
+                  <a:srgbClr val="000000"/>
+                </a:solidFill>
+              </a:rPr>
+              <a:t>leo</a:t>
+            </a:r>
+            <a:r>
+              <a:rPr lang="en-GB" sz="1200" dirty="0">
+                <a:solidFill>
+                  <a:srgbClr val="000000"/>
+                </a:solidFill>
+              </a:rPr>
+              <a:t>. Lorem ipsum </a:t>
+            </a:r>
+            <a:r>
+              <a:rPr lang="en-GB" sz="1200" dirty="0" err="1">
+                <a:solidFill>
+                  <a:srgbClr val="000000"/>
+                </a:solidFill>
+              </a:rPr>
+              <a:t>dolor</a:t>
+            </a:r>
+            <a:r>
+              <a:rPr lang="en-GB" sz="1200" dirty="0">
+                <a:solidFill>
+                  <a:srgbClr val="000000"/>
+                </a:solidFill>
+              </a:rPr>
+              <a:t> sit </a:t>
+            </a:r>
+            <a:r>
+              <a:rPr lang="en-GB" sz="1200" dirty="0" err="1">
+                <a:solidFill>
+                  <a:srgbClr val="000000"/>
+                </a:solidFill>
+              </a:rPr>
+              <a:t>amet</a:t>
+            </a:r>
+            <a:r>
+              <a:rPr lang="en-GB" sz="1200" dirty="0">
+                <a:solidFill>
+                  <a:srgbClr val="000000"/>
+                </a:solidFill>
+              </a:rPr>
+              <a:t>, </a:t>
+            </a:r>
+            <a:r>
+              <a:rPr lang="en-GB" sz="1200" dirty="0" err="1">
+                <a:solidFill>
+                  <a:srgbClr val="000000"/>
+                </a:solidFill>
+              </a:rPr>
+              <a:t>consectetur</a:t>
+            </a:r>
+            <a:r>
+              <a:rPr lang="en-GB" sz="1200" dirty="0">
+                <a:solidFill>
+                  <a:srgbClr val="000000"/>
+                </a:solidFill>
+              </a:rPr>
+              <a:t> </a:t>
+            </a:r>
+            <a:r>
+              <a:rPr lang="en-GB" sz="1200" dirty="0" err="1">
+                <a:solidFill>
+                  <a:srgbClr val="000000"/>
+                </a:solidFill>
+              </a:rPr>
+              <a:t>adipiscing</a:t>
+            </a:r>
+            <a:r>
+              <a:rPr lang="en-GB" sz="1200" dirty="0">
+                <a:solidFill>
+                  <a:srgbClr val="000000"/>
+                </a:solidFill>
+              </a:rPr>
+              <a:t> </a:t>
+            </a:r>
+            <a:r>
+              <a:rPr lang="en-GB" sz="1200" dirty="0" err="1">
+                <a:solidFill>
+                  <a:srgbClr val="000000"/>
+                </a:solidFill>
+              </a:rPr>
+              <a:t>elit</a:t>
+            </a:r>
+            <a:r>
+              <a:rPr lang="en-GB" sz="1200" dirty="0">
+                <a:solidFill>
+                  <a:srgbClr val="000000"/>
+                </a:solidFill>
+              </a:rPr>
+              <a:t>. </a:t>
+            </a:r>
+            <a:r>
+              <a:rPr lang="en-GB" sz="1200" dirty="0" err="1">
+                <a:solidFill>
+                  <a:srgbClr val="000000"/>
+                </a:solidFill>
+              </a:rPr>
+              <a:t>Aliquam</a:t>
+            </a:r>
+            <a:r>
+              <a:rPr lang="en-GB" sz="1200" dirty="0">
+                <a:solidFill>
+                  <a:srgbClr val="000000"/>
+                </a:solidFill>
+              </a:rPr>
+              <a:t> </a:t>
+            </a:r>
+            <a:r>
+              <a:rPr lang="en-GB" sz="1200" dirty="0" err="1">
+                <a:solidFill>
+                  <a:srgbClr val="000000"/>
+                </a:solidFill>
+              </a:rPr>
+              <a:t>lectus</a:t>
+            </a:r>
+            <a:r>
+              <a:rPr lang="en-GB" sz="1200" dirty="0">
+                <a:solidFill>
+                  <a:srgbClr val="000000"/>
+                </a:solidFill>
+              </a:rPr>
+              <a:t> dui, cursus vitae </a:t>
+            </a:r>
+            <a:r>
+              <a:rPr lang="en-GB" sz="1200" dirty="0" err="1">
+                <a:solidFill>
+                  <a:srgbClr val="000000"/>
+                </a:solidFill>
+              </a:rPr>
+              <a:t>elit</a:t>
+            </a:r>
+            <a:r>
+              <a:rPr lang="en-GB" sz="1200" dirty="0">
+                <a:solidFill>
+                  <a:srgbClr val="000000"/>
+                </a:solidFill>
+              </a:rPr>
+              <a:t> </a:t>
+            </a:r>
+            <a:r>
+              <a:rPr lang="en-GB" sz="1200" dirty="0" err="1">
+                <a:solidFill>
+                  <a:srgbClr val="000000"/>
+                </a:solidFill>
+              </a:rPr>
+              <a:t>quis</a:t>
+            </a:r>
+            <a:r>
+              <a:rPr lang="en-GB" sz="1200" dirty="0">
+                <a:solidFill>
+                  <a:srgbClr val="000000"/>
+                </a:solidFill>
+              </a:rPr>
+              <a:t>, </a:t>
+            </a:r>
+            <a:r>
+              <a:rPr lang="en-GB" sz="1200" dirty="0" err="1">
+                <a:solidFill>
+                  <a:srgbClr val="000000"/>
+                </a:solidFill>
+              </a:rPr>
+              <a:t>mattis</a:t>
+            </a:r>
+            <a:r>
+              <a:rPr lang="en-GB" sz="1200" dirty="0">
+                <a:solidFill>
+                  <a:srgbClr val="000000"/>
+                </a:solidFill>
+              </a:rPr>
+              <a:t> </a:t>
+            </a:r>
+            <a:r>
+              <a:rPr lang="en-GB" sz="1200" dirty="0" err="1">
+                <a:solidFill>
+                  <a:srgbClr val="000000"/>
+                </a:solidFill>
+              </a:rPr>
+              <a:t>suscipit</a:t>
+            </a:r>
+            <a:r>
+              <a:rPr lang="en-GB" sz="1200" dirty="0">
+                <a:solidFill>
+                  <a:srgbClr val="000000"/>
+                </a:solidFill>
+              </a:rPr>
+              <a:t> </a:t>
+            </a:r>
+            <a:r>
+              <a:rPr lang="en-GB" sz="1200" dirty="0" err="1">
+                <a:solidFill>
+                  <a:srgbClr val="000000"/>
+                </a:solidFill>
+              </a:rPr>
+              <a:t>massa</a:t>
+            </a:r>
+            <a:r>
+              <a:rPr lang="en-GB" sz="1200" dirty="0">
+                <a:solidFill>
+                  <a:srgbClr val="000000"/>
+                </a:solidFill>
+              </a:rPr>
+              <a:t>. </a:t>
+            </a:r>
+            <a:r>
+              <a:rPr lang="en-GB" sz="1200" dirty="0" err="1">
+                <a:solidFill>
+                  <a:srgbClr val="000000"/>
+                </a:solidFill>
+              </a:rPr>
+              <a:t>Fusce</a:t>
+            </a:r>
+            <a:r>
+              <a:rPr lang="en-GB" sz="1200" dirty="0">
+                <a:solidFill>
+                  <a:srgbClr val="000000"/>
+                </a:solidFill>
+              </a:rPr>
+              <a:t> </a:t>
+            </a:r>
+            <a:r>
+              <a:rPr lang="en-GB" sz="1200" dirty="0" err="1">
+                <a:solidFill>
+                  <a:srgbClr val="000000"/>
+                </a:solidFill>
+              </a:rPr>
+              <a:t>nec</a:t>
+            </a:r>
+            <a:r>
+              <a:rPr lang="en-GB" sz="1200" dirty="0">
+                <a:solidFill>
+                  <a:srgbClr val="000000"/>
+                </a:solidFill>
+              </a:rPr>
+              <a:t> </a:t>
+            </a:r>
+            <a:r>
+              <a:rPr lang="en-GB" sz="1200" dirty="0" err="1">
+                <a:solidFill>
+                  <a:srgbClr val="000000"/>
+                </a:solidFill>
+              </a:rPr>
+              <a:t>diam</a:t>
+            </a:r>
+            <a:r>
+              <a:rPr lang="en-GB" sz="1200" dirty="0">
+                <a:solidFill>
+                  <a:srgbClr val="000000"/>
+                </a:solidFill>
+              </a:rPr>
+              <a:t> </a:t>
+            </a:r>
+            <a:r>
+              <a:rPr lang="en-GB" sz="1200" dirty="0" err="1">
+                <a:solidFill>
+                  <a:srgbClr val="000000"/>
+                </a:solidFill>
+              </a:rPr>
+              <a:t>leo</a:t>
+            </a:r>
+            <a:r>
+              <a:rPr lang="en-GB" sz="1200" dirty="0">
+                <a:solidFill>
+                  <a:srgbClr val="000000"/>
+                </a:solidFill>
+              </a:rPr>
+              <a:t>. </a:t>
+            </a:r>
+          </a:p>
+          <a:p>
             <a:pPr algn="l"/>
+            <a:endParaRPr lang="en-GB" sz="1200" dirty="0">
+              <a:solidFill>
+                <a:srgbClr val="000000"/>
+              </a:solidFill>
+            </a:endParaRPr>
+          </a:p>
+          <a:p>
             <a:r>
               <a:rPr lang="en-GB" sz="1200" dirty="0">
                 <a:solidFill>
                   <a:srgbClr val="000000"/>
                 </a:solidFill>
               </a:rPr>
-              <a:t>Paragraph about revisions.</a:t>
+              <a:t>Lorem ipsum </a:t>
+            </a:r>
+            <a:r>
+              <a:rPr lang="en-GB" sz="1200" dirty="0" err="1">
+                <a:solidFill>
+                  <a:srgbClr val="000000"/>
+                </a:solidFill>
+              </a:rPr>
+              <a:t>dolor</a:t>
+            </a:r>
+            <a:r>
+              <a:rPr lang="en-GB" sz="1200" dirty="0">
+                <a:solidFill>
+                  <a:srgbClr val="000000"/>
+                </a:solidFill>
+              </a:rPr>
+              <a:t> sit </a:t>
+            </a:r>
+            <a:r>
+              <a:rPr lang="en-GB" sz="1200" dirty="0" err="1">
+                <a:solidFill>
+                  <a:srgbClr val="000000"/>
+                </a:solidFill>
+              </a:rPr>
+              <a:t>amet</a:t>
+            </a:r>
+            <a:r>
+              <a:rPr lang="en-GB" sz="1200" dirty="0">
+                <a:solidFill>
+                  <a:srgbClr val="000000"/>
+                </a:solidFill>
+              </a:rPr>
+              <a:t>, </a:t>
+            </a:r>
+            <a:r>
+              <a:rPr lang="en-GB" sz="1200" dirty="0" err="1">
+                <a:solidFill>
+                  <a:srgbClr val="000000"/>
+                </a:solidFill>
+              </a:rPr>
+              <a:t>consectetur</a:t>
+            </a:r>
+            <a:r>
+              <a:rPr lang="en-GB" sz="1200" dirty="0">
+                <a:solidFill>
+                  <a:srgbClr val="000000"/>
+                </a:solidFill>
+              </a:rPr>
+              <a:t> </a:t>
+            </a:r>
+            <a:r>
+              <a:rPr lang="en-GB" sz="1200" dirty="0" err="1">
+                <a:solidFill>
+                  <a:srgbClr val="000000"/>
+                </a:solidFill>
+              </a:rPr>
+              <a:t>adipiscing</a:t>
+            </a:r>
+            <a:r>
+              <a:rPr lang="en-GB" sz="1200" dirty="0">
+                <a:solidFill>
+                  <a:srgbClr val="000000"/>
+                </a:solidFill>
+              </a:rPr>
+              <a:t> </a:t>
+            </a:r>
+            <a:r>
+              <a:rPr lang="en-GB" sz="1200" dirty="0" err="1">
+                <a:solidFill>
+                  <a:srgbClr val="000000"/>
+                </a:solidFill>
+              </a:rPr>
+              <a:t>elit</a:t>
+            </a:r>
+            <a:r>
+              <a:rPr lang="en-GB" sz="1200" dirty="0">
+                <a:solidFill>
+                  <a:srgbClr val="000000"/>
+                </a:solidFill>
+              </a:rPr>
+              <a:t>. </a:t>
+            </a:r>
+            <a:r>
+              <a:rPr lang="en-GB" sz="1200" dirty="0" err="1">
+                <a:solidFill>
+                  <a:srgbClr val="000000"/>
+                </a:solidFill>
+              </a:rPr>
+              <a:t>Aliquam</a:t>
+            </a:r>
+            <a:r>
+              <a:rPr lang="en-GB" sz="1200" dirty="0">
+                <a:solidFill>
+                  <a:srgbClr val="000000"/>
+                </a:solidFill>
+              </a:rPr>
+              <a:t> </a:t>
+            </a:r>
+            <a:r>
+              <a:rPr lang="en-GB" sz="1200" dirty="0" err="1">
+                <a:solidFill>
+                  <a:srgbClr val="000000"/>
+                </a:solidFill>
+              </a:rPr>
+              <a:t>lectus</a:t>
+            </a:r>
+            <a:r>
+              <a:rPr lang="en-GB" sz="1200" dirty="0">
+                <a:solidFill>
+                  <a:srgbClr val="000000"/>
+                </a:solidFill>
+              </a:rPr>
+              <a:t> dui, cursus vitae </a:t>
+            </a:r>
+            <a:r>
+              <a:rPr lang="en-GB" sz="1200" dirty="0" err="1">
+                <a:solidFill>
+                  <a:srgbClr val="000000"/>
+                </a:solidFill>
+              </a:rPr>
+              <a:t>elit</a:t>
+            </a:r>
+            <a:r>
+              <a:rPr lang="en-GB" sz="1200" dirty="0">
+                <a:solidFill>
+                  <a:srgbClr val="000000"/>
+                </a:solidFill>
+              </a:rPr>
+              <a:t> </a:t>
+            </a:r>
+            <a:r>
+              <a:rPr lang="en-GB" sz="1200" dirty="0" err="1">
+                <a:solidFill>
+                  <a:srgbClr val="000000"/>
+                </a:solidFill>
+              </a:rPr>
+              <a:t>quis</a:t>
+            </a:r>
+            <a:r>
+              <a:rPr lang="en-GB" sz="1200" dirty="0">
+                <a:solidFill>
+                  <a:srgbClr val="000000"/>
+                </a:solidFill>
+              </a:rPr>
+              <a:t>, </a:t>
+            </a:r>
+            <a:r>
+              <a:rPr lang="en-GB" sz="1200" dirty="0" err="1">
+                <a:solidFill>
+                  <a:srgbClr val="000000"/>
+                </a:solidFill>
+              </a:rPr>
+              <a:t>mattis</a:t>
+            </a:r>
+            <a:r>
+              <a:rPr lang="en-GB" sz="1200" dirty="0">
+                <a:solidFill>
+                  <a:srgbClr val="000000"/>
+                </a:solidFill>
+              </a:rPr>
+              <a:t> </a:t>
+            </a:r>
+            <a:r>
+              <a:rPr lang="en-GB" sz="1200" dirty="0" err="1">
+                <a:solidFill>
+                  <a:srgbClr val="000000"/>
+                </a:solidFill>
+              </a:rPr>
+              <a:t>suscipit</a:t>
+            </a:r>
+            <a:r>
+              <a:rPr lang="en-GB" sz="1200" dirty="0">
+                <a:solidFill>
+                  <a:srgbClr val="000000"/>
+                </a:solidFill>
+              </a:rPr>
+              <a:t> </a:t>
+            </a:r>
+            <a:r>
+              <a:rPr lang="en-GB" sz="1200" dirty="0" err="1">
+                <a:solidFill>
+                  <a:srgbClr val="000000"/>
+                </a:solidFill>
+              </a:rPr>
+              <a:t>massa</a:t>
+            </a:r>
+            <a:r>
+              <a:rPr lang="en-GB" sz="1200" dirty="0">
+                <a:solidFill>
+                  <a:srgbClr val="000000"/>
+                </a:solidFill>
+              </a:rPr>
+              <a:t>. </a:t>
+            </a:r>
+            <a:r>
+              <a:rPr lang="en-GB" sz="1200" dirty="0" err="1">
+                <a:solidFill>
+                  <a:srgbClr val="000000"/>
+                </a:solidFill>
+              </a:rPr>
+              <a:t>Fusce</a:t>
+            </a:r>
+            <a:r>
+              <a:rPr lang="en-GB" sz="1200" dirty="0">
+                <a:solidFill>
+                  <a:srgbClr val="000000"/>
+                </a:solidFill>
+              </a:rPr>
+              <a:t> </a:t>
+            </a:r>
+            <a:r>
+              <a:rPr lang="en-GB" sz="1200" dirty="0" err="1">
+                <a:solidFill>
+                  <a:srgbClr val="000000"/>
+                </a:solidFill>
+              </a:rPr>
+              <a:t>nec</a:t>
+            </a:r>
+            <a:r>
+              <a:rPr lang="en-GB" sz="1200" dirty="0">
+                <a:solidFill>
+                  <a:srgbClr val="000000"/>
+                </a:solidFill>
+              </a:rPr>
+              <a:t> </a:t>
+            </a:r>
+            <a:r>
+              <a:rPr lang="en-GB" sz="1200" dirty="0" err="1">
+                <a:solidFill>
+                  <a:srgbClr val="000000"/>
+                </a:solidFill>
+              </a:rPr>
+              <a:t>diam</a:t>
+            </a:r>
+            <a:r>
+              <a:rPr lang="en-GB" sz="1200" dirty="0">
+                <a:solidFill>
+                  <a:srgbClr val="000000"/>
+                </a:solidFill>
+              </a:rPr>
+              <a:t> </a:t>
+            </a:r>
+            <a:r>
+              <a:rPr lang="en-GB" sz="1200" dirty="0" err="1">
+                <a:solidFill>
+                  <a:srgbClr val="000000"/>
+                </a:solidFill>
+              </a:rPr>
+              <a:t>leo</a:t>
+            </a:r>
+            <a:r>
+              <a:rPr lang="en-GB" sz="1200" dirty="0">
+                <a:solidFill>
+                  <a:srgbClr val="000000"/>
+                </a:solidFill>
+              </a:rPr>
+              <a:t>. </a:t>
             </a:r>
           </a:p>
         </p:txBody>
@@ -15593,6 +16384,2118 @@
     <p:extLst>
       <p:ext uri="{BB962C8B-B14F-4D97-AF65-F5344CB8AC3E}">
         <p14:creationId xmlns:p14="http://schemas.microsoft.com/office/powerpoint/2010/main" val="2027665480"/>
+      </p:ext>
+    </p:extLst>
+  </p:cSld>
+  <p:clrMapOvr>
+    <a:masterClrMapping/>
+  </p:clrMapOvr>
+</p:sld>
+</file>
+
+<file path=ppt/slides/slide7.xml><?xml version="1.0" encoding="utf-8"?>
+<p:sld xmlns:a="http://schemas.openxmlformats.org/drawingml/2006/main" xmlns:r="http://schemas.openxmlformats.org/officeDocument/2006/relationships" xmlns:p="http://schemas.openxmlformats.org/presentationml/2006/main">
+  <p:cSld>
+    <p:spTree>
+      <p:nvGrpSpPr>
+        <p:cNvPr id="1" name=""/>
+        <p:cNvGrpSpPr/>
+        <p:nvPr/>
+      </p:nvGrpSpPr>
+      <p:grpSpPr>
+        <a:xfrm>
+          <a:off x="0" y="0"/>
+          <a:ext cx="0" cy="0"/>
+          <a:chOff x="0" y="0"/>
+          <a:chExt cx="0" cy="0"/>
+        </a:xfrm>
+      </p:grpSpPr>
+      <p:pic>
+        <p:nvPicPr>
+          <p:cNvPr id="2" name="Picture 1">
+            <a:extLst>
+              <a:ext uri="{FF2B5EF4-FFF2-40B4-BE49-F238E27FC236}">
+                <a16:creationId xmlns:a16="http://schemas.microsoft.com/office/drawing/2014/main" id="{E3763B69-8364-486C-B0DE-58B1175F9FF4}"/>
+              </a:ext>
+            </a:extLst>
+          </p:cNvPr>
+          <p:cNvPicPr>
+            <a:picLocks noChangeAspect="1"/>
+          </p:cNvPicPr>
+          <p:nvPr/>
+        </p:nvPicPr>
+        <p:blipFill>
+          <a:blip r:embed="rId2"/>
+          <a:stretch>
+            <a:fillRect/>
+          </a:stretch>
+        </p:blipFill>
+        <p:spPr>
+          <a:xfrm>
+            <a:off x="0" y="-2063"/>
+            <a:ext cx="6858000" cy="799794"/>
+          </a:xfrm>
+          <a:prstGeom prst="rect">
+            <a:avLst/>
+          </a:prstGeom>
+        </p:spPr>
+      </p:pic>
+      <p:sp>
+        <p:nvSpPr>
+          <p:cNvPr id="3" name="Rectangle 2">
+            <a:extLst>
+              <a:ext uri="{FF2B5EF4-FFF2-40B4-BE49-F238E27FC236}">
+                <a16:creationId xmlns:a16="http://schemas.microsoft.com/office/drawing/2014/main" id="{A9A7E3B9-70C6-4A16-B6D8-EA3AFD3505F8}"/>
+              </a:ext>
+            </a:extLst>
+          </p:cNvPr>
+          <p:cNvSpPr/>
+          <p:nvPr/>
+        </p:nvSpPr>
+        <p:spPr>
+          <a:xfrm>
+            <a:off x="0" y="797731"/>
+            <a:ext cx="6858000" cy="1488269"/>
+          </a:xfrm>
+          <a:prstGeom prst="rect">
+            <a:avLst/>
+          </a:prstGeom>
+          <a:solidFill>
+            <a:schemeClr val="bg2">
+              <a:lumMod val="90000"/>
+            </a:schemeClr>
+          </a:solidFill>
+          <a:ln>
+            <a:noFill/>
+          </a:ln>
+        </p:spPr>
+        <p:style>
+          <a:lnRef idx="2">
+            <a:schemeClr val="accent1">
+              <a:shade val="50000"/>
+            </a:schemeClr>
+          </a:lnRef>
+          <a:fillRef idx="1">
+            <a:schemeClr val="accent1"/>
+          </a:fillRef>
+          <a:effectRef idx="0">
+            <a:schemeClr val="accent1"/>
+          </a:effectRef>
+          <a:fontRef idx="minor">
+            <a:schemeClr val="lt1"/>
+          </a:fontRef>
+        </p:style>
+        <p:txBody>
+          <a:bodyPr rtlCol="0" anchor="ctr"/>
+          <a:lstStyle/>
+          <a:p>
+            <a:pPr algn="ctr"/>
+            <a:endParaRPr lang="en-GB" dirty="0"/>
+          </a:p>
+        </p:txBody>
+      </p:sp>
+      <p:sp>
+        <p:nvSpPr>
+          <p:cNvPr id="4" name="TextBox 3">
+            <a:extLst>
+              <a:ext uri="{FF2B5EF4-FFF2-40B4-BE49-F238E27FC236}">
+                <a16:creationId xmlns:a16="http://schemas.microsoft.com/office/drawing/2014/main" id="{7A2D3681-C2D0-4BF3-AB9D-9E626DD934BD}"/>
+              </a:ext>
+            </a:extLst>
+          </p:cNvPr>
+          <p:cNvSpPr txBox="1"/>
+          <p:nvPr/>
+        </p:nvSpPr>
+        <p:spPr>
+          <a:xfrm>
+            <a:off x="3785673" y="1087875"/>
+            <a:ext cx="2705035" cy="830997"/>
+          </a:xfrm>
+          <a:prstGeom prst="rect">
+            <a:avLst/>
+          </a:prstGeom>
+          <a:noFill/>
+        </p:spPr>
+        <p:txBody>
+          <a:bodyPr wrap="none" rtlCol="0">
+            <a:spAutoFit/>
+          </a:bodyPr>
+          <a:lstStyle/>
+          <a:p>
+            <a:pPr algn="r"/>
+            <a:r>
+              <a:rPr lang="en-GB" sz="2400" dirty="0"/>
+              <a:t>Patient Experiences </a:t>
+            </a:r>
+          </a:p>
+          <a:p>
+            <a:pPr algn="r"/>
+            <a:r>
+              <a:rPr lang="en-GB" sz="2400" dirty="0"/>
+              <a:t>and Success Stories</a:t>
+            </a:r>
+          </a:p>
+        </p:txBody>
+      </p:sp>
+      <p:sp>
+        <p:nvSpPr>
+          <p:cNvPr id="5" name="Rectangle 4">
+            <a:extLst>
+              <a:ext uri="{FF2B5EF4-FFF2-40B4-BE49-F238E27FC236}">
+                <a16:creationId xmlns:a16="http://schemas.microsoft.com/office/drawing/2014/main" id="{6438A6E4-9B04-4DE6-B95B-6CE2BD1C58FC}"/>
+              </a:ext>
+            </a:extLst>
+          </p:cNvPr>
+          <p:cNvSpPr/>
+          <p:nvPr/>
+        </p:nvSpPr>
+        <p:spPr>
+          <a:xfrm>
+            <a:off x="0" y="9588856"/>
+            <a:ext cx="6858000" cy="1194865"/>
+          </a:xfrm>
+          <a:prstGeom prst="rect">
+            <a:avLst/>
+          </a:prstGeom>
+          <a:noFill/>
+          <a:ln w="12700">
+            <a:solidFill>
+              <a:schemeClr val="tx1"/>
+            </a:solidFill>
+          </a:ln>
+        </p:spPr>
+        <p:style>
+          <a:lnRef idx="2">
+            <a:schemeClr val="accent1">
+              <a:shade val="50000"/>
+            </a:schemeClr>
+          </a:lnRef>
+          <a:fillRef idx="1">
+            <a:schemeClr val="accent1"/>
+          </a:fillRef>
+          <a:effectRef idx="0">
+            <a:schemeClr val="accent1"/>
+          </a:effectRef>
+          <a:fontRef idx="minor">
+            <a:schemeClr val="lt1"/>
+          </a:fontRef>
+        </p:style>
+        <p:txBody>
+          <a:bodyPr rtlCol="0" anchor="ctr"/>
+          <a:lstStyle/>
+          <a:p>
+            <a:pPr algn="ctr"/>
+            <a:endParaRPr lang="en-GB"/>
+          </a:p>
+        </p:txBody>
+      </p:sp>
+      <p:sp>
+        <p:nvSpPr>
+          <p:cNvPr id="6" name="TextBox 5">
+            <a:extLst>
+              <a:ext uri="{FF2B5EF4-FFF2-40B4-BE49-F238E27FC236}">
+                <a16:creationId xmlns:a16="http://schemas.microsoft.com/office/drawing/2014/main" id="{7DE356D9-9E56-4723-A0BF-0E7DF325E53C}"/>
+              </a:ext>
+            </a:extLst>
+          </p:cNvPr>
+          <p:cNvSpPr txBox="1"/>
+          <p:nvPr/>
+        </p:nvSpPr>
+        <p:spPr>
+          <a:xfrm>
+            <a:off x="4809987" y="10246716"/>
+            <a:ext cx="1771639" cy="384721"/>
+          </a:xfrm>
+          <a:prstGeom prst="rect">
+            <a:avLst/>
+          </a:prstGeom>
+          <a:noFill/>
+        </p:spPr>
+        <p:txBody>
+          <a:bodyPr wrap="none" rtlCol="0">
+            <a:spAutoFit/>
+          </a:bodyPr>
+          <a:lstStyle/>
+          <a:p>
+            <a:r>
+              <a:rPr lang="en-GB" sz="1100" dirty="0"/>
+              <a:t>Advanced Obesity Surgery</a:t>
+            </a:r>
+          </a:p>
+          <a:p>
+            <a:pPr algn="r"/>
+            <a:r>
+              <a:rPr lang="en-GB" sz="800" dirty="0"/>
+              <a:t>©Copyright 2022. All Rights Reserved.</a:t>
+            </a:r>
+          </a:p>
+        </p:txBody>
+      </p:sp>
+      <p:sp>
+        <p:nvSpPr>
+          <p:cNvPr id="7" name="TextBox 6">
+            <a:extLst>
+              <a:ext uri="{FF2B5EF4-FFF2-40B4-BE49-F238E27FC236}">
+                <a16:creationId xmlns:a16="http://schemas.microsoft.com/office/drawing/2014/main" id="{02E92B9E-10CC-4B7E-B10C-143690395DE5}"/>
+              </a:ext>
+            </a:extLst>
+          </p:cNvPr>
+          <p:cNvSpPr txBox="1"/>
+          <p:nvPr/>
+        </p:nvSpPr>
+        <p:spPr>
+          <a:xfrm>
+            <a:off x="3761623" y="9733421"/>
+            <a:ext cx="2820003" cy="261610"/>
+          </a:xfrm>
+          <a:prstGeom prst="rect">
+            <a:avLst/>
+          </a:prstGeom>
+          <a:noFill/>
+        </p:spPr>
+        <p:txBody>
+          <a:bodyPr wrap="none" rtlCol="0">
+            <a:spAutoFit/>
+          </a:bodyPr>
+          <a:lstStyle/>
+          <a:p>
+            <a:r>
+              <a:rPr lang="en-GB" sz="1100" dirty="0"/>
+              <a:t>Blog        FAQ        Contact us        Privacy Policy</a:t>
+            </a:r>
+          </a:p>
+        </p:txBody>
+      </p:sp>
+      <p:pic>
+        <p:nvPicPr>
+          <p:cNvPr id="8" name="Picture 2" descr="Center for Metabolic and Obesity Surgery">
+            <a:extLst>
+              <a:ext uri="{FF2B5EF4-FFF2-40B4-BE49-F238E27FC236}">
+                <a16:creationId xmlns:a16="http://schemas.microsoft.com/office/drawing/2014/main" id="{51FC48F6-7BE2-48D2-A637-7F9307D99469}"/>
+              </a:ext>
+            </a:extLst>
+          </p:cNvPr>
+          <p:cNvPicPr>
+            <a:picLocks noChangeAspect="1" noChangeArrowheads="1"/>
+          </p:cNvPicPr>
+          <p:nvPr/>
+        </p:nvPicPr>
+        <p:blipFill>
+          <a:blip r:embed="rId3">
+            <a:extLst>
+              <a:ext uri="{BEBA8EAE-BF5A-486C-A8C5-ECC9F3942E4B}">
+                <a14:imgProps xmlns:a14="http://schemas.microsoft.com/office/drawing/2010/main">
+                  <a14:imgLayer r:embed="rId4">
+                    <a14:imgEffect>
+                      <a14:backgroundRemoval t="8163" b="89796" l="4219" r="95000">
+                        <a14:foregroundMark x1="7969" y1="48163" x2="7969" y2="48163"/>
+                        <a14:foregroundMark x1="4219" y1="62857" x2="4219" y2="62857"/>
+                        <a14:foregroundMark x1="14844" y1="48571" x2="14844" y2="48571"/>
+                        <a14:foregroundMark x1="23594" y1="54286" x2="23594" y2="54286"/>
+                        <a14:foregroundMark x1="30938" y1="54694" x2="30938" y2="54694"/>
+                        <a14:foregroundMark x1="38594" y1="53061" x2="38594" y2="53061"/>
+                        <a14:foregroundMark x1="47031" y1="50612" x2="47031" y2="50612"/>
+                        <a14:foregroundMark x1="64531" y1="50612" x2="64531" y2="50612"/>
+                        <a14:foregroundMark x1="72656" y1="53469" x2="72656" y2="53469"/>
+                        <a14:foregroundMark x1="81094" y1="53061" x2="81094" y2="53061"/>
+                        <a14:foregroundMark x1="85156" y1="54286" x2="85156" y2="54286"/>
+                        <a14:foregroundMark x1="90469" y1="51429" x2="90469" y2="51429"/>
+                        <a14:foregroundMark x1="95000" y1="59184" x2="95000" y2="59184"/>
+                        <a14:foregroundMark x1="68281" y1="30204" x2="68281" y2="30204"/>
+                        <a14:foregroundMark x1="73125" y1="28980" x2="73125" y2="28980"/>
+                        <a14:foregroundMark x1="73125" y1="8163" x2="73125" y2="8163"/>
+                        <a14:foregroundMark x1="67500" y1="13061" x2="67500" y2="13061"/>
+                        <a14:foregroundMark x1="72031" y1="17143" x2="72031" y2="17143"/>
+                        <a14:foregroundMark x1="68438" y1="22041" x2="68438" y2="22041"/>
+                        <a14:foregroundMark x1="69688" y1="17143" x2="69688" y2="17143"/>
+                        <a14:foregroundMark x1="57031" y1="83265" x2="57031" y2="83265"/>
+                        <a14:foregroundMark x1="62187" y1="83673" x2="62187" y2="83673"/>
+                        <a14:foregroundMark x1="66250" y1="79184" x2="66250" y2="79184"/>
+                        <a14:foregroundMark x1="68281" y1="82857" x2="68281" y2="82857"/>
+                        <a14:foregroundMark x1="72969" y1="82041" x2="72969" y2="82041"/>
+                        <a14:foregroundMark x1="77188" y1="84898" x2="77188" y2="84898"/>
+                        <a14:foregroundMark x1="76719" y1="82857" x2="76719" y2="82857"/>
+                        <a14:foregroundMark x1="79219" y1="82857" x2="79219" y2="82857"/>
+                        <a14:foregroundMark x1="84375" y1="81224" x2="84375" y2="81224"/>
+                        <a14:foregroundMark x1="86094" y1="82041" x2="86094" y2="82041"/>
+                        <a14:foregroundMark x1="86094" y1="77143" x2="86094" y2="77143"/>
+                        <a14:foregroundMark x1="87969" y1="83673" x2="87969" y2="83673"/>
+                        <a14:foregroundMark x1="92656" y1="82041" x2="92656" y2="82041"/>
+                        <a14:foregroundMark x1="72813" y1="23673" x2="72813" y2="23673"/>
+                        <a14:foregroundMark x1="71563" y1="20816" x2="71563" y2="20816"/>
+                        <a14:foregroundMark x1="5938" y1="55510" x2="5938" y2="55510"/>
+                        <a14:backgroundMark x1="7969" y1="46531" x2="7969" y2="46531"/>
+                        <a14:backgroundMark x1="32656" y1="51837" x2="32656" y2="51837"/>
+                        <a14:backgroundMark x1="63281" y1="83265" x2="63281" y2="83265"/>
+                        <a14:backgroundMark x1="69375" y1="82857" x2="69375" y2="82857"/>
+                        <a14:backgroundMark x1="73281" y1="84898" x2="73281" y2="84898"/>
+                        <a14:backgroundMark x1="80938" y1="83673" x2="80938" y2="83673"/>
+                        <a14:backgroundMark x1="89375" y1="84898" x2="89375" y2="84898"/>
+                        <a14:backgroundMark x1="69688" y1="22041" x2="69688" y2="22041"/>
+                        <a14:backgroundMark x1="72500" y1="20816" x2="72500" y2="20816"/>
+                        <a14:backgroundMark x1="8125" y1="48163" x2="8125" y2="48163"/>
+                        <a14:backgroundMark x1="7969" y1="48163" x2="7969" y2="48163"/>
+                        <a14:backgroundMark x1="6406" y1="55510" x2="6406" y2="55510"/>
+                        <a14:backgroundMark x1="77344" y1="85714" x2="77344" y2="85714"/>
+                        <a14:backgroundMark x1="73125" y1="82857" x2="73125" y2="82857"/>
+                        <a14:backgroundMark x1="77500" y1="84898" x2="77500" y2="84898"/>
+                      </a14:backgroundRemoval>
+                    </a14:imgEffect>
+                  </a14:imgLayer>
+                </a14:imgProps>
+              </a:ext>
+              <a:ext uri="{28A0092B-C50C-407E-A947-70E740481C1C}">
+                <a14:useLocalDpi xmlns:a14="http://schemas.microsoft.com/office/drawing/2010/main" val="0"/>
+              </a:ext>
+            </a:extLst>
+          </a:blip>
+          <a:srcRect/>
+          <a:stretch>
+            <a:fillRect/>
+          </a:stretch>
+        </p:blipFill>
+        <p:spPr bwMode="auto">
+          <a:xfrm>
+            <a:off x="276376" y="9736561"/>
+            <a:ext cx="1158153" cy="443355"/>
+          </a:xfrm>
+          <a:prstGeom prst="rect">
+            <a:avLst/>
+          </a:prstGeom>
+          <a:noFill/>
+          <a:ln>
+            <a:noFill/>
+          </a:ln>
+          <a:extLst>
+            <a:ext uri="{909E8E84-426E-40DD-AFC4-6F175D3DCCD1}">
+              <a14:hiddenFill xmlns:a14="http://schemas.microsoft.com/office/drawing/2010/main">
+                <a:solidFill>
+                  <a:srgbClr val="FFFFFF"/>
+                </a:solidFill>
+              </a14:hiddenFill>
+            </a:ext>
+          </a:extLst>
+        </p:spPr>
+      </p:pic>
+      <p:sp>
+        <p:nvSpPr>
+          <p:cNvPr id="9" name="TextBox 8">
+            <a:extLst>
+              <a:ext uri="{FF2B5EF4-FFF2-40B4-BE49-F238E27FC236}">
+                <a16:creationId xmlns:a16="http://schemas.microsoft.com/office/drawing/2014/main" id="{39794B87-1F4F-44BE-9347-FF79EEFCCC81}"/>
+              </a:ext>
+            </a:extLst>
+          </p:cNvPr>
+          <p:cNvSpPr txBox="1"/>
+          <p:nvPr/>
+        </p:nvSpPr>
+        <p:spPr>
+          <a:xfrm>
+            <a:off x="208205" y="10169772"/>
+            <a:ext cx="2219850" cy="461665"/>
+          </a:xfrm>
+          <a:prstGeom prst="rect">
+            <a:avLst/>
+          </a:prstGeom>
+          <a:noFill/>
+        </p:spPr>
+        <p:txBody>
+          <a:bodyPr wrap="square">
+            <a:spAutoFit/>
+          </a:bodyPr>
+          <a:lstStyle/>
+          <a:p>
+            <a:r>
+              <a:rPr lang="en-GB" sz="800" dirty="0"/>
+              <a:t>407-303-3820</a:t>
+            </a:r>
+          </a:p>
+          <a:p>
+            <a:r>
+              <a:rPr lang="en-GB" sz="800" dirty="0"/>
+              <a:t>410 Celebration Place, Suite 401</a:t>
+            </a:r>
+          </a:p>
+          <a:p>
+            <a:r>
+              <a:rPr lang="en-GB" sz="800" dirty="0"/>
+              <a:t>Celebration, FL 34747</a:t>
+            </a:r>
+          </a:p>
+        </p:txBody>
+      </p:sp>
+      <p:grpSp>
+        <p:nvGrpSpPr>
+          <p:cNvPr id="13" name="Group 12">
+            <a:extLst>
+              <a:ext uri="{FF2B5EF4-FFF2-40B4-BE49-F238E27FC236}">
+                <a16:creationId xmlns:a16="http://schemas.microsoft.com/office/drawing/2014/main" id="{07CCD1DB-E09A-4E6A-86EB-E384B888BC7F}"/>
+              </a:ext>
+            </a:extLst>
+          </p:cNvPr>
+          <p:cNvGrpSpPr/>
+          <p:nvPr/>
+        </p:nvGrpSpPr>
+        <p:grpSpPr>
+          <a:xfrm>
+            <a:off x="272471" y="3660007"/>
+            <a:ext cx="6218237" cy="461665"/>
+            <a:chOff x="272471" y="3461333"/>
+            <a:chExt cx="6218237" cy="461665"/>
+          </a:xfrm>
+        </p:grpSpPr>
+        <p:pic>
+          <p:nvPicPr>
+            <p:cNvPr id="10" name="Graphic 9" descr="Open quotation mark with solid fill">
+              <a:extLst>
+                <a:ext uri="{FF2B5EF4-FFF2-40B4-BE49-F238E27FC236}">
+                  <a16:creationId xmlns:a16="http://schemas.microsoft.com/office/drawing/2014/main" id="{2E5C3EF1-B60D-4936-B2C4-5D9A736736C8}"/>
+                </a:ext>
+              </a:extLst>
+            </p:cNvPr>
+            <p:cNvPicPr>
+              <a:picLocks noChangeAspect="1"/>
+            </p:cNvPicPr>
+            <p:nvPr/>
+          </p:nvPicPr>
+          <p:blipFill>
+            <a:blip r:embed="rId5">
+              <a:extLst>
+                <a:ext uri="{28A0092B-C50C-407E-A947-70E740481C1C}">
+                  <a14:useLocalDpi xmlns:a14="http://schemas.microsoft.com/office/drawing/2010/main" val="0"/>
+                </a:ext>
+                <a:ext uri="{96DAC541-7B7A-43D3-8B79-37D633B846F1}">
+                  <asvg:svgBlip xmlns:asvg="http://schemas.microsoft.com/office/drawing/2016/SVG/main" r:embed="rId6"/>
+                </a:ext>
+              </a:extLst>
+            </a:blip>
+            <a:stretch>
+              <a:fillRect/>
+            </a:stretch>
+          </p:blipFill>
+          <p:spPr>
+            <a:xfrm>
+              <a:off x="272471" y="3480788"/>
+              <a:ext cx="232826" cy="232826"/>
+            </a:xfrm>
+            <a:prstGeom prst="rect">
+              <a:avLst/>
+            </a:prstGeom>
+          </p:spPr>
+        </p:pic>
+        <p:sp>
+          <p:nvSpPr>
+            <p:cNvPr id="11" name="TextBox 10">
+              <a:extLst>
+                <a:ext uri="{FF2B5EF4-FFF2-40B4-BE49-F238E27FC236}">
+                  <a16:creationId xmlns:a16="http://schemas.microsoft.com/office/drawing/2014/main" id="{0B51A0A9-DA7E-4602-B8A4-7C8A4D4C26E4}"/>
+                </a:ext>
+              </a:extLst>
+            </p:cNvPr>
+            <p:cNvSpPr txBox="1"/>
+            <p:nvPr/>
+          </p:nvSpPr>
+          <p:spPr>
+            <a:xfrm>
+              <a:off x="434058" y="3461333"/>
+              <a:ext cx="6056650" cy="461665"/>
+            </a:xfrm>
+            <a:prstGeom prst="rect">
+              <a:avLst/>
+            </a:prstGeom>
+            <a:noFill/>
+          </p:spPr>
+          <p:txBody>
+            <a:bodyPr wrap="square">
+              <a:spAutoFit/>
+            </a:bodyPr>
+            <a:lstStyle/>
+            <a:p>
+              <a:r>
+                <a:rPr lang="en-GB" sz="1200" i="1" dirty="0">
+                  <a:solidFill>
+                    <a:srgbClr val="000000"/>
+                  </a:solidFill>
+                </a:rPr>
+                <a:t>Lorem ipsum </a:t>
+              </a:r>
+              <a:r>
+                <a:rPr lang="en-GB" sz="1200" i="1" dirty="0" err="1">
+                  <a:solidFill>
+                    <a:srgbClr val="000000"/>
+                  </a:solidFill>
+                </a:rPr>
+                <a:t>dolor</a:t>
+              </a:r>
+              <a:r>
+                <a:rPr lang="en-GB" sz="1200" i="1" dirty="0">
+                  <a:solidFill>
+                    <a:srgbClr val="000000"/>
+                  </a:solidFill>
+                </a:rPr>
+                <a:t> sit </a:t>
+              </a:r>
+              <a:r>
+                <a:rPr lang="en-GB" sz="1200" i="1" dirty="0" err="1">
+                  <a:solidFill>
+                    <a:srgbClr val="000000"/>
+                  </a:solidFill>
+                </a:rPr>
+                <a:t>amet</a:t>
+              </a:r>
+              <a:r>
+                <a:rPr lang="en-GB" sz="1200" i="1" dirty="0">
+                  <a:solidFill>
+                    <a:srgbClr val="000000"/>
+                  </a:solidFill>
+                </a:rPr>
+                <a:t>, </a:t>
+              </a:r>
+              <a:r>
+                <a:rPr lang="en-GB" sz="1200" i="1" dirty="0" err="1">
+                  <a:solidFill>
+                    <a:srgbClr val="000000"/>
+                  </a:solidFill>
+                </a:rPr>
+                <a:t>consectetur</a:t>
+              </a:r>
+              <a:r>
+                <a:rPr lang="en-GB" sz="1200" i="1" dirty="0">
+                  <a:solidFill>
+                    <a:srgbClr val="000000"/>
+                  </a:solidFill>
+                </a:rPr>
+                <a:t> </a:t>
+              </a:r>
+              <a:r>
+                <a:rPr lang="en-GB" sz="1200" i="1" dirty="0" err="1">
+                  <a:solidFill>
+                    <a:srgbClr val="000000"/>
+                  </a:solidFill>
+                </a:rPr>
+                <a:t>adipiscing</a:t>
+              </a:r>
+              <a:r>
+                <a:rPr lang="en-GB" sz="1200" i="1" dirty="0">
+                  <a:solidFill>
+                    <a:srgbClr val="000000"/>
+                  </a:solidFill>
+                </a:rPr>
+                <a:t> </a:t>
+              </a:r>
+              <a:r>
+                <a:rPr lang="en-GB" sz="1200" i="1" dirty="0" err="1">
+                  <a:solidFill>
+                    <a:srgbClr val="000000"/>
+                  </a:solidFill>
+                </a:rPr>
+                <a:t>elit</a:t>
+              </a:r>
+              <a:r>
+                <a:rPr lang="en-GB" sz="1200" i="1" dirty="0">
+                  <a:solidFill>
+                    <a:srgbClr val="000000"/>
+                  </a:solidFill>
+                </a:rPr>
+                <a:t>. </a:t>
+              </a:r>
+              <a:r>
+                <a:rPr lang="en-GB" sz="1200" i="1" dirty="0" err="1">
+                  <a:solidFill>
+                    <a:srgbClr val="000000"/>
+                  </a:solidFill>
+                </a:rPr>
+                <a:t>Aliquam</a:t>
+              </a:r>
+              <a:r>
+                <a:rPr lang="en-GB" sz="1200" i="1" dirty="0">
+                  <a:solidFill>
+                    <a:srgbClr val="000000"/>
+                  </a:solidFill>
+                </a:rPr>
+                <a:t> </a:t>
+              </a:r>
+              <a:r>
+                <a:rPr lang="en-GB" sz="1200" i="1" dirty="0" err="1">
+                  <a:solidFill>
+                    <a:srgbClr val="000000"/>
+                  </a:solidFill>
+                </a:rPr>
+                <a:t>lectus</a:t>
+              </a:r>
+              <a:r>
+                <a:rPr lang="en-GB" sz="1200" i="1" dirty="0">
+                  <a:solidFill>
+                    <a:srgbClr val="000000"/>
+                  </a:solidFill>
+                </a:rPr>
+                <a:t> dui, cursus vitae </a:t>
+              </a:r>
+              <a:r>
+                <a:rPr lang="en-GB" sz="1200" i="1" dirty="0" err="1">
+                  <a:solidFill>
+                    <a:srgbClr val="000000"/>
+                  </a:solidFill>
+                </a:rPr>
+                <a:t>elit</a:t>
+              </a:r>
+              <a:r>
+                <a:rPr lang="en-GB" sz="1200" i="1" dirty="0">
+                  <a:solidFill>
+                    <a:srgbClr val="000000"/>
+                  </a:solidFill>
+                </a:rPr>
+                <a:t> </a:t>
+              </a:r>
+              <a:r>
+                <a:rPr lang="en-GB" sz="1200" i="1" dirty="0" err="1">
+                  <a:solidFill>
+                    <a:srgbClr val="000000"/>
+                  </a:solidFill>
+                </a:rPr>
+                <a:t>quis</a:t>
+              </a:r>
+              <a:r>
+                <a:rPr lang="en-GB" sz="1200" i="1" dirty="0">
+                  <a:solidFill>
+                    <a:srgbClr val="000000"/>
+                  </a:solidFill>
+                </a:rPr>
+                <a:t>, </a:t>
+              </a:r>
+              <a:r>
+                <a:rPr lang="en-GB" sz="1200" i="1" dirty="0" err="1">
+                  <a:solidFill>
+                    <a:srgbClr val="000000"/>
+                  </a:solidFill>
+                </a:rPr>
+                <a:t>mattis</a:t>
+              </a:r>
+              <a:r>
+                <a:rPr lang="en-GB" sz="1200" i="1" dirty="0">
+                  <a:solidFill>
+                    <a:srgbClr val="000000"/>
+                  </a:solidFill>
+                </a:rPr>
+                <a:t> </a:t>
+              </a:r>
+              <a:r>
+                <a:rPr lang="en-GB" sz="1200" i="1" dirty="0" err="1">
+                  <a:solidFill>
+                    <a:srgbClr val="000000"/>
+                  </a:solidFill>
+                </a:rPr>
+                <a:t>suscipit</a:t>
+              </a:r>
+              <a:r>
+                <a:rPr lang="en-GB" sz="1200" i="1" dirty="0">
+                  <a:solidFill>
+                    <a:srgbClr val="000000"/>
+                  </a:solidFill>
+                </a:rPr>
+                <a:t> </a:t>
+              </a:r>
+              <a:r>
+                <a:rPr lang="en-GB" sz="1200" i="1" dirty="0" err="1">
+                  <a:solidFill>
+                    <a:srgbClr val="000000"/>
+                  </a:solidFill>
+                </a:rPr>
+                <a:t>massa</a:t>
+              </a:r>
+              <a:r>
+                <a:rPr lang="en-GB" sz="1200" i="1" dirty="0">
+                  <a:solidFill>
+                    <a:srgbClr val="000000"/>
+                  </a:solidFill>
+                </a:rPr>
+                <a:t>. </a:t>
+              </a:r>
+              <a:r>
+                <a:rPr lang="en-GB" sz="1200" i="1" dirty="0" err="1">
+                  <a:solidFill>
+                    <a:srgbClr val="000000"/>
+                  </a:solidFill>
+                </a:rPr>
+                <a:t>Fusce</a:t>
+              </a:r>
+              <a:r>
+                <a:rPr lang="en-GB" sz="1200" i="1" dirty="0">
+                  <a:solidFill>
+                    <a:srgbClr val="000000"/>
+                  </a:solidFill>
+                </a:rPr>
+                <a:t> </a:t>
+              </a:r>
+              <a:r>
+                <a:rPr lang="en-GB" sz="1200" i="1" dirty="0" err="1">
+                  <a:solidFill>
+                    <a:srgbClr val="000000"/>
+                  </a:solidFill>
+                </a:rPr>
+                <a:t>nec</a:t>
+              </a:r>
+              <a:r>
+                <a:rPr lang="en-GB" sz="1200" i="1" dirty="0">
+                  <a:solidFill>
+                    <a:srgbClr val="000000"/>
+                  </a:solidFill>
+                </a:rPr>
+                <a:t> </a:t>
+              </a:r>
+              <a:r>
+                <a:rPr lang="en-GB" sz="1200" i="1" dirty="0" err="1">
+                  <a:solidFill>
+                    <a:srgbClr val="000000"/>
+                  </a:solidFill>
+                </a:rPr>
+                <a:t>diam</a:t>
+              </a:r>
+              <a:r>
+                <a:rPr lang="en-GB" sz="1200" i="1" dirty="0">
+                  <a:solidFill>
+                    <a:srgbClr val="000000"/>
+                  </a:solidFill>
+                </a:rPr>
+                <a:t> </a:t>
+              </a:r>
+              <a:r>
+                <a:rPr lang="en-GB" sz="1200" i="1" dirty="0" err="1">
+                  <a:solidFill>
+                    <a:srgbClr val="000000"/>
+                  </a:solidFill>
+                </a:rPr>
+                <a:t>leo</a:t>
+              </a:r>
+              <a:r>
+                <a:rPr lang="en-GB" sz="1200" i="1" dirty="0">
+                  <a:solidFill>
+                    <a:srgbClr val="000000"/>
+                  </a:solidFill>
+                </a:rPr>
+                <a:t>."</a:t>
+              </a:r>
+              <a:endParaRPr lang="en-GB" sz="1200" dirty="0"/>
+            </a:p>
+          </p:txBody>
+        </p:sp>
+      </p:grpSp>
+      <p:sp>
+        <p:nvSpPr>
+          <p:cNvPr id="12" name="TextBox 11">
+            <a:extLst>
+              <a:ext uri="{FF2B5EF4-FFF2-40B4-BE49-F238E27FC236}">
+                <a16:creationId xmlns:a16="http://schemas.microsoft.com/office/drawing/2014/main" id="{85F98AC0-756D-4573-83B1-C637DAD20CF5}"/>
+              </a:ext>
+            </a:extLst>
+          </p:cNvPr>
+          <p:cNvSpPr txBox="1"/>
+          <p:nvPr/>
+        </p:nvSpPr>
+        <p:spPr>
+          <a:xfrm>
+            <a:off x="272471" y="3075232"/>
+            <a:ext cx="2278894" cy="523220"/>
+          </a:xfrm>
+          <a:prstGeom prst="rect">
+            <a:avLst/>
+          </a:prstGeom>
+          <a:noFill/>
+        </p:spPr>
+        <p:txBody>
+          <a:bodyPr wrap="none" rtlCol="0">
+            <a:spAutoFit/>
+          </a:bodyPr>
+          <a:lstStyle/>
+          <a:p>
+            <a:r>
+              <a:rPr lang="en-GB" sz="1400" b="1" dirty="0"/>
+              <a:t>Name/Anon from City, State</a:t>
+            </a:r>
+          </a:p>
+          <a:p>
+            <a:r>
+              <a:rPr lang="en-GB" sz="1400" b="1" dirty="0"/>
+              <a:t>Received x procedure</a:t>
+            </a:r>
+          </a:p>
+        </p:txBody>
+      </p:sp>
+      <p:grpSp>
+        <p:nvGrpSpPr>
+          <p:cNvPr id="14" name="Group 13">
+            <a:extLst>
+              <a:ext uri="{FF2B5EF4-FFF2-40B4-BE49-F238E27FC236}">
+                <a16:creationId xmlns:a16="http://schemas.microsoft.com/office/drawing/2014/main" id="{1F65920B-0D84-4886-AF59-644AD0AC4635}"/>
+              </a:ext>
+            </a:extLst>
+          </p:cNvPr>
+          <p:cNvGrpSpPr/>
+          <p:nvPr/>
+        </p:nvGrpSpPr>
+        <p:grpSpPr>
+          <a:xfrm>
+            <a:off x="272471" y="5137776"/>
+            <a:ext cx="6218237" cy="461665"/>
+            <a:chOff x="272471" y="3461333"/>
+            <a:chExt cx="6218237" cy="461665"/>
+          </a:xfrm>
+        </p:grpSpPr>
+        <p:pic>
+          <p:nvPicPr>
+            <p:cNvPr id="15" name="Graphic 14" descr="Open quotation mark with solid fill">
+              <a:extLst>
+                <a:ext uri="{FF2B5EF4-FFF2-40B4-BE49-F238E27FC236}">
+                  <a16:creationId xmlns:a16="http://schemas.microsoft.com/office/drawing/2014/main" id="{13DDF66C-2032-46B6-B88B-BDACD773C70E}"/>
+                </a:ext>
+              </a:extLst>
+            </p:cNvPr>
+            <p:cNvPicPr>
+              <a:picLocks noChangeAspect="1"/>
+            </p:cNvPicPr>
+            <p:nvPr/>
+          </p:nvPicPr>
+          <p:blipFill>
+            <a:blip r:embed="rId5">
+              <a:extLst>
+                <a:ext uri="{28A0092B-C50C-407E-A947-70E740481C1C}">
+                  <a14:useLocalDpi xmlns:a14="http://schemas.microsoft.com/office/drawing/2010/main" val="0"/>
+                </a:ext>
+                <a:ext uri="{96DAC541-7B7A-43D3-8B79-37D633B846F1}">
+                  <asvg:svgBlip xmlns:asvg="http://schemas.microsoft.com/office/drawing/2016/SVG/main" r:embed="rId6"/>
+                </a:ext>
+              </a:extLst>
+            </a:blip>
+            <a:stretch>
+              <a:fillRect/>
+            </a:stretch>
+          </p:blipFill>
+          <p:spPr>
+            <a:xfrm>
+              <a:off x="272471" y="3480788"/>
+              <a:ext cx="232826" cy="232826"/>
+            </a:xfrm>
+            <a:prstGeom prst="rect">
+              <a:avLst/>
+            </a:prstGeom>
+          </p:spPr>
+        </p:pic>
+        <p:sp>
+          <p:nvSpPr>
+            <p:cNvPr id="16" name="TextBox 15">
+              <a:extLst>
+                <a:ext uri="{FF2B5EF4-FFF2-40B4-BE49-F238E27FC236}">
+                  <a16:creationId xmlns:a16="http://schemas.microsoft.com/office/drawing/2014/main" id="{D2A4166E-5DDE-4E95-89A6-FE35ACCDDDE3}"/>
+                </a:ext>
+              </a:extLst>
+            </p:cNvPr>
+            <p:cNvSpPr txBox="1"/>
+            <p:nvPr/>
+          </p:nvSpPr>
+          <p:spPr>
+            <a:xfrm>
+              <a:off x="434058" y="3461333"/>
+              <a:ext cx="6056650" cy="461665"/>
+            </a:xfrm>
+            <a:prstGeom prst="rect">
+              <a:avLst/>
+            </a:prstGeom>
+            <a:noFill/>
+          </p:spPr>
+          <p:txBody>
+            <a:bodyPr wrap="square">
+              <a:spAutoFit/>
+            </a:bodyPr>
+            <a:lstStyle/>
+            <a:p>
+              <a:r>
+                <a:rPr lang="en-GB" sz="1200" i="1" dirty="0">
+                  <a:solidFill>
+                    <a:srgbClr val="000000"/>
+                  </a:solidFill>
+                </a:rPr>
+                <a:t>Lorem ipsum </a:t>
+              </a:r>
+              <a:r>
+                <a:rPr lang="en-GB" sz="1200" i="1" dirty="0" err="1">
+                  <a:solidFill>
+                    <a:srgbClr val="000000"/>
+                  </a:solidFill>
+                </a:rPr>
+                <a:t>dolor</a:t>
+              </a:r>
+              <a:r>
+                <a:rPr lang="en-GB" sz="1200" i="1" dirty="0">
+                  <a:solidFill>
+                    <a:srgbClr val="000000"/>
+                  </a:solidFill>
+                </a:rPr>
+                <a:t> sit </a:t>
+              </a:r>
+              <a:r>
+                <a:rPr lang="en-GB" sz="1200" i="1" dirty="0" err="1">
+                  <a:solidFill>
+                    <a:srgbClr val="000000"/>
+                  </a:solidFill>
+                </a:rPr>
+                <a:t>amet</a:t>
+              </a:r>
+              <a:r>
+                <a:rPr lang="en-GB" sz="1200" i="1" dirty="0">
+                  <a:solidFill>
+                    <a:srgbClr val="000000"/>
+                  </a:solidFill>
+                </a:rPr>
+                <a:t>, </a:t>
+              </a:r>
+              <a:r>
+                <a:rPr lang="en-GB" sz="1200" i="1" dirty="0" err="1">
+                  <a:solidFill>
+                    <a:srgbClr val="000000"/>
+                  </a:solidFill>
+                </a:rPr>
+                <a:t>consectetur</a:t>
+              </a:r>
+              <a:r>
+                <a:rPr lang="en-GB" sz="1200" i="1" dirty="0">
+                  <a:solidFill>
+                    <a:srgbClr val="000000"/>
+                  </a:solidFill>
+                </a:rPr>
+                <a:t> </a:t>
+              </a:r>
+              <a:r>
+                <a:rPr lang="en-GB" sz="1200" i="1" dirty="0" err="1">
+                  <a:solidFill>
+                    <a:srgbClr val="000000"/>
+                  </a:solidFill>
+                </a:rPr>
+                <a:t>adipiscing</a:t>
+              </a:r>
+              <a:r>
+                <a:rPr lang="en-GB" sz="1200" i="1" dirty="0">
+                  <a:solidFill>
+                    <a:srgbClr val="000000"/>
+                  </a:solidFill>
+                </a:rPr>
+                <a:t> </a:t>
+              </a:r>
+              <a:r>
+                <a:rPr lang="en-GB" sz="1200" i="1" dirty="0" err="1">
+                  <a:solidFill>
+                    <a:srgbClr val="000000"/>
+                  </a:solidFill>
+                </a:rPr>
+                <a:t>elit</a:t>
+              </a:r>
+              <a:r>
+                <a:rPr lang="en-GB" sz="1200" i="1" dirty="0">
+                  <a:solidFill>
+                    <a:srgbClr val="000000"/>
+                  </a:solidFill>
+                </a:rPr>
+                <a:t>. </a:t>
+              </a:r>
+              <a:r>
+                <a:rPr lang="en-GB" sz="1200" i="1" dirty="0" err="1">
+                  <a:solidFill>
+                    <a:srgbClr val="000000"/>
+                  </a:solidFill>
+                </a:rPr>
+                <a:t>Aliquam</a:t>
+              </a:r>
+              <a:r>
+                <a:rPr lang="en-GB" sz="1200" i="1" dirty="0">
+                  <a:solidFill>
+                    <a:srgbClr val="000000"/>
+                  </a:solidFill>
+                </a:rPr>
+                <a:t> </a:t>
+              </a:r>
+              <a:r>
+                <a:rPr lang="en-GB" sz="1200" i="1" dirty="0" err="1">
+                  <a:solidFill>
+                    <a:srgbClr val="000000"/>
+                  </a:solidFill>
+                </a:rPr>
+                <a:t>lectus</a:t>
+              </a:r>
+              <a:r>
+                <a:rPr lang="en-GB" sz="1200" i="1" dirty="0">
+                  <a:solidFill>
+                    <a:srgbClr val="000000"/>
+                  </a:solidFill>
+                </a:rPr>
+                <a:t> dui, cursus vitae </a:t>
+              </a:r>
+              <a:r>
+                <a:rPr lang="en-GB" sz="1200" i="1" dirty="0" err="1">
+                  <a:solidFill>
+                    <a:srgbClr val="000000"/>
+                  </a:solidFill>
+                </a:rPr>
+                <a:t>elit</a:t>
+              </a:r>
+              <a:r>
+                <a:rPr lang="en-GB" sz="1200" i="1" dirty="0">
+                  <a:solidFill>
+                    <a:srgbClr val="000000"/>
+                  </a:solidFill>
+                </a:rPr>
+                <a:t> </a:t>
+              </a:r>
+              <a:r>
+                <a:rPr lang="en-GB" sz="1200" i="1" dirty="0" err="1">
+                  <a:solidFill>
+                    <a:srgbClr val="000000"/>
+                  </a:solidFill>
+                </a:rPr>
+                <a:t>quis</a:t>
+              </a:r>
+              <a:r>
+                <a:rPr lang="en-GB" sz="1200" i="1" dirty="0">
+                  <a:solidFill>
+                    <a:srgbClr val="000000"/>
+                  </a:solidFill>
+                </a:rPr>
+                <a:t>, </a:t>
+              </a:r>
+              <a:r>
+                <a:rPr lang="en-GB" sz="1200" i="1" dirty="0" err="1">
+                  <a:solidFill>
+                    <a:srgbClr val="000000"/>
+                  </a:solidFill>
+                </a:rPr>
+                <a:t>mattis</a:t>
+              </a:r>
+              <a:r>
+                <a:rPr lang="en-GB" sz="1200" i="1" dirty="0">
+                  <a:solidFill>
+                    <a:srgbClr val="000000"/>
+                  </a:solidFill>
+                </a:rPr>
+                <a:t> </a:t>
+              </a:r>
+              <a:r>
+                <a:rPr lang="en-GB" sz="1200" i="1" dirty="0" err="1">
+                  <a:solidFill>
+                    <a:srgbClr val="000000"/>
+                  </a:solidFill>
+                </a:rPr>
+                <a:t>suscipit</a:t>
+              </a:r>
+              <a:r>
+                <a:rPr lang="en-GB" sz="1200" i="1" dirty="0">
+                  <a:solidFill>
+                    <a:srgbClr val="000000"/>
+                  </a:solidFill>
+                </a:rPr>
+                <a:t> </a:t>
+              </a:r>
+              <a:r>
+                <a:rPr lang="en-GB" sz="1200" i="1" dirty="0" err="1">
+                  <a:solidFill>
+                    <a:srgbClr val="000000"/>
+                  </a:solidFill>
+                </a:rPr>
+                <a:t>massa</a:t>
+              </a:r>
+              <a:r>
+                <a:rPr lang="en-GB" sz="1200" i="1" dirty="0">
+                  <a:solidFill>
+                    <a:srgbClr val="000000"/>
+                  </a:solidFill>
+                </a:rPr>
+                <a:t>. </a:t>
+              </a:r>
+              <a:r>
+                <a:rPr lang="en-GB" sz="1200" i="1" dirty="0" err="1">
+                  <a:solidFill>
+                    <a:srgbClr val="000000"/>
+                  </a:solidFill>
+                </a:rPr>
+                <a:t>Fusce</a:t>
+              </a:r>
+              <a:r>
+                <a:rPr lang="en-GB" sz="1200" i="1" dirty="0">
+                  <a:solidFill>
+                    <a:srgbClr val="000000"/>
+                  </a:solidFill>
+                </a:rPr>
+                <a:t> </a:t>
+              </a:r>
+              <a:r>
+                <a:rPr lang="en-GB" sz="1200" i="1" dirty="0" err="1">
+                  <a:solidFill>
+                    <a:srgbClr val="000000"/>
+                  </a:solidFill>
+                </a:rPr>
+                <a:t>nec</a:t>
+              </a:r>
+              <a:r>
+                <a:rPr lang="en-GB" sz="1200" i="1" dirty="0">
+                  <a:solidFill>
+                    <a:srgbClr val="000000"/>
+                  </a:solidFill>
+                </a:rPr>
+                <a:t> </a:t>
+              </a:r>
+              <a:r>
+                <a:rPr lang="en-GB" sz="1200" i="1" dirty="0" err="1">
+                  <a:solidFill>
+                    <a:srgbClr val="000000"/>
+                  </a:solidFill>
+                </a:rPr>
+                <a:t>diam</a:t>
+              </a:r>
+              <a:r>
+                <a:rPr lang="en-GB" sz="1200" i="1" dirty="0">
+                  <a:solidFill>
+                    <a:srgbClr val="000000"/>
+                  </a:solidFill>
+                </a:rPr>
+                <a:t> </a:t>
+              </a:r>
+              <a:r>
+                <a:rPr lang="en-GB" sz="1200" i="1" dirty="0" err="1">
+                  <a:solidFill>
+                    <a:srgbClr val="000000"/>
+                  </a:solidFill>
+                </a:rPr>
+                <a:t>leo</a:t>
+              </a:r>
+              <a:r>
+                <a:rPr lang="en-GB" sz="1200" i="1" dirty="0">
+                  <a:solidFill>
+                    <a:srgbClr val="000000"/>
+                  </a:solidFill>
+                </a:rPr>
+                <a:t>."</a:t>
+              </a:r>
+              <a:endParaRPr lang="en-GB" sz="1200" dirty="0"/>
+            </a:p>
+          </p:txBody>
+        </p:sp>
+      </p:grpSp>
+      <p:sp>
+        <p:nvSpPr>
+          <p:cNvPr id="17" name="TextBox 16">
+            <a:extLst>
+              <a:ext uri="{FF2B5EF4-FFF2-40B4-BE49-F238E27FC236}">
+                <a16:creationId xmlns:a16="http://schemas.microsoft.com/office/drawing/2014/main" id="{3C313BF8-675F-4A9F-A293-78D8086539C2}"/>
+              </a:ext>
+            </a:extLst>
+          </p:cNvPr>
+          <p:cNvSpPr txBox="1"/>
+          <p:nvPr/>
+        </p:nvSpPr>
+        <p:spPr>
+          <a:xfrm>
+            <a:off x="272471" y="4553001"/>
+            <a:ext cx="2278894" cy="523220"/>
+          </a:xfrm>
+          <a:prstGeom prst="rect">
+            <a:avLst/>
+          </a:prstGeom>
+          <a:noFill/>
+        </p:spPr>
+        <p:txBody>
+          <a:bodyPr wrap="none" rtlCol="0">
+            <a:spAutoFit/>
+          </a:bodyPr>
+          <a:lstStyle/>
+          <a:p>
+            <a:r>
+              <a:rPr lang="en-GB" sz="1400" b="1" dirty="0"/>
+              <a:t>Name/Anon from City, State</a:t>
+            </a:r>
+          </a:p>
+          <a:p>
+            <a:r>
+              <a:rPr lang="en-GB" sz="1400" b="1" dirty="0"/>
+              <a:t>Received x procedure</a:t>
+            </a:r>
+          </a:p>
+        </p:txBody>
+      </p:sp>
+      <p:grpSp>
+        <p:nvGrpSpPr>
+          <p:cNvPr id="18" name="Group 17">
+            <a:extLst>
+              <a:ext uri="{FF2B5EF4-FFF2-40B4-BE49-F238E27FC236}">
+                <a16:creationId xmlns:a16="http://schemas.microsoft.com/office/drawing/2014/main" id="{21F03000-14CB-4719-B1C0-152BE2DEAA23}"/>
+              </a:ext>
+            </a:extLst>
+          </p:cNvPr>
+          <p:cNvGrpSpPr/>
+          <p:nvPr/>
+        </p:nvGrpSpPr>
+        <p:grpSpPr>
+          <a:xfrm>
+            <a:off x="272471" y="6605479"/>
+            <a:ext cx="6218237" cy="461665"/>
+            <a:chOff x="272471" y="3461333"/>
+            <a:chExt cx="6218237" cy="461665"/>
+          </a:xfrm>
+        </p:grpSpPr>
+        <p:pic>
+          <p:nvPicPr>
+            <p:cNvPr id="19" name="Graphic 18" descr="Open quotation mark with solid fill">
+              <a:extLst>
+                <a:ext uri="{FF2B5EF4-FFF2-40B4-BE49-F238E27FC236}">
+                  <a16:creationId xmlns:a16="http://schemas.microsoft.com/office/drawing/2014/main" id="{019509AA-2501-4FA8-886D-0478927B8314}"/>
+                </a:ext>
+              </a:extLst>
+            </p:cNvPr>
+            <p:cNvPicPr>
+              <a:picLocks noChangeAspect="1"/>
+            </p:cNvPicPr>
+            <p:nvPr/>
+          </p:nvPicPr>
+          <p:blipFill>
+            <a:blip r:embed="rId5">
+              <a:extLst>
+                <a:ext uri="{28A0092B-C50C-407E-A947-70E740481C1C}">
+                  <a14:useLocalDpi xmlns:a14="http://schemas.microsoft.com/office/drawing/2010/main" val="0"/>
+                </a:ext>
+                <a:ext uri="{96DAC541-7B7A-43D3-8B79-37D633B846F1}">
+                  <asvg:svgBlip xmlns:asvg="http://schemas.microsoft.com/office/drawing/2016/SVG/main" r:embed="rId6"/>
+                </a:ext>
+              </a:extLst>
+            </a:blip>
+            <a:stretch>
+              <a:fillRect/>
+            </a:stretch>
+          </p:blipFill>
+          <p:spPr>
+            <a:xfrm>
+              <a:off x="272471" y="3480788"/>
+              <a:ext cx="232826" cy="232826"/>
+            </a:xfrm>
+            <a:prstGeom prst="rect">
+              <a:avLst/>
+            </a:prstGeom>
+          </p:spPr>
+        </p:pic>
+        <p:sp>
+          <p:nvSpPr>
+            <p:cNvPr id="20" name="TextBox 19">
+              <a:extLst>
+                <a:ext uri="{FF2B5EF4-FFF2-40B4-BE49-F238E27FC236}">
+                  <a16:creationId xmlns:a16="http://schemas.microsoft.com/office/drawing/2014/main" id="{4DA7C6D5-243B-4646-BAA8-77F5D3D52D96}"/>
+                </a:ext>
+              </a:extLst>
+            </p:cNvPr>
+            <p:cNvSpPr txBox="1"/>
+            <p:nvPr/>
+          </p:nvSpPr>
+          <p:spPr>
+            <a:xfrm>
+              <a:off x="434058" y="3461333"/>
+              <a:ext cx="6056650" cy="461665"/>
+            </a:xfrm>
+            <a:prstGeom prst="rect">
+              <a:avLst/>
+            </a:prstGeom>
+            <a:noFill/>
+          </p:spPr>
+          <p:txBody>
+            <a:bodyPr wrap="square">
+              <a:spAutoFit/>
+            </a:bodyPr>
+            <a:lstStyle/>
+            <a:p>
+              <a:r>
+                <a:rPr lang="en-GB" sz="1200" i="1" dirty="0">
+                  <a:solidFill>
+                    <a:srgbClr val="000000"/>
+                  </a:solidFill>
+                </a:rPr>
+                <a:t>Lorem ipsum </a:t>
+              </a:r>
+              <a:r>
+                <a:rPr lang="en-GB" sz="1200" i="1" dirty="0" err="1">
+                  <a:solidFill>
+                    <a:srgbClr val="000000"/>
+                  </a:solidFill>
+                </a:rPr>
+                <a:t>dolor</a:t>
+              </a:r>
+              <a:r>
+                <a:rPr lang="en-GB" sz="1200" i="1" dirty="0">
+                  <a:solidFill>
+                    <a:srgbClr val="000000"/>
+                  </a:solidFill>
+                </a:rPr>
+                <a:t> sit </a:t>
+              </a:r>
+              <a:r>
+                <a:rPr lang="en-GB" sz="1200" i="1" dirty="0" err="1">
+                  <a:solidFill>
+                    <a:srgbClr val="000000"/>
+                  </a:solidFill>
+                </a:rPr>
+                <a:t>amet</a:t>
+              </a:r>
+              <a:r>
+                <a:rPr lang="en-GB" sz="1200" i="1" dirty="0">
+                  <a:solidFill>
+                    <a:srgbClr val="000000"/>
+                  </a:solidFill>
+                </a:rPr>
+                <a:t>, </a:t>
+              </a:r>
+              <a:r>
+                <a:rPr lang="en-GB" sz="1200" i="1" dirty="0" err="1">
+                  <a:solidFill>
+                    <a:srgbClr val="000000"/>
+                  </a:solidFill>
+                </a:rPr>
+                <a:t>consectetur</a:t>
+              </a:r>
+              <a:r>
+                <a:rPr lang="en-GB" sz="1200" i="1" dirty="0">
+                  <a:solidFill>
+                    <a:srgbClr val="000000"/>
+                  </a:solidFill>
+                </a:rPr>
+                <a:t> </a:t>
+              </a:r>
+              <a:r>
+                <a:rPr lang="en-GB" sz="1200" i="1" dirty="0" err="1">
+                  <a:solidFill>
+                    <a:srgbClr val="000000"/>
+                  </a:solidFill>
+                </a:rPr>
+                <a:t>adipiscing</a:t>
+              </a:r>
+              <a:r>
+                <a:rPr lang="en-GB" sz="1200" i="1" dirty="0">
+                  <a:solidFill>
+                    <a:srgbClr val="000000"/>
+                  </a:solidFill>
+                </a:rPr>
+                <a:t> </a:t>
+              </a:r>
+              <a:r>
+                <a:rPr lang="en-GB" sz="1200" i="1" dirty="0" err="1">
+                  <a:solidFill>
+                    <a:srgbClr val="000000"/>
+                  </a:solidFill>
+                </a:rPr>
+                <a:t>elit</a:t>
+              </a:r>
+              <a:r>
+                <a:rPr lang="en-GB" sz="1200" i="1" dirty="0">
+                  <a:solidFill>
+                    <a:srgbClr val="000000"/>
+                  </a:solidFill>
+                </a:rPr>
+                <a:t>. </a:t>
+              </a:r>
+              <a:r>
+                <a:rPr lang="en-GB" sz="1200" i="1" dirty="0" err="1">
+                  <a:solidFill>
+                    <a:srgbClr val="000000"/>
+                  </a:solidFill>
+                </a:rPr>
+                <a:t>Aliquam</a:t>
+              </a:r>
+              <a:r>
+                <a:rPr lang="en-GB" sz="1200" i="1" dirty="0">
+                  <a:solidFill>
+                    <a:srgbClr val="000000"/>
+                  </a:solidFill>
+                </a:rPr>
+                <a:t> </a:t>
+              </a:r>
+              <a:r>
+                <a:rPr lang="en-GB" sz="1200" i="1" dirty="0" err="1">
+                  <a:solidFill>
+                    <a:srgbClr val="000000"/>
+                  </a:solidFill>
+                </a:rPr>
+                <a:t>lectus</a:t>
+              </a:r>
+              <a:r>
+                <a:rPr lang="en-GB" sz="1200" i="1" dirty="0">
+                  <a:solidFill>
+                    <a:srgbClr val="000000"/>
+                  </a:solidFill>
+                </a:rPr>
+                <a:t> dui, cursus vitae </a:t>
+              </a:r>
+              <a:r>
+                <a:rPr lang="en-GB" sz="1200" i="1" dirty="0" err="1">
+                  <a:solidFill>
+                    <a:srgbClr val="000000"/>
+                  </a:solidFill>
+                </a:rPr>
+                <a:t>elit</a:t>
+              </a:r>
+              <a:r>
+                <a:rPr lang="en-GB" sz="1200" i="1" dirty="0">
+                  <a:solidFill>
+                    <a:srgbClr val="000000"/>
+                  </a:solidFill>
+                </a:rPr>
+                <a:t> </a:t>
+              </a:r>
+              <a:r>
+                <a:rPr lang="en-GB" sz="1200" i="1" dirty="0" err="1">
+                  <a:solidFill>
+                    <a:srgbClr val="000000"/>
+                  </a:solidFill>
+                </a:rPr>
+                <a:t>quis</a:t>
+              </a:r>
+              <a:r>
+                <a:rPr lang="en-GB" sz="1200" i="1" dirty="0">
+                  <a:solidFill>
+                    <a:srgbClr val="000000"/>
+                  </a:solidFill>
+                </a:rPr>
+                <a:t>, </a:t>
+              </a:r>
+              <a:r>
+                <a:rPr lang="en-GB" sz="1200" i="1" dirty="0" err="1">
+                  <a:solidFill>
+                    <a:srgbClr val="000000"/>
+                  </a:solidFill>
+                </a:rPr>
+                <a:t>mattis</a:t>
+              </a:r>
+              <a:r>
+                <a:rPr lang="en-GB" sz="1200" i="1" dirty="0">
+                  <a:solidFill>
+                    <a:srgbClr val="000000"/>
+                  </a:solidFill>
+                </a:rPr>
+                <a:t> </a:t>
+              </a:r>
+              <a:r>
+                <a:rPr lang="en-GB" sz="1200" i="1" dirty="0" err="1">
+                  <a:solidFill>
+                    <a:srgbClr val="000000"/>
+                  </a:solidFill>
+                </a:rPr>
+                <a:t>suscipit</a:t>
+              </a:r>
+              <a:r>
+                <a:rPr lang="en-GB" sz="1200" i="1" dirty="0">
+                  <a:solidFill>
+                    <a:srgbClr val="000000"/>
+                  </a:solidFill>
+                </a:rPr>
+                <a:t> </a:t>
+              </a:r>
+              <a:r>
+                <a:rPr lang="en-GB" sz="1200" i="1" dirty="0" err="1">
+                  <a:solidFill>
+                    <a:srgbClr val="000000"/>
+                  </a:solidFill>
+                </a:rPr>
+                <a:t>massa</a:t>
+              </a:r>
+              <a:r>
+                <a:rPr lang="en-GB" sz="1200" i="1" dirty="0">
+                  <a:solidFill>
+                    <a:srgbClr val="000000"/>
+                  </a:solidFill>
+                </a:rPr>
+                <a:t>. </a:t>
+              </a:r>
+              <a:r>
+                <a:rPr lang="en-GB" sz="1200" i="1" dirty="0" err="1">
+                  <a:solidFill>
+                    <a:srgbClr val="000000"/>
+                  </a:solidFill>
+                </a:rPr>
+                <a:t>Fusce</a:t>
+              </a:r>
+              <a:r>
+                <a:rPr lang="en-GB" sz="1200" i="1" dirty="0">
+                  <a:solidFill>
+                    <a:srgbClr val="000000"/>
+                  </a:solidFill>
+                </a:rPr>
+                <a:t> </a:t>
+              </a:r>
+              <a:r>
+                <a:rPr lang="en-GB" sz="1200" i="1" dirty="0" err="1">
+                  <a:solidFill>
+                    <a:srgbClr val="000000"/>
+                  </a:solidFill>
+                </a:rPr>
+                <a:t>nec</a:t>
+              </a:r>
+              <a:r>
+                <a:rPr lang="en-GB" sz="1200" i="1" dirty="0">
+                  <a:solidFill>
+                    <a:srgbClr val="000000"/>
+                  </a:solidFill>
+                </a:rPr>
+                <a:t> </a:t>
+              </a:r>
+              <a:r>
+                <a:rPr lang="en-GB" sz="1200" i="1" dirty="0" err="1">
+                  <a:solidFill>
+                    <a:srgbClr val="000000"/>
+                  </a:solidFill>
+                </a:rPr>
+                <a:t>diam</a:t>
+              </a:r>
+              <a:r>
+                <a:rPr lang="en-GB" sz="1200" i="1" dirty="0">
+                  <a:solidFill>
+                    <a:srgbClr val="000000"/>
+                  </a:solidFill>
+                </a:rPr>
+                <a:t> </a:t>
+              </a:r>
+              <a:r>
+                <a:rPr lang="en-GB" sz="1200" i="1" dirty="0" err="1">
+                  <a:solidFill>
+                    <a:srgbClr val="000000"/>
+                  </a:solidFill>
+                </a:rPr>
+                <a:t>leo</a:t>
+              </a:r>
+              <a:r>
+                <a:rPr lang="en-GB" sz="1200" i="1" dirty="0">
+                  <a:solidFill>
+                    <a:srgbClr val="000000"/>
+                  </a:solidFill>
+                </a:rPr>
+                <a:t>."</a:t>
+              </a:r>
+              <a:endParaRPr lang="en-GB" sz="1200" dirty="0"/>
+            </a:p>
+          </p:txBody>
+        </p:sp>
+      </p:grpSp>
+      <p:sp>
+        <p:nvSpPr>
+          <p:cNvPr id="21" name="TextBox 20">
+            <a:extLst>
+              <a:ext uri="{FF2B5EF4-FFF2-40B4-BE49-F238E27FC236}">
+                <a16:creationId xmlns:a16="http://schemas.microsoft.com/office/drawing/2014/main" id="{06239B53-3CBD-4290-97D8-C4591EC03C15}"/>
+              </a:ext>
+            </a:extLst>
+          </p:cNvPr>
+          <p:cNvSpPr txBox="1"/>
+          <p:nvPr/>
+        </p:nvSpPr>
+        <p:spPr>
+          <a:xfrm>
+            <a:off x="272471" y="6020704"/>
+            <a:ext cx="2278894" cy="523220"/>
+          </a:xfrm>
+          <a:prstGeom prst="rect">
+            <a:avLst/>
+          </a:prstGeom>
+          <a:noFill/>
+        </p:spPr>
+        <p:txBody>
+          <a:bodyPr wrap="none" rtlCol="0">
+            <a:spAutoFit/>
+          </a:bodyPr>
+          <a:lstStyle/>
+          <a:p>
+            <a:r>
+              <a:rPr lang="en-GB" sz="1400" b="1" dirty="0"/>
+              <a:t>Name/Anon from City, State</a:t>
+            </a:r>
+          </a:p>
+          <a:p>
+            <a:r>
+              <a:rPr lang="en-GB" sz="1400" b="1" dirty="0"/>
+              <a:t>Received x procedure</a:t>
+            </a:r>
+          </a:p>
+        </p:txBody>
+      </p:sp>
+      <p:grpSp>
+        <p:nvGrpSpPr>
+          <p:cNvPr id="22" name="Group 21">
+            <a:extLst>
+              <a:ext uri="{FF2B5EF4-FFF2-40B4-BE49-F238E27FC236}">
+                <a16:creationId xmlns:a16="http://schemas.microsoft.com/office/drawing/2014/main" id="{4B2E6EEF-1BE8-4298-901A-BE486E6A506C}"/>
+              </a:ext>
+            </a:extLst>
+          </p:cNvPr>
+          <p:cNvGrpSpPr/>
+          <p:nvPr/>
+        </p:nvGrpSpPr>
+        <p:grpSpPr>
+          <a:xfrm>
+            <a:off x="272471" y="8083248"/>
+            <a:ext cx="6218237" cy="461665"/>
+            <a:chOff x="272471" y="3461333"/>
+            <a:chExt cx="6218237" cy="461665"/>
+          </a:xfrm>
+        </p:grpSpPr>
+        <p:pic>
+          <p:nvPicPr>
+            <p:cNvPr id="23" name="Graphic 22" descr="Open quotation mark with solid fill">
+              <a:extLst>
+                <a:ext uri="{FF2B5EF4-FFF2-40B4-BE49-F238E27FC236}">
+                  <a16:creationId xmlns:a16="http://schemas.microsoft.com/office/drawing/2014/main" id="{48B7D3CF-FB0D-4FA8-B7AB-1200C4A3E3AF}"/>
+                </a:ext>
+              </a:extLst>
+            </p:cNvPr>
+            <p:cNvPicPr>
+              <a:picLocks noChangeAspect="1"/>
+            </p:cNvPicPr>
+            <p:nvPr/>
+          </p:nvPicPr>
+          <p:blipFill>
+            <a:blip r:embed="rId5">
+              <a:extLst>
+                <a:ext uri="{28A0092B-C50C-407E-A947-70E740481C1C}">
+                  <a14:useLocalDpi xmlns:a14="http://schemas.microsoft.com/office/drawing/2010/main" val="0"/>
+                </a:ext>
+                <a:ext uri="{96DAC541-7B7A-43D3-8B79-37D633B846F1}">
+                  <asvg:svgBlip xmlns:asvg="http://schemas.microsoft.com/office/drawing/2016/SVG/main" r:embed="rId6"/>
+                </a:ext>
+              </a:extLst>
+            </a:blip>
+            <a:stretch>
+              <a:fillRect/>
+            </a:stretch>
+          </p:blipFill>
+          <p:spPr>
+            <a:xfrm>
+              <a:off x="272471" y="3480788"/>
+              <a:ext cx="232826" cy="232826"/>
+            </a:xfrm>
+            <a:prstGeom prst="rect">
+              <a:avLst/>
+            </a:prstGeom>
+          </p:spPr>
+        </p:pic>
+        <p:sp>
+          <p:nvSpPr>
+            <p:cNvPr id="24" name="TextBox 23">
+              <a:extLst>
+                <a:ext uri="{FF2B5EF4-FFF2-40B4-BE49-F238E27FC236}">
+                  <a16:creationId xmlns:a16="http://schemas.microsoft.com/office/drawing/2014/main" id="{FD394CEB-1196-4583-90C5-D42052201792}"/>
+                </a:ext>
+              </a:extLst>
+            </p:cNvPr>
+            <p:cNvSpPr txBox="1"/>
+            <p:nvPr/>
+          </p:nvSpPr>
+          <p:spPr>
+            <a:xfrm>
+              <a:off x="434058" y="3461333"/>
+              <a:ext cx="6056650" cy="461665"/>
+            </a:xfrm>
+            <a:prstGeom prst="rect">
+              <a:avLst/>
+            </a:prstGeom>
+            <a:noFill/>
+          </p:spPr>
+          <p:txBody>
+            <a:bodyPr wrap="square">
+              <a:spAutoFit/>
+            </a:bodyPr>
+            <a:lstStyle/>
+            <a:p>
+              <a:r>
+                <a:rPr lang="en-GB" sz="1200" i="1" dirty="0">
+                  <a:solidFill>
+                    <a:srgbClr val="000000"/>
+                  </a:solidFill>
+                </a:rPr>
+                <a:t>Lorem ipsum </a:t>
+              </a:r>
+              <a:r>
+                <a:rPr lang="en-GB" sz="1200" i="1" dirty="0" err="1">
+                  <a:solidFill>
+                    <a:srgbClr val="000000"/>
+                  </a:solidFill>
+                </a:rPr>
+                <a:t>dolor</a:t>
+              </a:r>
+              <a:r>
+                <a:rPr lang="en-GB" sz="1200" i="1" dirty="0">
+                  <a:solidFill>
+                    <a:srgbClr val="000000"/>
+                  </a:solidFill>
+                </a:rPr>
+                <a:t> sit </a:t>
+              </a:r>
+              <a:r>
+                <a:rPr lang="en-GB" sz="1200" i="1" dirty="0" err="1">
+                  <a:solidFill>
+                    <a:srgbClr val="000000"/>
+                  </a:solidFill>
+                </a:rPr>
+                <a:t>amet</a:t>
+              </a:r>
+              <a:r>
+                <a:rPr lang="en-GB" sz="1200" i="1" dirty="0">
+                  <a:solidFill>
+                    <a:srgbClr val="000000"/>
+                  </a:solidFill>
+                </a:rPr>
+                <a:t>, </a:t>
+              </a:r>
+              <a:r>
+                <a:rPr lang="en-GB" sz="1200" i="1" dirty="0" err="1">
+                  <a:solidFill>
+                    <a:srgbClr val="000000"/>
+                  </a:solidFill>
+                </a:rPr>
+                <a:t>consectetur</a:t>
+              </a:r>
+              <a:r>
+                <a:rPr lang="en-GB" sz="1200" i="1" dirty="0">
+                  <a:solidFill>
+                    <a:srgbClr val="000000"/>
+                  </a:solidFill>
+                </a:rPr>
+                <a:t> </a:t>
+              </a:r>
+              <a:r>
+                <a:rPr lang="en-GB" sz="1200" i="1" dirty="0" err="1">
+                  <a:solidFill>
+                    <a:srgbClr val="000000"/>
+                  </a:solidFill>
+                </a:rPr>
+                <a:t>adipiscing</a:t>
+              </a:r>
+              <a:r>
+                <a:rPr lang="en-GB" sz="1200" i="1" dirty="0">
+                  <a:solidFill>
+                    <a:srgbClr val="000000"/>
+                  </a:solidFill>
+                </a:rPr>
+                <a:t> </a:t>
+              </a:r>
+              <a:r>
+                <a:rPr lang="en-GB" sz="1200" i="1" dirty="0" err="1">
+                  <a:solidFill>
+                    <a:srgbClr val="000000"/>
+                  </a:solidFill>
+                </a:rPr>
+                <a:t>elit</a:t>
+              </a:r>
+              <a:r>
+                <a:rPr lang="en-GB" sz="1200" i="1" dirty="0">
+                  <a:solidFill>
+                    <a:srgbClr val="000000"/>
+                  </a:solidFill>
+                </a:rPr>
+                <a:t>. </a:t>
+              </a:r>
+              <a:r>
+                <a:rPr lang="en-GB" sz="1200" i="1" dirty="0" err="1">
+                  <a:solidFill>
+                    <a:srgbClr val="000000"/>
+                  </a:solidFill>
+                </a:rPr>
+                <a:t>Aliquam</a:t>
+              </a:r>
+              <a:r>
+                <a:rPr lang="en-GB" sz="1200" i="1" dirty="0">
+                  <a:solidFill>
+                    <a:srgbClr val="000000"/>
+                  </a:solidFill>
+                </a:rPr>
+                <a:t> </a:t>
+              </a:r>
+              <a:r>
+                <a:rPr lang="en-GB" sz="1200" i="1" dirty="0" err="1">
+                  <a:solidFill>
+                    <a:srgbClr val="000000"/>
+                  </a:solidFill>
+                </a:rPr>
+                <a:t>lectus</a:t>
+              </a:r>
+              <a:r>
+                <a:rPr lang="en-GB" sz="1200" i="1" dirty="0">
+                  <a:solidFill>
+                    <a:srgbClr val="000000"/>
+                  </a:solidFill>
+                </a:rPr>
+                <a:t> dui, cursus vitae </a:t>
+              </a:r>
+              <a:r>
+                <a:rPr lang="en-GB" sz="1200" i="1" dirty="0" err="1">
+                  <a:solidFill>
+                    <a:srgbClr val="000000"/>
+                  </a:solidFill>
+                </a:rPr>
+                <a:t>elit</a:t>
+              </a:r>
+              <a:r>
+                <a:rPr lang="en-GB" sz="1200" i="1" dirty="0">
+                  <a:solidFill>
+                    <a:srgbClr val="000000"/>
+                  </a:solidFill>
+                </a:rPr>
+                <a:t> </a:t>
+              </a:r>
+              <a:r>
+                <a:rPr lang="en-GB" sz="1200" i="1" dirty="0" err="1">
+                  <a:solidFill>
+                    <a:srgbClr val="000000"/>
+                  </a:solidFill>
+                </a:rPr>
+                <a:t>quis</a:t>
+              </a:r>
+              <a:r>
+                <a:rPr lang="en-GB" sz="1200" i="1" dirty="0">
+                  <a:solidFill>
+                    <a:srgbClr val="000000"/>
+                  </a:solidFill>
+                </a:rPr>
+                <a:t>, </a:t>
+              </a:r>
+              <a:r>
+                <a:rPr lang="en-GB" sz="1200" i="1" dirty="0" err="1">
+                  <a:solidFill>
+                    <a:srgbClr val="000000"/>
+                  </a:solidFill>
+                </a:rPr>
+                <a:t>mattis</a:t>
+              </a:r>
+              <a:r>
+                <a:rPr lang="en-GB" sz="1200" i="1" dirty="0">
+                  <a:solidFill>
+                    <a:srgbClr val="000000"/>
+                  </a:solidFill>
+                </a:rPr>
+                <a:t> </a:t>
+              </a:r>
+              <a:r>
+                <a:rPr lang="en-GB" sz="1200" i="1" dirty="0" err="1">
+                  <a:solidFill>
+                    <a:srgbClr val="000000"/>
+                  </a:solidFill>
+                </a:rPr>
+                <a:t>suscipit</a:t>
+              </a:r>
+              <a:r>
+                <a:rPr lang="en-GB" sz="1200" i="1" dirty="0">
+                  <a:solidFill>
+                    <a:srgbClr val="000000"/>
+                  </a:solidFill>
+                </a:rPr>
+                <a:t> </a:t>
+              </a:r>
+              <a:r>
+                <a:rPr lang="en-GB" sz="1200" i="1" dirty="0" err="1">
+                  <a:solidFill>
+                    <a:srgbClr val="000000"/>
+                  </a:solidFill>
+                </a:rPr>
+                <a:t>massa</a:t>
+              </a:r>
+              <a:r>
+                <a:rPr lang="en-GB" sz="1200" i="1" dirty="0">
+                  <a:solidFill>
+                    <a:srgbClr val="000000"/>
+                  </a:solidFill>
+                </a:rPr>
+                <a:t>. </a:t>
+              </a:r>
+              <a:r>
+                <a:rPr lang="en-GB" sz="1200" i="1" dirty="0" err="1">
+                  <a:solidFill>
+                    <a:srgbClr val="000000"/>
+                  </a:solidFill>
+                </a:rPr>
+                <a:t>Fusce</a:t>
+              </a:r>
+              <a:r>
+                <a:rPr lang="en-GB" sz="1200" i="1" dirty="0">
+                  <a:solidFill>
+                    <a:srgbClr val="000000"/>
+                  </a:solidFill>
+                </a:rPr>
+                <a:t> </a:t>
+              </a:r>
+              <a:r>
+                <a:rPr lang="en-GB" sz="1200" i="1" dirty="0" err="1">
+                  <a:solidFill>
+                    <a:srgbClr val="000000"/>
+                  </a:solidFill>
+                </a:rPr>
+                <a:t>nec</a:t>
+              </a:r>
+              <a:r>
+                <a:rPr lang="en-GB" sz="1200" i="1" dirty="0">
+                  <a:solidFill>
+                    <a:srgbClr val="000000"/>
+                  </a:solidFill>
+                </a:rPr>
+                <a:t> </a:t>
+              </a:r>
+              <a:r>
+                <a:rPr lang="en-GB" sz="1200" i="1" dirty="0" err="1">
+                  <a:solidFill>
+                    <a:srgbClr val="000000"/>
+                  </a:solidFill>
+                </a:rPr>
+                <a:t>diam</a:t>
+              </a:r>
+              <a:r>
+                <a:rPr lang="en-GB" sz="1200" i="1" dirty="0">
+                  <a:solidFill>
+                    <a:srgbClr val="000000"/>
+                  </a:solidFill>
+                </a:rPr>
+                <a:t> </a:t>
+              </a:r>
+              <a:r>
+                <a:rPr lang="en-GB" sz="1200" i="1" dirty="0" err="1">
+                  <a:solidFill>
+                    <a:srgbClr val="000000"/>
+                  </a:solidFill>
+                </a:rPr>
+                <a:t>leo</a:t>
+              </a:r>
+              <a:r>
+                <a:rPr lang="en-GB" sz="1200" i="1" dirty="0">
+                  <a:solidFill>
+                    <a:srgbClr val="000000"/>
+                  </a:solidFill>
+                </a:rPr>
+                <a:t>."</a:t>
+              </a:r>
+              <a:endParaRPr lang="en-GB" sz="1200" dirty="0"/>
+            </a:p>
+          </p:txBody>
+        </p:sp>
+      </p:grpSp>
+      <p:sp>
+        <p:nvSpPr>
+          <p:cNvPr id="25" name="TextBox 24">
+            <a:extLst>
+              <a:ext uri="{FF2B5EF4-FFF2-40B4-BE49-F238E27FC236}">
+                <a16:creationId xmlns:a16="http://schemas.microsoft.com/office/drawing/2014/main" id="{F318F0A7-830A-4901-BC59-FFF5C07176B4}"/>
+              </a:ext>
+            </a:extLst>
+          </p:cNvPr>
+          <p:cNvSpPr txBox="1"/>
+          <p:nvPr/>
+        </p:nvSpPr>
+        <p:spPr>
+          <a:xfrm>
+            <a:off x="272471" y="7498473"/>
+            <a:ext cx="2278894" cy="523220"/>
+          </a:xfrm>
+          <a:prstGeom prst="rect">
+            <a:avLst/>
+          </a:prstGeom>
+          <a:noFill/>
+        </p:spPr>
+        <p:txBody>
+          <a:bodyPr wrap="none" rtlCol="0">
+            <a:spAutoFit/>
+          </a:bodyPr>
+          <a:lstStyle/>
+          <a:p>
+            <a:r>
+              <a:rPr lang="en-GB" sz="1400" b="1" dirty="0"/>
+              <a:t>Name/Anon from City, State</a:t>
+            </a:r>
+          </a:p>
+          <a:p>
+            <a:r>
+              <a:rPr lang="en-GB" sz="1400" b="1" dirty="0"/>
+              <a:t>Received x procedure</a:t>
+            </a:r>
+          </a:p>
+        </p:txBody>
+      </p:sp>
+      <p:sp>
+        <p:nvSpPr>
+          <p:cNvPr id="26" name="TextBox 25">
+            <a:extLst>
+              <a:ext uri="{FF2B5EF4-FFF2-40B4-BE49-F238E27FC236}">
+                <a16:creationId xmlns:a16="http://schemas.microsoft.com/office/drawing/2014/main" id="{03610DF3-BD65-4FFB-B891-B2BC940E8907}"/>
+              </a:ext>
+            </a:extLst>
+          </p:cNvPr>
+          <p:cNvSpPr txBox="1"/>
+          <p:nvPr/>
+        </p:nvSpPr>
+        <p:spPr>
+          <a:xfrm>
+            <a:off x="4410330" y="8677423"/>
+            <a:ext cx="2080378" cy="307777"/>
+          </a:xfrm>
+          <a:prstGeom prst="rect">
+            <a:avLst/>
+          </a:prstGeom>
+          <a:noFill/>
+          <a:ln>
+            <a:solidFill>
+              <a:schemeClr val="tx1"/>
+            </a:solidFill>
+          </a:ln>
+        </p:spPr>
+        <p:txBody>
+          <a:bodyPr wrap="none" rtlCol="0">
+            <a:spAutoFit/>
+          </a:bodyPr>
+          <a:lstStyle/>
+          <a:p>
+            <a:r>
+              <a:rPr lang="en-GB" sz="1400" dirty="0"/>
+              <a:t>Previous | 1 | 2 | 3 | Next</a:t>
+            </a:r>
+          </a:p>
+        </p:txBody>
+      </p:sp>
+      <p:sp>
+        <p:nvSpPr>
+          <p:cNvPr id="27" name="TextBox 26">
+            <a:extLst>
+              <a:ext uri="{FF2B5EF4-FFF2-40B4-BE49-F238E27FC236}">
+                <a16:creationId xmlns:a16="http://schemas.microsoft.com/office/drawing/2014/main" id="{6302B46C-4F0A-40B4-A67D-7CF61806924D}"/>
+              </a:ext>
+            </a:extLst>
+          </p:cNvPr>
+          <p:cNvSpPr txBox="1"/>
+          <p:nvPr/>
+        </p:nvSpPr>
+        <p:spPr>
+          <a:xfrm>
+            <a:off x="4410330" y="2767455"/>
+            <a:ext cx="2080378" cy="307777"/>
+          </a:xfrm>
+          <a:prstGeom prst="rect">
+            <a:avLst/>
+          </a:prstGeom>
+          <a:noFill/>
+          <a:ln>
+            <a:solidFill>
+              <a:schemeClr val="tx1"/>
+            </a:solidFill>
+          </a:ln>
+        </p:spPr>
+        <p:txBody>
+          <a:bodyPr wrap="none" rtlCol="0">
+            <a:spAutoFit/>
+          </a:bodyPr>
+          <a:lstStyle/>
+          <a:p>
+            <a:r>
+              <a:rPr lang="en-GB" sz="1400" dirty="0"/>
+              <a:t>Previous | 1 | 2 | 3 | Next</a:t>
+            </a:r>
+          </a:p>
+        </p:txBody>
+      </p:sp>
+    </p:spTree>
+    <p:extLst>
+      <p:ext uri="{BB962C8B-B14F-4D97-AF65-F5344CB8AC3E}">
+        <p14:creationId xmlns:p14="http://schemas.microsoft.com/office/powerpoint/2010/main" val="3572581620"/>
       </p:ext>
     </p:extLst>
   </p:cSld>

</xml_diff>

<commit_message>
Completed header partial HTML and CSS
</commit_message>
<xml_diff>
--- a/Website Design Tools.pptx
+++ b/Website Design Tools.pptx
@@ -5471,7 +5471,7 @@
           <a:p>
             <a:fld id="{12F15D9C-A007-4C82-A807-6D2013854DF5}" type="datetimeFigureOut">
               <a:rPr lang="en-GB" smtClean="0"/>
-              <a:t>24/02/2022</a:t>
+              <a:t>06/03/2022</a:t>
             </a:fld>
             <a:endParaRPr lang="en-GB"/>
           </a:p>
@@ -5971,7 +5971,7 @@
           <a:p>
             <a:fld id="{1C4F9540-4BF6-456B-983F-E69BCBCF3DC2}" type="datetimeFigureOut">
               <a:rPr lang="en-GB" smtClean="0"/>
-              <a:t>24/02/2022</a:t>
+              <a:t>06/03/2022</a:t>
             </a:fld>
             <a:endParaRPr lang="en-GB"/>
           </a:p>
@@ -6141,7 +6141,7 @@
           <a:p>
             <a:fld id="{1C4F9540-4BF6-456B-983F-E69BCBCF3DC2}" type="datetimeFigureOut">
               <a:rPr lang="en-GB" smtClean="0"/>
-              <a:t>24/02/2022</a:t>
+              <a:t>06/03/2022</a:t>
             </a:fld>
             <a:endParaRPr lang="en-GB"/>
           </a:p>
@@ -6321,7 +6321,7 @@
           <a:p>
             <a:fld id="{1C4F9540-4BF6-456B-983F-E69BCBCF3DC2}" type="datetimeFigureOut">
               <a:rPr lang="en-GB" smtClean="0"/>
-              <a:t>24/02/2022</a:t>
+              <a:t>06/03/2022</a:t>
             </a:fld>
             <a:endParaRPr lang="en-GB"/>
           </a:p>
@@ -6491,7 +6491,7 @@
           <a:p>
             <a:fld id="{1C4F9540-4BF6-456B-983F-E69BCBCF3DC2}" type="datetimeFigureOut">
               <a:rPr lang="en-GB" smtClean="0"/>
-              <a:t>24/02/2022</a:t>
+              <a:t>06/03/2022</a:t>
             </a:fld>
             <a:endParaRPr lang="en-GB"/>
           </a:p>
@@ -6735,7 +6735,7 @@
           <a:p>
             <a:fld id="{1C4F9540-4BF6-456B-983F-E69BCBCF3DC2}" type="datetimeFigureOut">
               <a:rPr lang="en-GB" smtClean="0"/>
-              <a:t>24/02/2022</a:t>
+              <a:t>06/03/2022</a:t>
             </a:fld>
             <a:endParaRPr lang="en-GB"/>
           </a:p>
@@ -6967,7 +6967,7 @@
           <a:p>
             <a:fld id="{1C4F9540-4BF6-456B-983F-E69BCBCF3DC2}" type="datetimeFigureOut">
               <a:rPr lang="en-GB" smtClean="0"/>
-              <a:t>24/02/2022</a:t>
+              <a:t>06/03/2022</a:t>
             </a:fld>
             <a:endParaRPr lang="en-GB"/>
           </a:p>
@@ -7334,7 +7334,7 @@
           <a:p>
             <a:fld id="{1C4F9540-4BF6-456B-983F-E69BCBCF3DC2}" type="datetimeFigureOut">
               <a:rPr lang="en-GB" smtClean="0"/>
-              <a:t>24/02/2022</a:t>
+              <a:t>06/03/2022</a:t>
             </a:fld>
             <a:endParaRPr lang="en-GB"/>
           </a:p>
@@ -7452,7 +7452,7 @@
           <a:p>
             <a:fld id="{1C4F9540-4BF6-456B-983F-E69BCBCF3DC2}" type="datetimeFigureOut">
               <a:rPr lang="en-GB" smtClean="0"/>
-              <a:t>24/02/2022</a:t>
+              <a:t>06/03/2022</a:t>
             </a:fld>
             <a:endParaRPr lang="en-GB"/>
           </a:p>
@@ -7547,7 +7547,7 @@
           <a:p>
             <a:fld id="{1C4F9540-4BF6-456B-983F-E69BCBCF3DC2}" type="datetimeFigureOut">
               <a:rPr lang="en-GB" smtClean="0"/>
-              <a:t>24/02/2022</a:t>
+              <a:t>06/03/2022</a:t>
             </a:fld>
             <a:endParaRPr lang="en-GB"/>
           </a:p>
@@ -7824,7 +7824,7 @@
           <a:p>
             <a:fld id="{1C4F9540-4BF6-456B-983F-E69BCBCF3DC2}" type="datetimeFigureOut">
               <a:rPr lang="en-GB" smtClean="0"/>
-              <a:t>24/02/2022</a:t>
+              <a:t>06/03/2022</a:t>
             </a:fld>
             <a:endParaRPr lang="en-GB"/>
           </a:p>
@@ -8081,7 +8081,7 @@
           <a:p>
             <a:fld id="{1C4F9540-4BF6-456B-983F-E69BCBCF3DC2}" type="datetimeFigureOut">
               <a:rPr lang="en-GB" smtClean="0"/>
-              <a:t>24/02/2022</a:t>
+              <a:t>06/03/2022</a:t>
             </a:fld>
             <a:endParaRPr lang="en-GB"/>
           </a:p>
@@ -8294,7 +8294,7 @@
           <a:p>
             <a:fld id="{1C4F9540-4BF6-456B-983F-E69BCBCF3DC2}" type="datetimeFigureOut">
               <a:rPr lang="en-GB" smtClean="0"/>
-              <a:t>24/02/2022</a:t>
+              <a:t>06/03/2022</a:t>
             </a:fld>
             <a:endParaRPr lang="en-GB"/>
           </a:p>
@@ -8809,7 +8809,7 @@
           <a:lstStyle/>
           <a:p>
             <a:pPr algn="ctr"/>
-            <a:endParaRPr lang="en-GB"/>
+            <a:endParaRPr lang="en-GB" dirty="0"/>
           </a:p>
         </p:txBody>
       </p:sp>
@@ -8928,58 +8928,6 @@
       </p:pic>
       <p:sp>
         <p:nvSpPr>
-          <p:cNvPr id="8" name="Rectangle 7">
-            <a:extLst>
-              <a:ext uri="{FF2B5EF4-FFF2-40B4-BE49-F238E27FC236}">
-                <a16:creationId xmlns:a16="http://schemas.microsoft.com/office/drawing/2014/main" id="{5A9B4925-9099-4696-B348-236913E4F7E3}"/>
-              </a:ext>
-            </a:extLst>
-          </p:cNvPr>
-          <p:cNvSpPr/>
-          <p:nvPr/>
-        </p:nvSpPr>
-        <p:spPr>
-          <a:xfrm>
-            <a:off x="4414437" y="6451269"/>
-            <a:ext cx="2139774" cy="231422"/>
-          </a:xfrm>
-          <a:prstGeom prst="rect">
-            <a:avLst/>
-          </a:prstGeom>
-          <a:noFill/>
-          <a:ln>
-            <a:solidFill>
-              <a:schemeClr val="tx1"/>
-            </a:solidFill>
-          </a:ln>
-        </p:spPr>
-        <p:style>
-          <a:lnRef idx="2">
-            <a:schemeClr val="accent6"/>
-          </a:lnRef>
-          <a:fillRef idx="1">
-            <a:schemeClr val="lt1"/>
-          </a:fillRef>
-          <a:effectRef idx="0">
-            <a:schemeClr val="accent6"/>
-          </a:effectRef>
-          <a:fontRef idx="minor">
-            <a:schemeClr val="dk1"/>
-          </a:fontRef>
-        </p:style>
-        <p:txBody>
-          <a:bodyPr rtlCol="0" anchor="ctr"/>
-          <a:lstStyle/>
-          <a:p>
-            <a:r>
-              <a:rPr lang="en-GB" sz="1100" dirty="0"/>
-              <a:t>Search bar</a:t>
-            </a:r>
-          </a:p>
-        </p:txBody>
-      </p:sp>
-      <p:sp>
-        <p:nvSpPr>
           <p:cNvPr id="10" name="Rectangle 9">
             <a:extLst>
               <a:ext uri="{FF2B5EF4-FFF2-40B4-BE49-F238E27FC236}">
@@ -8992,7 +8940,7 @@
         </p:nvSpPr>
         <p:spPr>
           <a:xfrm>
-            <a:off x="1934394" y="6451269"/>
+            <a:off x="4143877" y="6446188"/>
             <a:ext cx="2415014" cy="231422"/>
           </a:xfrm>
           <a:prstGeom prst="rect">
@@ -9031,45 +8979,6 @@
           </a:p>
         </p:txBody>
       </p:sp>
-      <p:pic>
-        <p:nvPicPr>
-          <p:cNvPr id="11" name="Graphic 10" descr="Magnifying glass with solid fill">
-            <a:extLst>
-              <a:ext uri="{FF2B5EF4-FFF2-40B4-BE49-F238E27FC236}">
-                <a16:creationId xmlns:a16="http://schemas.microsoft.com/office/drawing/2014/main" id="{43A29C4D-645A-4723-9646-C9C63BB26AE0}"/>
-              </a:ext>
-            </a:extLst>
-          </p:cNvPr>
-          <p:cNvPicPr>
-            <a:picLocks noChangeAspect="1"/>
-          </p:cNvPicPr>
-          <p:nvPr/>
-        </p:nvPicPr>
-        <p:blipFill>
-          <a:blip r:embed="rId10">
-            <a:extLst>
-              <a:ext uri="{28A0092B-C50C-407E-A947-70E740481C1C}">
-                <a14:useLocalDpi xmlns:a14="http://schemas.microsoft.com/office/drawing/2010/main" val="0"/>
-              </a:ext>
-              <a:ext uri="{96DAC541-7B7A-43D3-8B79-37D633B846F1}">
-                <asvg:svgBlip xmlns:asvg="http://schemas.microsoft.com/office/drawing/2016/SVG/main" r:embed="rId11"/>
-              </a:ext>
-            </a:extLst>
-          </a:blip>
-          <a:stretch>
-            <a:fillRect/>
-          </a:stretch>
-        </p:blipFill>
-        <p:spPr>
-          <a:xfrm flipH="1">
-            <a:off x="6342012" y="6473847"/>
-            <a:ext cx="183447" cy="183447"/>
-          </a:xfrm>
-          <a:prstGeom prst="rect">
-            <a:avLst/>
-          </a:prstGeom>
-        </p:spPr>
-      </p:pic>
       <p:sp>
         <p:nvSpPr>
           <p:cNvPr id="12" name="TextBox 11">
@@ -9195,7 +9104,7 @@
           <a:lstStyle/>
           <a:p>
             <a:pPr algn="ctr"/>
-            <a:endParaRPr lang="en-GB"/>
+            <a:endParaRPr lang="en-GB" dirty="0"/>
           </a:p>
         </p:txBody>
       </p:sp>
@@ -9249,7 +9158,7 @@
           <p:nvPr/>
         </p:nvPicPr>
         <p:blipFill rotWithShape="1">
-          <a:blip r:embed="rId12">
+          <a:blip r:embed="rId10">
             <a:extLst>
               <a:ext uri="{28A0092B-C50C-407E-A947-70E740481C1C}">
                 <a14:useLocalDpi xmlns:a14="http://schemas.microsoft.com/office/drawing/2010/main" val="0"/>
@@ -9298,7 +9207,7 @@
         </p:nvSpPr>
         <p:spPr>
           <a:xfrm>
-            <a:off x="530574" y="7721632"/>
+            <a:off x="4177062" y="7720366"/>
             <a:ext cx="2415014" cy="231422"/>
           </a:xfrm>
           <a:prstGeom prst="rect">
@@ -9441,45 +9350,6 @@
           </a:p>
         </p:txBody>
       </p:sp>
-      <p:pic>
-        <p:nvPicPr>
-          <p:cNvPr id="23" name="Graphic 22" descr="Magnifying glass with solid fill">
-            <a:extLst>
-              <a:ext uri="{FF2B5EF4-FFF2-40B4-BE49-F238E27FC236}">
-                <a16:creationId xmlns:a16="http://schemas.microsoft.com/office/drawing/2014/main" id="{B1AA8943-AD2B-49D2-B913-19B7C642EDFA}"/>
-              </a:ext>
-            </a:extLst>
-          </p:cNvPr>
-          <p:cNvPicPr>
-            <a:picLocks noChangeAspect="1"/>
-          </p:cNvPicPr>
-          <p:nvPr/>
-        </p:nvPicPr>
-        <p:blipFill>
-          <a:blip r:embed="rId10">
-            <a:extLst>
-              <a:ext uri="{28A0092B-C50C-407E-A947-70E740481C1C}">
-                <a14:useLocalDpi xmlns:a14="http://schemas.microsoft.com/office/drawing/2010/main" val="0"/>
-              </a:ext>
-              <a:ext uri="{96DAC541-7B7A-43D3-8B79-37D633B846F1}">
-                <asvg:svgBlip xmlns:asvg="http://schemas.microsoft.com/office/drawing/2016/SVG/main" r:embed="rId11"/>
-              </a:ext>
-            </a:extLst>
-          </a:blip>
-          <a:stretch>
-            <a:fillRect/>
-          </a:stretch>
-        </p:blipFill>
-        <p:spPr>
-          <a:xfrm flipH="1">
-            <a:off x="6350001" y="7708528"/>
-            <a:ext cx="246668" cy="246668"/>
-          </a:xfrm>
-          <a:prstGeom prst="rect">
-            <a:avLst/>
-          </a:prstGeom>
-        </p:spPr>
-      </p:pic>
       <p:sp>
         <p:nvSpPr>
           <p:cNvPr id="24" name="TextBox 23">
@@ -10079,7 +9949,7 @@
               </a:bodyPr>
               <a:lstStyle/>
               <a:p>
-                <a:endParaRPr lang="en-GB" sz="1400"/>
+                <a:endParaRPr lang="en-GB" sz="1400" dirty="0"/>
               </a:p>
             </p:txBody>
           </p:sp>
@@ -10186,7 +10056,7 @@
               </a:bodyPr>
               <a:lstStyle/>
               <a:p>
-                <a:endParaRPr lang="en-GB" sz="1400"/>
+                <a:endParaRPr lang="en-GB" sz="1400" dirty="0"/>
               </a:p>
             </p:txBody>
           </p:sp>
@@ -10281,7 +10151,7 @@
         <p:spPr>
           <a:xfrm>
             <a:off x="768626" y="689113"/>
-            <a:ext cx="5218032" cy="6186309"/>
+            <a:ext cx="5218032" cy="8956298"/>
           </a:xfrm>
           <a:prstGeom prst="rect">
             <a:avLst/>
@@ -10344,6 +10214,24 @@
           </a:p>
           <a:p>
             <a:r>
+              <a:rPr lang="en-GB" sz="3600" dirty="0"/>
+              <a:t>	DS</a:t>
+            </a:r>
+          </a:p>
+          <a:p>
+            <a:r>
+              <a:rPr lang="en-GB" sz="3600" dirty="0"/>
+              <a:t>	GB</a:t>
+            </a:r>
+          </a:p>
+          <a:p>
+            <a:r>
+              <a:rPr lang="en-GB" sz="3600" dirty="0"/>
+              <a:t>	SG</a:t>
+            </a:r>
+          </a:p>
+          <a:p>
+            <a:r>
               <a:rPr lang="en-GB" sz="3600" dirty="0">
                 <a:highlight>
                   <a:srgbClr val="FFFF00"/>
@@ -10374,6 +10262,18 @@
             <a:r>
               <a:rPr lang="en-GB" sz="3600" dirty="0"/>
               <a:t>Start here questionnaire</a:t>
+            </a:r>
+          </a:p>
+          <a:p>
+            <a:r>
+              <a:rPr lang="en-GB" sz="3600" dirty="0"/>
+              <a:t>Header</a:t>
+            </a:r>
+          </a:p>
+          <a:p>
+            <a:r>
+              <a:rPr lang="en-GB" sz="3600" dirty="0"/>
+              <a:t>Footer</a:t>
             </a:r>
           </a:p>
         </p:txBody>
@@ -10408,36 +10308,6 @@
           <a:chExt cx="0" cy="0"/>
         </a:xfrm>
       </p:grpSpPr>
-      <p:pic>
-        <p:nvPicPr>
-          <p:cNvPr id="8" name="Picture 7">
-            <a:extLst>
-              <a:ext uri="{FF2B5EF4-FFF2-40B4-BE49-F238E27FC236}">
-                <a16:creationId xmlns:a16="http://schemas.microsoft.com/office/drawing/2014/main" id="{E7C43C45-75F5-41F8-89A2-C2FFB4739C97}"/>
-              </a:ext>
-            </a:extLst>
-          </p:cNvPr>
-          <p:cNvPicPr>
-            <a:picLocks noChangeAspect="1"/>
-          </p:cNvPicPr>
-          <p:nvPr/>
-        </p:nvPicPr>
-        <p:blipFill>
-          <a:blip r:embed="rId3"/>
-          <a:stretch>
-            <a:fillRect/>
-          </a:stretch>
-        </p:blipFill>
-        <p:spPr>
-          <a:xfrm>
-            <a:off x="0" y="-2063"/>
-            <a:ext cx="6858000" cy="799794"/>
-          </a:xfrm>
-          <a:prstGeom prst="rect">
-            <a:avLst/>
-          </a:prstGeom>
-        </p:spPr>
-      </p:pic>
       <p:sp>
         <p:nvSpPr>
           <p:cNvPr id="9" name="Rectangle 8">
@@ -11868,13 +11738,13 @@
               <p:nvPr/>
             </p:nvPicPr>
             <p:blipFill>
-              <a:blip r:embed="rId4">
+              <a:blip r:embed="rId3">
                 <a:extLst>
                   <a:ext uri="{28A0092B-C50C-407E-A947-70E740481C1C}">
                     <a14:useLocalDpi xmlns:a14="http://schemas.microsoft.com/office/drawing/2010/main" val="0"/>
                   </a:ext>
                   <a:ext uri="{96DAC541-7B7A-43D3-8B79-37D633B846F1}">
-                    <asvg:svgBlip xmlns:asvg="http://schemas.microsoft.com/office/drawing/2016/SVG/main" r:embed="rId5"/>
+                    <asvg:svgBlip xmlns:asvg="http://schemas.microsoft.com/office/drawing/2016/SVG/main" r:embed="rId4"/>
                   </a:ext>
                 </a:extLst>
               </a:blip>
@@ -12691,11 +12561,11 @@
           <p:nvPr/>
         </p:nvPicPr>
         <p:blipFill>
-          <a:blip r:embed="rId6">
+          <a:blip r:embed="rId5">
             <a:extLst>
               <a:ext uri="{BEBA8EAE-BF5A-486C-A8C5-ECC9F3942E4B}">
                 <a14:imgProps xmlns:a14="http://schemas.microsoft.com/office/drawing/2010/main">
-                  <a14:imgLayer r:embed="rId7">
+                  <a14:imgLayer r:embed="rId6">
                     <a14:imgEffect>
                       <a14:backgroundRemoval t="8163" b="89796" l="4219" r="95000">
                         <a14:foregroundMark x1="7969" y1="48163" x2="7969" y2="48163"/>
@@ -12834,6 +12704,36 @@
           </a:p>
         </p:txBody>
       </p:sp>
+      <p:pic>
+        <p:nvPicPr>
+          <p:cNvPr id="5" name="Picture 4">
+            <a:extLst>
+              <a:ext uri="{FF2B5EF4-FFF2-40B4-BE49-F238E27FC236}">
+                <a16:creationId xmlns:a16="http://schemas.microsoft.com/office/drawing/2014/main" id="{98C6047B-6167-490D-856A-1220D7A047A2}"/>
+              </a:ext>
+            </a:extLst>
+          </p:cNvPr>
+          <p:cNvPicPr>
+            <a:picLocks noChangeAspect="1"/>
+          </p:cNvPicPr>
+          <p:nvPr/>
+        </p:nvPicPr>
+        <p:blipFill>
+          <a:blip r:embed="rId7"/>
+          <a:stretch>
+            <a:fillRect/>
+          </a:stretch>
+        </p:blipFill>
+        <p:spPr>
+          <a:xfrm>
+            <a:off x="0" y="14"/>
+            <a:ext cx="6858000" cy="797912"/>
+          </a:xfrm>
+          <a:prstGeom prst="rect">
+            <a:avLst/>
+          </a:prstGeom>
+        </p:spPr>
+      </p:pic>
     </p:spTree>
     <p:extLst>
       <p:ext uri="{BB962C8B-B14F-4D97-AF65-F5344CB8AC3E}">
@@ -13573,6 +13473,36 @@
           </a:p>
         </p:txBody>
       </p:sp>
+      <p:pic>
+        <p:nvPicPr>
+          <p:cNvPr id="21" name="Picture 20">
+            <a:extLst>
+              <a:ext uri="{FF2B5EF4-FFF2-40B4-BE49-F238E27FC236}">
+                <a16:creationId xmlns:a16="http://schemas.microsoft.com/office/drawing/2014/main" id="{CFC94F45-C148-4E11-B39E-0A13DFB6BB46}"/>
+              </a:ext>
+            </a:extLst>
+          </p:cNvPr>
+          <p:cNvPicPr>
+            <a:picLocks noChangeAspect="1"/>
+          </p:cNvPicPr>
+          <p:nvPr/>
+        </p:nvPicPr>
+        <p:blipFill>
+          <a:blip r:embed="rId5"/>
+          <a:stretch>
+            <a:fillRect/>
+          </a:stretch>
+        </p:blipFill>
+        <p:spPr>
+          <a:xfrm>
+            <a:off x="0" y="14"/>
+            <a:ext cx="6858000" cy="797912"/>
+          </a:xfrm>
+          <a:prstGeom prst="rect">
+            <a:avLst/>
+          </a:prstGeom>
+        </p:spPr>
+      </p:pic>
     </p:spTree>
     <p:extLst>
       <p:ext uri="{BB962C8B-B14F-4D97-AF65-F5344CB8AC3E}">
@@ -14284,6 +14214,36 @@
           </a:p>
         </p:txBody>
       </p:sp>
+      <p:pic>
+        <p:nvPicPr>
+          <p:cNvPr id="11" name="Picture 10">
+            <a:extLst>
+              <a:ext uri="{FF2B5EF4-FFF2-40B4-BE49-F238E27FC236}">
+                <a16:creationId xmlns:a16="http://schemas.microsoft.com/office/drawing/2014/main" id="{C8B680C4-7355-4269-84FD-3379EB74369F}"/>
+              </a:ext>
+            </a:extLst>
+          </p:cNvPr>
+          <p:cNvPicPr>
+            <a:picLocks noChangeAspect="1"/>
+          </p:cNvPicPr>
+          <p:nvPr/>
+        </p:nvPicPr>
+        <p:blipFill>
+          <a:blip r:embed="rId5"/>
+          <a:stretch>
+            <a:fillRect/>
+          </a:stretch>
+        </p:blipFill>
+        <p:spPr>
+          <a:xfrm>
+            <a:off x="0" y="14"/>
+            <a:ext cx="6858000" cy="797912"/>
+          </a:xfrm>
+          <a:prstGeom prst="rect">
+            <a:avLst/>
+          </a:prstGeom>
+        </p:spPr>
+      </p:pic>
     </p:spTree>
     <p:extLst>
       <p:ext uri="{BB962C8B-B14F-4D97-AF65-F5344CB8AC3E}">
@@ -16380,6 +16340,36 @@
           </a:p>
         </p:txBody>
       </p:sp>
+      <p:pic>
+        <p:nvPicPr>
+          <p:cNvPr id="19" name="Picture 18">
+            <a:extLst>
+              <a:ext uri="{FF2B5EF4-FFF2-40B4-BE49-F238E27FC236}">
+                <a16:creationId xmlns:a16="http://schemas.microsoft.com/office/drawing/2014/main" id="{F970E7C8-EF8F-4864-990F-61B086AD9A1A}"/>
+              </a:ext>
+            </a:extLst>
+          </p:cNvPr>
+          <p:cNvPicPr>
+            <a:picLocks noChangeAspect="1"/>
+          </p:cNvPicPr>
+          <p:nvPr/>
+        </p:nvPicPr>
+        <p:blipFill>
+          <a:blip r:embed="rId5"/>
+          <a:stretch>
+            <a:fillRect/>
+          </a:stretch>
+        </p:blipFill>
+        <p:spPr>
+          <a:xfrm>
+            <a:off x="0" y="14"/>
+            <a:ext cx="6858000" cy="797912"/>
+          </a:xfrm>
+          <a:prstGeom prst="rect">
+            <a:avLst/>
+          </a:prstGeom>
+        </p:spPr>
+      </p:pic>
     </p:spTree>
     <p:extLst>
       <p:ext uri="{BB962C8B-B14F-4D97-AF65-F5344CB8AC3E}">
@@ -18492,6 +18482,36 @@
           </a:p>
         </p:txBody>
       </p:sp>
+      <p:pic>
+        <p:nvPicPr>
+          <p:cNvPr id="28" name="Picture 27">
+            <a:extLst>
+              <a:ext uri="{FF2B5EF4-FFF2-40B4-BE49-F238E27FC236}">
+                <a16:creationId xmlns:a16="http://schemas.microsoft.com/office/drawing/2014/main" id="{344B7B98-FAA8-4986-A881-73F219C01E5A}"/>
+              </a:ext>
+            </a:extLst>
+          </p:cNvPr>
+          <p:cNvPicPr>
+            <a:picLocks noChangeAspect="1"/>
+          </p:cNvPicPr>
+          <p:nvPr/>
+        </p:nvPicPr>
+        <p:blipFill>
+          <a:blip r:embed="rId7"/>
+          <a:stretch>
+            <a:fillRect/>
+          </a:stretch>
+        </p:blipFill>
+        <p:spPr>
+          <a:xfrm>
+            <a:off x="0" y="14"/>
+            <a:ext cx="6858000" cy="797912"/>
+          </a:xfrm>
+          <a:prstGeom prst="rect">
+            <a:avLst/>
+          </a:prstGeom>
+        </p:spPr>
+      </p:pic>
     </p:spTree>
     <p:extLst>
       <p:ext uri="{BB962C8B-B14F-4D97-AF65-F5344CB8AC3E}">

</xml_diff>

<commit_message>
Created index.php and committing for testing
</commit_message>
<xml_diff>
--- a/Website Design Tools.pptx
+++ b/Website Design Tools.pptx
@@ -10266,7 +10266,11 @@
           </a:p>
           <a:p>
             <a:r>
-              <a:rPr lang="en-GB" sz="3600" dirty="0"/>
+              <a:rPr lang="en-GB" sz="3600" dirty="0">
+                <a:highlight>
+                  <a:srgbClr val="FFFF00"/>
+                </a:highlight>
+              </a:rPr>
               <a:t>Header</a:t>
             </a:r>
           </a:p>

</xml_diff>

<commit_message>
Created and integrated header.php and footer.php partials into index.php
</commit_message>
<xml_diff>
--- a/Website Design Tools.pptx
+++ b/Website Design Tools.pptx
@@ -5471,7 +5471,7 @@
           <a:p>
             <a:fld id="{12F15D9C-A007-4C82-A807-6D2013854DF5}" type="datetimeFigureOut">
               <a:rPr lang="en-GB" smtClean="0"/>
-              <a:t>06/03/2022</a:t>
+              <a:t>07/03/2022</a:t>
             </a:fld>
             <a:endParaRPr lang="en-GB"/>
           </a:p>
@@ -5971,7 +5971,7 @@
           <a:p>
             <a:fld id="{1C4F9540-4BF6-456B-983F-E69BCBCF3DC2}" type="datetimeFigureOut">
               <a:rPr lang="en-GB" smtClean="0"/>
-              <a:t>06/03/2022</a:t>
+              <a:t>07/03/2022</a:t>
             </a:fld>
             <a:endParaRPr lang="en-GB"/>
           </a:p>
@@ -6141,7 +6141,7 @@
           <a:p>
             <a:fld id="{1C4F9540-4BF6-456B-983F-E69BCBCF3DC2}" type="datetimeFigureOut">
               <a:rPr lang="en-GB" smtClean="0"/>
-              <a:t>06/03/2022</a:t>
+              <a:t>07/03/2022</a:t>
             </a:fld>
             <a:endParaRPr lang="en-GB"/>
           </a:p>
@@ -6321,7 +6321,7 @@
           <a:p>
             <a:fld id="{1C4F9540-4BF6-456B-983F-E69BCBCF3DC2}" type="datetimeFigureOut">
               <a:rPr lang="en-GB" smtClean="0"/>
-              <a:t>06/03/2022</a:t>
+              <a:t>07/03/2022</a:t>
             </a:fld>
             <a:endParaRPr lang="en-GB"/>
           </a:p>
@@ -6491,7 +6491,7 @@
           <a:p>
             <a:fld id="{1C4F9540-4BF6-456B-983F-E69BCBCF3DC2}" type="datetimeFigureOut">
               <a:rPr lang="en-GB" smtClean="0"/>
-              <a:t>06/03/2022</a:t>
+              <a:t>07/03/2022</a:t>
             </a:fld>
             <a:endParaRPr lang="en-GB"/>
           </a:p>
@@ -6735,7 +6735,7 @@
           <a:p>
             <a:fld id="{1C4F9540-4BF6-456B-983F-E69BCBCF3DC2}" type="datetimeFigureOut">
               <a:rPr lang="en-GB" smtClean="0"/>
-              <a:t>06/03/2022</a:t>
+              <a:t>07/03/2022</a:t>
             </a:fld>
             <a:endParaRPr lang="en-GB"/>
           </a:p>
@@ -6967,7 +6967,7 @@
           <a:p>
             <a:fld id="{1C4F9540-4BF6-456B-983F-E69BCBCF3DC2}" type="datetimeFigureOut">
               <a:rPr lang="en-GB" smtClean="0"/>
-              <a:t>06/03/2022</a:t>
+              <a:t>07/03/2022</a:t>
             </a:fld>
             <a:endParaRPr lang="en-GB"/>
           </a:p>
@@ -7334,7 +7334,7 @@
           <a:p>
             <a:fld id="{1C4F9540-4BF6-456B-983F-E69BCBCF3DC2}" type="datetimeFigureOut">
               <a:rPr lang="en-GB" smtClean="0"/>
-              <a:t>06/03/2022</a:t>
+              <a:t>07/03/2022</a:t>
             </a:fld>
             <a:endParaRPr lang="en-GB"/>
           </a:p>
@@ -7452,7 +7452,7 @@
           <a:p>
             <a:fld id="{1C4F9540-4BF6-456B-983F-E69BCBCF3DC2}" type="datetimeFigureOut">
               <a:rPr lang="en-GB" smtClean="0"/>
-              <a:t>06/03/2022</a:t>
+              <a:t>07/03/2022</a:t>
             </a:fld>
             <a:endParaRPr lang="en-GB"/>
           </a:p>
@@ -7547,7 +7547,7 @@
           <a:p>
             <a:fld id="{1C4F9540-4BF6-456B-983F-E69BCBCF3DC2}" type="datetimeFigureOut">
               <a:rPr lang="en-GB" smtClean="0"/>
-              <a:t>06/03/2022</a:t>
+              <a:t>07/03/2022</a:t>
             </a:fld>
             <a:endParaRPr lang="en-GB"/>
           </a:p>
@@ -7824,7 +7824,7 @@
           <a:p>
             <a:fld id="{1C4F9540-4BF6-456B-983F-E69BCBCF3DC2}" type="datetimeFigureOut">
               <a:rPr lang="en-GB" smtClean="0"/>
-              <a:t>06/03/2022</a:t>
+              <a:t>07/03/2022</a:t>
             </a:fld>
             <a:endParaRPr lang="en-GB"/>
           </a:p>
@@ -8081,7 +8081,7 @@
           <a:p>
             <a:fld id="{1C4F9540-4BF6-456B-983F-E69BCBCF3DC2}" type="datetimeFigureOut">
               <a:rPr lang="en-GB" smtClean="0"/>
-              <a:t>06/03/2022</a:t>
+              <a:t>07/03/2022</a:t>
             </a:fld>
             <a:endParaRPr lang="en-GB"/>
           </a:p>
@@ -8294,7 +8294,7 @@
           <a:p>
             <a:fld id="{1C4F9540-4BF6-456B-983F-E69BCBCF3DC2}" type="datetimeFigureOut">
               <a:rPr lang="en-GB" smtClean="0"/>
-              <a:t>06/03/2022</a:t>
+              <a:t>07/03/2022</a:t>
             </a:fld>
             <a:endParaRPr lang="en-GB"/>
           </a:p>
@@ -10276,7 +10276,11 @@
           </a:p>
           <a:p>
             <a:r>
-              <a:rPr lang="en-GB" sz="3600" dirty="0"/>
+              <a:rPr lang="en-GB" sz="3600" dirty="0">
+                <a:highlight>
+                  <a:srgbClr val="FFFF00"/>
+                </a:highlight>
+              </a:rPr>
               <a:t>Footer</a:t>
             </a:r>
           </a:p>

</xml_diff>

<commit_message>
Converted procedure info pages to PHP and moved HTML into folder
</commit_message>
<xml_diff>
--- a/Website Design Tools.pptx
+++ b/Website Design Tools.pptx
@@ -15354,19 +15354,43 @@
           <a:p>
             <a:r>
               <a:rPr lang="en-GB" sz="3600" dirty="0"/>
-              <a:t>	DS</a:t>
+              <a:t>	</a:t>
+            </a:r>
+            <a:r>
+              <a:rPr lang="en-GB" sz="3600" dirty="0">
+                <a:highlight>
+                  <a:srgbClr val="FFFF00"/>
+                </a:highlight>
+              </a:rPr>
+              <a:t>DS</a:t>
             </a:r>
           </a:p>
           <a:p>
             <a:r>
               <a:rPr lang="en-GB" sz="3600" dirty="0"/>
-              <a:t>	GB</a:t>
+              <a:t>	</a:t>
+            </a:r>
+            <a:r>
+              <a:rPr lang="en-GB" sz="3600" dirty="0">
+                <a:highlight>
+                  <a:srgbClr val="FFFF00"/>
+                </a:highlight>
+              </a:rPr>
+              <a:t>GB</a:t>
             </a:r>
           </a:p>
           <a:p>
             <a:r>
               <a:rPr lang="en-GB" sz="3600" dirty="0"/>
-              <a:t>	SG</a:t>
+              <a:t>	</a:t>
+            </a:r>
+            <a:r>
+              <a:rPr lang="en-GB" sz="3600" dirty="0">
+                <a:highlight>
+                  <a:srgbClr val="FFFF00"/>
+                </a:highlight>
+              </a:rPr>
+              <a:t>SG</a:t>
             </a:r>
           </a:p>
           <a:p>

</xml_diff>

<commit_message>
Added links to buttons to allow navigation between pages
</commit_message>
<xml_diff>
--- a/Website Design Tools.pptx
+++ b/Website Design Tools.pptx
@@ -5,7 +5,7 @@
     <p:sldMasterId id="2147483672" r:id="rId1"/>
   </p:sldMasterIdLst>
   <p:notesMasterIdLst>
-    <p:notesMasterId r:id="rId13"/>
+    <p:notesMasterId r:id="rId14"/>
   </p:notesMasterIdLst>
   <p:sldIdLst>
     <p:sldId id="257" r:id="rId2"/>
@@ -19,6 +19,7 @@
     <p:sldId id="265" r:id="rId10"/>
     <p:sldId id="266" r:id="rId11"/>
     <p:sldId id="267" r:id="rId12"/>
+    <p:sldId id="268" r:id="rId13"/>
   </p:sldIdLst>
   <p:sldSz cx="6858000" cy="10799763"/>
   <p:notesSz cx="6858000" cy="9144000"/>
@@ -137,6 +138,7 @@
             <p14:sldId id="265"/>
             <p14:sldId id="266"/>
             <p14:sldId id="267"/>
+            <p14:sldId id="268"/>
           </p14:sldIdLst>
         </p14:section>
       </p14:sectionLst>
@@ -15054,6 +15056,36 @@
 </p:sld>
 </file>
 
+<file path=ppt/slides/slide12.xml><?xml version="1.0" encoding="utf-8"?>
+<p:sld xmlns:a="http://schemas.openxmlformats.org/drawingml/2006/main" xmlns:r="http://schemas.openxmlformats.org/officeDocument/2006/relationships" xmlns:p="http://schemas.openxmlformats.org/presentationml/2006/main">
+  <p:cSld>
+    <p:spTree>
+      <p:nvGrpSpPr>
+        <p:cNvPr id="1" name=""/>
+        <p:cNvGrpSpPr/>
+        <p:nvPr/>
+      </p:nvGrpSpPr>
+      <p:grpSpPr>
+        <a:xfrm>
+          <a:off x="0" y="0"/>
+          <a:ext cx="0" cy="0"/>
+          <a:chOff x="0" y="0"/>
+          <a:chExt cx="0" cy="0"/>
+        </a:xfrm>
+      </p:grpSpPr>
+    </p:spTree>
+    <p:extLst>
+      <p:ext uri="{BB962C8B-B14F-4D97-AF65-F5344CB8AC3E}">
+        <p14:creationId xmlns:p14="http://schemas.microsoft.com/office/powerpoint/2010/main" val="811808872"/>
+      </p:ext>
+    </p:extLst>
+  </p:cSld>
+  <p:clrMapOvr>
+    <a:masterClrMapping/>
+  </p:clrMapOvr>
+</p:sld>
+</file>
+
 <file path=ppt/slides/slide2.xml><?xml version="1.0" encoding="utf-8"?>
 <p:sld xmlns:a="http://schemas.openxmlformats.org/drawingml/2006/main" xmlns:r="http://schemas.openxmlformats.org/officeDocument/2006/relationships" xmlns:p="http://schemas.openxmlformats.org/presentationml/2006/main">
   <p:cSld>
@@ -19137,7 +19169,7 @@
         <p:spPr>
           <a:xfrm>
             <a:off x="276376" y="2664551"/>
-            <a:ext cx="6214332" cy="6063198"/>
+            <a:ext cx="6214332" cy="5693866"/>
           </a:xfrm>
           <a:prstGeom prst="rect">
             <a:avLst/>
@@ -19149,42 +19181,6 @@
             <a:spAutoFit/>
           </a:bodyPr>
           <a:lstStyle/>
-          <a:p>
-            <a:pPr algn="l"/>
-            <a:r>
-              <a:rPr lang="en-GB" sz="1600" b="1" i="0" dirty="0">
-                <a:solidFill>
-                  <a:srgbClr val="000000"/>
-                </a:solidFill>
-                <a:effectLst/>
-              </a:rPr>
-              <a:t>About </a:t>
-            </a:r>
-            <a:r>
-              <a:rPr lang="en-GB" sz="1600" b="1" i="0" dirty="0" err="1">
-                <a:solidFill>
-                  <a:srgbClr val="000000"/>
-                </a:solidFill>
-                <a:effectLst/>
-              </a:rPr>
-              <a:t>AdventHealth</a:t>
-            </a:r>
-            <a:endParaRPr lang="en-GB" sz="1600" b="1" i="0" dirty="0">
-              <a:solidFill>
-                <a:srgbClr val="000000"/>
-              </a:solidFill>
-              <a:effectLst/>
-            </a:endParaRPr>
-          </a:p>
-          <a:p>
-            <a:pPr algn="l"/>
-            <a:endParaRPr lang="en-GB" sz="1200" b="0" i="0" dirty="0">
-              <a:solidFill>
-                <a:srgbClr val="000000"/>
-              </a:solidFill>
-              <a:effectLst/>
-            </a:endParaRPr>
-          </a:p>
           <a:p>
             <a:pPr algn="l"/>
             <a:r>

</xml_diff>

<commit_message>
Updating information in README
</commit_message>
<xml_diff>
--- a/Website Design Tools.pptx
+++ b/Website Design Tools.pptx
@@ -5481,7 +5481,7 @@
           <a:p>
             <a:fld id="{12F15D9C-A007-4C82-A807-6D2013854DF5}" type="datetimeFigureOut">
               <a:rPr lang="en-GB" smtClean="0"/>
-              <a:t>11/03/2022</a:t>
+              <a:t>21/03/2022</a:t>
             </a:fld>
             <a:endParaRPr lang="en-GB"/>
           </a:p>
@@ -6242,7 +6242,7 @@
           <a:p>
             <a:fld id="{1C4F9540-4BF6-456B-983F-E69BCBCF3DC2}" type="datetimeFigureOut">
               <a:rPr lang="en-GB" smtClean="0"/>
-              <a:t>11/03/2022</a:t>
+              <a:t>21/03/2022</a:t>
             </a:fld>
             <a:endParaRPr lang="en-GB"/>
           </a:p>
@@ -6412,7 +6412,7 @@
           <a:p>
             <a:fld id="{1C4F9540-4BF6-456B-983F-E69BCBCF3DC2}" type="datetimeFigureOut">
               <a:rPr lang="en-GB" smtClean="0"/>
-              <a:t>11/03/2022</a:t>
+              <a:t>21/03/2022</a:t>
             </a:fld>
             <a:endParaRPr lang="en-GB"/>
           </a:p>
@@ -6592,7 +6592,7 @@
           <a:p>
             <a:fld id="{1C4F9540-4BF6-456B-983F-E69BCBCF3DC2}" type="datetimeFigureOut">
               <a:rPr lang="en-GB" smtClean="0"/>
-              <a:t>11/03/2022</a:t>
+              <a:t>21/03/2022</a:t>
             </a:fld>
             <a:endParaRPr lang="en-GB"/>
           </a:p>
@@ -6762,7 +6762,7 @@
           <a:p>
             <a:fld id="{1C4F9540-4BF6-456B-983F-E69BCBCF3DC2}" type="datetimeFigureOut">
               <a:rPr lang="en-GB" smtClean="0"/>
-              <a:t>11/03/2022</a:t>
+              <a:t>21/03/2022</a:t>
             </a:fld>
             <a:endParaRPr lang="en-GB"/>
           </a:p>
@@ -7006,7 +7006,7 @@
           <a:p>
             <a:fld id="{1C4F9540-4BF6-456B-983F-E69BCBCF3DC2}" type="datetimeFigureOut">
               <a:rPr lang="en-GB" smtClean="0"/>
-              <a:t>11/03/2022</a:t>
+              <a:t>21/03/2022</a:t>
             </a:fld>
             <a:endParaRPr lang="en-GB"/>
           </a:p>
@@ -7238,7 +7238,7 @@
           <a:p>
             <a:fld id="{1C4F9540-4BF6-456B-983F-E69BCBCF3DC2}" type="datetimeFigureOut">
               <a:rPr lang="en-GB" smtClean="0"/>
-              <a:t>11/03/2022</a:t>
+              <a:t>21/03/2022</a:t>
             </a:fld>
             <a:endParaRPr lang="en-GB"/>
           </a:p>
@@ -7605,7 +7605,7 @@
           <a:p>
             <a:fld id="{1C4F9540-4BF6-456B-983F-E69BCBCF3DC2}" type="datetimeFigureOut">
               <a:rPr lang="en-GB" smtClean="0"/>
-              <a:t>11/03/2022</a:t>
+              <a:t>21/03/2022</a:t>
             </a:fld>
             <a:endParaRPr lang="en-GB"/>
           </a:p>
@@ -7723,7 +7723,7 @@
           <a:p>
             <a:fld id="{1C4F9540-4BF6-456B-983F-E69BCBCF3DC2}" type="datetimeFigureOut">
               <a:rPr lang="en-GB" smtClean="0"/>
-              <a:t>11/03/2022</a:t>
+              <a:t>21/03/2022</a:t>
             </a:fld>
             <a:endParaRPr lang="en-GB"/>
           </a:p>
@@ -7818,7 +7818,7 @@
           <a:p>
             <a:fld id="{1C4F9540-4BF6-456B-983F-E69BCBCF3DC2}" type="datetimeFigureOut">
               <a:rPr lang="en-GB" smtClean="0"/>
-              <a:t>11/03/2022</a:t>
+              <a:t>21/03/2022</a:t>
             </a:fld>
             <a:endParaRPr lang="en-GB"/>
           </a:p>
@@ -8095,7 +8095,7 @@
           <a:p>
             <a:fld id="{1C4F9540-4BF6-456B-983F-E69BCBCF3DC2}" type="datetimeFigureOut">
               <a:rPr lang="en-GB" smtClean="0"/>
-              <a:t>11/03/2022</a:t>
+              <a:t>21/03/2022</a:t>
             </a:fld>
             <a:endParaRPr lang="en-GB"/>
           </a:p>
@@ -8352,7 +8352,7 @@
           <a:p>
             <a:fld id="{1C4F9540-4BF6-456B-983F-E69BCBCF3DC2}" type="datetimeFigureOut">
               <a:rPr lang="en-GB" smtClean="0"/>
-              <a:t>11/03/2022</a:t>
+              <a:t>21/03/2022</a:t>
             </a:fld>
             <a:endParaRPr lang="en-GB"/>
           </a:p>
@@ -8565,7 +8565,7 @@
           <a:p>
             <a:fld id="{1C4F9540-4BF6-456B-983F-E69BCBCF3DC2}" type="datetimeFigureOut">
               <a:rPr lang="en-GB" smtClean="0"/>
-              <a:t>11/03/2022</a:t>
+              <a:t>21/03/2022</a:t>
             </a:fld>
             <a:endParaRPr lang="en-GB"/>
           </a:p>
@@ -15118,7 +15118,7 @@
         <p:spPr>
           <a:xfrm>
             <a:off x="768626" y="689113"/>
-            <a:ext cx="5218032" cy="8956298"/>
+            <a:ext cx="5218032" cy="9510296"/>
           </a:xfrm>
           <a:prstGeom prst="rect">
             <a:avLst/>
@@ -15133,7 +15133,13 @@
           <a:p>
             <a:r>
               <a:rPr lang="en-GB" sz="3600" dirty="0"/>
-              <a:t>HTML pages</a:t>
+              <a:t>HTML pages </a:t>
+            </a:r>
+          </a:p>
+          <a:p>
+            <a:r>
+              <a:rPr lang="en-GB" sz="3600" dirty="0"/>
+              <a:t>(highlighted = finished)</a:t>
             </a:r>
           </a:p>
           <a:p>
@@ -15251,7 +15257,11 @@
           </a:p>
           <a:p>
             <a:r>
-              <a:rPr lang="en-GB" sz="3600" dirty="0"/>
+              <a:rPr lang="en-GB" sz="3600" dirty="0">
+                <a:highlight>
+                  <a:srgbClr val="FFFF00"/>
+                </a:highlight>
+              </a:rPr>
               <a:t>Start here questionnaire</a:t>
             </a:r>
           </a:p>
@@ -15322,7 +15332,7 @@
         <p:spPr>
           <a:xfrm>
             <a:off x="768626" y="689113"/>
-            <a:ext cx="5218032" cy="8956298"/>
+            <a:ext cx="5218032" cy="10064294"/>
           </a:xfrm>
           <a:prstGeom prst="rect">
             <a:avLst/>
@@ -15341,6 +15351,15 @@
             </a:r>
           </a:p>
           <a:p>
+            <a:r>
+              <a:rPr lang="en-GB" sz="3600" dirty="0"/>
+              <a:t>(highlighted = finished)</a:t>
+            </a:r>
+          </a:p>
+          <a:p>
+            <a:endParaRPr lang="en-GB" sz="3600" dirty="0"/>
+          </a:p>
+          <a:p>
             <a:endParaRPr lang="en-GB" sz="3600" dirty="0"/>
           </a:p>
           <a:p>
@@ -15455,7 +15474,11 @@
           </a:p>
           <a:p>
             <a:r>
-              <a:rPr lang="en-GB" sz="3600" dirty="0"/>
+              <a:rPr lang="en-GB" sz="3600" dirty="0">
+                <a:highlight>
+                  <a:srgbClr val="FFFF00"/>
+                </a:highlight>
+              </a:rPr>
               <a:t>Start here questionnaire</a:t>
             </a:r>
           </a:p>

</xml_diff>

<commit_message>
Modifications to design for responsiveness and smoothness
</commit_message>
<xml_diff>
--- a/Website Design Tools.pptx
+++ b/Website Design Tools.pptx
@@ -5,7 +5,7 @@
     <p:sldMasterId id="2147483672" r:id="rId1"/>
   </p:sldMasterIdLst>
   <p:notesMasterIdLst>
-    <p:notesMasterId r:id="rId14"/>
+    <p:notesMasterId r:id="rId15"/>
   </p:notesMasterIdLst>
   <p:sldIdLst>
     <p:sldId id="257" r:id="rId2"/>
@@ -20,6 +20,7 @@
     <p:sldId id="266" r:id="rId11"/>
     <p:sldId id="267" r:id="rId12"/>
     <p:sldId id="268" r:id="rId13"/>
+    <p:sldId id="269" r:id="rId14"/>
   </p:sldIdLst>
   <p:sldSz cx="6858000" cy="10799763"/>
   <p:notesSz cx="6858000" cy="9144000"/>
@@ -139,6 +140,7 @@
             <p14:sldId id="266"/>
             <p14:sldId id="267"/>
             <p14:sldId id="268"/>
+            <p14:sldId id="269"/>
           </p14:sldIdLst>
         </p14:section>
       </p14:sectionLst>
@@ -5481,7 +5483,7 @@
           <a:p>
             <a:fld id="{12F15D9C-A007-4C82-A807-6D2013854DF5}" type="datetimeFigureOut">
               <a:rPr lang="en-GB" smtClean="0"/>
-              <a:t>21/03/2022</a:t>
+              <a:t>02/04/2022</a:t>
             </a:fld>
             <a:endParaRPr lang="en-GB"/>
           </a:p>
@@ -6242,7 +6244,7 @@
           <a:p>
             <a:fld id="{1C4F9540-4BF6-456B-983F-E69BCBCF3DC2}" type="datetimeFigureOut">
               <a:rPr lang="en-GB" smtClean="0"/>
-              <a:t>21/03/2022</a:t>
+              <a:t>02/04/2022</a:t>
             </a:fld>
             <a:endParaRPr lang="en-GB"/>
           </a:p>
@@ -6412,7 +6414,7 @@
           <a:p>
             <a:fld id="{1C4F9540-4BF6-456B-983F-E69BCBCF3DC2}" type="datetimeFigureOut">
               <a:rPr lang="en-GB" smtClean="0"/>
-              <a:t>21/03/2022</a:t>
+              <a:t>02/04/2022</a:t>
             </a:fld>
             <a:endParaRPr lang="en-GB"/>
           </a:p>
@@ -6592,7 +6594,7 @@
           <a:p>
             <a:fld id="{1C4F9540-4BF6-456B-983F-E69BCBCF3DC2}" type="datetimeFigureOut">
               <a:rPr lang="en-GB" smtClean="0"/>
-              <a:t>21/03/2022</a:t>
+              <a:t>02/04/2022</a:t>
             </a:fld>
             <a:endParaRPr lang="en-GB"/>
           </a:p>
@@ -6762,7 +6764,7 @@
           <a:p>
             <a:fld id="{1C4F9540-4BF6-456B-983F-E69BCBCF3DC2}" type="datetimeFigureOut">
               <a:rPr lang="en-GB" smtClean="0"/>
-              <a:t>21/03/2022</a:t>
+              <a:t>02/04/2022</a:t>
             </a:fld>
             <a:endParaRPr lang="en-GB"/>
           </a:p>
@@ -7006,7 +7008,7 @@
           <a:p>
             <a:fld id="{1C4F9540-4BF6-456B-983F-E69BCBCF3DC2}" type="datetimeFigureOut">
               <a:rPr lang="en-GB" smtClean="0"/>
-              <a:t>21/03/2022</a:t>
+              <a:t>02/04/2022</a:t>
             </a:fld>
             <a:endParaRPr lang="en-GB"/>
           </a:p>
@@ -7238,7 +7240,7 @@
           <a:p>
             <a:fld id="{1C4F9540-4BF6-456B-983F-E69BCBCF3DC2}" type="datetimeFigureOut">
               <a:rPr lang="en-GB" smtClean="0"/>
-              <a:t>21/03/2022</a:t>
+              <a:t>02/04/2022</a:t>
             </a:fld>
             <a:endParaRPr lang="en-GB"/>
           </a:p>
@@ -7605,7 +7607,7 @@
           <a:p>
             <a:fld id="{1C4F9540-4BF6-456B-983F-E69BCBCF3DC2}" type="datetimeFigureOut">
               <a:rPr lang="en-GB" smtClean="0"/>
-              <a:t>21/03/2022</a:t>
+              <a:t>02/04/2022</a:t>
             </a:fld>
             <a:endParaRPr lang="en-GB"/>
           </a:p>
@@ -7723,7 +7725,7 @@
           <a:p>
             <a:fld id="{1C4F9540-4BF6-456B-983F-E69BCBCF3DC2}" type="datetimeFigureOut">
               <a:rPr lang="en-GB" smtClean="0"/>
-              <a:t>21/03/2022</a:t>
+              <a:t>02/04/2022</a:t>
             </a:fld>
             <a:endParaRPr lang="en-GB"/>
           </a:p>
@@ -7818,7 +7820,7 @@
           <a:p>
             <a:fld id="{1C4F9540-4BF6-456B-983F-E69BCBCF3DC2}" type="datetimeFigureOut">
               <a:rPr lang="en-GB" smtClean="0"/>
-              <a:t>21/03/2022</a:t>
+              <a:t>02/04/2022</a:t>
             </a:fld>
             <a:endParaRPr lang="en-GB"/>
           </a:p>
@@ -8095,7 +8097,7 @@
           <a:p>
             <a:fld id="{1C4F9540-4BF6-456B-983F-E69BCBCF3DC2}" type="datetimeFigureOut">
               <a:rPr lang="en-GB" smtClean="0"/>
-              <a:t>21/03/2022</a:t>
+              <a:t>02/04/2022</a:t>
             </a:fld>
             <a:endParaRPr lang="en-GB"/>
           </a:p>
@@ -8352,7 +8354,7 @@
           <a:p>
             <a:fld id="{1C4F9540-4BF6-456B-983F-E69BCBCF3DC2}" type="datetimeFigureOut">
               <a:rPr lang="en-GB" smtClean="0"/>
-              <a:t>21/03/2022</a:t>
+              <a:t>02/04/2022</a:t>
             </a:fld>
             <a:endParaRPr lang="en-GB"/>
           </a:p>
@@ -8565,7 +8567,7 @@
           <a:p>
             <a:fld id="{1C4F9540-4BF6-456B-983F-E69BCBCF3DC2}" type="datetimeFigureOut">
               <a:rPr lang="en-GB" smtClean="0"/>
-              <a:t>21/03/2022</a:t>
+              <a:t>02/04/2022</a:t>
             </a:fld>
             <a:endParaRPr lang="en-GB"/>
           </a:p>
@@ -15073,10 +15075,2386 @@
           <a:chExt cx="0" cy="0"/>
         </a:xfrm>
       </p:grpSpPr>
+      <p:pic>
+        <p:nvPicPr>
+          <p:cNvPr id="2" name="Picture 1">
+            <a:extLst>
+              <a:ext uri="{FF2B5EF4-FFF2-40B4-BE49-F238E27FC236}">
+                <a16:creationId xmlns:a16="http://schemas.microsoft.com/office/drawing/2014/main" id="{25954844-6FDA-4FB6-AEC3-45E3D631BF0C}"/>
+              </a:ext>
+            </a:extLst>
+          </p:cNvPr>
+          <p:cNvPicPr>
+            <a:picLocks noChangeAspect="1"/>
+          </p:cNvPicPr>
+          <p:nvPr/>
+        </p:nvPicPr>
+        <p:blipFill>
+          <a:blip r:embed="rId2"/>
+          <a:stretch>
+            <a:fillRect/>
+          </a:stretch>
+        </p:blipFill>
+        <p:spPr>
+          <a:xfrm>
+            <a:off x="0" y="-2063"/>
+            <a:ext cx="6858000" cy="799794"/>
+          </a:xfrm>
+          <a:prstGeom prst="rect">
+            <a:avLst/>
+          </a:prstGeom>
+        </p:spPr>
+      </p:pic>
+      <p:sp>
+        <p:nvSpPr>
+          <p:cNvPr id="3" name="Rectangle 2">
+            <a:extLst>
+              <a:ext uri="{FF2B5EF4-FFF2-40B4-BE49-F238E27FC236}">
+                <a16:creationId xmlns:a16="http://schemas.microsoft.com/office/drawing/2014/main" id="{F069EB33-F530-4972-AB7D-008D58309B82}"/>
+              </a:ext>
+            </a:extLst>
+          </p:cNvPr>
+          <p:cNvSpPr/>
+          <p:nvPr/>
+        </p:nvSpPr>
+        <p:spPr>
+          <a:xfrm>
+            <a:off x="0" y="797731"/>
+            <a:ext cx="6858000" cy="1720182"/>
+          </a:xfrm>
+          <a:prstGeom prst="rect">
+            <a:avLst/>
+          </a:prstGeom>
+          <a:solidFill>
+            <a:schemeClr val="bg2">
+              <a:lumMod val="90000"/>
+            </a:schemeClr>
+          </a:solidFill>
+          <a:ln>
+            <a:noFill/>
+          </a:ln>
+        </p:spPr>
+        <p:style>
+          <a:lnRef idx="2">
+            <a:schemeClr val="accent1">
+              <a:shade val="50000"/>
+            </a:schemeClr>
+          </a:lnRef>
+          <a:fillRef idx="1">
+            <a:schemeClr val="accent1"/>
+          </a:fillRef>
+          <a:effectRef idx="0">
+            <a:schemeClr val="accent1"/>
+          </a:effectRef>
+          <a:fontRef idx="minor">
+            <a:schemeClr val="lt1"/>
+          </a:fontRef>
+        </p:style>
+        <p:txBody>
+          <a:bodyPr rtlCol="0" anchor="ctr"/>
+          <a:lstStyle/>
+          <a:p>
+            <a:pPr algn="ctr"/>
+            <a:endParaRPr lang="en-GB" dirty="0"/>
+          </a:p>
+        </p:txBody>
+      </p:sp>
+      <p:sp>
+        <p:nvSpPr>
+          <p:cNvPr id="4" name="TextBox 3">
+            <a:extLst>
+              <a:ext uri="{FF2B5EF4-FFF2-40B4-BE49-F238E27FC236}">
+                <a16:creationId xmlns:a16="http://schemas.microsoft.com/office/drawing/2014/main" id="{5B48F222-8DDB-46AE-B905-9EB6975B3EFD}"/>
+              </a:ext>
+            </a:extLst>
+          </p:cNvPr>
+          <p:cNvSpPr txBox="1"/>
+          <p:nvPr/>
+        </p:nvSpPr>
+        <p:spPr>
+          <a:xfrm>
+            <a:off x="2366502" y="1087875"/>
+            <a:ext cx="4124206" cy="461665"/>
+          </a:xfrm>
+          <a:prstGeom prst="rect">
+            <a:avLst/>
+          </a:prstGeom>
+          <a:noFill/>
+        </p:spPr>
+        <p:txBody>
+          <a:bodyPr wrap="none" rtlCol="0">
+            <a:spAutoFit/>
+          </a:bodyPr>
+          <a:lstStyle/>
+          <a:p>
+            <a:pPr algn="r"/>
+            <a:r>
+              <a:rPr lang="en-GB" sz="2400" dirty="0"/>
+              <a:t>Begin Your Weight Loss Journey</a:t>
+            </a:r>
+          </a:p>
+        </p:txBody>
+      </p:sp>
+      <p:pic>
+        <p:nvPicPr>
+          <p:cNvPr id="5" name="Picture 4">
+            <a:extLst>
+              <a:ext uri="{FF2B5EF4-FFF2-40B4-BE49-F238E27FC236}">
+                <a16:creationId xmlns:a16="http://schemas.microsoft.com/office/drawing/2014/main" id="{A5FFF17F-92B6-45C8-A723-A96DBECF4053}"/>
+              </a:ext>
+            </a:extLst>
+          </p:cNvPr>
+          <p:cNvPicPr>
+            <a:picLocks noChangeAspect="1"/>
+          </p:cNvPicPr>
+          <p:nvPr/>
+        </p:nvPicPr>
+        <p:blipFill>
+          <a:blip r:embed="rId3"/>
+          <a:stretch>
+            <a:fillRect/>
+          </a:stretch>
+        </p:blipFill>
+        <p:spPr>
+          <a:xfrm>
+            <a:off x="0" y="14"/>
+            <a:ext cx="6858000" cy="797912"/>
+          </a:xfrm>
+          <a:prstGeom prst="rect">
+            <a:avLst/>
+          </a:prstGeom>
+        </p:spPr>
+      </p:pic>
+      <p:sp>
+        <p:nvSpPr>
+          <p:cNvPr id="6" name="TextBox 5">
+            <a:extLst>
+              <a:ext uri="{FF2B5EF4-FFF2-40B4-BE49-F238E27FC236}">
+                <a16:creationId xmlns:a16="http://schemas.microsoft.com/office/drawing/2014/main" id="{47B75C23-E8E3-453B-BA81-BEDC4D786B39}"/>
+              </a:ext>
+            </a:extLst>
+          </p:cNvPr>
+          <p:cNvSpPr txBox="1"/>
+          <p:nvPr/>
+        </p:nvSpPr>
+        <p:spPr>
+          <a:xfrm>
+            <a:off x="276376" y="1697245"/>
+            <a:ext cx="3874394" cy="584775"/>
+          </a:xfrm>
+          <a:prstGeom prst="rect">
+            <a:avLst/>
+          </a:prstGeom>
+          <a:noFill/>
+        </p:spPr>
+        <p:txBody>
+          <a:bodyPr wrap="none" rtlCol="0">
+            <a:spAutoFit/>
+          </a:bodyPr>
+          <a:lstStyle/>
+          <a:p>
+            <a:r>
+              <a:rPr lang="en-GB" sz="1600" dirty="0"/>
+              <a:t>The following survey will help us understand</a:t>
+            </a:r>
+          </a:p>
+          <a:p>
+            <a:r>
+              <a:rPr lang="en-GB" sz="1600" dirty="0"/>
+              <a:t>your history regarding bariatric surgery.</a:t>
+            </a:r>
+          </a:p>
+        </p:txBody>
+      </p:sp>
+      <p:sp>
+        <p:nvSpPr>
+          <p:cNvPr id="7" name="Rectangle 6">
+            <a:extLst>
+              <a:ext uri="{FF2B5EF4-FFF2-40B4-BE49-F238E27FC236}">
+                <a16:creationId xmlns:a16="http://schemas.microsoft.com/office/drawing/2014/main" id="{FD4DB36A-6B8D-4205-B04C-B1CDFD9EC147}"/>
+              </a:ext>
+            </a:extLst>
+          </p:cNvPr>
+          <p:cNvSpPr/>
+          <p:nvPr/>
+        </p:nvSpPr>
+        <p:spPr>
+          <a:xfrm>
+            <a:off x="0" y="9588856"/>
+            <a:ext cx="6858000" cy="1194865"/>
+          </a:xfrm>
+          <a:prstGeom prst="rect">
+            <a:avLst/>
+          </a:prstGeom>
+          <a:noFill/>
+          <a:ln w="12700">
+            <a:solidFill>
+              <a:schemeClr val="tx1"/>
+            </a:solidFill>
+          </a:ln>
+        </p:spPr>
+        <p:style>
+          <a:lnRef idx="2">
+            <a:schemeClr val="accent1">
+              <a:shade val="50000"/>
+            </a:schemeClr>
+          </a:lnRef>
+          <a:fillRef idx="1">
+            <a:schemeClr val="accent1"/>
+          </a:fillRef>
+          <a:effectRef idx="0">
+            <a:schemeClr val="accent1"/>
+          </a:effectRef>
+          <a:fontRef idx="minor">
+            <a:schemeClr val="lt1"/>
+          </a:fontRef>
+        </p:style>
+        <p:txBody>
+          <a:bodyPr rtlCol="0" anchor="ctr"/>
+          <a:lstStyle/>
+          <a:p>
+            <a:pPr algn="ctr"/>
+            <a:endParaRPr lang="en-GB"/>
+          </a:p>
+        </p:txBody>
+      </p:sp>
+      <p:sp>
+        <p:nvSpPr>
+          <p:cNvPr id="8" name="TextBox 7">
+            <a:extLst>
+              <a:ext uri="{FF2B5EF4-FFF2-40B4-BE49-F238E27FC236}">
+                <a16:creationId xmlns:a16="http://schemas.microsoft.com/office/drawing/2014/main" id="{DC17F37D-9CBD-4BD4-AD9F-74FCDE2780EE}"/>
+              </a:ext>
+            </a:extLst>
+          </p:cNvPr>
+          <p:cNvSpPr txBox="1"/>
+          <p:nvPr/>
+        </p:nvSpPr>
+        <p:spPr>
+          <a:xfrm>
+            <a:off x="4809987" y="10246716"/>
+            <a:ext cx="1771639" cy="384721"/>
+          </a:xfrm>
+          <a:prstGeom prst="rect">
+            <a:avLst/>
+          </a:prstGeom>
+          <a:noFill/>
+        </p:spPr>
+        <p:txBody>
+          <a:bodyPr wrap="none" rtlCol="0">
+            <a:spAutoFit/>
+          </a:bodyPr>
+          <a:lstStyle/>
+          <a:p>
+            <a:r>
+              <a:rPr lang="en-GB" sz="1100" dirty="0"/>
+              <a:t>Advanced Obesity Surgery</a:t>
+            </a:r>
+          </a:p>
+          <a:p>
+            <a:pPr algn="r"/>
+            <a:r>
+              <a:rPr lang="en-GB" sz="800" dirty="0"/>
+              <a:t>©Copyright 2022. All Rights Reserved.</a:t>
+            </a:r>
+          </a:p>
+        </p:txBody>
+      </p:sp>
+      <p:sp>
+        <p:nvSpPr>
+          <p:cNvPr id="9" name="TextBox 8">
+            <a:extLst>
+              <a:ext uri="{FF2B5EF4-FFF2-40B4-BE49-F238E27FC236}">
+                <a16:creationId xmlns:a16="http://schemas.microsoft.com/office/drawing/2014/main" id="{77676D51-6BA1-41B9-B828-4349A1409791}"/>
+              </a:ext>
+            </a:extLst>
+          </p:cNvPr>
+          <p:cNvSpPr txBox="1"/>
+          <p:nvPr/>
+        </p:nvSpPr>
+        <p:spPr>
+          <a:xfrm>
+            <a:off x="3761623" y="9733421"/>
+            <a:ext cx="2820003" cy="261610"/>
+          </a:xfrm>
+          <a:prstGeom prst="rect">
+            <a:avLst/>
+          </a:prstGeom>
+          <a:noFill/>
+        </p:spPr>
+        <p:txBody>
+          <a:bodyPr wrap="none" rtlCol="0">
+            <a:spAutoFit/>
+          </a:bodyPr>
+          <a:lstStyle/>
+          <a:p>
+            <a:r>
+              <a:rPr lang="en-GB" sz="1100" dirty="0"/>
+              <a:t>Blog        FAQ        Contact us        Privacy Policy</a:t>
+            </a:r>
+          </a:p>
+        </p:txBody>
+      </p:sp>
+      <p:pic>
+        <p:nvPicPr>
+          <p:cNvPr id="10" name="Picture 2" descr="Center for Metabolic and Obesity Surgery">
+            <a:extLst>
+              <a:ext uri="{FF2B5EF4-FFF2-40B4-BE49-F238E27FC236}">
+                <a16:creationId xmlns:a16="http://schemas.microsoft.com/office/drawing/2014/main" id="{899852C0-F26C-42C8-ABEF-9D83EA0021C6}"/>
+              </a:ext>
+            </a:extLst>
+          </p:cNvPr>
+          <p:cNvPicPr>
+            <a:picLocks noChangeAspect="1" noChangeArrowheads="1"/>
+          </p:cNvPicPr>
+          <p:nvPr/>
+        </p:nvPicPr>
+        <p:blipFill>
+          <a:blip r:embed="rId4">
+            <a:extLst>
+              <a:ext uri="{BEBA8EAE-BF5A-486C-A8C5-ECC9F3942E4B}">
+                <a14:imgProps xmlns:a14="http://schemas.microsoft.com/office/drawing/2010/main">
+                  <a14:imgLayer r:embed="rId5">
+                    <a14:imgEffect>
+                      <a14:backgroundRemoval t="8163" b="89796" l="4219" r="95000">
+                        <a14:foregroundMark x1="7969" y1="48163" x2="7969" y2="48163"/>
+                        <a14:foregroundMark x1="4219" y1="62857" x2="4219" y2="62857"/>
+                        <a14:foregroundMark x1="14844" y1="48571" x2="14844" y2="48571"/>
+                        <a14:foregroundMark x1="23594" y1="54286" x2="23594" y2="54286"/>
+                        <a14:foregroundMark x1="30938" y1="54694" x2="30938" y2="54694"/>
+                        <a14:foregroundMark x1="38594" y1="53061" x2="38594" y2="53061"/>
+                        <a14:foregroundMark x1="47031" y1="50612" x2="47031" y2="50612"/>
+                        <a14:foregroundMark x1="64531" y1="50612" x2="64531" y2="50612"/>
+                        <a14:foregroundMark x1="72656" y1="53469" x2="72656" y2="53469"/>
+                        <a14:foregroundMark x1="81094" y1="53061" x2="81094" y2="53061"/>
+                        <a14:foregroundMark x1="85156" y1="54286" x2="85156" y2="54286"/>
+                        <a14:foregroundMark x1="90469" y1="51429" x2="90469" y2="51429"/>
+                        <a14:foregroundMark x1="95000" y1="59184" x2="95000" y2="59184"/>
+                        <a14:foregroundMark x1="68281" y1="30204" x2="68281" y2="30204"/>
+                        <a14:foregroundMark x1="73125" y1="28980" x2="73125" y2="28980"/>
+                        <a14:foregroundMark x1="73125" y1="8163" x2="73125" y2="8163"/>
+                        <a14:foregroundMark x1="67500" y1="13061" x2="67500" y2="13061"/>
+                        <a14:foregroundMark x1="72031" y1="17143" x2="72031" y2="17143"/>
+                        <a14:foregroundMark x1="68438" y1="22041" x2="68438" y2="22041"/>
+                        <a14:foregroundMark x1="69688" y1="17143" x2="69688" y2="17143"/>
+                        <a14:foregroundMark x1="57031" y1="83265" x2="57031" y2="83265"/>
+                        <a14:foregroundMark x1="62187" y1="83673" x2="62187" y2="83673"/>
+                        <a14:foregroundMark x1="66250" y1="79184" x2="66250" y2="79184"/>
+                        <a14:foregroundMark x1="68281" y1="82857" x2="68281" y2="82857"/>
+                        <a14:foregroundMark x1="72969" y1="82041" x2="72969" y2="82041"/>
+                        <a14:foregroundMark x1="77188" y1="84898" x2="77188" y2="84898"/>
+                        <a14:foregroundMark x1="76719" y1="82857" x2="76719" y2="82857"/>
+                        <a14:foregroundMark x1="79219" y1="82857" x2="79219" y2="82857"/>
+                        <a14:foregroundMark x1="84375" y1="81224" x2="84375" y2="81224"/>
+                        <a14:foregroundMark x1="86094" y1="82041" x2="86094" y2="82041"/>
+                        <a14:foregroundMark x1="86094" y1="77143" x2="86094" y2="77143"/>
+                        <a14:foregroundMark x1="87969" y1="83673" x2="87969" y2="83673"/>
+                        <a14:foregroundMark x1="92656" y1="82041" x2="92656" y2="82041"/>
+                        <a14:foregroundMark x1="72813" y1="23673" x2="72813" y2="23673"/>
+                        <a14:foregroundMark x1="71563" y1="20816" x2="71563" y2="20816"/>
+                        <a14:foregroundMark x1="5938" y1="55510" x2="5938" y2="55510"/>
+                        <a14:backgroundMark x1="7969" y1="46531" x2="7969" y2="46531"/>
+                        <a14:backgroundMark x1="32656" y1="51837" x2="32656" y2="51837"/>
+                        <a14:backgroundMark x1="63281" y1="83265" x2="63281" y2="83265"/>
+                        <a14:backgroundMark x1="69375" y1="82857" x2="69375" y2="82857"/>
+                        <a14:backgroundMark x1="73281" y1="84898" x2="73281" y2="84898"/>
+                        <a14:backgroundMark x1="80938" y1="83673" x2="80938" y2="83673"/>
+                        <a14:backgroundMark x1="89375" y1="84898" x2="89375" y2="84898"/>
+                        <a14:backgroundMark x1="69688" y1="22041" x2="69688" y2="22041"/>
+                        <a14:backgroundMark x1="72500" y1="20816" x2="72500" y2="20816"/>
+                        <a14:backgroundMark x1="8125" y1="48163" x2="8125" y2="48163"/>
+                        <a14:backgroundMark x1="7969" y1="48163" x2="7969" y2="48163"/>
+                        <a14:backgroundMark x1="6406" y1="55510" x2="6406" y2="55510"/>
+                        <a14:backgroundMark x1="77344" y1="85714" x2="77344" y2="85714"/>
+                        <a14:backgroundMark x1="73125" y1="82857" x2="73125" y2="82857"/>
+                        <a14:backgroundMark x1="77500" y1="84898" x2="77500" y2="84898"/>
+                      </a14:backgroundRemoval>
+                    </a14:imgEffect>
+                  </a14:imgLayer>
+                </a14:imgProps>
+              </a:ext>
+              <a:ext uri="{28A0092B-C50C-407E-A947-70E740481C1C}">
+                <a14:useLocalDpi xmlns:a14="http://schemas.microsoft.com/office/drawing/2010/main" val="0"/>
+              </a:ext>
+            </a:extLst>
+          </a:blip>
+          <a:srcRect/>
+          <a:stretch>
+            <a:fillRect/>
+          </a:stretch>
+        </p:blipFill>
+        <p:spPr bwMode="auto">
+          <a:xfrm>
+            <a:off x="276376" y="9736561"/>
+            <a:ext cx="1158153" cy="443355"/>
+          </a:xfrm>
+          <a:prstGeom prst="rect">
+            <a:avLst/>
+          </a:prstGeom>
+          <a:noFill/>
+          <a:ln>
+            <a:noFill/>
+          </a:ln>
+          <a:extLst>
+            <a:ext uri="{909E8E84-426E-40DD-AFC4-6F175D3DCCD1}">
+              <a14:hiddenFill xmlns:a14="http://schemas.microsoft.com/office/drawing/2010/main">
+                <a:solidFill>
+                  <a:srgbClr val="FFFFFF"/>
+                </a:solidFill>
+              </a14:hiddenFill>
+            </a:ext>
+          </a:extLst>
+        </p:spPr>
+      </p:pic>
+      <p:sp>
+        <p:nvSpPr>
+          <p:cNvPr id="11" name="TextBox 10">
+            <a:extLst>
+              <a:ext uri="{FF2B5EF4-FFF2-40B4-BE49-F238E27FC236}">
+                <a16:creationId xmlns:a16="http://schemas.microsoft.com/office/drawing/2014/main" id="{6AA3E525-BF21-4D21-9551-A2D3D824EB26}"/>
+              </a:ext>
+            </a:extLst>
+          </p:cNvPr>
+          <p:cNvSpPr txBox="1"/>
+          <p:nvPr/>
+        </p:nvSpPr>
+        <p:spPr>
+          <a:xfrm>
+            <a:off x="208205" y="10169772"/>
+            <a:ext cx="2219850" cy="461665"/>
+          </a:xfrm>
+          <a:prstGeom prst="rect">
+            <a:avLst/>
+          </a:prstGeom>
+          <a:noFill/>
+        </p:spPr>
+        <p:txBody>
+          <a:bodyPr wrap="square">
+            <a:spAutoFit/>
+          </a:bodyPr>
+          <a:lstStyle/>
+          <a:p>
+            <a:r>
+              <a:rPr lang="en-GB" sz="800" dirty="0"/>
+              <a:t>407-303-3820</a:t>
+            </a:r>
+          </a:p>
+          <a:p>
+            <a:r>
+              <a:rPr lang="en-GB" sz="800" dirty="0"/>
+              <a:t>410 Celebration Place, Suite 401</a:t>
+            </a:r>
+          </a:p>
+          <a:p>
+            <a:r>
+              <a:rPr lang="en-GB" sz="800" dirty="0"/>
+              <a:t>Celebration, FL 34747</a:t>
+            </a:r>
+          </a:p>
+        </p:txBody>
+      </p:sp>
+      <p:sp>
+        <p:nvSpPr>
+          <p:cNvPr id="12" name="TextBox 11">
+            <a:extLst>
+              <a:ext uri="{FF2B5EF4-FFF2-40B4-BE49-F238E27FC236}">
+                <a16:creationId xmlns:a16="http://schemas.microsoft.com/office/drawing/2014/main" id="{C0ECED1C-31A3-4CD5-AF7F-C0F2D3C965F8}"/>
+              </a:ext>
+            </a:extLst>
+          </p:cNvPr>
+          <p:cNvSpPr txBox="1"/>
+          <p:nvPr/>
+        </p:nvSpPr>
+        <p:spPr>
+          <a:xfrm>
+            <a:off x="276376" y="2807862"/>
+            <a:ext cx="6214332" cy="1261884"/>
+          </a:xfrm>
+          <a:prstGeom prst="rect">
+            <a:avLst/>
+          </a:prstGeom>
+          <a:noFill/>
+        </p:spPr>
+        <p:txBody>
+          <a:bodyPr wrap="square" rtlCol="0">
+            <a:spAutoFit/>
+          </a:bodyPr>
+          <a:lstStyle/>
+          <a:p>
+            <a:pPr algn="l"/>
+            <a:r>
+              <a:rPr lang="en-GB" sz="1600" b="1" i="0" dirty="0">
+                <a:solidFill>
+                  <a:srgbClr val="000000"/>
+                </a:solidFill>
+                <a:effectLst/>
+              </a:rPr>
+              <a:t>Have you previously had bariatric surgery?</a:t>
+            </a:r>
+          </a:p>
+          <a:p>
+            <a:pPr algn="l"/>
+            <a:endParaRPr lang="en-GB" sz="1200" b="0" i="0" dirty="0">
+              <a:solidFill>
+                <a:srgbClr val="000000"/>
+              </a:solidFill>
+              <a:effectLst/>
+            </a:endParaRPr>
+          </a:p>
+          <a:p>
+            <a:pPr algn="l"/>
+            <a:r>
+              <a:rPr lang="en-GB" sz="1200" b="0" i="0" dirty="0">
+                <a:solidFill>
+                  <a:srgbClr val="000000"/>
+                </a:solidFill>
+                <a:effectLst/>
+              </a:rPr>
+              <a:t>This includes operations from any surgeon, not just Dr. Smith.</a:t>
+            </a:r>
+          </a:p>
+          <a:p>
+            <a:pPr algn="l"/>
+            <a:r>
+              <a:rPr lang="en-GB" sz="1200" dirty="0">
+                <a:solidFill>
+                  <a:srgbClr val="000000"/>
+                </a:solidFill>
+              </a:rPr>
+              <a:t>Choose the option that best suits your experience.</a:t>
+            </a:r>
+            <a:endParaRPr lang="en-GB" sz="1200" b="0" i="0" dirty="0">
+              <a:solidFill>
+                <a:srgbClr val="000000"/>
+              </a:solidFill>
+              <a:effectLst/>
+            </a:endParaRPr>
+          </a:p>
+          <a:p>
+            <a:pPr algn="l"/>
+            <a:br>
+              <a:rPr lang="en-GB" sz="1200" dirty="0"/>
+            </a:br>
+            <a:endParaRPr lang="en-GB" sz="1200" b="0" i="0" dirty="0">
+              <a:solidFill>
+                <a:srgbClr val="000000"/>
+              </a:solidFill>
+              <a:effectLst/>
+            </a:endParaRPr>
+          </a:p>
+        </p:txBody>
+      </p:sp>
+      <p:sp>
+        <p:nvSpPr>
+          <p:cNvPr id="14" name="Rectangle: Diagonal Corners Rounded 13">
+            <a:extLst>
+              <a:ext uri="{FF2B5EF4-FFF2-40B4-BE49-F238E27FC236}">
+                <a16:creationId xmlns:a16="http://schemas.microsoft.com/office/drawing/2014/main" id="{F1163279-351E-4197-BBFC-477577168C47}"/>
+              </a:ext>
+            </a:extLst>
+          </p:cNvPr>
+          <p:cNvSpPr/>
+          <p:nvPr/>
+        </p:nvSpPr>
+        <p:spPr>
+          <a:xfrm flipH="1">
+            <a:off x="365316" y="4018008"/>
+            <a:ext cx="3785453" cy="484949"/>
+          </a:xfrm>
+          <a:prstGeom prst="round2DiagRect">
+            <a:avLst/>
+          </a:prstGeom>
+          <a:solidFill>
+            <a:schemeClr val="tx2">
+              <a:lumMod val="75000"/>
+            </a:schemeClr>
+          </a:solidFill>
+          <a:ln>
+            <a:noFill/>
+          </a:ln>
+        </p:spPr>
+        <p:style>
+          <a:lnRef idx="2">
+            <a:schemeClr val="accent1">
+              <a:shade val="50000"/>
+            </a:schemeClr>
+          </a:lnRef>
+          <a:fillRef idx="1">
+            <a:schemeClr val="accent1"/>
+          </a:fillRef>
+          <a:effectRef idx="0">
+            <a:schemeClr val="accent1"/>
+          </a:effectRef>
+          <a:fontRef idx="minor">
+            <a:schemeClr val="lt1"/>
+          </a:fontRef>
+        </p:style>
+        <p:txBody>
+          <a:bodyPr rtlCol="0" anchor="ctr"/>
+          <a:lstStyle/>
+          <a:p>
+            <a:r>
+              <a:rPr lang="en-GB" dirty="0"/>
+              <a:t>   No, I would like a consultation</a:t>
+            </a:r>
+          </a:p>
+        </p:txBody>
+      </p:sp>
+      <p:sp>
+        <p:nvSpPr>
+          <p:cNvPr id="18" name="Rectangle: Diagonal Corners Rounded 17">
+            <a:extLst>
+              <a:ext uri="{FF2B5EF4-FFF2-40B4-BE49-F238E27FC236}">
+                <a16:creationId xmlns:a16="http://schemas.microsoft.com/office/drawing/2014/main" id="{32A948F8-FEC4-4348-8B34-EF42E3C63530}"/>
+              </a:ext>
+            </a:extLst>
+          </p:cNvPr>
+          <p:cNvSpPr/>
+          <p:nvPr/>
+        </p:nvSpPr>
+        <p:spPr>
+          <a:xfrm flipH="1">
+            <a:off x="365316" y="4647522"/>
+            <a:ext cx="3785453" cy="484949"/>
+          </a:xfrm>
+          <a:prstGeom prst="round2DiagRect">
+            <a:avLst/>
+          </a:prstGeom>
+          <a:solidFill>
+            <a:schemeClr val="bg1">
+              <a:lumMod val="65000"/>
+            </a:schemeClr>
+          </a:solidFill>
+          <a:ln>
+            <a:noFill/>
+          </a:ln>
+        </p:spPr>
+        <p:style>
+          <a:lnRef idx="2">
+            <a:schemeClr val="accent1">
+              <a:shade val="50000"/>
+            </a:schemeClr>
+          </a:lnRef>
+          <a:fillRef idx="1">
+            <a:schemeClr val="accent1"/>
+          </a:fillRef>
+          <a:effectRef idx="0">
+            <a:schemeClr val="accent1"/>
+          </a:effectRef>
+          <a:fontRef idx="minor">
+            <a:schemeClr val="lt1"/>
+          </a:fontRef>
+        </p:style>
+        <p:txBody>
+          <a:bodyPr rtlCol="0" anchor="ctr"/>
+          <a:lstStyle/>
+          <a:p>
+            <a:r>
+              <a:rPr lang="en-GB" dirty="0"/>
+              <a:t>   Yes, and I have some questions</a:t>
+            </a:r>
+          </a:p>
+        </p:txBody>
+      </p:sp>
+      <p:sp>
+        <p:nvSpPr>
+          <p:cNvPr id="20" name="TextBox 19">
+            <a:extLst>
+              <a:ext uri="{FF2B5EF4-FFF2-40B4-BE49-F238E27FC236}">
+                <a16:creationId xmlns:a16="http://schemas.microsoft.com/office/drawing/2014/main" id="{0B2C28C6-A8FB-42D6-AF65-917A42A2CA30}"/>
+              </a:ext>
+            </a:extLst>
+          </p:cNvPr>
+          <p:cNvSpPr txBox="1"/>
+          <p:nvPr/>
+        </p:nvSpPr>
+        <p:spPr>
+          <a:xfrm>
+            <a:off x="4348480" y="4018008"/>
+            <a:ext cx="2142228" cy="3293209"/>
+          </a:xfrm>
+          <a:prstGeom prst="rect">
+            <a:avLst/>
+          </a:prstGeom>
+          <a:noFill/>
+        </p:spPr>
+        <p:txBody>
+          <a:bodyPr wrap="square" rtlCol="0">
+            <a:spAutoFit/>
+          </a:bodyPr>
+          <a:lstStyle/>
+          <a:p>
+            <a:pPr algn="ctr"/>
+            <a:r>
+              <a:rPr lang="en-GB" dirty="0"/>
+              <a:t>1</a:t>
+            </a:r>
+          </a:p>
+          <a:p>
+            <a:pPr algn="ctr"/>
+            <a:r>
+              <a:rPr lang="en-GB" sz="1400" dirty="0"/>
+              <a:t>What is your height?</a:t>
+            </a:r>
+          </a:p>
+          <a:p>
+            <a:pPr algn="ctr"/>
+            <a:r>
+              <a:rPr lang="en-GB" sz="900" dirty="0"/>
+              <a:t>We will use this to calculate your BMI.</a:t>
+            </a:r>
+          </a:p>
+          <a:p>
+            <a:pPr algn="ctr"/>
+            <a:endParaRPr lang="en-GB" sz="900" dirty="0"/>
+          </a:p>
+          <a:p>
+            <a:pPr algn="ctr"/>
+            <a:endParaRPr lang="en-GB" sz="800" dirty="0"/>
+          </a:p>
+          <a:p>
+            <a:pPr algn="ctr"/>
+            <a:endParaRPr lang="en-GB" sz="1400" dirty="0"/>
+          </a:p>
+          <a:p>
+            <a:pPr marL="0" marR="0" lvl="0" indent="0" algn="ctr" defTabSz="457200" rtl="0" eaLnBrk="1" fontAlgn="auto" latinLnBrk="0" hangingPunct="1">
+              <a:lnSpc>
+                <a:spcPct val="100000"/>
+              </a:lnSpc>
+              <a:spcBef>
+                <a:spcPts val="0"/>
+              </a:spcBef>
+              <a:spcAft>
+                <a:spcPts val="0"/>
+              </a:spcAft>
+              <a:buClrTx/>
+              <a:buSzTx/>
+              <a:buFontTx/>
+              <a:buNone/>
+              <a:tabLst/>
+              <a:defRPr/>
+            </a:pPr>
+            <a:r>
+              <a:rPr lang="en-GB" dirty="0">
+                <a:solidFill>
+                  <a:prstClr val="black"/>
+                </a:solidFill>
+                <a:latin typeface="Calibri" panose="020F0502020204030204"/>
+              </a:rPr>
+              <a:t>2</a:t>
+            </a:r>
+            <a:endParaRPr lang="en-GB" sz="1400" dirty="0"/>
+          </a:p>
+          <a:p>
+            <a:pPr algn="ctr"/>
+            <a:r>
+              <a:rPr lang="en-GB" sz="1400" dirty="0"/>
+              <a:t>What is your weight?</a:t>
+            </a:r>
+          </a:p>
+          <a:p>
+            <a:pPr algn="ctr"/>
+            <a:r>
+              <a:rPr lang="en-GB" sz="900" dirty="0"/>
+              <a:t>We will use this to calculate your BMI.</a:t>
+            </a:r>
+          </a:p>
+          <a:p>
+            <a:pPr algn="ctr"/>
+            <a:endParaRPr lang="en-GB" sz="900" dirty="0"/>
+          </a:p>
+          <a:p>
+            <a:pPr algn="ctr"/>
+            <a:endParaRPr lang="en-GB" sz="800" dirty="0"/>
+          </a:p>
+          <a:p>
+            <a:pPr algn="ctr"/>
+            <a:endParaRPr lang="en-GB" sz="1400" dirty="0"/>
+          </a:p>
+          <a:p>
+            <a:pPr marL="0" marR="0" lvl="0" indent="0" algn="ctr" defTabSz="457200" rtl="0" eaLnBrk="1" fontAlgn="auto" latinLnBrk="0" hangingPunct="1">
+              <a:lnSpc>
+                <a:spcPct val="100000"/>
+              </a:lnSpc>
+              <a:spcBef>
+                <a:spcPts val="0"/>
+              </a:spcBef>
+              <a:spcAft>
+                <a:spcPts val="0"/>
+              </a:spcAft>
+              <a:buClrTx/>
+              <a:buSzTx/>
+              <a:buFontTx/>
+              <a:buNone/>
+              <a:tabLst/>
+              <a:defRPr/>
+            </a:pPr>
+            <a:r>
+              <a:rPr lang="en-GB" dirty="0">
+                <a:solidFill>
+                  <a:prstClr val="black"/>
+                </a:solidFill>
+                <a:latin typeface="Calibri" panose="020F0502020204030204"/>
+              </a:rPr>
+              <a:t>3</a:t>
+            </a:r>
+            <a:endParaRPr lang="en-GB" sz="1400" dirty="0"/>
+          </a:p>
+          <a:p>
+            <a:pPr algn="ctr"/>
+            <a:r>
+              <a:rPr lang="en-GB" sz="1400" b="0" i="0" dirty="0">
+                <a:solidFill>
+                  <a:srgbClr val="000000"/>
+                </a:solidFill>
+                <a:effectLst/>
+              </a:rPr>
+              <a:t>Do you have any obesity-related medical problems?</a:t>
+            </a:r>
+          </a:p>
+          <a:p>
+            <a:pPr algn="ctr"/>
+            <a:r>
+              <a:rPr lang="en-GB" sz="900" dirty="0">
+                <a:solidFill>
+                  <a:srgbClr val="000000"/>
+                </a:solidFill>
+              </a:rPr>
+              <a:t>(</a:t>
+            </a:r>
+            <a:r>
+              <a:rPr lang="en-GB" sz="900" b="0" i="0" dirty="0">
+                <a:solidFill>
+                  <a:srgbClr val="000000"/>
+                </a:solidFill>
+                <a:effectLst/>
+              </a:rPr>
+              <a:t>diabetes, high blood pressure, sleep </a:t>
+            </a:r>
+            <a:r>
+              <a:rPr lang="en-GB" sz="900" b="0" i="0" dirty="0" err="1">
+                <a:solidFill>
+                  <a:srgbClr val="000000"/>
+                </a:solidFill>
+                <a:effectLst/>
+              </a:rPr>
+              <a:t>apnea</a:t>
+            </a:r>
+            <a:r>
+              <a:rPr lang="en-GB" sz="900" b="0" i="0" dirty="0">
+                <a:solidFill>
+                  <a:srgbClr val="000000"/>
+                </a:solidFill>
+                <a:effectLst/>
+              </a:rPr>
+              <a:t>, disabling osteoarthritis, etc)</a:t>
+            </a:r>
+            <a:endParaRPr lang="en-GB" sz="900" dirty="0"/>
+          </a:p>
+        </p:txBody>
+      </p:sp>
+      <p:sp>
+        <p:nvSpPr>
+          <p:cNvPr id="21" name="Rectangle 20">
+            <a:extLst>
+              <a:ext uri="{FF2B5EF4-FFF2-40B4-BE49-F238E27FC236}">
+                <a16:creationId xmlns:a16="http://schemas.microsoft.com/office/drawing/2014/main" id="{3E1D8345-BDEE-4321-A90B-4961136133D9}"/>
+              </a:ext>
+            </a:extLst>
+          </p:cNvPr>
+          <p:cNvSpPr/>
+          <p:nvPr/>
+        </p:nvSpPr>
+        <p:spPr>
+          <a:xfrm>
+            <a:off x="4901434" y="4744720"/>
+            <a:ext cx="1036320" cy="233680"/>
+          </a:xfrm>
+          <a:prstGeom prst="rect">
+            <a:avLst/>
+          </a:prstGeom>
+          <a:solidFill>
+            <a:schemeClr val="bg2"/>
+          </a:solidFill>
+          <a:ln>
+            <a:solidFill>
+              <a:schemeClr val="bg1"/>
+            </a:solidFill>
+          </a:ln>
+        </p:spPr>
+        <p:style>
+          <a:lnRef idx="2">
+            <a:schemeClr val="accent1">
+              <a:shade val="50000"/>
+            </a:schemeClr>
+          </a:lnRef>
+          <a:fillRef idx="1">
+            <a:schemeClr val="accent1"/>
+          </a:fillRef>
+          <a:effectRef idx="0">
+            <a:schemeClr val="accent1"/>
+          </a:effectRef>
+          <a:fontRef idx="minor">
+            <a:schemeClr val="lt1"/>
+          </a:fontRef>
+        </p:style>
+        <p:txBody>
+          <a:bodyPr rtlCol="0" anchor="ctr"/>
+          <a:lstStyle/>
+          <a:p>
+            <a:pPr algn="ctr"/>
+            <a:endParaRPr lang="en-GB"/>
+          </a:p>
+        </p:txBody>
+      </p:sp>
+      <p:sp>
+        <p:nvSpPr>
+          <p:cNvPr id="24" name="Rectangle 23">
+            <a:extLst>
+              <a:ext uri="{FF2B5EF4-FFF2-40B4-BE49-F238E27FC236}">
+                <a16:creationId xmlns:a16="http://schemas.microsoft.com/office/drawing/2014/main" id="{8F945448-5FDD-418A-A247-C15A011BD368}"/>
+              </a:ext>
+            </a:extLst>
+          </p:cNvPr>
+          <p:cNvSpPr/>
+          <p:nvPr/>
+        </p:nvSpPr>
+        <p:spPr>
+          <a:xfrm>
+            <a:off x="4901434" y="7305281"/>
+            <a:ext cx="1036320" cy="233680"/>
+          </a:xfrm>
+          <a:prstGeom prst="rect">
+            <a:avLst/>
+          </a:prstGeom>
+          <a:solidFill>
+            <a:schemeClr val="bg2"/>
+          </a:solidFill>
+          <a:ln>
+            <a:solidFill>
+              <a:schemeClr val="bg1"/>
+            </a:solidFill>
+          </a:ln>
+        </p:spPr>
+        <p:style>
+          <a:lnRef idx="2">
+            <a:schemeClr val="accent1">
+              <a:shade val="50000"/>
+            </a:schemeClr>
+          </a:lnRef>
+          <a:fillRef idx="1">
+            <a:schemeClr val="accent1"/>
+          </a:fillRef>
+          <a:effectRef idx="0">
+            <a:schemeClr val="accent1"/>
+          </a:effectRef>
+          <a:fontRef idx="minor">
+            <a:schemeClr val="lt1"/>
+          </a:fontRef>
+        </p:style>
+        <p:txBody>
+          <a:bodyPr rtlCol="0" anchor="ctr"/>
+          <a:lstStyle/>
+          <a:p>
+            <a:pPr algn="ctr"/>
+            <a:endParaRPr lang="en-GB"/>
+          </a:p>
+        </p:txBody>
+      </p:sp>
+      <p:sp>
+        <p:nvSpPr>
+          <p:cNvPr id="25" name="Rectangle 24">
+            <a:extLst>
+              <a:ext uri="{FF2B5EF4-FFF2-40B4-BE49-F238E27FC236}">
+                <a16:creationId xmlns:a16="http://schemas.microsoft.com/office/drawing/2014/main" id="{16D18550-24A7-48AB-8BEC-44AC295BE937}"/>
+              </a:ext>
+            </a:extLst>
+          </p:cNvPr>
+          <p:cNvSpPr/>
+          <p:nvPr/>
+        </p:nvSpPr>
+        <p:spPr>
+          <a:xfrm>
+            <a:off x="4901434" y="5834928"/>
+            <a:ext cx="1036320" cy="233680"/>
+          </a:xfrm>
+          <a:prstGeom prst="rect">
+            <a:avLst/>
+          </a:prstGeom>
+          <a:solidFill>
+            <a:schemeClr val="bg2"/>
+          </a:solidFill>
+          <a:ln>
+            <a:solidFill>
+              <a:schemeClr val="bg1"/>
+            </a:solidFill>
+          </a:ln>
+        </p:spPr>
+        <p:style>
+          <a:lnRef idx="2">
+            <a:schemeClr val="accent1">
+              <a:shade val="50000"/>
+            </a:schemeClr>
+          </a:lnRef>
+          <a:fillRef idx="1">
+            <a:schemeClr val="accent1"/>
+          </a:fillRef>
+          <a:effectRef idx="0">
+            <a:schemeClr val="accent1"/>
+          </a:effectRef>
+          <a:fontRef idx="minor">
+            <a:schemeClr val="lt1"/>
+          </a:fontRef>
+        </p:style>
+        <p:txBody>
+          <a:bodyPr rtlCol="0" anchor="ctr"/>
+          <a:lstStyle/>
+          <a:p>
+            <a:pPr algn="ctr"/>
+            <a:endParaRPr lang="en-GB"/>
+          </a:p>
+        </p:txBody>
+      </p:sp>
     </p:spTree>
     <p:extLst>
       <p:ext uri="{BB962C8B-B14F-4D97-AF65-F5344CB8AC3E}">
         <p14:creationId xmlns:p14="http://schemas.microsoft.com/office/powerpoint/2010/main" val="811808872"/>
+      </p:ext>
+    </p:extLst>
+  </p:cSld>
+  <p:clrMapOvr>
+    <a:masterClrMapping/>
+  </p:clrMapOvr>
+</p:sld>
+</file>
+
+<file path=ppt/slides/slide13.xml><?xml version="1.0" encoding="utf-8"?>
+<p:sld xmlns:a="http://schemas.openxmlformats.org/drawingml/2006/main" xmlns:r="http://schemas.openxmlformats.org/officeDocument/2006/relationships" xmlns:p="http://schemas.openxmlformats.org/presentationml/2006/main">
+  <p:cSld>
+    <p:spTree>
+      <p:nvGrpSpPr>
+        <p:cNvPr id="1" name=""/>
+        <p:cNvGrpSpPr/>
+        <p:nvPr/>
+      </p:nvGrpSpPr>
+      <p:grpSpPr>
+        <a:xfrm>
+          <a:off x="0" y="0"/>
+          <a:ext cx="0" cy="0"/>
+          <a:chOff x="0" y="0"/>
+          <a:chExt cx="0" cy="0"/>
+        </a:xfrm>
+      </p:grpSpPr>
+      <p:pic>
+        <p:nvPicPr>
+          <p:cNvPr id="2" name="Picture 1">
+            <a:extLst>
+              <a:ext uri="{FF2B5EF4-FFF2-40B4-BE49-F238E27FC236}">
+                <a16:creationId xmlns:a16="http://schemas.microsoft.com/office/drawing/2014/main" id="{25954844-6FDA-4FB6-AEC3-45E3D631BF0C}"/>
+              </a:ext>
+            </a:extLst>
+          </p:cNvPr>
+          <p:cNvPicPr>
+            <a:picLocks noChangeAspect="1"/>
+          </p:cNvPicPr>
+          <p:nvPr/>
+        </p:nvPicPr>
+        <p:blipFill>
+          <a:blip r:embed="rId2"/>
+          <a:stretch>
+            <a:fillRect/>
+          </a:stretch>
+        </p:blipFill>
+        <p:spPr>
+          <a:xfrm>
+            <a:off x="0" y="-2063"/>
+            <a:ext cx="6858000" cy="799794"/>
+          </a:xfrm>
+          <a:prstGeom prst="rect">
+            <a:avLst/>
+          </a:prstGeom>
+        </p:spPr>
+      </p:pic>
+      <p:sp>
+        <p:nvSpPr>
+          <p:cNvPr id="3" name="Rectangle 2">
+            <a:extLst>
+              <a:ext uri="{FF2B5EF4-FFF2-40B4-BE49-F238E27FC236}">
+                <a16:creationId xmlns:a16="http://schemas.microsoft.com/office/drawing/2014/main" id="{F069EB33-F530-4972-AB7D-008D58309B82}"/>
+              </a:ext>
+            </a:extLst>
+          </p:cNvPr>
+          <p:cNvSpPr/>
+          <p:nvPr/>
+        </p:nvSpPr>
+        <p:spPr>
+          <a:xfrm>
+            <a:off x="0" y="797731"/>
+            <a:ext cx="6858000" cy="1720182"/>
+          </a:xfrm>
+          <a:prstGeom prst="rect">
+            <a:avLst/>
+          </a:prstGeom>
+          <a:solidFill>
+            <a:schemeClr val="bg2">
+              <a:lumMod val="90000"/>
+            </a:schemeClr>
+          </a:solidFill>
+          <a:ln>
+            <a:noFill/>
+          </a:ln>
+        </p:spPr>
+        <p:style>
+          <a:lnRef idx="2">
+            <a:schemeClr val="accent1">
+              <a:shade val="50000"/>
+            </a:schemeClr>
+          </a:lnRef>
+          <a:fillRef idx="1">
+            <a:schemeClr val="accent1"/>
+          </a:fillRef>
+          <a:effectRef idx="0">
+            <a:schemeClr val="accent1"/>
+          </a:effectRef>
+          <a:fontRef idx="minor">
+            <a:schemeClr val="lt1"/>
+          </a:fontRef>
+        </p:style>
+        <p:txBody>
+          <a:bodyPr rtlCol="0" anchor="ctr"/>
+          <a:lstStyle/>
+          <a:p>
+            <a:pPr algn="ctr"/>
+            <a:endParaRPr lang="en-GB" dirty="0"/>
+          </a:p>
+        </p:txBody>
+      </p:sp>
+      <p:sp>
+        <p:nvSpPr>
+          <p:cNvPr id="4" name="TextBox 3">
+            <a:extLst>
+              <a:ext uri="{FF2B5EF4-FFF2-40B4-BE49-F238E27FC236}">
+                <a16:creationId xmlns:a16="http://schemas.microsoft.com/office/drawing/2014/main" id="{5B48F222-8DDB-46AE-B905-9EB6975B3EFD}"/>
+              </a:ext>
+            </a:extLst>
+          </p:cNvPr>
+          <p:cNvSpPr txBox="1"/>
+          <p:nvPr/>
+        </p:nvSpPr>
+        <p:spPr>
+          <a:xfrm>
+            <a:off x="2366502" y="1087875"/>
+            <a:ext cx="4124206" cy="461665"/>
+          </a:xfrm>
+          <a:prstGeom prst="rect">
+            <a:avLst/>
+          </a:prstGeom>
+          <a:noFill/>
+        </p:spPr>
+        <p:txBody>
+          <a:bodyPr wrap="none" rtlCol="0">
+            <a:spAutoFit/>
+          </a:bodyPr>
+          <a:lstStyle/>
+          <a:p>
+            <a:pPr algn="r"/>
+            <a:r>
+              <a:rPr lang="en-GB" sz="2400" dirty="0"/>
+              <a:t>Begin Your Weight Loss Journey</a:t>
+            </a:r>
+          </a:p>
+        </p:txBody>
+      </p:sp>
+      <p:pic>
+        <p:nvPicPr>
+          <p:cNvPr id="5" name="Picture 4">
+            <a:extLst>
+              <a:ext uri="{FF2B5EF4-FFF2-40B4-BE49-F238E27FC236}">
+                <a16:creationId xmlns:a16="http://schemas.microsoft.com/office/drawing/2014/main" id="{A5FFF17F-92B6-45C8-A723-A96DBECF4053}"/>
+              </a:ext>
+            </a:extLst>
+          </p:cNvPr>
+          <p:cNvPicPr>
+            <a:picLocks noChangeAspect="1"/>
+          </p:cNvPicPr>
+          <p:nvPr/>
+        </p:nvPicPr>
+        <p:blipFill>
+          <a:blip r:embed="rId3"/>
+          <a:stretch>
+            <a:fillRect/>
+          </a:stretch>
+        </p:blipFill>
+        <p:spPr>
+          <a:xfrm>
+            <a:off x="0" y="14"/>
+            <a:ext cx="6858000" cy="797912"/>
+          </a:xfrm>
+          <a:prstGeom prst="rect">
+            <a:avLst/>
+          </a:prstGeom>
+        </p:spPr>
+      </p:pic>
+      <p:sp>
+        <p:nvSpPr>
+          <p:cNvPr id="6" name="TextBox 5">
+            <a:extLst>
+              <a:ext uri="{FF2B5EF4-FFF2-40B4-BE49-F238E27FC236}">
+                <a16:creationId xmlns:a16="http://schemas.microsoft.com/office/drawing/2014/main" id="{47B75C23-E8E3-453B-BA81-BEDC4D786B39}"/>
+              </a:ext>
+            </a:extLst>
+          </p:cNvPr>
+          <p:cNvSpPr txBox="1"/>
+          <p:nvPr/>
+        </p:nvSpPr>
+        <p:spPr>
+          <a:xfrm>
+            <a:off x="276376" y="1697245"/>
+            <a:ext cx="3874394" cy="584775"/>
+          </a:xfrm>
+          <a:prstGeom prst="rect">
+            <a:avLst/>
+          </a:prstGeom>
+          <a:noFill/>
+        </p:spPr>
+        <p:txBody>
+          <a:bodyPr wrap="none" rtlCol="0">
+            <a:spAutoFit/>
+          </a:bodyPr>
+          <a:lstStyle/>
+          <a:p>
+            <a:r>
+              <a:rPr lang="en-GB" sz="1600" dirty="0"/>
+              <a:t>The following survey will help us understand</a:t>
+            </a:r>
+          </a:p>
+          <a:p>
+            <a:r>
+              <a:rPr lang="en-GB" sz="1600" dirty="0"/>
+              <a:t>your history regarding bariatric surgery.</a:t>
+            </a:r>
+          </a:p>
+        </p:txBody>
+      </p:sp>
+      <p:sp>
+        <p:nvSpPr>
+          <p:cNvPr id="7" name="Rectangle 6">
+            <a:extLst>
+              <a:ext uri="{FF2B5EF4-FFF2-40B4-BE49-F238E27FC236}">
+                <a16:creationId xmlns:a16="http://schemas.microsoft.com/office/drawing/2014/main" id="{FD4DB36A-6B8D-4205-B04C-B1CDFD9EC147}"/>
+              </a:ext>
+            </a:extLst>
+          </p:cNvPr>
+          <p:cNvSpPr/>
+          <p:nvPr/>
+        </p:nvSpPr>
+        <p:spPr>
+          <a:xfrm>
+            <a:off x="0" y="9588856"/>
+            <a:ext cx="6858000" cy="1194865"/>
+          </a:xfrm>
+          <a:prstGeom prst="rect">
+            <a:avLst/>
+          </a:prstGeom>
+          <a:noFill/>
+          <a:ln w="12700">
+            <a:solidFill>
+              <a:schemeClr val="tx1"/>
+            </a:solidFill>
+          </a:ln>
+        </p:spPr>
+        <p:style>
+          <a:lnRef idx="2">
+            <a:schemeClr val="accent1">
+              <a:shade val="50000"/>
+            </a:schemeClr>
+          </a:lnRef>
+          <a:fillRef idx="1">
+            <a:schemeClr val="accent1"/>
+          </a:fillRef>
+          <a:effectRef idx="0">
+            <a:schemeClr val="accent1"/>
+          </a:effectRef>
+          <a:fontRef idx="minor">
+            <a:schemeClr val="lt1"/>
+          </a:fontRef>
+        </p:style>
+        <p:txBody>
+          <a:bodyPr rtlCol="0" anchor="ctr"/>
+          <a:lstStyle/>
+          <a:p>
+            <a:pPr algn="ctr"/>
+            <a:endParaRPr lang="en-GB"/>
+          </a:p>
+        </p:txBody>
+      </p:sp>
+      <p:sp>
+        <p:nvSpPr>
+          <p:cNvPr id="8" name="TextBox 7">
+            <a:extLst>
+              <a:ext uri="{FF2B5EF4-FFF2-40B4-BE49-F238E27FC236}">
+                <a16:creationId xmlns:a16="http://schemas.microsoft.com/office/drawing/2014/main" id="{DC17F37D-9CBD-4BD4-AD9F-74FCDE2780EE}"/>
+              </a:ext>
+            </a:extLst>
+          </p:cNvPr>
+          <p:cNvSpPr txBox="1"/>
+          <p:nvPr/>
+        </p:nvSpPr>
+        <p:spPr>
+          <a:xfrm>
+            <a:off x="4809987" y="10246716"/>
+            <a:ext cx="1771639" cy="384721"/>
+          </a:xfrm>
+          <a:prstGeom prst="rect">
+            <a:avLst/>
+          </a:prstGeom>
+          <a:noFill/>
+        </p:spPr>
+        <p:txBody>
+          <a:bodyPr wrap="none" rtlCol="0">
+            <a:spAutoFit/>
+          </a:bodyPr>
+          <a:lstStyle/>
+          <a:p>
+            <a:r>
+              <a:rPr lang="en-GB" sz="1100" dirty="0"/>
+              <a:t>Advanced Obesity Surgery</a:t>
+            </a:r>
+          </a:p>
+          <a:p>
+            <a:pPr algn="r"/>
+            <a:r>
+              <a:rPr lang="en-GB" sz="800" dirty="0"/>
+              <a:t>©Copyright 2022. All Rights Reserved.</a:t>
+            </a:r>
+          </a:p>
+        </p:txBody>
+      </p:sp>
+      <p:sp>
+        <p:nvSpPr>
+          <p:cNvPr id="9" name="TextBox 8">
+            <a:extLst>
+              <a:ext uri="{FF2B5EF4-FFF2-40B4-BE49-F238E27FC236}">
+                <a16:creationId xmlns:a16="http://schemas.microsoft.com/office/drawing/2014/main" id="{77676D51-6BA1-41B9-B828-4349A1409791}"/>
+              </a:ext>
+            </a:extLst>
+          </p:cNvPr>
+          <p:cNvSpPr txBox="1"/>
+          <p:nvPr/>
+        </p:nvSpPr>
+        <p:spPr>
+          <a:xfrm>
+            <a:off x="3761623" y="9733421"/>
+            <a:ext cx="2820003" cy="261610"/>
+          </a:xfrm>
+          <a:prstGeom prst="rect">
+            <a:avLst/>
+          </a:prstGeom>
+          <a:noFill/>
+        </p:spPr>
+        <p:txBody>
+          <a:bodyPr wrap="none" rtlCol="0">
+            <a:spAutoFit/>
+          </a:bodyPr>
+          <a:lstStyle/>
+          <a:p>
+            <a:r>
+              <a:rPr lang="en-GB" sz="1100" dirty="0"/>
+              <a:t>Blog        FAQ        Contact us        Privacy Policy</a:t>
+            </a:r>
+          </a:p>
+        </p:txBody>
+      </p:sp>
+      <p:pic>
+        <p:nvPicPr>
+          <p:cNvPr id="10" name="Picture 2" descr="Center for Metabolic and Obesity Surgery">
+            <a:extLst>
+              <a:ext uri="{FF2B5EF4-FFF2-40B4-BE49-F238E27FC236}">
+                <a16:creationId xmlns:a16="http://schemas.microsoft.com/office/drawing/2014/main" id="{899852C0-F26C-42C8-ABEF-9D83EA0021C6}"/>
+              </a:ext>
+            </a:extLst>
+          </p:cNvPr>
+          <p:cNvPicPr>
+            <a:picLocks noChangeAspect="1" noChangeArrowheads="1"/>
+          </p:cNvPicPr>
+          <p:nvPr/>
+        </p:nvPicPr>
+        <p:blipFill>
+          <a:blip r:embed="rId4">
+            <a:extLst>
+              <a:ext uri="{BEBA8EAE-BF5A-486C-A8C5-ECC9F3942E4B}">
+                <a14:imgProps xmlns:a14="http://schemas.microsoft.com/office/drawing/2010/main">
+                  <a14:imgLayer r:embed="rId5">
+                    <a14:imgEffect>
+                      <a14:backgroundRemoval t="8163" b="89796" l="4219" r="95000">
+                        <a14:foregroundMark x1="7969" y1="48163" x2="7969" y2="48163"/>
+                        <a14:foregroundMark x1="4219" y1="62857" x2="4219" y2="62857"/>
+                        <a14:foregroundMark x1="14844" y1="48571" x2="14844" y2="48571"/>
+                        <a14:foregroundMark x1="23594" y1="54286" x2="23594" y2="54286"/>
+                        <a14:foregroundMark x1="30938" y1="54694" x2="30938" y2="54694"/>
+                        <a14:foregroundMark x1="38594" y1="53061" x2="38594" y2="53061"/>
+                        <a14:foregroundMark x1="47031" y1="50612" x2="47031" y2="50612"/>
+                        <a14:foregroundMark x1="64531" y1="50612" x2="64531" y2="50612"/>
+                        <a14:foregroundMark x1="72656" y1="53469" x2="72656" y2="53469"/>
+                        <a14:foregroundMark x1="81094" y1="53061" x2="81094" y2="53061"/>
+                        <a14:foregroundMark x1="85156" y1="54286" x2="85156" y2="54286"/>
+                        <a14:foregroundMark x1="90469" y1="51429" x2="90469" y2="51429"/>
+                        <a14:foregroundMark x1="95000" y1="59184" x2="95000" y2="59184"/>
+                        <a14:foregroundMark x1="68281" y1="30204" x2="68281" y2="30204"/>
+                        <a14:foregroundMark x1="73125" y1="28980" x2="73125" y2="28980"/>
+                        <a14:foregroundMark x1="73125" y1="8163" x2="73125" y2="8163"/>
+                        <a14:foregroundMark x1="67500" y1="13061" x2="67500" y2="13061"/>
+                        <a14:foregroundMark x1="72031" y1="17143" x2="72031" y2="17143"/>
+                        <a14:foregroundMark x1="68438" y1="22041" x2="68438" y2="22041"/>
+                        <a14:foregroundMark x1="69688" y1="17143" x2="69688" y2="17143"/>
+                        <a14:foregroundMark x1="57031" y1="83265" x2="57031" y2="83265"/>
+                        <a14:foregroundMark x1="62187" y1="83673" x2="62187" y2="83673"/>
+                        <a14:foregroundMark x1="66250" y1="79184" x2="66250" y2="79184"/>
+                        <a14:foregroundMark x1="68281" y1="82857" x2="68281" y2="82857"/>
+                        <a14:foregroundMark x1="72969" y1="82041" x2="72969" y2="82041"/>
+                        <a14:foregroundMark x1="77188" y1="84898" x2="77188" y2="84898"/>
+                        <a14:foregroundMark x1="76719" y1="82857" x2="76719" y2="82857"/>
+                        <a14:foregroundMark x1="79219" y1="82857" x2="79219" y2="82857"/>
+                        <a14:foregroundMark x1="84375" y1="81224" x2="84375" y2="81224"/>
+                        <a14:foregroundMark x1="86094" y1="82041" x2="86094" y2="82041"/>
+                        <a14:foregroundMark x1="86094" y1="77143" x2="86094" y2="77143"/>
+                        <a14:foregroundMark x1="87969" y1="83673" x2="87969" y2="83673"/>
+                        <a14:foregroundMark x1="92656" y1="82041" x2="92656" y2="82041"/>
+                        <a14:foregroundMark x1="72813" y1="23673" x2="72813" y2="23673"/>
+                        <a14:foregroundMark x1="71563" y1="20816" x2="71563" y2="20816"/>
+                        <a14:foregroundMark x1="5938" y1="55510" x2="5938" y2="55510"/>
+                        <a14:backgroundMark x1="7969" y1="46531" x2="7969" y2="46531"/>
+                        <a14:backgroundMark x1="32656" y1="51837" x2="32656" y2="51837"/>
+                        <a14:backgroundMark x1="63281" y1="83265" x2="63281" y2="83265"/>
+                        <a14:backgroundMark x1="69375" y1="82857" x2="69375" y2="82857"/>
+                        <a14:backgroundMark x1="73281" y1="84898" x2="73281" y2="84898"/>
+                        <a14:backgroundMark x1="80938" y1="83673" x2="80938" y2="83673"/>
+                        <a14:backgroundMark x1="89375" y1="84898" x2="89375" y2="84898"/>
+                        <a14:backgroundMark x1="69688" y1="22041" x2="69688" y2="22041"/>
+                        <a14:backgroundMark x1="72500" y1="20816" x2="72500" y2="20816"/>
+                        <a14:backgroundMark x1="8125" y1="48163" x2="8125" y2="48163"/>
+                        <a14:backgroundMark x1="7969" y1="48163" x2="7969" y2="48163"/>
+                        <a14:backgroundMark x1="6406" y1="55510" x2="6406" y2="55510"/>
+                        <a14:backgroundMark x1="77344" y1="85714" x2="77344" y2="85714"/>
+                        <a14:backgroundMark x1="73125" y1="82857" x2="73125" y2="82857"/>
+                        <a14:backgroundMark x1="77500" y1="84898" x2="77500" y2="84898"/>
+                      </a14:backgroundRemoval>
+                    </a14:imgEffect>
+                  </a14:imgLayer>
+                </a14:imgProps>
+              </a:ext>
+              <a:ext uri="{28A0092B-C50C-407E-A947-70E740481C1C}">
+                <a14:useLocalDpi xmlns:a14="http://schemas.microsoft.com/office/drawing/2010/main" val="0"/>
+              </a:ext>
+            </a:extLst>
+          </a:blip>
+          <a:srcRect/>
+          <a:stretch>
+            <a:fillRect/>
+          </a:stretch>
+        </p:blipFill>
+        <p:spPr bwMode="auto">
+          <a:xfrm>
+            <a:off x="276376" y="9736561"/>
+            <a:ext cx="1158153" cy="443355"/>
+          </a:xfrm>
+          <a:prstGeom prst="rect">
+            <a:avLst/>
+          </a:prstGeom>
+          <a:noFill/>
+          <a:ln>
+            <a:noFill/>
+          </a:ln>
+          <a:extLst>
+            <a:ext uri="{909E8E84-426E-40DD-AFC4-6F175D3DCCD1}">
+              <a14:hiddenFill xmlns:a14="http://schemas.microsoft.com/office/drawing/2010/main">
+                <a:solidFill>
+                  <a:srgbClr val="FFFFFF"/>
+                </a:solidFill>
+              </a14:hiddenFill>
+            </a:ext>
+          </a:extLst>
+        </p:spPr>
+      </p:pic>
+      <p:sp>
+        <p:nvSpPr>
+          <p:cNvPr id="11" name="TextBox 10">
+            <a:extLst>
+              <a:ext uri="{FF2B5EF4-FFF2-40B4-BE49-F238E27FC236}">
+                <a16:creationId xmlns:a16="http://schemas.microsoft.com/office/drawing/2014/main" id="{6AA3E525-BF21-4D21-9551-A2D3D824EB26}"/>
+              </a:ext>
+            </a:extLst>
+          </p:cNvPr>
+          <p:cNvSpPr txBox="1"/>
+          <p:nvPr/>
+        </p:nvSpPr>
+        <p:spPr>
+          <a:xfrm>
+            <a:off x="208205" y="10169772"/>
+            <a:ext cx="2219850" cy="461665"/>
+          </a:xfrm>
+          <a:prstGeom prst="rect">
+            <a:avLst/>
+          </a:prstGeom>
+          <a:noFill/>
+        </p:spPr>
+        <p:txBody>
+          <a:bodyPr wrap="square">
+            <a:spAutoFit/>
+          </a:bodyPr>
+          <a:lstStyle/>
+          <a:p>
+            <a:r>
+              <a:rPr lang="en-GB" sz="800" dirty="0"/>
+              <a:t>407-303-3820</a:t>
+            </a:r>
+          </a:p>
+          <a:p>
+            <a:r>
+              <a:rPr lang="en-GB" sz="800" dirty="0"/>
+              <a:t>410 Celebration Place, Suite 401</a:t>
+            </a:r>
+          </a:p>
+          <a:p>
+            <a:r>
+              <a:rPr lang="en-GB" sz="800" dirty="0"/>
+              <a:t>Celebration, FL 34747</a:t>
+            </a:r>
+          </a:p>
+        </p:txBody>
+      </p:sp>
+      <p:sp>
+        <p:nvSpPr>
+          <p:cNvPr id="12" name="TextBox 11">
+            <a:extLst>
+              <a:ext uri="{FF2B5EF4-FFF2-40B4-BE49-F238E27FC236}">
+                <a16:creationId xmlns:a16="http://schemas.microsoft.com/office/drawing/2014/main" id="{C0ECED1C-31A3-4CD5-AF7F-C0F2D3C965F8}"/>
+              </a:ext>
+            </a:extLst>
+          </p:cNvPr>
+          <p:cNvSpPr txBox="1"/>
+          <p:nvPr/>
+        </p:nvSpPr>
+        <p:spPr>
+          <a:xfrm>
+            <a:off x="276376" y="2807862"/>
+            <a:ext cx="6214332" cy="1261884"/>
+          </a:xfrm>
+          <a:prstGeom prst="rect">
+            <a:avLst/>
+          </a:prstGeom>
+          <a:noFill/>
+        </p:spPr>
+        <p:txBody>
+          <a:bodyPr wrap="square" rtlCol="0">
+            <a:spAutoFit/>
+          </a:bodyPr>
+          <a:lstStyle/>
+          <a:p>
+            <a:pPr algn="l"/>
+            <a:r>
+              <a:rPr lang="en-GB" sz="1600" b="1" i="0" dirty="0">
+                <a:solidFill>
+                  <a:srgbClr val="000000"/>
+                </a:solidFill>
+                <a:effectLst/>
+              </a:rPr>
+              <a:t>Have you previously had bariatric surgery?</a:t>
+            </a:r>
+          </a:p>
+          <a:p>
+            <a:pPr algn="l"/>
+            <a:endParaRPr lang="en-GB" sz="1200" b="0" i="0" dirty="0">
+              <a:solidFill>
+                <a:srgbClr val="000000"/>
+              </a:solidFill>
+              <a:effectLst/>
+            </a:endParaRPr>
+          </a:p>
+          <a:p>
+            <a:pPr algn="l"/>
+            <a:r>
+              <a:rPr lang="en-GB" sz="1200" b="0" i="0" dirty="0">
+                <a:solidFill>
+                  <a:srgbClr val="000000"/>
+                </a:solidFill>
+                <a:effectLst/>
+              </a:rPr>
+              <a:t>This includes operations from any surgeon, not just Dr. Smith.</a:t>
+            </a:r>
+          </a:p>
+          <a:p>
+            <a:pPr algn="l"/>
+            <a:r>
+              <a:rPr lang="en-GB" sz="1200" dirty="0">
+                <a:solidFill>
+                  <a:srgbClr val="000000"/>
+                </a:solidFill>
+              </a:rPr>
+              <a:t>Choose the option that best suits your experience.</a:t>
+            </a:r>
+            <a:endParaRPr lang="en-GB" sz="1200" b="0" i="0" dirty="0">
+              <a:solidFill>
+                <a:srgbClr val="000000"/>
+              </a:solidFill>
+              <a:effectLst/>
+            </a:endParaRPr>
+          </a:p>
+          <a:p>
+            <a:pPr algn="l"/>
+            <a:br>
+              <a:rPr lang="en-GB" sz="1200" dirty="0"/>
+            </a:br>
+            <a:endParaRPr lang="en-GB" sz="1200" b="0" i="0" dirty="0">
+              <a:solidFill>
+                <a:srgbClr val="000000"/>
+              </a:solidFill>
+              <a:effectLst/>
+            </a:endParaRPr>
+          </a:p>
+        </p:txBody>
+      </p:sp>
+      <p:sp>
+        <p:nvSpPr>
+          <p:cNvPr id="14" name="Rectangle: Diagonal Corners Rounded 13">
+            <a:extLst>
+              <a:ext uri="{FF2B5EF4-FFF2-40B4-BE49-F238E27FC236}">
+                <a16:creationId xmlns:a16="http://schemas.microsoft.com/office/drawing/2014/main" id="{F1163279-351E-4197-BBFC-477577168C47}"/>
+              </a:ext>
+            </a:extLst>
+          </p:cNvPr>
+          <p:cNvSpPr/>
+          <p:nvPr/>
+        </p:nvSpPr>
+        <p:spPr>
+          <a:xfrm flipH="1">
+            <a:off x="365316" y="4018008"/>
+            <a:ext cx="3785453" cy="484949"/>
+          </a:xfrm>
+          <a:prstGeom prst="round2DiagRect">
+            <a:avLst/>
+          </a:prstGeom>
+          <a:solidFill>
+            <a:schemeClr val="accent3"/>
+          </a:solidFill>
+          <a:ln>
+            <a:noFill/>
+          </a:ln>
+        </p:spPr>
+        <p:style>
+          <a:lnRef idx="2">
+            <a:schemeClr val="accent1">
+              <a:shade val="50000"/>
+            </a:schemeClr>
+          </a:lnRef>
+          <a:fillRef idx="1">
+            <a:schemeClr val="accent1"/>
+          </a:fillRef>
+          <a:effectRef idx="0">
+            <a:schemeClr val="accent1"/>
+          </a:effectRef>
+          <a:fontRef idx="minor">
+            <a:schemeClr val="lt1"/>
+          </a:fontRef>
+        </p:style>
+        <p:txBody>
+          <a:bodyPr rtlCol="0" anchor="ctr"/>
+          <a:lstStyle/>
+          <a:p>
+            <a:r>
+              <a:rPr lang="en-GB" dirty="0"/>
+              <a:t>   No, I would like a consultation</a:t>
+            </a:r>
+          </a:p>
+        </p:txBody>
+      </p:sp>
+      <p:sp>
+        <p:nvSpPr>
+          <p:cNvPr id="41" name="Rectangle: Diagonal Corners Rounded 40">
+            <a:extLst>
+              <a:ext uri="{FF2B5EF4-FFF2-40B4-BE49-F238E27FC236}">
+                <a16:creationId xmlns:a16="http://schemas.microsoft.com/office/drawing/2014/main" id="{4C45350A-AA77-4FD7-BFD7-F7096C50A368}"/>
+              </a:ext>
+            </a:extLst>
+          </p:cNvPr>
+          <p:cNvSpPr/>
+          <p:nvPr/>
+        </p:nvSpPr>
+        <p:spPr>
+          <a:xfrm flipH="1">
+            <a:off x="4348480" y="4390822"/>
+            <a:ext cx="2142228" cy="891457"/>
+          </a:xfrm>
+          <a:prstGeom prst="round2DiagRect">
+            <a:avLst/>
+          </a:prstGeom>
+          <a:solidFill>
+            <a:srgbClr val="92D050"/>
+          </a:solidFill>
+          <a:ln>
+            <a:noFill/>
+          </a:ln>
+        </p:spPr>
+        <p:style>
+          <a:lnRef idx="2">
+            <a:schemeClr val="accent1">
+              <a:shade val="50000"/>
+            </a:schemeClr>
+          </a:lnRef>
+          <a:fillRef idx="1">
+            <a:schemeClr val="accent1"/>
+          </a:fillRef>
+          <a:effectRef idx="0">
+            <a:schemeClr val="accent1"/>
+          </a:effectRef>
+          <a:fontRef idx="minor">
+            <a:schemeClr val="lt1"/>
+          </a:fontRef>
+        </p:style>
+        <p:txBody>
+          <a:bodyPr rtlCol="0" anchor="ctr"/>
+          <a:lstStyle/>
+          <a:p>
+            <a:endParaRPr lang="en-GB" dirty="0"/>
+          </a:p>
+        </p:txBody>
+      </p:sp>
+      <p:sp>
+        <p:nvSpPr>
+          <p:cNvPr id="42" name="Rectangle: Diagonal Corners Rounded 41">
+            <a:extLst>
+              <a:ext uri="{FF2B5EF4-FFF2-40B4-BE49-F238E27FC236}">
+                <a16:creationId xmlns:a16="http://schemas.microsoft.com/office/drawing/2014/main" id="{B5FD3739-4F22-4176-9358-F2C9A005E6B4}"/>
+              </a:ext>
+            </a:extLst>
+          </p:cNvPr>
+          <p:cNvSpPr/>
+          <p:nvPr/>
+        </p:nvSpPr>
+        <p:spPr>
+          <a:xfrm flipH="1">
+            <a:off x="4349164" y="5445262"/>
+            <a:ext cx="2142228" cy="891457"/>
+          </a:xfrm>
+          <a:prstGeom prst="round2DiagRect">
+            <a:avLst/>
+          </a:prstGeom>
+          <a:solidFill>
+            <a:srgbClr val="92D050"/>
+          </a:solidFill>
+          <a:ln>
+            <a:noFill/>
+          </a:ln>
+        </p:spPr>
+        <p:style>
+          <a:lnRef idx="2">
+            <a:schemeClr val="accent1">
+              <a:shade val="50000"/>
+            </a:schemeClr>
+          </a:lnRef>
+          <a:fillRef idx="1">
+            <a:schemeClr val="accent1"/>
+          </a:fillRef>
+          <a:effectRef idx="0">
+            <a:schemeClr val="accent1"/>
+          </a:effectRef>
+          <a:fontRef idx="minor">
+            <a:schemeClr val="lt1"/>
+          </a:fontRef>
+        </p:style>
+        <p:txBody>
+          <a:bodyPr rtlCol="0" anchor="ctr"/>
+          <a:lstStyle/>
+          <a:p>
+            <a:endParaRPr lang="en-GB" dirty="0"/>
+          </a:p>
+        </p:txBody>
+      </p:sp>
+      <p:sp>
+        <p:nvSpPr>
+          <p:cNvPr id="18" name="Rectangle: Diagonal Corners Rounded 17">
+            <a:extLst>
+              <a:ext uri="{FF2B5EF4-FFF2-40B4-BE49-F238E27FC236}">
+                <a16:creationId xmlns:a16="http://schemas.microsoft.com/office/drawing/2014/main" id="{32A948F8-FEC4-4348-8B34-EF42E3C63530}"/>
+              </a:ext>
+            </a:extLst>
+          </p:cNvPr>
+          <p:cNvSpPr/>
+          <p:nvPr/>
+        </p:nvSpPr>
+        <p:spPr>
+          <a:xfrm flipH="1">
+            <a:off x="365316" y="4647522"/>
+            <a:ext cx="3785453" cy="484949"/>
+          </a:xfrm>
+          <a:prstGeom prst="round2DiagRect">
+            <a:avLst/>
+          </a:prstGeom>
+          <a:solidFill>
+            <a:schemeClr val="tx2">
+              <a:lumMod val="75000"/>
+            </a:schemeClr>
+          </a:solidFill>
+          <a:ln>
+            <a:noFill/>
+          </a:ln>
+        </p:spPr>
+        <p:style>
+          <a:lnRef idx="2">
+            <a:schemeClr val="accent1">
+              <a:shade val="50000"/>
+            </a:schemeClr>
+          </a:lnRef>
+          <a:fillRef idx="1">
+            <a:schemeClr val="accent1"/>
+          </a:fillRef>
+          <a:effectRef idx="0">
+            <a:schemeClr val="accent1"/>
+          </a:effectRef>
+          <a:fontRef idx="minor">
+            <a:schemeClr val="lt1"/>
+          </a:fontRef>
+        </p:style>
+        <p:txBody>
+          <a:bodyPr rtlCol="0" anchor="ctr"/>
+          <a:lstStyle/>
+          <a:p>
+            <a:r>
+              <a:rPr lang="en-GB" dirty="0"/>
+              <a:t>   Yes, and I have some questions</a:t>
+            </a:r>
+          </a:p>
+        </p:txBody>
+      </p:sp>
+      <p:sp>
+        <p:nvSpPr>
+          <p:cNvPr id="22" name="TextBox 21">
+            <a:extLst>
+              <a:ext uri="{FF2B5EF4-FFF2-40B4-BE49-F238E27FC236}">
+                <a16:creationId xmlns:a16="http://schemas.microsoft.com/office/drawing/2014/main" id="{78C3D8D5-587C-4B4C-8FA9-2A0147913329}"/>
+              </a:ext>
+            </a:extLst>
+          </p:cNvPr>
+          <p:cNvSpPr txBox="1"/>
+          <p:nvPr/>
+        </p:nvSpPr>
+        <p:spPr>
+          <a:xfrm>
+            <a:off x="4348480" y="4018008"/>
+            <a:ext cx="2072198" cy="2246769"/>
+          </a:xfrm>
+          <a:prstGeom prst="rect">
+            <a:avLst/>
+          </a:prstGeom>
+          <a:noFill/>
+        </p:spPr>
+        <p:txBody>
+          <a:bodyPr wrap="square" rtlCol="0">
+            <a:spAutoFit/>
+          </a:bodyPr>
+          <a:lstStyle/>
+          <a:p>
+            <a:r>
+              <a:rPr lang="en-GB" sz="1400" dirty="0"/>
+              <a:t>What are you looking for?</a:t>
+            </a:r>
+          </a:p>
+          <a:p>
+            <a:endParaRPr lang="en-GB" sz="1400" dirty="0"/>
+          </a:p>
+          <a:p>
+            <a:r>
+              <a:rPr lang="en-GB" sz="1400" dirty="0">
+                <a:solidFill>
+                  <a:schemeClr val="bg1"/>
+                </a:solidFill>
+              </a:rPr>
+              <a:t>I need help with maintaining my health post-operation.</a:t>
+            </a:r>
+          </a:p>
+          <a:p>
+            <a:endParaRPr lang="en-GB" sz="1400" dirty="0"/>
+          </a:p>
+          <a:p>
+            <a:endParaRPr lang="en-GB" sz="1400" dirty="0"/>
+          </a:p>
+          <a:p>
+            <a:r>
+              <a:rPr lang="en-GB" sz="1400" dirty="0">
+                <a:solidFill>
+                  <a:schemeClr val="bg1"/>
+                </a:solidFill>
+              </a:rPr>
+              <a:t>I have an issue with </a:t>
+            </a:r>
+          </a:p>
+          <a:p>
+            <a:r>
+              <a:rPr lang="en-GB" sz="1400" dirty="0">
+                <a:solidFill>
+                  <a:schemeClr val="bg1"/>
+                </a:solidFill>
+              </a:rPr>
+              <a:t>my operation and am</a:t>
+            </a:r>
+          </a:p>
+          <a:p>
+            <a:r>
+              <a:rPr lang="en-GB" sz="1400" dirty="0">
+                <a:solidFill>
+                  <a:schemeClr val="bg1"/>
+                </a:solidFill>
+              </a:rPr>
+              <a:t>in need of a revision.</a:t>
+            </a:r>
+            <a:endParaRPr lang="en-GB" sz="900" dirty="0">
+              <a:solidFill>
+                <a:schemeClr val="bg1"/>
+              </a:solidFill>
+            </a:endParaRPr>
+          </a:p>
+        </p:txBody>
+      </p:sp>
+      <p:sp>
+        <p:nvSpPr>
+          <p:cNvPr id="43" name="Freeform: Shape 42">
+            <a:extLst>
+              <a:ext uri="{FF2B5EF4-FFF2-40B4-BE49-F238E27FC236}">
+                <a16:creationId xmlns:a16="http://schemas.microsoft.com/office/drawing/2014/main" id="{69F4FE5A-9350-475B-89A7-A175AA4EDB2C}"/>
+              </a:ext>
+            </a:extLst>
+          </p:cNvPr>
+          <p:cNvSpPr/>
+          <p:nvPr/>
+        </p:nvSpPr>
+        <p:spPr>
+          <a:xfrm>
+            <a:off x="6183152" y="5773730"/>
+            <a:ext cx="90415" cy="239898"/>
+          </a:xfrm>
+          <a:custGeom>
+            <a:avLst/>
+            <a:gdLst>
+              <a:gd name="connsiteX0" fmla="*/ 119063 w 319087"/>
+              <a:gd name="connsiteY0" fmla="*/ 0 h 533400"/>
+              <a:gd name="connsiteX1" fmla="*/ 0 w 319087"/>
+              <a:gd name="connsiteY1" fmla="*/ 0 h 533400"/>
+              <a:gd name="connsiteX2" fmla="*/ 200025 w 319087"/>
+              <a:gd name="connsiteY2" fmla="*/ 266700 h 533400"/>
+              <a:gd name="connsiteX3" fmla="*/ 0 w 319087"/>
+              <a:gd name="connsiteY3" fmla="*/ 533400 h 533400"/>
+              <a:gd name="connsiteX4" fmla="*/ 119063 w 319087"/>
+              <a:gd name="connsiteY4" fmla="*/ 533400 h 533400"/>
+              <a:gd name="connsiteX5" fmla="*/ 319088 w 319087"/>
+              <a:gd name="connsiteY5" fmla="*/ 266700 h 533400"/>
+              <a:gd name="connsiteX6" fmla="*/ 119063 w 319087"/>
+              <a:gd name="connsiteY6" fmla="*/ 0 h 533400"/>
+            </a:gdLst>
+            <a:ahLst/>
+            <a:cxnLst>
+              <a:cxn ang="0">
+                <a:pos x="connsiteX0" y="connsiteY0"/>
+              </a:cxn>
+              <a:cxn ang="0">
+                <a:pos x="connsiteX1" y="connsiteY1"/>
+              </a:cxn>
+              <a:cxn ang="0">
+                <a:pos x="connsiteX2" y="connsiteY2"/>
+              </a:cxn>
+              <a:cxn ang="0">
+                <a:pos x="connsiteX3" y="connsiteY3"/>
+              </a:cxn>
+              <a:cxn ang="0">
+                <a:pos x="connsiteX4" y="connsiteY4"/>
+              </a:cxn>
+              <a:cxn ang="0">
+                <a:pos x="connsiteX5" y="connsiteY5"/>
+              </a:cxn>
+              <a:cxn ang="0">
+                <a:pos x="connsiteX6" y="connsiteY6"/>
+              </a:cxn>
+            </a:cxnLst>
+            <a:rect l="l" t="t" r="r" b="b"/>
+            <a:pathLst>
+              <a:path w="319087" h="533400">
+                <a:moveTo>
+                  <a:pt x="119063" y="0"/>
+                </a:moveTo>
+                <a:lnTo>
+                  <a:pt x="0" y="0"/>
+                </a:lnTo>
+                <a:lnTo>
+                  <a:pt x="200025" y="266700"/>
+                </a:lnTo>
+                <a:lnTo>
+                  <a:pt x="0" y="533400"/>
+                </a:lnTo>
+                <a:lnTo>
+                  <a:pt x="119063" y="533400"/>
+                </a:lnTo>
+                <a:lnTo>
+                  <a:pt x="319088" y="266700"/>
+                </a:lnTo>
+                <a:lnTo>
+                  <a:pt x="119063" y="0"/>
+                </a:lnTo>
+                <a:close/>
+              </a:path>
+            </a:pathLst>
+          </a:custGeom>
+          <a:solidFill>
+            <a:schemeClr val="bg1"/>
+          </a:solidFill>
+          <a:ln w="9525" cap="flat">
+            <a:noFill/>
+            <a:prstDash val="solid"/>
+            <a:miter/>
+          </a:ln>
+        </p:spPr>
+        <p:txBody>
+          <a:bodyPr rot="0" spcFirstLastPara="0" vertOverflow="overflow" horzOverflow="overflow" vert="horz" wrap="square" lIns="91440" tIns="45720" rIns="91440" bIns="45720" numCol="1" spcCol="0" rtlCol="0" fromWordArt="0" anchor="ctr" anchorCtr="0" forceAA="0" compatLnSpc="1">
+            <a:prstTxWarp prst="textNoShape">
+              <a:avLst/>
+            </a:prstTxWarp>
+            <a:noAutofit/>
+          </a:bodyPr>
+          <a:lstStyle/>
+          <a:p>
+            <a:endParaRPr lang="en-GB" sz="1400"/>
+          </a:p>
+        </p:txBody>
+      </p:sp>
+      <p:sp>
+        <p:nvSpPr>
+          <p:cNvPr id="44" name="Freeform: Shape 43">
+            <a:extLst>
+              <a:ext uri="{FF2B5EF4-FFF2-40B4-BE49-F238E27FC236}">
+                <a16:creationId xmlns:a16="http://schemas.microsoft.com/office/drawing/2014/main" id="{E21F671C-71FB-40AB-870D-EC411222ADF2}"/>
+              </a:ext>
+            </a:extLst>
+          </p:cNvPr>
+          <p:cNvSpPr/>
+          <p:nvPr/>
+        </p:nvSpPr>
+        <p:spPr>
+          <a:xfrm>
+            <a:off x="6247927" y="5773730"/>
+            <a:ext cx="90415" cy="239898"/>
+          </a:xfrm>
+          <a:custGeom>
+            <a:avLst/>
+            <a:gdLst>
+              <a:gd name="connsiteX0" fmla="*/ 119063 w 319087"/>
+              <a:gd name="connsiteY0" fmla="*/ 0 h 533400"/>
+              <a:gd name="connsiteX1" fmla="*/ 0 w 319087"/>
+              <a:gd name="connsiteY1" fmla="*/ 0 h 533400"/>
+              <a:gd name="connsiteX2" fmla="*/ 200025 w 319087"/>
+              <a:gd name="connsiteY2" fmla="*/ 266700 h 533400"/>
+              <a:gd name="connsiteX3" fmla="*/ 0 w 319087"/>
+              <a:gd name="connsiteY3" fmla="*/ 533400 h 533400"/>
+              <a:gd name="connsiteX4" fmla="*/ 119063 w 319087"/>
+              <a:gd name="connsiteY4" fmla="*/ 533400 h 533400"/>
+              <a:gd name="connsiteX5" fmla="*/ 319088 w 319087"/>
+              <a:gd name="connsiteY5" fmla="*/ 266700 h 533400"/>
+              <a:gd name="connsiteX6" fmla="*/ 119063 w 319087"/>
+              <a:gd name="connsiteY6" fmla="*/ 0 h 533400"/>
+            </a:gdLst>
+            <a:ahLst/>
+            <a:cxnLst>
+              <a:cxn ang="0">
+                <a:pos x="connsiteX0" y="connsiteY0"/>
+              </a:cxn>
+              <a:cxn ang="0">
+                <a:pos x="connsiteX1" y="connsiteY1"/>
+              </a:cxn>
+              <a:cxn ang="0">
+                <a:pos x="connsiteX2" y="connsiteY2"/>
+              </a:cxn>
+              <a:cxn ang="0">
+                <a:pos x="connsiteX3" y="connsiteY3"/>
+              </a:cxn>
+              <a:cxn ang="0">
+                <a:pos x="connsiteX4" y="connsiteY4"/>
+              </a:cxn>
+              <a:cxn ang="0">
+                <a:pos x="connsiteX5" y="connsiteY5"/>
+              </a:cxn>
+              <a:cxn ang="0">
+                <a:pos x="connsiteX6" y="connsiteY6"/>
+              </a:cxn>
+            </a:cxnLst>
+            <a:rect l="l" t="t" r="r" b="b"/>
+            <a:pathLst>
+              <a:path w="319087" h="533400">
+                <a:moveTo>
+                  <a:pt x="119063" y="0"/>
+                </a:moveTo>
+                <a:lnTo>
+                  <a:pt x="0" y="0"/>
+                </a:lnTo>
+                <a:lnTo>
+                  <a:pt x="200025" y="266700"/>
+                </a:lnTo>
+                <a:lnTo>
+                  <a:pt x="0" y="533400"/>
+                </a:lnTo>
+                <a:lnTo>
+                  <a:pt x="119063" y="533400"/>
+                </a:lnTo>
+                <a:lnTo>
+                  <a:pt x="319088" y="266700"/>
+                </a:lnTo>
+                <a:lnTo>
+                  <a:pt x="119063" y="0"/>
+                </a:lnTo>
+                <a:close/>
+              </a:path>
+            </a:pathLst>
+          </a:custGeom>
+          <a:solidFill>
+            <a:schemeClr val="bg1"/>
+          </a:solidFill>
+          <a:ln w="9525" cap="flat">
+            <a:noFill/>
+            <a:prstDash val="solid"/>
+            <a:miter/>
+          </a:ln>
+        </p:spPr>
+        <p:txBody>
+          <a:bodyPr rot="0" spcFirstLastPara="0" vertOverflow="overflow" horzOverflow="overflow" vert="horz" wrap="square" lIns="91440" tIns="45720" rIns="91440" bIns="45720" numCol="1" spcCol="0" rtlCol="0" fromWordArt="0" anchor="ctr" anchorCtr="0" forceAA="0" compatLnSpc="1">
+            <a:prstTxWarp prst="textNoShape">
+              <a:avLst/>
+            </a:prstTxWarp>
+            <a:noAutofit/>
+          </a:bodyPr>
+          <a:lstStyle/>
+          <a:p>
+            <a:endParaRPr lang="en-GB" sz="1400"/>
+          </a:p>
+        </p:txBody>
+      </p:sp>
+      <p:sp>
+        <p:nvSpPr>
+          <p:cNvPr id="45" name="Freeform: Shape 44">
+            <a:extLst>
+              <a:ext uri="{FF2B5EF4-FFF2-40B4-BE49-F238E27FC236}">
+                <a16:creationId xmlns:a16="http://schemas.microsoft.com/office/drawing/2014/main" id="{2AB68C7B-4B38-4528-82C6-54E664CEE4A4}"/>
+              </a:ext>
+            </a:extLst>
+          </p:cNvPr>
+          <p:cNvSpPr/>
+          <p:nvPr/>
+        </p:nvSpPr>
+        <p:spPr>
+          <a:xfrm>
+            <a:off x="6208792" y="4733117"/>
+            <a:ext cx="90415" cy="239898"/>
+          </a:xfrm>
+          <a:custGeom>
+            <a:avLst/>
+            <a:gdLst>
+              <a:gd name="connsiteX0" fmla="*/ 119063 w 319087"/>
+              <a:gd name="connsiteY0" fmla="*/ 0 h 533400"/>
+              <a:gd name="connsiteX1" fmla="*/ 0 w 319087"/>
+              <a:gd name="connsiteY1" fmla="*/ 0 h 533400"/>
+              <a:gd name="connsiteX2" fmla="*/ 200025 w 319087"/>
+              <a:gd name="connsiteY2" fmla="*/ 266700 h 533400"/>
+              <a:gd name="connsiteX3" fmla="*/ 0 w 319087"/>
+              <a:gd name="connsiteY3" fmla="*/ 533400 h 533400"/>
+              <a:gd name="connsiteX4" fmla="*/ 119063 w 319087"/>
+              <a:gd name="connsiteY4" fmla="*/ 533400 h 533400"/>
+              <a:gd name="connsiteX5" fmla="*/ 319088 w 319087"/>
+              <a:gd name="connsiteY5" fmla="*/ 266700 h 533400"/>
+              <a:gd name="connsiteX6" fmla="*/ 119063 w 319087"/>
+              <a:gd name="connsiteY6" fmla="*/ 0 h 533400"/>
+            </a:gdLst>
+            <a:ahLst/>
+            <a:cxnLst>
+              <a:cxn ang="0">
+                <a:pos x="connsiteX0" y="connsiteY0"/>
+              </a:cxn>
+              <a:cxn ang="0">
+                <a:pos x="connsiteX1" y="connsiteY1"/>
+              </a:cxn>
+              <a:cxn ang="0">
+                <a:pos x="connsiteX2" y="connsiteY2"/>
+              </a:cxn>
+              <a:cxn ang="0">
+                <a:pos x="connsiteX3" y="connsiteY3"/>
+              </a:cxn>
+              <a:cxn ang="0">
+                <a:pos x="connsiteX4" y="connsiteY4"/>
+              </a:cxn>
+              <a:cxn ang="0">
+                <a:pos x="connsiteX5" y="connsiteY5"/>
+              </a:cxn>
+              <a:cxn ang="0">
+                <a:pos x="connsiteX6" y="connsiteY6"/>
+              </a:cxn>
+            </a:cxnLst>
+            <a:rect l="l" t="t" r="r" b="b"/>
+            <a:pathLst>
+              <a:path w="319087" h="533400">
+                <a:moveTo>
+                  <a:pt x="119063" y="0"/>
+                </a:moveTo>
+                <a:lnTo>
+                  <a:pt x="0" y="0"/>
+                </a:lnTo>
+                <a:lnTo>
+                  <a:pt x="200025" y="266700"/>
+                </a:lnTo>
+                <a:lnTo>
+                  <a:pt x="0" y="533400"/>
+                </a:lnTo>
+                <a:lnTo>
+                  <a:pt x="119063" y="533400"/>
+                </a:lnTo>
+                <a:lnTo>
+                  <a:pt x="319088" y="266700"/>
+                </a:lnTo>
+                <a:lnTo>
+                  <a:pt x="119063" y="0"/>
+                </a:lnTo>
+                <a:close/>
+              </a:path>
+            </a:pathLst>
+          </a:custGeom>
+          <a:solidFill>
+            <a:schemeClr val="bg1"/>
+          </a:solidFill>
+          <a:ln w="9525" cap="flat">
+            <a:noFill/>
+            <a:prstDash val="solid"/>
+            <a:miter/>
+          </a:ln>
+        </p:spPr>
+        <p:txBody>
+          <a:bodyPr rot="0" spcFirstLastPara="0" vertOverflow="overflow" horzOverflow="overflow" vert="horz" wrap="square" lIns="91440" tIns="45720" rIns="91440" bIns="45720" numCol="1" spcCol="0" rtlCol="0" fromWordArt="0" anchor="ctr" anchorCtr="0" forceAA="0" compatLnSpc="1">
+            <a:prstTxWarp prst="textNoShape">
+              <a:avLst/>
+            </a:prstTxWarp>
+            <a:noAutofit/>
+          </a:bodyPr>
+          <a:lstStyle/>
+          <a:p>
+            <a:endParaRPr lang="en-GB" sz="1400"/>
+          </a:p>
+        </p:txBody>
+      </p:sp>
+      <p:sp>
+        <p:nvSpPr>
+          <p:cNvPr id="46" name="Freeform: Shape 45">
+            <a:extLst>
+              <a:ext uri="{FF2B5EF4-FFF2-40B4-BE49-F238E27FC236}">
+                <a16:creationId xmlns:a16="http://schemas.microsoft.com/office/drawing/2014/main" id="{9E02A76E-2201-444E-B342-01CA00DDC490}"/>
+              </a:ext>
+            </a:extLst>
+          </p:cNvPr>
+          <p:cNvSpPr/>
+          <p:nvPr/>
+        </p:nvSpPr>
+        <p:spPr>
+          <a:xfrm>
+            <a:off x="6273567" y="4733117"/>
+            <a:ext cx="90415" cy="239898"/>
+          </a:xfrm>
+          <a:custGeom>
+            <a:avLst/>
+            <a:gdLst>
+              <a:gd name="connsiteX0" fmla="*/ 119063 w 319087"/>
+              <a:gd name="connsiteY0" fmla="*/ 0 h 533400"/>
+              <a:gd name="connsiteX1" fmla="*/ 0 w 319087"/>
+              <a:gd name="connsiteY1" fmla="*/ 0 h 533400"/>
+              <a:gd name="connsiteX2" fmla="*/ 200025 w 319087"/>
+              <a:gd name="connsiteY2" fmla="*/ 266700 h 533400"/>
+              <a:gd name="connsiteX3" fmla="*/ 0 w 319087"/>
+              <a:gd name="connsiteY3" fmla="*/ 533400 h 533400"/>
+              <a:gd name="connsiteX4" fmla="*/ 119063 w 319087"/>
+              <a:gd name="connsiteY4" fmla="*/ 533400 h 533400"/>
+              <a:gd name="connsiteX5" fmla="*/ 319088 w 319087"/>
+              <a:gd name="connsiteY5" fmla="*/ 266700 h 533400"/>
+              <a:gd name="connsiteX6" fmla="*/ 119063 w 319087"/>
+              <a:gd name="connsiteY6" fmla="*/ 0 h 533400"/>
+            </a:gdLst>
+            <a:ahLst/>
+            <a:cxnLst>
+              <a:cxn ang="0">
+                <a:pos x="connsiteX0" y="connsiteY0"/>
+              </a:cxn>
+              <a:cxn ang="0">
+                <a:pos x="connsiteX1" y="connsiteY1"/>
+              </a:cxn>
+              <a:cxn ang="0">
+                <a:pos x="connsiteX2" y="connsiteY2"/>
+              </a:cxn>
+              <a:cxn ang="0">
+                <a:pos x="connsiteX3" y="connsiteY3"/>
+              </a:cxn>
+              <a:cxn ang="0">
+                <a:pos x="connsiteX4" y="connsiteY4"/>
+              </a:cxn>
+              <a:cxn ang="0">
+                <a:pos x="connsiteX5" y="connsiteY5"/>
+              </a:cxn>
+              <a:cxn ang="0">
+                <a:pos x="connsiteX6" y="connsiteY6"/>
+              </a:cxn>
+            </a:cxnLst>
+            <a:rect l="l" t="t" r="r" b="b"/>
+            <a:pathLst>
+              <a:path w="319087" h="533400">
+                <a:moveTo>
+                  <a:pt x="119063" y="0"/>
+                </a:moveTo>
+                <a:lnTo>
+                  <a:pt x="0" y="0"/>
+                </a:lnTo>
+                <a:lnTo>
+                  <a:pt x="200025" y="266700"/>
+                </a:lnTo>
+                <a:lnTo>
+                  <a:pt x="0" y="533400"/>
+                </a:lnTo>
+                <a:lnTo>
+                  <a:pt x="119063" y="533400"/>
+                </a:lnTo>
+                <a:lnTo>
+                  <a:pt x="319088" y="266700"/>
+                </a:lnTo>
+                <a:lnTo>
+                  <a:pt x="119063" y="0"/>
+                </a:lnTo>
+                <a:close/>
+              </a:path>
+            </a:pathLst>
+          </a:custGeom>
+          <a:solidFill>
+            <a:schemeClr val="bg1"/>
+          </a:solidFill>
+          <a:ln w="9525" cap="flat">
+            <a:noFill/>
+            <a:prstDash val="solid"/>
+            <a:miter/>
+          </a:ln>
+        </p:spPr>
+        <p:txBody>
+          <a:bodyPr rot="0" spcFirstLastPara="0" vertOverflow="overflow" horzOverflow="overflow" vert="horz" wrap="square" lIns="91440" tIns="45720" rIns="91440" bIns="45720" numCol="1" spcCol="0" rtlCol="0" fromWordArt="0" anchor="ctr" anchorCtr="0" forceAA="0" compatLnSpc="1">
+            <a:prstTxWarp prst="textNoShape">
+              <a:avLst/>
+            </a:prstTxWarp>
+            <a:noAutofit/>
+          </a:bodyPr>
+          <a:lstStyle/>
+          <a:p>
+            <a:endParaRPr lang="en-GB" sz="1400"/>
+          </a:p>
+        </p:txBody>
+      </p:sp>
+    </p:spTree>
+    <p:extLst>
+      <p:ext uri="{BB962C8B-B14F-4D97-AF65-F5344CB8AC3E}">
+        <p14:creationId xmlns:p14="http://schemas.microsoft.com/office/powerpoint/2010/main" val="2236089778"/>
       </p:ext>
     </p:extLst>
   </p:cSld>

</xml_diff>

<commit_message>
Contact form added in html/css
</commit_message>
<xml_diff>
--- a/Website Design Tools.pptx
+++ b/Website Design Tools.pptx
@@ -5,7 +5,7 @@
     <p:sldMasterId id="2147483672" r:id="rId1"/>
   </p:sldMasterIdLst>
   <p:notesMasterIdLst>
-    <p:notesMasterId r:id="rId15"/>
+    <p:notesMasterId r:id="rId17"/>
   </p:notesMasterIdLst>
   <p:sldIdLst>
     <p:sldId id="257" r:id="rId2"/>
@@ -21,6 +21,8 @@
     <p:sldId id="267" r:id="rId12"/>
     <p:sldId id="268" r:id="rId13"/>
     <p:sldId id="269" r:id="rId14"/>
+    <p:sldId id="270" r:id="rId15"/>
+    <p:sldId id="271" r:id="rId16"/>
   </p:sldIdLst>
   <p:sldSz cx="6858000" cy="10799763"/>
   <p:notesSz cx="6858000" cy="9144000"/>
@@ -141,6 +143,8 @@
             <p14:sldId id="267"/>
             <p14:sldId id="268"/>
             <p14:sldId id="269"/>
+            <p14:sldId id="270"/>
+            <p14:sldId id="271"/>
           </p14:sldIdLst>
         </p14:section>
       </p14:sectionLst>
@@ -5483,7 +5487,7 @@
           <a:p>
             <a:fld id="{12F15D9C-A007-4C82-A807-6D2013854DF5}" type="datetimeFigureOut">
               <a:rPr lang="en-GB" smtClean="0"/>
-              <a:t>02/04/2022</a:t>
+              <a:t>04/04/2022</a:t>
             </a:fld>
             <a:endParaRPr lang="en-GB"/>
           </a:p>
@@ -6113,6 +6117,90 @@
 </p:notes>
 </file>
 
+<file path=ppt/notesSlides/notesSlide5.xml><?xml version="1.0" encoding="utf-8"?>
+<p:notes xmlns:a="http://schemas.openxmlformats.org/drawingml/2006/main" xmlns:r="http://schemas.openxmlformats.org/officeDocument/2006/relationships" xmlns:p="http://schemas.openxmlformats.org/presentationml/2006/main">
+  <p:cSld>
+    <p:spTree>
+      <p:nvGrpSpPr>
+        <p:cNvPr id="1" name=""/>
+        <p:cNvGrpSpPr/>
+        <p:nvPr/>
+      </p:nvGrpSpPr>
+      <p:grpSpPr>
+        <a:xfrm>
+          <a:off x="0" y="0"/>
+          <a:ext cx="0" cy="0"/>
+          <a:chOff x="0" y="0"/>
+          <a:chExt cx="0" cy="0"/>
+        </a:xfrm>
+      </p:grpSpPr>
+      <p:sp>
+        <p:nvSpPr>
+          <p:cNvPr id="2" name="Slide Image Placeholder 1"/>
+          <p:cNvSpPr>
+            <a:spLocks noGrp="1" noRot="1" noChangeAspect="1"/>
+          </p:cNvSpPr>
+          <p:nvPr>
+            <p:ph type="sldImg"/>
+          </p:nvPr>
+        </p:nvSpPr>
+        <p:spPr/>
+      </p:sp>
+      <p:sp>
+        <p:nvSpPr>
+          <p:cNvPr id="3" name="Notes Placeholder 2"/>
+          <p:cNvSpPr>
+            <a:spLocks noGrp="1"/>
+          </p:cNvSpPr>
+          <p:nvPr>
+            <p:ph type="body" idx="1"/>
+          </p:nvPr>
+        </p:nvSpPr>
+        <p:spPr/>
+        <p:txBody>
+          <a:bodyPr/>
+          <a:lstStyle/>
+          <a:p>
+            <a:endParaRPr lang="en-GB" dirty="0"/>
+          </a:p>
+        </p:txBody>
+      </p:sp>
+      <p:sp>
+        <p:nvSpPr>
+          <p:cNvPr id="4" name="Slide Number Placeholder 3"/>
+          <p:cNvSpPr>
+            <a:spLocks noGrp="1"/>
+          </p:cNvSpPr>
+          <p:nvPr>
+            <p:ph type="sldNum" sz="quarter" idx="5"/>
+          </p:nvPr>
+        </p:nvSpPr>
+        <p:spPr/>
+        <p:txBody>
+          <a:bodyPr/>
+          <a:lstStyle/>
+          <a:p>
+            <a:fld id="{63B92925-6786-4756-8985-7A915050A8F8}" type="slidenum">
+              <a:rPr lang="en-GB" smtClean="0"/>
+              <a:t>15</a:t>
+            </a:fld>
+            <a:endParaRPr lang="en-GB"/>
+          </a:p>
+        </p:txBody>
+      </p:sp>
+    </p:spTree>
+    <p:extLst>
+      <p:ext uri="{BB962C8B-B14F-4D97-AF65-F5344CB8AC3E}">
+        <p14:creationId xmlns:p14="http://schemas.microsoft.com/office/powerpoint/2010/main" val="1882691176"/>
+      </p:ext>
+    </p:extLst>
+  </p:cSld>
+  <p:clrMapOvr>
+    <a:masterClrMapping/>
+  </p:clrMapOvr>
+</p:notes>
+</file>
+
 <file path=ppt/slideLayouts/slideLayout1.xml><?xml version="1.0" encoding="utf-8"?>
 <p:sldLayout xmlns:a="http://schemas.openxmlformats.org/drawingml/2006/main" xmlns:r="http://schemas.openxmlformats.org/officeDocument/2006/relationships" xmlns:p="http://schemas.openxmlformats.org/presentationml/2006/main" type="title" preserve="1">
   <p:cSld name="Title Slide">
@@ -6244,7 +6332,7 @@
           <a:p>
             <a:fld id="{1C4F9540-4BF6-456B-983F-E69BCBCF3DC2}" type="datetimeFigureOut">
               <a:rPr lang="en-GB" smtClean="0"/>
-              <a:t>02/04/2022</a:t>
+              <a:t>04/04/2022</a:t>
             </a:fld>
             <a:endParaRPr lang="en-GB"/>
           </a:p>
@@ -6414,7 +6502,7 @@
           <a:p>
             <a:fld id="{1C4F9540-4BF6-456B-983F-E69BCBCF3DC2}" type="datetimeFigureOut">
               <a:rPr lang="en-GB" smtClean="0"/>
-              <a:t>02/04/2022</a:t>
+              <a:t>04/04/2022</a:t>
             </a:fld>
             <a:endParaRPr lang="en-GB"/>
           </a:p>
@@ -6594,7 +6682,7 @@
           <a:p>
             <a:fld id="{1C4F9540-4BF6-456B-983F-E69BCBCF3DC2}" type="datetimeFigureOut">
               <a:rPr lang="en-GB" smtClean="0"/>
-              <a:t>02/04/2022</a:t>
+              <a:t>04/04/2022</a:t>
             </a:fld>
             <a:endParaRPr lang="en-GB"/>
           </a:p>
@@ -6764,7 +6852,7 @@
           <a:p>
             <a:fld id="{1C4F9540-4BF6-456B-983F-E69BCBCF3DC2}" type="datetimeFigureOut">
               <a:rPr lang="en-GB" smtClean="0"/>
-              <a:t>02/04/2022</a:t>
+              <a:t>04/04/2022</a:t>
             </a:fld>
             <a:endParaRPr lang="en-GB"/>
           </a:p>
@@ -7008,7 +7096,7 @@
           <a:p>
             <a:fld id="{1C4F9540-4BF6-456B-983F-E69BCBCF3DC2}" type="datetimeFigureOut">
               <a:rPr lang="en-GB" smtClean="0"/>
-              <a:t>02/04/2022</a:t>
+              <a:t>04/04/2022</a:t>
             </a:fld>
             <a:endParaRPr lang="en-GB"/>
           </a:p>
@@ -7240,7 +7328,7 @@
           <a:p>
             <a:fld id="{1C4F9540-4BF6-456B-983F-E69BCBCF3DC2}" type="datetimeFigureOut">
               <a:rPr lang="en-GB" smtClean="0"/>
-              <a:t>02/04/2022</a:t>
+              <a:t>04/04/2022</a:t>
             </a:fld>
             <a:endParaRPr lang="en-GB"/>
           </a:p>
@@ -7607,7 +7695,7 @@
           <a:p>
             <a:fld id="{1C4F9540-4BF6-456B-983F-E69BCBCF3DC2}" type="datetimeFigureOut">
               <a:rPr lang="en-GB" smtClean="0"/>
-              <a:t>02/04/2022</a:t>
+              <a:t>04/04/2022</a:t>
             </a:fld>
             <a:endParaRPr lang="en-GB"/>
           </a:p>
@@ -7725,7 +7813,7 @@
           <a:p>
             <a:fld id="{1C4F9540-4BF6-456B-983F-E69BCBCF3DC2}" type="datetimeFigureOut">
               <a:rPr lang="en-GB" smtClean="0"/>
-              <a:t>02/04/2022</a:t>
+              <a:t>04/04/2022</a:t>
             </a:fld>
             <a:endParaRPr lang="en-GB"/>
           </a:p>
@@ -7820,7 +7908,7 @@
           <a:p>
             <a:fld id="{1C4F9540-4BF6-456B-983F-E69BCBCF3DC2}" type="datetimeFigureOut">
               <a:rPr lang="en-GB" smtClean="0"/>
-              <a:t>02/04/2022</a:t>
+              <a:t>04/04/2022</a:t>
             </a:fld>
             <a:endParaRPr lang="en-GB"/>
           </a:p>
@@ -8097,7 +8185,7 @@
           <a:p>
             <a:fld id="{1C4F9540-4BF6-456B-983F-E69BCBCF3DC2}" type="datetimeFigureOut">
               <a:rPr lang="en-GB" smtClean="0"/>
-              <a:t>02/04/2022</a:t>
+              <a:t>04/04/2022</a:t>
             </a:fld>
             <a:endParaRPr lang="en-GB"/>
           </a:p>
@@ -8354,7 +8442,7 @@
           <a:p>
             <a:fld id="{1C4F9540-4BF6-456B-983F-E69BCBCF3DC2}" type="datetimeFigureOut">
               <a:rPr lang="en-GB" smtClean="0"/>
-              <a:t>02/04/2022</a:t>
+              <a:t>04/04/2022</a:t>
             </a:fld>
             <a:endParaRPr lang="en-GB"/>
           </a:p>
@@ -8567,7 +8655,7 @@
           <a:p>
             <a:fld id="{1C4F9540-4BF6-456B-983F-E69BCBCF3DC2}" type="datetimeFigureOut">
               <a:rPr lang="en-GB" smtClean="0"/>
-              <a:t>02/04/2022</a:t>
+              <a:t>04/04/2022</a:t>
             </a:fld>
             <a:endParaRPr lang="en-GB"/>
           </a:p>
@@ -17464,6 +17552,3054 @@
 </p:sld>
 </file>
 
+<file path=ppt/slides/slide14.xml><?xml version="1.0" encoding="utf-8"?>
+<p:sld xmlns:a="http://schemas.openxmlformats.org/drawingml/2006/main" xmlns:r="http://schemas.openxmlformats.org/officeDocument/2006/relationships" xmlns:p="http://schemas.openxmlformats.org/presentationml/2006/main">
+  <p:cSld>
+    <p:spTree>
+      <p:nvGrpSpPr>
+        <p:cNvPr id="1" name=""/>
+        <p:cNvGrpSpPr/>
+        <p:nvPr/>
+      </p:nvGrpSpPr>
+      <p:grpSpPr>
+        <a:xfrm>
+          <a:off x="0" y="0"/>
+          <a:ext cx="0" cy="0"/>
+          <a:chOff x="0" y="0"/>
+          <a:chExt cx="0" cy="0"/>
+        </a:xfrm>
+      </p:grpSpPr>
+      <p:pic>
+        <p:nvPicPr>
+          <p:cNvPr id="2" name="Picture 1">
+            <a:extLst>
+              <a:ext uri="{FF2B5EF4-FFF2-40B4-BE49-F238E27FC236}">
+                <a16:creationId xmlns:a16="http://schemas.microsoft.com/office/drawing/2014/main" id="{E3763B69-8364-486C-B0DE-58B1175F9FF4}"/>
+              </a:ext>
+            </a:extLst>
+          </p:cNvPr>
+          <p:cNvPicPr>
+            <a:picLocks noChangeAspect="1"/>
+          </p:cNvPicPr>
+          <p:nvPr/>
+        </p:nvPicPr>
+        <p:blipFill>
+          <a:blip r:embed="rId2"/>
+          <a:stretch>
+            <a:fillRect/>
+          </a:stretch>
+        </p:blipFill>
+        <p:spPr>
+          <a:xfrm>
+            <a:off x="0" y="-2063"/>
+            <a:ext cx="6858000" cy="799794"/>
+          </a:xfrm>
+          <a:prstGeom prst="rect">
+            <a:avLst/>
+          </a:prstGeom>
+        </p:spPr>
+      </p:pic>
+      <p:sp>
+        <p:nvSpPr>
+          <p:cNvPr id="3" name="Rectangle 2">
+            <a:extLst>
+              <a:ext uri="{FF2B5EF4-FFF2-40B4-BE49-F238E27FC236}">
+                <a16:creationId xmlns:a16="http://schemas.microsoft.com/office/drawing/2014/main" id="{A9A7E3B9-70C6-4A16-B6D8-EA3AFD3505F8}"/>
+              </a:ext>
+            </a:extLst>
+          </p:cNvPr>
+          <p:cNvSpPr/>
+          <p:nvPr/>
+        </p:nvSpPr>
+        <p:spPr>
+          <a:xfrm>
+            <a:off x="0" y="797731"/>
+            <a:ext cx="6858000" cy="1488269"/>
+          </a:xfrm>
+          <a:prstGeom prst="rect">
+            <a:avLst/>
+          </a:prstGeom>
+          <a:solidFill>
+            <a:schemeClr val="bg2">
+              <a:lumMod val="90000"/>
+            </a:schemeClr>
+          </a:solidFill>
+          <a:ln>
+            <a:noFill/>
+          </a:ln>
+        </p:spPr>
+        <p:style>
+          <a:lnRef idx="2">
+            <a:schemeClr val="accent1">
+              <a:shade val="50000"/>
+            </a:schemeClr>
+          </a:lnRef>
+          <a:fillRef idx="1">
+            <a:schemeClr val="accent1"/>
+          </a:fillRef>
+          <a:effectRef idx="0">
+            <a:schemeClr val="accent1"/>
+          </a:effectRef>
+          <a:fontRef idx="minor">
+            <a:schemeClr val="lt1"/>
+          </a:fontRef>
+        </p:style>
+        <p:txBody>
+          <a:bodyPr rtlCol="0" anchor="ctr"/>
+          <a:lstStyle/>
+          <a:p>
+            <a:pPr algn="ctr"/>
+            <a:endParaRPr lang="en-GB" dirty="0"/>
+          </a:p>
+        </p:txBody>
+      </p:sp>
+      <p:sp>
+        <p:nvSpPr>
+          <p:cNvPr id="4" name="TextBox 3">
+            <a:extLst>
+              <a:ext uri="{FF2B5EF4-FFF2-40B4-BE49-F238E27FC236}">
+                <a16:creationId xmlns:a16="http://schemas.microsoft.com/office/drawing/2014/main" id="{7A2D3681-C2D0-4BF3-AB9D-9E626DD934BD}"/>
+              </a:ext>
+            </a:extLst>
+          </p:cNvPr>
+          <p:cNvSpPr txBox="1"/>
+          <p:nvPr/>
+        </p:nvSpPr>
+        <p:spPr>
+          <a:xfrm>
+            <a:off x="4523823" y="1087875"/>
+            <a:ext cx="1966885" cy="461665"/>
+          </a:xfrm>
+          <a:prstGeom prst="rect">
+            <a:avLst/>
+          </a:prstGeom>
+          <a:noFill/>
+        </p:spPr>
+        <p:txBody>
+          <a:bodyPr wrap="none" rtlCol="0">
+            <a:spAutoFit/>
+          </a:bodyPr>
+          <a:lstStyle/>
+          <a:p>
+            <a:pPr algn="r"/>
+            <a:r>
+              <a:rPr lang="en-GB" sz="2400" dirty="0"/>
+              <a:t>Get in Contact</a:t>
+            </a:r>
+          </a:p>
+        </p:txBody>
+      </p:sp>
+      <p:sp>
+        <p:nvSpPr>
+          <p:cNvPr id="5" name="Rectangle 4">
+            <a:extLst>
+              <a:ext uri="{FF2B5EF4-FFF2-40B4-BE49-F238E27FC236}">
+                <a16:creationId xmlns:a16="http://schemas.microsoft.com/office/drawing/2014/main" id="{6438A6E4-9B04-4DE6-B95B-6CE2BD1C58FC}"/>
+              </a:ext>
+            </a:extLst>
+          </p:cNvPr>
+          <p:cNvSpPr/>
+          <p:nvPr/>
+        </p:nvSpPr>
+        <p:spPr>
+          <a:xfrm>
+            <a:off x="0" y="9588856"/>
+            <a:ext cx="6858000" cy="1194865"/>
+          </a:xfrm>
+          <a:prstGeom prst="rect">
+            <a:avLst/>
+          </a:prstGeom>
+          <a:noFill/>
+          <a:ln w="12700">
+            <a:solidFill>
+              <a:schemeClr val="tx1"/>
+            </a:solidFill>
+          </a:ln>
+        </p:spPr>
+        <p:style>
+          <a:lnRef idx="2">
+            <a:schemeClr val="accent1">
+              <a:shade val="50000"/>
+            </a:schemeClr>
+          </a:lnRef>
+          <a:fillRef idx="1">
+            <a:schemeClr val="accent1"/>
+          </a:fillRef>
+          <a:effectRef idx="0">
+            <a:schemeClr val="accent1"/>
+          </a:effectRef>
+          <a:fontRef idx="minor">
+            <a:schemeClr val="lt1"/>
+          </a:fontRef>
+        </p:style>
+        <p:txBody>
+          <a:bodyPr rtlCol="0" anchor="ctr"/>
+          <a:lstStyle/>
+          <a:p>
+            <a:pPr algn="ctr"/>
+            <a:endParaRPr lang="en-GB"/>
+          </a:p>
+        </p:txBody>
+      </p:sp>
+      <p:sp>
+        <p:nvSpPr>
+          <p:cNvPr id="6" name="TextBox 5">
+            <a:extLst>
+              <a:ext uri="{FF2B5EF4-FFF2-40B4-BE49-F238E27FC236}">
+                <a16:creationId xmlns:a16="http://schemas.microsoft.com/office/drawing/2014/main" id="{7DE356D9-9E56-4723-A0BF-0E7DF325E53C}"/>
+              </a:ext>
+            </a:extLst>
+          </p:cNvPr>
+          <p:cNvSpPr txBox="1"/>
+          <p:nvPr/>
+        </p:nvSpPr>
+        <p:spPr>
+          <a:xfrm>
+            <a:off x="4809987" y="10246716"/>
+            <a:ext cx="1771639" cy="384721"/>
+          </a:xfrm>
+          <a:prstGeom prst="rect">
+            <a:avLst/>
+          </a:prstGeom>
+          <a:noFill/>
+        </p:spPr>
+        <p:txBody>
+          <a:bodyPr wrap="none" rtlCol="0">
+            <a:spAutoFit/>
+          </a:bodyPr>
+          <a:lstStyle/>
+          <a:p>
+            <a:r>
+              <a:rPr lang="en-GB" sz="1100" dirty="0"/>
+              <a:t>Advanced Obesity Surgery</a:t>
+            </a:r>
+          </a:p>
+          <a:p>
+            <a:pPr algn="r"/>
+            <a:r>
+              <a:rPr lang="en-GB" sz="800" dirty="0"/>
+              <a:t>©Copyright 2022. All Rights Reserved.</a:t>
+            </a:r>
+          </a:p>
+        </p:txBody>
+      </p:sp>
+      <p:sp>
+        <p:nvSpPr>
+          <p:cNvPr id="7" name="TextBox 6">
+            <a:extLst>
+              <a:ext uri="{FF2B5EF4-FFF2-40B4-BE49-F238E27FC236}">
+                <a16:creationId xmlns:a16="http://schemas.microsoft.com/office/drawing/2014/main" id="{02E92B9E-10CC-4B7E-B10C-143690395DE5}"/>
+              </a:ext>
+            </a:extLst>
+          </p:cNvPr>
+          <p:cNvSpPr txBox="1"/>
+          <p:nvPr/>
+        </p:nvSpPr>
+        <p:spPr>
+          <a:xfrm>
+            <a:off x="3761623" y="9733421"/>
+            <a:ext cx="2820003" cy="261610"/>
+          </a:xfrm>
+          <a:prstGeom prst="rect">
+            <a:avLst/>
+          </a:prstGeom>
+          <a:noFill/>
+        </p:spPr>
+        <p:txBody>
+          <a:bodyPr wrap="none" rtlCol="0">
+            <a:spAutoFit/>
+          </a:bodyPr>
+          <a:lstStyle/>
+          <a:p>
+            <a:r>
+              <a:rPr lang="en-GB" sz="1100" dirty="0"/>
+              <a:t>Blog        FAQ        Contact us        Privacy Policy</a:t>
+            </a:r>
+          </a:p>
+        </p:txBody>
+      </p:sp>
+      <p:pic>
+        <p:nvPicPr>
+          <p:cNvPr id="8" name="Picture 2" descr="Center for Metabolic and Obesity Surgery">
+            <a:extLst>
+              <a:ext uri="{FF2B5EF4-FFF2-40B4-BE49-F238E27FC236}">
+                <a16:creationId xmlns:a16="http://schemas.microsoft.com/office/drawing/2014/main" id="{51FC48F6-7BE2-48D2-A637-7F9307D99469}"/>
+              </a:ext>
+            </a:extLst>
+          </p:cNvPr>
+          <p:cNvPicPr>
+            <a:picLocks noChangeAspect="1" noChangeArrowheads="1"/>
+          </p:cNvPicPr>
+          <p:nvPr/>
+        </p:nvPicPr>
+        <p:blipFill>
+          <a:blip r:embed="rId3">
+            <a:extLst>
+              <a:ext uri="{BEBA8EAE-BF5A-486C-A8C5-ECC9F3942E4B}">
+                <a14:imgProps xmlns:a14="http://schemas.microsoft.com/office/drawing/2010/main">
+                  <a14:imgLayer r:embed="rId4">
+                    <a14:imgEffect>
+                      <a14:backgroundRemoval t="8163" b="89796" l="4219" r="95000">
+                        <a14:foregroundMark x1="7969" y1="48163" x2="7969" y2="48163"/>
+                        <a14:foregroundMark x1="4219" y1="62857" x2="4219" y2="62857"/>
+                        <a14:foregroundMark x1="14844" y1="48571" x2="14844" y2="48571"/>
+                        <a14:foregroundMark x1="23594" y1="54286" x2="23594" y2="54286"/>
+                        <a14:foregroundMark x1="30938" y1="54694" x2="30938" y2="54694"/>
+                        <a14:foregroundMark x1="38594" y1="53061" x2="38594" y2="53061"/>
+                        <a14:foregroundMark x1="47031" y1="50612" x2="47031" y2="50612"/>
+                        <a14:foregroundMark x1="64531" y1="50612" x2="64531" y2="50612"/>
+                        <a14:foregroundMark x1="72656" y1="53469" x2="72656" y2="53469"/>
+                        <a14:foregroundMark x1="81094" y1="53061" x2="81094" y2="53061"/>
+                        <a14:foregroundMark x1="85156" y1="54286" x2="85156" y2="54286"/>
+                        <a14:foregroundMark x1="90469" y1="51429" x2="90469" y2="51429"/>
+                        <a14:foregroundMark x1="95000" y1="59184" x2="95000" y2="59184"/>
+                        <a14:foregroundMark x1="68281" y1="30204" x2="68281" y2="30204"/>
+                        <a14:foregroundMark x1="73125" y1="28980" x2="73125" y2="28980"/>
+                        <a14:foregroundMark x1="73125" y1="8163" x2="73125" y2="8163"/>
+                        <a14:foregroundMark x1="67500" y1="13061" x2="67500" y2="13061"/>
+                        <a14:foregroundMark x1="72031" y1="17143" x2="72031" y2="17143"/>
+                        <a14:foregroundMark x1="68438" y1="22041" x2="68438" y2="22041"/>
+                        <a14:foregroundMark x1="69688" y1="17143" x2="69688" y2="17143"/>
+                        <a14:foregroundMark x1="57031" y1="83265" x2="57031" y2="83265"/>
+                        <a14:foregroundMark x1="62187" y1="83673" x2="62187" y2="83673"/>
+                        <a14:foregroundMark x1="66250" y1="79184" x2="66250" y2="79184"/>
+                        <a14:foregroundMark x1="68281" y1="82857" x2="68281" y2="82857"/>
+                        <a14:foregroundMark x1="72969" y1="82041" x2="72969" y2="82041"/>
+                        <a14:foregroundMark x1="77188" y1="84898" x2="77188" y2="84898"/>
+                        <a14:foregroundMark x1="76719" y1="82857" x2="76719" y2="82857"/>
+                        <a14:foregroundMark x1="79219" y1="82857" x2="79219" y2="82857"/>
+                        <a14:foregroundMark x1="84375" y1="81224" x2="84375" y2="81224"/>
+                        <a14:foregroundMark x1="86094" y1="82041" x2="86094" y2="82041"/>
+                        <a14:foregroundMark x1="86094" y1="77143" x2="86094" y2="77143"/>
+                        <a14:foregroundMark x1="87969" y1="83673" x2="87969" y2="83673"/>
+                        <a14:foregroundMark x1="92656" y1="82041" x2="92656" y2="82041"/>
+                        <a14:foregroundMark x1="72813" y1="23673" x2="72813" y2="23673"/>
+                        <a14:foregroundMark x1="71563" y1="20816" x2="71563" y2="20816"/>
+                        <a14:foregroundMark x1="5938" y1="55510" x2="5938" y2="55510"/>
+                        <a14:backgroundMark x1="7969" y1="46531" x2="7969" y2="46531"/>
+                        <a14:backgroundMark x1="32656" y1="51837" x2="32656" y2="51837"/>
+                        <a14:backgroundMark x1="63281" y1="83265" x2="63281" y2="83265"/>
+                        <a14:backgroundMark x1="69375" y1="82857" x2="69375" y2="82857"/>
+                        <a14:backgroundMark x1="73281" y1="84898" x2="73281" y2="84898"/>
+                        <a14:backgroundMark x1="80938" y1="83673" x2="80938" y2="83673"/>
+                        <a14:backgroundMark x1="89375" y1="84898" x2="89375" y2="84898"/>
+                        <a14:backgroundMark x1="69688" y1="22041" x2="69688" y2="22041"/>
+                        <a14:backgroundMark x1="72500" y1="20816" x2="72500" y2="20816"/>
+                        <a14:backgroundMark x1="8125" y1="48163" x2="8125" y2="48163"/>
+                        <a14:backgroundMark x1="7969" y1="48163" x2="7969" y2="48163"/>
+                        <a14:backgroundMark x1="6406" y1="55510" x2="6406" y2="55510"/>
+                        <a14:backgroundMark x1="77344" y1="85714" x2="77344" y2="85714"/>
+                        <a14:backgroundMark x1="73125" y1="82857" x2="73125" y2="82857"/>
+                        <a14:backgroundMark x1="77500" y1="84898" x2="77500" y2="84898"/>
+                      </a14:backgroundRemoval>
+                    </a14:imgEffect>
+                  </a14:imgLayer>
+                </a14:imgProps>
+              </a:ext>
+              <a:ext uri="{28A0092B-C50C-407E-A947-70E740481C1C}">
+                <a14:useLocalDpi xmlns:a14="http://schemas.microsoft.com/office/drawing/2010/main" val="0"/>
+              </a:ext>
+            </a:extLst>
+          </a:blip>
+          <a:srcRect/>
+          <a:stretch>
+            <a:fillRect/>
+          </a:stretch>
+        </p:blipFill>
+        <p:spPr bwMode="auto">
+          <a:xfrm>
+            <a:off x="276376" y="9736561"/>
+            <a:ext cx="1158153" cy="443355"/>
+          </a:xfrm>
+          <a:prstGeom prst="rect">
+            <a:avLst/>
+          </a:prstGeom>
+          <a:noFill/>
+          <a:ln>
+            <a:noFill/>
+          </a:ln>
+          <a:extLst>
+            <a:ext uri="{909E8E84-426E-40DD-AFC4-6F175D3DCCD1}">
+              <a14:hiddenFill xmlns:a14="http://schemas.microsoft.com/office/drawing/2010/main">
+                <a:solidFill>
+                  <a:srgbClr val="FFFFFF"/>
+                </a:solidFill>
+              </a14:hiddenFill>
+            </a:ext>
+          </a:extLst>
+        </p:spPr>
+      </p:pic>
+      <p:sp>
+        <p:nvSpPr>
+          <p:cNvPr id="9" name="TextBox 8">
+            <a:extLst>
+              <a:ext uri="{FF2B5EF4-FFF2-40B4-BE49-F238E27FC236}">
+                <a16:creationId xmlns:a16="http://schemas.microsoft.com/office/drawing/2014/main" id="{39794B87-1F4F-44BE-9347-FF79EEFCCC81}"/>
+              </a:ext>
+            </a:extLst>
+          </p:cNvPr>
+          <p:cNvSpPr txBox="1"/>
+          <p:nvPr/>
+        </p:nvSpPr>
+        <p:spPr>
+          <a:xfrm>
+            <a:off x="208205" y="10169772"/>
+            <a:ext cx="2219850" cy="461665"/>
+          </a:xfrm>
+          <a:prstGeom prst="rect">
+            <a:avLst/>
+          </a:prstGeom>
+          <a:noFill/>
+        </p:spPr>
+        <p:txBody>
+          <a:bodyPr wrap="square">
+            <a:spAutoFit/>
+          </a:bodyPr>
+          <a:lstStyle/>
+          <a:p>
+            <a:r>
+              <a:rPr lang="en-GB" sz="800" dirty="0"/>
+              <a:t>407-303-3820</a:t>
+            </a:r>
+          </a:p>
+          <a:p>
+            <a:r>
+              <a:rPr lang="en-GB" sz="800" dirty="0"/>
+              <a:t>410 Celebration Place, Suite 401</a:t>
+            </a:r>
+          </a:p>
+          <a:p>
+            <a:r>
+              <a:rPr lang="en-GB" sz="800" dirty="0"/>
+              <a:t>Celebration, FL 34747</a:t>
+            </a:r>
+          </a:p>
+        </p:txBody>
+      </p:sp>
+      <p:sp>
+        <p:nvSpPr>
+          <p:cNvPr id="12" name="TextBox 11">
+            <a:extLst>
+              <a:ext uri="{FF2B5EF4-FFF2-40B4-BE49-F238E27FC236}">
+                <a16:creationId xmlns:a16="http://schemas.microsoft.com/office/drawing/2014/main" id="{85F98AC0-756D-4573-83B1-C637DAD20CF5}"/>
+              </a:ext>
+            </a:extLst>
+          </p:cNvPr>
+          <p:cNvSpPr txBox="1"/>
+          <p:nvPr/>
+        </p:nvSpPr>
+        <p:spPr>
+          <a:xfrm>
+            <a:off x="272471" y="2690923"/>
+            <a:ext cx="3756190" cy="5447645"/>
+          </a:xfrm>
+          <a:prstGeom prst="rect">
+            <a:avLst/>
+          </a:prstGeom>
+          <a:noFill/>
+        </p:spPr>
+        <p:txBody>
+          <a:bodyPr wrap="square" rtlCol="0">
+            <a:spAutoFit/>
+          </a:bodyPr>
+          <a:lstStyle/>
+          <a:p>
+            <a:pPr algn="l"/>
+            <a:r>
+              <a:rPr lang="en-GB" sz="1800" b="1" i="0" dirty="0">
+                <a:solidFill>
+                  <a:srgbClr val="000000"/>
+                </a:solidFill>
+                <a:effectLst/>
+              </a:rPr>
+              <a:t>Your details</a:t>
+            </a:r>
+          </a:p>
+          <a:p>
+            <a:pPr algn="l"/>
+            <a:endParaRPr lang="en-GB" sz="1400" b="0" i="0" dirty="0">
+              <a:solidFill>
+                <a:srgbClr val="000000"/>
+              </a:solidFill>
+              <a:effectLst/>
+            </a:endParaRPr>
+          </a:p>
+          <a:p>
+            <a:pPr algn="l"/>
+            <a:r>
+              <a:rPr lang="en-GB" sz="1400" b="0" i="0" dirty="0">
+                <a:solidFill>
+                  <a:srgbClr val="000000"/>
+                </a:solidFill>
+                <a:effectLst/>
+              </a:rPr>
+              <a:t>First Name</a:t>
+            </a:r>
+          </a:p>
+          <a:p>
+            <a:pPr algn="l"/>
+            <a:endParaRPr lang="en-GB" sz="1400" b="0" i="0" dirty="0">
+              <a:solidFill>
+                <a:srgbClr val="000000"/>
+              </a:solidFill>
+              <a:effectLst/>
+            </a:endParaRPr>
+          </a:p>
+          <a:p>
+            <a:pPr algn="l"/>
+            <a:r>
+              <a:rPr lang="en-GB" sz="1400" b="0" i="0" dirty="0">
+                <a:solidFill>
+                  <a:srgbClr val="000000"/>
+                </a:solidFill>
+                <a:effectLst/>
+              </a:rPr>
+              <a:t>Last Name</a:t>
+            </a:r>
+          </a:p>
+          <a:p>
+            <a:pPr algn="l"/>
+            <a:endParaRPr lang="en-GB" sz="1400" b="0" i="0" dirty="0">
+              <a:solidFill>
+                <a:srgbClr val="000000"/>
+              </a:solidFill>
+              <a:effectLst/>
+            </a:endParaRPr>
+          </a:p>
+          <a:p>
+            <a:pPr algn="l"/>
+            <a:endParaRPr lang="en-GB" sz="1400" b="0" i="0" dirty="0">
+              <a:solidFill>
+                <a:srgbClr val="000000"/>
+              </a:solidFill>
+              <a:effectLst/>
+            </a:endParaRPr>
+          </a:p>
+          <a:p>
+            <a:pPr algn="l"/>
+            <a:endParaRPr lang="en-GB" sz="1400" b="0" i="0" dirty="0">
+              <a:solidFill>
+                <a:srgbClr val="000000"/>
+              </a:solidFill>
+              <a:effectLst/>
+            </a:endParaRPr>
+          </a:p>
+          <a:p>
+            <a:pPr marL="0" marR="0" lvl="0" indent="0" algn="l" defTabSz="457200" rtl="0" eaLnBrk="1" fontAlgn="auto" latinLnBrk="0" hangingPunct="1">
+              <a:lnSpc>
+                <a:spcPct val="100000"/>
+              </a:lnSpc>
+              <a:spcBef>
+                <a:spcPts val="0"/>
+              </a:spcBef>
+              <a:spcAft>
+                <a:spcPts val="0"/>
+              </a:spcAft>
+              <a:buClrTx/>
+              <a:buSzTx/>
+              <a:buFontTx/>
+              <a:buNone/>
+              <a:tabLst/>
+              <a:defRPr/>
+            </a:pPr>
+            <a:r>
+              <a:rPr kumimoji="0" lang="en-GB" sz="1800" b="1" i="0" u="none" strike="noStrike" kern="1200" cap="none" spc="0" normalizeH="0" baseline="0" noProof="0" dirty="0">
+                <a:ln>
+                  <a:noFill/>
+                </a:ln>
+                <a:solidFill>
+                  <a:srgbClr val="000000"/>
+                </a:solidFill>
+                <a:effectLst/>
+                <a:uLnTx/>
+                <a:uFillTx/>
+                <a:latin typeface="Calibri" panose="020F0502020204030204"/>
+                <a:ea typeface="+mn-ea"/>
+                <a:cs typeface="+mn-cs"/>
+              </a:rPr>
+              <a:t>Insurance details</a:t>
+            </a:r>
+          </a:p>
+          <a:p>
+            <a:pPr algn="l"/>
+            <a:endParaRPr lang="en-GB" sz="1400" dirty="0">
+              <a:solidFill>
+                <a:srgbClr val="000000"/>
+              </a:solidFill>
+            </a:endParaRPr>
+          </a:p>
+          <a:p>
+            <a:pPr algn="l"/>
+            <a:r>
+              <a:rPr lang="en-GB" sz="1400" b="0" i="0" dirty="0">
+                <a:solidFill>
+                  <a:srgbClr val="000000"/>
+                </a:solidFill>
+                <a:effectLst/>
+              </a:rPr>
+              <a:t>Insurance provider</a:t>
+            </a:r>
+          </a:p>
+          <a:p>
+            <a:pPr algn="l"/>
+            <a:endParaRPr lang="en-GB" sz="1400" b="0" i="0" dirty="0">
+              <a:solidFill>
+                <a:srgbClr val="000000"/>
+              </a:solidFill>
+              <a:effectLst/>
+            </a:endParaRPr>
+          </a:p>
+          <a:p>
+            <a:pPr algn="l"/>
+            <a:endParaRPr lang="en-GB" sz="1400" dirty="0">
+              <a:solidFill>
+                <a:srgbClr val="000000"/>
+              </a:solidFill>
+            </a:endParaRPr>
+          </a:p>
+          <a:p>
+            <a:pPr algn="l"/>
+            <a:endParaRPr lang="en-GB" sz="1400" dirty="0">
+              <a:solidFill>
+                <a:srgbClr val="000000"/>
+              </a:solidFill>
+            </a:endParaRPr>
+          </a:p>
+          <a:p>
+            <a:pPr marL="0" marR="0" lvl="0" indent="0" algn="l" defTabSz="457200" rtl="0" eaLnBrk="1" fontAlgn="auto" latinLnBrk="0" hangingPunct="1">
+              <a:lnSpc>
+                <a:spcPct val="100000"/>
+              </a:lnSpc>
+              <a:spcBef>
+                <a:spcPts val="0"/>
+              </a:spcBef>
+              <a:spcAft>
+                <a:spcPts val="0"/>
+              </a:spcAft>
+              <a:buClrTx/>
+              <a:buSzTx/>
+              <a:buFontTx/>
+              <a:buNone/>
+              <a:tabLst/>
+              <a:defRPr/>
+            </a:pPr>
+            <a:r>
+              <a:rPr kumimoji="0" lang="en-GB" sz="1800" b="1" i="0" u="none" strike="noStrike" kern="1200" cap="none" spc="0" normalizeH="0" baseline="0" noProof="0" dirty="0">
+                <a:ln>
+                  <a:noFill/>
+                </a:ln>
+                <a:solidFill>
+                  <a:srgbClr val="000000"/>
+                </a:solidFill>
+                <a:effectLst/>
+                <a:uLnTx/>
+                <a:uFillTx/>
+                <a:latin typeface="Calibri" panose="020F0502020204030204"/>
+                <a:ea typeface="+mn-ea"/>
+                <a:cs typeface="+mn-cs"/>
+              </a:rPr>
+              <a:t>Reason for contact</a:t>
+            </a:r>
+          </a:p>
+          <a:p>
+            <a:pPr algn="l"/>
+            <a:endParaRPr lang="en-GB" sz="1400" b="0" i="0" dirty="0">
+              <a:solidFill>
+                <a:srgbClr val="000000"/>
+              </a:solidFill>
+              <a:effectLst/>
+            </a:endParaRPr>
+          </a:p>
+          <a:p>
+            <a:pPr algn="l"/>
+            <a:r>
+              <a:rPr lang="en-GB" sz="1400" b="0" i="0" dirty="0">
+                <a:solidFill>
+                  <a:srgbClr val="000000"/>
+                </a:solidFill>
+                <a:effectLst/>
+              </a:rPr>
+              <a:t>Previously had bariatric surgery? </a:t>
+            </a:r>
+            <a:r>
+              <a:rPr lang="en-GB" sz="1400" b="0" i="0" dirty="0">
+                <a:solidFill>
+                  <a:schemeClr val="bg1">
+                    <a:lumMod val="50000"/>
+                  </a:schemeClr>
+                </a:solidFill>
+                <a:effectLst/>
+              </a:rPr>
+              <a:t>No</a:t>
+            </a:r>
+          </a:p>
+          <a:p>
+            <a:pPr algn="l"/>
+            <a:r>
+              <a:rPr lang="en-GB" sz="1400" dirty="0">
+                <a:solidFill>
+                  <a:srgbClr val="000000"/>
+                </a:solidFill>
+              </a:rPr>
+              <a:t>Obesity-related medical problems? </a:t>
+            </a:r>
+            <a:r>
+              <a:rPr lang="en-GB" sz="1400" b="0" i="0" dirty="0">
+                <a:solidFill>
+                  <a:schemeClr val="bg1">
+                    <a:lumMod val="50000"/>
+                  </a:schemeClr>
+                </a:solidFill>
+                <a:effectLst/>
+              </a:rPr>
+              <a:t>No</a:t>
+            </a:r>
+          </a:p>
+          <a:p>
+            <a:pPr algn="l"/>
+            <a:r>
+              <a:rPr lang="en-GB" sz="1400" b="0" i="0" dirty="0">
+                <a:solidFill>
+                  <a:srgbClr val="000000"/>
+                </a:solidFill>
+                <a:effectLst/>
+              </a:rPr>
+              <a:t>Height </a:t>
+            </a:r>
+            <a:r>
+              <a:rPr lang="en-GB" sz="1400" dirty="0">
+                <a:solidFill>
+                  <a:schemeClr val="bg1">
+                    <a:lumMod val="50000"/>
+                  </a:schemeClr>
+                </a:solidFill>
+              </a:rPr>
+              <a:t>5’4”</a:t>
+            </a:r>
+          </a:p>
+          <a:p>
+            <a:pPr algn="l"/>
+            <a:r>
+              <a:rPr lang="en-GB" sz="1400" b="0" i="0" dirty="0">
+                <a:solidFill>
+                  <a:srgbClr val="000000"/>
+                </a:solidFill>
+                <a:effectLst/>
+              </a:rPr>
+              <a:t>Weight </a:t>
+            </a:r>
+            <a:r>
+              <a:rPr lang="en-GB" sz="1400" b="0" i="0" dirty="0">
+                <a:solidFill>
+                  <a:schemeClr val="bg1">
+                    <a:lumMod val="50000"/>
+                  </a:schemeClr>
+                </a:solidFill>
+                <a:effectLst/>
+              </a:rPr>
+              <a:t>250 lbs</a:t>
+            </a:r>
+            <a:endParaRPr lang="en-GB" sz="1400" dirty="0">
+              <a:solidFill>
+                <a:schemeClr val="bg1">
+                  <a:lumMod val="50000"/>
+                </a:schemeClr>
+              </a:solidFill>
+            </a:endParaRPr>
+          </a:p>
+          <a:p>
+            <a:pPr algn="l"/>
+            <a:endParaRPr lang="en-GB" sz="1400" dirty="0">
+              <a:solidFill>
+                <a:srgbClr val="000000"/>
+              </a:solidFill>
+            </a:endParaRPr>
+          </a:p>
+          <a:p>
+            <a:pPr algn="l"/>
+            <a:r>
+              <a:rPr lang="en-GB" sz="1400" dirty="0">
+                <a:solidFill>
+                  <a:srgbClr val="000000"/>
+                </a:solidFill>
+              </a:rPr>
+              <a:t>What type of surgery are you interested in?</a:t>
+            </a:r>
+          </a:p>
+          <a:p>
+            <a:pPr algn="l"/>
+            <a:r>
+              <a:rPr lang="en-GB" sz="1400" b="0" i="0" dirty="0">
+                <a:solidFill>
+                  <a:schemeClr val="bg1">
+                    <a:lumMod val="50000"/>
+                  </a:schemeClr>
+                </a:solidFill>
+                <a:effectLst/>
+              </a:rPr>
+              <a:t>Need help? Click here for more information.</a:t>
+            </a:r>
+          </a:p>
+          <a:p>
+            <a:pPr algn="l"/>
+            <a:endParaRPr lang="en-GB" sz="1400" dirty="0">
+              <a:solidFill>
+                <a:schemeClr val="bg1">
+                  <a:lumMod val="50000"/>
+                </a:schemeClr>
+              </a:solidFill>
+            </a:endParaRPr>
+          </a:p>
+        </p:txBody>
+      </p:sp>
+      <p:pic>
+        <p:nvPicPr>
+          <p:cNvPr id="28" name="Picture 27">
+            <a:extLst>
+              <a:ext uri="{FF2B5EF4-FFF2-40B4-BE49-F238E27FC236}">
+                <a16:creationId xmlns:a16="http://schemas.microsoft.com/office/drawing/2014/main" id="{344B7B98-FAA8-4986-A881-73F219C01E5A}"/>
+              </a:ext>
+            </a:extLst>
+          </p:cNvPr>
+          <p:cNvPicPr>
+            <a:picLocks noChangeAspect="1"/>
+          </p:cNvPicPr>
+          <p:nvPr/>
+        </p:nvPicPr>
+        <p:blipFill>
+          <a:blip r:embed="rId5"/>
+          <a:stretch>
+            <a:fillRect/>
+          </a:stretch>
+        </p:blipFill>
+        <p:spPr>
+          <a:xfrm>
+            <a:off x="0" y="14"/>
+            <a:ext cx="6858000" cy="797912"/>
+          </a:xfrm>
+          <a:prstGeom prst="rect">
+            <a:avLst/>
+          </a:prstGeom>
+        </p:spPr>
+      </p:pic>
+      <p:sp>
+        <p:nvSpPr>
+          <p:cNvPr id="29" name="TextBox 28">
+            <a:extLst>
+              <a:ext uri="{FF2B5EF4-FFF2-40B4-BE49-F238E27FC236}">
+                <a16:creationId xmlns:a16="http://schemas.microsoft.com/office/drawing/2014/main" id="{0E85BCCA-8B90-4106-BE39-B3AC0BE15B7B}"/>
+              </a:ext>
+            </a:extLst>
+          </p:cNvPr>
+          <p:cNvSpPr txBox="1"/>
+          <p:nvPr/>
+        </p:nvSpPr>
+        <p:spPr>
+          <a:xfrm>
+            <a:off x="3425097" y="2690923"/>
+            <a:ext cx="3156529" cy="3508653"/>
+          </a:xfrm>
+          <a:prstGeom prst="rect">
+            <a:avLst/>
+          </a:prstGeom>
+          <a:noFill/>
+        </p:spPr>
+        <p:txBody>
+          <a:bodyPr wrap="square" rtlCol="0">
+            <a:spAutoFit/>
+          </a:bodyPr>
+          <a:lstStyle/>
+          <a:p>
+            <a:pPr algn="l"/>
+            <a:r>
+              <a:rPr lang="en-GB" sz="1800" b="1" i="0" dirty="0">
+                <a:solidFill>
+                  <a:srgbClr val="000000"/>
+                </a:solidFill>
+                <a:effectLst/>
+              </a:rPr>
+              <a:t> </a:t>
+            </a:r>
+          </a:p>
+          <a:p>
+            <a:pPr algn="l"/>
+            <a:endParaRPr lang="en-GB" sz="1400" b="0" i="0" dirty="0">
+              <a:solidFill>
+                <a:srgbClr val="000000"/>
+              </a:solidFill>
+              <a:effectLst/>
+            </a:endParaRPr>
+          </a:p>
+          <a:p>
+            <a:pPr algn="l"/>
+            <a:r>
+              <a:rPr lang="en-GB" sz="1400" dirty="0">
+                <a:solidFill>
+                  <a:srgbClr val="000000"/>
+                </a:solidFill>
+              </a:rPr>
+              <a:t>Email address</a:t>
+            </a:r>
+          </a:p>
+          <a:p>
+            <a:pPr algn="l"/>
+            <a:endParaRPr lang="en-GB" sz="1400" dirty="0">
+              <a:solidFill>
+                <a:srgbClr val="000000"/>
+              </a:solidFill>
+            </a:endParaRPr>
+          </a:p>
+          <a:p>
+            <a:pPr algn="l"/>
+            <a:r>
+              <a:rPr lang="en-GB" sz="1400" b="0" i="0" dirty="0">
+                <a:solidFill>
+                  <a:srgbClr val="000000"/>
+                </a:solidFill>
+                <a:effectLst/>
+              </a:rPr>
+              <a:t>Phone number</a:t>
+            </a:r>
+          </a:p>
+          <a:p>
+            <a:pPr algn="l"/>
+            <a:endParaRPr lang="en-GB" sz="1400" b="0" i="0" dirty="0">
+              <a:solidFill>
+                <a:srgbClr val="000000"/>
+              </a:solidFill>
+              <a:effectLst/>
+            </a:endParaRPr>
+          </a:p>
+          <a:p>
+            <a:pPr algn="l"/>
+            <a:endParaRPr lang="en-GB" sz="1400" b="0" i="0" dirty="0">
+              <a:solidFill>
+                <a:srgbClr val="000000"/>
+              </a:solidFill>
+              <a:effectLst/>
+            </a:endParaRPr>
+          </a:p>
+          <a:p>
+            <a:pPr algn="l"/>
+            <a:endParaRPr lang="en-GB" sz="1400" b="0" i="0" dirty="0">
+              <a:solidFill>
+                <a:srgbClr val="000000"/>
+              </a:solidFill>
+              <a:effectLst/>
+            </a:endParaRPr>
+          </a:p>
+          <a:p>
+            <a:pPr marL="0" marR="0" lvl="0" indent="0" algn="l" defTabSz="457200" rtl="0" eaLnBrk="1" fontAlgn="auto" latinLnBrk="0" hangingPunct="1">
+              <a:lnSpc>
+                <a:spcPct val="100000"/>
+              </a:lnSpc>
+              <a:spcBef>
+                <a:spcPts val="0"/>
+              </a:spcBef>
+              <a:spcAft>
+                <a:spcPts val="0"/>
+              </a:spcAft>
+              <a:buClrTx/>
+              <a:buSzTx/>
+              <a:buFontTx/>
+              <a:buNone/>
+              <a:tabLst/>
+              <a:defRPr/>
+            </a:pPr>
+            <a:r>
+              <a:rPr kumimoji="0" lang="en-GB" sz="1800" b="1" i="0" u="none" strike="noStrike" kern="1200" cap="none" spc="0" normalizeH="0" baseline="0" noProof="0" dirty="0">
+                <a:ln>
+                  <a:noFill/>
+                </a:ln>
+                <a:solidFill>
+                  <a:srgbClr val="000000"/>
+                </a:solidFill>
+                <a:effectLst/>
+                <a:uLnTx/>
+                <a:uFillTx/>
+                <a:latin typeface="Calibri" panose="020F0502020204030204"/>
+                <a:ea typeface="+mn-ea"/>
+                <a:cs typeface="+mn-cs"/>
+              </a:rPr>
+              <a:t> </a:t>
+            </a:r>
+          </a:p>
+          <a:p>
+            <a:pPr algn="l"/>
+            <a:endParaRPr lang="en-GB" sz="1400" dirty="0">
+              <a:solidFill>
+                <a:srgbClr val="000000"/>
+              </a:solidFill>
+            </a:endParaRPr>
+          </a:p>
+          <a:p>
+            <a:pPr algn="l"/>
+            <a:r>
+              <a:rPr lang="en-GB" sz="1400" dirty="0">
+                <a:solidFill>
+                  <a:srgbClr val="000000"/>
+                </a:solidFill>
+              </a:rPr>
+              <a:t>Insurance number</a:t>
+            </a:r>
+          </a:p>
+          <a:p>
+            <a:pPr algn="l"/>
+            <a:endParaRPr lang="en-GB" sz="1400" b="0" i="0" dirty="0">
+              <a:solidFill>
+                <a:srgbClr val="000000"/>
+              </a:solidFill>
+              <a:effectLst/>
+            </a:endParaRPr>
+          </a:p>
+          <a:p>
+            <a:pPr algn="l"/>
+            <a:endParaRPr lang="en-GB" sz="1400" dirty="0">
+              <a:solidFill>
+                <a:srgbClr val="000000"/>
+              </a:solidFill>
+            </a:endParaRPr>
+          </a:p>
+          <a:p>
+            <a:pPr marL="0" marR="0" lvl="0" indent="0" algn="l" defTabSz="457200" rtl="0" eaLnBrk="1" fontAlgn="auto" latinLnBrk="0" hangingPunct="1">
+              <a:lnSpc>
+                <a:spcPct val="100000"/>
+              </a:lnSpc>
+              <a:spcBef>
+                <a:spcPts val="0"/>
+              </a:spcBef>
+              <a:spcAft>
+                <a:spcPts val="0"/>
+              </a:spcAft>
+              <a:buClrTx/>
+              <a:buSzTx/>
+              <a:buFontTx/>
+              <a:buNone/>
+              <a:tabLst/>
+              <a:defRPr/>
+            </a:pPr>
+            <a:r>
+              <a:rPr kumimoji="0" lang="en-GB" sz="1800" b="1" i="0" u="none" strike="noStrike" kern="1200" cap="none" spc="0" normalizeH="0" baseline="0" noProof="0" dirty="0">
+                <a:ln>
+                  <a:noFill/>
+                </a:ln>
+                <a:solidFill>
+                  <a:srgbClr val="000000"/>
+                </a:solidFill>
+                <a:effectLst/>
+                <a:uLnTx/>
+                <a:uFillTx/>
+                <a:latin typeface="Calibri" panose="020F0502020204030204"/>
+                <a:ea typeface="+mn-ea"/>
+                <a:cs typeface="+mn-cs"/>
+              </a:rPr>
+              <a:t> </a:t>
+            </a:r>
+          </a:p>
+          <a:p>
+            <a:pPr algn="l"/>
+            <a:endParaRPr lang="en-GB" sz="1400" b="0" i="0" dirty="0">
+              <a:solidFill>
+                <a:srgbClr val="000000"/>
+              </a:solidFill>
+              <a:effectLst/>
+            </a:endParaRPr>
+          </a:p>
+        </p:txBody>
+      </p:sp>
+      <p:sp>
+        <p:nvSpPr>
+          <p:cNvPr id="30" name="Rectangle 29">
+            <a:extLst>
+              <a:ext uri="{FF2B5EF4-FFF2-40B4-BE49-F238E27FC236}">
+                <a16:creationId xmlns:a16="http://schemas.microsoft.com/office/drawing/2014/main" id="{E7A86401-3D3D-4E83-8949-E2E6760769F5}"/>
+              </a:ext>
+            </a:extLst>
+          </p:cNvPr>
+          <p:cNvSpPr/>
+          <p:nvPr/>
+        </p:nvSpPr>
+        <p:spPr>
+          <a:xfrm>
+            <a:off x="337291" y="3423794"/>
+            <a:ext cx="2090763" cy="233806"/>
+          </a:xfrm>
+          <a:prstGeom prst="rect">
+            <a:avLst/>
+          </a:prstGeom>
+          <a:solidFill>
+            <a:schemeClr val="bg2"/>
+          </a:solidFill>
+          <a:ln>
+            <a:solidFill>
+              <a:schemeClr val="bg1"/>
+            </a:solidFill>
+          </a:ln>
+        </p:spPr>
+        <p:style>
+          <a:lnRef idx="2">
+            <a:schemeClr val="accent1">
+              <a:shade val="50000"/>
+            </a:schemeClr>
+          </a:lnRef>
+          <a:fillRef idx="1">
+            <a:schemeClr val="accent1"/>
+          </a:fillRef>
+          <a:effectRef idx="0">
+            <a:schemeClr val="accent1"/>
+          </a:effectRef>
+          <a:fontRef idx="minor">
+            <a:schemeClr val="lt1"/>
+          </a:fontRef>
+        </p:style>
+        <p:txBody>
+          <a:bodyPr rtlCol="0" anchor="ctr"/>
+          <a:lstStyle/>
+          <a:p>
+            <a:pPr algn="ctr"/>
+            <a:endParaRPr lang="en-GB"/>
+          </a:p>
+        </p:txBody>
+      </p:sp>
+      <p:sp>
+        <p:nvSpPr>
+          <p:cNvPr id="31" name="Rectangle 30">
+            <a:extLst>
+              <a:ext uri="{FF2B5EF4-FFF2-40B4-BE49-F238E27FC236}">
+                <a16:creationId xmlns:a16="http://schemas.microsoft.com/office/drawing/2014/main" id="{3897F25D-7AED-4832-B061-3830440D22BC}"/>
+              </a:ext>
+            </a:extLst>
+          </p:cNvPr>
+          <p:cNvSpPr/>
+          <p:nvPr/>
+        </p:nvSpPr>
+        <p:spPr>
+          <a:xfrm>
+            <a:off x="337290" y="3860245"/>
+            <a:ext cx="2090763" cy="233806"/>
+          </a:xfrm>
+          <a:prstGeom prst="rect">
+            <a:avLst/>
+          </a:prstGeom>
+          <a:solidFill>
+            <a:schemeClr val="bg2"/>
+          </a:solidFill>
+          <a:ln>
+            <a:solidFill>
+              <a:schemeClr val="bg1"/>
+            </a:solidFill>
+          </a:ln>
+        </p:spPr>
+        <p:style>
+          <a:lnRef idx="2">
+            <a:schemeClr val="accent1">
+              <a:shade val="50000"/>
+            </a:schemeClr>
+          </a:lnRef>
+          <a:fillRef idx="1">
+            <a:schemeClr val="accent1"/>
+          </a:fillRef>
+          <a:effectRef idx="0">
+            <a:schemeClr val="accent1"/>
+          </a:effectRef>
+          <a:fontRef idx="minor">
+            <a:schemeClr val="lt1"/>
+          </a:fontRef>
+        </p:style>
+        <p:txBody>
+          <a:bodyPr rtlCol="0" anchor="ctr"/>
+          <a:lstStyle/>
+          <a:p>
+            <a:pPr algn="ctr"/>
+            <a:endParaRPr lang="en-GB"/>
+          </a:p>
+        </p:txBody>
+      </p:sp>
+      <p:sp>
+        <p:nvSpPr>
+          <p:cNvPr id="32" name="Rectangle 31">
+            <a:extLst>
+              <a:ext uri="{FF2B5EF4-FFF2-40B4-BE49-F238E27FC236}">
+                <a16:creationId xmlns:a16="http://schemas.microsoft.com/office/drawing/2014/main" id="{688CE72B-6449-4F70-BBEA-5F0337A2F022}"/>
+              </a:ext>
+            </a:extLst>
+          </p:cNvPr>
+          <p:cNvSpPr/>
+          <p:nvPr/>
+        </p:nvSpPr>
+        <p:spPr>
+          <a:xfrm>
+            <a:off x="3493820" y="3423777"/>
+            <a:ext cx="2090763" cy="233806"/>
+          </a:xfrm>
+          <a:prstGeom prst="rect">
+            <a:avLst/>
+          </a:prstGeom>
+          <a:solidFill>
+            <a:schemeClr val="bg2"/>
+          </a:solidFill>
+          <a:ln>
+            <a:solidFill>
+              <a:schemeClr val="bg1"/>
+            </a:solidFill>
+          </a:ln>
+        </p:spPr>
+        <p:style>
+          <a:lnRef idx="2">
+            <a:schemeClr val="accent1">
+              <a:shade val="50000"/>
+            </a:schemeClr>
+          </a:lnRef>
+          <a:fillRef idx="1">
+            <a:schemeClr val="accent1"/>
+          </a:fillRef>
+          <a:effectRef idx="0">
+            <a:schemeClr val="accent1"/>
+          </a:effectRef>
+          <a:fontRef idx="minor">
+            <a:schemeClr val="lt1"/>
+          </a:fontRef>
+        </p:style>
+        <p:txBody>
+          <a:bodyPr rtlCol="0" anchor="ctr"/>
+          <a:lstStyle/>
+          <a:p>
+            <a:pPr algn="ctr"/>
+            <a:endParaRPr lang="en-GB"/>
+          </a:p>
+        </p:txBody>
+      </p:sp>
+      <p:sp>
+        <p:nvSpPr>
+          <p:cNvPr id="33" name="Rectangle 32">
+            <a:extLst>
+              <a:ext uri="{FF2B5EF4-FFF2-40B4-BE49-F238E27FC236}">
+                <a16:creationId xmlns:a16="http://schemas.microsoft.com/office/drawing/2014/main" id="{1C793425-35D2-46DB-B5A4-B2F1AC1528B9}"/>
+              </a:ext>
+            </a:extLst>
+          </p:cNvPr>
+          <p:cNvSpPr/>
+          <p:nvPr/>
+        </p:nvSpPr>
+        <p:spPr>
+          <a:xfrm>
+            <a:off x="3495490" y="3859878"/>
+            <a:ext cx="2090763" cy="233806"/>
+          </a:xfrm>
+          <a:prstGeom prst="rect">
+            <a:avLst/>
+          </a:prstGeom>
+          <a:solidFill>
+            <a:schemeClr val="bg2"/>
+          </a:solidFill>
+          <a:ln>
+            <a:solidFill>
+              <a:schemeClr val="bg1"/>
+            </a:solidFill>
+          </a:ln>
+        </p:spPr>
+        <p:style>
+          <a:lnRef idx="2">
+            <a:schemeClr val="accent1">
+              <a:shade val="50000"/>
+            </a:schemeClr>
+          </a:lnRef>
+          <a:fillRef idx="1">
+            <a:schemeClr val="accent1"/>
+          </a:fillRef>
+          <a:effectRef idx="0">
+            <a:schemeClr val="accent1"/>
+          </a:effectRef>
+          <a:fontRef idx="minor">
+            <a:schemeClr val="lt1"/>
+          </a:fontRef>
+        </p:style>
+        <p:txBody>
+          <a:bodyPr rtlCol="0" anchor="ctr"/>
+          <a:lstStyle/>
+          <a:p>
+            <a:pPr algn="ctr"/>
+            <a:endParaRPr lang="en-GB"/>
+          </a:p>
+        </p:txBody>
+      </p:sp>
+      <p:sp>
+        <p:nvSpPr>
+          <p:cNvPr id="34" name="Rectangle 33">
+            <a:extLst>
+              <a:ext uri="{FF2B5EF4-FFF2-40B4-BE49-F238E27FC236}">
+                <a16:creationId xmlns:a16="http://schemas.microsoft.com/office/drawing/2014/main" id="{0D8297A4-7ED9-46C2-B441-F1233F0E6167}"/>
+              </a:ext>
+            </a:extLst>
+          </p:cNvPr>
+          <p:cNvSpPr/>
+          <p:nvPr/>
+        </p:nvSpPr>
+        <p:spPr>
+          <a:xfrm>
+            <a:off x="337290" y="5177452"/>
+            <a:ext cx="2090763" cy="233806"/>
+          </a:xfrm>
+          <a:prstGeom prst="rect">
+            <a:avLst/>
+          </a:prstGeom>
+          <a:solidFill>
+            <a:schemeClr val="bg2"/>
+          </a:solidFill>
+          <a:ln>
+            <a:solidFill>
+              <a:schemeClr val="bg1"/>
+            </a:solidFill>
+          </a:ln>
+        </p:spPr>
+        <p:style>
+          <a:lnRef idx="2">
+            <a:schemeClr val="accent1">
+              <a:shade val="50000"/>
+            </a:schemeClr>
+          </a:lnRef>
+          <a:fillRef idx="1">
+            <a:schemeClr val="accent1"/>
+          </a:fillRef>
+          <a:effectRef idx="0">
+            <a:schemeClr val="accent1"/>
+          </a:effectRef>
+          <a:fontRef idx="minor">
+            <a:schemeClr val="lt1"/>
+          </a:fontRef>
+        </p:style>
+        <p:txBody>
+          <a:bodyPr rtlCol="0" anchor="ctr"/>
+          <a:lstStyle/>
+          <a:p>
+            <a:pPr algn="ctr"/>
+            <a:endParaRPr lang="en-GB"/>
+          </a:p>
+        </p:txBody>
+      </p:sp>
+      <p:sp>
+        <p:nvSpPr>
+          <p:cNvPr id="35" name="Rectangle 34">
+            <a:extLst>
+              <a:ext uri="{FF2B5EF4-FFF2-40B4-BE49-F238E27FC236}">
+                <a16:creationId xmlns:a16="http://schemas.microsoft.com/office/drawing/2014/main" id="{90F340E3-865F-4BB9-94E0-B1E4C9C04310}"/>
+              </a:ext>
+            </a:extLst>
+          </p:cNvPr>
+          <p:cNvSpPr/>
+          <p:nvPr/>
+        </p:nvSpPr>
+        <p:spPr>
+          <a:xfrm>
+            <a:off x="3493819" y="5177452"/>
+            <a:ext cx="2090763" cy="233806"/>
+          </a:xfrm>
+          <a:prstGeom prst="rect">
+            <a:avLst/>
+          </a:prstGeom>
+          <a:solidFill>
+            <a:schemeClr val="bg2"/>
+          </a:solidFill>
+          <a:ln>
+            <a:solidFill>
+              <a:schemeClr val="bg1"/>
+            </a:solidFill>
+          </a:ln>
+        </p:spPr>
+        <p:style>
+          <a:lnRef idx="2">
+            <a:schemeClr val="accent1">
+              <a:shade val="50000"/>
+            </a:schemeClr>
+          </a:lnRef>
+          <a:fillRef idx="1">
+            <a:schemeClr val="accent1"/>
+          </a:fillRef>
+          <a:effectRef idx="0">
+            <a:schemeClr val="accent1"/>
+          </a:effectRef>
+          <a:fontRef idx="minor">
+            <a:schemeClr val="lt1"/>
+          </a:fontRef>
+        </p:style>
+        <p:txBody>
+          <a:bodyPr rtlCol="0" anchor="ctr"/>
+          <a:lstStyle/>
+          <a:p>
+            <a:pPr algn="ctr"/>
+            <a:endParaRPr lang="en-GB"/>
+          </a:p>
+        </p:txBody>
+      </p:sp>
+      <p:sp>
+        <p:nvSpPr>
+          <p:cNvPr id="36" name="Rectangle 35">
+            <a:extLst>
+              <a:ext uri="{FF2B5EF4-FFF2-40B4-BE49-F238E27FC236}">
+                <a16:creationId xmlns:a16="http://schemas.microsoft.com/office/drawing/2014/main" id="{B03E5DF9-618E-49A0-B998-82E9E70CA8BD}"/>
+              </a:ext>
+            </a:extLst>
+          </p:cNvPr>
+          <p:cNvSpPr/>
+          <p:nvPr/>
+        </p:nvSpPr>
+        <p:spPr>
+          <a:xfrm>
+            <a:off x="337289" y="7835242"/>
+            <a:ext cx="3087808" cy="231401"/>
+          </a:xfrm>
+          <a:prstGeom prst="rect">
+            <a:avLst/>
+          </a:prstGeom>
+          <a:solidFill>
+            <a:schemeClr val="bg2"/>
+          </a:solidFill>
+          <a:ln>
+            <a:solidFill>
+              <a:schemeClr val="bg1"/>
+            </a:solidFill>
+          </a:ln>
+        </p:spPr>
+        <p:style>
+          <a:lnRef idx="2">
+            <a:schemeClr val="accent1">
+              <a:shade val="50000"/>
+            </a:schemeClr>
+          </a:lnRef>
+          <a:fillRef idx="1">
+            <a:schemeClr val="accent1"/>
+          </a:fillRef>
+          <a:effectRef idx="0">
+            <a:schemeClr val="accent1"/>
+          </a:effectRef>
+          <a:fontRef idx="minor">
+            <a:schemeClr val="lt1"/>
+          </a:fontRef>
+        </p:style>
+        <p:txBody>
+          <a:bodyPr rtlCol="0" anchor="ctr"/>
+          <a:lstStyle/>
+          <a:p>
+            <a:pPr algn="ctr"/>
+            <a:endParaRPr lang="en-GB"/>
+          </a:p>
+        </p:txBody>
+      </p:sp>
+      <p:sp>
+        <p:nvSpPr>
+          <p:cNvPr id="38" name="Freeform: Shape 37">
+            <a:extLst>
+              <a:ext uri="{FF2B5EF4-FFF2-40B4-BE49-F238E27FC236}">
+                <a16:creationId xmlns:a16="http://schemas.microsoft.com/office/drawing/2014/main" id="{CA4E453E-CA4C-457F-835D-F1F0D83DCF57}"/>
+              </a:ext>
+            </a:extLst>
+          </p:cNvPr>
+          <p:cNvSpPr/>
+          <p:nvPr/>
+        </p:nvSpPr>
+        <p:spPr>
+          <a:xfrm rot="5400000">
+            <a:off x="3245825" y="7915079"/>
+            <a:ext cx="90415" cy="108000"/>
+          </a:xfrm>
+          <a:custGeom>
+            <a:avLst/>
+            <a:gdLst>
+              <a:gd name="connsiteX0" fmla="*/ 119063 w 319087"/>
+              <a:gd name="connsiteY0" fmla="*/ 0 h 533400"/>
+              <a:gd name="connsiteX1" fmla="*/ 0 w 319087"/>
+              <a:gd name="connsiteY1" fmla="*/ 0 h 533400"/>
+              <a:gd name="connsiteX2" fmla="*/ 200025 w 319087"/>
+              <a:gd name="connsiteY2" fmla="*/ 266700 h 533400"/>
+              <a:gd name="connsiteX3" fmla="*/ 0 w 319087"/>
+              <a:gd name="connsiteY3" fmla="*/ 533400 h 533400"/>
+              <a:gd name="connsiteX4" fmla="*/ 119063 w 319087"/>
+              <a:gd name="connsiteY4" fmla="*/ 533400 h 533400"/>
+              <a:gd name="connsiteX5" fmla="*/ 319088 w 319087"/>
+              <a:gd name="connsiteY5" fmla="*/ 266700 h 533400"/>
+              <a:gd name="connsiteX6" fmla="*/ 119063 w 319087"/>
+              <a:gd name="connsiteY6" fmla="*/ 0 h 533400"/>
+            </a:gdLst>
+            <a:ahLst/>
+            <a:cxnLst>
+              <a:cxn ang="0">
+                <a:pos x="connsiteX0" y="connsiteY0"/>
+              </a:cxn>
+              <a:cxn ang="0">
+                <a:pos x="connsiteX1" y="connsiteY1"/>
+              </a:cxn>
+              <a:cxn ang="0">
+                <a:pos x="connsiteX2" y="connsiteY2"/>
+              </a:cxn>
+              <a:cxn ang="0">
+                <a:pos x="connsiteX3" y="connsiteY3"/>
+              </a:cxn>
+              <a:cxn ang="0">
+                <a:pos x="connsiteX4" y="connsiteY4"/>
+              </a:cxn>
+              <a:cxn ang="0">
+                <a:pos x="connsiteX5" y="connsiteY5"/>
+              </a:cxn>
+              <a:cxn ang="0">
+                <a:pos x="connsiteX6" y="connsiteY6"/>
+              </a:cxn>
+            </a:cxnLst>
+            <a:rect l="l" t="t" r="r" b="b"/>
+            <a:pathLst>
+              <a:path w="319087" h="533400">
+                <a:moveTo>
+                  <a:pt x="119063" y="0"/>
+                </a:moveTo>
+                <a:lnTo>
+                  <a:pt x="0" y="0"/>
+                </a:lnTo>
+                <a:lnTo>
+                  <a:pt x="200025" y="266700"/>
+                </a:lnTo>
+                <a:lnTo>
+                  <a:pt x="0" y="533400"/>
+                </a:lnTo>
+                <a:lnTo>
+                  <a:pt x="119063" y="533400"/>
+                </a:lnTo>
+                <a:lnTo>
+                  <a:pt x="319088" y="266700"/>
+                </a:lnTo>
+                <a:lnTo>
+                  <a:pt x="119063" y="0"/>
+                </a:lnTo>
+                <a:close/>
+              </a:path>
+            </a:pathLst>
+          </a:custGeom>
+          <a:solidFill>
+            <a:schemeClr val="tx1"/>
+          </a:solidFill>
+          <a:ln w="9525" cap="flat">
+            <a:noFill/>
+            <a:prstDash val="solid"/>
+            <a:miter/>
+          </a:ln>
+        </p:spPr>
+        <p:txBody>
+          <a:bodyPr rot="0" spcFirstLastPara="0" vertOverflow="overflow" horzOverflow="overflow" vert="horz" wrap="square" lIns="91440" tIns="45720" rIns="91440" bIns="45720" numCol="1" spcCol="0" rtlCol="0" fromWordArt="0" anchor="ctr" anchorCtr="0" forceAA="0" compatLnSpc="1">
+            <a:prstTxWarp prst="textNoShape">
+              <a:avLst/>
+            </a:prstTxWarp>
+            <a:noAutofit/>
+          </a:bodyPr>
+          <a:lstStyle/>
+          <a:p>
+            <a:endParaRPr lang="en-GB" sz="1400"/>
+          </a:p>
+        </p:txBody>
+      </p:sp>
+      <p:sp>
+        <p:nvSpPr>
+          <p:cNvPr id="39" name="Rectangle: Diagonal Corners Rounded 38">
+            <a:extLst>
+              <a:ext uri="{FF2B5EF4-FFF2-40B4-BE49-F238E27FC236}">
+                <a16:creationId xmlns:a16="http://schemas.microsoft.com/office/drawing/2014/main" id="{09073B7E-74C0-4B1E-A4FE-937F101BBEDB}"/>
+              </a:ext>
+            </a:extLst>
+          </p:cNvPr>
+          <p:cNvSpPr/>
+          <p:nvPr/>
+        </p:nvSpPr>
+        <p:spPr>
+          <a:xfrm flipH="1">
+            <a:off x="337289" y="8515727"/>
+            <a:ext cx="1261691" cy="331045"/>
+          </a:xfrm>
+          <a:prstGeom prst="round2DiagRect">
+            <a:avLst/>
+          </a:prstGeom>
+          <a:solidFill>
+            <a:schemeClr val="accent1">
+              <a:lumMod val="60000"/>
+              <a:lumOff val="40000"/>
+            </a:schemeClr>
+          </a:solidFill>
+          <a:ln>
+            <a:noFill/>
+          </a:ln>
+        </p:spPr>
+        <p:style>
+          <a:lnRef idx="2">
+            <a:schemeClr val="accent1">
+              <a:shade val="50000"/>
+            </a:schemeClr>
+          </a:lnRef>
+          <a:fillRef idx="1">
+            <a:schemeClr val="accent1"/>
+          </a:fillRef>
+          <a:effectRef idx="0">
+            <a:schemeClr val="accent1"/>
+          </a:effectRef>
+          <a:fontRef idx="minor">
+            <a:schemeClr val="lt1"/>
+          </a:fontRef>
+        </p:style>
+        <p:txBody>
+          <a:bodyPr rtlCol="0" anchor="ctr"/>
+          <a:lstStyle/>
+          <a:p>
+            <a:pPr algn="ctr"/>
+            <a:r>
+              <a:rPr lang="en-GB" sz="1200" dirty="0"/>
+              <a:t>Submit</a:t>
+            </a:r>
+          </a:p>
+        </p:txBody>
+      </p:sp>
+    </p:spTree>
+    <p:extLst>
+      <p:ext uri="{BB962C8B-B14F-4D97-AF65-F5344CB8AC3E}">
+        <p14:creationId xmlns:p14="http://schemas.microsoft.com/office/powerpoint/2010/main" val="2598887623"/>
+      </p:ext>
+    </p:extLst>
+  </p:cSld>
+  <p:clrMapOvr>
+    <a:masterClrMapping/>
+  </p:clrMapOvr>
+</p:sld>
+</file>
+
+<file path=ppt/slides/slide15.xml><?xml version="1.0" encoding="utf-8"?>
+<p:sld xmlns:a="http://schemas.openxmlformats.org/drawingml/2006/main" xmlns:r="http://schemas.openxmlformats.org/officeDocument/2006/relationships" xmlns:p="http://schemas.openxmlformats.org/presentationml/2006/main">
+  <p:cSld>
+    <p:spTree>
+      <p:nvGrpSpPr>
+        <p:cNvPr id="1" name=""/>
+        <p:cNvGrpSpPr/>
+        <p:nvPr/>
+      </p:nvGrpSpPr>
+      <p:grpSpPr>
+        <a:xfrm>
+          <a:off x="0" y="0"/>
+          <a:ext cx="0" cy="0"/>
+          <a:chOff x="0" y="0"/>
+          <a:chExt cx="0" cy="0"/>
+        </a:xfrm>
+      </p:grpSpPr>
+      <p:pic>
+        <p:nvPicPr>
+          <p:cNvPr id="2" name="Picture 1">
+            <a:extLst>
+              <a:ext uri="{FF2B5EF4-FFF2-40B4-BE49-F238E27FC236}">
+                <a16:creationId xmlns:a16="http://schemas.microsoft.com/office/drawing/2014/main" id="{E3763B69-8364-486C-B0DE-58B1175F9FF4}"/>
+              </a:ext>
+            </a:extLst>
+          </p:cNvPr>
+          <p:cNvPicPr>
+            <a:picLocks noChangeAspect="1"/>
+          </p:cNvPicPr>
+          <p:nvPr/>
+        </p:nvPicPr>
+        <p:blipFill>
+          <a:blip r:embed="rId3"/>
+          <a:stretch>
+            <a:fillRect/>
+          </a:stretch>
+        </p:blipFill>
+        <p:spPr>
+          <a:xfrm>
+            <a:off x="0" y="-2063"/>
+            <a:ext cx="6858000" cy="799794"/>
+          </a:xfrm>
+          <a:prstGeom prst="rect">
+            <a:avLst/>
+          </a:prstGeom>
+        </p:spPr>
+      </p:pic>
+      <p:sp>
+        <p:nvSpPr>
+          <p:cNvPr id="3" name="Rectangle 2">
+            <a:extLst>
+              <a:ext uri="{FF2B5EF4-FFF2-40B4-BE49-F238E27FC236}">
+                <a16:creationId xmlns:a16="http://schemas.microsoft.com/office/drawing/2014/main" id="{A9A7E3B9-70C6-4A16-B6D8-EA3AFD3505F8}"/>
+              </a:ext>
+            </a:extLst>
+          </p:cNvPr>
+          <p:cNvSpPr/>
+          <p:nvPr/>
+        </p:nvSpPr>
+        <p:spPr>
+          <a:xfrm>
+            <a:off x="0" y="797731"/>
+            <a:ext cx="6858000" cy="1488269"/>
+          </a:xfrm>
+          <a:prstGeom prst="rect">
+            <a:avLst/>
+          </a:prstGeom>
+          <a:solidFill>
+            <a:schemeClr val="bg2">
+              <a:lumMod val="90000"/>
+            </a:schemeClr>
+          </a:solidFill>
+          <a:ln>
+            <a:noFill/>
+          </a:ln>
+        </p:spPr>
+        <p:style>
+          <a:lnRef idx="2">
+            <a:schemeClr val="accent1">
+              <a:shade val="50000"/>
+            </a:schemeClr>
+          </a:lnRef>
+          <a:fillRef idx="1">
+            <a:schemeClr val="accent1"/>
+          </a:fillRef>
+          <a:effectRef idx="0">
+            <a:schemeClr val="accent1"/>
+          </a:effectRef>
+          <a:fontRef idx="minor">
+            <a:schemeClr val="lt1"/>
+          </a:fontRef>
+        </p:style>
+        <p:txBody>
+          <a:bodyPr rtlCol="0" anchor="ctr"/>
+          <a:lstStyle/>
+          <a:p>
+            <a:pPr algn="ctr"/>
+            <a:endParaRPr lang="en-GB" dirty="0"/>
+          </a:p>
+        </p:txBody>
+      </p:sp>
+      <p:sp>
+        <p:nvSpPr>
+          <p:cNvPr id="4" name="TextBox 3">
+            <a:extLst>
+              <a:ext uri="{FF2B5EF4-FFF2-40B4-BE49-F238E27FC236}">
+                <a16:creationId xmlns:a16="http://schemas.microsoft.com/office/drawing/2014/main" id="{7A2D3681-C2D0-4BF3-AB9D-9E626DD934BD}"/>
+              </a:ext>
+            </a:extLst>
+          </p:cNvPr>
+          <p:cNvSpPr txBox="1"/>
+          <p:nvPr/>
+        </p:nvSpPr>
+        <p:spPr>
+          <a:xfrm>
+            <a:off x="4523823" y="1087875"/>
+            <a:ext cx="1966885" cy="461665"/>
+          </a:xfrm>
+          <a:prstGeom prst="rect">
+            <a:avLst/>
+          </a:prstGeom>
+          <a:noFill/>
+        </p:spPr>
+        <p:txBody>
+          <a:bodyPr wrap="none" rtlCol="0">
+            <a:spAutoFit/>
+          </a:bodyPr>
+          <a:lstStyle/>
+          <a:p>
+            <a:pPr algn="r"/>
+            <a:r>
+              <a:rPr lang="en-GB" sz="2400" dirty="0"/>
+              <a:t>Get in Contact</a:t>
+            </a:r>
+          </a:p>
+        </p:txBody>
+      </p:sp>
+      <p:sp>
+        <p:nvSpPr>
+          <p:cNvPr id="5" name="Rectangle 4">
+            <a:extLst>
+              <a:ext uri="{FF2B5EF4-FFF2-40B4-BE49-F238E27FC236}">
+                <a16:creationId xmlns:a16="http://schemas.microsoft.com/office/drawing/2014/main" id="{6438A6E4-9B04-4DE6-B95B-6CE2BD1C58FC}"/>
+              </a:ext>
+            </a:extLst>
+          </p:cNvPr>
+          <p:cNvSpPr/>
+          <p:nvPr/>
+        </p:nvSpPr>
+        <p:spPr>
+          <a:xfrm>
+            <a:off x="0" y="9588856"/>
+            <a:ext cx="6858000" cy="1194865"/>
+          </a:xfrm>
+          <a:prstGeom prst="rect">
+            <a:avLst/>
+          </a:prstGeom>
+          <a:noFill/>
+          <a:ln w="12700">
+            <a:solidFill>
+              <a:schemeClr val="tx1"/>
+            </a:solidFill>
+          </a:ln>
+        </p:spPr>
+        <p:style>
+          <a:lnRef idx="2">
+            <a:schemeClr val="accent1">
+              <a:shade val="50000"/>
+            </a:schemeClr>
+          </a:lnRef>
+          <a:fillRef idx="1">
+            <a:schemeClr val="accent1"/>
+          </a:fillRef>
+          <a:effectRef idx="0">
+            <a:schemeClr val="accent1"/>
+          </a:effectRef>
+          <a:fontRef idx="minor">
+            <a:schemeClr val="lt1"/>
+          </a:fontRef>
+        </p:style>
+        <p:txBody>
+          <a:bodyPr rtlCol="0" anchor="ctr"/>
+          <a:lstStyle/>
+          <a:p>
+            <a:pPr algn="ctr"/>
+            <a:endParaRPr lang="en-GB"/>
+          </a:p>
+        </p:txBody>
+      </p:sp>
+      <p:sp>
+        <p:nvSpPr>
+          <p:cNvPr id="6" name="TextBox 5">
+            <a:extLst>
+              <a:ext uri="{FF2B5EF4-FFF2-40B4-BE49-F238E27FC236}">
+                <a16:creationId xmlns:a16="http://schemas.microsoft.com/office/drawing/2014/main" id="{7DE356D9-9E56-4723-A0BF-0E7DF325E53C}"/>
+              </a:ext>
+            </a:extLst>
+          </p:cNvPr>
+          <p:cNvSpPr txBox="1"/>
+          <p:nvPr/>
+        </p:nvSpPr>
+        <p:spPr>
+          <a:xfrm>
+            <a:off x="4809987" y="10246716"/>
+            <a:ext cx="1771639" cy="384721"/>
+          </a:xfrm>
+          <a:prstGeom prst="rect">
+            <a:avLst/>
+          </a:prstGeom>
+          <a:noFill/>
+        </p:spPr>
+        <p:txBody>
+          <a:bodyPr wrap="none" rtlCol="0">
+            <a:spAutoFit/>
+          </a:bodyPr>
+          <a:lstStyle/>
+          <a:p>
+            <a:r>
+              <a:rPr lang="en-GB" sz="1100" dirty="0"/>
+              <a:t>Advanced Obesity Surgery</a:t>
+            </a:r>
+          </a:p>
+          <a:p>
+            <a:pPr algn="r"/>
+            <a:r>
+              <a:rPr lang="en-GB" sz="800" dirty="0"/>
+              <a:t>©Copyright 2022. All Rights Reserved.</a:t>
+            </a:r>
+          </a:p>
+        </p:txBody>
+      </p:sp>
+      <p:sp>
+        <p:nvSpPr>
+          <p:cNvPr id="7" name="TextBox 6">
+            <a:extLst>
+              <a:ext uri="{FF2B5EF4-FFF2-40B4-BE49-F238E27FC236}">
+                <a16:creationId xmlns:a16="http://schemas.microsoft.com/office/drawing/2014/main" id="{02E92B9E-10CC-4B7E-B10C-143690395DE5}"/>
+              </a:ext>
+            </a:extLst>
+          </p:cNvPr>
+          <p:cNvSpPr txBox="1"/>
+          <p:nvPr/>
+        </p:nvSpPr>
+        <p:spPr>
+          <a:xfrm>
+            <a:off x="3761623" y="9733421"/>
+            <a:ext cx="2820003" cy="261610"/>
+          </a:xfrm>
+          <a:prstGeom prst="rect">
+            <a:avLst/>
+          </a:prstGeom>
+          <a:noFill/>
+        </p:spPr>
+        <p:txBody>
+          <a:bodyPr wrap="none" rtlCol="0">
+            <a:spAutoFit/>
+          </a:bodyPr>
+          <a:lstStyle/>
+          <a:p>
+            <a:r>
+              <a:rPr lang="en-GB" sz="1100" dirty="0"/>
+              <a:t>Blog        FAQ        Contact us        Privacy Policy</a:t>
+            </a:r>
+          </a:p>
+        </p:txBody>
+      </p:sp>
+      <p:pic>
+        <p:nvPicPr>
+          <p:cNvPr id="8" name="Picture 2" descr="Center for Metabolic and Obesity Surgery">
+            <a:extLst>
+              <a:ext uri="{FF2B5EF4-FFF2-40B4-BE49-F238E27FC236}">
+                <a16:creationId xmlns:a16="http://schemas.microsoft.com/office/drawing/2014/main" id="{51FC48F6-7BE2-48D2-A637-7F9307D99469}"/>
+              </a:ext>
+            </a:extLst>
+          </p:cNvPr>
+          <p:cNvPicPr>
+            <a:picLocks noChangeAspect="1" noChangeArrowheads="1"/>
+          </p:cNvPicPr>
+          <p:nvPr/>
+        </p:nvPicPr>
+        <p:blipFill>
+          <a:blip r:embed="rId4">
+            <a:extLst>
+              <a:ext uri="{BEBA8EAE-BF5A-486C-A8C5-ECC9F3942E4B}">
+                <a14:imgProps xmlns:a14="http://schemas.microsoft.com/office/drawing/2010/main">
+                  <a14:imgLayer r:embed="rId5">
+                    <a14:imgEffect>
+                      <a14:backgroundRemoval t="8163" b="89796" l="4219" r="95000">
+                        <a14:foregroundMark x1="7969" y1="48163" x2="7969" y2="48163"/>
+                        <a14:foregroundMark x1="4219" y1="62857" x2="4219" y2="62857"/>
+                        <a14:foregroundMark x1="14844" y1="48571" x2="14844" y2="48571"/>
+                        <a14:foregroundMark x1="23594" y1="54286" x2="23594" y2="54286"/>
+                        <a14:foregroundMark x1="30938" y1="54694" x2="30938" y2="54694"/>
+                        <a14:foregroundMark x1="38594" y1="53061" x2="38594" y2="53061"/>
+                        <a14:foregroundMark x1="47031" y1="50612" x2="47031" y2="50612"/>
+                        <a14:foregroundMark x1="64531" y1="50612" x2="64531" y2="50612"/>
+                        <a14:foregroundMark x1="72656" y1="53469" x2="72656" y2="53469"/>
+                        <a14:foregroundMark x1="81094" y1="53061" x2="81094" y2="53061"/>
+                        <a14:foregroundMark x1="85156" y1="54286" x2="85156" y2="54286"/>
+                        <a14:foregroundMark x1="90469" y1="51429" x2="90469" y2="51429"/>
+                        <a14:foregroundMark x1="95000" y1="59184" x2="95000" y2="59184"/>
+                        <a14:foregroundMark x1="68281" y1="30204" x2="68281" y2="30204"/>
+                        <a14:foregroundMark x1="73125" y1="28980" x2="73125" y2="28980"/>
+                        <a14:foregroundMark x1="73125" y1="8163" x2="73125" y2="8163"/>
+                        <a14:foregroundMark x1="67500" y1="13061" x2="67500" y2="13061"/>
+                        <a14:foregroundMark x1="72031" y1="17143" x2="72031" y2="17143"/>
+                        <a14:foregroundMark x1="68438" y1="22041" x2="68438" y2="22041"/>
+                        <a14:foregroundMark x1="69688" y1="17143" x2="69688" y2="17143"/>
+                        <a14:foregroundMark x1="57031" y1="83265" x2="57031" y2="83265"/>
+                        <a14:foregroundMark x1="62187" y1="83673" x2="62187" y2="83673"/>
+                        <a14:foregroundMark x1="66250" y1="79184" x2="66250" y2="79184"/>
+                        <a14:foregroundMark x1="68281" y1="82857" x2="68281" y2="82857"/>
+                        <a14:foregroundMark x1="72969" y1="82041" x2="72969" y2="82041"/>
+                        <a14:foregroundMark x1="77188" y1="84898" x2="77188" y2="84898"/>
+                        <a14:foregroundMark x1="76719" y1="82857" x2="76719" y2="82857"/>
+                        <a14:foregroundMark x1="79219" y1="82857" x2="79219" y2="82857"/>
+                        <a14:foregroundMark x1="84375" y1="81224" x2="84375" y2="81224"/>
+                        <a14:foregroundMark x1="86094" y1="82041" x2="86094" y2="82041"/>
+                        <a14:foregroundMark x1="86094" y1="77143" x2="86094" y2="77143"/>
+                        <a14:foregroundMark x1="87969" y1="83673" x2="87969" y2="83673"/>
+                        <a14:foregroundMark x1="92656" y1="82041" x2="92656" y2="82041"/>
+                        <a14:foregroundMark x1="72813" y1="23673" x2="72813" y2="23673"/>
+                        <a14:foregroundMark x1="71563" y1="20816" x2="71563" y2="20816"/>
+                        <a14:foregroundMark x1="5938" y1="55510" x2="5938" y2="55510"/>
+                        <a14:backgroundMark x1="7969" y1="46531" x2="7969" y2="46531"/>
+                        <a14:backgroundMark x1="32656" y1="51837" x2="32656" y2="51837"/>
+                        <a14:backgroundMark x1="63281" y1="83265" x2="63281" y2="83265"/>
+                        <a14:backgroundMark x1="69375" y1="82857" x2="69375" y2="82857"/>
+                        <a14:backgroundMark x1="73281" y1="84898" x2="73281" y2="84898"/>
+                        <a14:backgroundMark x1="80938" y1="83673" x2="80938" y2="83673"/>
+                        <a14:backgroundMark x1="89375" y1="84898" x2="89375" y2="84898"/>
+                        <a14:backgroundMark x1="69688" y1="22041" x2="69688" y2="22041"/>
+                        <a14:backgroundMark x1="72500" y1="20816" x2="72500" y2="20816"/>
+                        <a14:backgroundMark x1="8125" y1="48163" x2="8125" y2="48163"/>
+                        <a14:backgroundMark x1="7969" y1="48163" x2="7969" y2="48163"/>
+                        <a14:backgroundMark x1="6406" y1="55510" x2="6406" y2="55510"/>
+                        <a14:backgroundMark x1="77344" y1="85714" x2="77344" y2="85714"/>
+                        <a14:backgroundMark x1="73125" y1="82857" x2="73125" y2="82857"/>
+                        <a14:backgroundMark x1="77500" y1="84898" x2="77500" y2="84898"/>
+                      </a14:backgroundRemoval>
+                    </a14:imgEffect>
+                  </a14:imgLayer>
+                </a14:imgProps>
+              </a:ext>
+              <a:ext uri="{28A0092B-C50C-407E-A947-70E740481C1C}">
+                <a14:useLocalDpi xmlns:a14="http://schemas.microsoft.com/office/drawing/2010/main" val="0"/>
+              </a:ext>
+            </a:extLst>
+          </a:blip>
+          <a:srcRect/>
+          <a:stretch>
+            <a:fillRect/>
+          </a:stretch>
+        </p:blipFill>
+        <p:spPr bwMode="auto">
+          <a:xfrm>
+            <a:off x="276376" y="9736561"/>
+            <a:ext cx="1158153" cy="443355"/>
+          </a:xfrm>
+          <a:prstGeom prst="rect">
+            <a:avLst/>
+          </a:prstGeom>
+          <a:noFill/>
+          <a:ln>
+            <a:noFill/>
+          </a:ln>
+          <a:extLst>
+            <a:ext uri="{909E8E84-426E-40DD-AFC4-6F175D3DCCD1}">
+              <a14:hiddenFill xmlns:a14="http://schemas.microsoft.com/office/drawing/2010/main">
+                <a:solidFill>
+                  <a:srgbClr val="FFFFFF"/>
+                </a:solidFill>
+              </a14:hiddenFill>
+            </a:ext>
+          </a:extLst>
+        </p:spPr>
+      </p:pic>
+      <p:sp>
+        <p:nvSpPr>
+          <p:cNvPr id="9" name="TextBox 8">
+            <a:extLst>
+              <a:ext uri="{FF2B5EF4-FFF2-40B4-BE49-F238E27FC236}">
+                <a16:creationId xmlns:a16="http://schemas.microsoft.com/office/drawing/2014/main" id="{39794B87-1F4F-44BE-9347-FF79EEFCCC81}"/>
+              </a:ext>
+            </a:extLst>
+          </p:cNvPr>
+          <p:cNvSpPr txBox="1"/>
+          <p:nvPr/>
+        </p:nvSpPr>
+        <p:spPr>
+          <a:xfrm>
+            <a:off x="208205" y="10169772"/>
+            <a:ext cx="2219850" cy="461665"/>
+          </a:xfrm>
+          <a:prstGeom prst="rect">
+            <a:avLst/>
+          </a:prstGeom>
+          <a:noFill/>
+        </p:spPr>
+        <p:txBody>
+          <a:bodyPr wrap="square">
+            <a:spAutoFit/>
+          </a:bodyPr>
+          <a:lstStyle/>
+          <a:p>
+            <a:r>
+              <a:rPr lang="en-GB" sz="800" dirty="0"/>
+              <a:t>407-303-3820</a:t>
+            </a:r>
+          </a:p>
+          <a:p>
+            <a:r>
+              <a:rPr lang="en-GB" sz="800" dirty="0"/>
+              <a:t>410 Celebration Place, Suite 401</a:t>
+            </a:r>
+          </a:p>
+          <a:p>
+            <a:r>
+              <a:rPr lang="en-GB" sz="800" dirty="0"/>
+              <a:t>Celebration, FL 34747</a:t>
+            </a:r>
+          </a:p>
+        </p:txBody>
+      </p:sp>
+      <p:sp>
+        <p:nvSpPr>
+          <p:cNvPr id="12" name="TextBox 11">
+            <a:extLst>
+              <a:ext uri="{FF2B5EF4-FFF2-40B4-BE49-F238E27FC236}">
+                <a16:creationId xmlns:a16="http://schemas.microsoft.com/office/drawing/2014/main" id="{85F98AC0-756D-4573-83B1-C637DAD20CF5}"/>
+              </a:ext>
+            </a:extLst>
+          </p:cNvPr>
+          <p:cNvSpPr txBox="1"/>
+          <p:nvPr/>
+        </p:nvSpPr>
+        <p:spPr>
+          <a:xfrm>
+            <a:off x="272471" y="2690923"/>
+            <a:ext cx="4836424" cy="4585871"/>
+          </a:xfrm>
+          <a:prstGeom prst="rect">
+            <a:avLst/>
+          </a:prstGeom>
+          <a:noFill/>
+        </p:spPr>
+        <p:txBody>
+          <a:bodyPr wrap="square" rtlCol="0">
+            <a:spAutoFit/>
+          </a:bodyPr>
+          <a:lstStyle/>
+          <a:p>
+            <a:pPr algn="l"/>
+            <a:r>
+              <a:rPr lang="en-GB" sz="1800" b="1" i="0" dirty="0">
+                <a:solidFill>
+                  <a:srgbClr val="000000"/>
+                </a:solidFill>
+                <a:effectLst/>
+              </a:rPr>
+              <a:t>Your details</a:t>
+            </a:r>
+          </a:p>
+          <a:p>
+            <a:pPr algn="l"/>
+            <a:endParaRPr lang="en-GB" sz="1400" b="0" i="0" dirty="0">
+              <a:solidFill>
+                <a:srgbClr val="000000"/>
+              </a:solidFill>
+              <a:effectLst/>
+            </a:endParaRPr>
+          </a:p>
+          <a:p>
+            <a:pPr algn="l"/>
+            <a:r>
+              <a:rPr lang="en-GB" sz="1400" b="0" i="0" dirty="0">
+                <a:solidFill>
+                  <a:srgbClr val="000000"/>
+                </a:solidFill>
+                <a:effectLst/>
+              </a:rPr>
+              <a:t>First Name</a:t>
+            </a:r>
+          </a:p>
+          <a:p>
+            <a:pPr algn="l"/>
+            <a:endParaRPr lang="en-GB" sz="1400" b="0" i="0" dirty="0">
+              <a:solidFill>
+                <a:srgbClr val="000000"/>
+              </a:solidFill>
+              <a:effectLst/>
+            </a:endParaRPr>
+          </a:p>
+          <a:p>
+            <a:pPr algn="l"/>
+            <a:r>
+              <a:rPr lang="en-GB" sz="1400" b="0" i="0" dirty="0">
+                <a:solidFill>
+                  <a:srgbClr val="000000"/>
+                </a:solidFill>
+                <a:effectLst/>
+              </a:rPr>
+              <a:t>Last Name</a:t>
+            </a:r>
+          </a:p>
+          <a:p>
+            <a:pPr algn="l"/>
+            <a:endParaRPr lang="en-GB" sz="1400" b="0" i="0" dirty="0">
+              <a:solidFill>
+                <a:srgbClr val="000000"/>
+              </a:solidFill>
+              <a:effectLst/>
+            </a:endParaRPr>
+          </a:p>
+          <a:p>
+            <a:pPr algn="l"/>
+            <a:endParaRPr lang="en-GB" sz="1400" b="0" i="0" dirty="0">
+              <a:solidFill>
+                <a:srgbClr val="000000"/>
+              </a:solidFill>
+              <a:effectLst/>
+            </a:endParaRPr>
+          </a:p>
+          <a:p>
+            <a:pPr algn="l"/>
+            <a:endParaRPr lang="en-GB" sz="1400" b="0" i="0" dirty="0">
+              <a:solidFill>
+                <a:srgbClr val="000000"/>
+              </a:solidFill>
+              <a:effectLst/>
+            </a:endParaRPr>
+          </a:p>
+          <a:p>
+            <a:pPr marL="0" marR="0" lvl="0" indent="0" algn="l" defTabSz="457200" rtl="0" eaLnBrk="1" fontAlgn="auto" latinLnBrk="0" hangingPunct="1">
+              <a:lnSpc>
+                <a:spcPct val="100000"/>
+              </a:lnSpc>
+              <a:spcBef>
+                <a:spcPts val="0"/>
+              </a:spcBef>
+              <a:spcAft>
+                <a:spcPts val="0"/>
+              </a:spcAft>
+              <a:buClrTx/>
+              <a:buSzTx/>
+              <a:buFontTx/>
+              <a:buNone/>
+              <a:tabLst/>
+              <a:defRPr/>
+            </a:pPr>
+            <a:r>
+              <a:rPr kumimoji="0" lang="en-GB" sz="1800" b="1" i="0" u="none" strike="noStrike" kern="1200" cap="none" spc="0" normalizeH="0" baseline="0" noProof="0" dirty="0">
+                <a:ln>
+                  <a:noFill/>
+                </a:ln>
+                <a:solidFill>
+                  <a:srgbClr val="000000"/>
+                </a:solidFill>
+                <a:effectLst/>
+                <a:uLnTx/>
+                <a:uFillTx/>
+                <a:latin typeface="Calibri" panose="020F0502020204030204"/>
+                <a:ea typeface="+mn-ea"/>
+                <a:cs typeface="+mn-cs"/>
+              </a:rPr>
+              <a:t>Insurance details</a:t>
+            </a:r>
+          </a:p>
+          <a:p>
+            <a:pPr algn="l"/>
+            <a:endParaRPr lang="en-GB" sz="1400" dirty="0">
+              <a:solidFill>
+                <a:srgbClr val="000000"/>
+              </a:solidFill>
+            </a:endParaRPr>
+          </a:p>
+          <a:p>
+            <a:pPr algn="l"/>
+            <a:r>
+              <a:rPr lang="en-GB" sz="1400" b="0" i="0" dirty="0">
+                <a:solidFill>
+                  <a:srgbClr val="000000"/>
+                </a:solidFill>
+                <a:effectLst/>
+              </a:rPr>
+              <a:t>Insurance provider</a:t>
+            </a:r>
+          </a:p>
+          <a:p>
+            <a:pPr algn="l"/>
+            <a:endParaRPr lang="en-GB" sz="1400" b="0" i="0" dirty="0">
+              <a:solidFill>
+                <a:srgbClr val="000000"/>
+              </a:solidFill>
+              <a:effectLst/>
+            </a:endParaRPr>
+          </a:p>
+          <a:p>
+            <a:pPr algn="l"/>
+            <a:endParaRPr lang="en-GB" sz="1400" dirty="0">
+              <a:solidFill>
+                <a:srgbClr val="000000"/>
+              </a:solidFill>
+            </a:endParaRPr>
+          </a:p>
+          <a:p>
+            <a:pPr algn="l"/>
+            <a:endParaRPr lang="en-GB" sz="1400" dirty="0">
+              <a:solidFill>
+                <a:srgbClr val="000000"/>
+              </a:solidFill>
+            </a:endParaRPr>
+          </a:p>
+          <a:p>
+            <a:pPr marL="0" marR="0" lvl="0" indent="0" algn="l" defTabSz="457200" rtl="0" eaLnBrk="1" fontAlgn="auto" latinLnBrk="0" hangingPunct="1">
+              <a:lnSpc>
+                <a:spcPct val="100000"/>
+              </a:lnSpc>
+              <a:spcBef>
+                <a:spcPts val="0"/>
+              </a:spcBef>
+              <a:spcAft>
+                <a:spcPts val="0"/>
+              </a:spcAft>
+              <a:buClrTx/>
+              <a:buSzTx/>
+              <a:buFontTx/>
+              <a:buNone/>
+              <a:tabLst/>
+              <a:defRPr/>
+            </a:pPr>
+            <a:r>
+              <a:rPr kumimoji="0" lang="en-GB" sz="1800" b="1" i="0" u="none" strike="noStrike" kern="1200" cap="none" spc="0" normalizeH="0" baseline="0" noProof="0" dirty="0">
+                <a:ln>
+                  <a:noFill/>
+                </a:ln>
+                <a:solidFill>
+                  <a:srgbClr val="000000"/>
+                </a:solidFill>
+                <a:effectLst/>
+                <a:uLnTx/>
+                <a:uFillTx/>
+                <a:latin typeface="Calibri" panose="020F0502020204030204"/>
+                <a:ea typeface="+mn-ea"/>
+                <a:cs typeface="+mn-cs"/>
+              </a:rPr>
+              <a:t>Reason for contact</a:t>
+            </a:r>
+          </a:p>
+          <a:p>
+            <a:pPr algn="l"/>
+            <a:endParaRPr lang="en-GB" sz="1400" b="0" i="0" dirty="0">
+              <a:solidFill>
+                <a:srgbClr val="000000"/>
+              </a:solidFill>
+              <a:effectLst/>
+            </a:endParaRPr>
+          </a:p>
+          <a:p>
+            <a:pPr algn="l"/>
+            <a:r>
+              <a:rPr lang="en-GB" sz="1400" b="0" i="0" dirty="0">
+                <a:solidFill>
+                  <a:srgbClr val="000000"/>
+                </a:solidFill>
+                <a:effectLst/>
+              </a:rPr>
+              <a:t>Previously had bariatric surgery? </a:t>
+            </a:r>
+            <a:r>
+              <a:rPr lang="en-GB" sz="1400" b="0" i="0" dirty="0">
+                <a:solidFill>
+                  <a:schemeClr val="bg1">
+                    <a:lumMod val="50000"/>
+                  </a:schemeClr>
+                </a:solidFill>
+                <a:effectLst/>
+              </a:rPr>
+              <a:t>Yes</a:t>
+            </a:r>
+          </a:p>
+          <a:p>
+            <a:pPr algn="l"/>
+            <a:r>
+              <a:rPr lang="en-GB" sz="1400" dirty="0">
+                <a:solidFill>
+                  <a:srgbClr val="000000"/>
+                </a:solidFill>
+              </a:rPr>
+              <a:t>Revision needed? </a:t>
+            </a:r>
+            <a:r>
+              <a:rPr lang="en-GB" sz="1400" b="0" i="0" dirty="0">
+                <a:solidFill>
+                  <a:schemeClr val="bg1">
+                    <a:lumMod val="50000"/>
+                  </a:schemeClr>
+                </a:solidFill>
+                <a:effectLst/>
+              </a:rPr>
+              <a:t>Yes</a:t>
+            </a:r>
+          </a:p>
+          <a:p>
+            <a:pPr algn="l"/>
+            <a:endParaRPr lang="en-GB" sz="1400" dirty="0">
+              <a:solidFill>
+                <a:srgbClr val="000000"/>
+              </a:solidFill>
+            </a:endParaRPr>
+          </a:p>
+          <a:p>
+            <a:pPr algn="l"/>
+            <a:r>
+              <a:rPr lang="en-GB" sz="1400" dirty="0">
+                <a:solidFill>
+                  <a:srgbClr val="000000"/>
+                </a:solidFill>
+              </a:rPr>
+              <a:t>Please briefly describe your history with bariatric surgery.</a:t>
+            </a:r>
+            <a:endParaRPr lang="en-GB" sz="1400" dirty="0">
+              <a:solidFill>
+                <a:schemeClr val="bg1">
+                  <a:lumMod val="50000"/>
+                </a:schemeClr>
+              </a:solidFill>
+            </a:endParaRPr>
+          </a:p>
+        </p:txBody>
+      </p:sp>
+      <p:pic>
+        <p:nvPicPr>
+          <p:cNvPr id="28" name="Picture 27">
+            <a:extLst>
+              <a:ext uri="{FF2B5EF4-FFF2-40B4-BE49-F238E27FC236}">
+                <a16:creationId xmlns:a16="http://schemas.microsoft.com/office/drawing/2014/main" id="{344B7B98-FAA8-4986-A881-73F219C01E5A}"/>
+              </a:ext>
+            </a:extLst>
+          </p:cNvPr>
+          <p:cNvPicPr>
+            <a:picLocks noChangeAspect="1"/>
+          </p:cNvPicPr>
+          <p:nvPr/>
+        </p:nvPicPr>
+        <p:blipFill>
+          <a:blip r:embed="rId6"/>
+          <a:stretch>
+            <a:fillRect/>
+          </a:stretch>
+        </p:blipFill>
+        <p:spPr>
+          <a:xfrm>
+            <a:off x="0" y="14"/>
+            <a:ext cx="6858000" cy="797912"/>
+          </a:xfrm>
+          <a:prstGeom prst="rect">
+            <a:avLst/>
+          </a:prstGeom>
+        </p:spPr>
+      </p:pic>
+      <p:sp>
+        <p:nvSpPr>
+          <p:cNvPr id="29" name="TextBox 28">
+            <a:extLst>
+              <a:ext uri="{FF2B5EF4-FFF2-40B4-BE49-F238E27FC236}">
+                <a16:creationId xmlns:a16="http://schemas.microsoft.com/office/drawing/2014/main" id="{0E85BCCA-8B90-4106-BE39-B3AC0BE15B7B}"/>
+              </a:ext>
+            </a:extLst>
+          </p:cNvPr>
+          <p:cNvSpPr txBox="1"/>
+          <p:nvPr/>
+        </p:nvSpPr>
+        <p:spPr>
+          <a:xfrm>
+            <a:off x="3425097" y="2690923"/>
+            <a:ext cx="3156529" cy="3508653"/>
+          </a:xfrm>
+          <a:prstGeom prst="rect">
+            <a:avLst/>
+          </a:prstGeom>
+          <a:noFill/>
+        </p:spPr>
+        <p:txBody>
+          <a:bodyPr wrap="square" rtlCol="0">
+            <a:spAutoFit/>
+          </a:bodyPr>
+          <a:lstStyle/>
+          <a:p>
+            <a:pPr algn="l"/>
+            <a:r>
+              <a:rPr lang="en-GB" sz="1800" b="1" i="0" dirty="0">
+                <a:solidFill>
+                  <a:srgbClr val="000000"/>
+                </a:solidFill>
+                <a:effectLst/>
+              </a:rPr>
+              <a:t> </a:t>
+            </a:r>
+          </a:p>
+          <a:p>
+            <a:pPr algn="l"/>
+            <a:endParaRPr lang="en-GB" sz="1400" b="0" i="0" dirty="0">
+              <a:solidFill>
+                <a:srgbClr val="000000"/>
+              </a:solidFill>
+              <a:effectLst/>
+            </a:endParaRPr>
+          </a:p>
+          <a:p>
+            <a:pPr algn="l"/>
+            <a:r>
+              <a:rPr lang="en-GB" sz="1400" dirty="0">
+                <a:solidFill>
+                  <a:srgbClr val="000000"/>
+                </a:solidFill>
+              </a:rPr>
+              <a:t>Email address</a:t>
+            </a:r>
+          </a:p>
+          <a:p>
+            <a:pPr algn="l"/>
+            <a:endParaRPr lang="en-GB" sz="1400" dirty="0">
+              <a:solidFill>
+                <a:srgbClr val="000000"/>
+              </a:solidFill>
+            </a:endParaRPr>
+          </a:p>
+          <a:p>
+            <a:pPr algn="l"/>
+            <a:r>
+              <a:rPr lang="en-GB" sz="1400" b="0" i="0" dirty="0">
+                <a:solidFill>
+                  <a:srgbClr val="000000"/>
+                </a:solidFill>
+                <a:effectLst/>
+              </a:rPr>
+              <a:t>Phone number</a:t>
+            </a:r>
+          </a:p>
+          <a:p>
+            <a:pPr algn="l"/>
+            <a:endParaRPr lang="en-GB" sz="1400" b="0" i="0" dirty="0">
+              <a:solidFill>
+                <a:srgbClr val="000000"/>
+              </a:solidFill>
+              <a:effectLst/>
+            </a:endParaRPr>
+          </a:p>
+          <a:p>
+            <a:pPr algn="l"/>
+            <a:endParaRPr lang="en-GB" sz="1400" b="0" i="0" dirty="0">
+              <a:solidFill>
+                <a:srgbClr val="000000"/>
+              </a:solidFill>
+              <a:effectLst/>
+            </a:endParaRPr>
+          </a:p>
+          <a:p>
+            <a:pPr algn="l"/>
+            <a:endParaRPr lang="en-GB" sz="1400" b="0" i="0" dirty="0">
+              <a:solidFill>
+                <a:srgbClr val="000000"/>
+              </a:solidFill>
+              <a:effectLst/>
+            </a:endParaRPr>
+          </a:p>
+          <a:p>
+            <a:pPr marL="0" marR="0" lvl="0" indent="0" algn="l" defTabSz="457200" rtl="0" eaLnBrk="1" fontAlgn="auto" latinLnBrk="0" hangingPunct="1">
+              <a:lnSpc>
+                <a:spcPct val="100000"/>
+              </a:lnSpc>
+              <a:spcBef>
+                <a:spcPts val="0"/>
+              </a:spcBef>
+              <a:spcAft>
+                <a:spcPts val="0"/>
+              </a:spcAft>
+              <a:buClrTx/>
+              <a:buSzTx/>
+              <a:buFontTx/>
+              <a:buNone/>
+              <a:tabLst/>
+              <a:defRPr/>
+            </a:pPr>
+            <a:r>
+              <a:rPr kumimoji="0" lang="en-GB" sz="1800" b="1" i="0" u="none" strike="noStrike" kern="1200" cap="none" spc="0" normalizeH="0" baseline="0" noProof="0" dirty="0">
+                <a:ln>
+                  <a:noFill/>
+                </a:ln>
+                <a:solidFill>
+                  <a:srgbClr val="000000"/>
+                </a:solidFill>
+                <a:effectLst/>
+                <a:uLnTx/>
+                <a:uFillTx/>
+                <a:latin typeface="Calibri" panose="020F0502020204030204"/>
+                <a:ea typeface="+mn-ea"/>
+                <a:cs typeface="+mn-cs"/>
+              </a:rPr>
+              <a:t> </a:t>
+            </a:r>
+          </a:p>
+          <a:p>
+            <a:pPr algn="l"/>
+            <a:endParaRPr lang="en-GB" sz="1400" dirty="0">
+              <a:solidFill>
+                <a:srgbClr val="000000"/>
+              </a:solidFill>
+            </a:endParaRPr>
+          </a:p>
+          <a:p>
+            <a:pPr algn="l"/>
+            <a:r>
+              <a:rPr lang="en-GB" sz="1400" dirty="0">
+                <a:solidFill>
+                  <a:srgbClr val="000000"/>
+                </a:solidFill>
+              </a:rPr>
+              <a:t>Insurance number</a:t>
+            </a:r>
+          </a:p>
+          <a:p>
+            <a:pPr algn="l"/>
+            <a:endParaRPr lang="en-GB" sz="1400" b="0" i="0" dirty="0">
+              <a:solidFill>
+                <a:srgbClr val="000000"/>
+              </a:solidFill>
+              <a:effectLst/>
+            </a:endParaRPr>
+          </a:p>
+          <a:p>
+            <a:pPr algn="l"/>
+            <a:endParaRPr lang="en-GB" sz="1400" dirty="0">
+              <a:solidFill>
+                <a:srgbClr val="000000"/>
+              </a:solidFill>
+            </a:endParaRPr>
+          </a:p>
+          <a:p>
+            <a:pPr marL="0" marR="0" lvl="0" indent="0" algn="l" defTabSz="457200" rtl="0" eaLnBrk="1" fontAlgn="auto" latinLnBrk="0" hangingPunct="1">
+              <a:lnSpc>
+                <a:spcPct val="100000"/>
+              </a:lnSpc>
+              <a:spcBef>
+                <a:spcPts val="0"/>
+              </a:spcBef>
+              <a:spcAft>
+                <a:spcPts val="0"/>
+              </a:spcAft>
+              <a:buClrTx/>
+              <a:buSzTx/>
+              <a:buFontTx/>
+              <a:buNone/>
+              <a:tabLst/>
+              <a:defRPr/>
+            </a:pPr>
+            <a:r>
+              <a:rPr kumimoji="0" lang="en-GB" sz="1800" b="1" i="0" u="none" strike="noStrike" kern="1200" cap="none" spc="0" normalizeH="0" baseline="0" noProof="0" dirty="0">
+                <a:ln>
+                  <a:noFill/>
+                </a:ln>
+                <a:solidFill>
+                  <a:srgbClr val="000000"/>
+                </a:solidFill>
+                <a:effectLst/>
+                <a:uLnTx/>
+                <a:uFillTx/>
+                <a:latin typeface="Calibri" panose="020F0502020204030204"/>
+                <a:ea typeface="+mn-ea"/>
+                <a:cs typeface="+mn-cs"/>
+              </a:rPr>
+              <a:t> </a:t>
+            </a:r>
+          </a:p>
+          <a:p>
+            <a:pPr algn="l"/>
+            <a:endParaRPr lang="en-GB" sz="1400" b="0" i="0" dirty="0">
+              <a:solidFill>
+                <a:srgbClr val="000000"/>
+              </a:solidFill>
+              <a:effectLst/>
+            </a:endParaRPr>
+          </a:p>
+        </p:txBody>
+      </p:sp>
+      <p:sp>
+        <p:nvSpPr>
+          <p:cNvPr id="30" name="Rectangle 29">
+            <a:extLst>
+              <a:ext uri="{FF2B5EF4-FFF2-40B4-BE49-F238E27FC236}">
+                <a16:creationId xmlns:a16="http://schemas.microsoft.com/office/drawing/2014/main" id="{E7A86401-3D3D-4E83-8949-E2E6760769F5}"/>
+              </a:ext>
+            </a:extLst>
+          </p:cNvPr>
+          <p:cNvSpPr/>
+          <p:nvPr/>
+        </p:nvSpPr>
+        <p:spPr>
+          <a:xfrm>
+            <a:off x="337291" y="3423794"/>
+            <a:ext cx="2090763" cy="233806"/>
+          </a:xfrm>
+          <a:prstGeom prst="rect">
+            <a:avLst/>
+          </a:prstGeom>
+          <a:solidFill>
+            <a:schemeClr val="bg2"/>
+          </a:solidFill>
+          <a:ln>
+            <a:solidFill>
+              <a:schemeClr val="bg1"/>
+            </a:solidFill>
+          </a:ln>
+        </p:spPr>
+        <p:style>
+          <a:lnRef idx="2">
+            <a:schemeClr val="accent1">
+              <a:shade val="50000"/>
+            </a:schemeClr>
+          </a:lnRef>
+          <a:fillRef idx="1">
+            <a:schemeClr val="accent1"/>
+          </a:fillRef>
+          <a:effectRef idx="0">
+            <a:schemeClr val="accent1"/>
+          </a:effectRef>
+          <a:fontRef idx="minor">
+            <a:schemeClr val="lt1"/>
+          </a:fontRef>
+        </p:style>
+        <p:txBody>
+          <a:bodyPr rtlCol="0" anchor="ctr"/>
+          <a:lstStyle/>
+          <a:p>
+            <a:pPr algn="ctr"/>
+            <a:endParaRPr lang="en-GB"/>
+          </a:p>
+        </p:txBody>
+      </p:sp>
+      <p:sp>
+        <p:nvSpPr>
+          <p:cNvPr id="31" name="Rectangle 30">
+            <a:extLst>
+              <a:ext uri="{FF2B5EF4-FFF2-40B4-BE49-F238E27FC236}">
+                <a16:creationId xmlns:a16="http://schemas.microsoft.com/office/drawing/2014/main" id="{3897F25D-7AED-4832-B061-3830440D22BC}"/>
+              </a:ext>
+            </a:extLst>
+          </p:cNvPr>
+          <p:cNvSpPr/>
+          <p:nvPr/>
+        </p:nvSpPr>
+        <p:spPr>
+          <a:xfrm>
+            <a:off x="337290" y="3860245"/>
+            <a:ext cx="2090763" cy="233806"/>
+          </a:xfrm>
+          <a:prstGeom prst="rect">
+            <a:avLst/>
+          </a:prstGeom>
+          <a:solidFill>
+            <a:schemeClr val="bg2"/>
+          </a:solidFill>
+          <a:ln>
+            <a:solidFill>
+              <a:schemeClr val="bg1"/>
+            </a:solidFill>
+          </a:ln>
+        </p:spPr>
+        <p:style>
+          <a:lnRef idx="2">
+            <a:schemeClr val="accent1">
+              <a:shade val="50000"/>
+            </a:schemeClr>
+          </a:lnRef>
+          <a:fillRef idx="1">
+            <a:schemeClr val="accent1"/>
+          </a:fillRef>
+          <a:effectRef idx="0">
+            <a:schemeClr val="accent1"/>
+          </a:effectRef>
+          <a:fontRef idx="minor">
+            <a:schemeClr val="lt1"/>
+          </a:fontRef>
+        </p:style>
+        <p:txBody>
+          <a:bodyPr rtlCol="0" anchor="ctr"/>
+          <a:lstStyle/>
+          <a:p>
+            <a:pPr algn="ctr"/>
+            <a:endParaRPr lang="en-GB"/>
+          </a:p>
+        </p:txBody>
+      </p:sp>
+      <p:sp>
+        <p:nvSpPr>
+          <p:cNvPr id="32" name="Rectangle 31">
+            <a:extLst>
+              <a:ext uri="{FF2B5EF4-FFF2-40B4-BE49-F238E27FC236}">
+                <a16:creationId xmlns:a16="http://schemas.microsoft.com/office/drawing/2014/main" id="{688CE72B-6449-4F70-BBEA-5F0337A2F022}"/>
+              </a:ext>
+            </a:extLst>
+          </p:cNvPr>
+          <p:cNvSpPr/>
+          <p:nvPr/>
+        </p:nvSpPr>
+        <p:spPr>
+          <a:xfrm>
+            <a:off x="3493820" y="3423777"/>
+            <a:ext cx="2090763" cy="233806"/>
+          </a:xfrm>
+          <a:prstGeom prst="rect">
+            <a:avLst/>
+          </a:prstGeom>
+          <a:solidFill>
+            <a:schemeClr val="bg2"/>
+          </a:solidFill>
+          <a:ln>
+            <a:solidFill>
+              <a:schemeClr val="bg1"/>
+            </a:solidFill>
+          </a:ln>
+        </p:spPr>
+        <p:style>
+          <a:lnRef idx="2">
+            <a:schemeClr val="accent1">
+              <a:shade val="50000"/>
+            </a:schemeClr>
+          </a:lnRef>
+          <a:fillRef idx="1">
+            <a:schemeClr val="accent1"/>
+          </a:fillRef>
+          <a:effectRef idx="0">
+            <a:schemeClr val="accent1"/>
+          </a:effectRef>
+          <a:fontRef idx="minor">
+            <a:schemeClr val="lt1"/>
+          </a:fontRef>
+        </p:style>
+        <p:txBody>
+          <a:bodyPr rtlCol="0" anchor="ctr"/>
+          <a:lstStyle/>
+          <a:p>
+            <a:pPr algn="ctr"/>
+            <a:endParaRPr lang="en-GB"/>
+          </a:p>
+        </p:txBody>
+      </p:sp>
+      <p:sp>
+        <p:nvSpPr>
+          <p:cNvPr id="33" name="Rectangle 32">
+            <a:extLst>
+              <a:ext uri="{FF2B5EF4-FFF2-40B4-BE49-F238E27FC236}">
+                <a16:creationId xmlns:a16="http://schemas.microsoft.com/office/drawing/2014/main" id="{1C793425-35D2-46DB-B5A4-B2F1AC1528B9}"/>
+              </a:ext>
+            </a:extLst>
+          </p:cNvPr>
+          <p:cNvSpPr/>
+          <p:nvPr/>
+        </p:nvSpPr>
+        <p:spPr>
+          <a:xfrm>
+            <a:off x="3495490" y="3859878"/>
+            <a:ext cx="2090763" cy="233806"/>
+          </a:xfrm>
+          <a:prstGeom prst="rect">
+            <a:avLst/>
+          </a:prstGeom>
+          <a:solidFill>
+            <a:schemeClr val="bg2"/>
+          </a:solidFill>
+          <a:ln>
+            <a:solidFill>
+              <a:schemeClr val="bg1"/>
+            </a:solidFill>
+          </a:ln>
+        </p:spPr>
+        <p:style>
+          <a:lnRef idx="2">
+            <a:schemeClr val="accent1">
+              <a:shade val="50000"/>
+            </a:schemeClr>
+          </a:lnRef>
+          <a:fillRef idx="1">
+            <a:schemeClr val="accent1"/>
+          </a:fillRef>
+          <a:effectRef idx="0">
+            <a:schemeClr val="accent1"/>
+          </a:effectRef>
+          <a:fontRef idx="minor">
+            <a:schemeClr val="lt1"/>
+          </a:fontRef>
+        </p:style>
+        <p:txBody>
+          <a:bodyPr rtlCol="0" anchor="ctr"/>
+          <a:lstStyle/>
+          <a:p>
+            <a:pPr algn="ctr"/>
+            <a:endParaRPr lang="en-GB"/>
+          </a:p>
+        </p:txBody>
+      </p:sp>
+      <p:sp>
+        <p:nvSpPr>
+          <p:cNvPr id="34" name="Rectangle 33">
+            <a:extLst>
+              <a:ext uri="{FF2B5EF4-FFF2-40B4-BE49-F238E27FC236}">
+                <a16:creationId xmlns:a16="http://schemas.microsoft.com/office/drawing/2014/main" id="{0D8297A4-7ED9-46C2-B441-F1233F0E6167}"/>
+              </a:ext>
+            </a:extLst>
+          </p:cNvPr>
+          <p:cNvSpPr/>
+          <p:nvPr/>
+        </p:nvSpPr>
+        <p:spPr>
+          <a:xfrm>
+            <a:off x="337290" y="5177452"/>
+            <a:ext cx="2090763" cy="233806"/>
+          </a:xfrm>
+          <a:prstGeom prst="rect">
+            <a:avLst/>
+          </a:prstGeom>
+          <a:solidFill>
+            <a:schemeClr val="bg2"/>
+          </a:solidFill>
+          <a:ln>
+            <a:solidFill>
+              <a:schemeClr val="bg1"/>
+            </a:solidFill>
+          </a:ln>
+        </p:spPr>
+        <p:style>
+          <a:lnRef idx="2">
+            <a:schemeClr val="accent1">
+              <a:shade val="50000"/>
+            </a:schemeClr>
+          </a:lnRef>
+          <a:fillRef idx="1">
+            <a:schemeClr val="accent1"/>
+          </a:fillRef>
+          <a:effectRef idx="0">
+            <a:schemeClr val="accent1"/>
+          </a:effectRef>
+          <a:fontRef idx="minor">
+            <a:schemeClr val="lt1"/>
+          </a:fontRef>
+        </p:style>
+        <p:txBody>
+          <a:bodyPr rtlCol="0" anchor="ctr"/>
+          <a:lstStyle/>
+          <a:p>
+            <a:pPr algn="ctr"/>
+            <a:endParaRPr lang="en-GB"/>
+          </a:p>
+        </p:txBody>
+      </p:sp>
+      <p:sp>
+        <p:nvSpPr>
+          <p:cNvPr id="35" name="Rectangle 34">
+            <a:extLst>
+              <a:ext uri="{FF2B5EF4-FFF2-40B4-BE49-F238E27FC236}">
+                <a16:creationId xmlns:a16="http://schemas.microsoft.com/office/drawing/2014/main" id="{90F340E3-865F-4BB9-94E0-B1E4C9C04310}"/>
+              </a:ext>
+            </a:extLst>
+          </p:cNvPr>
+          <p:cNvSpPr/>
+          <p:nvPr/>
+        </p:nvSpPr>
+        <p:spPr>
+          <a:xfrm>
+            <a:off x="3493819" y="5177452"/>
+            <a:ext cx="2090763" cy="233806"/>
+          </a:xfrm>
+          <a:prstGeom prst="rect">
+            <a:avLst/>
+          </a:prstGeom>
+          <a:solidFill>
+            <a:schemeClr val="bg2"/>
+          </a:solidFill>
+          <a:ln>
+            <a:solidFill>
+              <a:schemeClr val="bg1"/>
+            </a:solidFill>
+          </a:ln>
+        </p:spPr>
+        <p:style>
+          <a:lnRef idx="2">
+            <a:schemeClr val="accent1">
+              <a:shade val="50000"/>
+            </a:schemeClr>
+          </a:lnRef>
+          <a:fillRef idx="1">
+            <a:schemeClr val="accent1"/>
+          </a:fillRef>
+          <a:effectRef idx="0">
+            <a:schemeClr val="accent1"/>
+          </a:effectRef>
+          <a:fontRef idx="minor">
+            <a:schemeClr val="lt1"/>
+          </a:fontRef>
+        </p:style>
+        <p:txBody>
+          <a:bodyPr rtlCol="0" anchor="ctr"/>
+          <a:lstStyle/>
+          <a:p>
+            <a:pPr algn="ctr"/>
+            <a:endParaRPr lang="en-GB"/>
+          </a:p>
+        </p:txBody>
+      </p:sp>
+      <p:sp>
+        <p:nvSpPr>
+          <p:cNvPr id="36" name="Rectangle 35">
+            <a:extLst>
+              <a:ext uri="{FF2B5EF4-FFF2-40B4-BE49-F238E27FC236}">
+                <a16:creationId xmlns:a16="http://schemas.microsoft.com/office/drawing/2014/main" id="{B03E5DF9-618E-49A0-B998-82E9E70CA8BD}"/>
+              </a:ext>
+            </a:extLst>
+          </p:cNvPr>
+          <p:cNvSpPr/>
+          <p:nvPr/>
+        </p:nvSpPr>
+        <p:spPr>
+          <a:xfrm>
+            <a:off x="337289" y="7210234"/>
+            <a:ext cx="5247293" cy="509211"/>
+          </a:xfrm>
+          <a:prstGeom prst="rect">
+            <a:avLst/>
+          </a:prstGeom>
+          <a:solidFill>
+            <a:schemeClr val="bg2"/>
+          </a:solidFill>
+          <a:ln>
+            <a:solidFill>
+              <a:schemeClr val="bg1"/>
+            </a:solidFill>
+          </a:ln>
+        </p:spPr>
+        <p:style>
+          <a:lnRef idx="2">
+            <a:schemeClr val="accent1">
+              <a:shade val="50000"/>
+            </a:schemeClr>
+          </a:lnRef>
+          <a:fillRef idx="1">
+            <a:schemeClr val="accent1"/>
+          </a:fillRef>
+          <a:effectRef idx="0">
+            <a:schemeClr val="accent1"/>
+          </a:effectRef>
+          <a:fontRef idx="minor">
+            <a:schemeClr val="lt1"/>
+          </a:fontRef>
+        </p:style>
+        <p:txBody>
+          <a:bodyPr rtlCol="0" anchor="ctr"/>
+          <a:lstStyle/>
+          <a:p>
+            <a:pPr algn="ctr"/>
+            <a:endParaRPr lang="en-GB"/>
+          </a:p>
+        </p:txBody>
+      </p:sp>
+      <p:sp>
+        <p:nvSpPr>
+          <p:cNvPr id="39" name="Rectangle: Diagonal Corners Rounded 38">
+            <a:extLst>
+              <a:ext uri="{FF2B5EF4-FFF2-40B4-BE49-F238E27FC236}">
+                <a16:creationId xmlns:a16="http://schemas.microsoft.com/office/drawing/2014/main" id="{09073B7E-74C0-4B1E-A4FE-937F101BBEDB}"/>
+              </a:ext>
+            </a:extLst>
+          </p:cNvPr>
+          <p:cNvSpPr/>
+          <p:nvPr/>
+        </p:nvSpPr>
+        <p:spPr>
+          <a:xfrm flipH="1">
+            <a:off x="337289" y="8152656"/>
+            <a:ext cx="1261691" cy="331045"/>
+          </a:xfrm>
+          <a:prstGeom prst="round2DiagRect">
+            <a:avLst/>
+          </a:prstGeom>
+          <a:solidFill>
+            <a:schemeClr val="accent1">
+              <a:lumMod val="60000"/>
+              <a:lumOff val="40000"/>
+            </a:schemeClr>
+          </a:solidFill>
+          <a:ln>
+            <a:noFill/>
+          </a:ln>
+        </p:spPr>
+        <p:style>
+          <a:lnRef idx="2">
+            <a:schemeClr val="accent1">
+              <a:shade val="50000"/>
+            </a:schemeClr>
+          </a:lnRef>
+          <a:fillRef idx="1">
+            <a:schemeClr val="accent1"/>
+          </a:fillRef>
+          <a:effectRef idx="0">
+            <a:schemeClr val="accent1"/>
+          </a:effectRef>
+          <a:fontRef idx="minor">
+            <a:schemeClr val="lt1"/>
+          </a:fontRef>
+        </p:style>
+        <p:txBody>
+          <a:bodyPr rtlCol="0" anchor="ctr"/>
+          <a:lstStyle/>
+          <a:p>
+            <a:pPr algn="ctr"/>
+            <a:r>
+              <a:rPr lang="en-GB" sz="1200" dirty="0"/>
+              <a:t>Submit</a:t>
+            </a:r>
+          </a:p>
+        </p:txBody>
+      </p:sp>
+    </p:spTree>
+    <p:extLst>
+      <p:ext uri="{BB962C8B-B14F-4D97-AF65-F5344CB8AC3E}">
+        <p14:creationId xmlns:p14="http://schemas.microsoft.com/office/powerpoint/2010/main" val="614700749"/>
+      </p:ext>
+    </p:extLst>
+  </p:cSld>
+  <p:clrMapOvr>
+    <a:masterClrMapping/>
+  </p:clrMapOvr>
+</p:sld>
+</file>
+
 <file path=ppt/slides/slide2.xml><?xml version="1.0" encoding="utf-8"?>
 <p:sld xmlns:a="http://schemas.openxmlformats.org/drawingml/2006/main" xmlns:r="http://schemas.openxmlformats.org/officeDocument/2006/relationships" xmlns:p="http://schemas.openxmlformats.org/presentationml/2006/main">
   <p:cSld>
@@ -17710,7 +20846,7 @@
         <p:spPr>
           <a:xfrm>
             <a:off x="768626" y="689113"/>
-            <a:ext cx="5218032" cy="10064294"/>
+            <a:ext cx="5218032" cy="9510296"/>
           </a:xfrm>
           <a:prstGeom prst="rect">
             <a:avLst/>
@@ -17733,9 +20869,6 @@
               <a:rPr lang="en-GB" sz="3600" dirty="0"/>
               <a:t>(highlighted = finished)</a:t>
             </a:r>
-          </a:p>
-          <a:p>
-            <a:endParaRPr lang="en-GB" sz="3600" dirty="0"/>
           </a:p>
           <a:p>
             <a:endParaRPr lang="en-GB" sz="3600" dirty="0"/>

</xml_diff>